<commit_message>
Updating documentation to have proper formatting. Adding design doc and user's guide
</commit_message>
<xml_diff>
--- a/Documentation/Architecture.pptx
+++ b/Documentation/Architecture.pptx
@@ -116,11 +116,23 @@
       </a:defRPr>
     </a:lvl9pPr>
   </p:defaultTextStyle>
+  <p:extLst>
+    <p:ext uri="{EFAFB233-063F-42B5-8137-9DF3F51BA10A}">
+      <p15:sldGuideLst xmlns:p15="http://schemas.microsoft.com/office/powerpoint/2012/main">
+        <p15:guide id="1" orient="horz" pos="2160">
+          <p15:clr>
+            <a:srgbClr val="A4A3A4"/>
+          </p15:clr>
+        </p15:guide>
+        <p15:guide id="2" pos="3840">
+          <p15:clr>
+            <a:srgbClr val="A4A3A4"/>
+          </p15:clr>
+        </p15:guide>
+      </p15:sldGuideLst>
+    </p:ext>
+  </p:extLst>
 </p:presentation>
-</file>
-
-<file path=ppt/revisionInfo.xml><?xml version="1.0" encoding="utf-8"?>
-<p1510:revInfo xmlns:a="http://schemas.openxmlformats.org/drawingml/2006/main" xmlns:r="http://schemas.openxmlformats.org/officeDocument/2006/relationships" xmlns:p1510="http://schemas.microsoft.com/office/powerpoint/2015/10/main"/>
 </file>
 
 <file path=ppt/slideLayouts/slideLayout1.xml><?xml version="1.0" encoding="utf-8"?>
@@ -145,7 +157,7 @@
           <p:cNvPr id="2" name="Title 1">
             <a:extLst>
               <a:ext uri="{FF2B5EF4-FFF2-40B4-BE49-F238E27FC236}">
-                <a16:creationId xmlns:a16="http://schemas.microsoft.com/office/drawing/2014/main" xmlns="" id="{0208DEFD-B3C0-4D12-817A-672980A0AB83}"/>
+                <a16:creationId xmlns:a16="http://schemas.microsoft.com/office/drawing/2014/main" id="{0208DEFD-B3C0-4D12-817A-672980A0AB83}"/>
               </a:ext>
             </a:extLst>
           </p:cNvPr>
@@ -182,7 +194,7 @@
           <p:cNvPr id="3" name="Subtitle 2">
             <a:extLst>
               <a:ext uri="{FF2B5EF4-FFF2-40B4-BE49-F238E27FC236}">
-                <a16:creationId xmlns:a16="http://schemas.microsoft.com/office/drawing/2014/main" xmlns="" id="{52F30D22-503B-48B4-86CB-F2B0287B54CC}"/>
+                <a16:creationId xmlns:a16="http://schemas.microsoft.com/office/drawing/2014/main" id="{52F30D22-503B-48B4-86CB-F2B0287B54CC}"/>
               </a:ext>
             </a:extLst>
           </p:cNvPr>
@@ -252,7 +264,7 @@
           <p:cNvPr id="4" name="Date Placeholder 3">
             <a:extLst>
               <a:ext uri="{FF2B5EF4-FFF2-40B4-BE49-F238E27FC236}">
-                <a16:creationId xmlns:a16="http://schemas.microsoft.com/office/drawing/2014/main" xmlns="" id="{E8D6C7CF-C878-4063-8520-28BAE75AD582}"/>
+                <a16:creationId xmlns:a16="http://schemas.microsoft.com/office/drawing/2014/main" id="{E8D6C7CF-C878-4063-8520-28BAE75AD582}"/>
               </a:ext>
             </a:extLst>
           </p:cNvPr>
@@ -270,7 +282,7 @@
           <a:p>
             <a:fld id="{79DE2D3D-0B4E-4DD7-9670-155A46B4C7D3}" type="datetimeFigureOut">
               <a:rPr lang="en-US" smtClean="0"/>
-              <a:t>2/27/2018</a:t>
+              <a:t>3/5/2018</a:t>
             </a:fld>
             <a:endParaRPr lang="en-US"/>
           </a:p>
@@ -281,7 +293,7 @@
           <p:cNvPr id="5" name="Footer Placeholder 4">
             <a:extLst>
               <a:ext uri="{FF2B5EF4-FFF2-40B4-BE49-F238E27FC236}">
-                <a16:creationId xmlns:a16="http://schemas.microsoft.com/office/drawing/2014/main" xmlns="" id="{3405CBA8-3946-4106-B7BE-1A9C679D70B1}"/>
+                <a16:creationId xmlns:a16="http://schemas.microsoft.com/office/drawing/2014/main" id="{3405CBA8-3946-4106-B7BE-1A9C679D70B1}"/>
               </a:ext>
             </a:extLst>
           </p:cNvPr>
@@ -306,7 +318,7 @@
           <p:cNvPr id="6" name="Slide Number Placeholder 5">
             <a:extLst>
               <a:ext uri="{FF2B5EF4-FFF2-40B4-BE49-F238E27FC236}">
-                <a16:creationId xmlns:a16="http://schemas.microsoft.com/office/drawing/2014/main" xmlns="" id="{EA452CDD-AB4C-46BE-AF96-A4F89F5341BB}"/>
+                <a16:creationId xmlns:a16="http://schemas.microsoft.com/office/drawing/2014/main" id="{EA452CDD-AB4C-46BE-AF96-A4F89F5341BB}"/>
               </a:ext>
             </a:extLst>
           </p:cNvPr>
@@ -365,7 +377,7 @@
           <p:cNvPr id="2" name="Title 1">
             <a:extLst>
               <a:ext uri="{FF2B5EF4-FFF2-40B4-BE49-F238E27FC236}">
-                <a16:creationId xmlns:a16="http://schemas.microsoft.com/office/drawing/2014/main" xmlns="" id="{0820BE71-470D-4418-8BBA-56BC87E53E0D}"/>
+                <a16:creationId xmlns:a16="http://schemas.microsoft.com/office/drawing/2014/main" id="{0820BE71-470D-4418-8BBA-56BC87E53E0D}"/>
               </a:ext>
             </a:extLst>
           </p:cNvPr>
@@ -393,7 +405,7 @@
           <p:cNvPr id="3" name="Vertical Text Placeholder 2">
             <a:extLst>
               <a:ext uri="{FF2B5EF4-FFF2-40B4-BE49-F238E27FC236}">
-                <a16:creationId xmlns:a16="http://schemas.microsoft.com/office/drawing/2014/main" xmlns="" id="{1CD458A7-5C48-48B1-8674-1E3B59FF0DBF}"/>
+                <a16:creationId xmlns:a16="http://schemas.microsoft.com/office/drawing/2014/main" id="{1CD458A7-5C48-48B1-8674-1E3B59FF0DBF}"/>
               </a:ext>
             </a:extLst>
           </p:cNvPr>
@@ -450,7 +462,7 @@
           <p:cNvPr id="4" name="Date Placeholder 3">
             <a:extLst>
               <a:ext uri="{FF2B5EF4-FFF2-40B4-BE49-F238E27FC236}">
-                <a16:creationId xmlns:a16="http://schemas.microsoft.com/office/drawing/2014/main" xmlns="" id="{71FF30CF-2DC0-4356-ACC2-DC5857B93045}"/>
+                <a16:creationId xmlns:a16="http://schemas.microsoft.com/office/drawing/2014/main" id="{71FF30CF-2DC0-4356-ACC2-DC5857B93045}"/>
               </a:ext>
             </a:extLst>
           </p:cNvPr>
@@ -468,7 +480,7 @@
           <a:p>
             <a:fld id="{79DE2D3D-0B4E-4DD7-9670-155A46B4C7D3}" type="datetimeFigureOut">
               <a:rPr lang="en-US" smtClean="0"/>
-              <a:t>2/27/2018</a:t>
+              <a:t>3/5/2018</a:t>
             </a:fld>
             <a:endParaRPr lang="en-US"/>
           </a:p>
@@ -479,7 +491,7 @@
           <p:cNvPr id="5" name="Footer Placeholder 4">
             <a:extLst>
               <a:ext uri="{FF2B5EF4-FFF2-40B4-BE49-F238E27FC236}">
-                <a16:creationId xmlns:a16="http://schemas.microsoft.com/office/drawing/2014/main" xmlns="" id="{C64F5D84-1880-4D66-9409-B05042B38277}"/>
+                <a16:creationId xmlns:a16="http://schemas.microsoft.com/office/drawing/2014/main" id="{C64F5D84-1880-4D66-9409-B05042B38277}"/>
               </a:ext>
             </a:extLst>
           </p:cNvPr>
@@ -504,7 +516,7 @@
           <p:cNvPr id="6" name="Slide Number Placeholder 5">
             <a:extLst>
               <a:ext uri="{FF2B5EF4-FFF2-40B4-BE49-F238E27FC236}">
-                <a16:creationId xmlns:a16="http://schemas.microsoft.com/office/drawing/2014/main" xmlns="" id="{6AEA3C71-42CA-4318-8246-5C298A025615}"/>
+                <a16:creationId xmlns:a16="http://schemas.microsoft.com/office/drawing/2014/main" id="{6AEA3C71-42CA-4318-8246-5C298A025615}"/>
               </a:ext>
             </a:extLst>
           </p:cNvPr>
@@ -563,7 +575,7 @@
           <p:cNvPr id="2" name="Vertical Title 1">
             <a:extLst>
               <a:ext uri="{FF2B5EF4-FFF2-40B4-BE49-F238E27FC236}">
-                <a16:creationId xmlns:a16="http://schemas.microsoft.com/office/drawing/2014/main" xmlns="" id="{4FC911C0-596F-406E-89F9-D86536F980CB}"/>
+                <a16:creationId xmlns:a16="http://schemas.microsoft.com/office/drawing/2014/main" id="{4FC911C0-596F-406E-89F9-D86536F980CB}"/>
               </a:ext>
             </a:extLst>
           </p:cNvPr>
@@ -596,7 +608,7 @@
           <p:cNvPr id="3" name="Vertical Text Placeholder 2">
             <a:extLst>
               <a:ext uri="{FF2B5EF4-FFF2-40B4-BE49-F238E27FC236}">
-                <a16:creationId xmlns:a16="http://schemas.microsoft.com/office/drawing/2014/main" xmlns="" id="{D3F5427C-63BC-48E8-9131-FE9C4D5F3036}"/>
+                <a16:creationId xmlns:a16="http://schemas.microsoft.com/office/drawing/2014/main" id="{D3F5427C-63BC-48E8-9131-FE9C4D5F3036}"/>
               </a:ext>
             </a:extLst>
           </p:cNvPr>
@@ -658,7 +670,7 @@
           <p:cNvPr id="4" name="Date Placeholder 3">
             <a:extLst>
               <a:ext uri="{FF2B5EF4-FFF2-40B4-BE49-F238E27FC236}">
-                <a16:creationId xmlns:a16="http://schemas.microsoft.com/office/drawing/2014/main" xmlns="" id="{35036C6B-FB42-4DE3-9515-2C21F01A41B2}"/>
+                <a16:creationId xmlns:a16="http://schemas.microsoft.com/office/drawing/2014/main" id="{35036C6B-FB42-4DE3-9515-2C21F01A41B2}"/>
               </a:ext>
             </a:extLst>
           </p:cNvPr>
@@ -676,7 +688,7 @@
           <a:p>
             <a:fld id="{79DE2D3D-0B4E-4DD7-9670-155A46B4C7D3}" type="datetimeFigureOut">
               <a:rPr lang="en-US" smtClean="0"/>
-              <a:t>2/27/2018</a:t>
+              <a:t>3/5/2018</a:t>
             </a:fld>
             <a:endParaRPr lang="en-US"/>
           </a:p>
@@ -687,7 +699,7 @@
           <p:cNvPr id="5" name="Footer Placeholder 4">
             <a:extLst>
               <a:ext uri="{FF2B5EF4-FFF2-40B4-BE49-F238E27FC236}">
-                <a16:creationId xmlns:a16="http://schemas.microsoft.com/office/drawing/2014/main" xmlns="" id="{EE5F9010-B58A-4E05-80CB-8465A102D5D3}"/>
+                <a16:creationId xmlns:a16="http://schemas.microsoft.com/office/drawing/2014/main" id="{EE5F9010-B58A-4E05-80CB-8465A102D5D3}"/>
               </a:ext>
             </a:extLst>
           </p:cNvPr>
@@ -712,7 +724,7 @@
           <p:cNvPr id="6" name="Slide Number Placeholder 5">
             <a:extLst>
               <a:ext uri="{FF2B5EF4-FFF2-40B4-BE49-F238E27FC236}">
-                <a16:creationId xmlns:a16="http://schemas.microsoft.com/office/drawing/2014/main" xmlns="" id="{8A93244B-0726-4AEF-A9D6-78C169B4EBBC}"/>
+                <a16:creationId xmlns:a16="http://schemas.microsoft.com/office/drawing/2014/main" id="{8A93244B-0726-4AEF-A9D6-78C169B4EBBC}"/>
               </a:ext>
             </a:extLst>
           </p:cNvPr>
@@ -771,7 +783,7 @@
           <p:cNvPr id="2" name="Title 1">
             <a:extLst>
               <a:ext uri="{FF2B5EF4-FFF2-40B4-BE49-F238E27FC236}">
-                <a16:creationId xmlns:a16="http://schemas.microsoft.com/office/drawing/2014/main" xmlns="" id="{E8BD4358-492D-49F4-8353-C46623D4A0DE}"/>
+                <a16:creationId xmlns:a16="http://schemas.microsoft.com/office/drawing/2014/main" id="{E8BD4358-492D-49F4-8353-C46623D4A0DE}"/>
               </a:ext>
             </a:extLst>
           </p:cNvPr>
@@ -799,7 +811,7 @@
           <p:cNvPr id="3" name="Content Placeholder 2">
             <a:extLst>
               <a:ext uri="{FF2B5EF4-FFF2-40B4-BE49-F238E27FC236}">
-                <a16:creationId xmlns:a16="http://schemas.microsoft.com/office/drawing/2014/main" xmlns="" id="{CE882704-3E1B-4A78-A667-7E5E07744BE1}"/>
+                <a16:creationId xmlns:a16="http://schemas.microsoft.com/office/drawing/2014/main" id="{CE882704-3E1B-4A78-A667-7E5E07744BE1}"/>
               </a:ext>
             </a:extLst>
           </p:cNvPr>
@@ -856,7 +868,7 @@
           <p:cNvPr id="4" name="Date Placeholder 3">
             <a:extLst>
               <a:ext uri="{FF2B5EF4-FFF2-40B4-BE49-F238E27FC236}">
-                <a16:creationId xmlns:a16="http://schemas.microsoft.com/office/drawing/2014/main" xmlns="" id="{0D08B253-52A2-4C3D-BF5D-B8E56A1A2E16}"/>
+                <a16:creationId xmlns:a16="http://schemas.microsoft.com/office/drawing/2014/main" id="{0D08B253-52A2-4C3D-BF5D-B8E56A1A2E16}"/>
               </a:ext>
             </a:extLst>
           </p:cNvPr>
@@ -874,7 +886,7 @@
           <a:p>
             <a:fld id="{79DE2D3D-0B4E-4DD7-9670-155A46B4C7D3}" type="datetimeFigureOut">
               <a:rPr lang="en-US" smtClean="0"/>
-              <a:t>2/27/2018</a:t>
+              <a:t>3/5/2018</a:t>
             </a:fld>
             <a:endParaRPr lang="en-US"/>
           </a:p>
@@ -885,7 +897,7 @@
           <p:cNvPr id="5" name="Footer Placeholder 4">
             <a:extLst>
               <a:ext uri="{FF2B5EF4-FFF2-40B4-BE49-F238E27FC236}">
-                <a16:creationId xmlns:a16="http://schemas.microsoft.com/office/drawing/2014/main" xmlns="" id="{F2538AF5-D233-40C7-90BF-D5042A78432D}"/>
+                <a16:creationId xmlns:a16="http://schemas.microsoft.com/office/drawing/2014/main" id="{F2538AF5-D233-40C7-90BF-D5042A78432D}"/>
               </a:ext>
             </a:extLst>
           </p:cNvPr>
@@ -910,7 +922,7 @@
           <p:cNvPr id="6" name="Slide Number Placeholder 5">
             <a:extLst>
               <a:ext uri="{FF2B5EF4-FFF2-40B4-BE49-F238E27FC236}">
-                <a16:creationId xmlns:a16="http://schemas.microsoft.com/office/drawing/2014/main" xmlns="" id="{BBDF52CB-805F-4DFD-8CDA-7B1787FF8EEF}"/>
+                <a16:creationId xmlns:a16="http://schemas.microsoft.com/office/drawing/2014/main" id="{BBDF52CB-805F-4DFD-8CDA-7B1787FF8EEF}"/>
               </a:ext>
             </a:extLst>
           </p:cNvPr>
@@ -969,7 +981,7 @@
           <p:cNvPr id="2" name="Title 1">
             <a:extLst>
               <a:ext uri="{FF2B5EF4-FFF2-40B4-BE49-F238E27FC236}">
-                <a16:creationId xmlns:a16="http://schemas.microsoft.com/office/drawing/2014/main" xmlns="" id="{27D28634-873F-4F1F-A867-4DD9B734A08D}"/>
+                <a16:creationId xmlns:a16="http://schemas.microsoft.com/office/drawing/2014/main" id="{27D28634-873F-4F1F-A867-4DD9B734A08D}"/>
               </a:ext>
             </a:extLst>
           </p:cNvPr>
@@ -1006,7 +1018,7 @@
           <p:cNvPr id="3" name="Text Placeholder 2">
             <a:extLst>
               <a:ext uri="{FF2B5EF4-FFF2-40B4-BE49-F238E27FC236}">
-                <a16:creationId xmlns:a16="http://schemas.microsoft.com/office/drawing/2014/main" xmlns="" id="{1DECB686-6970-4E95-90E6-6FEDEDA473C2}"/>
+                <a16:creationId xmlns:a16="http://schemas.microsoft.com/office/drawing/2014/main" id="{1DECB686-6970-4E95-90E6-6FEDEDA473C2}"/>
               </a:ext>
             </a:extLst>
           </p:cNvPr>
@@ -1131,7 +1143,7 @@
           <p:cNvPr id="4" name="Date Placeholder 3">
             <a:extLst>
               <a:ext uri="{FF2B5EF4-FFF2-40B4-BE49-F238E27FC236}">
-                <a16:creationId xmlns:a16="http://schemas.microsoft.com/office/drawing/2014/main" xmlns="" id="{00FBC595-CBE7-4EA9-A885-EE14A03709FF}"/>
+                <a16:creationId xmlns:a16="http://schemas.microsoft.com/office/drawing/2014/main" id="{00FBC595-CBE7-4EA9-A885-EE14A03709FF}"/>
               </a:ext>
             </a:extLst>
           </p:cNvPr>
@@ -1149,7 +1161,7 @@
           <a:p>
             <a:fld id="{79DE2D3D-0B4E-4DD7-9670-155A46B4C7D3}" type="datetimeFigureOut">
               <a:rPr lang="en-US" smtClean="0"/>
-              <a:t>2/27/2018</a:t>
+              <a:t>3/5/2018</a:t>
             </a:fld>
             <a:endParaRPr lang="en-US"/>
           </a:p>
@@ -1160,7 +1172,7 @@
           <p:cNvPr id="5" name="Footer Placeholder 4">
             <a:extLst>
               <a:ext uri="{FF2B5EF4-FFF2-40B4-BE49-F238E27FC236}">
-                <a16:creationId xmlns:a16="http://schemas.microsoft.com/office/drawing/2014/main" xmlns="" id="{FF14EDF1-B2C2-49FE-9528-7E748E6EA3F6}"/>
+                <a16:creationId xmlns:a16="http://schemas.microsoft.com/office/drawing/2014/main" id="{FF14EDF1-B2C2-49FE-9528-7E748E6EA3F6}"/>
               </a:ext>
             </a:extLst>
           </p:cNvPr>
@@ -1185,7 +1197,7 @@
           <p:cNvPr id="6" name="Slide Number Placeholder 5">
             <a:extLst>
               <a:ext uri="{FF2B5EF4-FFF2-40B4-BE49-F238E27FC236}">
-                <a16:creationId xmlns:a16="http://schemas.microsoft.com/office/drawing/2014/main" xmlns="" id="{820E7B30-794B-44D2-9AF6-8F3EBCC924A1}"/>
+                <a16:creationId xmlns:a16="http://schemas.microsoft.com/office/drawing/2014/main" id="{820E7B30-794B-44D2-9AF6-8F3EBCC924A1}"/>
               </a:ext>
             </a:extLst>
           </p:cNvPr>
@@ -1244,7 +1256,7 @@
           <p:cNvPr id="2" name="Title 1">
             <a:extLst>
               <a:ext uri="{FF2B5EF4-FFF2-40B4-BE49-F238E27FC236}">
-                <a16:creationId xmlns:a16="http://schemas.microsoft.com/office/drawing/2014/main" xmlns="" id="{4D052C3E-728A-4E49-88AF-B7AADC9448DF}"/>
+                <a16:creationId xmlns:a16="http://schemas.microsoft.com/office/drawing/2014/main" id="{4D052C3E-728A-4E49-88AF-B7AADC9448DF}"/>
               </a:ext>
             </a:extLst>
           </p:cNvPr>
@@ -1272,7 +1284,7 @@
           <p:cNvPr id="3" name="Content Placeholder 2">
             <a:extLst>
               <a:ext uri="{FF2B5EF4-FFF2-40B4-BE49-F238E27FC236}">
-                <a16:creationId xmlns:a16="http://schemas.microsoft.com/office/drawing/2014/main" xmlns="" id="{19ABF20A-CEF3-431B-95B1-BC6709015D64}"/>
+                <a16:creationId xmlns:a16="http://schemas.microsoft.com/office/drawing/2014/main" id="{19ABF20A-CEF3-431B-95B1-BC6709015D64}"/>
               </a:ext>
             </a:extLst>
           </p:cNvPr>
@@ -1334,7 +1346,7 @@
           <p:cNvPr id="4" name="Content Placeholder 3">
             <a:extLst>
               <a:ext uri="{FF2B5EF4-FFF2-40B4-BE49-F238E27FC236}">
-                <a16:creationId xmlns:a16="http://schemas.microsoft.com/office/drawing/2014/main" xmlns="" id="{2737B622-ACD2-4627-B8FF-45D35B2633F1}"/>
+                <a16:creationId xmlns:a16="http://schemas.microsoft.com/office/drawing/2014/main" id="{2737B622-ACD2-4627-B8FF-45D35B2633F1}"/>
               </a:ext>
             </a:extLst>
           </p:cNvPr>
@@ -1396,7 +1408,7 @@
           <p:cNvPr id="5" name="Date Placeholder 4">
             <a:extLst>
               <a:ext uri="{FF2B5EF4-FFF2-40B4-BE49-F238E27FC236}">
-                <a16:creationId xmlns:a16="http://schemas.microsoft.com/office/drawing/2014/main" xmlns="" id="{42DDD691-4765-43B5-B9AD-534F1097CD33}"/>
+                <a16:creationId xmlns:a16="http://schemas.microsoft.com/office/drawing/2014/main" id="{42DDD691-4765-43B5-B9AD-534F1097CD33}"/>
               </a:ext>
             </a:extLst>
           </p:cNvPr>
@@ -1414,7 +1426,7 @@
           <a:p>
             <a:fld id="{79DE2D3D-0B4E-4DD7-9670-155A46B4C7D3}" type="datetimeFigureOut">
               <a:rPr lang="en-US" smtClean="0"/>
-              <a:t>2/27/2018</a:t>
+              <a:t>3/5/2018</a:t>
             </a:fld>
             <a:endParaRPr lang="en-US"/>
           </a:p>
@@ -1425,7 +1437,7 @@
           <p:cNvPr id="6" name="Footer Placeholder 5">
             <a:extLst>
               <a:ext uri="{FF2B5EF4-FFF2-40B4-BE49-F238E27FC236}">
-                <a16:creationId xmlns:a16="http://schemas.microsoft.com/office/drawing/2014/main" xmlns="" id="{52530E5C-8595-4F7E-B13E-A3BAFCF64E6D}"/>
+                <a16:creationId xmlns:a16="http://schemas.microsoft.com/office/drawing/2014/main" id="{52530E5C-8595-4F7E-B13E-A3BAFCF64E6D}"/>
               </a:ext>
             </a:extLst>
           </p:cNvPr>
@@ -1450,7 +1462,7 @@
           <p:cNvPr id="7" name="Slide Number Placeholder 6">
             <a:extLst>
               <a:ext uri="{FF2B5EF4-FFF2-40B4-BE49-F238E27FC236}">
-                <a16:creationId xmlns:a16="http://schemas.microsoft.com/office/drawing/2014/main" xmlns="" id="{0DB30A7B-8C52-420F-A1B6-C897CC27AA65}"/>
+                <a16:creationId xmlns:a16="http://schemas.microsoft.com/office/drawing/2014/main" id="{0DB30A7B-8C52-420F-A1B6-C897CC27AA65}"/>
               </a:ext>
             </a:extLst>
           </p:cNvPr>
@@ -1509,7 +1521,7 @@
           <p:cNvPr id="2" name="Title 1">
             <a:extLst>
               <a:ext uri="{FF2B5EF4-FFF2-40B4-BE49-F238E27FC236}">
-                <a16:creationId xmlns:a16="http://schemas.microsoft.com/office/drawing/2014/main" xmlns="" id="{E9AC60E8-9FC1-42DC-8C29-EA7465D837D0}"/>
+                <a16:creationId xmlns:a16="http://schemas.microsoft.com/office/drawing/2014/main" id="{E9AC60E8-9FC1-42DC-8C29-EA7465D837D0}"/>
               </a:ext>
             </a:extLst>
           </p:cNvPr>
@@ -1542,7 +1554,7 @@
           <p:cNvPr id="3" name="Text Placeholder 2">
             <a:extLst>
               <a:ext uri="{FF2B5EF4-FFF2-40B4-BE49-F238E27FC236}">
-                <a16:creationId xmlns:a16="http://schemas.microsoft.com/office/drawing/2014/main" xmlns="" id="{0C818A30-7FA1-4337-8120-C200A7442D75}"/>
+                <a16:creationId xmlns:a16="http://schemas.microsoft.com/office/drawing/2014/main" id="{0C818A30-7FA1-4337-8120-C200A7442D75}"/>
               </a:ext>
             </a:extLst>
           </p:cNvPr>
@@ -1613,7 +1625,7 @@
           <p:cNvPr id="4" name="Content Placeholder 3">
             <a:extLst>
               <a:ext uri="{FF2B5EF4-FFF2-40B4-BE49-F238E27FC236}">
-                <a16:creationId xmlns:a16="http://schemas.microsoft.com/office/drawing/2014/main" xmlns="" id="{9CE84CA1-F2AA-4CF1-AFDA-45D282715E23}"/>
+                <a16:creationId xmlns:a16="http://schemas.microsoft.com/office/drawing/2014/main" id="{9CE84CA1-F2AA-4CF1-AFDA-45D282715E23}"/>
               </a:ext>
             </a:extLst>
           </p:cNvPr>
@@ -1675,7 +1687,7 @@
           <p:cNvPr id="5" name="Text Placeholder 4">
             <a:extLst>
               <a:ext uri="{FF2B5EF4-FFF2-40B4-BE49-F238E27FC236}">
-                <a16:creationId xmlns:a16="http://schemas.microsoft.com/office/drawing/2014/main" xmlns="" id="{DBA3B6D1-4E3D-4DD3-9BB7-54C5D52214F5}"/>
+                <a16:creationId xmlns:a16="http://schemas.microsoft.com/office/drawing/2014/main" id="{DBA3B6D1-4E3D-4DD3-9BB7-54C5D52214F5}"/>
               </a:ext>
             </a:extLst>
           </p:cNvPr>
@@ -1746,7 +1758,7 @@
           <p:cNvPr id="6" name="Content Placeholder 5">
             <a:extLst>
               <a:ext uri="{FF2B5EF4-FFF2-40B4-BE49-F238E27FC236}">
-                <a16:creationId xmlns:a16="http://schemas.microsoft.com/office/drawing/2014/main" xmlns="" id="{E542C983-E152-4F06-8C96-7E07D0F125CD}"/>
+                <a16:creationId xmlns:a16="http://schemas.microsoft.com/office/drawing/2014/main" id="{E542C983-E152-4F06-8C96-7E07D0F125CD}"/>
               </a:ext>
             </a:extLst>
           </p:cNvPr>
@@ -1808,7 +1820,7 @@
           <p:cNvPr id="7" name="Date Placeholder 6">
             <a:extLst>
               <a:ext uri="{FF2B5EF4-FFF2-40B4-BE49-F238E27FC236}">
-                <a16:creationId xmlns:a16="http://schemas.microsoft.com/office/drawing/2014/main" xmlns="" id="{8E601059-966A-4AC8-B04D-E3BDB85FC4E2}"/>
+                <a16:creationId xmlns:a16="http://schemas.microsoft.com/office/drawing/2014/main" id="{8E601059-966A-4AC8-B04D-E3BDB85FC4E2}"/>
               </a:ext>
             </a:extLst>
           </p:cNvPr>
@@ -1826,7 +1838,7 @@
           <a:p>
             <a:fld id="{79DE2D3D-0B4E-4DD7-9670-155A46B4C7D3}" type="datetimeFigureOut">
               <a:rPr lang="en-US" smtClean="0"/>
-              <a:t>2/27/2018</a:t>
+              <a:t>3/5/2018</a:t>
             </a:fld>
             <a:endParaRPr lang="en-US"/>
           </a:p>
@@ -1837,7 +1849,7 @@
           <p:cNvPr id="8" name="Footer Placeholder 7">
             <a:extLst>
               <a:ext uri="{FF2B5EF4-FFF2-40B4-BE49-F238E27FC236}">
-                <a16:creationId xmlns:a16="http://schemas.microsoft.com/office/drawing/2014/main" xmlns="" id="{79DD1AA8-075F-40C9-9873-85A9A2D4DC98}"/>
+                <a16:creationId xmlns:a16="http://schemas.microsoft.com/office/drawing/2014/main" id="{79DD1AA8-075F-40C9-9873-85A9A2D4DC98}"/>
               </a:ext>
             </a:extLst>
           </p:cNvPr>
@@ -1862,7 +1874,7 @@
           <p:cNvPr id="9" name="Slide Number Placeholder 8">
             <a:extLst>
               <a:ext uri="{FF2B5EF4-FFF2-40B4-BE49-F238E27FC236}">
-                <a16:creationId xmlns:a16="http://schemas.microsoft.com/office/drawing/2014/main" xmlns="" id="{C179C8F9-9FC6-415C-BF20-26F3308511CF}"/>
+                <a16:creationId xmlns:a16="http://schemas.microsoft.com/office/drawing/2014/main" id="{C179C8F9-9FC6-415C-BF20-26F3308511CF}"/>
               </a:ext>
             </a:extLst>
           </p:cNvPr>
@@ -1921,7 +1933,7 @@
           <p:cNvPr id="2" name="Title 1">
             <a:extLst>
               <a:ext uri="{FF2B5EF4-FFF2-40B4-BE49-F238E27FC236}">
-                <a16:creationId xmlns:a16="http://schemas.microsoft.com/office/drawing/2014/main" xmlns="" id="{4C9581B1-453E-4AAD-9D12-D5CD21C43E28}"/>
+                <a16:creationId xmlns:a16="http://schemas.microsoft.com/office/drawing/2014/main" id="{4C9581B1-453E-4AAD-9D12-D5CD21C43E28}"/>
               </a:ext>
             </a:extLst>
           </p:cNvPr>
@@ -1949,7 +1961,7 @@
           <p:cNvPr id="3" name="Date Placeholder 2">
             <a:extLst>
               <a:ext uri="{FF2B5EF4-FFF2-40B4-BE49-F238E27FC236}">
-                <a16:creationId xmlns:a16="http://schemas.microsoft.com/office/drawing/2014/main" xmlns="" id="{19DECDA6-0FFD-4C5B-B7E6-7249068A0385}"/>
+                <a16:creationId xmlns:a16="http://schemas.microsoft.com/office/drawing/2014/main" id="{19DECDA6-0FFD-4C5B-B7E6-7249068A0385}"/>
               </a:ext>
             </a:extLst>
           </p:cNvPr>
@@ -1967,7 +1979,7 @@
           <a:p>
             <a:fld id="{79DE2D3D-0B4E-4DD7-9670-155A46B4C7D3}" type="datetimeFigureOut">
               <a:rPr lang="en-US" smtClean="0"/>
-              <a:t>2/27/2018</a:t>
+              <a:t>3/5/2018</a:t>
             </a:fld>
             <a:endParaRPr lang="en-US"/>
           </a:p>
@@ -1978,7 +1990,7 @@
           <p:cNvPr id="4" name="Footer Placeholder 3">
             <a:extLst>
               <a:ext uri="{FF2B5EF4-FFF2-40B4-BE49-F238E27FC236}">
-                <a16:creationId xmlns:a16="http://schemas.microsoft.com/office/drawing/2014/main" xmlns="" id="{51FB464C-C0C4-4823-A3E7-091DC998738E}"/>
+                <a16:creationId xmlns:a16="http://schemas.microsoft.com/office/drawing/2014/main" id="{51FB464C-C0C4-4823-A3E7-091DC998738E}"/>
               </a:ext>
             </a:extLst>
           </p:cNvPr>
@@ -2003,7 +2015,7 @@
           <p:cNvPr id="5" name="Slide Number Placeholder 4">
             <a:extLst>
               <a:ext uri="{FF2B5EF4-FFF2-40B4-BE49-F238E27FC236}">
-                <a16:creationId xmlns:a16="http://schemas.microsoft.com/office/drawing/2014/main" xmlns="" id="{D0716546-9DB4-4D0D-B586-6AC1ECAE4C07}"/>
+                <a16:creationId xmlns:a16="http://schemas.microsoft.com/office/drawing/2014/main" id="{D0716546-9DB4-4D0D-B586-6AC1ECAE4C07}"/>
               </a:ext>
             </a:extLst>
           </p:cNvPr>
@@ -2062,7 +2074,7 @@
           <p:cNvPr id="2" name="Date Placeholder 1">
             <a:extLst>
               <a:ext uri="{FF2B5EF4-FFF2-40B4-BE49-F238E27FC236}">
-                <a16:creationId xmlns:a16="http://schemas.microsoft.com/office/drawing/2014/main" xmlns="" id="{BA814E6B-A29F-4AE7-9237-6DF2A3ABBA33}"/>
+                <a16:creationId xmlns:a16="http://schemas.microsoft.com/office/drawing/2014/main" id="{BA814E6B-A29F-4AE7-9237-6DF2A3ABBA33}"/>
               </a:ext>
             </a:extLst>
           </p:cNvPr>
@@ -2080,7 +2092,7 @@
           <a:p>
             <a:fld id="{79DE2D3D-0B4E-4DD7-9670-155A46B4C7D3}" type="datetimeFigureOut">
               <a:rPr lang="en-US" smtClean="0"/>
-              <a:t>2/27/2018</a:t>
+              <a:t>3/5/2018</a:t>
             </a:fld>
             <a:endParaRPr lang="en-US"/>
           </a:p>
@@ -2091,7 +2103,7 @@
           <p:cNvPr id="3" name="Footer Placeholder 2">
             <a:extLst>
               <a:ext uri="{FF2B5EF4-FFF2-40B4-BE49-F238E27FC236}">
-                <a16:creationId xmlns:a16="http://schemas.microsoft.com/office/drawing/2014/main" xmlns="" id="{09BA391C-6DAE-4B53-B555-6CD4D8F9D2CB}"/>
+                <a16:creationId xmlns:a16="http://schemas.microsoft.com/office/drawing/2014/main" id="{09BA391C-6DAE-4B53-B555-6CD4D8F9D2CB}"/>
               </a:ext>
             </a:extLst>
           </p:cNvPr>
@@ -2116,7 +2128,7 @@
           <p:cNvPr id="4" name="Slide Number Placeholder 3">
             <a:extLst>
               <a:ext uri="{FF2B5EF4-FFF2-40B4-BE49-F238E27FC236}">
-                <a16:creationId xmlns:a16="http://schemas.microsoft.com/office/drawing/2014/main" xmlns="" id="{F625249E-BF43-4AB8-A5F0-A41CC1492ED3}"/>
+                <a16:creationId xmlns:a16="http://schemas.microsoft.com/office/drawing/2014/main" id="{F625249E-BF43-4AB8-A5F0-A41CC1492ED3}"/>
               </a:ext>
             </a:extLst>
           </p:cNvPr>
@@ -2175,7 +2187,7 @@
           <p:cNvPr id="2" name="Title 1">
             <a:extLst>
               <a:ext uri="{FF2B5EF4-FFF2-40B4-BE49-F238E27FC236}">
-                <a16:creationId xmlns:a16="http://schemas.microsoft.com/office/drawing/2014/main" xmlns="" id="{076ABC1E-EE30-473D-9843-97DA2B713DCD}"/>
+                <a16:creationId xmlns:a16="http://schemas.microsoft.com/office/drawing/2014/main" id="{076ABC1E-EE30-473D-9843-97DA2B713DCD}"/>
               </a:ext>
             </a:extLst>
           </p:cNvPr>
@@ -2212,7 +2224,7 @@
           <p:cNvPr id="3" name="Content Placeholder 2">
             <a:extLst>
               <a:ext uri="{FF2B5EF4-FFF2-40B4-BE49-F238E27FC236}">
-                <a16:creationId xmlns:a16="http://schemas.microsoft.com/office/drawing/2014/main" xmlns="" id="{BC46249D-CC42-436D-BE0D-5625D0485C24}"/>
+                <a16:creationId xmlns:a16="http://schemas.microsoft.com/office/drawing/2014/main" id="{BC46249D-CC42-436D-BE0D-5625D0485C24}"/>
               </a:ext>
             </a:extLst>
           </p:cNvPr>
@@ -2302,7 +2314,7 @@
           <p:cNvPr id="4" name="Text Placeholder 3">
             <a:extLst>
               <a:ext uri="{FF2B5EF4-FFF2-40B4-BE49-F238E27FC236}">
-                <a16:creationId xmlns:a16="http://schemas.microsoft.com/office/drawing/2014/main" xmlns="" id="{BB8F32DE-2D90-4225-849F-71A8E16108A2}"/>
+                <a16:creationId xmlns:a16="http://schemas.microsoft.com/office/drawing/2014/main" id="{BB8F32DE-2D90-4225-849F-71A8E16108A2}"/>
               </a:ext>
             </a:extLst>
           </p:cNvPr>
@@ -2373,7 +2385,7 @@
           <p:cNvPr id="5" name="Date Placeholder 4">
             <a:extLst>
               <a:ext uri="{FF2B5EF4-FFF2-40B4-BE49-F238E27FC236}">
-                <a16:creationId xmlns:a16="http://schemas.microsoft.com/office/drawing/2014/main" xmlns="" id="{81FDD5F9-4B94-4BF2-986F-B735C9B79581}"/>
+                <a16:creationId xmlns:a16="http://schemas.microsoft.com/office/drawing/2014/main" id="{81FDD5F9-4B94-4BF2-986F-B735C9B79581}"/>
               </a:ext>
             </a:extLst>
           </p:cNvPr>
@@ -2391,7 +2403,7 @@
           <a:p>
             <a:fld id="{79DE2D3D-0B4E-4DD7-9670-155A46B4C7D3}" type="datetimeFigureOut">
               <a:rPr lang="en-US" smtClean="0"/>
-              <a:t>2/27/2018</a:t>
+              <a:t>3/5/2018</a:t>
             </a:fld>
             <a:endParaRPr lang="en-US"/>
           </a:p>
@@ -2402,7 +2414,7 @@
           <p:cNvPr id="6" name="Footer Placeholder 5">
             <a:extLst>
               <a:ext uri="{FF2B5EF4-FFF2-40B4-BE49-F238E27FC236}">
-                <a16:creationId xmlns:a16="http://schemas.microsoft.com/office/drawing/2014/main" xmlns="" id="{D0408356-96AD-466E-AC30-0DCC886CEFA5}"/>
+                <a16:creationId xmlns:a16="http://schemas.microsoft.com/office/drawing/2014/main" id="{D0408356-96AD-466E-AC30-0DCC886CEFA5}"/>
               </a:ext>
             </a:extLst>
           </p:cNvPr>
@@ -2427,7 +2439,7 @@
           <p:cNvPr id="7" name="Slide Number Placeholder 6">
             <a:extLst>
               <a:ext uri="{FF2B5EF4-FFF2-40B4-BE49-F238E27FC236}">
-                <a16:creationId xmlns:a16="http://schemas.microsoft.com/office/drawing/2014/main" xmlns="" id="{68F5E96F-D5B9-4F8B-A9CC-7427EAB39A92}"/>
+                <a16:creationId xmlns:a16="http://schemas.microsoft.com/office/drawing/2014/main" id="{68F5E96F-D5B9-4F8B-A9CC-7427EAB39A92}"/>
               </a:ext>
             </a:extLst>
           </p:cNvPr>
@@ -2486,7 +2498,7 @@
           <p:cNvPr id="2" name="Title 1">
             <a:extLst>
               <a:ext uri="{FF2B5EF4-FFF2-40B4-BE49-F238E27FC236}">
-                <a16:creationId xmlns:a16="http://schemas.microsoft.com/office/drawing/2014/main" xmlns="" id="{9C0F5112-278F-44E4-87C0-4C2F8A651829}"/>
+                <a16:creationId xmlns:a16="http://schemas.microsoft.com/office/drawing/2014/main" id="{9C0F5112-278F-44E4-87C0-4C2F8A651829}"/>
               </a:ext>
             </a:extLst>
           </p:cNvPr>
@@ -2523,7 +2535,7 @@
           <p:cNvPr id="3" name="Picture Placeholder 2">
             <a:extLst>
               <a:ext uri="{FF2B5EF4-FFF2-40B4-BE49-F238E27FC236}">
-                <a16:creationId xmlns:a16="http://schemas.microsoft.com/office/drawing/2014/main" xmlns="" id="{05EA54BB-79CA-4CC9-98CE-E5D860A33729}"/>
+                <a16:creationId xmlns:a16="http://schemas.microsoft.com/office/drawing/2014/main" id="{05EA54BB-79CA-4CC9-98CE-E5D860A33729}"/>
               </a:ext>
             </a:extLst>
           </p:cNvPr>
@@ -2590,7 +2602,7 @@
           <p:cNvPr id="4" name="Text Placeholder 3">
             <a:extLst>
               <a:ext uri="{FF2B5EF4-FFF2-40B4-BE49-F238E27FC236}">
-                <a16:creationId xmlns:a16="http://schemas.microsoft.com/office/drawing/2014/main" xmlns="" id="{BE5F85B6-2DFC-4F12-B91A-B047130C2235}"/>
+                <a16:creationId xmlns:a16="http://schemas.microsoft.com/office/drawing/2014/main" id="{BE5F85B6-2DFC-4F12-B91A-B047130C2235}"/>
               </a:ext>
             </a:extLst>
           </p:cNvPr>
@@ -2661,7 +2673,7 @@
           <p:cNvPr id="5" name="Date Placeholder 4">
             <a:extLst>
               <a:ext uri="{FF2B5EF4-FFF2-40B4-BE49-F238E27FC236}">
-                <a16:creationId xmlns:a16="http://schemas.microsoft.com/office/drawing/2014/main" xmlns="" id="{172D123F-5801-4632-89EF-A7048EAB1264}"/>
+                <a16:creationId xmlns:a16="http://schemas.microsoft.com/office/drawing/2014/main" id="{172D123F-5801-4632-89EF-A7048EAB1264}"/>
               </a:ext>
             </a:extLst>
           </p:cNvPr>
@@ -2679,7 +2691,7 @@
           <a:p>
             <a:fld id="{79DE2D3D-0B4E-4DD7-9670-155A46B4C7D3}" type="datetimeFigureOut">
               <a:rPr lang="en-US" smtClean="0"/>
-              <a:t>2/27/2018</a:t>
+              <a:t>3/5/2018</a:t>
             </a:fld>
             <a:endParaRPr lang="en-US"/>
           </a:p>
@@ -2690,7 +2702,7 @@
           <p:cNvPr id="6" name="Footer Placeholder 5">
             <a:extLst>
               <a:ext uri="{FF2B5EF4-FFF2-40B4-BE49-F238E27FC236}">
-                <a16:creationId xmlns:a16="http://schemas.microsoft.com/office/drawing/2014/main" xmlns="" id="{5393FCEA-51F8-4D51-BA8E-D42F966A2BF0}"/>
+                <a16:creationId xmlns:a16="http://schemas.microsoft.com/office/drawing/2014/main" id="{5393FCEA-51F8-4D51-BA8E-D42F966A2BF0}"/>
               </a:ext>
             </a:extLst>
           </p:cNvPr>
@@ -2715,7 +2727,7 @@
           <p:cNvPr id="7" name="Slide Number Placeholder 6">
             <a:extLst>
               <a:ext uri="{FF2B5EF4-FFF2-40B4-BE49-F238E27FC236}">
-                <a16:creationId xmlns:a16="http://schemas.microsoft.com/office/drawing/2014/main" xmlns="" id="{A0B91011-BCB3-49E8-B94D-89877DAB044B}"/>
+                <a16:creationId xmlns:a16="http://schemas.microsoft.com/office/drawing/2014/main" id="{A0B91011-BCB3-49E8-B94D-89877DAB044B}"/>
               </a:ext>
             </a:extLst>
           </p:cNvPr>
@@ -2779,7 +2791,7 @@
           <p:cNvPr id="2" name="Title Placeholder 1">
             <a:extLst>
               <a:ext uri="{FF2B5EF4-FFF2-40B4-BE49-F238E27FC236}">
-                <a16:creationId xmlns:a16="http://schemas.microsoft.com/office/drawing/2014/main" xmlns="" id="{5BBD9B47-EC09-49CB-91C3-4FF23C8DFDFA}"/>
+                <a16:creationId xmlns:a16="http://schemas.microsoft.com/office/drawing/2014/main" id="{5BBD9B47-EC09-49CB-91C3-4FF23C8DFDFA}"/>
               </a:ext>
             </a:extLst>
           </p:cNvPr>
@@ -2817,7 +2829,7 @@
           <p:cNvPr id="3" name="Text Placeholder 2">
             <a:extLst>
               <a:ext uri="{FF2B5EF4-FFF2-40B4-BE49-F238E27FC236}">
-                <a16:creationId xmlns:a16="http://schemas.microsoft.com/office/drawing/2014/main" xmlns="" id="{513AA069-5DC8-4F13-BF00-1DDB9CFEBB93}"/>
+                <a16:creationId xmlns:a16="http://schemas.microsoft.com/office/drawing/2014/main" id="{513AA069-5DC8-4F13-BF00-1DDB9CFEBB93}"/>
               </a:ext>
             </a:extLst>
           </p:cNvPr>
@@ -2884,7 +2896,7 @@
           <p:cNvPr id="4" name="Date Placeholder 3">
             <a:extLst>
               <a:ext uri="{FF2B5EF4-FFF2-40B4-BE49-F238E27FC236}">
-                <a16:creationId xmlns:a16="http://schemas.microsoft.com/office/drawing/2014/main" xmlns="" id="{1B988FF8-EF37-4E2D-8D06-B56DC9727511}"/>
+                <a16:creationId xmlns:a16="http://schemas.microsoft.com/office/drawing/2014/main" id="{1B988FF8-EF37-4E2D-8D06-B56DC9727511}"/>
               </a:ext>
             </a:extLst>
           </p:cNvPr>
@@ -2920,7 +2932,7 @@
           <a:p>
             <a:fld id="{79DE2D3D-0B4E-4DD7-9670-155A46B4C7D3}" type="datetimeFigureOut">
               <a:rPr lang="en-US" smtClean="0"/>
-              <a:t>2/27/2018</a:t>
+              <a:t>3/5/2018</a:t>
             </a:fld>
             <a:endParaRPr lang="en-US"/>
           </a:p>
@@ -2931,7 +2943,7 @@
           <p:cNvPr id="5" name="Footer Placeholder 4">
             <a:extLst>
               <a:ext uri="{FF2B5EF4-FFF2-40B4-BE49-F238E27FC236}">
-                <a16:creationId xmlns:a16="http://schemas.microsoft.com/office/drawing/2014/main" xmlns="" id="{83212C0E-B2E5-4E9B-8071-67611BC3B695}"/>
+                <a16:creationId xmlns:a16="http://schemas.microsoft.com/office/drawing/2014/main" id="{83212C0E-B2E5-4E9B-8071-67611BC3B695}"/>
               </a:ext>
             </a:extLst>
           </p:cNvPr>
@@ -2974,7 +2986,7 @@
           <p:cNvPr id="6" name="Slide Number Placeholder 5">
             <a:extLst>
               <a:ext uri="{FF2B5EF4-FFF2-40B4-BE49-F238E27FC236}">
-                <a16:creationId xmlns:a16="http://schemas.microsoft.com/office/drawing/2014/main" xmlns="" id="{FEDCB7D4-E33C-461E-9027-986C5814089F}"/>
+                <a16:creationId xmlns:a16="http://schemas.microsoft.com/office/drawing/2014/main" id="{FEDCB7D4-E33C-461E-9027-986C5814089F}"/>
               </a:ext>
             </a:extLst>
           </p:cNvPr>
@@ -3342,7 +3354,7 @@
           <p:cNvPr id="2" name="Title 1">
             <a:extLst>
               <a:ext uri="{FF2B5EF4-FFF2-40B4-BE49-F238E27FC236}">
-                <a16:creationId xmlns:a16="http://schemas.microsoft.com/office/drawing/2014/main" xmlns="" id="{139BAF7C-DB50-417E-B55C-81858A77D703}"/>
+                <a16:creationId xmlns:a16="http://schemas.microsoft.com/office/drawing/2014/main" id="{139BAF7C-DB50-417E-B55C-81858A77D703}"/>
               </a:ext>
             </a:extLst>
           </p:cNvPr>
@@ -3370,7 +3382,7 @@
           <p:cNvPr id="3" name="Subtitle 2">
             <a:extLst>
               <a:ext uri="{FF2B5EF4-FFF2-40B4-BE49-F238E27FC236}">
-                <a16:creationId xmlns:a16="http://schemas.microsoft.com/office/drawing/2014/main" xmlns="" id="{CE9D560A-2AB0-4D6D-83D1-F0F54D6A5F58}"/>
+                <a16:creationId xmlns:a16="http://schemas.microsoft.com/office/drawing/2014/main" id="{CE9D560A-2AB0-4D6D-83D1-F0F54D6A5F58}"/>
               </a:ext>
             </a:extLst>
           </p:cNvPr>
@@ -3400,13 +3412,6 @@
   <p:clrMapOvr>
     <a:masterClrMapping/>
   </p:clrMapOvr>
-  <p:timing>
-    <p:tnLst>
-      <p:par>
-        <p:cTn id="1" dur="indefinite" restart="never" nodeType="tmRoot"/>
-      </p:par>
-    </p:tnLst>
-  </p:timing>
 </p:sld>
 </file>
 
@@ -3432,7 +3437,7 @@
           <p:cNvPr id="2" name="Title 1">
             <a:extLst>
               <a:ext uri="{FF2B5EF4-FFF2-40B4-BE49-F238E27FC236}">
-                <a16:creationId xmlns:a16="http://schemas.microsoft.com/office/drawing/2014/main" xmlns="" id="{88BB61F1-4D04-4BA3-880A-182E63063E3F}"/>
+                <a16:creationId xmlns:a16="http://schemas.microsoft.com/office/drawing/2014/main" id="{88BB61F1-4D04-4BA3-880A-182E63063E3F}"/>
               </a:ext>
             </a:extLst>
           </p:cNvPr>
@@ -3460,7 +3465,7 @@
           <p:cNvPr id="5" name="Table 4">
             <a:extLst>
               <a:ext uri="{FF2B5EF4-FFF2-40B4-BE49-F238E27FC236}">
-                <a16:creationId xmlns:a16="http://schemas.microsoft.com/office/drawing/2014/main" xmlns="" id="{7FE0EC76-5C3B-4492-8D2E-E1FAAD3FCB09}"/>
+                <a16:creationId xmlns:a16="http://schemas.microsoft.com/office/drawing/2014/main" id="{7FE0EC76-5C3B-4492-8D2E-E1FAAD3FCB09}"/>
               </a:ext>
             </a:extLst>
           </p:cNvPr>
@@ -3489,21 +3494,21 @@
                 <a:gridCol w="1190594">
                   <a:extLst>
                     <a:ext uri="{9D8B030D-6E8A-4147-A177-3AD203B41FA5}">
-                      <a16:colId xmlns:a16="http://schemas.microsoft.com/office/drawing/2014/main" xmlns="" val="2350551349"/>
+                      <a16:colId xmlns:a16="http://schemas.microsoft.com/office/drawing/2014/main" val="2350551349"/>
                     </a:ext>
                   </a:extLst>
                 </a:gridCol>
                 <a:gridCol w="4492101">
                   <a:extLst>
                     <a:ext uri="{9D8B030D-6E8A-4147-A177-3AD203B41FA5}">
-                      <a16:colId xmlns:a16="http://schemas.microsoft.com/office/drawing/2014/main" xmlns="" val="3837764880"/>
+                      <a16:colId xmlns:a16="http://schemas.microsoft.com/office/drawing/2014/main" val="3837764880"/>
                     </a:ext>
                   </a:extLst>
                 </a:gridCol>
                 <a:gridCol w="5495277">
                   <a:extLst>
                     <a:ext uri="{9D8B030D-6E8A-4147-A177-3AD203B41FA5}">
-                      <a16:colId xmlns:a16="http://schemas.microsoft.com/office/drawing/2014/main" xmlns="" val="1650680026"/>
+                      <a16:colId xmlns:a16="http://schemas.microsoft.com/office/drawing/2014/main" val="1650680026"/>
                     </a:ext>
                   </a:extLst>
                 </a:gridCol>
@@ -3615,7 +3620,7 @@
                 </a:tc>
                 <a:extLst>
                   <a:ext uri="{0D108BD9-81ED-4DB2-BD59-A6C34878D82A}">
-                    <a16:rowId xmlns:a16="http://schemas.microsoft.com/office/drawing/2014/main" xmlns="" val="3622372536"/>
+                    <a16:rowId xmlns:a16="http://schemas.microsoft.com/office/drawing/2014/main" val="3622372536"/>
                   </a:ext>
                 </a:extLst>
               </a:tr>
@@ -3655,7 +3660,7 @@
                 </a:tc>
                 <a:extLst>
                   <a:ext uri="{0D108BD9-81ED-4DB2-BD59-A6C34878D82A}">
-                    <a16:rowId xmlns:a16="http://schemas.microsoft.com/office/drawing/2014/main" xmlns="" val="3395803886"/>
+                    <a16:rowId xmlns:a16="http://schemas.microsoft.com/office/drawing/2014/main" val="3395803886"/>
                   </a:ext>
                 </a:extLst>
               </a:tr>
@@ -3695,7 +3700,7 @@
                 </a:tc>
                 <a:extLst>
                   <a:ext uri="{0D108BD9-81ED-4DB2-BD59-A6C34878D82A}">
-                    <a16:rowId xmlns:a16="http://schemas.microsoft.com/office/drawing/2014/main" xmlns="" val="678614825"/>
+                    <a16:rowId xmlns:a16="http://schemas.microsoft.com/office/drawing/2014/main" val="678614825"/>
                   </a:ext>
                 </a:extLst>
               </a:tr>
@@ -3735,7 +3740,7 @@
                 </a:tc>
                 <a:extLst>
                   <a:ext uri="{0D108BD9-81ED-4DB2-BD59-A6C34878D82A}">
-                    <a16:rowId xmlns:a16="http://schemas.microsoft.com/office/drawing/2014/main" xmlns="" val="14700446"/>
+                    <a16:rowId xmlns:a16="http://schemas.microsoft.com/office/drawing/2014/main" val="14700446"/>
                   </a:ext>
                 </a:extLst>
               </a:tr>
@@ -3826,7 +3831,7 @@
                 </a:tc>
                 <a:extLst>
                   <a:ext uri="{0D108BD9-81ED-4DB2-BD59-A6C34878D82A}">
-                    <a16:rowId xmlns:a16="http://schemas.microsoft.com/office/drawing/2014/main" xmlns="" val="2986406775"/>
+                    <a16:rowId xmlns:a16="http://schemas.microsoft.com/office/drawing/2014/main" val="2986406775"/>
                   </a:ext>
                 </a:extLst>
               </a:tr>
@@ -3839,7 +3844,7 @@
           <p:cNvPr id="6" name="Rectangle 5">
             <a:extLst>
               <a:ext uri="{FF2B5EF4-FFF2-40B4-BE49-F238E27FC236}">
-                <a16:creationId xmlns:a16="http://schemas.microsoft.com/office/drawing/2014/main" xmlns="" id="{3D3A6304-95D1-4C9A-9D4F-D6FEB093FD04}"/>
+                <a16:creationId xmlns:a16="http://schemas.microsoft.com/office/drawing/2014/main" id="{3D3A6304-95D1-4C9A-9D4F-D6FEB093FD04}"/>
               </a:ext>
             </a:extLst>
           </p:cNvPr>
@@ -3889,7 +3894,7 @@
           <p:cNvPr id="7" name="Rectangle 6">
             <a:extLst>
               <a:ext uri="{FF2B5EF4-FFF2-40B4-BE49-F238E27FC236}">
-                <a16:creationId xmlns:a16="http://schemas.microsoft.com/office/drawing/2014/main" xmlns="" id="{FA2D1AB0-D637-49D0-8B11-798F83C57DE5}"/>
+                <a16:creationId xmlns:a16="http://schemas.microsoft.com/office/drawing/2014/main" id="{FA2D1AB0-D637-49D0-8B11-798F83C57DE5}"/>
               </a:ext>
             </a:extLst>
           </p:cNvPr>
@@ -3938,7 +3943,7 @@
           <p:cNvPr id="20" name="Group 19">
             <a:extLst>
               <a:ext uri="{FF2B5EF4-FFF2-40B4-BE49-F238E27FC236}">
-                <a16:creationId xmlns:a16="http://schemas.microsoft.com/office/drawing/2014/main" xmlns="" id="{61966E5F-6A7D-4692-B4A7-31B364D52472}"/>
+                <a16:creationId xmlns:a16="http://schemas.microsoft.com/office/drawing/2014/main" id="{61966E5F-6A7D-4692-B4A7-31B364D52472}"/>
               </a:ext>
             </a:extLst>
           </p:cNvPr>
@@ -3958,7 +3963,7 @@
             <p:cNvPr id="10" name="Rectangle 9">
               <a:extLst>
                 <a:ext uri="{FF2B5EF4-FFF2-40B4-BE49-F238E27FC236}">
-                  <a16:creationId xmlns:a16="http://schemas.microsoft.com/office/drawing/2014/main" xmlns="" id="{ED96FD96-30EE-42EA-AE74-FF660B4CD95E}"/>
+                  <a16:creationId xmlns:a16="http://schemas.microsoft.com/office/drawing/2014/main" id="{ED96FD96-30EE-42EA-AE74-FF660B4CD95E}"/>
                 </a:ext>
               </a:extLst>
             </p:cNvPr>
@@ -4007,7 +4012,7 @@
             <p:cNvPr id="15" name="Flowchart: Decision 14">
               <a:extLst>
                 <a:ext uri="{FF2B5EF4-FFF2-40B4-BE49-F238E27FC236}">
-                  <a16:creationId xmlns:a16="http://schemas.microsoft.com/office/drawing/2014/main" xmlns="" id="{7DD829F6-1A9E-4763-8903-C9A0993AC38E}"/>
+                  <a16:creationId xmlns:a16="http://schemas.microsoft.com/office/drawing/2014/main" id="{7DD829F6-1A9E-4763-8903-C9A0993AC38E}"/>
                 </a:ext>
               </a:extLst>
             </p:cNvPr>
@@ -4054,7 +4059,7 @@
           <p:cNvPr id="19" name="Group 18">
             <a:extLst>
               <a:ext uri="{FF2B5EF4-FFF2-40B4-BE49-F238E27FC236}">
-                <a16:creationId xmlns:a16="http://schemas.microsoft.com/office/drawing/2014/main" xmlns="" id="{0DAE263D-B219-4D24-932B-1ECEB1854EDA}"/>
+                <a16:creationId xmlns:a16="http://schemas.microsoft.com/office/drawing/2014/main" id="{0DAE263D-B219-4D24-932B-1ECEB1854EDA}"/>
               </a:ext>
             </a:extLst>
           </p:cNvPr>
@@ -4074,7 +4079,7 @@
             <p:cNvPr id="11" name="Rectangle 10">
               <a:extLst>
                 <a:ext uri="{FF2B5EF4-FFF2-40B4-BE49-F238E27FC236}">
-                  <a16:creationId xmlns:a16="http://schemas.microsoft.com/office/drawing/2014/main" xmlns="" id="{80085097-CCF1-4DCA-9E6D-E8FB4FF5528B}"/>
+                  <a16:creationId xmlns:a16="http://schemas.microsoft.com/office/drawing/2014/main" id="{80085097-CCF1-4DCA-9E6D-E8FB4FF5528B}"/>
                 </a:ext>
               </a:extLst>
             </p:cNvPr>
@@ -4123,7 +4128,7 @@
             <p:cNvPr id="12" name="Flowchart: Decision 11">
               <a:extLst>
                 <a:ext uri="{FF2B5EF4-FFF2-40B4-BE49-F238E27FC236}">
-                  <a16:creationId xmlns:a16="http://schemas.microsoft.com/office/drawing/2014/main" xmlns="" id="{2A0BE501-A964-4BB6-B7A5-2B5C26EC5DF9}"/>
+                  <a16:creationId xmlns:a16="http://schemas.microsoft.com/office/drawing/2014/main" id="{2A0BE501-A964-4BB6-B7A5-2B5C26EC5DF9}"/>
                 </a:ext>
               </a:extLst>
             </p:cNvPr>
@@ -4169,7 +4174,7 @@
             <p:cNvPr id="13" name="Flowchart: Decision 12">
               <a:extLst>
                 <a:ext uri="{FF2B5EF4-FFF2-40B4-BE49-F238E27FC236}">
-                  <a16:creationId xmlns:a16="http://schemas.microsoft.com/office/drawing/2014/main" xmlns="" id="{ED8A9097-3781-480B-8EA6-66A0EFFD1B0C}"/>
+                  <a16:creationId xmlns:a16="http://schemas.microsoft.com/office/drawing/2014/main" id="{ED8A9097-3781-480B-8EA6-66A0EFFD1B0C}"/>
                 </a:ext>
               </a:extLst>
             </p:cNvPr>
@@ -4215,7 +4220,7 @@
             <p:cNvPr id="14" name="Flowchart: Decision 13">
               <a:extLst>
                 <a:ext uri="{FF2B5EF4-FFF2-40B4-BE49-F238E27FC236}">
-                  <a16:creationId xmlns:a16="http://schemas.microsoft.com/office/drawing/2014/main" xmlns="" id="{FC301A33-6B6C-4638-8E7B-D2120989BE20}"/>
+                  <a16:creationId xmlns:a16="http://schemas.microsoft.com/office/drawing/2014/main" id="{FC301A33-6B6C-4638-8E7B-D2120989BE20}"/>
                 </a:ext>
               </a:extLst>
             </p:cNvPr>
@@ -4262,7 +4267,7 @@
           <p:cNvPr id="21" name="Group 20">
             <a:extLst>
               <a:ext uri="{FF2B5EF4-FFF2-40B4-BE49-F238E27FC236}">
-                <a16:creationId xmlns:a16="http://schemas.microsoft.com/office/drawing/2014/main" xmlns="" id="{84119507-443D-45EE-86E7-FA578222D438}"/>
+                <a16:creationId xmlns:a16="http://schemas.microsoft.com/office/drawing/2014/main" id="{84119507-443D-45EE-86E7-FA578222D438}"/>
               </a:ext>
             </a:extLst>
           </p:cNvPr>
@@ -4282,7 +4287,7 @@
             <p:cNvPr id="8" name="Rectangle 7">
               <a:extLst>
                 <a:ext uri="{FF2B5EF4-FFF2-40B4-BE49-F238E27FC236}">
-                  <a16:creationId xmlns:a16="http://schemas.microsoft.com/office/drawing/2014/main" xmlns="" id="{AFEE3931-10A1-4CDD-810D-FC9109934B99}"/>
+                  <a16:creationId xmlns:a16="http://schemas.microsoft.com/office/drawing/2014/main" id="{AFEE3931-10A1-4CDD-810D-FC9109934B99}"/>
                 </a:ext>
               </a:extLst>
             </p:cNvPr>
@@ -4331,7 +4336,7 @@
             <p:cNvPr id="16" name="Flowchart: Decision 15">
               <a:extLst>
                 <a:ext uri="{FF2B5EF4-FFF2-40B4-BE49-F238E27FC236}">
-                  <a16:creationId xmlns:a16="http://schemas.microsoft.com/office/drawing/2014/main" xmlns="" id="{4E597F90-8639-4F18-85CF-7F9254DB3317}"/>
+                  <a16:creationId xmlns:a16="http://schemas.microsoft.com/office/drawing/2014/main" id="{4E597F90-8639-4F18-85CF-7F9254DB3317}"/>
                 </a:ext>
               </a:extLst>
             </p:cNvPr>
@@ -4378,7 +4383,7 @@
           <p:cNvPr id="22" name="Group 21">
             <a:extLst>
               <a:ext uri="{FF2B5EF4-FFF2-40B4-BE49-F238E27FC236}">
-                <a16:creationId xmlns:a16="http://schemas.microsoft.com/office/drawing/2014/main" xmlns="" id="{D3172953-4DC1-4408-A686-B915B758B219}"/>
+                <a16:creationId xmlns:a16="http://schemas.microsoft.com/office/drawing/2014/main" id="{D3172953-4DC1-4408-A686-B915B758B219}"/>
               </a:ext>
             </a:extLst>
           </p:cNvPr>
@@ -4398,7 +4403,7 @@
             <p:cNvPr id="9" name="Rectangle 8">
               <a:extLst>
                 <a:ext uri="{FF2B5EF4-FFF2-40B4-BE49-F238E27FC236}">
-                  <a16:creationId xmlns:a16="http://schemas.microsoft.com/office/drawing/2014/main" xmlns="" id="{EFA74233-BA2E-456A-86AA-CF07F73244F1}"/>
+                  <a16:creationId xmlns:a16="http://schemas.microsoft.com/office/drawing/2014/main" id="{EFA74233-BA2E-456A-86AA-CF07F73244F1}"/>
                 </a:ext>
               </a:extLst>
             </p:cNvPr>
@@ -4447,7 +4452,7 @@
             <p:cNvPr id="17" name="Flowchart: Decision 16">
               <a:extLst>
                 <a:ext uri="{FF2B5EF4-FFF2-40B4-BE49-F238E27FC236}">
-                  <a16:creationId xmlns:a16="http://schemas.microsoft.com/office/drawing/2014/main" xmlns="" id="{92959D0E-74B4-4C6C-828D-74F2B6A3D47C}"/>
+                  <a16:creationId xmlns:a16="http://schemas.microsoft.com/office/drawing/2014/main" id="{92959D0E-74B4-4C6C-828D-74F2B6A3D47C}"/>
                 </a:ext>
               </a:extLst>
             </p:cNvPr>
@@ -4494,7 +4499,7 @@
           <p:cNvPr id="18" name="Flowchart: Decision 17">
             <a:extLst>
               <a:ext uri="{FF2B5EF4-FFF2-40B4-BE49-F238E27FC236}">
-                <a16:creationId xmlns:a16="http://schemas.microsoft.com/office/drawing/2014/main" xmlns="" id="{210DC1B3-53F0-4298-B209-CB2117756721}"/>
+                <a16:creationId xmlns:a16="http://schemas.microsoft.com/office/drawing/2014/main" id="{210DC1B3-53F0-4298-B209-CB2117756721}"/>
               </a:ext>
             </a:extLst>
           </p:cNvPr>
@@ -4540,7 +4545,7 @@
           <p:cNvPr id="23" name="TextBox 22">
             <a:extLst>
               <a:ext uri="{FF2B5EF4-FFF2-40B4-BE49-F238E27FC236}">
-                <a16:creationId xmlns:a16="http://schemas.microsoft.com/office/drawing/2014/main" xmlns="" id="{E661C252-6A24-4EB1-8618-EC5A6E2ECFDD}"/>
+                <a16:creationId xmlns:a16="http://schemas.microsoft.com/office/drawing/2014/main" id="{E661C252-6A24-4EB1-8618-EC5A6E2ECFDD}"/>
               </a:ext>
             </a:extLst>
           </p:cNvPr>
@@ -4579,7 +4584,7 @@
           <p:cNvPr id="24" name="TextBox 23">
             <a:extLst>
               <a:ext uri="{FF2B5EF4-FFF2-40B4-BE49-F238E27FC236}">
-                <a16:creationId xmlns:a16="http://schemas.microsoft.com/office/drawing/2014/main" xmlns="" id="{F7314EE0-3A67-4C86-892A-2F68B23DA8DE}"/>
+                <a16:creationId xmlns:a16="http://schemas.microsoft.com/office/drawing/2014/main" id="{F7314EE0-3A67-4C86-892A-2F68B23DA8DE}"/>
               </a:ext>
             </a:extLst>
           </p:cNvPr>
@@ -4618,7 +4623,7 @@
           <p:cNvPr id="25" name="TextBox 24">
             <a:extLst>
               <a:ext uri="{FF2B5EF4-FFF2-40B4-BE49-F238E27FC236}">
-                <a16:creationId xmlns:a16="http://schemas.microsoft.com/office/drawing/2014/main" xmlns="" id="{DFC08BC7-36A6-438D-B1DC-123CBDD5C0F6}"/>
+                <a16:creationId xmlns:a16="http://schemas.microsoft.com/office/drawing/2014/main" id="{DFC08BC7-36A6-438D-B1DC-123CBDD5C0F6}"/>
               </a:ext>
             </a:extLst>
           </p:cNvPr>
@@ -4657,7 +4662,7 @@
           <p:cNvPr id="26" name="TextBox 25">
             <a:extLst>
               <a:ext uri="{FF2B5EF4-FFF2-40B4-BE49-F238E27FC236}">
-                <a16:creationId xmlns:a16="http://schemas.microsoft.com/office/drawing/2014/main" xmlns="" id="{4992DB1A-B53E-43E4-9038-42FB5B14EC93}"/>
+                <a16:creationId xmlns:a16="http://schemas.microsoft.com/office/drawing/2014/main" id="{4992DB1A-B53E-43E4-9038-42FB5B14EC93}"/>
               </a:ext>
             </a:extLst>
           </p:cNvPr>
@@ -4696,7 +4701,7 @@
           <p:cNvPr id="27" name="TextBox 26">
             <a:extLst>
               <a:ext uri="{FF2B5EF4-FFF2-40B4-BE49-F238E27FC236}">
-                <a16:creationId xmlns:a16="http://schemas.microsoft.com/office/drawing/2014/main" xmlns="" id="{8710889C-2534-4DC4-B4CE-00EC929F78F1}"/>
+                <a16:creationId xmlns:a16="http://schemas.microsoft.com/office/drawing/2014/main" id="{8710889C-2534-4DC4-B4CE-00EC929F78F1}"/>
               </a:ext>
             </a:extLst>
           </p:cNvPr>
@@ -4735,7 +4740,7 @@
           <p:cNvPr id="29" name="TextBox 28">
             <a:extLst>
               <a:ext uri="{FF2B5EF4-FFF2-40B4-BE49-F238E27FC236}">
-                <a16:creationId xmlns:a16="http://schemas.microsoft.com/office/drawing/2014/main" xmlns="" id="{31A6AF03-D01E-4FD5-90D9-8B5FFD612ECB}"/>
+                <a16:creationId xmlns:a16="http://schemas.microsoft.com/office/drawing/2014/main" id="{31A6AF03-D01E-4FD5-90D9-8B5FFD612ECB}"/>
               </a:ext>
             </a:extLst>
           </p:cNvPr>
@@ -4770,7 +4775,7 @@
           <p:cNvPr id="30" name="TextBox 29">
             <a:extLst>
               <a:ext uri="{FF2B5EF4-FFF2-40B4-BE49-F238E27FC236}">
-                <a16:creationId xmlns:a16="http://schemas.microsoft.com/office/drawing/2014/main" xmlns="" id="{B1F3D9F5-18A1-4BB4-8394-3037A1C456BE}"/>
+                <a16:creationId xmlns:a16="http://schemas.microsoft.com/office/drawing/2014/main" id="{B1F3D9F5-18A1-4BB4-8394-3037A1C456BE}"/>
               </a:ext>
             </a:extLst>
           </p:cNvPr>
@@ -4805,7 +4810,7 @@
           <p:cNvPr id="32" name="Straight Connector 31">
             <a:extLst>
               <a:ext uri="{FF2B5EF4-FFF2-40B4-BE49-F238E27FC236}">
-                <a16:creationId xmlns:a16="http://schemas.microsoft.com/office/drawing/2014/main" xmlns="" id="{C278E7B5-CACA-4CA5-BAB7-413AB76CD5F8}"/>
+                <a16:creationId xmlns:a16="http://schemas.microsoft.com/office/drawing/2014/main" id="{C278E7B5-CACA-4CA5-BAB7-413AB76CD5F8}"/>
               </a:ext>
             </a:extLst>
           </p:cNvPr>
@@ -4847,7 +4852,7 @@
           <p:cNvPr id="33" name="Straight Connector 32">
             <a:extLst>
               <a:ext uri="{FF2B5EF4-FFF2-40B4-BE49-F238E27FC236}">
-                <a16:creationId xmlns:a16="http://schemas.microsoft.com/office/drawing/2014/main" xmlns="" id="{760B251E-E9CE-466F-9A74-481074E07959}"/>
+                <a16:creationId xmlns:a16="http://schemas.microsoft.com/office/drawing/2014/main" id="{760B251E-E9CE-466F-9A74-481074E07959}"/>
               </a:ext>
             </a:extLst>
           </p:cNvPr>
@@ -4890,7 +4895,7 @@
           <p:cNvPr id="36" name="Straight Connector 35">
             <a:extLst>
               <a:ext uri="{FF2B5EF4-FFF2-40B4-BE49-F238E27FC236}">
-                <a16:creationId xmlns:a16="http://schemas.microsoft.com/office/drawing/2014/main" xmlns="" id="{4B29E178-4BBD-4573-A789-253BC7408026}"/>
+                <a16:creationId xmlns:a16="http://schemas.microsoft.com/office/drawing/2014/main" id="{4B29E178-4BBD-4573-A789-253BC7408026}"/>
               </a:ext>
             </a:extLst>
           </p:cNvPr>
@@ -4933,7 +4938,7 @@
           <p:cNvPr id="39" name="Straight Connector 38">
             <a:extLst>
               <a:ext uri="{FF2B5EF4-FFF2-40B4-BE49-F238E27FC236}">
-                <a16:creationId xmlns:a16="http://schemas.microsoft.com/office/drawing/2014/main" xmlns="" id="{1833A9CD-9D3C-4E77-BBE9-FCBD590D33A0}"/>
+                <a16:creationId xmlns:a16="http://schemas.microsoft.com/office/drawing/2014/main" id="{1833A9CD-9D3C-4E77-BBE9-FCBD590D33A0}"/>
               </a:ext>
             </a:extLst>
           </p:cNvPr>
@@ -4976,7 +4981,7 @@
           <p:cNvPr id="47" name="Straight Connector 46">
             <a:extLst>
               <a:ext uri="{FF2B5EF4-FFF2-40B4-BE49-F238E27FC236}">
-                <a16:creationId xmlns:a16="http://schemas.microsoft.com/office/drawing/2014/main" xmlns="" id="{3CCE225C-90DF-4831-BC56-FC60EC845F85}"/>
+                <a16:creationId xmlns:a16="http://schemas.microsoft.com/office/drawing/2014/main" id="{3CCE225C-90DF-4831-BC56-FC60EC845F85}"/>
               </a:ext>
             </a:extLst>
           </p:cNvPr>
@@ -5060,13 +5065,6 @@
   <p:clrMapOvr>
     <a:masterClrMapping/>
   </p:clrMapOvr>
-  <p:timing>
-    <p:tnLst>
-      <p:par>
-        <p:cTn id="1" dur="indefinite" restart="never" nodeType="tmRoot"/>
-      </p:par>
-    </p:tnLst>
-  </p:timing>
 </p:sld>
 </file>
 
@@ -5103,11 +5101,11 @@
           <a:lstStyle/>
           <a:p>
             <a:r>
-              <a:rPr lang="en-US" dirty="0" smtClean="0"/>
+              <a:rPr lang="en-US" dirty="0"/>
               <a:t>Strategies - </a:t>
             </a:r>
             <a:r>
-              <a:rPr lang="en-US" dirty="0" err="1" smtClean="0"/>
+              <a:rPr lang="en-US" dirty="0" err="1"/>
               <a:t>Terran</a:t>
             </a:r>
             <a:endParaRPr lang="en-US" dirty="0"/>
@@ -5140,10 +5138,34 @@
                 <a:tableStyleId>{5C22544A-7EE6-4342-B048-85BDC9FD1C3A}</a:tableStyleId>
               </a:tblPr>
               <a:tblGrid>
-                <a:gridCol w="2628900"/>
-                <a:gridCol w="2628900"/>
-                <a:gridCol w="2628900"/>
-                <a:gridCol w="2628900"/>
+                <a:gridCol w="2628900">
+                  <a:extLst>
+                    <a:ext uri="{9D8B030D-6E8A-4147-A177-3AD203B41FA5}">
+                      <a16:colId xmlns:a16="http://schemas.microsoft.com/office/drawing/2014/main" val="20000"/>
+                    </a:ext>
+                  </a:extLst>
+                </a:gridCol>
+                <a:gridCol w="2628900">
+                  <a:extLst>
+                    <a:ext uri="{9D8B030D-6E8A-4147-A177-3AD203B41FA5}">
+                      <a16:colId xmlns:a16="http://schemas.microsoft.com/office/drawing/2014/main" val="20001"/>
+                    </a:ext>
+                  </a:extLst>
+                </a:gridCol>
+                <a:gridCol w="2628900">
+                  <a:extLst>
+                    <a:ext uri="{9D8B030D-6E8A-4147-A177-3AD203B41FA5}">
+                      <a16:colId xmlns:a16="http://schemas.microsoft.com/office/drawing/2014/main" val="20002"/>
+                    </a:ext>
+                  </a:extLst>
+                </a:gridCol>
+                <a:gridCol w="2628900">
+                  <a:extLst>
+                    <a:ext uri="{9D8B030D-6E8A-4147-A177-3AD203B41FA5}">
+                      <a16:colId xmlns:a16="http://schemas.microsoft.com/office/drawing/2014/main" val="20003"/>
+                    </a:ext>
+                  </a:extLst>
+                </a:gridCol>
               </a:tblGrid>
               <a:tr h="370840">
                 <a:tc>
@@ -5152,10 +5174,9 @@
                     <a:lstStyle/>
                     <a:p>
                       <a:r>
-                        <a:rPr lang="en-US" dirty="0" smtClean="0"/>
+                        <a:rPr lang="en-US" dirty="0"/>
                         <a:t>Name</a:t>
                       </a:r>
-                      <a:endParaRPr lang="en-US" dirty="0"/>
                     </a:p>
                   </a:txBody>
                   <a:tcPr/>
@@ -5166,10 +5187,9 @@
                     <a:lstStyle/>
                     <a:p>
                       <a:r>
-                        <a:rPr lang="en-US" dirty="0" smtClean="0"/>
+                        <a:rPr lang="en-US" dirty="0"/>
                         <a:t>A vs AA</a:t>
                       </a:r>
-                      <a:endParaRPr lang="en-US" dirty="0"/>
                     </a:p>
                   </a:txBody>
                   <a:tcPr/>
@@ -5180,10 +5200,9 @@
                     <a:lstStyle/>
                     <a:p>
                       <a:r>
-                        <a:rPr lang="en-US" dirty="0" smtClean="0"/>
+                        <a:rPr lang="en-US" dirty="0"/>
                         <a:t>G vs AG</a:t>
                       </a:r>
-                      <a:endParaRPr lang="en-US" dirty="0"/>
                     </a:p>
                   </a:txBody>
                   <a:tcPr/>
@@ -5194,11 +5213,11 @@
                     <a:lstStyle/>
                     <a:p>
                       <a:r>
-                        <a:rPr lang="en-US" dirty="0" err="1" smtClean="0"/>
+                        <a:rPr lang="en-US" dirty="0" err="1"/>
                         <a:t>Atk</a:t>
                       </a:r>
                       <a:r>
-                        <a:rPr lang="en-US" baseline="0" dirty="0" smtClean="0"/>
+                        <a:rPr lang="en-US" baseline="0" dirty="0"/>
                         <a:t> vs Def</a:t>
                       </a:r>
                       <a:endParaRPr lang="en-US" dirty="0"/>
@@ -5206,6 +5225,11 @@
                   </a:txBody>
                   <a:tcPr/>
                 </a:tc>
+                <a:extLst>
+                  <a:ext uri="{0D108BD9-81ED-4DB2-BD59-A6C34878D82A}">
+                    <a16:rowId xmlns:a16="http://schemas.microsoft.com/office/drawing/2014/main" val="10000"/>
+                  </a:ext>
+                </a:extLst>
               </a:tr>
               <a:tr h="370840">
                 <a:tc>
@@ -5214,10 +5238,9 @@
                     <a:lstStyle/>
                     <a:p>
                       <a:r>
-                        <a:rPr lang="en-US" dirty="0" smtClean="0"/>
+                        <a:rPr lang="en-US" dirty="0"/>
                         <a:t>Bio (marines/medics)</a:t>
                       </a:r>
-                      <a:endParaRPr lang="en-US" dirty="0"/>
                     </a:p>
                   </a:txBody>
                   <a:tcPr/>
@@ -5228,10 +5251,9 @@
                     <a:lstStyle/>
                     <a:p>
                       <a:r>
-                        <a:rPr lang="en-US" dirty="0" smtClean="0"/>
+                        <a:rPr lang="en-US" dirty="0"/>
                         <a:t>-0.25</a:t>
                       </a:r>
-                      <a:endParaRPr lang="en-US" dirty="0"/>
                     </a:p>
                   </a:txBody>
                   <a:tcPr/>
@@ -5242,10 +5264,9 @@
                     <a:lstStyle/>
                     <a:p>
                       <a:r>
-                        <a:rPr lang="en-US" dirty="0" smtClean="0"/>
+                        <a:rPr lang="en-US" dirty="0"/>
                         <a:t>0.75</a:t>
                       </a:r>
-                      <a:endParaRPr lang="en-US" dirty="0"/>
                     </a:p>
                   </a:txBody>
                   <a:tcPr/>
@@ -5256,14 +5277,18 @@
                     <a:lstStyle/>
                     <a:p>
                       <a:r>
-                        <a:rPr lang="en-US" dirty="0" smtClean="0"/>
+                        <a:rPr lang="en-US" dirty="0"/>
                         <a:t>1</a:t>
                       </a:r>
-                      <a:endParaRPr lang="en-US" dirty="0"/>
                     </a:p>
                   </a:txBody>
                   <a:tcPr/>
                 </a:tc>
+                <a:extLst>
+                  <a:ext uri="{0D108BD9-81ED-4DB2-BD59-A6C34878D82A}">
+                    <a16:rowId xmlns:a16="http://schemas.microsoft.com/office/drawing/2014/main" val="10001"/>
+                  </a:ext>
+                </a:extLst>
               </a:tr>
               <a:tr h="370840">
                 <a:tc>
@@ -5272,14 +5297,13 @@
                     <a:lstStyle/>
                     <a:p>
                       <a:r>
-                        <a:rPr lang="en-US" dirty="0" err="1" smtClean="0"/>
+                        <a:rPr lang="en-US" dirty="0" err="1"/>
                         <a:t>Rax_fe</a:t>
                       </a:r>
                       <a:r>
-                        <a:rPr lang="en-US" dirty="0" smtClean="0"/>
+                        <a:rPr lang="en-US" dirty="0"/>
                         <a:t> (second base)</a:t>
                       </a:r>
-                      <a:endParaRPr lang="en-US" dirty="0"/>
                     </a:p>
                   </a:txBody>
                   <a:tcPr/>
@@ -5290,10 +5314,9 @@
                     <a:lstStyle/>
                     <a:p>
                       <a:r>
-                        <a:rPr lang="en-US" dirty="0" smtClean="0"/>
+                        <a:rPr lang="en-US" dirty="0"/>
                         <a:t>0</a:t>
                       </a:r>
-                      <a:endParaRPr lang="en-US" dirty="0"/>
                     </a:p>
                   </a:txBody>
                   <a:tcPr/>
@@ -5304,10 +5327,9 @@
                     <a:lstStyle/>
                     <a:p>
                       <a:r>
-                        <a:rPr lang="en-US" dirty="0" smtClean="0"/>
+                        <a:rPr lang="en-US" dirty="0"/>
                         <a:t>0</a:t>
                       </a:r>
-                      <a:endParaRPr lang="en-US" dirty="0"/>
                     </a:p>
                   </a:txBody>
                   <a:tcPr/>
@@ -5318,14 +5340,18 @@
                     <a:lstStyle/>
                     <a:p>
                       <a:r>
-                        <a:rPr lang="en-US" dirty="0" smtClean="0"/>
+                        <a:rPr lang="en-US" dirty="0"/>
                         <a:t>-1</a:t>
                       </a:r>
-                      <a:endParaRPr lang="en-US" dirty="0"/>
                     </a:p>
                   </a:txBody>
                   <a:tcPr/>
                 </a:tc>
+                <a:extLst>
+                  <a:ext uri="{0D108BD9-81ED-4DB2-BD59-A6C34878D82A}">
+                    <a16:rowId xmlns:a16="http://schemas.microsoft.com/office/drawing/2014/main" val="10002"/>
+                  </a:ext>
+                </a:extLst>
               </a:tr>
               <a:tr h="370840">
                 <a:tc>
@@ -5334,14 +5360,13 @@
                     <a:lstStyle/>
                     <a:p>
                       <a:r>
-                        <a:rPr lang="en-US" dirty="0" err="1" smtClean="0"/>
+                        <a:rPr lang="en-US" dirty="0" err="1"/>
                         <a:t>Two_facto</a:t>
                       </a:r>
                       <a:r>
-                        <a:rPr lang="en-US" dirty="0" smtClean="0"/>
+                        <a:rPr lang="en-US" dirty="0"/>
                         <a:t>(tanks)</a:t>
                       </a:r>
-                      <a:endParaRPr lang="en-US" dirty="0"/>
                     </a:p>
                   </a:txBody>
                   <a:tcPr/>
@@ -5352,10 +5377,9 @@
                     <a:lstStyle/>
                     <a:p>
                       <a:r>
-                        <a:rPr lang="en-US" dirty="0" smtClean="0"/>
+                        <a:rPr lang="en-US" dirty="0"/>
                         <a:t>0</a:t>
                       </a:r>
-                      <a:endParaRPr lang="en-US" dirty="0"/>
                     </a:p>
                   </a:txBody>
                   <a:tcPr/>
@@ -5366,10 +5390,9 @@
                     <a:lstStyle/>
                     <a:p>
                       <a:r>
-                        <a:rPr lang="en-US" dirty="0" smtClean="0"/>
+                        <a:rPr lang="en-US" dirty="0"/>
                         <a:t>1</a:t>
                       </a:r>
-                      <a:endParaRPr lang="en-US" dirty="0"/>
                     </a:p>
                   </a:txBody>
                   <a:tcPr/>
@@ -5380,14 +5403,18 @@
                     <a:lstStyle/>
                     <a:p>
                       <a:r>
-                        <a:rPr lang="en-US" dirty="0" smtClean="0"/>
+                        <a:rPr lang="en-US" dirty="0"/>
                         <a:t>0.5</a:t>
                       </a:r>
-                      <a:endParaRPr lang="en-US" dirty="0"/>
                     </a:p>
                   </a:txBody>
                   <a:tcPr/>
                 </a:tc>
+                <a:extLst>
+                  <a:ext uri="{0D108BD9-81ED-4DB2-BD59-A6C34878D82A}">
+                    <a16:rowId xmlns:a16="http://schemas.microsoft.com/office/drawing/2014/main" val="10003"/>
+                  </a:ext>
+                </a:extLst>
               </a:tr>
               <a:tr h="370840">
                 <a:tc>
@@ -5396,10 +5423,9 @@
                     <a:lstStyle/>
                     <a:p>
                       <a:r>
-                        <a:rPr lang="en-US" dirty="0" smtClean="0"/>
+                        <a:rPr lang="en-US" dirty="0"/>
                         <a:t>Vultures</a:t>
                       </a:r>
-                      <a:endParaRPr lang="en-US" dirty="0"/>
                     </a:p>
                   </a:txBody>
                   <a:tcPr/>
@@ -5410,10 +5436,9 @@
                     <a:lstStyle/>
                     <a:p>
                       <a:r>
-                        <a:rPr lang="en-US" dirty="0" smtClean="0"/>
+                        <a:rPr lang="en-US" dirty="0"/>
                         <a:t>0</a:t>
                       </a:r>
-                      <a:endParaRPr lang="en-US" dirty="0"/>
                     </a:p>
                   </a:txBody>
                   <a:tcPr/>
@@ -5424,10 +5449,9 @@
                     <a:lstStyle/>
                     <a:p>
                       <a:r>
-                        <a:rPr lang="en-US" dirty="0" smtClean="0"/>
+                        <a:rPr lang="en-US" dirty="0"/>
                         <a:t>1</a:t>
                       </a:r>
-                      <a:endParaRPr lang="en-US" dirty="0"/>
                     </a:p>
                   </a:txBody>
                   <a:tcPr/>
@@ -5438,14 +5462,18 @@
                     <a:lstStyle/>
                     <a:p>
                       <a:r>
-                        <a:rPr lang="en-US" dirty="0" smtClean="0"/>
+                        <a:rPr lang="en-US" dirty="0"/>
                         <a:t>0.75</a:t>
                       </a:r>
-                      <a:endParaRPr lang="en-US" dirty="0"/>
                     </a:p>
                   </a:txBody>
                   <a:tcPr/>
                 </a:tc>
+                <a:extLst>
+                  <a:ext uri="{0D108BD9-81ED-4DB2-BD59-A6C34878D82A}">
+                    <a16:rowId xmlns:a16="http://schemas.microsoft.com/office/drawing/2014/main" val="10004"/>
+                  </a:ext>
+                </a:extLst>
               </a:tr>
               <a:tr h="370840">
                 <a:tc>
@@ -5454,10 +5482,9 @@
                     <a:lstStyle/>
                     <a:p>
                       <a:r>
-                        <a:rPr lang="en-US" dirty="0" smtClean="0"/>
+                        <a:rPr lang="en-US" dirty="0"/>
                         <a:t>Air(wraiths)</a:t>
                       </a:r>
-                      <a:endParaRPr lang="en-US" dirty="0"/>
                     </a:p>
                   </a:txBody>
                   <a:tcPr/>
@@ -5468,10 +5495,9 @@
                     <a:lstStyle/>
                     <a:p>
                       <a:r>
-                        <a:rPr lang="en-US" dirty="0" smtClean="0"/>
+                        <a:rPr lang="en-US" dirty="0"/>
                         <a:t>0.75</a:t>
                       </a:r>
-                      <a:endParaRPr lang="en-US" dirty="0"/>
                     </a:p>
                   </a:txBody>
                   <a:tcPr/>
@@ -5482,10 +5508,9 @@
                     <a:lstStyle/>
                     <a:p>
                       <a:r>
-                        <a:rPr lang="en-US" dirty="0" smtClean="0"/>
+                        <a:rPr lang="en-US" dirty="0"/>
                         <a:t>-0.5</a:t>
                       </a:r>
-                      <a:endParaRPr lang="en-US" dirty="0"/>
                     </a:p>
                   </a:txBody>
                   <a:tcPr/>
@@ -5496,14 +5521,18 @@
                     <a:lstStyle/>
                     <a:p>
                       <a:r>
-                        <a:rPr lang="en-US" dirty="0" smtClean="0"/>
+                        <a:rPr lang="en-US" dirty="0"/>
                         <a:t>0.25</a:t>
                       </a:r>
-                      <a:endParaRPr lang="en-US" dirty="0"/>
                     </a:p>
                   </a:txBody>
                   <a:tcPr/>
                 </a:tc>
+                <a:extLst>
+                  <a:ext uri="{0D108BD9-81ED-4DB2-BD59-A6C34878D82A}">
+                    <a16:rowId xmlns:a16="http://schemas.microsoft.com/office/drawing/2014/main" val="10005"/>
+                  </a:ext>
+                </a:extLst>
               </a:tr>
               <a:tr h="370840">
                 <a:tc>
@@ -5512,7 +5541,7 @@
                     <a:lstStyle/>
                     <a:p>
                       <a:r>
-                        <a:rPr lang="en-US" smtClean="0"/>
+                        <a:rPr lang="en-US"/>
                         <a:t>drop</a:t>
                       </a:r>
                       <a:endParaRPr lang="en-US" dirty="0"/>
@@ -5526,10 +5555,9 @@
                     <a:lstStyle/>
                     <a:p>
                       <a:r>
-                        <a:rPr lang="en-US" dirty="0" smtClean="0"/>
+                        <a:rPr lang="en-US" dirty="0"/>
                         <a:t>0.25</a:t>
                       </a:r>
-                      <a:endParaRPr lang="en-US" dirty="0"/>
                     </a:p>
                   </a:txBody>
                   <a:tcPr/>
@@ -5540,10 +5568,9 @@
                     <a:lstStyle/>
                     <a:p>
                       <a:r>
-                        <a:rPr lang="en-US" dirty="0" smtClean="0"/>
+                        <a:rPr lang="en-US" dirty="0"/>
                         <a:t>0.25</a:t>
                       </a:r>
-                      <a:endParaRPr lang="en-US" dirty="0"/>
                     </a:p>
                   </a:txBody>
                   <a:tcPr/>
@@ -5554,14 +5581,18 @@
                     <a:lstStyle/>
                     <a:p>
                       <a:r>
-                        <a:rPr lang="en-US" dirty="0" smtClean="0"/>
+                        <a:rPr lang="en-US" dirty="0"/>
                         <a:t>-0.25</a:t>
                       </a:r>
-                      <a:endParaRPr lang="en-US" dirty="0"/>
                     </a:p>
                   </a:txBody>
                   <a:tcPr/>
                 </a:tc>
+                <a:extLst>
+                  <a:ext uri="{0D108BD9-81ED-4DB2-BD59-A6C34878D82A}">
+                    <a16:rowId xmlns:a16="http://schemas.microsoft.com/office/drawing/2014/main" val="10006"/>
+                  </a:ext>
+                </a:extLst>
               </a:tr>
             </a:tbl>
           </a:graphicData>
@@ -5613,11 +5644,11 @@
           <a:lstStyle/>
           <a:p>
             <a:r>
-              <a:rPr lang="en-US" dirty="0" smtClean="0"/>
+              <a:rPr lang="en-US" dirty="0"/>
               <a:t>Strategies - </a:t>
             </a:r>
             <a:r>
-              <a:rPr lang="en-US" dirty="0" err="1" smtClean="0"/>
+              <a:rPr lang="en-US" dirty="0" err="1"/>
               <a:t>Protoss</a:t>
             </a:r>
             <a:endParaRPr lang="en-US" dirty="0"/>
@@ -5650,10 +5681,34 @@
                 <a:tableStyleId>{5C22544A-7EE6-4342-B048-85BDC9FD1C3A}</a:tableStyleId>
               </a:tblPr>
               <a:tblGrid>
-                <a:gridCol w="2628900"/>
-                <a:gridCol w="2628900"/>
-                <a:gridCol w="2628900"/>
-                <a:gridCol w="2628900"/>
+                <a:gridCol w="2628900">
+                  <a:extLst>
+                    <a:ext uri="{9D8B030D-6E8A-4147-A177-3AD203B41FA5}">
+                      <a16:colId xmlns:a16="http://schemas.microsoft.com/office/drawing/2014/main" val="20000"/>
+                    </a:ext>
+                  </a:extLst>
+                </a:gridCol>
+                <a:gridCol w="2628900">
+                  <a:extLst>
+                    <a:ext uri="{9D8B030D-6E8A-4147-A177-3AD203B41FA5}">
+                      <a16:colId xmlns:a16="http://schemas.microsoft.com/office/drawing/2014/main" val="20001"/>
+                    </a:ext>
+                  </a:extLst>
+                </a:gridCol>
+                <a:gridCol w="2628900">
+                  <a:extLst>
+                    <a:ext uri="{9D8B030D-6E8A-4147-A177-3AD203B41FA5}">
+                      <a16:colId xmlns:a16="http://schemas.microsoft.com/office/drawing/2014/main" val="20002"/>
+                    </a:ext>
+                  </a:extLst>
+                </a:gridCol>
+                <a:gridCol w="2628900">
+                  <a:extLst>
+                    <a:ext uri="{9D8B030D-6E8A-4147-A177-3AD203B41FA5}">
+                      <a16:colId xmlns:a16="http://schemas.microsoft.com/office/drawing/2014/main" val="20003"/>
+                    </a:ext>
+                  </a:extLst>
+                </a:gridCol>
               </a:tblGrid>
               <a:tr h="370840">
                 <a:tc>
@@ -5662,10 +5717,9 @@
                     <a:lstStyle/>
                     <a:p>
                       <a:r>
-                        <a:rPr lang="en-US" dirty="0" smtClean="0"/>
+                        <a:rPr lang="en-US" dirty="0"/>
                         <a:t>Name</a:t>
                       </a:r>
-                      <a:endParaRPr lang="en-US" dirty="0"/>
                     </a:p>
                   </a:txBody>
                   <a:tcPr/>
@@ -5676,10 +5730,9 @@
                     <a:lstStyle/>
                     <a:p>
                       <a:r>
-                        <a:rPr lang="en-US" dirty="0" smtClean="0"/>
+                        <a:rPr lang="en-US" dirty="0"/>
                         <a:t>A vs AA</a:t>
                       </a:r>
-                      <a:endParaRPr lang="en-US" dirty="0"/>
                     </a:p>
                   </a:txBody>
                   <a:tcPr/>
@@ -5690,10 +5743,9 @@
                     <a:lstStyle/>
                     <a:p>
                       <a:r>
-                        <a:rPr lang="en-US" dirty="0" smtClean="0"/>
+                        <a:rPr lang="en-US" dirty="0"/>
                         <a:t>G vs AG</a:t>
                       </a:r>
-                      <a:endParaRPr lang="en-US" dirty="0"/>
                     </a:p>
                   </a:txBody>
                   <a:tcPr/>
@@ -5704,11 +5756,11 @@
                     <a:lstStyle/>
                     <a:p>
                       <a:r>
-                        <a:rPr lang="en-US" dirty="0" smtClean="0"/>
+                        <a:rPr lang="en-US" dirty="0"/>
                         <a:t>Aggressive </a:t>
                       </a:r>
                       <a:r>
-                        <a:rPr lang="en-US" baseline="0" dirty="0" smtClean="0"/>
+                        <a:rPr lang="en-US" baseline="0" dirty="0"/>
                         <a:t>vs Def</a:t>
                       </a:r>
                       <a:endParaRPr lang="en-US" dirty="0"/>
@@ -5716,6 +5768,11 @@
                   </a:txBody>
                   <a:tcPr/>
                 </a:tc>
+                <a:extLst>
+                  <a:ext uri="{0D108BD9-81ED-4DB2-BD59-A6C34878D82A}">
+                    <a16:rowId xmlns:a16="http://schemas.microsoft.com/office/drawing/2014/main" val="10000"/>
+                  </a:ext>
+                </a:extLst>
               </a:tr>
               <a:tr h="370840">
                 <a:tc>
@@ -5724,14 +5781,13 @@
                     <a:lstStyle/>
                     <a:p>
                       <a:r>
-                        <a:rPr lang="en-US" dirty="0" err="1" smtClean="0"/>
+                        <a:rPr lang="en-US" dirty="0" err="1"/>
                         <a:t>Two_gates</a:t>
                       </a:r>
                       <a:r>
-                        <a:rPr lang="en-US" dirty="0" smtClean="0"/>
+                        <a:rPr lang="en-US" dirty="0"/>
                         <a:t> (zealots)</a:t>
                       </a:r>
-                      <a:endParaRPr lang="en-US" dirty="0"/>
                     </a:p>
                   </a:txBody>
                   <a:tcPr/>
@@ -5742,10 +5798,9 @@
                     <a:lstStyle/>
                     <a:p>
                       <a:r>
-                        <a:rPr lang="en-US" dirty="0" smtClean="0"/>
+                        <a:rPr lang="en-US" dirty="0"/>
                         <a:t>0</a:t>
                       </a:r>
-                      <a:endParaRPr lang="en-US" dirty="0"/>
                     </a:p>
                   </a:txBody>
                   <a:tcPr/>
@@ -5756,10 +5811,9 @@
                     <a:lstStyle/>
                     <a:p>
                       <a:r>
-                        <a:rPr lang="en-US" dirty="0" smtClean="0"/>
+                        <a:rPr lang="en-US" dirty="0"/>
                         <a:t>1</a:t>
                       </a:r>
-                      <a:endParaRPr lang="en-US" dirty="0"/>
                     </a:p>
                   </a:txBody>
                   <a:tcPr/>
@@ -5770,14 +5824,18 @@
                     <a:lstStyle/>
                     <a:p>
                       <a:r>
-                        <a:rPr lang="en-US" dirty="0" smtClean="0"/>
+                        <a:rPr lang="en-US" dirty="0"/>
                         <a:t>1</a:t>
                       </a:r>
-                      <a:endParaRPr lang="en-US" dirty="0"/>
                     </a:p>
                   </a:txBody>
                   <a:tcPr/>
                 </a:tc>
+                <a:extLst>
+                  <a:ext uri="{0D108BD9-81ED-4DB2-BD59-A6C34878D82A}">
+                    <a16:rowId xmlns:a16="http://schemas.microsoft.com/office/drawing/2014/main" val="10001"/>
+                  </a:ext>
+                </a:extLst>
               </a:tr>
               <a:tr h="370840">
                 <a:tc>
@@ -5786,22 +5844,21 @@
                     <a:lstStyle/>
                     <a:p>
                       <a:r>
-                        <a:rPr lang="en-US" dirty="0" err="1" smtClean="0"/>
+                        <a:rPr lang="en-US" dirty="0" err="1"/>
                         <a:t>fast_dt</a:t>
                       </a:r>
                       <a:r>
-                        <a:rPr lang="en-US" dirty="0" smtClean="0"/>
+                        <a:rPr lang="en-US" dirty="0"/>
                         <a:t> (dark </a:t>
                       </a:r>
                       <a:r>
-                        <a:rPr lang="en-US" dirty="0" err="1" smtClean="0"/>
+                        <a:rPr lang="en-US" dirty="0" err="1"/>
                         <a:t>templars</a:t>
                       </a:r>
                       <a:r>
-                        <a:rPr lang="en-US" dirty="0" smtClean="0"/>
+                        <a:rPr lang="en-US" dirty="0"/>
                         <a:t>)</a:t>
                       </a:r>
-                      <a:endParaRPr lang="en-US" dirty="0"/>
                     </a:p>
                   </a:txBody>
                   <a:tcPr/>
@@ -5812,10 +5869,9 @@
                     <a:lstStyle/>
                     <a:p>
                       <a:r>
-                        <a:rPr lang="en-US" dirty="0" smtClean="0"/>
+                        <a:rPr lang="en-US" dirty="0"/>
                         <a:t>-0.25</a:t>
                       </a:r>
-                      <a:endParaRPr lang="en-US" dirty="0"/>
                     </a:p>
                   </a:txBody>
                   <a:tcPr/>
@@ -5826,10 +5882,9 @@
                     <a:lstStyle/>
                     <a:p>
                       <a:r>
-                        <a:rPr lang="en-US" dirty="0" smtClean="0"/>
+                        <a:rPr lang="en-US" dirty="0"/>
                         <a:t>0</a:t>
                       </a:r>
-                      <a:endParaRPr lang="en-US" dirty="0"/>
                     </a:p>
                   </a:txBody>
                   <a:tcPr/>
@@ -5840,14 +5895,18 @@
                     <a:lstStyle/>
                     <a:p>
                       <a:r>
-                        <a:rPr lang="en-US" dirty="0" smtClean="0"/>
+                        <a:rPr lang="en-US" dirty="0"/>
                         <a:t>0</a:t>
                       </a:r>
-                      <a:endParaRPr lang="en-US" dirty="0"/>
                     </a:p>
                   </a:txBody>
                   <a:tcPr/>
                 </a:tc>
+                <a:extLst>
+                  <a:ext uri="{0D108BD9-81ED-4DB2-BD59-A6C34878D82A}">
+                    <a16:rowId xmlns:a16="http://schemas.microsoft.com/office/drawing/2014/main" val="10002"/>
+                  </a:ext>
+                </a:extLst>
               </a:tr>
               <a:tr h="370840">
                 <a:tc>
@@ -5856,10 +5915,9 @@
                     <a:lstStyle/>
                     <a:p>
                       <a:r>
-                        <a:rPr lang="en-US" dirty="0" smtClean="0"/>
+                        <a:rPr lang="en-US" dirty="0"/>
                         <a:t>Templar</a:t>
                       </a:r>
-                      <a:endParaRPr lang="en-US" dirty="0"/>
                     </a:p>
                   </a:txBody>
                   <a:tcPr/>
@@ -5870,10 +5928,9 @@
                     <a:lstStyle/>
                     <a:p>
                       <a:r>
-                        <a:rPr lang="en-US" dirty="0" smtClean="0"/>
+                        <a:rPr lang="en-US" dirty="0"/>
                         <a:t>-0.5</a:t>
                       </a:r>
-                      <a:endParaRPr lang="en-US" dirty="0"/>
                     </a:p>
                   </a:txBody>
                   <a:tcPr/>
@@ -5884,10 +5941,9 @@
                     <a:lstStyle/>
                     <a:p>
                       <a:r>
-                        <a:rPr lang="en-US" dirty="0" smtClean="0"/>
+                        <a:rPr lang="en-US" dirty="0"/>
                         <a:t>0</a:t>
                       </a:r>
-                      <a:endParaRPr lang="en-US" dirty="0"/>
                     </a:p>
                   </a:txBody>
                   <a:tcPr/>
@@ -5898,14 +5954,18 @@
                     <a:lstStyle/>
                     <a:p>
                       <a:r>
-                        <a:rPr lang="en-US" dirty="0" smtClean="0"/>
+                        <a:rPr lang="en-US" dirty="0"/>
                         <a:t>0.5</a:t>
                       </a:r>
-                      <a:endParaRPr lang="en-US" dirty="0"/>
                     </a:p>
                   </a:txBody>
                   <a:tcPr/>
                 </a:tc>
+                <a:extLst>
+                  <a:ext uri="{0D108BD9-81ED-4DB2-BD59-A6C34878D82A}">
+                    <a16:rowId xmlns:a16="http://schemas.microsoft.com/office/drawing/2014/main" val="10003"/>
+                  </a:ext>
+                </a:extLst>
               </a:tr>
               <a:tr h="370840">
                 <a:tc>
@@ -5914,22 +5974,21 @@
                     <a:lstStyle/>
                     <a:p>
                       <a:r>
-                        <a:rPr lang="en-US" dirty="0" err="1" smtClean="0"/>
+                        <a:rPr lang="en-US" dirty="0" err="1"/>
                         <a:t>Speedzeal</a:t>
                       </a:r>
                       <a:r>
-                        <a:rPr lang="en-US" dirty="0" smtClean="0"/>
+                        <a:rPr lang="en-US" dirty="0"/>
                         <a:t> (</a:t>
                       </a:r>
                       <a:r>
-                        <a:rPr lang="en-US" dirty="0" err="1" smtClean="0"/>
+                        <a:rPr lang="en-US" dirty="0" err="1"/>
                         <a:t>zealots+upgrades</a:t>
                       </a:r>
                       <a:r>
-                        <a:rPr lang="en-US" dirty="0" smtClean="0"/>
+                        <a:rPr lang="en-US" dirty="0"/>
                         <a:t>)</a:t>
                       </a:r>
-                      <a:endParaRPr lang="en-US" dirty="0"/>
                     </a:p>
                   </a:txBody>
                   <a:tcPr/>
@@ -5940,10 +5999,9 @@
                     <a:lstStyle/>
                     <a:p>
                       <a:r>
-                        <a:rPr lang="en-US" dirty="0" smtClean="0"/>
+                        <a:rPr lang="en-US" dirty="0"/>
                         <a:t>0</a:t>
                       </a:r>
-                      <a:endParaRPr lang="en-US" dirty="0"/>
                     </a:p>
                   </a:txBody>
                   <a:tcPr/>
@@ -5954,10 +6012,9 @@
                     <a:lstStyle/>
                     <a:p>
                       <a:r>
-                        <a:rPr lang="en-US" dirty="0" smtClean="0"/>
+                        <a:rPr lang="en-US" dirty="0"/>
                         <a:t>1</a:t>
                       </a:r>
-                      <a:endParaRPr lang="en-US" dirty="0"/>
                     </a:p>
                   </a:txBody>
                   <a:tcPr/>
@@ -5968,14 +6025,18 @@
                     <a:lstStyle/>
                     <a:p>
                       <a:r>
-                        <a:rPr lang="en-US" dirty="0" smtClean="0"/>
+                        <a:rPr lang="en-US" dirty="0"/>
                         <a:t>0.75</a:t>
                       </a:r>
-                      <a:endParaRPr lang="en-US" dirty="0"/>
                     </a:p>
                   </a:txBody>
                   <a:tcPr/>
                 </a:tc>
+                <a:extLst>
+                  <a:ext uri="{0D108BD9-81ED-4DB2-BD59-A6C34878D82A}">
+                    <a16:rowId xmlns:a16="http://schemas.microsoft.com/office/drawing/2014/main" val="10004"/>
+                  </a:ext>
+                </a:extLst>
               </a:tr>
               <a:tr h="370840">
                 <a:tc>
@@ -5984,10 +6045,9 @@
                     <a:lstStyle/>
                     <a:p>
                       <a:r>
-                        <a:rPr lang="en-US" dirty="0" smtClean="0"/>
+                        <a:rPr lang="en-US" dirty="0"/>
                         <a:t>Corsair</a:t>
                       </a:r>
-                      <a:endParaRPr lang="en-US" dirty="0"/>
                     </a:p>
                   </a:txBody>
                   <a:tcPr/>
@@ -5998,10 +6058,9 @@
                     <a:lstStyle/>
                     <a:p>
                       <a:r>
-                        <a:rPr lang="en-US" dirty="0" smtClean="0"/>
+                        <a:rPr lang="en-US" dirty="0"/>
                         <a:t>-1</a:t>
                       </a:r>
-                      <a:endParaRPr lang="en-US" dirty="0"/>
                     </a:p>
                   </a:txBody>
                   <a:tcPr/>
@@ -6012,10 +6071,9 @@
                     <a:lstStyle/>
                     <a:p>
                       <a:r>
-                        <a:rPr lang="en-US" dirty="0" smtClean="0"/>
+                        <a:rPr lang="en-US" dirty="0"/>
                         <a:t>0</a:t>
                       </a:r>
-                      <a:endParaRPr lang="en-US" dirty="0"/>
                     </a:p>
                   </a:txBody>
                   <a:tcPr/>
@@ -6026,14 +6084,18 @@
                     <a:lstStyle/>
                     <a:p>
                       <a:r>
-                        <a:rPr lang="en-US" dirty="0" smtClean="0"/>
+                        <a:rPr lang="en-US" dirty="0"/>
                         <a:t>-0.75</a:t>
                       </a:r>
-                      <a:endParaRPr lang="en-US" dirty="0"/>
                     </a:p>
                   </a:txBody>
                   <a:tcPr/>
                 </a:tc>
+                <a:extLst>
+                  <a:ext uri="{0D108BD9-81ED-4DB2-BD59-A6C34878D82A}">
+                    <a16:rowId xmlns:a16="http://schemas.microsoft.com/office/drawing/2014/main" val="10005"/>
+                  </a:ext>
+                </a:extLst>
               </a:tr>
               <a:tr h="370840">
                 <a:tc>
@@ -6042,14 +6104,13 @@
                     <a:lstStyle/>
                     <a:p>
                       <a:r>
-                        <a:rPr lang="en-US" dirty="0" err="1" smtClean="0"/>
+                        <a:rPr lang="en-US" dirty="0" err="1"/>
                         <a:t>Nony</a:t>
                       </a:r>
                       <a:r>
-                        <a:rPr lang="en-US" dirty="0" smtClean="0"/>
+                        <a:rPr lang="en-US" dirty="0"/>
                         <a:t> (dragoons)</a:t>
                       </a:r>
-                      <a:endParaRPr lang="en-US" dirty="0"/>
                     </a:p>
                   </a:txBody>
                   <a:tcPr/>
@@ -6060,10 +6121,9 @@
                     <a:lstStyle/>
                     <a:p>
                       <a:r>
-                        <a:rPr lang="en-US" dirty="0" smtClean="0"/>
+                        <a:rPr lang="en-US" dirty="0"/>
                         <a:t>0</a:t>
                       </a:r>
-                      <a:endParaRPr lang="en-US" dirty="0"/>
                     </a:p>
                   </a:txBody>
                   <a:tcPr/>
@@ -6074,10 +6134,9 @@
                     <a:lstStyle/>
                     <a:p>
                       <a:r>
-                        <a:rPr lang="en-US" dirty="0" smtClean="0"/>
+                        <a:rPr lang="en-US" dirty="0"/>
                         <a:t>0</a:t>
                       </a:r>
-                      <a:endParaRPr lang="en-US" dirty="0"/>
                     </a:p>
                   </a:txBody>
                   <a:tcPr/>
@@ -6088,14 +6147,18 @@
                     <a:lstStyle/>
                     <a:p>
                       <a:r>
-                        <a:rPr lang="en-US" dirty="0" smtClean="0"/>
+                        <a:rPr lang="en-US" dirty="0"/>
                         <a:t>0.5</a:t>
                       </a:r>
-                      <a:endParaRPr lang="en-US" dirty="0"/>
                     </a:p>
                   </a:txBody>
                   <a:tcPr/>
                 </a:tc>
+                <a:extLst>
+                  <a:ext uri="{0D108BD9-81ED-4DB2-BD59-A6C34878D82A}">
+                    <a16:rowId xmlns:a16="http://schemas.microsoft.com/office/drawing/2014/main" val="10006"/>
+                  </a:ext>
+                </a:extLst>
               </a:tr>
               <a:tr h="370840">
                 <a:tc>
@@ -6104,7 +6167,7 @@
                     <a:lstStyle/>
                     <a:p>
                       <a:r>
-                        <a:rPr lang="en-US" dirty="0" err="1" smtClean="0"/>
+                        <a:rPr lang="en-US" dirty="0" err="1"/>
                         <a:t>Reaver_drop</a:t>
                       </a:r>
                       <a:endParaRPr lang="en-US" dirty="0"/>
@@ -6118,10 +6181,9 @@
                     <a:lstStyle/>
                     <a:p>
                       <a:r>
-                        <a:rPr lang="en-US" dirty="0" smtClean="0"/>
+                        <a:rPr lang="en-US" dirty="0"/>
                         <a:t>0.25</a:t>
                       </a:r>
-                      <a:endParaRPr lang="en-US" dirty="0"/>
                     </a:p>
                   </a:txBody>
                   <a:tcPr/>
@@ -6132,10 +6194,9 @@
                     <a:lstStyle/>
                     <a:p>
                       <a:r>
-                        <a:rPr lang="en-US" dirty="0" smtClean="0"/>
+                        <a:rPr lang="en-US" dirty="0"/>
                         <a:t>0</a:t>
                       </a:r>
-                      <a:endParaRPr lang="en-US" dirty="0"/>
                     </a:p>
                   </a:txBody>
                   <a:tcPr/>
@@ -6146,14 +6207,18 @@
                     <a:lstStyle/>
                     <a:p>
                       <a:r>
-                        <a:rPr lang="en-US" dirty="0" smtClean="0"/>
+                        <a:rPr lang="en-US" dirty="0"/>
                         <a:t>-0.25</a:t>
                       </a:r>
-                      <a:endParaRPr lang="en-US" dirty="0"/>
                     </a:p>
                   </a:txBody>
                   <a:tcPr/>
                 </a:tc>
+                <a:extLst>
+                  <a:ext uri="{0D108BD9-81ED-4DB2-BD59-A6C34878D82A}">
+                    <a16:rowId xmlns:a16="http://schemas.microsoft.com/office/drawing/2014/main" val="10007"/>
+                  </a:ext>
+                </a:extLst>
               </a:tr>
             </a:tbl>
           </a:graphicData>
@@ -6205,11 +6270,11 @@
           <a:lstStyle/>
           <a:p>
             <a:r>
-              <a:rPr lang="en-US" dirty="0" smtClean="0"/>
+              <a:rPr lang="en-US" dirty="0"/>
               <a:t>Strategies - </a:t>
             </a:r>
             <a:r>
-              <a:rPr lang="en-US" dirty="0" err="1" smtClean="0"/>
+              <a:rPr lang="en-US" dirty="0" err="1"/>
               <a:t>Zerg</a:t>
             </a:r>
             <a:endParaRPr lang="en-US" dirty="0"/>
@@ -6242,10 +6307,34 @@
                 <a:tableStyleId>{5C22544A-7EE6-4342-B048-85BDC9FD1C3A}</a:tableStyleId>
               </a:tblPr>
               <a:tblGrid>
-                <a:gridCol w="2628900"/>
-                <a:gridCol w="2628900"/>
-                <a:gridCol w="2628900"/>
-                <a:gridCol w="2628900"/>
+                <a:gridCol w="2628900">
+                  <a:extLst>
+                    <a:ext uri="{9D8B030D-6E8A-4147-A177-3AD203B41FA5}">
+                      <a16:colId xmlns:a16="http://schemas.microsoft.com/office/drawing/2014/main" val="20000"/>
+                    </a:ext>
+                  </a:extLst>
+                </a:gridCol>
+                <a:gridCol w="2628900">
+                  <a:extLst>
+                    <a:ext uri="{9D8B030D-6E8A-4147-A177-3AD203B41FA5}">
+                      <a16:colId xmlns:a16="http://schemas.microsoft.com/office/drawing/2014/main" val="20001"/>
+                    </a:ext>
+                  </a:extLst>
+                </a:gridCol>
+                <a:gridCol w="2628900">
+                  <a:extLst>
+                    <a:ext uri="{9D8B030D-6E8A-4147-A177-3AD203B41FA5}">
+                      <a16:colId xmlns:a16="http://schemas.microsoft.com/office/drawing/2014/main" val="20002"/>
+                    </a:ext>
+                  </a:extLst>
+                </a:gridCol>
+                <a:gridCol w="2628900">
+                  <a:extLst>
+                    <a:ext uri="{9D8B030D-6E8A-4147-A177-3AD203B41FA5}">
+                      <a16:colId xmlns:a16="http://schemas.microsoft.com/office/drawing/2014/main" val="20003"/>
+                    </a:ext>
+                  </a:extLst>
+                </a:gridCol>
               </a:tblGrid>
               <a:tr h="370840">
                 <a:tc>
@@ -6254,10 +6343,9 @@
                     <a:lstStyle/>
                     <a:p>
                       <a:r>
-                        <a:rPr lang="en-US" dirty="0" smtClean="0"/>
+                        <a:rPr lang="en-US" dirty="0"/>
                         <a:t>Name</a:t>
                       </a:r>
-                      <a:endParaRPr lang="en-US" dirty="0"/>
                     </a:p>
                   </a:txBody>
                   <a:tcPr/>
@@ -6268,10 +6356,9 @@
                     <a:lstStyle/>
                     <a:p>
                       <a:r>
-                        <a:rPr lang="en-US" dirty="0" smtClean="0"/>
+                        <a:rPr lang="en-US" dirty="0"/>
                         <a:t>A vs AA</a:t>
                       </a:r>
-                      <a:endParaRPr lang="en-US" dirty="0"/>
                     </a:p>
                   </a:txBody>
                   <a:tcPr/>
@@ -6282,10 +6369,9 @@
                     <a:lstStyle/>
                     <a:p>
                       <a:r>
-                        <a:rPr lang="en-US" dirty="0" smtClean="0"/>
+                        <a:rPr lang="en-US" dirty="0"/>
                         <a:t>G vs AG</a:t>
                       </a:r>
-                      <a:endParaRPr lang="en-US" dirty="0"/>
                     </a:p>
                   </a:txBody>
                   <a:tcPr/>
@@ -6296,11 +6382,11 @@
                     <a:lstStyle/>
                     <a:p>
                       <a:r>
-                        <a:rPr lang="en-US" dirty="0" err="1" smtClean="0"/>
+                        <a:rPr lang="en-US" dirty="0" err="1"/>
                         <a:t>Atk</a:t>
                       </a:r>
                       <a:r>
-                        <a:rPr lang="en-US" baseline="0" dirty="0" smtClean="0"/>
+                        <a:rPr lang="en-US" baseline="0" dirty="0"/>
                         <a:t> vs Def</a:t>
                       </a:r>
                       <a:endParaRPr lang="en-US" dirty="0"/>
@@ -6308,6 +6394,11 @@
                   </a:txBody>
                   <a:tcPr/>
                 </a:tc>
+                <a:extLst>
+                  <a:ext uri="{0D108BD9-81ED-4DB2-BD59-A6C34878D82A}">
+                    <a16:rowId xmlns:a16="http://schemas.microsoft.com/office/drawing/2014/main" val="10000"/>
+                  </a:ext>
+                </a:extLst>
               </a:tr>
               <a:tr h="370840">
                 <a:tc>
@@ -6316,22 +6407,21 @@
                     <a:lstStyle/>
                     <a:p>
                       <a:r>
-                        <a:rPr lang="en-US" dirty="0" err="1" smtClean="0"/>
+                        <a:rPr lang="en-US" dirty="0" err="1"/>
                         <a:t>Speedlings</a:t>
                       </a:r>
                       <a:r>
-                        <a:rPr lang="en-US" dirty="0" smtClean="0"/>
+                        <a:rPr lang="en-US" dirty="0"/>
                         <a:t> (</a:t>
                       </a:r>
                       <a:r>
-                        <a:rPr lang="en-US" dirty="0" err="1" smtClean="0"/>
+                        <a:rPr lang="en-US" dirty="0" err="1"/>
                         <a:t>zerlings</a:t>
                       </a:r>
                       <a:r>
-                        <a:rPr lang="en-US" dirty="0" smtClean="0"/>
+                        <a:rPr lang="en-US" dirty="0"/>
                         <a:t>)</a:t>
                       </a:r>
-                      <a:endParaRPr lang="en-US" dirty="0"/>
                     </a:p>
                   </a:txBody>
                   <a:tcPr/>
@@ -6342,10 +6432,9 @@
                     <a:lstStyle/>
                     <a:p>
                       <a:r>
-                        <a:rPr lang="en-US" dirty="0" smtClean="0"/>
+                        <a:rPr lang="en-US" dirty="0"/>
                         <a:t>0</a:t>
                       </a:r>
-                      <a:endParaRPr lang="en-US" dirty="0"/>
                     </a:p>
                   </a:txBody>
                   <a:tcPr/>
@@ -6356,10 +6445,9 @@
                     <a:lstStyle/>
                     <a:p>
                       <a:r>
-                        <a:rPr lang="en-US" dirty="0" smtClean="0"/>
+                        <a:rPr lang="en-US" dirty="0"/>
                         <a:t>1</a:t>
                       </a:r>
-                      <a:endParaRPr lang="en-US" dirty="0"/>
                     </a:p>
                   </a:txBody>
                   <a:tcPr/>
@@ -6370,14 +6458,18 @@
                     <a:lstStyle/>
                     <a:p>
                       <a:r>
-                        <a:rPr lang="en-US" dirty="0" smtClean="0"/>
+                        <a:rPr lang="en-US" dirty="0"/>
                         <a:t>1</a:t>
                       </a:r>
-                      <a:endParaRPr lang="en-US" dirty="0"/>
                     </a:p>
                   </a:txBody>
                   <a:tcPr/>
                 </a:tc>
+                <a:extLst>
+                  <a:ext uri="{0D108BD9-81ED-4DB2-BD59-A6C34878D82A}">
+                    <a16:rowId xmlns:a16="http://schemas.microsoft.com/office/drawing/2014/main" val="10001"/>
+                  </a:ext>
+                </a:extLst>
               </a:tr>
               <a:tr h="370840">
                 <a:tc>
@@ -6386,22 +6478,21 @@
                     <a:lstStyle/>
                     <a:p>
                       <a:r>
-                        <a:rPr lang="en-US" dirty="0" err="1" smtClean="0"/>
+                        <a:rPr lang="en-US" dirty="0" err="1"/>
                         <a:t>Fast_mutas</a:t>
                       </a:r>
                       <a:r>
-                        <a:rPr lang="en-US" dirty="0" smtClean="0"/>
+                        <a:rPr lang="en-US" dirty="0"/>
                         <a:t> (</a:t>
                       </a:r>
                       <a:r>
-                        <a:rPr lang="en-US" dirty="0" err="1" smtClean="0"/>
+                        <a:rPr lang="en-US" dirty="0" err="1"/>
                         <a:t>mutalisks</a:t>
                       </a:r>
                       <a:r>
-                        <a:rPr lang="en-US" dirty="0" smtClean="0"/>
+                        <a:rPr lang="en-US" dirty="0"/>
                         <a:t>)</a:t>
                       </a:r>
-                      <a:endParaRPr lang="en-US" dirty="0"/>
                     </a:p>
                   </a:txBody>
                   <a:tcPr/>
@@ -6412,10 +6503,9 @@
                     <a:lstStyle/>
                     <a:p>
                       <a:r>
-                        <a:rPr lang="en-US" dirty="0" smtClean="0"/>
+                        <a:rPr lang="en-US" dirty="0"/>
                         <a:t>1</a:t>
                       </a:r>
-                      <a:endParaRPr lang="en-US" dirty="0"/>
                     </a:p>
                   </a:txBody>
                   <a:tcPr/>
@@ -6426,10 +6516,9 @@
                     <a:lstStyle/>
                     <a:p>
                       <a:r>
-                        <a:rPr lang="en-US" dirty="0" smtClean="0"/>
+                        <a:rPr lang="en-US" dirty="0"/>
                         <a:t>-1</a:t>
                       </a:r>
-                      <a:endParaRPr lang="en-US" dirty="0"/>
                     </a:p>
                   </a:txBody>
                   <a:tcPr/>
@@ -6440,14 +6529,18 @@
                     <a:lstStyle/>
                     <a:p>
                       <a:r>
-                        <a:rPr lang="en-US" dirty="0" smtClean="0"/>
+                        <a:rPr lang="en-US" dirty="0"/>
                         <a:t>0.25</a:t>
                       </a:r>
-                      <a:endParaRPr lang="en-US" dirty="0"/>
                     </a:p>
                   </a:txBody>
                   <a:tcPr/>
                 </a:tc>
+                <a:extLst>
+                  <a:ext uri="{0D108BD9-81ED-4DB2-BD59-A6C34878D82A}">
+                    <a16:rowId xmlns:a16="http://schemas.microsoft.com/office/drawing/2014/main" val="10002"/>
+                  </a:ext>
+                </a:extLst>
               </a:tr>
               <a:tr h="370840">
                 <a:tc>
@@ -6456,22 +6549,21 @@
                     <a:lstStyle/>
                     <a:p>
                       <a:r>
-                        <a:rPr lang="en-US" dirty="0" err="1" smtClean="0"/>
+                        <a:rPr lang="en-US" dirty="0" err="1"/>
                         <a:t>Mutas</a:t>
                       </a:r>
                       <a:r>
-                        <a:rPr lang="en-US" dirty="0" smtClean="0"/>
+                        <a:rPr lang="en-US" dirty="0"/>
                         <a:t> (</a:t>
                       </a:r>
                       <a:r>
-                        <a:rPr lang="en-US" dirty="0" err="1" smtClean="0"/>
+                        <a:rPr lang="en-US" dirty="0" err="1"/>
                         <a:t>expand+mutas</a:t>
                       </a:r>
                       <a:r>
-                        <a:rPr lang="en-US" dirty="0" smtClean="0"/>
+                        <a:rPr lang="en-US" dirty="0"/>
                         <a:t>)</a:t>
                       </a:r>
-                      <a:endParaRPr lang="en-US" dirty="0"/>
                     </a:p>
                   </a:txBody>
                   <a:tcPr/>
@@ -6482,10 +6574,9 @@
                     <a:lstStyle/>
                     <a:p>
                       <a:r>
-                        <a:rPr lang="en-US" dirty="0" smtClean="0"/>
+                        <a:rPr lang="en-US" dirty="0"/>
                         <a:t>0.75</a:t>
                       </a:r>
-                      <a:endParaRPr lang="en-US" dirty="0"/>
                     </a:p>
                   </a:txBody>
                   <a:tcPr/>
@@ -6496,10 +6587,9 @@
                     <a:lstStyle/>
                     <a:p>
                       <a:r>
-                        <a:rPr lang="en-US" dirty="0" smtClean="0"/>
+                        <a:rPr lang="en-US" dirty="0"/>
                         <a:t>-0.75</a:t>
                       </a:r>
-                      <a:endParaRPr lang="en-US" dirty="0"/>
                     </a:p>
                   </a:txBody>
                   <a:tcPr/>
@@ -6510,14 +6600,18 @@
                     <a:lstStyle/>
                     <a:p>
                       <a:r>
-                        <a:rPr lang="en-US" dirty="0" smtClean="0"/>
+                        <a:rPr lang="en-US" dirty="0"/>
                         <a:t>-0.25</a:t>
                       </a:r>
-                      <a:endParaRPr lang="en-US" dirty="0"/>
                     </a:p>
                   </a:txBody>
                   <a:tcPr/>
                 </a:tc>
+                <a:extLst>
+                  <a:ext uri="{0D108BD9-81ED-4DB2-BD59-A6C34878D82A}">
+                    <a16:rowId xmlns:a16="http://schemas.microsoft.com/office/drawing/2014/main" val="10003"/>
+                  </a:ext>
+                </a:extLst>
               </a:tr>
               <a:tr h="370840">
                 <a:tc>
@@ -6526,10 +6620,9 @@
                     <a:lstStyle/>
                     <a:p>
                       <a:r>
-                        <a:rPr lang="en-US" dirty="0" smtClean="0"/>
+                        <a:rPr lang="en-US" dirty="0"/>
                         <a:t>Lurkers</a:t>
                       </a:r>
-                      <a:endParaRPr lang="en-US" dirty="0"/>
                     </a:p>
                   </a:txBody>
                   <a:tcPr/>
@@ -6540,10 +6633,9 @@
                     <a:lstStyle/>
                     <a:p>
                       <a:r>
-                        <a:rPr lang="en-US" dirty="0" smtClean="0"/>
+                        <a:rPr lang="en-US" dirty="0"/>
                         <a:t>0</a:t>
                       </a:r>
-                      <a:endParaRPr lang="en-US" dirty="0"/>
                     </a:p>
                   </a:txBody>
                   <a:tcPr/>
@@ -6554,10 +6646,9 @@
                     <a:lstStyle/>
                     <a:p>
                       <a:r>
-                        <a:rPr lang="en-US" dirty="0" smtClean="0"/>
+                        <a:rPr lang="en-US" dirty="0"/>
                         <a:t>0</a:t>
                       </a:r>
-                      <a:endParaRPr lang="en-US" dirty="0"/>
                     </a:p>
                   </a:txBody>
                   <a:tcPr/>
@@ -6568,14 +6659,18 @@
                     <a:lstStyle/>
                     <a:p>
                       <a:r>
-                        <a:rPr lang="en-US" dirty="0" smtClean="0"/>
+                        <a:rPr lang="en-US" dirty="0"/>
                         <a:t>-0.25</a:t>
                       </a:r>
-                      <a:endParaRPr lang="en-US" dirty="0"/>
                     </a:p>
                   </a:txBody>
                   <a:tcPr/>
                 </a:tc>
+                <a:extLst>
+                  <a:ext uri="{0D108BD9-81ED-4DB2-BD59-A6C34878D82A}">
+                    <a16:rowId xmlns:a16="http://schemas.microsoft.com/office/drawing/2014/main" val="10004"/>
+                  </a:ext>
+                </a:extLst>
               </a:tr>
               <a:tr h="370840">
                 <a:tc>
@@ -6584,10 +6679,9 @@
                     <a:lstStyle/>
                     <a:p>
                       <a:r>
-                        <a:rPr lang="en-US" dirty="0" smtClean="0"/>
+                        <a:rPr lang="en-US" dirty="0"/>
                         <a:t>Hydras</a:t>
                       </a:r>
-                      <a:endParaRPr lang="en-US" dirty="0"/>
                     </a:p>
                   </a:txBody>
                   <a:tcPr/>
@@ -6598,10 +6692,9 @@
                     <a:lstStyle/>
                     <a:p>
                       <a:r>
-                        <a:rPr lang="en-US" dirty="0" smtClean="0"/>
+                        <a:rPr lang="en-US" dirty="0"/>
                         <a:t>-0.25</a:t>
                       </a:r>
-                      <a:endParaRPr lang="en-US" dirty="0"/>
                     </a:p>
                   </a:txBody>
                   <a:tcPr/>
@@ -6612,10 +6705,9 @@
                     <a:lstStyle/>
                     <a:p>
                       <a:r>
-                        <a:rPr lang="en-US" dirty="0" smtClean="0"/>
+                        <a:rPr lang="en-US" dirty="0"/>
                         <a:t>1</a:t>
                       </a:r>
-                      <a:endParaRPr lang="en-US" dirty="0"/>
                     </a:p>
                   </a:txBody>
                   <a:tcPr/>
@@ -6626,14 +6718,18 @@
                     <a:lstStyle/>
                     <a:p>
                       <a:r>
-                        <a:rPr lang="en-US" dirty="0" smtClean="0"/>
+                        <a:rPr lang="en-US" dirty="0"/>
                         <a:t>0.75</a:t>
                       </a:r>
-                      <a:endParaRPr lang="en-US" dirty="0"/>
                     </a:p>
                   </a:txBody>
                   <a:tcPr/>
                 </a:tc>
+                <a:extLst>
+                  <a:ext uri="{0D108BD9-81ED-4DB2-BD59-A6C34878D82A}">
+                    <a16:rowId xmlns:a16="http://schemas.microsoft.com/office/drawing/2014/main" val="10005"/>
+                  </a:ext>
+                </a:extLst>
               </a:tr>
             </a:tbl>
           </a:graphicData>
@@ -6704,34 +6800,33 @@
           <a:lstStyle/>
           <a:p>
             <a:r>
-              <a:rPr lang="en-US" dirty="0" smtClean="0"/>
+              <a:rPr lang="en-US" dirty="0"/>
               <a:t>Apply Von Mises PDF Process to graph theory to create strategy space for possible enemy strategies</a:t>
             </a:r>
           </a:p>
           <a:p>
             <a:r>
-              <a:rPr lang="en-US" dirty="0" smtClean="0"/>
+              <a:rPr lang="en-US" dirty="0"/>
               <a:t>Use observations to strengthen leaves in tree with multiplicative effect</a:t>
             </a:r>
           </a:p>
           <a:p>
             <a:r>
-              <a:rPr lang="en-US" dirty="0" smtClean="0"/>
+              <a:rPr lang="en-US" dirty="0"/>
               <a:t>A new leaf in a branch normalizes the old leaf node to be like every other inner node</a:t>
             </a:r>
           </a:p>
           <a:p>
             <a:r>
-              <a:rPr lang="en-US" dirty="0" smtClean="0"/>
+              <a:rPr lang="en-US" dirty="0"/>
               <a:t>Over time, strategy leaf nodes will emerge as obvious enemy choice</a:t>
             </a:r>
           </a:p>
           <a:p>
             <a:r>
-              <a:rPr lang="en-US" dirty="0" smtClean="0"/>
+              <a:rPr lang="en-US" dirty="0"/>
               <a:t>While strategies are still being formed, Nova can act based on what region/quadrant has the largest average height</a:t>
             </a:r>
-            <a:endParaRPr lang="en-US" dirty="0"/>
           </a:p>
         </p:txBody>
       </p:sp>
@@ -6745,13 +6840,6 @@
   <p:clrMapOvr>
     <a:masterClrMapping/>
   </p:clrMapOvr>
-  <p:timing>
-    <p:tnLst>
-      <p:par>
-        <p:cTn id="1" dur="indefinite" restart="never" nodeType="tmRoot"/>
-      </p:par>
-    </p:tnLst>
-  </p:timing>
 </p:sld>
 </file>
 
@@ -8392,10 +8480,9 @@
           <a:p>
             <a:pPr algn="ctr"/>
             <a:r>
-              <a:rPr lang="en-US" dirty="0" smtClean="0"/>
+              <a:rPr lang="en-US" dirty="0"/>
               <a:t>Edge weight increase with each unit spotted</a:t>
             </a:r>
-            <a:endParaRPr lang="en-US" dirty="0"/>
           </a:p>
         </p:txBody>
       </p:sp>
@@ -8423,10 +8510,9 @@
           <a:p>
             <a:pPr algn="ctr"/>
             <a:r>
-              <a:rPr lang="en-US" i="1" dirty="0" smtClean="0"/>
+              <a:rPr lang="en-US" i="1" dirty="0"/>
               <a:t>Learned?</a:t>
             </a:r>
-            <a:endParaRPr lang="en-US" i="1" dirty="0"/>
           </a:p>
         </p:txBody>
       </p:sp>
@@ -8506,13 +8592,6 @@
   <p:clrMapOvr>
     <a:masterClrMapping/>
   </p:clrMapOvr>
-  <p:timing>
-    <p:tnLst>
-      <p:par>
-        <p:cTn id="1" dur="indefinite" restart="never" nodeType="tmRoot"/>
-      </p:par>
-    </p:tnLst>
-  </p:timing>
 </p:sld>
 </file>
 
@@ -9344,10 +9423,9 @@
           <a:lstStyle/>
           <a:p>
             <a:r>
-              <a:rPr lang="en-US" dirty="0" smtClean="0"/>
+              <a:rPr lang="en-US" dirty="0"/>
               <a:t>Vulture Rush</a:t>
             </a:r>
-            <a:endParaRPr lang="en-US" dirty="0"/>
           </a:p>
         </p:txBody>
       </p:sp>
@@ -10167,10 +10245,9 @@
           <a:lstStyle/>
           <a:p>
             <a:r>
-              <a:rPr lang="en-US" dirty="0" smtClean="0"/>
+              <a:rPr lang="en-US" dirty="0"/>
               <a:t>Marine Rush</a:t>
             </a:r>
-            <a:endParaRPr lang="en-US" dirty="0"/>
           </a:p>
         </p:txBody>
       </p:sp>
@@ -10198,10 +10275,9 @@
           <a:p>
             <a:pPr algn="ctr"/>
             <a:r>
-              <a:rPr lang="en-US" dirty="0" smtClean="0"/>
+              <a:rPr lang="en-US" dirty="0"/>
               <a:t>Compiled observations about enemy base, when normalized, is compared to strategy trees using graph similarity metrics</a:t>
             </a:r>
-            <a:endParaRPr lang="en-US" dirty="0"/>
           </a:p>
         </p:txBody>
       </p:sp>
@@ -10215,13 +10291,6 @@
   <p:clrMapOvr>
     <a:masterClrMapping/>
   </p:clrMapOvr>
-  <p:timing>
-    <p:tnLst>
-      <p:par>
-        <p:cTn id="1" dur="indefinite" restart="never" nodeType="tmRoot"/>
-      </p:par>
-    </p:tnLst>
-  </p:timing>
 </p:sld>
 </file>
 
@@ -10258,10 +10327,9 @@
           <a:lstStyle/>
           <a:p>
             <a:r>
-              <a:rPr lang="en-US" dirty="0" smtClean="0"/>
+              <a:rPr lang="en-US" dirty="0"/>
               <a:t>Option A: Distance metric</a:t>
             </a:r>
-            <a:endParaRPr lang="en-US" dirty="0"/>
           </a:p>
         </p:txBody>
       </p:sp>
@@ -10281,10 +10349,9 @@
           <a:lstStyle/>
           <a:p>
             <a:r>
-              <a:rPr lang="en-US" dirty="0" smtClean="0"/>
+              <a:rPr lang="en-US" dirty="0"/>
               <a:t>Compare state graph to strategies graph and select the one with the lowest graph distance (if all above threshold, stick with default strategy)</a:t>
             </a:r>
-            <a:endParaRPr lang="en-US" dirty="0"/>
           </a:p>
         </p:txBody>
       </p:sp>
@@ -10298,13 +10365,6 @@
   <p:clrMapOvr>
     <a:masterClrMapping/>
   </p:clrMapOvr>
-  <p:timing>
-    <p:tnLst>
-      <p:par>
-        <p:cTn id="1" dur="indefinite" restart="never" nodeType="tmRoot"/>
-      </p:par>
-    </p:tnLst>
-  </p:timing>
 </p:sld>
 </file>
 
@@ -10341,11 +10401,11 @@
           <a:lstStyle/>
           <a:p>
             <a:r>
-              <a:rPr lang="en-US" dirty="0" smtClean="0"/>
+              <a:rPr lang="en-US" dirty="0"/>
               <a:t>Option B</a:t>
             </a:r>
             <a:r>
-              <a:rPr lang="en-US" smtClean="0"/>
+              <a:rPr lang="en-US"/>
               <a:t>: Strategy Space</a:t>
             </a:r>
             <a:endParaRPr lang="en-US" dirty="0"/>
@@ -10368,30 +10428,29 @@
           <a:lstStyle/>
           <a:p>
             <a:r>
-              <a:rPr lang="en-US" dirty="0" smtClean="0"/>
+              <a:rPr lang="en-US" dirty="0"/>
               <a:t>Lay out all strategies into a single </a:t>
             </a:r>
             <a:r>
-              <a:rPr lang="en-US" dirty="0" err="1" smtClean="0"/>
+              <a:rPr lang="en-US" dirty="0" err="1"/>
               <a:t>supergraph</a:t>
             </a:r>
             <a:r>
-              <a:rPr lang="en-US" dirty="0" smtClean="0"/>
+              <a:rPr lang="en-US" dirty="0"/>
               <a:t> and let the PDF additive process </a:t>
             </a:r>
             <a:r>
-              <a:rPr lang="en-US" dirty="0" err="1" smtClean="0"/>
+              <a:rPr lang="en-US" dirty="0" err="1"/>
               <a:t>downselect</a:t>
             </a:r>
             <a:r>
-              <a:rPr lang="en-US" dirty="0" smtClean="0"/>
+              <a:rPr lang="en-US" dirty="0"/>
               <a:t> to strategy leaf nodes for “localizing” </a:t>
             </a:r>
             <a:r>
-              <a:rPr lang="en-US" smtClean="0"/>
+              <a:rPr lang="en-US"/>
               <a:t>on approach</a:t>
             </a:r>
-            <a:endParaRPr lang="en-US"/>
           </a:p>
         </p:txBody>
       </p:sp>
@@ -10405,13 +10464,6 @@
   <p:clrMapOvr>
     <a:masterClrMapping/>
   </p:clrMapOvr>
-  <p:timing>
-    <p:tnLst>
-      <p:par>
-        <p:cTn id="1" dur="indefinite" restart="never" nodeType="tmRoot"/>
-      </p:par>
-    </p:tnLst>
-  </p:timing>
 </p:sld>
 </file>
 
@@ -10749,10 +10801,9 @@
           <a:lstStyle/>
           <a:p>
             <a:r>
-              <a:rPr lang="en-US" dirty="0" smtClean="0"/>
+              <a:rPr lang="en-US" dirty="0"/>
               <a:t>Air Strategies</a:t>
             </a:r>
-            <a:endParaRPr lang="en-US" dirty="0"/>
           </a:p>
         </p:txBody>
       </p:sp>
@@ -10779,10 +10830,9 @@
           <a:lstStyle/>
           <a:p>
             <a:r>
-              <a:rPr lang="en-US" dirty="0" smtClean="0"/>
+              <a:rPr lang="en-US" dirty="0"/>
               <a:t>Ground Strategies</a:t>
             </a:r>
-            <a:endParaRPr lang="en-US" dirty="0"/>
           </a:p>
         </p:txBody>
       </p:sp>
@@ -10809,10 +10859,9 @@
           <a:lstStyle/>
           <a:p>
             <a:r>
-              <a:rPr lang="en-US" dirty="0" smtClean="0"/>
+              <a:rPr lang="en-US" dirty="0"/>
               <a:t>Defensive Strategies</a:t>
             </a:r>
-            <a:endParaRPr lang="en-US" dirty="0"/>
           </a:p>
         </p:txBody>
       </p:sp>
@@ -10839,10 +10888,9 @@
           <a:lstStyle/>
           <a:p>
             <a:r>
-              <a:rPr lang="en-US" dirty="0" smtClean="0"/>
+              <a:rPr lang="en-US" dirty="0"/>
               <a:t>Aggressive Strategies</a:t>
             </a:r>
-            <a:endParaRPr lang="en-US" dirty="0"/>
           </a:p>
         </p:txBody>
       </p:sp>
@@ -10856,13 +10904,6 @@
   <p:clrMapOvr>
     <a:masterClrMapping/>
   </p:clrMapOvr>
-  <p:timing>
-    <p:tnLst>
-      <p:par>
-        <p:cTn id="1" dur="indefinite" restart="never" nodeType="tmRoot"/>
-      </p:par>
-    </p:tnLst>
-  </p:timing>
 </p:sld>
 </file>
 
@@ -11210,13 +11251,6 @@
   <p:clrMapOvr>
     <a:masterClrMapping/>
   </p:clrMapOvr>
-  <p:timing>
-    <p:tnLst>
-      <p:par>
-        <p:cTn id="1" dur="indefinite" restart="never" nodeType="tmRoot"/>
-      </p:par>
-    </p:tnLst>
-  </p:timing>
 </p:sld>
 </file>
 
@@ -11242,7 +11276,7 @@
           <p:cNvPr id="2" name="Title 1">
             <a:extLst>
               <a:ext uri="{FF2B5EF4-FFF2-40B4-BE49-F238E27FC236}">
-                <a16:creationId xmlns:a16="http://schemas.microsoft.com/office/drawing/2014/main" xmlns="" id="{5ADC56FF-B4DC-4FF6-8C43-32D010FD16AF}"/>
+                <a16:creationId xmlns:a16="http://schemas.microsoft.com/office/drawing/2014/main" id="{5ADC56FF-B4DC-4FF6-8C43-32D010FD16AF}"/>
               </a:ext>
             </a:extLst>
           </p:cNvPr>
@@ -11302,17 +11336,16 @@
           <a:p>
             <a:pPr algn="ctr"/>
             <a:r>
-              <a:rPr lang="en-US" dirty="0" smtClean="0"/>
+              <a:rPr lang="en-US" dirty="0"/>
               <a:t>Game Interface</a:t>
             </a:r>
           </a:p>
           <a:p>
             <a:pPr algn="ctr"/>
             <a:r>
-              <a:rPr lang="en-US" dirty="0" smtClean="0"/>
+              <a:rPr lang="en-US" dirty="0"/>
               <a:t>(BWAPI)</a:t>
             </a:r>
-            <a:endParaRPr lang="en-US" dirty="0"/>
           </a:p>
         </p:txBody>
       </p:sp>
@@ -11353,10 +11386,9 @@
           <a:p>
             <a:pPr algn="ctr"/>
             <a:r>
-              <a:rPr lang="en-US" dirty="0" smtClean="0"/>
+              <a:rPr lang="en-US" dirty="0"/>
               <a:t>Strategy Manager</a:t>
             </a:r>
-            <a:endParaRPr lang="en-US" dirty="0"/>
           </a:p>
         </p:txBody>
       </p:sp>
@@ -11397,10 +11429,9 @@
           <a:p>
             <a:pPr algn="ctr"/>
             <a:r>
-              <a:rPr lang="en-US" dirty="0" smtClean="0"/>
+              <a:rPr lang="en-US" dirty="0"/>
               <a:t>Inference Engine</a:t>
             </a:r>
-            <a:endParaRPr lang="en-US" dirty="0"/>
           </a:p>
         </p:txBody>
       </p:sp>
@@ -11441,10 +11472,9 @@
           <a:p>
             <a:pPr algn="ctr"/>
             <a:r>
-              <a:rPr lang="en-US" dirty="0" smtClean="0"/>
+              <a:rPr lang="en-US" dirty="0"/>
               <a:t>Tree Builder</a:t>
             </a:r>
-            <a:endParaRPr lang="en-US" dirty="0"/>
           </a:p>
         </p:txBody>
       </p:sp>
@@ -11485,10 +11515,9 @@
           <a:p>
             <a:pPr algn="ctr"/>
             <a:r>
-              <a:rPr lang="en-US" dirty="0" smtClean="0"/>
+              <a:rPr lang="en-US" dirty="0"/>
               <a:t>Admin</a:t>
             </a:r>
-            <a:endParaRPr lang="en-US" dirty="0"/>
           </a:p>
         </p:txBody>
       </p:sp>
@@ -11529,10 +11558,9 @@
           <a:p>
             <a:pPr algn="ctr"/>
             <a:r>
-              <a:rPr lang="en-US" dirty="0" smtClean="0"/>
+              <a:rPr lang="en-US" dirty="0"/>
               <a:t>Test Driver</a:t>
             </a:r>
-            <a:endParaRPr lang="en-US" dirty="0"/>
           </a:p>
         </p:txBody>
       </p:sp>
@@ -11573,10 +11601,9 @@
           <a:p>
             <a:pPr algn="ctr"/>
             <a:r>
-              <a:rPr lang="en-US" dirty="0" smtClean="0"/>
+              <a:rPr lang="en-US" dirty="0"/>
               <a:t>PDDL Reader</a:t>
             </a:r>
-            <a:endParaRPr lang="en-US" dirty="0"/>
           </a:p>
         </p:txBody>
       </p:sp>
@@ -11679,16 +11706,15 @@
           <a:lstStyle/>
           <a:p>
             <a:r>
-              <a:rPr lang="en-US" dirty="0" smtClean="0"/>
+              <a:rPr lang="en-US" dirty="0"/>
               <a:t>Capability</a:t>
             </a:r>
           </a:p>
           <a:p>
             <a:r>
-              <a:rPr lang="en-US" dirty="0" smtClean="0"/>
+              <a:rPr lang="en-US" dirty="0"/>
               <a:t>Status</a:t>
             </a:r>
-            <a:endParaRPr lang="en-US" dirty="0"/>
           </a:p>
         </p:txBody>
       </p:sp>
@@ -11765,10 +11791,9 @@
           <a:p>
             <a:pPr algn="ctr"/>
             <a:r>
-              <a:rPr lang="en-US" dirty="0" smtClean="0"/>
+              <a:rPr lang="en-US" dirty="0"/>
               <a:t>PDDL File</a:t>
             </a:r>
-            <a:endParaRPr lang="en-US" dirty="0"/>
           </a:p>
         </p:txBody>
       </p:sp>
@@ -11979,10 +12004,9 @@
           <a:lstStyle/>
           <a:p>
             <a:r>
-              <a:rPr lang="en-US" dirty="0" smtClean="0"/>
+              <a:rPr lang="en-US" dirty="0"/>
               <a:t>Update Template Weights</a:t>
             </a:r>
-            <a:endParaRPr lang="en-US" dirty="0"/>
           </a:p>
         </p:txBody>
       </p:sp>
@@ -12023,10 +12047,9 @@
           <a:p>
             <a:pPr algn="ctr"/>
             <a:r>
-              <a:rPr lang="en-US" dirty="0" smtClean="0"/>
+              <a:rPr lang="en-US" dirty="0"/>
               <a:t>Strategies</a:t>
             </a:r>
-            <a:endParaRPr lang="en-US" dirty="0"/>
           </a:p>
         </p:txBody>
       </p:sp>
@@ -12077,13 +12100,6 @@
   <p:clrMapOvr>
     <a:masterClrMapping/>
   </p:clrMapOvr>
-  <p:timing>
-    <p:tnLst>
-      <p:par>
-        <p:cTn id="1" dur="indefinite" restart="never" nodeType="tmRoot"/>
-      </p:par>
-    </p:tnLst>
-  </p:timing>
 </p:sld>
 </file>
 
@@ -12376,7 +12392,7 @@
   <a:extraClrSchemeLst/>
   <a:extLst>
     <a:ext uri="{05A4C25C-085E-4340-85A3-A5531E510DB2}">
-      <thm15:themeFamily xmlns:thm15="http://schemas.microsoft.com/office/thememl/2012/main" xmlns="" name="Office Theme" id="{62F939B6-93AF-4DB8-9C6B-D6C7DFDC589F}" vid="{4A3C46E8-61CC-4603-A589-7422A47A8E4A}"/>
+      <thm15:themeFamily xmlns:thm15="http://schemas.microsoft.com/office/thememl/2012/main" name="Office Theme" id="{62F939B6-93AF-4DB8-9C6B-D6C7DFDC589F}" vid="{4A3C46E8-61CC-4603-A589-7422A47A8E4A}"/>
     </a:ext>
   </a:extLst>
 </a:theme>

</xml_diff>

<commit_message>
Updating documentation, adding more constants for configuration purposes, and including tech tree references in Documentation folder
</commit_message>
<xml_diff>
--- a/Documentation/Architecture.pptx
+++ b/Documentation/Architecture.pptx
@@ -14,10 +14,11 @@
     <p:sldId id="261" r:id="rId8"/>
     <p:sldId id="262" r:id="rId9"/>
     <p:sldId id="258" r:id="rId10"/>
-    <p:sldId id="257" r:id="rId11"/>
-    <p:sldId id="266" r:id="rId12"/>
-    <p:sldId id="267" r:id="rId13"/>
-    <p:sldId id="268" r:id="rId14"/>
+    <p:sldId id="269" r:id="rId11"/>
+    <p:sldId id="257" r:id="rId12"/>
+    <p:sldId id="266" r:id="rId13"/>
+    <p:sldId id="267" r:id="rId14"/>
+    <p:sldId id="268" r:id="rId15"/>
   </p:sldIdLst>
   <p:sldSz cx="12192000" cy="6858000"/>
   <p:notesSz cx="6858000" cy="9144000"/>
@@ -282,7 +283,7 @@
           <a:p>
             <a:fld id="{79DE2D3D-0B4E-4DD7-9670-155A46B4C7D3}" type="datetimeFigureOut">
               <a:rPr lang="en-US" smtClean="0"/>
-              <a:t>3/5/2018</a:t>
+              <a:t>3/12/2018</a:t>
             </a:fld>
             <a:endParaRPr lang="en-US"/>
           </a:p>
@@ -480,7 +481,7 @@
           <a:p>
             <a:fld id="{79DE2D3D-0B4E-4DD7-9670-155A46B4C7D3}" type="datetimeFigureOut">
               <a:rPr lang="en-US" smtClean="0"/>
-              <a:t>3/5/2018</a:t>
+              <a:t>3/12/2018</a:t>
             </a:fld>
             <a:endParaRPr lang="en-US"/>
           </a:p>
@@ -688,7 +689,7 @@
           <a:p>
             <a:fld id="{79DE2D3D-0B4E-4DD7-9670-155A46B4C7D3}" type="datetimeFigureOut">
               <a:rPr lang="en-US" smtClean="0"/>
-              <a:t>3/5/2018</a:t>
+              <a:t>3/12/2018</a:t>
             </a:fld>
             <a:endParaRPr lang="en-US"/>
           </a:p>
@@ -886,7 +887,7 @@
           <a:p>
             <a:fld id="{79DE2D3D-0B4E-4DD7-9670-155A46B4C7D3}" type="datetimeFigureOut">
               <a:rPr lang="en-US" smtClean="0"/>
-              <a:t>3/5/2018</a:t>
+              <a:t>3/12/2018</a:t>
             </a:fld>
             <a:endParaRPr lang="en-US"/>
           </a:p>
@@ -1161,7 +1162,7 @@
           <a:p>
             <a:fld id="{79DE2D3D-0B4E-4DD7-9670-155A46B4C7D3}" type="datetimeFigureOut">
               <a:rPr lang="en-US" smtClean="0"/>
-              <a:t>3/5/2018</a:t>
+              <a:t>3/12/2018</a:t>
             </a:fld>
             <a:endParaRPr lang="en-US"/>
           </a:p>
@@ -1426,7 +1427,7 @@
           <a:p>
             <a:fld id="{79DE2D3D-0B4E-4DD7-9670-155A46B4C7D3}" type="datetimeFigureOut">
               <a:rPr lang="en-US" smtClean="0"/>
-              <a:t>3/5/2018</a:t>
+              <a:t>3/12/2018</a:t>
             </a:fld>
             <a:endParaRPr lang="en-US"/>
           </a:p>
@@ -1838,7 +1839,7 @@
           <a:p>
             <a:fld id="{79DE2D3D-0B4E-4DD7-9670-155A46B4C7D3}" type="datetimeFigureOut">
               <a:rPr lang="en-US" smtClean="0"/>
-              <a:t>3/5/2018</a:t>
+              <a:t>3/12/2018</a:t>
             </a:fld>
             <a:endParaRPr lang="en-US"/>
           </a:p>
@@ -1979,7 +1980,7 @@
           <a:p>
             <a:fld id="{79DE2D3D-0B4E-4DD7-9670-155A46B4C7D3}" type="datetimeFigureOut">
               <a:rPr lang="en-US" smtClean="0"/>
-              <a:t>3/5/2018</a:t>
+              <a:t>3/12/2018</a:t>
             </a:fld>
             <a:endParaRPr lang="en-US"/>
           </a:p>
@@ -2092,7 +2093,7 @@
           <a:p>
             <a:fld id="{79DE2D3D-0B4E-4DD7-9670-155A46B4C7D3}" type="datetimeFigureOut">
               <a:rPr lang="en-US" smtClean="0"/>
-              <a:t>3/5/2018</a:t>
+              <a:t>3/12/2018</a:t>
             </a:fld>
             <a:endParaRPr lang="en-US"/>
           </a:p>
@@ -2403,7 +2404,7 @@
           <a:p>
             <a:fld id="{79DE2D3D-0B4E-4DD7-9670-155A46B4C7D3}" type="datetimeFigureOut">
               <a:rPr lang="en-US" smtClean="0"/>
-              <a:t>3/5/2018</a:t>
+              <a:t>3/12/2018</a:t>
             </a:fld>
             <a:endParaRPr lang="en-US"/>
           </a:p>
@@ -2691,7 +2692,7 @@
           <a:p>
             <a:fld id="{79DE2D3D-0B4E-4DD7-9670-155A46B4C7D3}" type="datetimeFigureOut">
               <a:rPr lang="en-US" smtClean="0"/>
-              <a:t>3/5/2018</a:t>
+              <a:t>3/12/2018</a:t>
             </a:fld>
             <a:endParaRPr lang="en-US"/>
           </a:p>
@@ -2932,7 +2933,7 @@
           <a:p>
             <a:fld id="{79DE2D3D-0B4E-4DD7-9670-155A46B4C7D3}" type="datetimeFigureOut">
               <a:rPr lang="en-US" smtClean="0"/>
-              <a:t>3/5/2018</a:t>
+              <a:t>3/12/2018</a:t>
             </a:fld>
             <a:endParaRPr lang="en-US"/>
           </a:p>
@@ -3416,6 +3417,855 @@
 </file>
 
 <file path=ppt/slides/slide10.xml><?xml version="1.0" encoding="utf-8"?>
+<p:sld xmlns:a="http://schemas.openxmlformats.org/drawingml/2006/main" xmlns:r="http://schemas.openxmlformats.org/officeDocument/2006/relationships" xmlns:p="http://schemas.openxmlformats.org/presentationml/2006/main">
+  <p:cSld>
+    <p:spTree>
+      <p:nvGrpSpPr>
+        <p:cNvPr id="1" name=""/>
+        <p:cNvGrpSpPr/>
+        <p:nvPr/>
+      </p:nvGrpSpPr>
+      <p:grpSpPr>
+        <a:xfrm>
+          <a:off x="0" y="0"/>
+          <a:ext cx="0" cy="0"/>
+          <a:chOff x="0" y="0"/>
+          <a:chExt cx="0" cy="0"/>
+        </a:xfrm>
+      </p:grpSpPr>
+      <p:sp>
+        <p:nvSpPr>
+          <p:cNvPr id="2" name="Title 1">
+            <a:extLst>
+              <a:ext uri="{FF2B5EF4-FFF2-40B4-BE49-F238E27FC236}">
+                <a16:creationId xmlns:a16="http://schemas.microsoft.com/office/drawing/2014/main" id="{5ADC56FF-B4DC-4FF6-8C43-32D010FD16AF}"/>
+              </a:ext>
+            </a:extLst>
+          </p:cNvPr>
+          <p:cNvSpPr>
+            <a:spLocks noGrp="1"/>
+          </p:cNvSpPr>
+          <p:nvPr>
+            <p:ph type="title"/>
+          </p:nvPr>
+        </p:nvSpPr>
+        <p:spPr/>
+        <p:txBody>
+          <a:bodyPr/>
+          <a:lstStyle/>
+          <a:p>
+            <a:r>
+              <a:rPr lang="en-US" dirty="0"/>
+              <a:t>Architecture</a:t>
+            </a:r>
+          </a:p>
+        </p:txBody>
+      </p:sp>
+      <p:sp>
+        <p:nvSpPr>
+          <p:cNvPr id="4" name="Rectangle 3"/>
+          <p:cNvSpPr/>
+          <p:nvPr/>
+        </p:nvSpPr>
+        <p:spPr>
+          <a:xfrm>
+            <a:off x="1361440" y="3464560"/>
+            <a:ext cx="1503680" cy="955040"/>
+          </a:xfrm>
+          <a:prstGeom prst="rect">
+            <a:avLst/>
+          </a:prstGeom>
+        </p:spPr>
+        <p:style>
+          <a:lnRef idx="2">
+            <a:schemeClr val="accent1">
+              <a:shade val="50000"/>
+            </a:schemeClr>
+          </a:lnRef>
+          <a:fillRef idx="1">
+            <a:schemeClr val="accent1"/>
+          </a:fillRef>
+          <a:effectRef idx="0">
+            <a:schemeClr val="accent1"/>
+          </a:effectRef>
+          <a:fontRef idx="minor">
+            <a:schemeClr val="lt1"/>
+          </a:fontRef>
+        </p:style>
+        <p:txBody>
+          <a:bodyPr rtlCol="0" anchor="ctr"/>
+          <a:lstStyle/>
+          <a:p>
+            <a:pPr algn="ctr"/>
+            <a:r>
+              <a:rPr lang="en-US" dirty="0"/>
+              <a:t>Game Interface</a:t>
+            </a:r>
+          </a:p>
+          <a:p>
+            <a:pPr algn="ctr"/>
+            <a:r>
+              <a:rPr lang="en-US" dirty="0"/>
+              <a:t>(BWAPI)</a:t>
+            </a:r>
+          </a:p>
+        </p:txBody>
+      </p:sp>
+      <p:sp>
+        <p:nvSpPr>
+          <p:cNvPr id="5" name="Rectangle 4"/>
+          <p:cNvSpPr/>
+          <p:nvPr/>
+        </p:nvSpPr>
+        <p:spPr>
+          <a:xfrm>
+            <a:off x="7589520" y="4079240"/>
+            <a:ext cx="1503680" cy="955040"/>
+          </a:xfrm>
+          <a:prstGeom prst="rect">
+            <a:avLst/>
+          </a:prstGeom>
+        </p:spPr>
+        <p:style>
+          <a:lnRef idx="2">
+            <a:schemeClr val="accent1">
+              <a:shade val="50000"/>
+            </a:schemeClr>
+          </a:lnRef>
+          <a:fillRef idx="1">
+            <a:schemeClr val="accent1"/>
+          </a:fillRef>
+          <a:effectRef idx="0">
+            <a:schemeClr val="accent1"/>
+          </a:effectRef>
+          <a:fontRef idx="minor">
+            <a:schemeClr val="lt1"/>
+          </a:fontRef>
+        </p:style>
+        <p:txBody>
+          <a:bodyPr rtlCol="0" anchor="ctr"/>
+          <a:lstStyle/>
+          <a:p>
+            <a:pPr algn="ctr"/>
+            <a:r>
+              <a:rPr lang="en-US" dirty="0"/>
+              <a:t>Strategy Manager</a:t>
+            </a:r>
+          </a:p>
+        </p:txBody>
+      </p:sp>
+      <p:sp>
+        <p:nvSpPr>
+          <p:cNvPr id="6" name="Rectangle 5"/>
+          <p:cNvSpPr/>
+          <p:nvPr/>
+        </p:nvSpPr>
+        <p:spPr>
+          <a:xfrm>
+            <a:off x="5313680" y="4079240"/>
+            <a:ext cx="1503680" cy="955040"/>
+          </a:xfrm>
+          <a:prstGeom prst="rect">
+            <a:avLst/>
+          </a:prstGeom>
+        </p:spPr>
+        <p:style>
+          <a:lnRef idx="2">
+            <a:schemeClr val="accent1">
+              <a:shade val="50000"/>
+            </a:schemeClr>
+          </a:lnRef>
+          <a:fillRef idx="1">
+            <a:schemeClr val="accent1"/>
+          </a:fillRef>
+          <a:effectRef idx="0">
+            <a:schemeClr val="accent1"/>
+          </a:effectRef>
+          <a:fontRef idx="minor">
+            <a:schemeClr val="lt1"/>
+          </a:fontRef>
+        </p:style>
+        <p:txBody>
+          <a:bodyPr rtlCol="0" anchor="ctr"/>
+          <a:lstStyle/>
+          <a:p>
+            <a:pPr algn="ctr"/>
+            <a:r>
+              <a:rPr lang="en-US" dirty="0"/>
+              <a:t>Inference Engine</a:t>
+            </a:r>
+          </a:p>
+        </p:txBody>
+      </p:sp>
+      <p:sp>
+        <p:nvSpPr>
+          <p:cNvPr id="7" name="Rectangle 6"/>
+          <p:cNvSpPr/>
+          <p:nvPr/>
+        </p:nvSpPr>
+        <p:spPr>
+          <a:xfrm>
+            <a:off x="7589520" y="5653425"/>
+            <a:ext cx="1503680" cy="955040"/>
+          </a:xfrm>
+          <a:prstGeom prst="rect">
+            <a:avLst/>
+          </a:prstGeom>
+        </p:spPr>
+        <p:style>
+          <a:lnRef idx="2">
+            <a:schemeClr val="accent1">
+              <a:shade val="50000"/>
+            </a:schemeClr>
+          </a:lnRef>
+          <a:fillRef idx="1">
+            <a:schemeClr val="accent1"/>
+          </a:fillRef>
+          <a:effectRef idx="0">
+            <a:schemeClr val="accent1"/>
+          </a:effectRef>
+          <a:fontRef idx="minor">
+            <a:schemeClr val="lt1"/>
+          </a:fontRef>
+        </p:style>
+        <p:txBody>
+          <a:bodyPr rtlCol="0" anchor="ctr"/>
+          <a:lstStyle/>
+          <a:p>
+            <a:pPr algn="ctr"/>
+            <a:r>
+              <a:rPr lang="en-US" dirty="0"/>
+              <a:t>Tree Builder</a:t>
+            </a:r>
+          </a:p>
+        </p:txBody>
+      </p:sp>
+      <p:sp>
+        <p:nvSpPr>
+          <p:cNvPr id="8" name="Rectangle 7"/>
+          <p:cNvSpPr/>
+          <p:nvPr/>
+        </p:nvSpPr>
+        <p:spPr>
+          <a:xfrm>
+            <a:off x="5313680" y="2362245"/>
+            <a:ext cx="1503680" cy="955040"/>
+          </a:xfrm>
+          <a:prstGeom prst="rect">
+            <a:avLst/>
+          </a:prstGeom>
+        </p:spPr>
+        <p:style>
+          <a:lnRef idx="2">
+            <a:schemeClr val="accent1">
+              <a:shade val="50000"/>
+            </a:schemeClr>
+          </a:lnRef>
+          <a:fillRef idx="1">
+            <a:schemeClr val="accent1"/>
+          </a:fillRef>
+          <a:effectRef idx="0">
+            <a:schemeClr val="accent1"/>
+          </a:effectRef>
+          <a:fontRef idx="minor">
+            <a:schemeClr val="lt1"/>
+          </a:fontRef>
+        </p:style>
+        <p:txBody>
+          <a:bodyPr rtlCol="0" anchor="ctr"/>
+          <a:lstStyle/>
+          <a:p>
+            <a:pPr algn="ctr"/>
+            <a:r>
+              <a:rPr lang="en-US" dirty="0"/>
+              <a:t>Admin</a:t>
+            </a:r>
+          </a:p>
+        </p:txBody>
+      </p:sp>
+      <p:sp>
+        <p:nvSpPr>
+          <p:cNvPr id="9" name="Rectangle 8"/>
+          <p:cNvSpPr/>
+          <p:nvPr/>
+        </p:nvSpPr>
+        <p:spPr>
+          <a:xfrm>
+            <a:off x="1361440" y="4714240"/>
+            <a:ext cx="1503680" cy="955040"/>
+          </a:xfrm>
+          <a:prstGeom prst="rect">
+            <a:avLst/>
+          </a:prstGeom>
+        </p:spPr>
+        <p:style>
+          <a:lnRef idx="2">
+            <a:schemeClr val="accent1">
+              <a:shade val="50000"/>
+            </a:schemeClr>
+          </a:lnRef>
+          <a:fillRef idx="1">
+            <a:schemeClr val="accent1"/>
+          </a:fillRef>
+          <a:effectRef idx="0">
+            <a:schemeClr val="accent1"/>
+          </a:effectRef>
+          <a:fontRef idx="minor">
+            <a:schemeClr val="lt1"/>
+          </a:fontRef>
+        </p:style>
+        <p:txBody>
+          <a:bodyPr rtlCol="0" anchor="ctr"/>
+          <a:lstStyle/>
+          <a:p>
+            <a:pPr algn="ctr"/>
+            <a:r>
+              <a:rPr lang="en-US" dirty="0"/>
+              <a:t>Test Driver</a:t>
+            </a:r>
+          </a:p>
+        </p:txBody>
+      </p:sp>
+      <p:sp>
+        <p:nvSpPr>
+          <p:cNvPr id="10" name="Rectangle 9"/>
+          <p:cNvSpPr/>
+          <p:nvPr/>
+        </p:nvSpPr>
+        <p:spPr>
+          <a:xfrm>
+            <a:off x="7589520" y="2743222"/>
+            <a:ext cx="1503680" cy="955040"/>
+          </a:xfrm>
+          <a:prstGeom prst="rect">
+            <a:avLst/>
+          </a:prstGeom>
+        </p:spPr>
+        <p:style>
+          <a:lnRef idx="2">
+            <a:schemeClr val="accent1">
+              <a:shade val="50000"/>
+            </a:schemeClr>
+          </a:lnRef>
+          <a:fillRef idx="1">
+            <a:schemeClr val="accent1"/>
+          </a:fillRef>
+          <a:effectRef idx="0">
+            <a:schemeClr val="accent1"/>
+          </a:effectRef>
+          <a:fontRef idx="minor">
+            <a:schemeClr val="lt1"/>
+          </a:fontRef>
+        </p:style>
+        <p:txBody>
+          <a:bodyPr rtlCol="0" anchor="ctr"/>
+          <a:lstStyle/>
+          <a:p>
+            <a:pPr algn="ctr"/>
+            <a:r>
+              <a:rPr lang="en-US" dirty="0"/>
+              <a:t>PDDL Reader</a:t>
+            </a:r>
+          </a:p>
+        </p:txBody>
+      </p:sp>
+      <p:cxnSp>
+        <p:nvCxnSpPr>
+          <p:cNvPr id="12" name="Straight Arrow Connector 11"/>
+          <p:cNvCxnSpPr>
+            <a:stCxn id="4" idx="3"/>
+            <a:endCxn id="6" idx="1"/>
+          </p:cNvCxnSpPr>
+          <p:nvPr/>
+        </p:nvCxnSpPr>
+        <p:spPr>
+          <a:xfrm>
+            <a:off x="2865120" y="3942080"/>
+            <a:ext cx="2448560" cy="614680"/>
+          </a:xfrm>
+          <a:prstGeom prst="bentConnector3">
+            <a:avLst>
+              <a:gd name="adj1" fmla="val 50000"/>
+            </a:avLst>
+          </a:prstGeom>
+          <a:ln>
+            <a:tailEnd type="arrow"/>
+          </a:ln>
+        </p:spPr>
+        <p:style>
+          <a:lnRef idx="1">
+            <a:schemeClr val="accent1"/>
+          </a:lnRef>
+          <a:fillRef idx="0">
+            <a:schemeClr val="accent1"/>
+          </a:fillRef>
+          <a:effectRef idx="0">
+            <a:schemeClr val="accent1"/>
+          </a:effectRef>
+          <a:fontRef idx="minor">
+            <a:schemeClr val="tx1"/>
+          </a:fontRef>
+        </p:style>
+      </p:cxnSp>
+      <p:cxnSp>
+        <p:nvCxnSpPr>
+          <p:cNvPr id="13" name="Straight Arrow Connector 12"/>
+          <p:cNvCxnSpPr>
+            <a:stCxn id="9" idx="3"/>
+            <a:endCxn id="6" idx="1"/>
+          </p:cNvCxnSpPr>
+          <p:nvPr/>
+        </p:nvCxnSpPr>
+        <p:spPr>
+          <a:xfrm flipV="1">
+            <a:off x="2865120" y="4556760"/>
+            <a:ext cx="2448560" cy="635000"/>
+          </a:xfrm>
+          <a:prstGeom prst="bentConnector3">
+            <a:avLst>
+              <a:gd name="adj1" fmla="val 50000"/>
+            </a:avLst>
+          </a:prstGeom>
+          <a:ln>
+            <a:tailEnd type="arrow"/>
+          </a:ln>
+        </p:spPr>
+        <p:style>
+          <a:lnRef idx="1">
+            <a:schemeClr val="accent1"/>
+          </a:lnRef>
+          <a:fillRef idx="0">
+            <a:schemeClr val="accent1"/>
+          </a:fillRef>
+          <a:effectRef idx="0">
+            <a:schemeClr val="accent1"/>
+          </a:effectRef>
+          <a:fontRef idx="minor">
+            <a:schemeClr val="tx1"/>
+          </a:fontRef>
+        </p:style>
+      </p:cxnSp>
+      <p:sp>
+        <p:nvSpPr>
+          <p:cNvPr id="20" name="TextBox 19"/>
+          <p:cNvSpPr txBox="1"/>
+          <p:nvPr/>
+        </p:nvSpPr>
+        <p:spPr>
+          <a:xfrm>
+            <a:off x="2976595" y="4227929"/>
+            <a:ext cx="1112805" cy="646331"/>
+          </a:xfrm>
+          <a:prstGeom prst="rect">
+            <a:avLst/>
+          </a:prstGeom>
+          <a:noFill/>
+        </p:spPr>
+        <p:txBody>
+          <a:bodyPr wrap="none" rtlCol="0">
+            <a:spAutoFit/>
+          </a:bodyPr>
+          <a:lstStyle/>
+          <a:p>
+            <a:r>
+              <a:rPr lang="en-US" dirty="0"/>
+              <a:t>Capability</a:t>
+            </a:r>
+          </a:p>
+          <a:p>
+            <a:r>
+              <a:rPr lang="en-US" dirty="0"/>
+              <a:t>Status</a:t>
+            </a:r>
+          </a:p>
+        </p:txBody>
+      </p:sp>
+      <p:cxnSp>
+        <p:nvCxnSpPr>
+          <p:cNvPr id="23" name="Straight Arrow Connector 22"/>
+          <p:cNvCxnSpPr>
+            <a:stCxn id="10" idx="2"/>
+            <a:endCxn id="5" idx="0"/>
+          </p:cNvCxnSpPr>
+          <p:nvPr/>
+        </p:nvCxnSpPr>
+        <p:spPr>
+          <a:xfrm>
+            <a:off x="8341360" y="3698262"/>
+            <a:ext cx="0" cy="380978"/>
+          </a:xfrm>
+          <a:prstGeom prst="straightConnector1">
+            <a:avLst/>
+          </a:prstGeom>
+          <a:ln>
+            <a:tailEnd type="arrow"/>
+          </a:ln>
+        </p:spPr>
+        <p:style>
+          <a:lnRef idx="1">
+            <a:schemeClr val="accent1"/>
+          </a:lnRef>
+          <a:fillRef idx="0">
+            <a:schemeClr val="accent1"/>
+          </a:fillRef>
+          <a:effectRef idx="0">
+            <a:schemeClr val="accent1"/>
+          </a:effectRef>
+          <a:fontRef idx="minor">
+            <a:schemeClr val="tx1"/>
+          </a:fontRef>
+        </p:style>
+      </p:cxnSp>
+      <p:sp>
+        <p:nvSpPr>
+          <p:cNvPr id="24" name="Flowchart: Document 23"/>
+          <p:cNvSpPr/>
+          <p:nvPr/>
+        </p:nvSpPr>
+        <p:spPr>
+          <a:xfrm>
+            <a:off x="7825778" y="1757702"/>
+            <a:ext cx="1031164" cy="690880"/>
+          </a:xfrm>
+          <a:prstGeom prst="flowChartDocument">
+            <a:avLst/>
+          </a:prstGeom>
+        </p:spPr>
+        <p:style>
+          <a:lnRef idx="2">
+            <a:schemeClr val="accent1">
+              <a:shade val="50000"/>
+            </a:schemeClr>
+          </a:lnRef>
+          <a:fillRef idx="1">
+            <a:schemeClr val="accent1"/>
+          </a:fillRef>
+          <a:effectRef idx="0">
+            <a:schemeClr val="accent1"/>
+          </a:effectRef>
+          <a:fontRef idx="minor">
+            <a:schemeClr val="lt1"/>
+          </a:fontRef>
+        </p:style>
+        <p:txBody>
+          <a:bodyPr rtlCol="0" anchor="ctr"/>
+          <a:lstStyle/>
+          <a:p>
+            <a:pPr algn="ctr"/>
+            <a:r>
+              <a:rPr lang="en-US" dirty="0"/>
+              <a:t>PDDL File</a:t>
+            </a:r>
+          </a:p>
+        </p:txBody>
+      </p:sp>
+      <p:cxnSp>
+        <p:nvCxnSpPr>
+          <p:cNvPr id="25" name="Straight Arrow Connector 24"/>
+          <p:cNvCxnSpPr>
+            <a:stCxn id="24" idx="2"/>
+            <a:endCxn id="10" idx="0"/>
+          </p:cNvCxnSpPr>
+          <p:nvPr/>
+        </p:nvCxnSpPr>
+        <p:spPr>
+          <a:xfrm>
+            <a:off x="8341360" y="2402907"/>
+            <a:ext cx="0" cy="340315"/>
+          </a:xfrm>
+          <a:prstGeom prst="straightConnector1">
+            <a:avLst/>
+          </a:prstGeom>
+          <a:ln>
+            <a:tailEnd type="arrow"/>
+          </a:ln>
+        </p:spPr>
+        <p:style>
+          <a:lnRef idx="1">
+            <a:schemeClr val="accent1"/>
+          </a:lnRef>
+          <a:fillRef idx="0">
+            <a:schemeClr val="accent1"/>
+          </a:fillRef>
+          <a:effectRef idx="0">
+            <a:schemeClr val="accent1"/>
+          </a:effectRef>
+          <a:fontRef idx="minor">
+            <a:schemeClr val="tx1"/>
+          </a:fontRef>
+        </p:style>
+      </p:cxnSp>
+      <p:cxnSp>
+        <p:nvCxnSpPr>
+          <p:cNvPr id="30" name="Straight Arrow Connector 29"/>
+          <p:cNvCxnSpPr>
+            <a:stCxn id="5" idx="2"/>
+            <a:endCxn id="7" idx="0"/>
+          </p:cNvCxnSpPr>
+          <p:nvPr/>
+        </p:nvCxnSpPr>
+        <p:spPr>
+          <a:xfrm>
+            <a:off x="8341360" y="5034280"/>
+            <a:ext cx="0" cy="619145"/>
+          </a:xfrm>
+          <a:prstGeom prst="straightConnector1">
+            <a:avLst/>
+          </a:prstGeom>
+          <a:ln>
+            <a:headEnd type="arrow"/>
+            <a:tailEnd type="arrow"/>
+          </a:ln>
+        </p:spPr>
+        <p:style>
+          <a:lnRef idx="1">
+            <a:schemeClr val="accent1"/>
+          </a:lnRef>
+          <a:fillRef idx="0">
+            <a:schemeClr val="accent1"/>
+          </a:fillRef>
+          <a:effectRef idx="0">
+            <a:schemeClr val="accent1"/>
+          </a:effectRef>
+          <a:fontRef idx="minor">
+            <a:schemeClr val="tx1"/>
+          </a:fontRef>
+        </p:style>
+      </p:cxnSp>
+      <p:cxnSp>
+        <p:nvCxnSpPr>
+          <p:cNvPr id="31" name="Straight Arrow Connector 30"/>
+          <p:cNvCxnSpPr>
+            <a:stCxn id="6" idx="3"/>
+            <a:endCxn id="5" idx="1"/>
+          </p:cNvCxnSpPr>
+          <p:nvPr/>
+        </p:nvCxnSpPr>
+        <p:spPr>
+          <a:xfrm>
+            <a:off x="6817360" y="4556760"/>
+            <a:ext cx="772160" cy="0"/>
+          </a:xfrm>
+          <a:prstGeom prst="straightConnector1">
+            <a:avLst/>
+          </a:prstGeom>
+          <a:ln>
+            <a:headEnd type="arrow"/>
+            <a:tailEnd type="arrow"/>
+          </a:ln>
+        </p:spPr>
+        <p:style>
+          <a:lnRef idx="1">
+            <a:schemeClr val="accent1"/>
+          </a:lnRef>
+          <a:fillRef idx="0">
+            <a:schemeClr val="accent1"/>
+          </a:fillRef>
+          <a:effectRef idx="0">
+            <a:schemeClr val="accent1"/>
+          </a:effectRef>
+          <a:fontRef idx="minor">
+            <a:schemeClr val="tx1"/>
+          </a:fontRef>
+        </p:style>
+      </p:cxnSp>
+      <p:cxnSp>
+        <p:nvCxnSpPr>
+          <p:cNvPr id="34" name="Straight Arrow Connector 33"/>
+          <p:cNvCxnSpPr>
+            <a:stCxn id="8" idx="2"/>
+            <a:endCxn id="6" idx="0"/>
+          </p:cNvCxnSpPr>
+          <p:nvPr/>
+        </p:nvCxnSpPr>
+        <p:spPr>
+          <a:xfrm>
+            <a:off x="6065520" y="3317285"/>
+            <a:ext cx="0" cy="761955"/>
+          </a:xfrm>
+          <a:prstGeom prst="straightConnector1">
+            <a:avLst/>
+          </a:prstGeom>
+          <a:ln>
+            <a:headEnd type="arrow"/>
+            <a:tailEnd type="arrow"/>
+          </a:ln>
+        </p:spPr>
+        <p:style>
+          <a:lnRef idx="1">
+            <a:schemeClr val="accent1"/>
+          </a:lnRef>
+          <a:fillRef idx="0">
+            <a:schemeClr val="accent1"/>
+          </a:fillRef>
+          <a:effectRef idx="0">
+            <a:schemeClr val="accent1"/>
+          </a:effectRef>
+          <a:fontRef idx="minor">
+            <a:schemeClr val="tx1"/>
+          </a:fontRef>
+        </p:style>
+      </p:cxnSp>
+      <p:cxnSp>
+        <p:nvCxnSpPr>
+          <p:cNvPr id="37" name="Straight Arrow Connector 36"/>
+          <p:cNvCxnSpPr>
+            <a:stCxn id="8" idx="1"/>
+            <a:endCxn id="4" idx="0"/>
+          </p:cNvCxnSpPr>
+          <p:nvPr/>
+        </p:nvCxnSpPr>
+        <p:spPr>
+          <a:xfrm rot="10800000" flipV="1">
+            <a:off x="2113280" y="2839764"/>
+            <a:ext cx="3200400" cy="624795"/>
+          </a:xfrm>
+          <a:prstGeom prst="bentConnector2">
+            <a:avLst/>
+          </a:prstGeom>
+          <a:ln>
+            <a:headEnd type="arrow"/>
+            <a:tailEnd type="arrow"/>
+          </a:ln>
+        </p:spPr>
+        <p:style>
+          <a:lnRef idx="1">
+            <a:schemeClr val="accent1"/>
+          </a:lnRef>
+          <a:fillRef idx="0">
+            <a:schemeClr val="accent1"/>
+          </a:fillRef>
+          <a:effectRef idx="0">
+            <a:schemeClr val="accent1"/>
+          </a:effectRef>
+          <a:fontRef idx="minor">
+            <a:schemeClr val="tx1"/>
+          </a:fontRef>
+        </p:style>
+      </p:cxnSp>
+      <p:sp>
+        <p:nvSpPr>
+          <p:cNvPr id="44" name="TextBox 43"/>
+          <p:cNvSpPr txBox="1"/>
+          <p:nvPr/>
+        </p:nvSpPr>
+        <p:spPr>
+          <a:xfrm>
+            <a:off x="9193601" y="4572615"/>
+            <a:ext cx="1198880" cy="923330"/>
+          </a:xfrm>
+          <a:prstGeom prst="rect">
+            <a:avLst/>
+          </a:prstGeom>
+          <a:noFill/>
+        </p:spPr>
+        <p:txBody>
+          <a:bodyPr wrap="square" rtlCol="0">
+            <a:spAutoFit/>
+          </a:bodyPr>
+          <a:lstStyle/>
+          <a:p>
+            <a:r>
+              <a:rPr lang="en-US" dirty="0"/>
+              <a:t>Update Template Weights</a:t>
+            </a:r>
+          </a:p>
+        </p:txBody>
+      </p:sp>
+      <p:sp>
+        <p:nvSpPr>
+          <p:cNvPr id="46" name="Flowchart: Multidocument 45"/>
+          <p:cNvSpPr/>
+          <p:nvPr/>
+        </p:nvSpPr>
+        <p:spPr>
+          <a:xfrm>
+            <a:off x="10492882" y="3964711"/>
+            <a:ext cx="1381760" cy="1184097"/>
+          </a:xfrm>
+          <a:prstGeom prst="flowChartMultidocument">
+            <a:avLst/>
+          </a:prstGeom>
+        </p:spPr>
+        <p:style>
+          <a:lnRef idx="2">
+            <a:schemeClr val="accent1">
+              <a:shade val="50000"/>
+            </a:schemeClr>
+          </a:lnRef>
+          <a:fillRef idx="1">
+            <a:schemeClr val="accent1"/>
+          </a:fillRef>
+          <a:effectRef idx="0">
+            <a:schemeClr val="accent1"/>
+          </a:effectRef>
+          <a:fontRef idx="minor">
+            <a:schemeClr val="lt1"/>
+          </a:fontRef>
+        </p:style>
+        <p:txBody>
+          <a:bodyPr rtlCol="0" anchor="ctr"/>
+          <a:lstStyle/>
+          <a:p>
+            <a:pPr algn="ctr"/>
+            <a:r>
+              <a:rPr lang="en-US" dirty="0"/>
+              <a:t>Strategies</a:t>
+            </a:r>
+          </a:p>
+        </p:txBody>
+      </p:sp>
+      <p:cxnSp>
+        <p:nvCxnSpPr>
+          <p:cNvPr id="48" name="Straight Arrow Connector 47"/>
+          <p:cNvCxnSpPr>
+            <a:stCxn id="46" idx="1"/>
+            <a:endCxn id="5" idx="3"/>
+          </p:cNvCxnSpPr>
+          <p:nvPr/>
+        </p:nvCxnSpPr>
+        <p:spPr>
+          <a:xfrm flipH="1">
+            <a:off x="9093200" y="4556760"/>
+            <a:ext cx="1399682" cy="0"/>
+          </a:xfrm>
+          <a:prstGeom prst="straightConnector1">
+            <a:avLst/>
+          </a:prstGeom>
+          <a:ln>
+            <a:headEnd type="arrow"/>
+            <a:tailEnd type="arrow"/>
+          </a:ln>
+        </p:spPr>
+        <p:style>
+          <a:lnRef idx="1">
+            <a:schemeClr val="accent1"/>
+          </a:lnRef>
+          <a:fillRef idx="0">
+            <a:schemeClr val="accent1"/>
+          </a:fillRef>
+          <a:effectRef idx="0">
+            <a:schemeClr val="accent1"/>
+          </a:effectRef>
+          <a:fontRef idx="minor">
+            <a:schemeClr val="tx1"/>
+          </a:fontRef>
+        </p:style>
+      </p:cxnSp>
+    </p:spTree>
+    <p:extLst>
+      <p:ext uri="{BB962C8B-B14F-4D97-AF65-F5344CB8AC3E}">
+        <p14:creationId xmlns:p14="http://schemas.microsoft.com/office/powerpoint/2010/main" val="447203902"/>
+      </p:ext>
+    </p:extLst>
+  </p:cSld>
+  <p:clrMapOvr>
+    <a:masterClrMapping/>
+  </p:clrMapOvr>
+</p:sld>
+</file>
+
+<file path=ppt/slides/slide11.xml><?xml version="1.0" encoding="utf-8"?>
 <p:sld xmlns:a="http://schemas.openxmlformats.org/drawingml/2006/main" xmlns:r="http://schemas.openxmlformats.org/officeDocument/2006/relationships" xmlns:p="http://schemas.openxmlformats.org/presentationml/2006/main">
   <p:cSld>
     <p:spTree>
@@ -5068,7 +5918,7 @@
 </p:sld>
 </file>
 
-<file path=ppt/slides/slide11.xml><?xml version="1.0" encoding="utf-8"?>
+<file path=ppt/slides/slide12.xml><?xml version="1.0" encoding="utf-8"?>
 <p:sld xmlns:a="http://schemas.openxmlformats.org/drawingml/2006/main" xmlns:r="http://schemas.openxmlformats.org/officeDocument/2006/relationships" xmlns:p="http://schemas.openxmlformats.org/presentationml/2006/main">
   <p:cSld>
     <p:spTree>
@@ -5611,7 +6461,7 @@
 </p:sld>
 </file>
 
-<file path=ppt/slides/slide12.xml><?xml version="1.0" encoding="utf-8"?>
+<file path=ppt/slides/slide13.xml><?xml version="1.0" encoding="utf-8"?>
 <p:sld xmlns:a="http://schemas.openxmlformats.org/drawingml/2006/main" xmlns:r="http://schemas.openxmlformats.org/officeDocument/2006/relationships" xmlns:p="http://schemas.openxmlformats.org/presentationml/2006/main">
   <p:cSld>
     <p:spTree>
@@ -6237,7 +7087,7 @@
 </p:sld>
 </file>
 
-<file path=ppt/slides/slide13.xml><?xml version="1.0" encoding="utf-8"?>
+<file path=ppt/slides/slide14.xml><?xml version="1.0" encoding="utf-8"?>
 <p:sld xmlns:a="http://schemas.openxmlformats.org/drawingml/2006/main" xmlns:r="http://schemas.openxmlformats.org/officeDocument/2006/relationships" xmlns:p="http://schemas.openxmlformats.org/presentationml/2006/main">
   <p:cSld>
     <p:spTree>
@@ -11307,12 +12157,22 @@
         </p:nvSpPr>
         <p:spPr>
           <a:xfrm>
-            <a:off x="1361440" y="3464560"/>
+            <a:off x="241983" y="2908300"/>
             <a:ext cx="1503680" cy="955040"/>
           </a:xfrm>
           <a:prstGeom prst="rect">
             <a:avLst/>
           </a:prstGeom>
+          <a:solidFill>
+            <a:schemeClr val="bg1">
+              <a:lumMod val="50000"/>
+            </a:schemeClr>
+          </a:solidFill>
+          <a:ln>
+            <a:solidFill>
+              <a:schemeClr val="tx1"/>
+            </a:solidFill>
+          </a:ln>
         </p:spPr>
         <p:style>
           <a:lnRef idx="2">
@@ -11337,32 +12197,27 @@
             <a:pPr algn="ctr"/>
             <a:r>
               <a:rPr lang="en-US" dirty="0"/>
-              <a:t>Game Interface</a:t>
+              <a:t>StarCraft</a:t>
             </a:r>
           </a:p>
-          <a:p>
-            <a:pPr algn="ctr"/>
-            <a:r>
-              <a:rPr lang="en-US" dirty="0"/>
-              <a:t>(BWAPI)</a:t>
-            </a:r>
-          </a:p>
-        </p:txBody>
-      </p:sp>
-      <p:sp>
-        <p:nvSpPr>
-          <p:cNvPr id="5" name="Rectangle 4"/>
+        </p:txBody>
+      </p:sp>
+      <p:sp>
+        <p:nvSpPr>
+          <p:cNvPr id="6" name="Rectangle 5"/>
           <p:cNvSpPr/>
           <p:nvPr/>
         </p:nvSpPr>
         <p:spPr>
           <a:xfrm>
-            <a:off x="7589520" y="4079240"/>
-            <a:ext cx="1503680" cy="955040"/>
+            <a:off x="4672236" y="2908299"/>
+            <a:ext cx="3270762" cy="3751807"/>
           </a:xfrm>
           <a:prstGeom prst="rect">
             <a:avLst/>
           </a:prstGeom>
+          <a:noFill/>
+          <a:ln w="38100"/>
         </p:spPr>
         <p:style>
           <a:lnRef idx="2">
@@ -11381,31 +12236,45 @@
           </a:fontRef>
         </p:style>
         <p:txBody>
-          <a:bodyPr rtlCol="0" anchor="ctr"/>
+          <a:bodyPr rtlCol="0" anchor="t"/>
           <a:lstStyle/>
           <a:p>
             <a:pPr algn="ctr"/>
             <a:r>
-              <a:rPr lang="en-US" dirty="0"/>
-              <a:t>Strategy Manager</a:t>
+              <a:rPr lang="en-US" dirty="0">
+                <a:solidFill>
+                  <a:schemeClr val="tx1"/>
+                </a:solidFill>
+              </a:rPr>
+              <a:t>Intent Recognition Engine</a:t>
             </a:r>
           </a:p>
         </p:txBody>
       </p:sp>
       <p:sp>
         <p:nvSpPr>
-          <p:cNvPr id="6" name="Rectangle 5"/>
+          <p:cNvPr id="8" name="Rectangle 7"/>
           <p:cNvSpPr/>
           <p:nvPr/>
         </p:nvSpPr>
         <p:spPr>
           <a:xfrm>
-            <a:off x="5313680" y="4079240"/>
+            <a:off x="2219960" y="2908300"/>
             <a:ext cx="1503680" cy="955040"/>
           </a:xfrm>
           <a:prstGeom prst="rect">
             <a:avLst/>
           </a:prstGeom>
+          <a:solidFill>
+            <a:schemeClr val="bg1">
+              <a:lumMod val="50000"/>
+            </a:schemeClr>
+          </a:solidFill>
+          <a:ln>
+            <a:solidFill>
+              <a:schemeClr val="tx1"/>
+            </a:solidFill>
+          </a:ln>
         </p:spPr>
         <p:style>
           <a:lnRef idx="2">
@@ -11430,179 +12299,7 @@
             <a:pPr algn="ctr"/>
             <a:r>
               <a:rPr lang="en-US" dirty="0"/>
-              <a:t>Inference Engine</a:t>
-            </a:r>
-          </a:p>
-        </p:txBody>
-      </p:sp>
-      <p:sp>
-        <p:nvSpPr>
-          <p:cNvPr id="7" name="Rectangle 6"/>
-          <p:cNvSpPr/>
-          <p:nvPr/>
-        </p:nvSpPr>
-        <p:spPr>
-          <a:xfrm>
-            <a:off x="7589520" y="5653425"/>
-            <a:ext cx="1503680" cy="955040"/>
-          </a:xfrm>
-          <a:prstGeom prst="rect">
-            <a:avLst/>
-          </a:prstGeom>
-        </p:spPr>
-        <p:style>
-          <a:lnRef idx="2">
-            <a:schemeClr val="accent1">
-              <a:shade val="50000"/>
-            </a:schemeClr>
-          </a:lnRef>
-          <a:fillRef idx="1">
-            <a:schemeClr val="accent1"/>
-          </a:fillRef>
-          <a:effectRef idx="0">
-            <a:schemeClr val="accent1"/>
-          </a:effectRef>
-          <a:fontRef idx="minor">
-            <a:schemeClr val="lt1"/>
-          </a:fontRef>
-        </p:style>
-        <p:txBody>
-          <a:bodyPr rtlCol="0" anchor="ctr"/>
-          <a:lstStyle/>
-          <a:p>
-            <a:pPr algn="ctr"/>
-            <a:r>
-              <a:rPr lang="en-US" dirty="0"/>
-              <a:t>Tree Builder</a:t>
-            </a:r>
-          </a:p>
-        </p:txBody>
-      </p:sp>
-      <p:sp>
-        <p:nvSpPr>
-          <p:cNvPr id="8" name="Rectangle 7"/>
-          <p:cNvSpPr/>
-          <p:nvPr/>
-        </p:nvSpPr>
-        <p:spPr>
-          <a:xfrm>
-            <a:off x="5313680" y="2362245"/>
-            <a:ext cx="1503680" cy="955040"/>
-          </a:xfrm>
-          <a:prstGeom prst="rect">
-            <a:avLst/>
-          </a:prstGeom>
-        </p:spPr>
-        <p:style>
-          <a:lnRef idx="2">
-            <a:schemeClr val="accent1">
-              <a:shade val="50000"/>
-            </a:schemeClr>
-          </a:lnRef>
-          <a:fillRef idx="1">
-            <a:schemeClr val="accent1"/>
-          </a:fillRef>
-          <a:effectRef idx="0">
-            <a:schemeClr val="accent1"/>
-          </a:effectRef>
-          <a:fontRef idx="minor">
-            <a:schemeClr val="lt1"/>
-          </a:fontRef>
-        </p:style>
-        <p:txBody>
-          <a:bodyPr rtlCol="0" anchor="ctr"/>
-          <a:lstStyle/>
-          <a:p>
-            <a:pPr algn="ctr"/>
-            <a:r>
-              <a:rPr lang="en-US" dirty="0"/>
-              <a:t>Admin</a:t>
-            </a:r>
-          </a:p>
-        </p:txBody>
-      </p:sp>
-      <p:sp>
-        <p:nvSpPr>
-          <p:cNvPr id="9" name="Rectangle 8"/>
-          <p:cNvSpPr/>
-          <p:nvPr/>
-        </p:nvSpPr>
-        <p:spPr>
-          <a:xfrm>
-            <a:off x="1361440" y="4714240"/>
-            <a:ext cx="1503680" cy="955040"/>
-          </a:xfrm>
-          <a:prstGeom prst="rect">
-            <a:avLst/>
-          </a:prstGeom>
-        </p:spPr>
-        <p:style>
-          <a:lnRef idx="2">
-            <a:schemeClr val="accent1">
-              <a:shade val="50000"/>
-            </a:schemeClr>
-          </a:lnRef>
-          <a:fillRef idx="1">
-            <a:schemeClr val="accent1"/>
-          </a:fillRef>
-          <a:effectRef idx="0">
-            <a:schemeClr val="accent1"/>
-          </a:effectRef>
-          <a:fontRef idx="minor">
-            <a:schemeClr val="lt1"/>
-          </a:fontRef>
-        </p:style>
-        <p:txBody>
-          <a:bodyPr rtlCol="0" anchor="ctr"/>
-          <a:lstStyle/>
-          <a:p>
-            <a:pPr algn="ctr"/>
-            <a:r>
-              <a:rPr lang="en-US" dirty="0"/>
-              <a:t>Test Driver</a:t>
-            </a:r>
-          </a:p>
-        </p:txBody>
-      </p:sp>
-      <p:sp>
-        <p:nvSpPr>
-          <p:cNvPr id="10" name="Rectangle 9"/>
-          <p:cNvSpPr/>
-          <p:nvPr/>
-        </p:nvSpPr>
-        <p:spPr>
-          <a:xfrm>
-            <a:off x="7589520" y="2743222"/>
-            <a:ext cx="1503680" cy="955040"/>
-          </a:xfrm>
-          <a:prstGeom prst="rect">
-            <a:avLst/>
-          </a:prstGeom>
-        </p:spPr>
-        <p:style>
-          <a:lnRef idx="2">
-            <a:schemeClr val="accent1">
-              <a:shade val="50000"/>
-            </a:schemeClr>
-          </a:lnRef>
-          <a:fillRef idx="1">
-            <a:schemeClr val="accent1"/>
-          </a:fillRef>
-          <a:effectRef idx="0">
-            <a:schemeClr val="accent1"/>
-          </a:effectRef>
-          <a:fontRef idx="minor">
-            <a:schemeClr val="lt1"/>
-          </a:fontRef>
-        </p:style>
-        <p:txBody>
-          <a:bodyPr rtlCol="0" anchor="ctr"/>
-          <a:lstStyle/>
-          <a:p>
-            <a:pPr algn="ctr"/>
-            <a:r>
-              <a:rPr lang="en-US" dirty="0"/>
-              <a:t>PDDL Reader</a:t>
+              <a:t>NOVA</a:t>
             </a:r>
           </a:p>
         </p:txBody>
@@ -11611,22 +12308,25 @@
         <p:nvCxnSpPr>
           <p:cNvPr id="12" name="Straight Arrow Connector 11"/>
           <p:cNvCxnSpPr>
+            <a:cxnSpLocks/>
             <a:stCxn id="4" idx="3"/>
-            <a:endCxn id="6" idx="1"/>
+            <a:endCxn id="8" idx="1"/>
           </p:cNvCxnSpPr>
           <p:nvPr/>
         </p:nvCxnSpPr>
         <p:spPr>
           <a:xfrm>
-            <a:off x="2865120" y="3942080"/>
-            <a:ext cx="2448560" cy="614680"/>
-          </a:xfrm>
-          <a:prstGeom prst="bentConnector3">
-            <a:avLst>
-              <a:gd name="adj1" fmla="val 50000"/>
-            </a:avLst>
+            <a:off x="1745663" y="3385820"/>
+            <a:ext cx="474297" cy="0"/>
+          </a:xfrm>
+          <a:prstGeom prst="straightConnector1">
+            <a:avLst/>
           </a:prstGeom>
           <a:ln>
+            <a:solidFill>
+              <a:schemeClr val="tx1"/>
+            </a:solidFill>
+            <a:headEnd type="arrow"/>
             <a:tailEnd type="arrow"/>
           </a:ln>
         </p:spPr>
@@ -11649,15 +12349,16 @@
         <p:nvCxnSpPr>
           <p:cNvPr id="13" name="Straight Arrow Connector 12"/>
           <p:cNvCxnSpPr>
-            <a:stCxn id="9" idx="3"/>
-            <a:endCxn id="6" idx="1"/>
+            <a:cxnSpLocks/>
+            <a:stCxn id="47" idx="3"/>
+            <a:endCxn id="54" idx="2"/>
           </p:cNvCxnSpPr>
           <p:nvPr/>
         </p:nvCxnSpPr>
         <p:spPr>
-          <a:xfrm flipV="1">
-            <a:off x="2865120" y="4556760"/>
-            <a:ext cx="2448560" cy="635000"/>
+          <a:xfrm>
+            <a:off x="2391953" y="4937586"/>
+            <a:ext cx="2916395" cy="1115653"/>
           </a:xfrm>
           <a:prstGeom prst="bentConnector3">
             <a:avLst>
@@ -11665,230 +12366,6 @@
             </a:avLst>
           </a:prstGeom>
           <a:ln>
-            <a:tailEnd type="arrow"/>
-          </a:ln>
-        </p:spPr>
-        <p:style>
-          <a:lnRef idx="1">
-            <a:schemeClr val="accent1"/>
-          </a:lnRef>
-          <a:fillRef idx="0">
-            <a:schemeClr val="accent1"/>
-          </a:fillRef>
-          <a:effectRef idx="0">
-            <a:schemeClr val="accent1"/>
-          </a:effectRef>
-          <a:fontRef idx="minor">
-            <a:schemeClr val="tx1"/>
-          </a:fontRef>
-        </p:style>
-      </p:cxnSp>
-      <p:sp>
-        <p:nvSpPr>
-          <p:cNvPr id="20" name="TextBox 19"/>
-          <p:cNvSpPr txBox="1"/>
-          <p:nvPr/>
-        </p:nvSpPr>
-        <p:spPr>
-          <a:xfrm>
-            <a:off x="2976595" y="4227929"/>
-            <a:ext cx="1112805" cy="646331"/>
-          </a:xfrm>
-          <a:prstGeom prst="rect">
-            <a:avLst/>
-          </a:prstGeom>
-          <a:noFill/>
-        </p:spPr>
-        <p:txBody>
-          <a:bodyPr wrap="none" rtlCol="0">
-            <a:spAutoFit/>
-          </a:bodyPr>
-          <a:lstStyle/>
-          <a:p>
-            <a:r>
-              <a:rPr lang="en-US" dirty="0"/>
-              <a:t>Capability</a:t>
-            </a:r>
-          </a:p>
-          <a:p>
-            <a:r>
-              <a:rPr lang="en-US" dirty="0"/>
-              <a:t>Status</a:t>
-            </a:r>
-          </a:p>
-        </p:txBody>
-      </p:sp>
-      <p:cxnSp>
-        <p:nvCxnSpPr>
-          <p:cNvPr id="23" name="Straight Arrow Connector 22"/>
-          <p:cNvCxnSpPr>
-            <a:stCxn id="10" idx="2"/>
-            <a:endCxn id="5" idx="0"/>
-          </p:cNvCxnSpPr>
-          <p:nvPr/>
-        </p:nvCxnSpPr>
-        <p:spPr>
-          <a:xfrm>
-            <a:off x="8341360" y="3698262"/>
-            <a:ext cx="0" cy="380978"/>
-          </a:xfrm>
-          <a:prstGeom prst="straightConnector1">
-            <a:avLst/>
-          </a:prstGeom>
-          <a:ln>
-            <a:tailEnd type="arrow"/>
-          </a:ln>
-        </p:spPr>
-        <p:style>
-          <a:lnRef idx="1">
-            <a:schemeClr val="accent1"/>
-          </a:lnRef>
-          <a:fillRef idx="0">
-            <a:schemeClr val="accent1"/>
-          </a:fillRef>
-          <a:effectRef idx="0">
-            <a:schemeClr val="accent1"/>
-          </a:effectRef>
-          <a:fontRef idx="minor">
-            <a:schemeClr val="tx1"/>
-          </a:fontRef>
-        </p:style>
-      </p:cxnSp>
-      <p:sp>
-        <p:nvSpPr>
-          <p:cNvPr id="24" name="Flowchart: Document 23"/>
-          <p:cNvSpPr/>
-          <p:nvPr/>
-        </p:nvSpPr>
-        <p:spPr>
-          <a:xfrm>
-            <a:off x="7825778" y="1757702"/>
-            <a:ext cx="1031164" cy="690880"/>
-          </a:xfrm>
-          <a:prstGeom prst="flowChartDocument">
-            <a:avLst/>
-          </a:prstGeom>
-        </p:spPr>
-        <p:style>
-          <a:lnRef idx="2">
-            <a:schemeClr val="accent1">
-              <a:shade val="50000"/>
-            </a:schemeClr>
-          </a:lnRef>
-          <a:fillRef idx="1">
-            <a:schemeClr val="accent1"/>
-          </a:fillRef>
-          <a:effectRef idx="0">
-            <a:schemeClr val="accent1"/>
-          </a:effectRef>
-          <a:fontRef idx="minor">
-            <a:schemeClr val="lt1"/>
-          </a:fontRef>
-        </p:style>
-        <p:txBody>
-          <a:bodyPr rtlCol="0" anchor="ctr"/>
-          <a:lstStyle/>
-          <a:p>
-            <a:pPr algn="ctr"/>
-            <a:r>
-              <a:rPr lang="en-US" dirty="0"/>
-              <a:t>PDDL File</a:t>
-            </a:r>
-          </a:p>
-        </p:txBody>
-      </p:sp>
-      <p:cxnSp>
-        <p:nvCxnSpPr>
-          <p:cNvPr id="25" name="Straight Arrow Connector 24"/>
-          <p:cNvCxnSpPr>
-            <a:stCxn id="24" idx="2"/>
-            <a:endCxn id="10" idx="0"/>
-          </p:cNvCxnSpPr>
-          <p:nvPr/>
-        </p:nvCxnSpPr>
-        <p:spPr>
-          <a:xfrm>
-            <a:off x="8341360" y="2402907"/>
-            <a:ext cx="0" cy="340315"/>
-          </a:xfrm>
-          <a:prstGeom prst="straightConnector1">
-            <a:avLst/>
-          </a:prstGeom>
-          <a:ln>
-            <a:tailEnd type="arrow"/>
-          </a:ln>
-        </p:spPr>
-        <p:style>
-          <a:lnRef idx="1">
-            <a:schemeClr val="accent1"/>
-          </a:lnRef>
-          <a:fillRef idx="0">
-            <a:schemeClr val="accent1"/>
-          </a:fillRef>
-          <a:effectRef idx="0">
-            <a:schemeClr val="accent1"/>
-          </a:effectRef>
-          <a:fontRef idx="minor">
-            <a:schemeClr val="tx1"/>
-          </a:fontRef>
-        </p:style>
-      </p:cxnSp>
-      <p:cxnSp>
-        <p:nvCxnSpPr>
-          <p:cNvPr id="30" name="Straight Arrow Connector 29"/>
-          <p:cNvCxnSpPr>
-            <a:stCxn id="5" idx="2"/>
-            <a:endCxn id="7" idx="0"/>
-          </p:cNvCxnSpPr>
-          <p:nvPr/>
-        </p:nvCxnSpPr>
-        <p:spPr>
-          <a:xfrm>
-            <a:off x="8341360" y="5034280"/>
-            <a:ext cx="0" cy="619145"/>
-          </a:xfrm>
-          <a:prstGeom prst="straightConnector1">
-            <a:avLst/>
-          </a:prstGeom>
-          <a:ln>
-            <a:headEnd type="arrow"/>
-            <a:tailEnd type="arrow"/>
-          </a:ln>
-        </p:spPr>
-        <p:style>
-          <a:lnRef idx="1">
-            <a:schemeClr val="accent1"/>
-          </a:lnRef>
-          <a:fillRef idx="0">
-            <a:schemeClr val="accent1"/>
-          </a:fillRef>
-          <a:effectRef idx="0">
-            <a:schemeClr val="accent1"/>
-          </a:effectRef>
-          <a:fontRef idx="minor">
-            <a:schemeClr val="tx1"/>
-          </a:fontRef>
-        </p:style>
-      </p:cxnSp>
-      <p:cxnSp>
-        <p:nvCxnSpPr>
-          <p:cNvPr id="31" name="Straight Arrow Connector 30"/>
-          <p:cNvCxnSpPr>
-            <a:stCxn id="6" idx="3"/>
-            <a:endCxn id="5" idx="1"/>
-          </p:cNvCxnSpPr>
-          <p:nvPr/>
-        </p:nvCxnSpPr>
-        <p:spPr>
-          <a:xfrm>
-            <a:off x="6817360" y="4556760"/>
-            <a:ext cx="772160" cy="0"/>
-          </a:xfrm>
-          <a:prstGeom prst="straightConnector1">
-            <a:avLst/>
-          </a:prstGeom>
-          <a:ln>
-            <a:headEnd type="arrow"/>
             <a:tailEnd type="arrow"/>
           </a:ln>
         </p:spPr>
@@ -11911,22 +12388,387 @@
         <p:nvCxnSpPr>
           <p:cNvPr id="34" name="Straight Arrow Connector 33"/>
           <p:cNvCxnSpPr>
-            <a:stCxn id="8" idx="2"/>
-            <a:endCxn id="6" idx="0"/>
+            <a:cxnSpLocks/>
+            <a:stCxn id="8" idx="3"/>
+            <a:endCxn id="52" idx="2"/>
           </p:cNvCxnSpPr>
           <p:nvPr/>
         </p:nvCxnSpPr>
         <p:spPr>
           <a:xfrm>
-            <a:off x="6065520" y="3317285"/>
-            <a:ext cx="0" cy="761955"/>
-          </a:xfrm>
-          <a:prstGeom prst="straightConnector1">
-            <a:avLst/>
+            <a:off x="3723640" y="3385820"/>
+            <a:ext cx="1584708" cy="388763"/>
+          </a:xfrm>
+          <a:prstGeom prst="bentConnector3">
+            <a:avLst>
+              <a:gd name="adj1" fmla="val 50000"/>
+            </a:avLst>
           </a:prstGeom>
           <a:ln>
             <a:headEnd type="arrow"/>
             <a:tailEnd type="arrow"/>
+          </a:ln>
+        </p:spPr>
+        <p:style>
+          <a:lnRef idx="1">
+            <a:schemeClr val="accent1"/>
+          </a:lnRef>
+          <a:fillRef idx="0">
+            <a:schemeClr val="accent1"/>
+          </a:fillRef>
+          <a:effectRef idx="0">
+            <a:schemeClr val="accent1"/>
+          </a:effectRef>
+          <a:fontRef idx="minor">
+            <a:schemeClr val="tx1"/>
+          </a:fontRef>
+        </p:style>
+      </p:cxnSp>
+      <p:sp>
+        <p:nvSpPr>
+          <p:cNvPr id="46" name="Flowchart: Multidocument 45"/>
+          <p:cNvSpPr/>
+          <p:nvPr/>
+        </p:nvSpPr>
+        <p:spPr>
+          <a:xfrm>
+            <a:off x="8729832" y="3794213"/>
+            <a:ext cx="1381760" cy="1184097"/>
+          </a:xfrm>
+          <a:prstGeom prst="flowChartMultidocument">
+            <a:avLst/>
+          </a:prstGeom>
+        </p:spPr>
+        <p:style>
+          <a:lnRef idx="2">
+            <a:schemeClr val="accent1">
+              <a:shade val="50000"/>
+            </a:schemeClr>
+          </a:lnRef>
+          <a:fillRef idx="1">
+            <a:schemeClr val="accent1"/>
+          </a:fillRef>
+          <a:effectRef idx="0">
+            <a:schemeClr val="accent1"/>
+          </a:effectRef>
+          <a:fontRef idx="minor">
+            <a:schemeClr val="lt1"/>
+          </a:fontRef>
+        </p:style>
+        <p:txBody>
+          <a:bodyPr rtlCol="0" anchor="ctr"/>
+          <a:lstStyle/>
+          <a:p>
+            <a:pPr algn="ctr"/>
+            <a:r>
+              <a:rPr lang="en-US" dirty="0"/>
+              <a:t>Strategies</a:t>
+            </a:r>
+          </a:p>
+        </p:txBody>
+      </p:sp>
+      <p:cxnSp>
+        <p:nvCxnSpPr>
+          <p:cNvPr id="48" name="Straight Arrow Connector 47"/>
+          <p:cNvCxnSpPr>
+            <a:cxnSpLocks/>
+            <a:stCxn id="46" idx="1"/>
+            <a:endCxn id="54" idx="6"/>
+          </p:cNvCxnSpPr>
+          <p:nvPr/>
+        </p:nvCxnSpPr>
+        <p:spPr>
+          <a:xfrm rot="10800000" flipV="1">
+            <a:off x="7273626" y="4386261"/>
+            <a:ext cx="1456206" cy="1666977"/>
+          </a:xfrm>
+          <a:prstGeom prst="bentConnector3">
+            <a:avLst>
+              <a:gd name="adj1" fmla="val 50000"/>
+            </a:avLst>
+          </a:prstGeom>
+          <a:ln>
+            <a:headEnd type="arrow"/>
+            <a:tailEnd type="arrow"/>
+          </a:ln>
+        </p:spPr>
+        <p:style>
+          <a:lnRef idx="1">
+            <a:schemeClr val="accent1"/>
+          </a:lnRef>
+          <a:fillRef idx="0">
+            <a:schemeClr val="accent1"/>
+          </a:fillRef>
+          <a:effectRef idx="0">
+            <a:schemeClr val="accent1"/>
+          </a:effectRef>
+          <a:fontRef idx="minor">
+            <a:schemeClr val="tx1"/>
+          </a:fontRef>
+        </p:style>
+      </p:cxnSp>
+      <p:grpSp>
+        <p:nvGrpSpPr>
+          <p:cNvPr id="50" name="Group 49">
+            <a:extLst>
+              <a:ext uri="{FF2B5EF4-FFF2-40B4-BE49-F238E27FC236}">
+                <a16:creationId xmlns:a16="http://schemas.microsoft.com/office/drawing/2014/main" id="{A51CCD7C-E0FB-4561-9ECB-21FA3B0B6011}"/>
+              </a:ext>
+            </a:extLst>
+          </p:cNvPr>
+          <p:cNvGrpSpPr/>
+          <p:nvPr/>
+        </p:nvGrpSpPr>
+        <p:grpSpPr>
+          <a:xfrm>
+            <a:off x="1451415" y="4132088"/>
+            <a:ext cx="1062791" cy="1971972"/>
+            <a:chOff x="979790" y="4386262"/>
+            <a:chExt cx="1062791" cy="1971972"/>
+          </a:xfrm>
+        </p:grpSpPr>
+        <p:pic>
+          <p:nvPicPr>
+            <p:cNvPr id="47" name="Picture 46">
+              <a:extLst>
+                <a:ext uri="{FF2B5EF4-FFF2-40B4-BE49-F238E27FC236}">
+                  <a16:creationId xmlns:a16="http://schemas.microsoft.com/office/drawing/2014/main" id="{01223F7B-10CE-4717-82FD-54FCB975B5B3}"/>
+                </a:ext>
+              </a:extLst>
+            </p:cNvPr>
+            <p:cNvPicPr>
+              <a:picLocks noChangeAspect="1"/>
+            </p:cNvPicPr>
+            <p:nvPr/>
+          </p:nvPicPr>
+          <p:blipFill>
+            <a:blip r:embed="rId2"/>
+            <a:stretch>
+              <a:fillRect/>
+            </a:stretch>
+          </p:blipFill>
+          <p:spPr>
+            <a:xfrm>
+              <a:off x="1102045" y="4386262"/>
+              <a:ext cx="818283" cy="1610995"/>
+            </a:xfrm>
+            <a:prstGeom prst="rect">
+              <a:avLst/>
+            </a:prstGeom>
+          </p:spPr>
+        </p:pic>
+        <p:sp>
+          <p:nvSpPr>
+            <p:cNvPr id="49" name="Rectangle 48">
+              <a:extLst>
+                <a:ext uri="{FF2B5EF4-FFF2-40B4-BE49-F238E27FC236}">
+                  <a16:creationId xmlns:a16="http://schemas.microsoft.com/office/drawing/2014/main" id="{D108285C-25BE-499E-9547-DE13717298E7}"/>
+                </a:ext>
+              </a:extLst>
+            </p:cNvPr>
+            <p:cNvSpPr/>
+            <p:nvPr/>
+          </p:nvSpPr>
+          <p:spPr>
+            <a:xfrm>
+              <a:off x="979790" y="5988902"/>
+              <a:ext cx="1062791" cy="369332"/>
+            </a:xfrm>
+            <a:prstGeom prst="rect">
+              <a:avLst/>
+            </a:prstGeom>
+          </p:spPr>
+          <p:txBody>
+            <a:bodyPr wrap="none">
+              <a:spAutoFit/>
+            </a:bodyPr>
+            <a:lstStyle/>
+            <a:p>
+              <a:pPr algn="ctr"/>
+              <a:r>
+                <a:rPr lang="en-US" dirty="0"/>
+                <a:t>Evaluator</a:t>
+              </a:r>
+            </a:p>
+          </p:txBody>
+        </p:sp>
+      </p:grpSp>
+      <p:sp>
+        <p:nvSpPr>
+          <p:cNvPr id="52" name="Oval 51">
+            <a:extLst>
+              <a:ext uri="{FF2B5EF4-FFF2-40B4-BE49-F238E27FC236}">
+                <a16:creationId xmlns:a16="http://schemas.microsoft.com/office/drawing/2014/main" id="{E0BF3096-B959-4382-A27C-4DDB205490B2}"/>
+              </a:ext>
+            </a:extLst>
+          </p:cNvPr>
+          <p:cNvSpPr/>
+          <p:nvPr/>
+        </p:nvSpPr>
+        <p:spPr>
+          <a:xfrm>
+            <a:off x="5308348" y="3417076"/>
+            <a:ext cx="1965278" cy="715014"/>
+          </a:xfrm>
+          <a:prstGeom prst="ellipse">
+            <a:avLst/>
+          </a:prstGeom>
+        </p:spPr>
+        <p:style>
+          <a:lnRef idx="2">
+            <a:schemeClr val="accent1">
+              <a:shade val="50000"/>
+            </a:schemeClr>
+          </a:lnRef>
+          <a:fillRef idx="1">
+            <a:schemeClr val="accent1"/>
+          </a:fillRef>
+          <a:effectRef idx="0">
+            <a:schemeClr val="accent1"/>
+          </a:effectRef>
+          <a:fontRef idx="minor">
+            <a:schemeClr val="lt1"/>
+          </a:fontRef>
+        </p:style>
+        <p:txBody>
+          <a:bodyPr rtlCol="0" anchor="ctr"/>
+          <a:lstStyle/>
+          <a:p>
+            <a:pPr algn="ctr"/>
+            <a:r>
+              <a:rPr lang="en-US" sz="1200" dirty="0"/>
+              <a:t>ID Enemy Strategy</a:t>
+            </a:r>
+          </a:p>
+        </p:txBody>
+      </p:sp>
+      <p:sp>
+        <p:nvSpPr>
+          <p:cNvPr id="53" name="Oval 52">
+            <a:extLst>
+              <a:ext uri="{FF2B5EF4-FFF2-40B4-BE49-F238E27FC236}">
+                <a16:creationId xmlns:a16="http://schemas.microsoft.com/office/drawing/2014/main" id="{FDC57CFA-8D25-4707-B3DB-E4E532673A0A}"/>
+              </a:ext>
+            </a:extLst>
+          </p:cNvPr>
+          <p:cNvSpPr/>
+          <p:nvPr/>
+        </p:nvSpPr>
+        <p:spPr>
+          <a:xfrm>
+            <a:off x="5308348" y="4537531"/>
+            <a:ext cx="1965278" cy="715014"/>
+          </a:xfrm>
+          <a:prstGeom prst="ellipse">
+            <a:avLst/>
+          </a:prstGeom>
+        </p:spPr>
+        <p:style>
+          <a:lnRef idx="2">
+            <a:schemeClr val="accent1">
+              <a:shade val="50000"/>
+            </a:schemeClr>
+          </a:lnRef>
+          <a:fillRef idx="1">
+            <a:schemeClr val="accent1"/>
+          </a:fillRef>
+          <a:effectRef idx="0">
+            <a:schemeClr val="accent1"/>
+          </a:effectRef>
+          <a:fontRef idx="minor">
+            <a:schemeClr val="lt1"/>
+          </a:fontRef>
+        </p:style>
+        <p:txBody>
+          <a:bodyPr rtlCol="0" anchor="ctr"/>
+          <a:lstStyle/>
+          <a:p>
+            <a:pPr algn="ctr"/>
+            <a:r>
+              <a:rPr lang="en-US" sz="1200" dirty="0"/>
+              <a:t>Propose Counter-Strategy</a:t>
+            </a:r>
+          </a:p>
+        </p:txBody>
+      </p:sp>
+      <p:sp>
+        <p:nvSpPr>
+          <p:cNvPr id="54" name="Oval 53">
+            <a:extLst>
+              <a:ext uri="{FF2B5EF4-FFF2-40B4-BE49-F238E27FC236}">
+                <a16:creationId xmlns:a16="http://schemas.microsoft.com/office/drawing/2014/main" id="{345DB287-9B46-4514-AC05-9E3901CC17ED}"/>
+              </a:ext>
+            </a:extLst>
+          </p:cNvPr>
+          <p:cNvSpPr/>
+          <p:nvPr/>
+        </p:nvSpPr>
+        <p:spPr>
+          <a:xfrm>
+            <a:off x="5308348" y="5695732"/>
+            <a:ext cx="1965278" cy="715014"/>
+          </a:xfrm>
+          <a:prstGeom prst="ellipse">
+            <a:avLst/>
+          </a:prstGeom>
+        </p:spPr>
+        <p:style>
+          <a:lnRef idx="2">
+            <a:schemeClr val="accent1">
+              <a:shade val="50000"/>
+            </a:schemeClr>
+          </a:lnRef>
+          <a:fillRef idx="1">
+            <a:schemeClr val="accent1"/>
+          </a:fillRef>
+          <a:effectRef idx="0">
+            <a:schemeClr val="accent1"/>
+          </a:effectRef>
+          <a:fontRef idx="minor">
+            <a:schemeClr val="lt1"/>
+          </a:fontRef>
+        </p:style>
+        <p:txBody>
+          <a:bodyPr rtlCol="0" anchor="ctr"/>
+          <a:lstStyle/>
+          <a:p>
+            <a:pPr algn="ctr"/>
+            <a:r>
+              <a:rPr lang="en-US" sz="1200" dirty="0"/>
+              <a:t>Read and Write Strategies</a:t>
+            </a:r>
+          </a:p>
+        </p:txBody>
+      </p:sp>
+      <p:cxnSp>
+        <p:nvCxnSpPr>
+          <p:cNvPr id="66" name="Straight Arrow Connector 33">
+            <a:extLst>
+              <a:ext uri="{FF2B5EF4-FFF2-40B4-BE49-F238E27FC236}">
+                <a16:creationId xmlns:a16="http://schemas.microsoft.com/office/drawing/2014/main" id="{870FF5B4-0094-43D7-B747-D0F9EC5A425A}"/>
+              </a:ext>
+            </a:extLst>
+          </p:cNvPr>
+          <p:cNvCxnSpPr>
+            <a:cxnSpLocks/>
+            <a:stCxn id="8" idx="3"/>
+            <a:endCxn id="53" idx="2"/>
+          </p:cNvCxnSpPr>
+          <p:nvPr/>
+        </p:nvCxnSpPr>
+        <p:spPr>
+          <a:xfrm>
+            <a:off x="3723640" y="3385820"/>
+            <a:ext cx="1584708" cy="1509218"/>
+          </a:xfrm>
+          <a:prstGeom prst="bentConnector3">
+            <a:avLst>
+              <a:gd name="adj1" fmla="val 50000"/>
+            </a:avLst>
+          </a:prstGeom>
+          <a:ln>
+            <a:headEnd type="arrow"/>
+            <a:tailEnd type="none"/>
           </a:ln>
         </p:spPr>
         <p:style>
@@ -11946,22 +12788,33 @@
       </p:cxnSp>
       <p:cxnSp>
         <p:nvCxnSpPr>
-          <p:cNvPr id="37" name="Straight Arrow Connector 36"/>
+          <p:cNvPr id="74" name="Straight Arrow Connector 73">
+            <a:extLst>
+              <a:ext uri="{FF2B5EF4-FFF2-40B4-BE49-F238E27FC236}">
+                <a16:creationId xmlns:a16="http://schemas.microsoft.com/office/drawing/2014/main" id="{25DC6E09-766C-435A-9947-62A270F44579}"/>
+              </a:ext>
+            </a:extLst>
+          </p:cNvPr>
           <p:cNvCxnSpPr>
-            <a:stCxn id="8" idx="1"/>
-            <a:endCxn id="4" idx="0"/>
+            <a:cxnSpLocks/>
+            <a:stCxn id="54" idx="0"/>
+            <a:endCxn id="53" idx="4"/>
           </p:cNvCxnSpPr>
           <p:nvPr/>
         </p:nvCxnSpPr>
         <p:spPr>
-          <a:xfrm rot="10800000" flipV="1">
-            <a:off x="2113280" y="2839764"/>
-            <a:ext cx="3200400" cy="624795"/>
-          </a:xfrm>
-          <a:prstGeom prst="bentConnector2">
+          <a:xfrm flipV="1">
+            <a:off x="6290987" y="5252545"/>
+            <a:ext cx="0" cy="443187"/>
+          </a:xfrm>
+          <a:prstGeom prst="straightConnector1">
             <a:avLst/>
           </a:prstGeom>
           <a:ln>
+            <a:solidFill>
+              <a:schemeClr val="tx1"/>
+            </a:solidFill>
+            <a:prstDash val="lgDash"/>
             <a:headEnd type="arrow"/>
             <a:tailEnd type="arrow"/>
           </a:ln>
@@ -11981,97 +12834,36 @@
           </a:fontRef>
         </p:style>
       </p:cxnSp>
-      <p:sp>
-        <p:nvSpPr>
-          <p:cNvPr id="44" name="TextBox 43"/>
-          <p:cNvSpPr txBox="1"/>
-          <p:nvPr/>
-        </p:nvSpPr>
-        <p:spPr>
-          <a:xfrm>
-            <a:off x="9193601" y="4572615"/>
-            <a:ext cx="1198880" cy="923330"/>
-          </a:xfrm>
-          <a:prstGeom prst="rect">
-            <a:avLst/>
-          </a:prstGeom>
-          <a:noFill/>
-        </p:spPr>
-        <p:txBody>
-          <a:bodyPr wrap="square" rtlCol="0">
-            <a:spAutoFit/>
-          </a:bodyPr>
-          <a:lstStyle/>
-          <a:p>
-            <a:r>
-              <a:rPr lang="en-US" dirty="0"/>
-              <a:t>Update Template Weights</a:t>
-            </a:r>
-          </a:p>
-        </p:txBody>
-      </p:sp>
-      <p:sp>
-        <p:nvSpPr>
-          <p:cNvPr id="46" name="Flowchart: Multidocument 45"/>
-          <p:cNvSpPr/>
-          <p:nvPr/>
-        </p:nvSpPr>
-        <p:spPr>
-          <a:xfrm>
-            <a:off x="10492882" y="3964711"/>
-            <a:ext cx="1381760" cy="1184097"/>
-          </a:xfrm>
-          <a:prstGeom prst="flowChartMultidocument">
-            <a:avLst/>
-          </a:prstGeom>
-        </p:spPr>
-        <p:style>
-          <a:lnRef idx="2">
-            <a:schemeClr val="accent1">
-              <a:shade val="50000"/>
-            </a:schemeClr>
-          </a:lnRef>
-          <a:fillRef idx="1">
-            <a:schemeClr val="accent1"/>
-          </a:fillRef>
-          <a:effectRef idx="0">
-            <a:schemeClr val="accent1"/>
-          </a:effectRef>
-          <a:fontRef idx="minor">
-            <a:schemeClr val="lt1"/>
-          </a:fontRef>
-        </p:style>
-        <p:txBody>
-          <a:bodyPr rtlCol="0" anchor="ctr"/>
-          <a:lstStyle/>
-          <a:p>
-            <a:pPr algn="ctr"/>
-            <a:r>
-              <a:rPr lang="en-US" dirty="0"/>
-              <a:t>Strategies</a:t>
-            </a:r>
-          </a:p>
-        </p:txBody>
-      </p:sp>
       <p:cxnSp>
         <p:nvCxnSpPr>
-          <p:cNvPr id="48" name="Straight Arrow Connector 47"/>
+          <p:cNvPr id="83" name="Straight Arrow Connector 82">
+            <a:extLst>
+              <a:ext uri="{FF2B5EF4-FFF2-40B4-BE49-F238E27FC236}">
+                <a16:creationId xmlns:a16="http://schemas.microsoft.com/office/drawing/2014/main" id="{7673F6C5-5DA1-42DB-9BD1-DB5C15D667E7}"/>
+              </a:ext>
+            </a:extLst>
+          </p:cNvPr>
           <p:cNvCxnSpPr>
-            <a:stCxn id="46" idx="1"/>
-            <a:endCxn id="5" idx="3"/>
+            <a:cxnSpLocks/>
+            <a:stCxn id="52" idx="4"/>
+            <a:endCxn id="53" idx="0"/>
           </p:cNvCxnSpPr>
           <p:nvPr/>
         </p:nvCxnSpPr>
         <p:spPr>
-          <a:xfrm flipH="1">
-            <a:off x="9093200" y="4556760"/>
-            <a:ext cx="1399682" cy="0"/>
+          <a:xfrm>
+            <a:off x="6290987" y="4132090"/>
+            <a:ext cx="0" cy="405441"/>
           </a:xfrm>
           <a:prstGeom prst="straightConnector1">
             <a:avLst/>
           </a:prstGeom>
           <a:ln>
-            <a:headEnd type="arrow"/>
+            <a:solidFill>
+              <a:schemeClr val="tx1"/>
+            </a:solidFill>
+            <a:prstDash val="lgDash"/>
+            <a:headEnd type="none"/>
             <a:tailEnd type="arrow"/>
           </a:ln>
         </p:spPr>

</xml_diff>

<commit_message>
Updates to how observed nodes are treated in the strategy space to help resolve duplicate "common buildings" problem
</commit_message>
<xml_diff>
--- a/Documentation/Architecture.pptx
+++ b/Documentation/Architecture.pptx
@@ -283,7 +283,7 @@
           <a:p>
             <a:fld id="{79DE2D3D-0B4E-4DD7-9670-155A46B4C7D3}" type="datetimeFigureOut">
               <a:rPr lang="en-US" smtClean="0"/>
-              <a:t>3/12/2018</a:t>
+              <a:t>3/21/2018</a:t>
             </a:fld>
             <a:endParaRPr lang="en-US"/>
           </a:p>
@@ -481,7 +481,7 @@
           <a:p>
             <a:fld id="{79DE2D3D-0B4E-4DD7-9670-155A46B4C7D3}" type="datetimeFigureOut">
               <a:rPr lang="en-US" smtClean="0"/>
-              <a:t>3/12/2018</a:t>
+              <a:t>3/21/2018</a:t>
             </a:fld>
             <a:endParaRPr lang="en-US"/>
           </a:p>
@@ -689,7 +689,7 @@
           <a:p>
             <a:fld id="{79DE2D3D-0B4E-4DD7-9670-155A46B4C7D3}" type="datetimeFigureOut">
               <a:rPr lang="en-US" smtClean="0"/>
-              <a:t>3/12/2018</a:t>
+              <a:t>3/21/2018</a:t>
             </a:fld>
             <a:endParaRPr lang="en-US"/>
           </a:p>
@@ -887,7 +887,7 @@
           <a:p>
             <a:fld id="{79DE2D3D-0B4E-4DD7-9670-155A46B4C7D3}" type="datetimeFigureOut">
               <a:rPr lang="en-US" smtClean="0"/>
-              <a:t>3/12/2018</a:t>
+              <a:t>3/21/2018</a:t>
             </a:fld>
             <a:endParaRPr lang="en-US"/>
           </a:p>
@@ -1162,7 +1162,7 @@
           <a:p>
             <a:fld id="{79DE2D3D-0B4E-4DD7-9670-155A46B4C7D3}" type="datetimeFigureOut">
               <a:rPr lang="en-US" smtClean="0"/>
-              <a:t>3/12/2018</a:t>
+              <a:t>3/21/2018</a:t>
             </a:fld>
             <a:endParaRPr lang="en-US"/>
           </a:p>
@@ -1427,7 +1427,7 @@
           <a:p>
             <a:fld id="{79DE2D3D-0B4E-4DD7-9670-155A46B4C7D3}" type="datetimeFigureOut">
               <a:rPr lang="en-US" smtClean="0"/>
-              <a:t>3/12/2018</a:t>
+              <a:t>3/21/2018</a:t>
             </a:fld>
             <a:endParaRPr lang="en-US"/>
           </a:p>
@@ -1839,7 +1839,7 @@
           <a:p>
             <a:fld id="{79DE2D3D-0B4E-4DD7-9670-155A46B4C7D3}" type="datetimeFigureOut">
               <a:rPr lang="en-US" smtClean="0"/>
-              <a:t>3/12/2018</a:t>
+              <a:t>3/21/2018</a:t>
             </a:fld>
             <a:endParaRPr lang="en-US"/>
           </a:p>
@@ -1980,7 +1980,7 @@
           <a:p>
             <a:fld id="{79DE2D3D-0B4E-4DD7-9670-155A46B4C7D3}" type="datetimeFigureOut">
               <a:rPr lang="en-US" smtClean="0"/>
-              <a:t>3/12/2018</a:t>
+              <a:t>3/21/2018</a:t>
             </a:fld>
             <a:endParaRPr lang="en-US"/>
           </a:p>
@@ -2093,7 +2093,7 @@
           <a:p>
             <a:fld id="{79DE2D3D-0B4E-4DD7-9670-155A46B4C7D3}" type="datetimeFigureOut">
               <a:rPr lang="en-US" smtClean="0"/>
-              <a:t>3/12/2018</a:t>
+              <a:t>3/21/2018</a:t>
             </a:fld>
             <a:endParaRPr lang="en-US"/>
           </a:p>
@@ -2404,7 +2404,7 @@
           <a:p>
             <a:fld id="{79DE2D3D-0B4E-4DD7-9670-155A46B4C7D3}" type="datetimeFigureOut">
               <a:rPr lang="en-US" smtClean="0"/>
-              <a:t>3/12/2018</a:t>
+              <a:t>3/21/2018</a:t>
             </a:fld>
             <a:endParaRPr lang="en-US"/>
           </a:p>
@@ -2692,7 +2692,7 @@
           <a:p>
             <a:fld id="{79DE2D3D-0B4E-4DD7-9670-155A46B4C7D3}" type="datetimeFigureOut">
               <a:rPr lang="en-US" smtClean="0"/>
-              <a:t>3/12/2018</a:t>
+              <a:t>3/21/2018</a:t>
             </a:fld>
             <a:endParaRPr lang="en-US"/>
           </a:p>
@@ -2933,7 +2933,7 @@
           <a:p>
             <a:fld id="{79DE2D3D-0B4E-4DD7-9670-155A46B4C7D3}" type="datetimeFigureOut">
               <a:rPr lang="en-US" smtClean="0"/>
-              <a:t>3/12/2018</a:t>
+              <a:t>3/21/2018</a:t>
             </a:fld>
             <a:endParaRPr lang="en-US"/>
           </a:p>
@@ -5877,7 +5877,7 @@
         </p:nvCxnSpPr>
         <p:spPr>
           <a:xfrm>
-            <a:off x="4104640" y="2438476"/>
+            <a:off x="5405702" y="2369745"/>
             <a:ext cx="0" cy="2549997"/>
           </a:xfrm>
           <a:prstGeom prst="line">

</xml_diff>

<commit_message>
Updating architecture document to map between NOVA and IRE functions for integration purposes
</commit_message>
<xml_diff>
--- a/Documentation/Architecture.pptx
+++ b/Documentation/Architecture.pptx
@@ -15,10 +15,11 @@
     <p:sldId id="262" r:id="rId9"/>
     <p:sldId id="258" r:id="rId10"/>
     <p:sldId id="269" r:id="rId11"/>
-    <p:sldId id="257" r:id="rId12"/>
-    <p:sldId id="266" r:id="rId13"/>
-    <p:sldId id="267" r:id="rId14"/>
-    <p:sldId id="268" r:id="rId15"/>
+    <p:sldId id="270" r:id="rId12"/>
+    <p:sldId id="257" r:id="rId13"/>
+    <p:sldId id="266" r:id="rId14"/>
+    <p:sldId id="267" r:id="rId15"/>
+    <p:sldId id="268" r:id="rId16"/>
   </p:sldIdLst>
   <p:sldSz cx="12192000" cy="6858000"/>
   <p:notesSz cx="6858000" cy="9144000"/>
@@ -283,7 +284,7 @@
           <a:p>
             <a:fld id="{79DE2D3D-0B4E-4DD7-9670-155A46B4C7D3}" type="datetimeFigureOut">
               <a:rPr lang="en-US" smtClean="0"/>
-              <a:t>3/21/2018</a:t>
+              <a:t>4/3/2018</a:t>
             </a:fld>
             <a:endParaRPr lang="en-US"/>
           </a:p>
@@ -481,7 +482,7 @@
           <a:p>
             <a:fld id="{79DE2D3D-0B4E-4DD7-9670-155A46B4C7D3}" type="datetimeFigureOut">
               <a:rPr lang="en-US" smtClean="0"/>
-              <a:t>3/21/2018</a:t>
+              <a:t>4/3/2018</a:t>
             </a:fld>
             <a:endParaRPr lang="en-US"/>
           </a:p>
@@ -689,7 +690,7 @@
           <a:p>
             <a:fld id="{79DE2D3D-0B4E-4DD7-9670-155A46B4C7D3}" type="datetimeFigureOut">
               <a:rPr lang="en-US" smtClean="0"/>
-              <a:t>3/21/2018</a:t>
+              <a:t>4/3/2018</a:t>
             </a:fld>
             <a:endParaRPr lang="en-US"/>
           </a:p>
@@ -887,7 +888,7 @@
           <a:p>
             <a:fld id="{79DE2D3D-0B4E-4DD7-9670-155A46B4C7D3}" type="datetimeFigureOut">
               <a:rPr lang="en-US" smtClean="0"/>
-              <a:t>3/21/2018</a:t>
+              <a:t>4/3/2018</a:t>
             </a:fld>
             <a:endParaRPr lang="en-US"/>
           </a:p>
@@ -1162,7 +1163,7 @@
           <a:p>
             <a:fld id="{79DE2D3D-0B4E-4DD7-9670-155A46B4C7D3}" type="datetimeFigureOut">
               <a:rPr lang="en-US" smtClean="0"/>
-              <a:t>3/21/2018</a:t>
+              <a:t>4/3/2018</a:t>
             </a:fld>
             <a:endParaRPr lang="en-US"/>
           </a:p>
@@ -1427,7 +1428,7 @@
           <a:p>
             <a:fld id="{79DE2D3D-0B4E-4DD7-9670-155A46B4C7D3}" type="datetimeFigureOut">
               <a:rPr lang="en-US" smtClean="0"/>
-              <a:t>3/21/2018</a:t>
+              <a:t>4/3/2018</a:t>
             </a:fld>
             <a:endParaRPr lang="en-US"/>
           </a:p>
@@ -1839,7 +1840,7 @@
           <a:p>
             <a:fld id="{79DE2D3D-0B4E-4DD7-9670-155A46B4C7D3}" type="datetimeFigureOut">
               <a:rPr lang="en-US" smtClean="0"/>
-              <a:t>3/21/2018</a:t>
+              <a:t>4/3/2018</a:t>
             </a:fld>
             <a:endParaRPr lang="en-US"/>
           </a:p>
@@ -1980,7 +1981,7 @@
           <a:p>
             <a:fld id="{79DE2D3D-0B4E-4DD7-9670-155A46B4C7D3}" type="datetimeFigureOut">
               <a:rPr lang="en-US" smtClean="0"/>
-              <a:t>3/21/2018</a:t>
+              <a:t>4/3/2018</a:t>
             </a:fld>
             <a:endParaRPr lang="en-US"/>
           </a:p>
@@ -2093,7 +2094,7 @@
           <a:p>
             <a:fld id="{79DE2D3D-0B4E-4DD7-9670-155A46B4C7D3}" type="datetimeFigureOut">
               <a:rPr lang="en-US" smtClean="0"/>
-              <a:t>3/21/2018</a:t>
+              <a:t>4/3/2018</a:t>
             </a:fld>
             <a:endParaRPr lang="en-US"/>
           </a:p>
@@ -2404,7 +2405,7 @@
           <a:p>
             <a:fld id="{79DE2D3D-0B4E-4DD7-9670-155A46B4C7D3}" type="datetimeFigureOut">
               <a:rPr lang="en-US" smtClean="0"/>
-              <a:t>3/21/2018</a:t>
+              <a:t>4/3/2018</a:t>
             </a:fld>
             <a:endParaRPr lang="en-US"/>
           </a:p>
@@ -2692,7 +2693,7 @@
           <a:p>
             <a:fld id="{79DE2D3D-0B4E-4DD7-9670-155A46B4C7D3}" type="datetimeFigureOut">
               <a:rPr lang="en-US" smtClean="0"/>
-              <a:t>3/21/2018</a:t>
+              <a:t>4/3/2018</a:t>
             </a:fld>
             <a:endParaRPr lang="en-US"/>
           </a:p>
@@ -2933,7 +2934,7 @@
           <a:p>
             <a:fld id="{79DE2D3D-0B4E-4DD7-9670-155A46B4C7D3}" type="datetimeFigureOut">
               <a:rPr lang="en-US" smtClean="0"/>
-              <a:t>3/21/2018</a:t>
+              <a:t>4/3/2018</a:t>
             </a:fld>
             <a:endParaRPr lang="en-US"/>
           </a:p>
@@ -4287,6 +4288,721 @@
           <p:cNvPr id="2" name="Title 1">
             <a:extLst>
               <a:ext uri="{FF2B5EF4-FFF2-40B4-BE49-F238E27FC236}">
+                <a16:creationId xmlns:a16="http://schemas.microsoft.com/office/drawing/2014/main" id="{2435A16B-C73F-4378-AB6D-608131C0F4DA}"/>
+              </a:ext>
+            </a:extLst>
+          </p:cNvPr>
+          <p:cNvSpPr>
+            <a:spLocks noGrp="1"/>
+          </p:cNvSpPr>
+          <p:nvPr>
+            <p:ph type="title"/>
+          </p:nvPr>
+        </p:nvSpPr>
+        <p:spPr/>
+        <p:txBody>
+          <a:bodyPr/>
+          <a:lstStyle/>
+          <a:p>
+            <a:r>
+              <a:rPr lang="en-US" dirty="0"/>
+              <a:t>NOVA Mapping</a:t>
+            </a:r>
+          </a:p>
+        </p:txBody>
+      </p:sp>
+      <p:graphicFrame>
+        <p:nvGraphicFramePr>
+          <p:cNvPr id="4" name="Content Placeholder 3">
+            <a:extLst>
+              <a:ext uri="{FF2B5EF4-FFF2-40B4-BE49-F238E27FC236}">
+                <a16:creationId xmlns:a16="http://schemas.microsoft.com/office/drawing/2014/main" id="{14BDE94F-63BA-453E-9B65-76E3AD0850E8}"/>
+              </a:ext>
+            </a:extLst>
+          </p:cNvPr>
+          <p:cNvGraphicFramePr>
+            <a:graphicFrameLocks noGrp="1"/>
+          </p:cNvGraphicFramePr>
+          <p:nvPr>
+            <p:ph idx="1"/>
+            <p:extLst>
+              <p:ext uri="{D42A27DB-BD31-4B8C-83A1-F6EECF244321}">
+                <p14:modId xmlns:p14="http://schemas.microsoft.com/office/powerpoint/2010/main" val="802185583"/>
+              </p:ext>
+            </p:extLst>
+          </p:nvPr>
+        </p:nvGraphicFramePr>
+        <p:xfrm>
+          <a:off x="259306" y="1825625"/>
+          <a:ext cx="11600596" cy="4048760"/>
+        </p:xfrm>
+        <a:graphic>
+          <a:graphicData uri="http://schemas.openxmlformats.org/drawingml/2006/table">
+            <a:tbl>
+              <a:tblPr firstRow="1" bandRow="1">
+                <a:tableStyleId>{5C22544A-7EE6-4342-B048-85BDC9FD1C3A}</a:tableStyleId>
+              </a:tblPr>
+              <a:tblGrid>
+                <a:gridCol w="2900149">
+                  <a:extLst>
+                    <a:ext uri="{9D8B030D-6E8A-4147-A177-3AD203B41FA5}">
+                      <a16:colId xmlns:a16="http://schemas.microsoft.com/office/drawing/2014/main" val="1377422795"/>
+                    </a:ext>
+                  </a:extLst>
+                </a:gridCol>
+                <a:gridCol w="2531661">
+                  <a:extLst>
+                    <a:ext uri="{9D8B030D-6E8A-4147-A177-3AD203B41FA5}">
+                      <a16:colId xmlns:a16="http://schemas.microsoft.com/office/drawing/2014/main" val="1598590039"/>
+                    </a:ext>
+                  </a:extLst>
+                </a:gridCol>
+                <a:gridCol w="2101756">
+                  <a:extLst>
+                    <a:ext uri="{9D8B030D-6E8A-4147-A177-3AD203B41FA5}">
+                      <a16:colId xmlns:a16="http://schemas.microsoft.com/office/drawing/2014/main" val="3896506482"/>
+                    </a:ext>
+                  </a:extLst>
+                </a:gridCol>
+                <a:gridCol w="4067030">
+                  <a:extLst>
+                    <a:ext uri="{9D8B030D-6E8A-4147-A177-3AD203B41FA5}">
+                      <a16:colId xmlns:a16="http://schemas.microsoft.com/office/drawing/2014/main" val="3170647213"/>
+                    </a:ext>
+                  </a:extLst>
+                </a:gridCol>
+              </a:tblGrid>
+              <a:tr h="370840">
+                <a:tc>
+                  <a:txBody>
+                    <a:bodyPr/>
+                    <a:lstStyle/>
+                    <a:p>
+                      <a:r>
+                        <a:rPr lang="en-US" dirty="0"/>
+                        <a:t>IRE Function</a:t>
+                      </a:r>
+                    </a:p>
+                  </a:txBody>
+                  <a:tcPr/>
+                </a:tc>
+                <a:tc>
+                  <a:txBody>
+                    <a:bodyPr/>
+                    <a:lstStyle/>
+                    <a:p>
+                      <a:r>
+                        <a:rPr lang="en-US" dirty="0"/>
+                        <a:t>NOVA Class</a:t>
+                      </a:r>
+                    </a:p>
+                  </a:txBody>
+                  <a:tcPr/>
+                </a:tc>
+                <a:tc>
+                  <a:txBody>
+                    <a:bodyPr/>
+                    <a:lstStyle/>
+                    <a:p>
+                      <a:r>
+                        <a:rPr lang="en-US" dirty="0"/>
+                        <a:t>NOVA Function</a:t>
+                      </a:r>
+                    </a:p>
+                  </a:txBody>
+                  <a:tcPr/>
+                </a:tc>
+                <a:tc>
+                  <a:txBody>
+                    <a:bodyPr/>
+                    <a:lstStyle/>
+                    <a:p>
+                      <a:r>
+                        <a:rPr lang="en-US" dirty="0"/>
+                        <a:t>Notes</a:t>
+                      </a:r>
+                    </a:p>
+                  </a:txBody>
+                  <a:tcPr/>
+                </a:tc>
+                <a:extLst>
+                  <a:ext uri="{0D108BD9-81ED-4DB2-BD59-A6C34878D82A}">
+                    <a16:rowId xmlns:a16="http://schemas.microsoft.com/office/drawing/2014/main" val="3387341382"/>
+                  </a:ext>
+                </a:extLst>
+              </a:tr>
+              <a:tr h="370840">
+                <a:tc>
+                  <a:txBody>
+                    <a:bodyPr/>
+                    <a:lstStyle/>
+                    <a:p>
+                      <a:r>
+                        <a:rPr lang="en-US" dirty="0"/>
+                        <a:t>Initialize</a:t>
+                      </a:r>
+                    </a:p>
+                  </a:txBody>
+                  <a:tcPr/>
+                </a:tc>
+                <a:tc>
+                  <a:txBody>
+                    <a:bodyPr/>
+                    <a:lstStyle/>
+                    <a:p>
+                      <a:r>
+                        <a:rPr lang="en-US" dirty="0"/>
+                        <a:t>NovaAIModule.cpp</a:t>
+                      </a:r>
+                    </a:p>
+                  </a:txBody>
+                  <a:tcPr/>
+                </a:tc>
+                <a:tc>
+                  <a:txBody>
+                    <a:bodyPr/>
+                    <a:lstStyle/>
+                    <a:p>
+                      <a:r>
+                        <a:rPr lang="en-US" dirty="0" err="1"/>
+                        <a:t>onStart</a:t>
+                      </a:r>
+                      <a:r>
+                        <a:rPr lang="en-US" dirty="0"/>
+                        <a:t> (31)</a:t>
+                      </a:r>
+                    </a:p>
+                  </a:txBody>
+                  <a:tcPr/>
+                </a:tc>
+                <a:tc>
+                  <a:txBody>
+                    <a:bodyPr/>
+                    <a:lstStyle/>
+                    <a:p>
+                      <a:endParaRPr lang="en-US" dirty="0"/>
+                    </a:p>
+                  </a:txBody>
+                  <a:tcPr/>
+                </a:tc>
+                <a:extLst>
+                  <a:ext uri="{0D108BD9-81ED-4DB2-BD59-A6C34878D82A}">
+                    <a16:rowId xmlns:a16="http://schemas.microsoft.com/office/drawing/2014/main" val="855420630"/>
+                  </a:ext>
+                </a:extLst>
+              </a:tr>
+              <a:tr h="370840">
+                <a:tc>
+                  <a:txBody>
+                    <a:bodyPr/>
+                    <a:lstStyle/>
+                    <a:p>
+                      <a:r>
+                        <a:rPr lang="en-US" dirty="0"/>
+                        <a:t>Process observed enemy unit</a:t>
+                      </a:r>
+                    </a:p>
+                  </a:txBody>
+                  <a:tcPr/>
+                </a:tc>
+                <a:tc>
+                  <a:txBody>
+                    <a:bodyPr/>
+                    <a:lstStyle/>
+                    <a:p>
+                      <a:r>
+                        <a:rPr lang="en-US" dirty="0"/>
+                        <a:t>NovaAIModule.cpp</a:t>
+                      </a:r>
+                    </a:p>
+                    <a:p>
+                      <a:r>
+                        <a:rPr lang="en-US" dirty="0"/>
+                        <a:t>SquadManager.cpp</a:t>
+                      </a:r>
+                    </a:p>
+                  </a:txBody>
+                  <a:tcPr/>
+                </a:tc>
+                <a:tc>
+                  <a:txBody>
+                    <a:bodyPr/>
+                    <a:lstStyle/>
+                    <a:p>
+                      <a:r>
+                        <a:rPr lang="en-US" dirty="0" err="1"/>
+                        <a:t>onUnitShow</a:t>
+                      </a:r>
+                      <a:r>
+                        <a:rPr lang="en-US" dirty="0"/>
+                        <a:t> (533)</a:t>
+                      </a:r>
+                    </a:p>
+                    <a:p>
+                      <a:r>
+                        <a:rPr lang="en-US" dirty="0" err="1"/>
+                        <a:t>newEnemy</a:t>
+                      </a:r>
+                      <a:r>
+                        <a:rPr lang="en-US" dirty="0"/>
+                        <a:t> (639)</a:t>
+                      </a:r>
+                    </a:p>
+                  </a:txBody>
+                  <a:tcPr/>
+                </a:tc>
+                <a:tc>
+                  <a:txBody>
+                    <a:bodyPr/>
+                    <a:lstStyle/>
+                    <a:p>
+                      <a:endParaRPr lang="en-US" dirty="0"/>
+                    </a:p>
+                  </a:txBody>
+                  <a:tcPr/>
+                </a:tc>
+                <a:extLst>
+                  <a:ext uri="{0D108BD9-81ED-4DB2-BD59-A6C34878D82A}">
+                    <a16:rowId xmlns:a16="http://schemas.microsoft.com/office/drawing/2014/main" val="3188031076"/>
+                  </a:ext>
+                </a:extLst>
+              </a:tr>
+              <a:tr h="370840">
+                <a:tc>
+                  <a:txBody>
+                    <a:bodyPr/>
+                    <a:lstStyle/>
+                    <a:p>
+                      <a:r>
+                        <a:rPr lang="en-US" dirty="0"/>
+                        <a:t>Process observed enemy building</a:t>
+                      </a:r>
+                    </a:p>
+                  </a:txBody>
+                  <a:tcPr/>
+                </a:tc>
+                <a:tc>
+                  <a:txBody>
+                    <a:bodyPr/>
+                    <a:lstStyle/>
+                    <a:p>
+                      <a:r>
+                        <a:rPr lang="en-US" dirty="0"/>
+                        <a:t>?</a:t>
+                      </a:r>
+                    </a:p>
+                  </a:txBody>
+                  <a:tcPr/>
+                </a:tc>
+                <a:tc>
+                  <a:txBody>
+                    <a:bodyPr/>
+                    <a:lstStyle/>
+                    <a:p>
+                      <a:r>
+                        <a:rPr lang="en-US" dirty="0"/>
+                        <a:t>?</a:t>
+                      </a:r>
+                    </a:p>
+                  </a:txBody>
+                  <a:tcPr/>
+                </a:tc>
+                <a:tc>
+                  <a:txBody>
+                    <a:bodyPr/>
+                    <a:lstStyle/>
+                    <a:p>
+                      <a:r>
+                        <a:rPr lang="en-US" dirty="0"/>
+                        <a:t>Is </a:t>
+                      </a:r>
+                      <a:r>
+                        <a:rPr lang="en-US" dirty="0" err="1"/>
+                        <a:t>enemySeen</a:t>
+                      </a:r>
+                      <a:r>
+                        <a:rPr lang="en-US" dirty="0"/>
+                        <a:t> both buildings and units?</a:t>
+                      </a:r>
+                    </a:p>
+                  </a:txBody>
+                  <a:tcPr/>
+                </a:tc>
+                <a:extLst>
+                  <a:ext uri="{0D108BD9-81ED-4DB2-BD59-A6C34878D82A}">
+                    <a16:rowId xmlns:a16="http://schemas.microsoft.com/office/drawing/2014/main" val="1240135095"/>
+                  </a:ext>
+                </a:extLst>
+              </a:tr>
+              <a:tr h="370840">
+                <a:tc>
+                  <a:txBody>
+                    <a:bodyPr/>
+                    <a:lstStyle/>
+                    <a:p>
+                      <a:r>
+                        <a:rPr lang="en-US" dirty="0"/>
+                        <a:t>Load strategies</a:t>
+                      </a:r>
+                    </a:p>
+                  </a:txBody>
+                  <a:tcPr/>
+                </a:tc>
+                <a:tc>
+                  <a:txBody>
+                    <a:bodyPr/>
+                    <a:lstStyle/>
+                    <a:p>
+                      <a:r>
+                        <a:rPr lang="en-US" dirty="0"/>
+                        <a:t>StrategyManager.cpp</a:t>
+                      </a:r>
+                    </a:p>
+                  </a:txBody>
+                  <a:tcPr/>
+                </a:tc>
+                <a:tc>
+                  <a:txBody>
+                    <a:bodyPr/>
+                    <a:lstStyle/>
+                    <a:p>
+                      <a:r>
+                        <a:rPr lang="en-US" dirty="0"/>
+                        <a:t>Constructor (84)</a:t>
+                      </a:r>
+                    </a:p>
+                  </a:txBody>
+                  <a:tcPr/>
+                </a:tc>
+                <a:tc>
+                  <a:txBody>
+                    <a:bodyPr/>
+                    <a:lstStyle/>
+                    <a:p>
+                      <a:endParaRPr lang="en-US" dirty="0"/>
+                    </a:p>
+                  </a:txBody>
+                  <a:tcPr/>
+                </a:tc>
+                <a:extLst>
+                  <a:ext uri="{0D108BD9-81ED-4DB2-BD59-A6C34878D82A}">
+                    <a16:rowId xmlns:a16="http://schemas.microsoft.com/office/drawing/2014/main" val="1651246168"/>
+                  </a:ext>
+                </a:extLst>
+              </a:tr>
+              <a:tr h="370840">
+                <a:tc>
+                  <a:txBody>
+                    <a:bodyPr/>
+                    <a:lstStyle/>
+                    <a:p>
+                      <a:r>
+                        <a:rPr lang="en-US" dirty="0"/>
+                        <a:t>Identify Strategy</a:t>
+                      </a:r>
+                    </a:p>
+                  </a:txBody>
+                  <a:tcPr/>
+                </a:tc>
+                <a:tc>
+                  <a:txBody>
+                    <a:bodyPr/>
+                    <a:lstStyle/>
+                    <a:p>
+                      <a:r>
+                        <a:rPr lang="en-US" dirty="0"/>
+                        <a:t>StrategyManager.cpp</a:t>
+                      </a:r>
+                    </a:p>
+                  </a:txBody>
+                  <a:tcPr/>
+                </a:tc>
+                <a:tc>
+                  <a:txBody>
+                    <a:bodyPr/>
+                    <a:lstStyle/>
+                    <a:p>
+                      <a:r>
+                        <a:rPr lang="en-US" dirty="0" err="1"/>
+                        <a:t>onFrame</a:t>
+                      </a:r>
+                      <a:r>
+                        <a:rPr lang="en-US" dirty="0"/>
+                        <a:t> (239)</a:t>
+                      </a:r>
+                    </a:p>
+                  </a:txBody>
+                  <a:tcPr/>
+                </a:tc>
+                <a:tc>
+                  <a:txBody>
+                    <a:bodyPr/>
+                    <a:lstStyle/>
+                    <a:p>
+                      <a:endParaRPr lang="en-US" dirty="0"/>
+                    </a:p>
+                  </a:txBody>
+                  <a:tcPr/>
+                </a:tc>
+                <a:extLst>
+                  <a:ext uri="{0D108BD9-81ED-4DB2-BD59-A6C34878D82A}">
+                    <a16:rowId xmlns:a16="http://schemas.microsoft.com/office/drawing/2014/main" val="3320754550"/>
+                  </a:ext>
+                </a:extLst>
+              </a:tr>
+              <a:tr h="370840">
+                <a:tc>
+                  <a:txBody>
+                    <a:bodyPr/>
+                    <a:lstStyle/>
+                    <a:p>
+                      <a:r>
+                        <a:rPr lang="en-US" dirty="0"/>
+                        <a:t>Recommend Results</a:t>
+                      </a:r>
+                    </a:p>
+                  </a:txBody>
+                  <a:tcPr/>
+                </a:tc>
+                <a:tc>
+                  <a:txBody>
+                    <a:bodyPr/>
+                    <a:lstStyle/>
+                    <a:p>
+                      <a:pPr marL="0" marR="0" lvl="0" indent="0" algn="l" defTabSz="914400" rtl="0" eaLnBrk="1" fontAlgn="auto" latinLnBrk="0" hangingPunct="1">
+                        <a:lnSpc>
+                          <a:spcPct val="100000"/>
+                        </a:lnSpc>
+                        <a:spcBef>
+                          <a:spcPts val="0"/>
+                        </a:spcBef>
+                        <a:spcAft>
+                          <a:spcPts val="0"/>
+                        </a:spcAft>
+                        <a:buClrTx/>
+                        <a:buSzTx/>
+                        <a:buFontTx/>
+                        <a:buNone/>
+                        <a:tabLst/>
+                        <a:defRPr/>
+                      </a:pPr>
+                      <a:r>
+                        <a:rPr lang="en-US" dirty="0"/>
+                        <a:t>StrategyManager.cpp</a:t>
+                      </a:r>
+                    </a:p>
+                  </a:txBody>
+                  <a:tcPr/>
+                </a:tc>
+                <a:tc>
+                  <a:txBody>
+                    <a:bodyPr/>
+                    <a:lstStyle/>
+                    <a:p>
+                      <a:r>
+                        <a:rPr lang="en-US" dirty="0" err="1"/>
+                        <a:t>onFrame</a:t>
+                      </a:r>
+                      <a:r>
+                        <a:rPr lang="en-US" dirty="0"/>
+                        <a:t> (240)</a:t>
+                      </a:r>
+                    </a:p>
+                  </a:txBody>
+                  <a:tcPr/>
+                </a:tc>
+                <a:tc>
+                  <a:txBody>
+                    <a:bodyPr/>
+                    <a:lstStyle/>
+                    <a:p>
+                      <a:endParaRPr lang="en-US" dirty="0"/>
+                    </a:p>
+                  </a:txBody>
+                  <a:tcPr/>
+                </a:tc>
+                <a:extLst>
+                  <a:ext uri="{0D108BD9-81ED-4DB2-BD59-A6C34878D82A}">
+                    <a16:rowId xmlns:a16="http://schemas.microsoft.com/office/drawing/2014/main" val="701464579"/>
+                  </a:ext>
+                </a:extLst>
+              </a:tr>
+              <a:tr h="370840">
+                <a:tc>
+                  <a:txBody>
+                    <a:bodyPr/>
+                    <a:lstStyle/>
+                    <a:p>
+                      <a:r>
+                        <a:rPr lang="en-US" dirty="0"/>
+                        <a:t>Produce Units</a:t>
+                      </a:r>
+                    </a:p>
+                  </a:txBody>
+                  <a:tcPr/>
+                </a:tc>
+                <a:tc>
+                  <a:txBody>
+                    <a:bodyPr/>
+                    <a:lstStyle/>
+                    <a:p>
+                      <a:pPr marL="0" marR="0" lvl="0" indent="0" algn="l" defTabSz="914400" rtl="0" eaLnBrk="1" fontAlgn="auto" latinLnBrk="0" hangingPunct="1">
+                        <a:lnSpc>
+                          <a:spcPct val="100000"/>
+                        </a:lnSpc>
+                        <a:spcBef>
+                          <a:spcPts val="0"/>
+                        </a:spcBef>
+                        <a:spcAft>
+                          <a:spcPts val="0"/>
+                        </a:spcAft>
+                        <a:buClrTx/>
+                        <a:buSzTx/>
+                        <a:buFontTx/>
+                        <a:buNone/>
+                        <a:tabLst/>
+                        <a:defRPr/>
+                      </a:pPr>
+                      <a:r>
+                        <a:rPr lang="en-US" dirty="0"/>
+                        <a:t>StrategyManager.cpp</a:t>
+                      </a:r>
+                    </a:p>
+                  </a:txBody>
+                  <a:tcPr/>
+                </a:tc>
+                <a:tc>
+                  <a:txBody>
+                    <a:bodyPr/>
+                    <a:lstStyle/>
+                    <a:p>
+                      <a:r>
+                        <a:rPr lang="en-US" dirty="0" err="1"/>
+                        <a:t>onFrame</a:t>
+                      </a:r>
+                      <a:endParaRPr lang="en-US" dirty="0"/>
+                    </a:p>
+                  </a:txBody>
+                  <a:tcPr/>
+                </a:tc>
+                <a:tc>
+                  <a:txBody>
+                    <a:bodyPr/>
+                    <a:lstStyle/>
+                    <a:p>
+                      <a:r>
+                        <a:rPr lang="en-US" dirty="0" err="1"/>
+                        <a:t>informationManager</a:t>
+                      </a:r>
+                      <a:r>
+                        <a:rPr lang="en-US" dirty="0"/>
+                        <a:t>-&gt;_</a:t>
+                      </a:r>
+                      <a:r>
+                        <a:rPr lang="en-US" dirty="0" err="1"/>
+                        <a:t>percentList</a:t>
+                      </a:r>
+                      <a:endParaRPr lang="en-US" dirty="0"/>
+                    </a:p>
+                    <a:p>
+                      <a:r>
+                        <a:rPr lang="en-US" dirty="0" err="1"/>
+                        <a:t>informationManager</a:t>
+                      </a:r>
+                      <a:r>
+                        <a:rPr lang="en-US" dirty="0"/>
+                        <a:t>-&gt;_</a:t>
+                      </a:r>
+                      <a:r>
+                        <a:rPr lang="en-US" dirty="0" err="1"/>
+                        <a:t>turretList</a:t>
+                      </a:r>
+                      <a:endParaRPr lang="en-US" dirty="0"/>
+                    </a:p>
+                    <a:p>
+                      <a:r>
+                        <a:rPr lang="en-US" sz="1800" kern="1200" dirty="0" err="1">
+                          <a:solidFill>
+                            <a:schemeClr val="dk1"/>
+                          </a:solidFill>
+                          <a:latin typeface="+mn-lt"/>
+                          <a:ea typeface="+mn-ea"/>
+                          <a:cs typeface="+mn-cs"/>
+                        </a:rPr>
+                        <a:t>informationManager</a:t>
+                      </a:r>
+                      <a:r>
+                        <a:rPr lang="en-US" sz="1800" kern="1200" dirty="0">
+                          <a:solidFill>
+                            <a:schemeClr val="dk1"/>
+                          </a:solidFill>
+                          <a:latin typeface="+mn-lt"/>
+                          <a:ea typeface="+mn-ea"/>
+                          <a:cs typeface="+mn-cs"/>
+                        </a:rPr>
+                        <a:t>-&gt;</a:t>
+                      </a:r>
+                      <a:r>
+                        <a:rPr lang="en-US" sz="1800" kern="1200" dirty="0" err="1">
+                          <a:solidFill>
+                            <a:schemeClr val="dk1"/>
+                          </a:solidFill>
+                          <a:latin typeface="+mn-lt"/>
+                          <a:ea typeface="+mn-ea"/>
+                          <a:cs typeface="+mn-cs"/>
+                        </a:rPr>
+                        <a:t>buildRequest</a:t>
+                      </a:r>
+                      <a:endParaRPr lang="en-US" dirty="0"/>
+                    </a:p>
+                  </a:txBody>
+                  <a:tcPr/>
+                </a:tc>
+                <a:extLst>
+                  <a:ext uri="{0D108BD9-81ED-4DB2-BD59-A6C34878D82A}">
+                    <a16:rowId xmlns:a16="http://schemas.microsoft.com/office/drawing/2014/main" val="904193852"/>
+                  </a:ext>
+                </a:extLst>
+              </a:tr>
+            </a:tbl>
+          </a:graphicData>
+        </a:graphic>
+      </p:graphicFrame>
+    </p:spTree>
+    <p:extLst>
+      <p:ext uri="{BB962C8B-B14F-4D97-AF65-F5344CB8AC3E}">
+        <p14:creationId xmlns:p14="http://schemas.microsoft.com/office/powerpoint/2010/main" val="2071122263"/>
+      </p:ext>
+    </p:extLst>
+  </p:cSld>
+  <p:clrMapOvr>
+    <a:masterClrMapping/>
+  </p:clrMapOvr>
+</p:sld>
+</file>
+
+<file path=ppt/slides/slide12.xml><?xml version="1.0" encoding="utf-8"?>
+<p:sld xmlns:a="http://schemas.openxmlformats.org/drawingml/2006/main" xmlns:r="http://schemas.openxmlformats.org/officeDocument/2006/relationships" xmlns:p="http://schemas.openxmlformats.org/presentationml/2006/main">
+  <p:cSld>
+    <p:spTree>
+      <p:nvGrpSpPr>
+        <p:cNvPr id="1" name=""/>
+        <p:cNvGrpSpPr/>
+        <p:nvPr/>
+      </p:nvGrpSpPr>
+      <p:grpSpPr>
+        <a:xfrm>
+          <a:off x="0" y="0"/>
+          <a:ext cx="0" cy="0"/>
+          <a:chOff x="0" y="0"/>
+          <a:chExt cx="0" cy="0"/>
+        </a:xfrm>
+      </p:grpSpPr>
+      <p:sp>
+        <p:nvSpPr>
+          <p:cNvPr id="2" name="Title 1">
+            <a:extLst>
+              <a:ext uri="{FF2B5EF4-FFF2-40B4-BE49-F238E27FC236}">
                 <a16:creationId xmlns:a16="http://schemas.microsoft.com/office/drawing/2014/main" id="{88BB61F1-4D04-4BA3-880A-182E63063E3F}"/>
               </a:ext>
             </a:extLst>
@@ -5918,7 +6634,7 @@
 </p:sld>
 </file>
 
-<file path=ppt/slides/slide12.xml><?xml version="1.0" encoding="utf-8"?>
+<file path=ppt/slides/slide13.xml><?xml version="1.0" encoding="utf-8"?>
 <p:sld xmlns:a="http://schemas.openxmlformats.org/drawingml/2006/main" xmlns:r="http://schemas.openxmlformats.org/officeDocument/2006/relationships" xmlns:p="http://schemas.openxmlformats.org/presentationml/2006/main">
   <p:cSld>
     <p:spTree>
@@ -6461,7 +7177,7 @@
 </p:sld>
 </file>
 
-<file path=ppt/slides/slide13.xml><?xml version="1.0" encoding="utf-8"?>
+<file path=ppt/slides/slide14.xml><?xml version="1.0" encoding="utf-8"?>
 <p:sld xmlns:a="http://schemas.openxmlformats.org/drawingml/2006/main" xmlns:r="http://schemas.openxmlformats.org/officeDocument/2006/relationships" xmlns:p="http://schemas.openxmlformats.org/presentationml/2006/main">
   <p:cSld>
     <p:spTree>
@@ -7087,7 +7803,7 @@
 </p:sld>
 </file>
 
-<file path=ppt/slides/slide14.xml><?xml version="1.0" encoding="utf-8"?>
+<file path=ppt/slides/slide15.xml><?xml version="1.0" encoding="utf-8"?>
 <p:sld xmlns:a="http://schemas.openxmlformats.org/drawingml/2006/main" xmlns:r="http://schemas.openxmlformats.org/officeDocument/2006/relationships" xmlns:p="http://schemas.openxmlformats.org/presentationml/2006/main">
   <p:cSld>
     <p:spTree>

</xml_diff>

<commit_message>
Updates to thesis draft
</commit_message>
<xml_diff>
--- a/Documentation/Architecture.pptx
+++ b/Documentation/Architecture.pptx
@@ -120,7 +120,7 @@
   </p:defaultTextStyle>
   <p:extLst>
     <p:ext uri="{EFAFB233-063F-42B5-8137-9DF3F51BA10A}">
-      <p15:sldGuideLst xmlns:p15="http://schemas.microsoft.com/office/powerpoint/2012/main">
+      <p15:sldGuideLst xmlns="" xmlns:p15="http://schemas.microsoft.com/office/powerpoint/2012/main">
         <p15:guide id="1" orient="horz" pos="2160">
           <p15:clr>
             <a:srgbClr val="A4A3A4"/>
@@ -159,7 +159,7 @@
           <p:cNvPr id="2" name="Title 1">
             <a:extLst>
               <a:ext uri="{FF2B5EF4-FFF2-40B4-BE49-F238E27FC236}">
-                <a16:creationId xmlns:a16="http://schemas.microsoft.com/office/drawing/2014/main" id="{0208DEFD-B3C0-4D12-817A-672980A0AB83}"/>
+                <a16:creationId xmlns="" xmlns:a16="http://schemas.microsoft.com/office/drawing/2014/main" id="{0208DEFD-B3C0-4D12-817A-672980A0AB83}"/>
               </a:ext>
             </a:extLst>
           </p:cNvPr>
@@ -196,7 +196,7 @@
           <p:cNvPr id="3" name="Subtitle 2">
             <a:extLst>
               <a:ext uri="{FF2B5EF4-FFF2-40B4-BE49-F238E27FC236}">
-                <a16:creationId xmlns:a16="http://schemas.microsoft.com/office/drawing/2014/main" id="{52F30D22-503B-48B4-86CB-F2B0287B54CC}"/>
+                <a16:creationId xmlns="" xmlns:a16="http://schemas.microsoft.com/office/drawing/2014/main" id="{52F30D22-503B-48B4-86CB-F2B0287B54CC}"/>
               </a:ext>
             </a:extLst>
           </p:cNvPr>
@@ -266,7 +266,7 @@
           <p:cNvPr id="4" name="Date Placeholder 3">
             <a:extLst>
               <a:ext uri="{FF2B5EF4-FFF2-40B4-BE49-F238E27FC236}">
-                <a16:creationId xmlns:a16="http://schemas.microsoft.com/office/drawing/2014/main" id="{E8D6C7CF-C878-4063-8520-28BAE75AD582}"/>
+                <a16:creationId xmlns="" xmlns:a16="http://schemas.microsoft.com/office/drawing/2014/main" id="{E8D6C7CF-C878-4063-8520-28BAE75AD582}"/>
               </a:ext>
             </a:extLst>
           </p:cNvPr>
@@ -284,7 +284,7 @@
           <a:p>
             <a:fld id="{79DE2D3D-0B4E-4DD7-9670-155A46B4C7D3}" type="datetimeFigureOut">
               <a:rPr lang="en-US" smtClean="0"/>
-              <a:t>4/3/2018</a:t>
+              <a:t>4/4/2018</a:t>
             </a:fld>
             <a:endParaRPr lang="en-US"/>
           </a:p>
@@ -295,7 +295,7 @@
           <p:cNvPr id="5" name="Footer Placeholder 4">
             <a:extLst>
               <a:ext uri="{FF2B5EF4-FFF2-40B4-BE49-F238E27FC236}">
-                <a16:creationId xmlns:a16="http://schemas.microsoft.com/office/drawing/2014/main" id="{3405CBA8-3946-4106-B7BE-1A9C679D70B1}"/>
+                <a16:creationId xmlns="" xmlns:a16="http://schemas.microsoft.com/office/drawing/2014/main" id="{3405CBA8-3946-4106-B7BE-1A9C679D70B1}"/>
               </a:ext>
             </a:extLst>
           </p:cNvPr>
@@ -320,7 +320,7 @@
           <p:cNvPr id="6" name="Slide Number Placeholder 5">
             <a:extLst>
               <a:ext uri="{FF2B5EF4-FFF2-40B4-BE49-F238E27FC236}">
-                <a16:creationId xmlns:a16="http://schemas.microsoft.com/office/drawing/2014/main" id="{EA452CDD-AB4C-46BE-AF96-A4F89F5341BB}"/>
+                <a16:creationId xmlns="" xmlns:a16="http://schemas.microsoft.com/office/drawing/2014/main" id="{EA452CDD-AB4C-46BE-AF96-A4F89F5341BB}"/>
               </a:ext>
             </a:extLst>
           </p:cNvPr>
@@ -379,7 +379,7 @@
           <p:cNvPr id="2" name="Title 1">
             <a:extLst>
               <a:ext uri="{FF2B5EF4-FFF2-40B4-BE49-F238E27FC236}">
-                <a16:creationId xmlns:a16="http://schemas.microsoft.com/office/drawing/2014/main" id="{0820BE71-470D-4418-8BBA-56BC87E53E0D}"/>
+                <a16:creationId xmlns="" xmlns:a16="http://schemas.microsoft.com/office/drawing/2014/main" id="{0820BE71-470D-4418-8BBA-56BC87E53E0D}"/>
               </a:ext>
             </a:extLst>
           </p:cNvPr>
@@ -407,7 +407,7 @@
           <p:cNvPr id="3" name="Vertical Text Placeholder 2">
             <a:extLst>
               <a:ext uri="{FF2B5EF4-FFF2-40B4-BE49-F238E27FC236}">
-                <a16:creationId xmlns:a16="http://schemas.microsoft.com/office/drawing/2014/main" id="{1CD458A7-5C48-48B1-8674-1E3B59FF0DBF}"/>
+                <a16:creationId xmlns="" xmlns:a16="http://schemas.microsoft.com/office/drawing/2014/main" id="{1CD458A7-5C48-48B1-8674-1E3B59FF0DBF}"/>
               </a:ext>
             </a:extLst>
           </p:cNvPr>
@@ -464,7 +464,7 @@
           <p:cNvPr id="4" name="Date Placeholder 3">
             <a:extLst>
               <a:ext uri="{FF2B5EF4-FFF2-40B4-BE49-F238E27FC236}">
-                <a16:creationId xmlns:a16="http://schemas.microsoft.com/office/drawing/2014/main" id="{71FF30CF-2DC0-4356-ACC2-DC5857B93045}"/>
+                <a16:creationId xmlns="" xmlns:a16="http://schemas.microsoft.com/office/drawing/2014/main" id="{71FF30CF-2DC0-4356-ACC2-DC5857B93045}"/>
               </a:ext>
             </a:extLst>
           </p:cNvPr>
@@ -482,7 +482,7 @@
           <a:p>
             <a:fld id="{79DE2D3D-0B4E-4DD7-9670-155A46B4C7D3}" type="datetimeFigureOut">
               <a:rPr lang="en-US" smtClean="0"/>
-              <a:t>4/3/2018</a:t>
+              <a:t>4/4/2018</a:t>
             </a:fld>
             <a:endParaRPr lang="en-US"/>
           </a:p>
@@ -493,7 +493,7 @@
           <p:cNvPr id="5" name="Footer Placeholder 4">
             <a:extLst>
               <a:ext uri="{FF2B5EF4-FFF2-40B4-BE49-F238E27FC236}">
-                <a16:creationId xmlns:a16="http://schemas.microsoft.com/office/drawing/2014/main" id="{C64F5D84-1880-4D66-9409-B05042B38277}"/>
+                <a16:creationId xmlns="" xmlns:a16="http://schemas.microsoft.com/office/drawing/2014/main" id="{C64F5D84-1880-4D66-9409-B05042B38277}"/>
               </a:ext>
             </a:extLst>
           </p:cNvPr>
@@ -518,7 +518,7 @@
           <p:cNvPr id="6" name="Slide Number Placeholder 5">
             <a:extLst>
               <a:ext uri="{FF2B5EF4-FFF2-40B4-BE49-F238E27FC236}">
-                <a16:creationId xmlns:a16="http://schemas.microsoft.com/office/drawing/2014/main" id="{6AEA3C71-42CA-4318-8246-5C298A025615}"/>
+                <a16:creationId xmlns="" xmlns:a16="http://schemas.microsoft.com/office/drawing/2014/main" id="{6AEA3C71-42CA-4318-8246-5C298A025615}"/>
               </a:ext>
             </a:extLst>
           </p:cNvPr>
@@ -577,7 +577,7 @@
           <p:cNvPr id="2" name="Vertical Title 1">
             <a:extLst>
               <a:ext uri="{FF2B5EF4-FFF2-40B4-BE49-F238E27FC236}">
-                <a16:creationId xmlns:a16="http://schemas.microsoft.com/office/drawing/2014/main" id="{4FC911C0-596F-406E-89F9-D86536F980CB}"/>
+                <a16:creationId xmlns="" xmlns:a16="http://schemas.microsoft.com/office/drawing/2014/main" id="{4FC911C0-596F-406E-89F9-D86536F980CB}"/>
               </a:ext>
             </a:extLst>
           </p:cNvPr>
@@ -610,7 +610,7 @@
           <p:cNvPr id="3" name="Vertical Text Placeholder 2">
             <a:extLst>
               <a:ext uri="{FF2B5EF4-FFF2-40B4-BE49-F238E27FC236}">
-                <a16:creationId xmlns:a16="http://schemas.microsoft.com/office/drawing/2014/main" id="{D3F5427C-63BC-48E8-9131-FE9C4D5F3036}"/>
+                <a16:creationId xmlns="" xmlns:a16="http://schemas.microsoft.com/office/drawing/2014/main" id="{D3F5427C-63BC-48E8-9131-FE9C4D5F3036}"/>
               </a:ext>
             </a:extLst>
           </p:cNvPr>
@@ -672,7 +672,7 @@
           <p:cNvPr id="4" name="Date Placeholder 3">
             <a:extLst>
               <a:ext uri="{FF2B5EF4-FFF2-40B4-BE49-F238E27FC236}">
-                <a16:creationId xmlns:a16="http://schemas.microsoft.com/office/drawing/2014/main" id="{35036C6B-FB42-4DE3-9515-2C21F01A41B2}"/>
+                <a16:creationId xmlns="" xmlns:a16="http://schemas.microsoft.com/office/drawing/2014/main" id="{35036C6B-FB42-4DE3-9515-2C21F01A41B2}"/>
               </a:ext>
             </a:extLst>
           </p:cNvPr>
@@ -690,7 +690,7 @@
           <a:p>
             <a:fld id="{79DE2D3D-0B4E-4DD7-9670-155A46B4C7D3}" type="datetimeFigureOut">
               <a:rPr lang="en-US" smtClean="0"/>
-              <a:t>4/3/2018</a:t>
+              <a:t>4/4/2018</a:t>
             </a:fld>
             <a:endParaRPr lang="en-US"/>
           </a:p>
@@ -701,7 +701,7 @@
           <p:cNvPr id="5" name="Footer Placeholder 4">
             <a:extLst>
               <a:ext uri="{FF2B5EF4-FFF2-40B4-BE49-F238E27FC236}">
-                <a16:creationId xmlns:a16="http://schemas.microsoft.com/office/drawing/2014/main" id="{EE5F9010-B58A-4E05-80CB-8465A102D5D3}"/>
+                <a16:creationId xmlns="" xmlns:a16="http://schemas.microsoft.com/office/drawing/2014/main" id="{EE5F9010-B58A-4E05-80CB-8465A102D5D3}"/>
               </a:ext>
             </a:extLst>
           </p:cNvPr>
@@ -726,7 +726,7 @@
           <p:cNvPr id="6" name="Slide Number Placeholder 5">
             <a:extLst>
               <a:ext uri="{FF2B5EF4-FFF2-40B4-BE49-F238E27FC236}">
-                <a16:creationId xmlns:a16="http://schemas.microsoft.com/office/drawing/2014/main" id="{8A93244B-0726-4AEF-A9D6-78C169B4EBBC}"/>
+                <a16:creationId xmlns="" xmlns:a16="http://schemas.microsoft.com/office/drawing/2014/main" id="{8A93244B-0726-4AEF-A9D6-78C169B4EBBC}"/>
               </a:ext>
             </a:extLst>
           </p:cNvPr>
@@ -785,7 +785,7 @@
           <p:cNvPr id="2" name="Title 1">
             <a:extLst>
               <a:ext uri="{FF2B5EF4-FFF2-40B4-BE49-F238E27FC236}">
-                <a16:creationId xmlns:a16="http://schemas.microsoft.com/office/drawing/2014/main" id="{E8BD4358-492D-49F4-8353-C46623D4A0DE}"/>
+                <a16:creationId xmlns="" xmlns:a16="http://schemas.microsoft.com/office/drawing/2014/main" id="{E8BD4358-492D-49F4-8353-C46623D4A0DE}"/>
               </a:ext>
             </a:extLst>
           </p:cNvPr>
@@ -813,7 +813,7 @@
           <p:cNvPr id="3" name="Content Placeholder 2">
             <a:extLst>
               <a:ext uri="{FF2B5EF4-FFF2-40B4-BE49-F238E27FC236}">
-                <a16:creationId xmlns:a16="http://schemas.microsoft.com/office/drawing/2014/main" id="{CE882704-3E1B-4A78-A667-7E5E07744BE1}"/>
+                <a16:creationId xmlns="" xmlns:a16="http://schemas.microsoft.com/office/drawing/2014/main" id="{CE882704-3E1B-4A78-A667-7E5E07744BE1}"/>
               </a:ext>
             </a:extLst>
           </p:cNvPr>
@@ -870,7 +870,7 @@
           <p:cNvPr id="4" name="Date Placeholder 3">
             <a:extLst>
               <a:ext uri="{FF2B5EF4-FFF2-40B4-BE49-F238E27FC236}">
-                <a16:creationId xmlns:a16="http://schemas.microsoft.com/office/drawing/2014/main" id="{0D08B253-52A2-4C3D-BF5D-B8E56A1A2E16}"/>
+                <a16:creationId xmlns="" xmlns:a16="http://schemas.microsoft.com/office/drawing/2014/main" id="{0D08B253-52A2-4C3D-BF5D-B8E56A1A2E16}"/>
               </a:ext>
             </a:extLst>
           </p:cNvPr>
@@ -888,7 +888,7 @@
           <a:p>
             <a:fld id="{79DE2D3D-0B4E-4DD7-9670-155A46B4C7D3}" type="datetimeFigureOut">
               <a:rPr lang="en-US" smtClean="0"/>
-              <a:t>4/3/2018</a:t>
+              <a:t>4/4/2018</a:t>
             </a:fld>
             <a:endParaRPr lang="en-US"/>
           </a:p>
@@ -899,7 +899,7 @@
           <p:cNvPr id="5" name="Footer Placeholder 4">
             <a:extLst>
               <a:ext uri="{FF2B5EF4-FFF2-40B4-BE49-F238E27FC236}">
-                <a16:creationId xmlns:a16="http://schemas.microsoft.com/office/drawing/2014/main" id="{F2538AF5-D233-40C7-90BF-D5042A78432D}"/>
+                <a16:creationId xmlns="" xmlns:a16="http://schemas.microsoft.com/office/drawing/2014/main" id="{F2538AF5-D233-40C7-90BF-D5042A78432D}"/>
               </a:ext>
             </a:extLst>
           </p:cNvPr>
@@ -924,7 +924,7 @@
           <p:cNvPr id="6" name="Slide Number Placeholder 5">
             <a:extLst>
               <a:ext uri="{FF2B5EF4-FFF2-40B4-BE49-F238E27FC236}">
-                <a16:creationId xmlns:a16="http://schemas.microsoft.com/office/drawing/2014/main" id="{BBDF52CB-805F-4DFD-8CDA-7B1787FF8EEF}"/>
+                <a16:creationId xmlns="" xmlns:a16="http://schemas.microsoft.com/office/drawing/2014/main" id="{BBDF52CB-805F-4DFD-8CDA-7B1787FF8EEF}"/>
               </a:ext>
             </a:extLst>
           </p:cNvPr>
@@ -983,7 +983,7 @@
           <p:cNvPr id="2" name="Title 1">
             <a:extLst>
               <a:ext uri="{FF2B5EF4-FFF2-40B4-BE49-F238E27FC236}">
-                <a16:creationId xmlns:a16="http://schemas.microsoft.com/office/drawing/2014/main" id="{27D28634-873F-4F1F-A867-4DD9B734A08D}"/>
+                <a16:creationId xmlns="" xmlns:a16="http://schemas.microsoft.com/office/drawing/2014/main" id="{27D28634-873F-4F1F-A867-4DD9B734A08D}"/>
               </a:ext>
             </a:extLst>
           </p:cNvPr>
@@ -1020,7 +1020,7 @@
           <p:cNvPr id="3" name="Text Placeholder 2">
             <a:extLst>
               <a:ext uri="{FF2B5EF4-FFF2-40B4-BE49-F238E27FC236}">
-                <a16:creationId xmlns:a16="http://schemas.microsoft.com/office/drawing/2014/main" id="{1DECB686-6970-4E95-90E6-6FEDEDA473C2}"/>
+                <a16:creationId xmlns="" xmlns:a16="http://schemas.microsoft.com/office/drawing/2014/main" id="{1DECB686-6970-4E95-90E6-6FEDEDA473C2}"/>
               </a:ext>
             </a:extLst>
           </p:cNvPr>
@@ -1145,7 +1145,7 @@
           <p:cNvPr id="4" name="Date Placeholder 3">
             <a:extLst>
               <a:ext uri="{FF2B5EF4-FFF2-40B4-BE49-F238E27FC236}">
-                <a16:creationId xmlns:a16="http://schemas.microsoft.com/office/drawing/2014/main" id="{00FBC595-CBE7-4EA9-A885-EE14A03709FF}"/>
+                <a16:creationId xmlns="" xmlns:a16="http://schemas.microsoft.com/office/drawing/2014/main" id="{00FBC595-CBE7-4EA9-A885-EE14A03709FF}"/>
               </a:ext>
             </a:extLst>
           </p:cNvPr>
@@ -1163,7 +1163,7 @@
           <a:p>
             <a:fld id="{79DE2D3D-0B4E-4DD7-9670-155A46B4C7D3}" type="datetimeFigureOut">
               <a:rPr lang="en-US" smtClean="0"/>
-              <a:t>4/3/2018</a:t>
+              <a:t>4/4/2018</a:t>
             </a:fld>
             <a:endParaRPr lang="en-US"/>
           </a:p>
@@ -1174,7 +1174,7 @@
           <p:cNvPr id="5" name="Footer Placeholder 4">
             <a:extLst>
               <a:ext uri="{FF2B5EF4-FFF2-40B4-BE49-F238E27FC236}">
-                <a16:creationId xmlns:a16="http://schemas.microsoft.com/office/drawing/2014/main" id="{FF14EDF1-B2C2-49FE-9528-7E748E6EA3F6}"/>
+                <a16:creationId xmlns="" xmlns:a16="http://schemas.microsoft.com/office/drawing/2014/main" id="{FF14EDF1-B2C2-49FE-9528-7E748E6EA3F6}"/>
               </a:ext>
             </a:extLst>
           </p:cNvPr>
@@ -1199,7 +1199,7 @@
           <p:cNvPr id="6" name="Slide Number Placeholder 5">
             <a:extLst>
               <a:ext uri="{FF2B5EF4-FFF2-40B4-BE49-F238E27FC236}">
-                <a16:creationId xmlns:a16="http://schemas.microsoft.com/office/drawing/2014/main" id="{820E7B30-794B-44D2-9AF6-8F3EBCC924A1}"/>
+                <a16:creationId xmlns="" xmlns:a16="http://schemas.microsoft.com/office/drawing/2014/main" id="{820E7B30-794B-44D2-9AF6-8F3EBCC924A1}"/>
               </a:ext>
             </a:extLst>
           </p:cNvPr>
@@ -1258,7 +1258,7 @@
           <p:cNvPr id="2" name="Title 1">
             <a:extLst>
               <a:ext uri="{FF2B5EF4-FFF2-40B4-BE49-F238E27FC236}">
-                <a16:creationId xmlns:a16="http://schemas.microsoft.com/office/drawing/2014/main" id="{4D052C3E-728A-4E49-88AF-B7AADC9448DF}"/>
+                <a16:creationId xmlns="" xmlns:a16="http://schemas.microsoft.com/office/drawing/2014/main" id="{4D052C3E-728A-4E49-88AF-B7AADC9448DF}"/>
               </a:ext>
             </a:extLst>
           </p:cNvPr>
@@ -1286,7 +1286,7 @@
           <p:cNvPr id="3" name="Content Placeholder 2">
             <a:extLst>
               <a:ext uri="{FF2B5EF4-FFF2-40B4-BE49-F238E27FC236}">
-                <a16:creationId xmlns:a16="http://schemas.microsoft.com/office/drawing/2014/main" id="{19ABF20A-CEF3-431B-95B1-BC6709015D64}"/>
+                <a16:creationId xmlns="" xmlns:a16="http://schemas.microsoft.com/office/drawing/2014/main" id="{19ABF20A-CEF3-431B-95B1-BC6709015D64}"/>
               </a:ext>
             </a:extLst>
           </p:cNvPr>
@@ -1348,7 +1348,7 @@
           <p:cNvPr id="4" name="Content Placeholder 3">
             <a:extLst>
               <a:ext uri="{FF2B5EF4-FFF2-40B4-BE49-F238E27FC236}">
-                <a16:creationId xmlns:a16="http://schemas.microsoft.com/office/drawing/2014/main" id="{2737B622-ACD2-4627-B8FF-45D35B2633F1}"/>
+                <a16:creationId xmlns="" xmlns:a16="http://schemas.microsoft.com/office/drawing/2014/main" id="{2737B622-ACD2-4627-B8FF-45D35B2633F1}"/>
               </a:ext>
             </a:extLst>
           </p:cNvPr>
@@ -1410,7 +1410,7 @@
           <p:cNvPr id="5" name="Date Placeholder 4">
             <a:extLst>
               <a:ext uri="{FF2B5EF4-FFF2-40B4-BE49-F238E27FC236}">
-                <a16:creationId xmlns:a16="http://schemas.microsoft.com/office/drawing/2014/main" id="{42DDD691-4765-43B5-B9AD-534F1097CD33}"/>
+                <a16:creationId xmlns="" xmlns:a16="http://schemas.microsoft.com/office/drawing/2014/main" id="{42DDD691-4765-43B5-B9AD-534F1097CD33}"/>
               </a:ext>
             </a:extLst>
           </p:cNvPr>
@@ -1428,7 +1428,7 @@
           <a:p>
             <a:fld id="{79DE2D3D-0B4E-4DD7-9670-155A46B4C7D3}" type="datetimeFigureOut">
               <a:rPr lang="en-US" smtClean="0"/>
-              <a:t>4/3/2018</a:t>
+              <a:t>4/4/2018</a:t>
             </a:fld>
             <a:endParaRPr lang="en-US"/>
           </a:p>
@@ -1439,7 +1439,7 @@
           <p:cNvPr id="6" name="Footer Placeholder 5">
             <a:extLst>
               <a:ext uri="{FF2B5EF4-FFF2-40B4-BE49-F238E27FC236}">
-                <a16:creationId xmlns:a16="http://schemas.microsoft.com/office/drawing/2014/main" id="{52530E5C-8595-4F7E-B13E-A3BAFCF64E6D}"/>
+                <a16:creationId xmlns="" xmlns:a16="http://schemas.microsoft.com/office/drawing/2014/main" id="{52530E5C-8595-4F7E-B13E-A3BAFCF64E6D}"/>
               </a:ext>
             </a:extLst>
           </p:cNvPr>
@@ -1464,7 +1464,7 @@
           <p:cNvPr id="7" name="Slide Number Placeholder 6">
             <a:extLst>
               <a:ext uri="{FF2B5EF4-FFF2-40B4-BE49-F238E27FC236}">
-                <a16:creationId xmlns:a16="http://schemas.microsoft.com/office/drawing/2014/main" id="{0DB30A7B-8C52-420F-A1B6-C897CC27AA65}"/>
+                <a16:creationId xmlns="" xmlns:a16="http://schemas.microsoft.com/office/drawing/2014/main" id="{0DB30A7B-8C52-420F-A1B6-C897CC27AA65}"/>
               </a:ext>
             </a:extLst>
           </p:cNvPr>
@@ -1523,7 +1523,7 @@
           <p:cNvPr id="2" name="Title 1">
             <a:extLst>
               <a:ext uri="{FF2B5EF4-FFF2-40B4-BE49-F238E27FC236}">
-                <a16:creationId xmlns:a16="http://schemas.microsoft.com/office/drawing/2014/main" id="{E9AC60E8-9FC1-42DC-8C29-EA7465D837D0}"/>
+                <a16:creationId xmlns="" xmlns:a16="http://schemas.microsoft.com/office/drawing/2014/main" id="{E9AC60E8-9FC1-42DC-8C29-EA7465D837D0}"/>
               </a:ext>
             </a:extLst>
           </p:cNvPr>
@@ -1556,7 +1556,7 @@
           <p:cNvPr id="3" name="Text Placeholder 2">
             <a:extLst>
               <a:ext uri="{FF2B5EF4-FFF2-40B4-BE49-F238E27FC236}">
-                <a16:creationId xmlns:a16="http://schemas.microsoft.com/office/drawing/2014/main" id="{0C818A30-7FA1-4337-8120-C200A7442D75}"/>
+                <a16:creationId xmlns="" xmlns:a16="http://schemas.microsoft.com/office/drawing/2014/main" id="{0C818A30-7FA1-4337-8120-C200A7442D75}"/>
               </a:ext>
             </a:extLst>
           </p:cNvPr>
@@ -1627,7 +1627,7 @@
           <p:cNvPr id="4" name="Content Placeholder 3">
             <a:extLst>
               <a:ext uri="{FF2B5EF4-FFF2-40B4-BE49-F238E27FC236}">
-                <a16:creationId xmlns:a16="http://schemas.microsoft.com/office/drawing/2014/main" id="{9CE84CA1-F2AA-4CF1-AFDA-45D282715E23}"/>
+                <a16:creationId xmlns="" xmlns:a16="http://schemas.microsoft.com/office/drawing/2014/main" id="{9CE84CA1-F2AA-4CF1-AFDA-45D282715E23}"/>
               </a:ext>
             </a:extLst>
           </p:cNvPr>
@@ -1689,7 +1689,7 @@
           <p:cNvPr id="5" name="Text Placeholder 4">
             <a:extLst>
               <a:ext uri="{FF2B5EF4-FFF2-40B4-BE49-F238E27FC236}">
-                <a16:creationId xmlns:a16="http://schemas.microsoft.com/office/drawing/2014/main" id="{DBA3B6D1-4E3D-4DD3-9BB7-54C5D52214F5}"/>
+                <a16:creationId xmlns="" xmlns:a16="http://schemas.microsoft.com/office/drawing/2014/main" id="{DBA3B6D1-4E3D-4DD3-9BB7-54C5D52214F5}"/>
               </a:ext>
             </a:extLst>
           </p:cNvPr>
@@ -1760,7 +1760,7 @@
           <p:cNvPr id="6" name="Content Placeholder 5">
             <a:extLst>
               <a:ext uri="{FF2B5EF4-FFF2-40B4-BE49-F238E27FC236}">
-                <a16:creationId xmlns:a16="http://schemas.microsoft.com/office/drawing/2014/main" id="{E542C983-E152-4F06-8C96-7E07D0F125CD}"/>
+                <a16:creationId xmlns="" xmlns:a16="http://schemas.microsoft.com/office/drawing/2014/main" id="{E542C983-E152-4F06-8C96-7E07D0F125CD}"/>
               </a:ext>
             </a:extLst>
           </p:cNvPr>
@@ -1822,7 +1822,7 @@
           <p:cNvPr id="7" name="Date Placeholder 6">
             <a:extLst>
               <a:ext uri="{FF2B5EF4-FFF2-40B4-BE49-F238E27FC236}">
-                <a16:creationId xmlns:a16="http://schemas.microsoft.com/office/drawing/2014/main" id="{8E601059-966A-4AC8-B04D-E3BDB85FC4E2}"/>
+                <a16:creationId xmlns="" xmlns:a16="http://schemas.microsoft.com/office/drawing/2014/main" id="{8E601059-966A-4AC8-B04D-E3BDB85FC4E2}"/>
               </a:ext>
             </a:extLst>
           </p:cNvPr>
@@ -1840,7 +1840,7 @@
           <a:p>
             <a:fld id="{79DE2D3D-0B4E-4DD7-9670-155A46B4C7D3}" type="datetimeFigureOut">
               <a:rPr lang="en-US" smtClean="0"/>
-              <a:t>4/3/2018</a:t>
+              <a:t>4/4/2018</a:t>
             </a:fld>
             <a:endParaRPr lang="en-US"/>
           </a:p>
@@ -1851,7 +1851,7 @@
           <p:cNvPr id="8" name="Footer Placeholder 7">
             <a:extLst>
               <a:ext uri="{FF2B5EF4-FFF2-40B4-BE49-F238E27FC236}">
-                <a16:creationId xmlns:a16="http://schemas.microsoft.com/office/drawing/2014/main" id="{79DD1AA8-075F-40C9-9873-85A9A2D4DC98}"/>
+                <a16:creationId xmlns="" xmlns:a16="http://schemas.microsoft.com/office/drawing/2014/main" id="{79DD1AA8-075F-40C9-9873-85A9A2D4DC98}"/>
               </a:ext>
             </a:extLst>
           </p:cNvPr>
@@ -1876,7 +1876,7 @@
           <p:cNvPr id="9" name="Slide Number Placeholder 8">
             <a:extLst>
               <a:ext uri="{FF2B5EF4-FFF2-40B4-BE49-F238E27FC236}">
-                <a16:creationId xmlns:a16="http://schemas.microsoft.com/office/drawing/2014/main" id="{C179C8F9-9FC6-415C-BF20-26F3308511CF}"/>
+                <a16:creationId xmlns="" xmlns:a16="http://schemas.microsoft.com/office/drawing/2014/main" id="{C179C8F9-9FC6-415C-BF20-26F3308511CF}"/>
               </a:ext>
             </a:extLst>
           </p:cNvPr>
@@ -1935,7 +1935,7 @@
           <p:cNvPr id="2" name="Title 1">
             <a:extLst>
               <a:ext uri="{FF2B5EF4-FFF2-40B4-BE49-F238E27FC236}">
-                <a16:creationId xmlns:a16="http://schemas.microsoft.com/office/drawing/2014/main" id="{4C9581B1-453E-4AAD-9D12-D5CD21C43E28}"/>
+                <a16:creationId xmlns="" xmlns:a16="http://schemas.microsoft.com/office/drawing/2014/main" id="{4C9581B1-453E-4AAD-9D12-D5CD21C43E28}"/>
               </a:ext>
             </a:extLst>
           </p:cNvPr>
@@ -1963,7 +1963,7 @@
           <p:cNvPr id="3" name="Date Placeholder 2">
             <a:extLst>
               <a:ext uri="{FF2B5EF4-FFF2-40B4-BE49-F238E27FC236}">
-                <a16:creationId xmlns:a16="http://schemas.microsoft.com/office/drawing/2014/main" id="{19DECDA6-0FFD-4C5B-B7E6-7249068A0385}"/>
+                <a16:creationId xmlns="" xmlns:a16="http://schemas.microsoft.com/office/drawing/2014/main" id="{19DECDA6-0FFD-4C5B-B7E6-7249068A0385}"/>
               </a:ext>
             </a:extLst>
           </p:cNvPr>
@@ -1981,7 +1981,7 @@
           <a:p>
             <a:fld id="{79DE2D3D-0B4E-4DD7-9670-155A46B4C7D3}" type="datetimeFigureOut">
               <a:rPr lang="en-US" smtClean="0"/>
-              <a:t>4/3/2018</a:t>
+              <a:t>4/4/2018</a:t>
             </a:fld>
             <a:endParaRPr lang="en-US"/>
           </a:p>
@@ -1992,7 +1992,7 @@
           <p:cNvPr id="4" name="Footer Placeholder 3">
             <a:extLst>
               <a:ext uri="{FF2B5EF4-FFF2-40B4-BE49-F238E27FC236}">
-                <a16:creationId xmlns:a16="http://schemas.microsoft.com/office/drawing/2014/main" id="{51FB464C-C0C4-4823-A3E7-091DC998738E}"/>
+                <a16:creationId xmlns="" xmlns:a16="http://schemas.microsoft.com/office/drawing/2014/main" id="{51FB464C-C0C4-4823-A3E7-091DC998738E}"/>
               </a:ext>
             </a:extLst>
           </p:cNvPr>
@@ -2017,7 +2017,7 @@
           <p:cNvPr id="5" name="Slide Number Placeholder 4">
             <a:extLst>
               <a:ext uri="{FF2B5EF4-FFF2-40B4-BE49-F238E27FC236}">
-                <a16:creationId xmlns:a16="http://schemas.microsoft.com/office/drawing/2014/main" id="{D0716546-9DB4-4D0D-B586-6AC1ECAE4C07}"/>
+                <a16:creationId xmlns="" xmlns:a16="http://schemas.microsoft.com/office/drawing/2014/main" id="{D0716546-9DB4-4D0D-B586-6AC1ECAE4C07}"/>
               </a:ext>
             </a:extLst>
           </p:cNvPr>
@@ -2076,7 +2076,7 @@
           <p:cNvPr id="2" name="Date Placeholder 1">
             <a:extLst>
               <a:ext uri="{FF2B5EF4-FFF2-40B4-BE49-F238E27FC236}">
-                <a16:creationId xmlns:a16="http://schemas.microsoft.com/office/drawing/2014/main" id="{BA814E6B-A29F-4AE7-9237-6DF2A3ABBA33}"/>
+                <a16:creationId xmlns="" xmlns:a16="http://schemas.microsoft.com/office/drawing/2014/main" id="{BA814E6B-A29F-4AE7-9237-6DF2A3ABBA33}"/>
               </a:ext>
             </a:extLst>
           </p:cNvPr>
@@ -2094,7 +2094,7 @@
           <a:p>
             <a:fld id="{79DE2D3D-0B4E-4DD7-9670-155A46B4C7D3}" type="datetimeFigureOut">
               <a:rPr lang="en-US" smtClean="0"/>
-              <a:t>4/3/2018</a:t>
+              <a:t>4/4/2018</a:t>
             </a:fld>
             <a:endParaRPr lang="en-US"/>
           </a:p>
@@ -2105,7 +2105,7 @@
           <p:cNvPr id="3" name="Footer Placeholder 2">
             <a:extLst>
               <a:ext uri="{FF2B5EF4-FFF2-40B4-BE49-F238E27FC236}">
-                <a16:creationId xmlns:a16="http://schemas.microsoft.com/office/drawing/2014/main" id="{09BA391C-6DAE-4B53-B555-6CD4D8F9D2CB}"/>
+                <a16:creationId xmlns="" xmlns:a16="http://schemas.microsoft.com/office/drawing/2014/main" id="{09BA391C-6DAE-4B53-B555-6CD4D8F9D2CB}"/>
               </a:ext>
             </a:extLst>
           </p:cNvPr>
@@ -2130,7 +2130,7 @@
           <p:cNvPr id="4" name="Slide Number Placeholder 3">
             <a:extLst>
               <a:ext uri="{FF2B5EF4-FFF2-40B4-BE49-F238E27FC236}">
-                <a16:creationId xmlns:a16="http://schemas.microsoft.com/office/drawing/2014/main" id="{F625249E-BF43-4AB8-A5F0-A41CC1492ED3}"/>
+                <a16:creationId xmlns="" xmlns:a16="http://schemas.microsoft.com/office/drawing/2014/main" id="{F625249E-BF43-4AB8-A5F0-A41CC1492ED3}"/>
               </a:ext>
             </a:extLst>
           </p:cNvPr>
@@ -2189,7 +2189,7 @@
           <p:cNvPr id="2" name="Title 1">
             <a:extLst>
               <a:ext uri="{FF2B5EF4-FFF2-40B4-BE49-F238E27FC236}">
-                <a16:creationId xmlns:a16="http://schemas.microsoft.com/office/drawing/2014/main" id="{076ABC1E-EE30-473D-9843-97DA2B713DCD}"/>
+                <a16:creationId xmlns="" xmlns:a16="http://schemas.microsoft.com/office/drawing/2014/main" id="{076ABC1E-EE30-473D-9843-97DA2B713DCD}"/>
               </a:ext>
             </a:extLst>
           </p:cNvPr>
@@ -2226,7 +2226,7 @@
           <p:cNvPr id="3" name="Content Placeholder 2">
             <a:extLst>
               <a:ext uri="{FF2B5EF4-FFF2-40B4-BE49-F238E27FC236}">
-                <a16:creationId xmlns:a16="http://schemas.microsoft.com/office/drawing/2014/main" id="{BC46249D-CC42-436D-BE0D-5625D0485C24}"/>
+                <a16:creationId xmlns="" xmlns:a16="http://schemas.microsoft.com/office/drawing/2014/main" id="{BC46249D-CC42-436D-BE0D-5625D0485C24}"/>
               </a:ext>
             </a:extLst>
           </p:cNvPr>
@@ -2316,7 +2316,7 @@
           <p:cNvPr id="4" name="Text Placeholder 3">
             <a:extLst>
               <a:ext uri="{FF2B5EF4-FFF2-40B4-BE49-F238E27FC236}">
-                <a16:creationId xmlns:a16="http://schemas.microsoft.com/office/drawing/2014/main" id="{BB8F32DE-2D90-4225-849F-71A8E16108A2}"/>
+                <a16:creationId xmlns="" xmlns:a16="http://schemas.microsoft.com/office/drawing/2014/main" id="{BB8F32DE-2D90-4225-849F-71A8E16108A2}"/>
               </a:ext>
             </a:extLst>
           </p:cNvPr>
@@ -2387,7 +2387,7 @@
           <p:cNvPr id="5" name="Date Placeholder 4">
             <a:extLst>
               <a:ext uri="{FF2B5EF4-FFF2-40B4-BE49-F238E27FC236}">
-                <a16:creationId xmlns:a16="http://schemas.microsoft.com/office/drawing/2014/main" id="{81FDD5F9-4B94-4BF2-986F-B735C9B79581}"/>
+                <a16:creationId xmlns="" xmlns:a16="http://schemas.microsoft.com/office/drawing/2014/main" id="{81FDD5F9-4B94-4BF2-986F-B735C9B79581}"/>
               </a:ext>
             </a:extLst>
           </p:cNvPr>
@@ -2405,7 +2405,7 @@
           <a:p>
             <a:fld id="{79DE2D3D-0B4E-4DD7-9670-155A46B4C7D3}" type="datetimeFigureOut">
               <a:rPr lang="en-US" smtClean="0"/>
-              <a:t>4/3/2018</a:t>
+              <a:t>4/4/2018</a:t>
             </a:fld>
             <a:endParaRPr lang="en-US"/>
           </a:p>
@@ -2416,7 +2416,7 @@
           <p:cNvPr id="6" name="Footer Placeholder 5">
             <a:extLst>
               <a:ext uri="{FF2B5EF4-FFF2-40B4-BE49-F238E27FC236}">
-                <a16:creationId xmlns:a16="http://schemas.microsoft.com/office/drawing/2014/main" id="{D0408356-96AD-466E-AC30-0DCC886CEFA5}"/>
+                <a16:creationId xmlns="" xmlns:a16="http://schemas.microsoft.com/office/drawing/2014/main" id="{D0408356-96AD-466E-AC30-0DCC886CEFA5}"/>
               </a:ext>
             </a:extLst>
           </p:cNvPr>
@@ -2441,7 +2441,7 @@
           <p:cNvPr id="7" name="Slide Number Placeholder 6">
             <a:extLst>
               <a:ext uri="{FF2B5EF4-FFF2-40B4-BE49-F238E27FC236}">
-                <a16:creationId xmlns:a16="http://schemas.microsoft.com/office/drawing/2014/main" id="{68F5E96F-D5B9-4F8B-A9CC-7427EAB39A92}"/>
+                <a16:creationId xmlns="" xmlns:a16="http://schemas.microsoft.com/office/drawing/2014/main" id="{68F5E96F-D5B9-4F8B-A9CC-7427EAB39A92}"/>
               </a:ext>
             </a:extLst>
           </p:cNvPr>
@@ -2500,7 +2500,7 @@
           <p:cNvPr id="2" name="Title 1">
             <a:extLst>
               <a:ext uri="{FF2B5EF4-FFF2-40B4-BE49-F238E27FC236}">
-                <a16:creationId xmlns:a16="http://schemas.microsoft.com/office/drawing/2014/main" id="{9C0F5112-278F-44E4-87C0-4C2F8A651829}"/>
+                <a16:creationId xmlns="" xmlns:a16="http://schemas.microsoft.com/office/drawing/2014/main" id="{9C0F5112-278F-44E4-87C0-4C2F8A651829}"/>
               </a:ext>
             </a:extLst>
           </p:cNvPr>
@@ -2537,7 +2537,7 @@
           <p:cNvPr id="3" name="Picture Placeholder 2">
             <a:extLst>
               <a:ext uri="{FF2B5EF4-FFF2-40B4-BE49-F238E27FC236}">
-                <a16:creationId xmlns:a16="http://schemas.microsoft.com/office/drawing/2014/main" id="{05EA54BB-79CA-4CC9-98CE-E5D860A33729}"/>
+                <a16:creationId xmlns="" xmlns:a16="http://schemas.microsoft.com/office/drawing/2014/main" id="{05EA54BB-79CA-4CC9-98CE-E5D860A33729}"/>
               </a:ext>
             </a:extLst>
           </p:cNvPr>
@@ -2604,7 +2604,7 @@
           <p:cNvPr id="4" name="Text Placeholder 3">
             <a:extLst>
               <a:ext uri="{FF2B5EF4-FFF2-40B4-BE49-F238E27FC236}">
-                <a16:creationId xmlns:a16="http://schemas.microsoft.com/office/drawing/2014/main" id="{BE5F85B6-2DFC-4F12-B91A-B047130C2235}"/>
+                <a16:creationId xmlns="" xmlns:a16="http://schemas.microsoft.com/office/drawing/2014/main" id="{BE5F85B6-2DFC-4F12-B91A-B047130C2235}"/>
               </a:ext>
             </a:extLst>
           </p:cNvPr>
@@ -2675,7 +2675,7 @@
           <p:cNvPr id="5" name="Date Placeholder 4">
             <a:extLst>
               <a:ext uri="{FF2B5EF4-FFF2-40B4-BE49-F238E27FC236}">
-                <a16:creationId xmlns:a16="http://schemas.microsoft.com/office/drawing/2014/main" id="{172D123F-5801-4632-89EF-A7048EAB1264}"/>
+                <a16:creationId xmlns="" xmlns:a16="http://schemas.microsoft.com/office/drawing/2014/main" id="{172D123F-5801-4632-89EF-A7048EAB1264}"/>
               </a:ext>
             </a:extLst>
           </p:cNvPr>
@@ -2693,7 +2693,7 @@
           <a:p>
             <a:fld id="{79DE2D3D-0B4E-4DD7-9670-155A46B4C7D3}" type="datetimeFigureOut">
               <a:rPr lang="en-US" smtClean="0"/>
-              <a:t>4/3/2018</a:t>
+              <a:t>4/4/2018</a:t>
             </a:fld>
             <a:endParaRPr lang="en-US"/>
           </a:p>
@@ -2704,7 +2704,7 @@
           <p:cNvPr id="6" name="Footer Placeholder 5">
             <a:extLst>
               <a:ext uri="{FF2B5EF4-FFF2-40B4-BE49-F238E27FC236}">
-                <a16:creationId xmlns:a16="http://schemas.microsoft.com/office/drawing/2014/main" id="{5393FCEA-51F8-4D51-BA8E-D42F966A2BF0}"/>
+                <a16:creationId xmlns="" xmlns:a16="http://schemas.microsoft.com/office/drawing/2014/main" id="{5393FCEA-51F8-4D51-BA8E-D42F966A2BF0}"/>
               </a:ext>
             </a:extLst>
           </p:cNvPr>
@@ -2729,7 +2729,7 @@
           <p:cNvPr id="7" name="Slide Number Placeholder 6">
             <a:extLst>
               <a:ext uri="{FF2B5EF4-FFF2-40B4-BE49-F238E27FC236}">
-                <a16:creationId xmlns:a16="http://schemas.microsoft.com/office/drawing/2014/main" id="{A0B91011-BCB3-49E8-B94D-89877DAB044B}"/>
+                <a16:creationId xmlns="" xmlns:a16="http://schemas.microsoft.com/office/drawing/2014/main" id="{A0B91011-BCB3-49E8-B94D-89877DAB044B}"/>
               </a:ext>
             </a:extLst>
           </p:cNvPr>
@@ -2793,7 +2793,7 @@
           <p:cNvPr id="2" name="Title Placeholder 1">
             <a:extLst>
               <a:ext uri="{FF2B5EF4-FFF2-40B4-BE49-F238E27FC236}">
-                <a16:creationId xmlns:a16="http://schemas.microsoft.com/office/drawing/2014/main" id="{5BBD9B47-EC09-49CB-91C3-4FF23C8DFDFA}"/>
+                <a16:creationId xmlns="" xmlns:a16="http://schemas.microsoft.com/office/drawing/2014/main" id="{5BBD9B47-EC09-49CB-91C3-4FF23C8DFDFA}"/>
               </a:ext>
             </a:extLst>
           </p:cNvPr>
@@ -2831,7 +2831,7 @@
           <p:cNvPr id="3" name="Text Placeholder 2">
             <a:extLst>
               <a:ext uri="{FF2B5EF4-FFF2-40B4-BE49-F238E27FC236}">
-                <a16:creationId xmlns:a16="http://schemas.microsoft.com/office/drawing/2014/main" id="{513AA069-5DC8-4F13-BF00-1DDB9CFEBB93}"/>
+                <a16:creationId xmlns="" xmlns:a16="http://schemas.microsoft.com/office/drawing/2014/main" id="{513AA069-5DC8-4F13-BF00-1DDB9CFEBB93}"/>
               </a:ext>
             </a:extLst>
           </p:cNvPr>
@@ -2898,7 +2898,7 @@
           <p:cNvPr id="4" name="Date Placeholder 3">
             <a:extLst>
               <a:ext uri="{FF2B5EF4-FFF2-40B4-BE49-F238E27FC236}">
-                <a16:creationId xmlns:a16="http://schemas.microsoft.com/office/drawing/2014/main" id="{1B988FF8-EF37-4E2D-8D06-B56DC9727511}"/>
+                <a16:creationId xmlns="" xmlns:a16="http://schemas.microsoft.com/office/drawing/2014/main" id="{1B988FF8-EF37-4E2D-8D06-B56DC9727511}"/>
               </a:ext>
             </a:extLst>
           </p:cNvPr>
@@ -2934,7 +2934,7 @@
           <a:p>
             <a:fld id="{79DE2D3D-0B4E-4DD7-9670-155A46B4C7D3}" type="datetimeFigureOut">
               <a:rPr lang="en-US" smtClean="0"/>
-              <a:t>4/3/2018</a:t>
+              <a:t>4/4/2018</a:t>
             </a:fld>
             <a:endParaRPr lang="en-US"/>
           </a:p>
@@ -2945,7 +2945,7 @@
           <p:cNvPr id="5" name="Footer Placeholder 4">
             <a:extLst>
               <a:ext uri="{FF2B5EF4-FFF2-40B4-BE49-F238E27FC236}">
-                <a16:creationId xmlns:a16="http://schemas.microsoft.com/office/drawing/2014/main" id="{83212C0E-B2E5-4E9B-8071-67611BC3B695}"/>
+                <a16:creationId xmlns="" xmlns:a16="http://schemas.microsoft.com/office/drawing/2014/main" id="{83212C0E-B2E5-4E9B-8071-67611BC3B695}"/>
               </a:ext>
             </a:extLst>
           </p:cNvPr>
@@ -2988,7 +2988,7 @@
           <p:cNvPr id="6" name="Slide Number Placeholder 5">
             <a:extLst>
               <a:ext uri="{FF2B5EF4-FFF2-40B4-BE49-F238E27FC236}">
-                <a16:creationId xmlns:a16="http://schemas.microsoft.com/office/drawing/2014/main" id="{FEDCB7D4-E33C-461E-9027-986C5814089F}"/>
+                <a16:creationId xmlns="" xmlns:a16="http://schemas.microsoft.com/office/drawing/2014/main" id="{FEDCB7D4-E33C-461E-9027-986C5814089F}"/>
               </a:ext>
             </a:extLst>
           </p:cNvPr>
@@ -3356,7 +3356,7 @@
           <p:cNvPr id="2" name="Title 1">
             <a:extLst>
               <a:ext uri="{FF2B5EF4-FFF2-40B4-BE49-F238E27FC236}">
-                <a16:creationId xmlns:a16="http://schemas.microsoft.com/office/drawing/2014/main" id="{139BAF7C-DB50-417E-B55C-81858A77D703}"/>
+                <a16:creationId xmlns="" xmlns:a16="http://schemas.microsoft.com/office/drawing/2014/main" id="{139BAF7C-DB50-417E-B55C-81858A77D703}"/>
               </a:ext>
             </a:extLst>
           </p:cNvPr>
@@ -3384,7 +3384,7 @@
           <p:cNvPr id="3" name="Subtitle 2">
             <a:extLst>
               <a:ext uri="{FF2B5EF4-FFF2-40B4-BE49-F238E27FC236}">
-                <a16:creationId xmlns:a16="http://schemas.microsoft.com/office/drawing/2014/main" id="{CE9D560A-2AB0-4D6D-83D1-F0F54D6A5F58}"/>
+                <a16:creationId xmlns="" xmlns:a16="http://schemas.microsoft.com/office/drawing/2014/main" id="{CE9D560A-2AB0-4D6D-83D1-F0F54D6A5F58}"/>
               </a:ext>
             </a:extLst>
           </p:cNvPr>
@@ -3439,7 +3439,7 @@
           <p:cNvPr id="2" name="Title 1">
             <a:extLst>
               <a:ext uri="{FF2B5EF4-FFF2-40B4-BE49-F238E27FC236}">
-                <a16:creationId xmlns:a16="http://schemas.microsoft.com/office/drawing/2014/main" id="{5ADC56FF-B4DC-4FF6-8C43-32D010FD16AF}"/>
+                <a16:creationId xmlns="" xmlns:a16="http://schemas.microsoft.com/office/drawing/2014/main" id="{5ADC56FF-B4DC-4FF6-8C43-32D010FD16AF}"/>
               </a:ext>
             </a:extLst>
           </p:cNvPr>
@@ -4288,7 +4288,7 @@
           <p:cNvPr id="2" name="Title 1">
             <a:extLst>
               <a:ext uri="{FF2B5EF4-FFF2-40B4-BE49-F238E27FC236}">
-                <a16:creationId xmlns:a16="http://schemas.microsoft.com/office/drawing/2014/main" id="{2435A16B-C73F-4378-AB6D-608131C0F4DA}"/>
+                <a16:creationId xmlns="" xmlns:a16="http://schemas.microsoft.com/office/drawing/2014/main" id="{2435A16B-C73F-4378-AB6D-608131C0F4DA}"/>
               </a:ext>
             </a:extLst>
           </p:cNvPr>
@@ -4316,7 +4316,7 @@
           <p:cNvPr id="4" name="Content Placeholder 3">
             <a:extLst>
               <a:ext uri="{FF2B5EF4-FFF2-40B4-BE49-F238E27FC236}">
-                <a16:creationId xmlns:a16="http://schemas.microsoft.com/office/drawing/2014/main" id="{14BDE94F-63BA-453E-9B65-76E3AD0850E8}"/>
+                <a16:creationId xmlns="" xmlns:a16="http://schemas.microsoft.com/office/drawing/2014/main" id="{14BDE94F-63BA-453E-9B65-76E3AD0850E8}"/>
               </a:ext>
             </a:extLst>
           </p:cNvPr>
@@ -4346,28 +4346,28 @@
                 <a:gridCol w="2900149">
                   <a:extLst>
                     <a:ext uri="{9D8B030D-6E8A-4147-A177-3AD203B41FA5}">
-                      <a16:colId xmlns:a16="http://schemas.microsoft.com/office/drawing/2014/main" val="1377422795"/>
+                      <a16:colId xmlns="" xmlns:a16="http://schemas.microsoft.com/office/drawing/2014/main" val="1377422795"/>
                     </a:ext>
                   </a:extLst>
                 </a:gridCol>
                 <a:gridCol w="2531661">
                   <a:extLst>
                     <a:ext uri="{9D8B030D-6E8A-4147-A177-3AD203B41FA5}">
-                      <a16:colId xmlns:a16="http://schemas.microsoft.com/office/drawing/2014/main" val="1598590039"/>
+                      <a16:colId xmlns="" xmlns:a16="http://schemas.microsoft.com/office/drawing/2014/main" val="1598590039"/>
                     </a:ext>
                   </a:extLst>
                 </a:gridCol>
                 <a:gridCol w="2101756">
                   <a:extLst>
                     <a:ext uri="{9D8B030D-6E8A-4147-A177-3AD203B41FA5}">
-                      <a16:colId xmlns:a16="http://schemas.microsoft.com/office/drawing/2014/main" val="3896506482"/>
+                      <a16:colId xmlns="" xmlns:a16="http://schemas.microsoft.com/office/drawing/2014/main" val="3896506482"/>
                     </a:ext>
                   </a:extLst>
                 </a:gridCol>
                 <a:gridCol w="4067030">
                   <a:extLst>
                     <a:ext uri="{9D8B030D-6E8A-4147-A177-3AD203B41FA5}">
-                      <a16:colId xmlns:a16="http://schemas.microsoft.com/office/drawing/2014/main" val="3170647213"/>
+                      <a16:colId xmlns="" xmlns:a16="http://schemas.microsoft.com/office/drawing/2014/main" val="3170647213"/>
                     </a:ext>
                   </a:extLst>
                 </a:gridCol>
@@ -4427,7 +4427,7 @@
                 </a:tc>
                 <a:extLst>
                   <a:ext uri="{0D108BD9-81ED-4DB2-BD59-A6C34878D82A}">
-                    <a16:rowId xmlns:a16="http://schemas.microsoft.com/office/drawing/2014/main" val="3387341382"/>
+                    <a16:rowId xmlns="" xmlns:a16="http://schemas.microsoft.com/office/drawing/2014/main" val="3387341382"/>
                   </a:ext>
                 </a:extLst>
               </a:tr>
@@ -4487,7 +4487,7 @@
                 </a:tc>
                 <a:extLst>
                   <a:ext uri="{0D108BD9-81ED-4DB2-BD59-A6C34878D82A}">
-                    <a16:rowId xmlns:a16="http://schemas.microsoft.com/office/drawing/2014/main" val="855420630"/>
+                    <a16:rowId xmlns="" xmlns:a16="http://schemas.microsoft.com/office/drawing/2014/main" val="855420630"/>
                   </a:ext>
                 </a:extLst>
               </a:tr>
@@ -4563,7 +4563,7 @@
                 </a:tc>
                 <a:extLst>
                   <a:ext uri="{0D108BD9-81ED-4DB2-BD59-A6C34878D82A}">
-                    <a16:rowId xmlns:a16="http://schemas.microsoft.com/office/drawing/2014/main" val="3188031076"/>
+                    <a16:rowId xmlns="" xmlns:a16="http://schemas.microsoft.com/office/drawing/2014/main" val="3188031076"/>
                   </a:ext>
                 </a:extLst>
               </a:tr>
@@ -4630,7 +4630,7 @@
                 </a:tc>
                 <a:extLst>
                   <a:ext uri="{0D108BD9-81ED-4DB2-BD59-A6C34878D82A}">
-                    <a16:rowId xmlns:a16="http://schemas.microsoft.com/office/drawing/2014/main" val="1240135095"/>
+                    <a16:rowId xmlns="" xmlns:a16="http://schemas.microsoft.com/office/drawing/2014/main" val="1240135095"/>
                   </a:ext>
                 </a:extLst>
               </a:tr>
@@ -4686,7 +4686,7 @@
                 </a:tc>
                 <a:extLst>
                   <a:ext uri="{0D108BD9-81ED-4DB2-BD59-A6C34878D82A}">
-                    <a16:rowId xmlns:a16="http://schemas.microsoft.com/office/drawing/2014/main" val="1651246168"/>
+                    <a16:rowId xmlns="" xmlns:a16="http://schemas.microsoft.com/office/drawing/2014/main" val="1651246168"/>
                   </a:ext>
                 </a:extLst>
               </a:tr>
@@ -4746,7 +4746,7 @@
                 </a:tc>
                 <a:extLst>
                   <a:ext uri="{0D108BD9-81ED-4DB2-BD59-A6C34878D82A}">
-                    <a16:rowId xmlns:a16="http://schemas.microsoft.com/office/drawing/2014/main" val="3320754550"/>
+                    <a16:rowId xmlns="" xmlns:a16="http://schemas.microsoft.com/office/drawing/2014/main" val="3320754550"/>
                   </a:ext>
                 </a:extLst>
               </a:tr>
@@ -4823,7 +4823,7 @@
                 </a:tc>
                 <a:extLst>
                   <a:ext uri="{0D108BD9-81ED-4DB2-BD59-A6C34878D82A}">
-                    <a16:rowId xmlns:a16="http://schemas.microsoft.com/office/drawing/2014/main" val="701464579"/>
+                    <a16:rowId xmlns="" xmlns:a16="http://schemas.microsoft.com/office/drawing/2014/main" val="701464579"/>
                   </a:ext>
                 </a:extLst>
               </a:tr>
@@ -4960,7 +4960,7 @@
                 </a:tc>
                 <a:extLst>
                   <a:ext uri="{0D108BD9-81ED-4DB2-BD59-A6C34878D82A}">
-                    <a16:rowId xmlns:a16="http://schemas.microsoft.com/office/drawing/2014/main" val="904193852"/>
+                    <a16:rowId xmlns="" xmlns:a16="http://schemas.microsoft.com/office/drawing/2014/main" val="904193852"/>
                   </a:ext>
                 </a:extLst>
               </a:tr>
@@ -5003,7 +5003,7 @@
           <p:cNvPr id="2" name="Title 1">
             <a:extLst>
               <a:ext uri="{FF2B5EF4-FFF2-40B4-BE49-F238E27FC236}">
-                <a16:creationId xmlns:a16="http://schemas.microsoft.com/office/drawing/2014/main" id="{88BB61F1-4D04-4BA3-880A-182E63063E3F}"/>
+                <a16:creationId xmlns="" xmlns:a16="http://schemas.microsoft.com/office/drawing/2014/main" id="{88BB61F1-4D04-4BA3-880A-182E63063E3F}"/>
               </a:ext>
             </a:extLst>
           </p:cNvPr>
@@ -5031,7 +5031,7 @@
           <p:cNvPr id="5" name="Table 4">
             <a:extLst>
               <a:ext uri="{FF2B5EF4-FFF2-40B4-BE49-F238E27FC236}">
-                <a16:creationId xmlns:a16="http://schemas.microsoft.com/office/drawing/2014/main" id="{7FE0EC76-5C3B-4492-8D2E-E1FAAD3FCB09}"/>
+                <a16:creationId xmlns="" xmlns:a16="http://schemas.microsoft.com/office/drawing/2014/main" id="{7FE0EC76-5C3B-4492-8D2E-E1FAAD3FCB09}"/>
               </a:ext>
             </a:extLst>
           </p:cNvPr>
@@ -5060,21 +5060,21 @@
                 <a:gridCol w="1190594">
                   <a:extLst>
                     <a:ext uri="{9D8B030D-6E8A-4147-A177-3AD203B41FA5}">
-                      <a16:colId xmlns:a16="http://schemas.microsoft.com/office/drawing/2014/main" val="2350551349"/>
+                      <a16:colId xmlns="" xmlns:a16="http://schemas.microsoft.com/office/drawing/2014/main" val="2350551349"/>
                     </a:ext>
                   </a:extLst>
                 </a:gridCol>
                 <a:gridCol w="4492101">
                   <a:extLst>
                     <a:ext uri="{9D8B030D-6E8A-4147-A177-3AD203B41FA5}">
-                      <a16:colId xmlns:a16="http://schemas.microsoft.com/office/drawing/2014/main" val="3837764880"/>
+                      <a16:colId xmlns="" xmlns:a16="http://schemas.microsoft.com/office/drawing/2014/main" val="3837764880"/>
                     </a:ext>
                   </a:extLst>
                 </a:gridCol>
                 <a:gridCol w="5495277">
                   <a:extLst>
                     <a:ext uri="{9D8B030D-6E8A-4147-A177-3AD203B41FA5}">
-                      <a16:colId xmlns:a16="http://schemas.microsoft.com/office/drawing/2014/main" val="1650680026"/>
+                      <a16:colId xmlns="" xmlns:a16="http://schemas.microsoft.com/office/drawing/2014/main" val="1650680026"/>
                     </a:ext>
                   </a:extLst>
                 </a:gridCol>
@@ -5186,7 +5186,7 @@
                 </a:tc>
                 <a:extLst>
                   <a:ext uri="{0D108BD9-81ED-4DB2-BD59-A6C34878D82A}">
-                    <a16:rowId xmlns:a16="http://schemas.microsoft.com/office/drawing/2014/main" val="3622372536"/>
+                    <a16:rowId xmlns="" xmlns:a16="http://schemas.microsoft.com/office/drawing/2014/main" val="3622372536"/>
                   </a:ext>
                 </a:extLst>
               </a:tr>
@@ -5226,7 +5226,7 @@
                 </a:tc>
                 <a:extLst>
                   <a:ext uri="{0D108BD9-81ED-4DB2-BD59-A6C34878D82A}">
-                    <a16:rowId xmlns:a16="http://schemas.microsoft.com/office/drawing/2014/main" val="3395803886"/>
+                    <a16:rowId xmlns="" xmlns:a16="http://schemas.microsoft.com/office/drawing/2014/main" val="3395803886"/>
                   </a:ext>
                 </a:extLst>
               </a:tr>
@@ -5266,7 +5266,7 @@
                 </a:tc>
                 <a:extLst>
                   <a:ext uri="{0D108BD9-81ED-4DB2-BD59-A6C34878D82A}">
-                    <a16:rowId xmlns:a16="http://schemas.microsoft.com/office/drawing/2014/main" val="678614825"/>
+                    <a16:rowId xmlns="" xmlns:a16="http://schemas.microsoft.com/office/drawing/2014/main" val="678614825"/>
                   </a:ext>
                 </a:extLst>
               </a:tr>
@@ -5306,7 +5306,7 @@
                 </a:tc>
                 <a:extLst>
                   <a:ext uri="{0D108BD9-81ED-4DB2-BD59-A6C34878D82A}">
-                    <a16:rowId xmlns:a16="http://schemas.microsoft.com/office/drawing/2014/main" val="14700446"/>
+                    <a16:rowId xmlns="" xmlns:a16="http://schemas.microsoft.com/office/drawing/2014/main" val="14700446"/>
                   </a:ext>
                 </a:extLst>
               </a:tr>
@@ -5397,7 +5397,7 @@
                 </a:tc>
                 <a:extLst>
                   <a:ext uri="{0D108BD9-81ED-4DB2-BD59-A6C34878D82A}">
-                    <a16:rowId xmlns:a16="http://schemas.microsoft.com/office/drawing/2014/main" val="2986406775"/>
+                    <a16:rowId xmlns="" xmlns:a16="http://schemas.microsoft.com/office/drawing/2014/main" val="2986406775"/>
                   </a:ext>
                 </a:extLst>
               </a:tr>
@@ -5410,7 +5410,7 @@
           <p:cNvPr id="6" name="Rectangle 5">
             <a:extLst>
               <a:ext uri="{FF2B5EF4-FFF2-40B4-BE49-F238E27FC236}">
-                <a16:creationId xmlns:a16="http://schemas.microsoft.com/office/drawing/2014/main" id="{3D3A6304-95D1-4C9A-9D4F-D6FEB093FD04}"/>
+                <a16:creationId xmlns="" xmlns:a16="http://schemas.microsoft.com/office/drawing/2014/main" id="{3D3A6304-95D1-4C9A-9D4F-D6FEB093FD04}"/>
               </a:ext>
             </a:extLst>
           </p:cNvPr>
@@ -5460,7 +5460,7 @@
           <p:cNvPr id="7" name="Rectangle 6">
             <a:extLst>
               <a:ext uri="{FF2B5EF4-FFF2-40B4-BE49-F238E27FC236}">
-                <a16:creationId xmlns:a16="http://schemas.microsoft.com/office/drawing/2014/main" id="{FA2D1AB0-D637-49D0-8B11-798F83C57DE5}"/>
+                <a16:creationId xmlns="" xmlns:a16="http://schemas.microsoft.com/office/drawing/2014/main" id="{FA2D1AB0-D637-49D0-8B11-798F83C57DE5}"/>
               </a:ext>
             </a:extLst>
           </p:cNvPr>
@@ -5509,7 +5509,7 @@
           <p:cNvPr id="20" name="Group 19">
             <a:extLst>
               <a:ext uri="{FF2B5EF4-FFF2-40B4-BE49-F238E27FC236}">
-                <a16:creationId xmlns:a16="http://schemas.microsoft.com/office/drawing/2014/main" id="{61966E5F-6A7D-4692-B4A7-31B364D52472}"/>
+                <a16:creationId xmlns="" xmlns:a16="http://schemas.microsoft.com/office/drawing/2014/main" id="{61966E5F-6A7D-4692-B4A7-31B364D52472}"/>
               </a:ext>
             </a:extLst>
           </p:cNvPr>
@@ -5529,7 +5529,7 @@
             <p:cNvPr id="10" name="Rectangle 9">
               <a:extLst>
                 <a:ext uri="{FF2B5EF4-FFF2-40B4-BE49-F238E27FC236}">
-                  <a16:creationId xmlns:a16="http://schemas.microsoft.com/office/drawing/2014/main" id="{ED96FD96-30EE-42EA-AE74-FF660B4CD95E}"/>
+                  <a16:creationId xmlns="" xmlns:a16="http://schemas.microsoft.com/office/drawing/2014/main" id="{ED96FD96-30EE-42EA-AE74-FF660B4CD95E}"/>
                 </a:ext>
               </a:extLst>
             </p:cNvPr>
@@ -5578,7 +5578,7 @@
             <p:cNvPr id="15" name="Flowchart: Decision 14">
               <a:extLst>
                 <a:ext uri="{FF2B5EF4-FFF2-40B4-BE49-F238E27FC236}">
-                  <a16:creationId xmlns:a16="http://schemas.microsoft.com/office/drawing/2014/main" id="{7DD829F6-1A9E-4763-8903-C9A0993AC38E}"/>
+                  <a16:creationId xmlns="" xmlns:a16="http://schemas.microsoft.com/office/drawing/2014/main" id="{7DD829F6-1A9E-4763-8903-C9A0993AC38E}"/>
                 </a:ext>
               </a:extLst>
             </p:cNvPr>
@@ -5625,7 +5625,7 @@
           <p:cNvPr id="19" name="Group 18">
             <a:extLst>
               <a:ext uri="{FF2B5EF4-FFF2-40B4-BE49-F238E27FC236}">
-                <a16:creationId xmlns:a16="http://schemas.microsoft.com/office/drawing/2014/main" id="{0DAE263D-B219-4D24-932B-1ECEB1854EDA}"/>
+                <a16:creationId xmlns="" xmlns:a16="http://schemas.microsoft.com/office/drawing/2014/main" id="{0DAE263D-B219-4D24-932B-1ECEB1854EDA}"/>
               </a:ext>
             </a:extLst>
           </p:cNvPr>
@@ -5645,7 +5645,7 @@
             <p:cNvPr id="11" name="Rectangle 10">
               <a:extLst>
                 <a:ext uri="{FF2B5EF4-FFF2-40B4-BE49-F238E27FC236}">
-                  <a16:creationId xmlns:a16="http://schemas.microsoft.com/office/drawing/2014/main" id="{80085097-CCF1-4DCA-9E6D-E8FB4FF5528B}"/>
+                  <a16:creationId xmlns="" xmlns:a16="http://schemas.microsoft.com/office/drawing/2014/main" id="{80085097-CCF1-4DCA-9E6D-E8FB4FF5528B}"/>
                 </a:ext>
               </a:extLst>
             </p:cNvPr>
@@ -5694,7 +5694,7 @@
             <p:cNvPr id="12" name="Flowchart: Decision 11">
               <a:extLst>
                 <a:ext uri="{FF2B5EF4-FFF2-40B4-BE49-F238E27FC236}">
-                  <a16:creationId xmlns:a16="http://schemas.microsoft.com/office/drawing/2014/main" id="{2A0BE501-A964-4BB6-B7A5-2B5C26EC5DF9}"/>
+                  <a16:creationId xmlns="" xmlns:a16="http://schemas.microsoft.com/office/drawing/2014/main" id="{2A0BE501-A964-4BB6-B7A5-2B5C26EC5DF9}"/>
                 </a:ext>
               </a:extLst>
             </p:cNvPr>
@@ -5740,7 +5740,7 @@
             <p:cNvPr id="13" name="Flowchart: Decision 12">
               <a:extLst>
                 <a:ext uri="{FF2B5EF4-FFF2-40B4-BE49-F238E27FC236}">
-                  <a16:creationId xmlns:a16="http://schemas.microsoft.com/office/drawing/2014/main" id="{ED8A9097-3781-480B-8EA6-66A0EFFD1B0C}"/>
+                  <a16:creationId xmlns="" xmlns:a16="http://schemas.microsoft.com/office/drawing/2014/main" id="{ED8A9097-3781-480B-8EA6-66A0EFFD1B0C}"/>
                 </a:ext>
               </a:extLst>
             </p:cNvPr>
@@ -5786,7 +5786,7 @@
             <p:cNvPr id="14" name="Flowchart: Decision 13">
               <a:extLst>
                 <a:ext uri="{FF2B5EF4-FFF2-40B4-BE49-F238E27FC236}">
-                  <a16:creationId xmlns:a16="http://schemas.microsoft.com/office/drawing/2014/main" id="{FC301A33-6B6C-4638-8E7B-D2120989BE20}"/>
+                  <a16:creationId xmlns="" xmlns:a16="http://schemas.microsoft.com/office/drawing/2014/main" id="{FC301A33-6B6C-4638-8E7B-D2120989BE20}"/>
                 </a:ext>
               </a:extLst>
             </p:cNvPr>
@@ -5833,7 +5833,7 @@
           <p:cNvPr id="21" name="Group 20">
             <a:extLst>
               <a:ext uri="{FF2B5EF4-FFF2-40B4-BE49-F238E27FC236}">
-                <a16:creationId xmlns:a16="http://schemas.microsoft.com/office/drawing/2014/main" id="{84119507-443D-45EE-86E7-FA578222D438}"/>
+                <a16:creationId xmlns="" xmlns:a16="http://schemas.microsoft.com/office/drawing/2014/main" id="{84119507-443D-45EE-86E7-FA578222D438}"/>
               </a:ext>
             </a:extLst>
           </p:cNvPr>
@@ -5853,7 +5853,7 @@
             <p:cNvPr id="8" name="Rectangle 7">
               <a:extLst>
                 <a:ext uri="{FF2B5EF4-FFF2-40B4-BE49-F238E27FC236}">
-                  <a16:creationId xmlns:a16="http://schemas.microsoft.com/office/drawing/2014/main" id="{AFEE3931-10A1-4CDD-810D-FC9109934B99}"/>
+                  <a16:creationId xmlns="" xmlns:a16="http://schemas.microsoft.com/office/drawing/2014/main" id="{AFEE3931-10A1-4CDD-810D-FC9109934B99}"/>
                 </a:ext>
               </a:extLst>
             </p:cNvPr>
@@ -5902,7 +5902,7 @@
             <p:cNvPr id="16" name="Flowchart: Decision 15">
               <a:extLst>
                 <a:ext uri="{FF2B5EF4-FFF2-40B4-BE49-F238E27FC236}">
-                  <a16:creationId xmlns:a16="http://schemas.microsoft.com/office/drawing/2014/main" id="{4E597F90-8639-4F18-85CF-7F9254DB3317}"/>
+                  <a16:creationId xmlns="" xmlns:a16="http://schemas.microsoft.com/office/drawing/2014/main" id="{4E597F90-8639-4F18-85CF-7F9254DB3317}"/>
                 </a:ext>
               </a:extLst>
             </p:cNvPr>
@@ -5949,7 +5949,7 @@
           <p:cNvPr id="22" name="Group 21">
             <a:extLst>
               <a:ext uri="{FF2B5EF4-FFF2-40B4-BE49-F238E27FC236}">
-                <a16:creationId xmlns:a16="http://schemas.microsoft.com/office/drawing/2014/main" id="{D3172953-4DC1-4408-A686-B915B758B219}"/>
+                <a16:creationId xmlns="" xmlns:a16="http://schemas.microsoft.com/office/drawing/2014/main" id="{D3172953-4DC1-4408-A686-B915B758B219}"/>
               </a:ext>
             </a:extLst>
           </p:cNvPr>
@@ -5969,7 +5969,7 @@
             <p:cNvPr id="9" name="Rectangle 8">
               <a:extLst>
                 <a:ext uri="{FF2B5EF4-FFF2-40B4-BE49-F238E27FC236}">
-                  <a16:creationId xmlns:a16="http://schemas.microsoft.com/office/drawing/2014/main" id="{EFA74233-BA2E-456A-86AA-CF07F73244F1}"/>
+                  <a16:creationId xmlns="" xmlns:a16="http://schemas.microsoft.com/office/drawing/2014/main" id="{EFA74233-BA2E-456A-86AA-CF07F73244F1}"/>
                 </a:ext>
               </a:extLst>
             </p:cNvPr>
@@ -6018,7 +6018,7 @@
             <p:cNvPr id="17" name="Flowchart: Decision 16">
               <a:extLst>
                 <a:ext uri="{FF2B5EF4-FFF2-40B4-BE49-F238E27FC236}">
-                  <a16:creationId xmlns:a16="http://schemas.microsoft.com/office/drawing/2014/main" id="{92959D0E-74B4-4C6C-828D-74F2B6A3D47C}"/>
+                  <a16:creationId xmlns="" xmlns:a16="http://schemas.microsoft.com/office/drawing/2014/main" id="{92959D0E-74B4-4C6C-828D-74F2B6A3D47C}"/>
                 </a:ext>
               </a:extLst>
             </p:cNvPr>
@@ -6065,7 +6065,7 @@
           <p:cNvPr id="18" name="Flowchart: Decision 17">
             <a:extLst>
               <a:ext uri="{FF2B5EF4-FFF2-40B4-BE49-F238E27FC236}">
-                <a16:creationId xmlns:a16="http://schemas.microsoft.com/office/drawing/2014/main" id="{210DC1B3-53F0-4298-B209-CB2117756721}"/>
+                <a16:creationId xmlns="" xmlns:a16="http://schemas.microsoft.com/office/drawing/2014/main" id="{210DC1B3-53F0-4298-B209-CB2117756721}"/>
               </a:ext>
             </a:extLst>
           </p:cNvPr>
@@ -6111,7 +6111,7 @@
           <p:cNvPr id="23" name="TextBox 22">
             <a:extLst>
               <a:ext uri="{FF2B5EF4-FFF2-40B4-BE49-F238E27FC236}">
-                <a16:creationId xmlns:a16="http://schemas.microsoft.com/office/drawing/2014/main" id="{E661C252-6A24-4EB1-8618-EC5A6E2ECFDD}"/>
+                <a16:creationId xmlns="" xmlns:a16="http://schemas.microsoft.com/office/drawing/2014/main" id="{E661C252-6A24-4EB1-8618-EC5A6E2ECFDD}"/>
               </a:ext>
             </a:extLst>
           </p:cNvPr>
@@ -6150,7 +6150,7 @@
           <p:cNvPr id="24" name="TextBox 23">
             <a:extLst>
               <a:ext uri="{FF2B5EF4-FFF2-40B4-BE49-F238E27FC236}">
-                <a16:creationId xmlns:a16="http://schemas.microsoft.com/office/drawing/2014/main" id="{F7314EE0-3A67-4C86-892A-2F68B23DA8DE}"/>
+                <a16:creationId xmlns="" xmlns:a16="http://schemas.microsoft.com/office/drawing/2014/main" id="{F7314EE0-3A67-4C86-892A-2F68B23DA8DE}"/>
               </a:ext>
             </a:extLst>
           </p:cNvPr>
@@ -6189,7 +6189,7 @@
           <p:cNvPr id="25" name="TextBox 24">
             <a:extLst>
               <a:ext uri="{FF2B5EF4-FFF2-40B4-BE49-F238E27FC236}">
-                <a16:creationId xmlns:a16="http://schemas.microsoft.com/office/drawing/2014/main" id="{DFC08BC7-36A6-438D-B1DC-123CBDD5C0F6}"/>
+                <a16:creationId xmlns="" xmlns:a16="http://schemas.microsoft.com/office/drawing/2014/main" id="{DFC08BC7-36A6-438D-B1DC-123CBDD5C0F6}"/>
               </a:ext>
             </a:extLst>
           </p:cNvPr>
@@ -6228,7 +6228,7 @@
           <p:cNvPr id="26" name="TextBox 25">
             <a:extLst>
               <a:ext uri="{FF2B5EF4-FFF2-40B4-BE49-F238E27FC236}">
-                <a16:creationId xmlns:a16="http://schemas.microsoft.com/office/drawing/2014/main" id="{4992DB1A-B53E-43E4-9038-42FB5B14EC93}"/>
+                <a16:creationId xmlns="" xmlns:a16="http://schemas.microsoft.com/office/drawing/2014/main" id="{4992DB1A-B53E-43E4-9038-42FB5B14EC93}"/>
               </a:ext>
             </a:extLst>
           </p:cNvPr>
@@ -6267,7 +6267,7 @@
           <p:cNvPr id="27" name="TextBox 26">
             <a:extLst>
               <a:ext uri="{FF2B5EF4-FFF2-40B4-BE49-F238E27FC236}">
-                <a16:creationId xmlns:a16="http://schemas.microsoft.com/office/drawing/2014/main" id="{8710889C-2534-4DC4-B4CE-00EC929F78F1}"/>
+                <a16:creationId xmlns="" xmlns:a16="http://schemas.microsoft.com/office/drawing/2014/main" id="{8710889C-2534-4DC4-B4CE-00EC929F78F1}"/>
               </a:ext>
             </a:extLst>
           </p:cNvPr>
@@ -6306,7 +6306,7 @@
           <p:cNvPr id="29" name="TextBox 28">
             <a:extLst>
               <a:ext uri="{FF2B5EF4-FFF2-40B4-BE49-F238E27FC236}">
-                <a16:creationId xmlns:a16="http://schemas.microsoft.com/office/drawing/2014/main" id="{31A6AF03-D01E-4FD5-90D9-8B5FFD612ECB}"/>
+                <a16:creationId xmlns="" xmlns:a16="http://schemas.microsoft.com/office/drawing/2014/main" id="{31A6AF03-D01E-4FD5-90D9-8B5FFD612ECB}"/>
               </a:ext>
             </a:extLst>
           </p:cNvPr>
@@ -6341,7 +6341,7 @@
           <p:cNvPr id="30" name="TextBox 29">
             <a:extLst>
               <a:ext uri="{FF2B5EF4-FFF2-40B4-BE49-F238E27FC236}">
-                <a16:creationId xmlns:a16="http://schemas.microsoft.com/office/drawing/2014/main" id="{B1F3D9F5-18A1-4BB4-8394-3037A1C456BE}"/>
+                <a16:creationId xmlns="" xmlns:a16="http://schemas.microsoft.com/office/drawing/2014/main" id="{B1F3D9F5-18A1-4BB4-8394-3037A1C456BE}"/>
               </a:ext>
             </a:extLst>
           </p:cNvPr>
@@ -6376,7 +6376,7 @@
           <p:cNvPr id="32" name="Straight Connector 31">
             <a:extLst>
               <a:ext uri="{FF2B5EF4-FFF2-40B4-BE49-F238E27FC236}">
-                <a16:creationId xmlns:a16="http://schemas.microsoft.com/office/drawing/2014/main" id="{C278E7B5-CACA-4CA5-BAB7-413AB76CD5F8}"/>
+                <a16:creationId xmlns="" xmlns:a16="http://schemas.microsoft.com/office/drawing/2014/main" id="{C278E7B5-CACA-4CA5-BAB7-413AB76CD5F8}"/>
               </a:ext>
             </a:extLst>
           </p:cNvPr>
@@ -6418,7 +6418,7 @@
           <p:cNvPr id="33" name="Straight Connector 32">
             <a:extLst>
               <a:ext uri="{FF2B5EF4-FFF2-40B4-BE49-F238E27FC236}">
-                <a16:creationId xmlns:a16="http://schemas.microsoft.com/office/drawing/2014/main" id="{760B251E-E9CE-466F-9A74-481074E07959}"/>
+                <a16:creationId xmlns="" xmlns:a16="http://schemas.microsoft.com/office/drawing/2014/main" id="{760B251E-E9CE-466F-9A74-481074E07959}"/>
               </a:ext>
             </a:extLst>
           </p:cNvPr>
@@ -6461,7 +6461,7 @@
           <p:cNvPr id="36" name="Straight Connector 35">
             <a:extLst>
               <a:ext uri="{FF2B5EF4-FFF2-40B4-BE49-F238E27FC236}">
-                <a16:creationId xmlns:a16="http://schemas.microsoft.com/office/drawing/2014/main" id="{4B29E178-4BBD-4573-A789-253BC7408026}"/>
+                <a16:creationId xmlns="" xmlns:a16="http://schemas.microsoft.com/office/drawing/2014/main" id="{4B29E178-4BBD-4573-A789-253BC7408026}"/>
               </a:ext>
             </a:extLst>
           </p:cNvPr>
@@ -6504,7 +6504,7 @@
           <p:cNvPr id="39" name="Straight Connector 38">
             <a:extLst>
               <a:ext uri="{FF2B5EF4-FFF2-40B4-BE49-F238E27FC236}">
-                <a16:creationId xmlns:a16="http://schemas.microsoft.com/office/drawing/2014/main" id="{1833A9CD-9D3C-4E77-BBE9-FCBD590D33A0}"/>
+                <a16:creationId xmlns="" xmlns:a16="http://schemas.microsoft.com/office/drawing/2014/main" id="{1833A9CD-9D3C-4E77-BBE9-FCBD590D33A0}"/>
               </a:ext>
             </a:extLst>
           </p:cNvPr>
@@ -6547,7 +6547,7 @@
           <p:cNvPr id="47" name="Straight Connector 46">
             <a:extLst>
               <a:ext uri="{FF2B5EF4-FFF2-40B4-BE49-F238E27FC236}">
-                <a16:creationId xmlns:a16="http://schemas.microsoft.com/office/drawing/2014/main" id="{3CCE225C-90DF-4831-BC56-FC60EC845F85}"/>
+                <a16:creationId xmlns="" xmlns:a16="http://schemas.microsoft.com/office/drawing/2014/main" id="{3CCE225C-90DF-4831-BC56-FC60EC845F85}"/>
               </a:ext>
             </a:extLst>
           </p:cNvPr>
@@ -6707,28 +6707,28 @@
                 <a:gridCol w="2628900">
                   <a:extLst>
                     <a:ext uri="{9D8B030D-6E8A-4147-A177-3AD203B41FA5}">
-                      <a16:colId xmlns:a16="http://schemas.microsoft.com/office/drawing/2014/main" val="20000"/>
+                      <a16:colId xmlns="" xmlns:a16="http://schemas.microsoft.com/office/drawing/2014/main" val="20000"/>
                     </a:ext>
                   </a:extLst>
                 </a:gridCol>
                 <a:gridCol w="2628900">
                   <a:extLst>
                     <a:ext uri="{9D8B030D-6E8A-4147-A177-3AD203B41FA5}">
-                      <a16:colId xmlns:a16="http://schemas.microsoft.com/office/drawing/2014/main" val="20001"/>
+                      <a16:colId xmlns="" xmlns:a16="http://schemas.microsoft.com/office/drawing/2014/main" val="20001"/>
                     </a:ext>
                   </a:extLst>
                 </a:gridCol>
                 <a:gridCol w="2628900">
                   <a:extLst>
                     <a:ext uri="{9D8B030D-6E8A-4147-A177-3AD203B41FA5}">
-                      <a16:colId xmlns:a16="http://schemas.microsoft.com/office/drawing/2014/main" val="20002"/>
+                      <a16:colId xmlns="" xmlns:a16="http://schemas.microsoft.com/office/drawing/2014/main" val="20002"/>
                     </a:ext>
                   </a:extLst>
                 </a:gridCol>
                 <a:gridCol w="2628900">
                   <a:extLst>
                     <a:ext uri="{9D8B030D-6E8A-4147-A177-3AD203B41FA5}">
-                      <a16:colId xmlns:a16="http://schemas.microsoft.com/office/drawing/2014/main" val="20003"/>
+                      <a16:colId xmlns="" xmlns:a16="http://schemas.microsoft.com/office/drawing/2014/main" val="20003"/>
                     </a:ext>
                   </a:extLst>
                 </a:gridCol>
@@ -6793,7 +6793,7 @@
                 </a:tc>
                 <a:extLst>
                   <a:ext uri="{0D108BD9-81ED-4DB2-BD59-A6C34878D82A}">
-                    <a16:rowId xmlns:a16="http://schemas.microsoft.com/office/drawing/2014/main" val="10000"/>
+                    <a16:rowId xmlns="" xmlns:a16="http://schemas.microsoft.com/office/drawing/2014/main" val="10000"/>
                   </a:ext>
                 </a:extLst>
               </a:tr>
@@ -6852,7 +6852,7 @@
                 </a:tc>
                 <a:extLst>
                   <a:ext uri="{0D108BD9-81ED-4DB2-BD59-A6C34878D82A}">
-                    <a16:rowId xmlns:a16="http://schemas.microsoft.com/office/drawing/2014/main" val="10001"/>
+                    <a16:rowId xmlns="" xmlns:a16="http://schemas.microsoft.com/office/drawing/2014/main" val="10001"/>
                   </a:ext>
                 </a:extLst>
               </a:tr>
@@ -6915,7 +6915,7 @@
                 </a:tc>
                 <a:extLst>
                   <a:ext uri="{0D108BD9-81ED-4DB2-BD59-A6C34878D82A}">
-                    <a16:rowId xmlns:a16="http://schemas.microsoft.com/office/drawing/2014/main" val="10002"/>
+                    <a16:rowId xmlns="" xmlns:a16="http://schemas.microsoft.com/office/drawing/2014/main" val="10002"/>
                   </a:ext>
                 </a:extLst>
               </a:tr>
@@ -6978,7 +6978,7 @@
                 </a:tc>
                 <a:extLst>
                   <a:ext uri="{0D108BD9-81ED-4DB2-BD59-A6C34878D82A}">
-                    <a16:rowId xmlns:a16="http://schemas.microsoft.com/office/drawing/2014/main" val="10003"/>
+                    <a16:rowId xmlns="" xmlns:a16="http://schemas.microsoft.com/office/drawing/2014/main" val="10003"/>
                   </a:ext>
                 </a:extLst>
               </a:tr>
@@ -7037,7 +7037,7 @@
                 </a:tc>
                 <a:extLst>
                   <a:ext uri="{0D108BD9-81ED-4DB2-BD59-A6C34878D82A}">
-                    <a16:rowId xmlns:a16="http://schemas.microsoft.com/office/drawing/2014/main" val="10004"/>
+                    <a16:rowId xmlns="" xmlns:a16="http://schemas.microsoft.com/office/drawing/2014/main" val="10004"/>
                   </a:ext>
                 </a:extLst>
               </a:tr>
@@ -7096,7 +7096,7 @@
                 </a:tc>
                 <a:extLst>
                   <a:ext uri="{0D108BD9-81ED-4DB2-BD59-A6C34878D82A}">
-                    <a16:rowId xmlns:a16="http://schemas.microsoft.com/office/drawing/2014/main" val="10005"/>
+                    <a16:rowId xmlns="" xmlns:a16="http://schemas.microsoft.com/office/drawing/2014/main" val="10005"/>
                   </a:ext>
                 </a:extLst>
               </a:tr>
@@ -7156,7 +7156,7 @@
                 </a:tc>
                 <a:extLst>
                   <a:ext uri="{0D108BD9-81ED-4DB2-BD59-A6C34878D82A}">
-                    <a16:rowId xmlns:a16="http://schemas.microsoft.com/office/drawing/2014/main" val="10006"/>
+                    <a16:rowId xmlns="" xmlns:a16="http://schemas.microsoft.com/office/drawing/2014/main" val="10006"/>
                   </a:ext>
                 </a:extLst>
               </a:tr>
@@ -7250,28 +7250,28 @@
                 <a:gridCol w="2628900">
                   <a:extLst>
                     <a:ext uri="{9D8B030D-6E8A-4147-A177-3AD203B41FA5}">
-                      <a16:colId xmlns:a16="http://schemas.microsoft.com/office/drawing/2014/main" val="20000"/>
+                      <a16:colId xmlns="" xmlns:a16="http://schemas.microsoft.com/office/drawing/2014/main" val="20000"/>
                     </a:ext>
                   </a:extLst>
                 </a:gridCol>
                 <a:gridCol w="2628900">
                   <a:extLst>
                     <a:ext uri="{9D8B030D-6E8A-4147-A177-3AD203B41FA5}">
-                      <a16:colId xmlns:a16="http://schemas.microsoft.com/office/drawing/2014/main" val="20001"/>
+                      <a16:colId xmlns="" xmlns:a16="http://schemas.microsoft.com/office/drawing/2014/main" val="20001"/>
                     </a:ext>
                   </a:extLst>
                 </a:gridCol>
                 <a:gridCol w="2628900">
                   <a:extLst>
                     <a:ext uri="{9D8B030D-6E8A-4147-A177-3AD203B41FA5}">
-                      <a16:colId xmlns:a16="http://schemas.microsoft.com/office/drawing/2014/main" val="20002"/>
+                      <a16:colId xmlns="" xmlns:a16="http://schemas.microsoft.com/office/drawing/2014/main" val="20002"/>
                     </a:ext>
                   </a:extLst>
                 </a:gridCol>
                 <a:gridCol w="2628900">
                   <a:extLst>
                     <a:ext uri="{9D8B030D-6E8A-4147-A177-3AD203B41FA5}">
-                      <a16:colId xmlns:a16="http://schemas.microsoft.com/office/drawing/2014/main" val="20003"/>
+                      <a16:colId xmlns="" xmlns:a16="http://schemas.microsoft.com/office/drawing/2014/main" val="20003"/>
                     </a:ext>
                   </a:extLst>
                 </a:gridCol>
@@ -7336,7 +7336,7 @@
                 </a:tc>
                 <a:extLst>
                   <a:ext uri="{0D108BD9-81ED-4DB2-BD59-A6C34878D82A}">
-                    <a16:rowId xmlns:a16="http://schemas.microsoft.com/office/drawing/2014/main" val="10000"/>
+                    <a16:rowId xmlns="" xmlns:a16="http://schemas.microsoft.com/office/drawing/2014/main" val="10000"/>
                   </a:ext>
                 </a:extLst>
               </a:tr>
@@ -7399,7 +7399,7 @@
                 </a:tc>
                 <a:extLst>
                   <a:ext uri="{0D108BD9-81ED-4DB2-BD59-A6C34878D82A}">
-                    <a16:rowId xmlns:a16="http://schemas.microsoft.com/office/drawing/2014/main" val="10001"/>
+                    <a16:rowId xmlns="" xmlns:a16="http://schemas.microsoft.com/office/drawing/2014/main" val="10001"/>
                   </a:ext>
                 </a:extLst>
               </a:tr>
@@ -7470,7 +7470,7 @@
                 </a:tc>
                 <a:extLst>
                   <a:ext uri="{0D108BD9-81ED-4DB2-BD59-A6C34878D82A}">
-                    <a16:rowId xmlns:a16="http://schemas.microsoft.com/office/drawing/2014/main" val="10002"/>
+                    <a16:rowId xmlns="" xmlns:a16="http://schemas.microsoft.com/office/drawing/2014/main" val="10002"/>
                   </a:ext>
                 </a:extLst>
               </a:tr>
@@ -7529,7 +7529,7 @@
                 </a:tc>
                 <a:extLst>
                   <a:ext uri="{0D108BD9-81ED-4DB2-BD59-A6C34878D82A}">
-                    <a16:rowId xmlns:a16="http://schemas.microsoft.com/office/drawing/2014/main" val="10003"/>
+                    <a16:rowId xmlns="" xmlns:a16="http://schemas.microsoft.com/office/drawing/2014/main" val="10003"/>
                   </a:ext>
                 </a:extLst>
               </a:tr>
@@ -7600,7 +7600,7 @@
                 </a:tc>
                 <a:extLst>
                   <a:ext uri="{0D108BD9-81ED-4DB2-BD59-A6C34878D82A}">
-                    <a16:rowId xmlns:a16="http://schemas.microsoft.com/office/drawing/2014/main" val="10004"/>
+                    <a16:rowId xmlns="" xmlns:a16="http://schemas.microsoft.com/office/drawing/2014/main" val="10004"/>
                   </a:ext>
                 </a:extLst>
               </a:tr>
@@ -7659,7 +7659,7 @@
                 </a:tc>
                 <a:extLst>
                   <a:ext uri="{0D108BD9-81ED-4DB2-BD59-A6C34878D82A}">
-                    <a16:rowId xmlns:a16="http://schemas.microsoft.com/office/drawing/2014/main" val="10005"/>
+                    <a16:rowId xmlns="" xmlns:a16="http://schemas.microsoft.com/office/drawing/2014/main" val="10005"/>
                   </a:ext>
                 </a:extLst>
               </a:tr>
@@ -7722,7 +7722,7 @@
                 </a:tc>
                 <a:extLst>
                   <a:ext uri="{0D108BD9-81ED-4DB2-BD59-A6C34878D82A}">
-                    <a16:rowId xmlns:a16="http://schemas.microsoft.com/office/drawing/2014/main" val="10006"/>
+                    <a16:rowId xmlns="" xmlns:a16="http://schemas.microsoft.com/office/drawing/2014/main" val="10006"/>
                   </a:ext>
                 </a:extLst>
               </a:tr>
@@ -7782,7 +7782,7 @@
                 </a:tc>
                 <a:extLst>
                   <a:ext uri="{0D108BD9-81ED-4DB2-BD59-A6C34878D82A}">
-                    <a16:rowId xmlns:a16="http://schemas.microsoft.com/office/drawing/2014/main" val="10007"/>
+                    <a16:rowId xmlns="" xmlns:a16="http://schemas.microsoft.com/office/drawing/2014/main" val="10007"/>
                   </a:ext>
                 </a:extLst>
               </a:tr>
@@ -7876,28 +7876,28 @@
                 <a:gridCol w="2628900">
                   <a:extLst>
                     <a:ext uri="{9D8B030D-6E8A-4147-A177-3AD203B41FA5}">
-                      <a16:colId xmlns:a16="http://schemas.microsoft.com/office/drawing/2014/main" val="20000"/>
+                      <a16:colId xmlns="" xmlns:a16="http://schemas.microsoft.com/office/drawing/2014/main" val="20000"/>
                     </a:ext>
                   </a:extLst>
                 </a:gridCol>
                 <a:gridCol w="2628900">
                   <a:extLst>
                     <a:ext uri="{9D8B030D-6E8A-4147-A177-3AD203B41FA5}">
-                      <a16:colId xmlns:a16="http://schemas.microsoft.com/office/drawing/2014/main" val="20001"/>
+                      <a16:colId xmlns="" xmlns:a16="http://schemas.microsoft.com/office/drawing/2014/main" val="20001"/>
                     </a:ext>
                   </a:extLst>
                 </a:gridCol>
                 <a:gridCol w="2628900">
                   <a:extLst>
                     <a:ext uri="{9D8B030D-6E8A-4147-A177-3AD203B41FA5}">
-                      <a16:colId xmlns:a16="http://schemas.microsoft.com/office/drawing/2014/main" val="20002"/>
+                      <a16:colId xmlns="" xmlns:a16="http://schemas.microsoft.com/office/drawing/2014/main" val="20002"/>
                     </a:ext>
                   </a:extLst>
                 </a:gridCol>
                 <a:gridCol w="2628900">
                   <a:extLst>
                     <a:ext uri="{9D8B030D-6E8A-4147-A177-3AD203B41FA5}">
-                      <a16:colId xmlns:a16="http://schemas.microsoft.com/office/drawing/2014/main" val="20003"/>
+                      <a16:colId xmlns="" xmlns:a16="http://schemas.microsoft.com/office/drawing/2014/main" val="20003"/>
                     </a:ext>
                   </a:extLst>
                 </a:gridCol>
@@ -7962,7 +7962,7 @@
                 </a:tc>
                 <a:extLst>
                   <a:ext uri="{0D108BD9-81ED-4DB2-BD59-A6C34878D82A}">
-                    <a16:rowId xmlns:a16="http://schemas.microsoft.com/office/drawing/2014/main" val="10000"/>
+                    <a16:rowId xmlns="" xmlns:a16="http://schemas.microsoft.com/office/drawing/2014/main" val="10000"/>
                   </a:ext>
                 </a:extLst>
               </a:tr>
@@ -8033,7 +8033,7 @@
                 </a:tc>
                 <a:extLst>
                   <a:ext uri="{0D108BD9-81ED-4DB2-BD59-A6C34878D82A}">
-                    <a16:rowId xmlns:a16="http://schemas.microsoft.com/office/drawing/2014/main" val="10001"/>
+                    <a16:rowId xmlns="" xmlns:a16="http://schemas.microsoft.com/office/drawing/2014/main" val="10001"/>
                   </a:ext>
                 </a:extLst>
               </a:tr>
@@ -8104,7 +8104,7 @@
                 </a:tc>
                 <a:extLst>
                   <a:ext uri="{0D108BD9-81ED-4DB2-BD59-A6C34878D82A}">
-                    <a16:rowId xmlns:a16="http://schemas.microsoft.com/office/drawing/2014/main" val="10002"/>
+                    <a16:rowId xmlns="" xmlns:a16="http://schemas.microsoft.com/office/drawing/2014/main" val="10002"/>
                   </a:ext>
                 </a:extLst>
               </a:tr>
@@ -8175,7 +8175,7 @@
                 </a:tc>
                 <a:extLst>
                   <a:ext uri="{0D108BD9-81ED-4DB2-BD59-A6C34878D82A}">
-                    <a16:rowId xmlns:a16="http://schemas.microsoft.com/office/drawing/2014/main" val="10003"/>
+                    <a16:rowId xmlns="" xmlns:a16="http://schemas.microsoft.com/office/drawing/2014/main" val="10003"/>
                   </a:ext>
                 </a:extLst>
               </a:tr>
@@ -8234,7 +8234,7 @@
                 </a:tc>
                 <a:extLst>
                   <a:ext uri="{0D108BD9-81ED-4DB2-BD59-A6C34878D82A}">
-                    <a16:rowId xmlns:a16="http://schemas.microsoft.com/office/drawing/2014/main" val="10004"/>
+                    <a16:rowId xmlns="" xmlns:a16="http://schemas.microsoft.com/office/drawing/2014/main" val="10004"/>
                   </a:ext>
                 </a:extLst>
               </a:tr>
@@ -8293,7 +8293,7 @@
                 </a:tc>
                 <a:extLst>
                   <a:ext uri="{0D108BD9-81ED-4DB2-BD59-A6C34878D82A}">
-                    <a16:rowId xmlns:a16="http://schemas.microsoft.com/office/drawing/2014/main" val="10005"/>
+                    <a16:rowId xmlns="" xmlns:a16="http://schemas.microsoft.com/office/drawing/2014/main" val="10005"/>
                   </a:ext>
                 </a:extLst>
               </a:tr>
@@ -12842,7 +12842,7 @@
           <p:cNvPr id="2" name="Title 1">
             <a:extLst>
               <a:ext uri="{FF2B5EF4-FFF2-40B4-BE49-F238E27FC236}">
-                <a16:creationId xmlns:a16="http://schemas.microsoft.com/office/drawing/2014/main" id="{5ADC56FF-B4DC-4FF6-8C43-32D010FD16AF}"/>
+                <a16:creationId xmlns="" xmlns:a16="http://schemas.microsoft.com/office/drawing/2014/main" id="{5ADC56FF-B4DC-4FF6-8C43-32D010FD16AF}"/>
               </a:ext>
             </a:extLst>
           </p:cNvPr>
@@ -13228,7 +13228,7 @@
           <p:cNvPr id="50" name="Group 49">
             <a:extLst>
               <a:ext uri="{FF2B5EF4-FFF2-40B4-BE49-F238E27FC236}">
-                <a16:creationId xmlns:a16="http://schemas.microsoft.com/office/drawing/2014/main" id="{A51CCD7C-E0FB-4561-9ECB-21FA3B0B6011}"/>
+                <a16:creationId xmlns="" xmlns:a16="http://schemas.microsoft.com/office/drawing/2014/main" id="{A51CCD7C-E0FB-4561-9ECB-21FA3B0B6011}"/>
               </a:ext>
             </a:extLst>
           </p:cNvPr>
@@ -13248,7 +13248,7 @@
             <p:cNvPr id="47" name="Picture 46">
               <a:extLst>
                 <a:ext uri="{FF2B5EF4-FFF2-40B4-BE49-F238E27FC236}">
-                  <a16:creationId xmlns:a16="http://schemas.microsoft.com/office/drawing/2014/main" id="{01223F7B-10CE-4717-82FD-54FCB975B5B3}"/>
+                  <a16:creationId xmlns="" xmlns:a16="http://schemas.microsoft.com/office/drawing/2014/main" id="{01223F7B-10CE-4717-82FD-54FCB975B5B3}"/>
                 </a:ext>
               </a:extLst>
             </p:cNvPr>
@@ -13278,7 +13278,7 @@
             <p:cNvPr id="49" name="Rectangle 48">
               <a:extLst>
                 <a:ext uri="{FF2B5EF4-FFF2-40B4-BE49-F238E27FC236}">
-                  <a16:creationId xmlns:a16="http://schemas.microsoft.com/office/drawing/2014/main" id="{D108285C-25BE-499E-9547-DE13717298E7}"/>
+                  <a16:creationId xmlns="" xmlns:a16="http://schemas.microsoft.com/office/drawing/2014/main" id="{D108285C-25BE-499E-9547-DE13717298E7}"/>
                 </a:ext>
               </a:extLst>
             </p:cNvPr>
@@ -13314,7 +13314,7 @@
           <p:cNvPr id="52" name="Oval 51">
             <a:extLst>
               <a:ext uri="{FF2B5EF4-FFF2-40B4-BE49-F238E27FC236}">
-                <a16:creationId xmlns:a16="http://schemas.microsoft.com/office/drawing/2014/main" id="{E0BF3096-B959-4382-A27C-4DDB205490B2}"/>
+                <a16:creationId xmlns="" xmlns:a16="http://schemas.microsoft.com/office/drawing/2014/main" id="{E0BF3096-B959-4382-A27C-4DDB205490B2}"/>
               </a:ext>
             </a:extLst>
           </p:cNvPr>
@@ -13363,7 +13363,7 @@
           <p:cNvPr id="53" name="Oval 52">
             <a:extLst>
               <a:ext uri="{FF2B5EF4-FFF2-40B4-BE49-F238E27FC236}">
-                <a16:creationId xmlns:a16="http://schemas.microsoft.com/office/drawing/2014/main" id="{FDC57CFA-8D25-4707-B3DB-E4E532673A0A}"/>
+                <a16:creationId xmlns="" xmlns:a16="http://schemas.microsoft.com/office/drawing/2014/main" id="{FDC57CFA-8D25-4707-B3DB-E4E532673A0A}"/>
               </a:ext>
             </a:extLst>
           </p:cNvPr>
@@ -13412,7 +13412,7 @@
           <p:cNvPr id="54" name="Oval 53">
             <a:extLst>
               <a:ext uri="{FF2B5EF4-FFF2-40B4-BE49-F238E27FC236}">
-                <a16:creationId xmlns:a16="http://schemas.microsoft.com/office/drawing/2014/main" id="{345DB287-9B46-4514-AC05-9E3901CC17ED}"/>
+                <a16:creationId xmlns="" xmlns:a16="http://schemas.microsoft.com/office/drawing/2014/main" id="{345DB287-9B46-4514-AC05-9E3901CC17ED}"/>
               </a:ext>
             </a:extLst>
           </p:cNvPr>
@@ -13461,7 +13461,7 @@
           <p:cNvPr id="66" name="Straight Arrow Connector 33">
             <a:extLst>
               <a:ext uri="{FF2B5EF4-FFF2-40B4-BE49-F238E27FC236}">
-                <a16:creationId xmlns:a16="http://schemas.microsoft.com/office/drawing/2014/main" id="{870FF5B4-0094-43D7-B747-D0F9EC5A425A}"/>
+                <a16:creationId xmlns="" xmlns:a16="http://schemas.microsoft.com/office/drawing/2014/main" id="{870FF5B4-0094-43D7-B747-D0F9EC5A425A}"/>
               </a:ext>
             </a:extLst>
           </p:cNvPr>
@@ -13507,7 +13507,7 @@
           <p:cNvPr id="74" name="Straight Arrow Connector 73">
             <a:extLst>
               <a:ext uri="{FF2B5EF4-FFF2-40B4-BE49-F238E27FC236}">
-                <a16:creationId xmlns:a16="http://schemas.microsoft.com/office/drawing/2014/main" id="{25DC6E09-766C-435A-9947-62A270F44579}"/>
+                <a16:creationId xmlns="" xmlns:a16="http://schemas.microsoft.com/office/drawing/2014/main" id="{25DC6E09-766C-435A-9947-62A270F44579}"/>
               </a:ext>
             </a:extLst>
           </p:cNvPr>
@@ -13555,7 +13555,7 @@
           <p:cNvPr id="83" name="Straight Arrow Connector 82">
             <a:extLst>
               <a:ext uri="{FF2B5EF4-FFF2-40B4-BE49-F238E27FC236}">
-                <a16:creationId xmlns:a16="http://schemas.microsoft.com/office/drawing/2014/main" id="{7673F6C5-5DA1-42DB-9BD1-DB5C15D667E7}"/>
+                <a16:creationId xmlns="" xmlns:a16="http://schemas.microsoft.com/office/drawing/2014/main" id="{7673F6C5-5DA1-42DB-9BD1-DB5C15D667E7}"/>
               </a:ext>
             </a:extLst>
           </p:cNvPr>
@@ -13900,7 +13900,7 @@
   <a:extraClrSchemeLst/>
   <a:extLst>
     <a:ext uri="{05A4C25C-085E-4340-85A3-A5531E510DB2}">
-      <thm15:themeFamily xmlns:thm15="http://schemas.microsoft.com/office/thememl/2012/main" name="Office Theme" id="{62F939B6-93AF-4DB8-9C6B-D6C7DFDC589F}" vid="{4A3C46E8-61CC-4603-A589-7422A47A8E4A}"/>
+      <thm15:themeFamily xmlns="" xmlns:thm15="http://schemas.microsoft.com/office/thememl/2012/main" name="Office Theme" id="{62F939B6-93AF-4DB8-9C6B-D6C7DFDC589F}" vid="{4A3C46E8-61CC-4603-A589-7422A47A8E4A}"/>
     </a:ext>
   </a:extLst>
 </a:theme>

</xml_diff>

<commit_message>
Updating first draft and starting references folder
</commit_message>
<xml_diff>
--- a/Documentation/Architecture.pptx
+++ b/Documentation/Architecture.pptx
@@ -15,11 +15,12 @@
     <p:sldId id="262" r:id="rId9"/>
     <p:sldId id="258" r:id="rId10"/>
     <p:sldId id="269" r:id="rId11"/>
-    <p:sldId id="270" r:id="rId12"/>
-    <p:sldId id="257" r:id="rId13"/>
-    <p:sldId id="266" r:id="rId14"/>
-    <p:sldId id="267" r:id="rId15"/>
-    <p:sldId id="268" r:id="rId16"/>
+    <p:sldId id="271" r:id="rId12"/>
+    <p:sldId id="270" r:id="rId13"/>
+    <p:sldId id="257" r:id="rId14"/>
+    <p:sldId id="266" r:id="rId15"/>
+    <p:sldId id="267" r:id="rId16"/>
+    <p:sldId id="268" r:id="rId17"/>
   </p:sldIdLst>
   <p:sldSz cx="12192000" cy="6858000"/>
   <p:notesSz cx="6858000" cy="9144000"/>
@@ -120,7 +121,7 @@
   </p:defaultTextStyle>
   <p:extLst>
     <p:ext uri="{EFAFB233-063F-42B5-8137-9DF3F51BA10A}">
-      <p15:sldGuideLst xmlns="" xmlns:p15="http://schemas.microsoft.com/office/powerpoint/2012/main">
+      <p15:sldGuideLst xmlns:p15="http://schemas.microsoft.com/office/powerpoint/2012/main">
         <p15:guide id="1" orient="horz" pos="2160">
           <p15:clr>
             <a:srgbClr val="A4A3A4"/>
@@ -159,7 +160,7 @@
           <p:cNvPr id="2" name="Title 1">
             <a:extLst>
               <a:ext uri="{FF2B5EF4-FFF2-40B4-BE49-F238E27FC236}">
-                <a16:creationId xmlns="" xmlns:a16="http://schemas.microsoft.com/office/drawing/2014/main" id="{0208DEFD-B3C0-4D12-817A-672980A0AB83}"/>
+                <a16:creationId xmlns:a16="http://schemas.microsoft.com/office/drawing/2014/main" id="{0208DEFD-B3C0-4D12-817A-672980A0AB83}"/>
               </a:ext>
             </a:extLst>
           </p:cNvPr>
@@ -196,7 +197,7 @@
           <p:cNvPr id="3" name="Subtitle 2">
             <a:extLst>
               <a:ext uri="{FF2B5EF4-FFF2-40B4-BE49-F238E27FC236}">
-                <a16:creationId xmlns="" xmlns:a16="http://schemas.microsoft.com/office/drawing/2014/main" id="{52F30D22-503B-48B4-86CB-F2B0287B54CC}"/>
+                <a16:creationId xmlns:a16="http://schemas.microsoft.com/office/drawing/2014/main" id="{52F30D22-503B-48B4-86CB-F2B0287B54CC}"/>
               </a:ext>
             </a:extLst>
           </p:cNvPr>
@@ -266,7 +267,7 @@
           <p:cNvPr id="4" name="Date Placeholder 3">
             <a:extLst>
               <a:ext uri="{FF2B5EF4-FFF2-40B4-BE49-F238E27FC236}">
-                <a16:creationId xmlns="" xmlns:a16="http://schemas.microsoft.com/office/drawing/2014/main" id="{E8D6C7CF-C878-4063-8520-28BAE75AD582}"/>
+                <a16:creationId xmlns:a16="http://schemas.microsoft.com/office/drawing/2014/main" id="{E8D6C7CF-C878-4063-8520-28BAE75AD582}"/>
               </a:ext>
             </a:extLst>
           </p:cNvPr>
@@ -284,7 +285,7 @@
           <a:p>
             <a:fld id="{79DE2D3D-0B4E-4DD7-9670-155A46B4C7D3}" type="datetimeFigureOut">
               <a:rPr lang="en-US" smtClean="0"/>
-              <a:t>4/4/2018</a:t>
+              <a:t>4/9/2018</a:t>
             </a:fld>
             <a:endParaRPr lang="en-US"/>
           </a:p>
@@ -295,7 +296,7 @@
           <p:cNvPr id="5" name="Footer Placeholder 4">
             <a:extLst>
               <a:ext uri="{FF2B5EF4-FFF2-40B4-BE49-F238E27FC236}">
-                <a16:creationId xmlns="" xmlns:a16="http://schemas.microsoft.com/office/drawing/2014/main" id="{3405CBA8-3946-4106-B7BE-1A9C679D70B1}"/>
+                <a16:creationId xmlns:a16="http://schemas.microsoft.com/office/drawing/2014/main" id="{3405CBA8-3946-4106-B7BE-1A9C679D70B1}"/>
               </a:ext>
             </a:extLst>
           </p:cNvPr>
@@ -320,7 +321,7 @@
           <p:cNvPr id="6" name="Slide Number Placeholder 5">
             <a:extLst>
               <a:ext uri="{FF2B5EF4-FFF2-40B4-BE49-F238E27FC236}">
-                <a16:creationId xmlns="" xmlns:a16="http://schemas.microsoft.com/office/drawing/2014/main" id="{EA452CDD-AB4C-46BE-AF96-A4F89F5341BB}"/>
+                <a16:creationId xmlns:a16="http://schemas.microsoft.com/office/drawing/2014/main" id="{EA452CDD-AB4C-46BE-AF96-A4F89F5341BB}"/>
               </a:ext>
             </a:extLst>
           </p:cNvPr>
@@ -379,7 +380,7 @@
           <p:cNvPr id="2" name="Title 1">
             <a:extLst>
               <a:ext uri="{FF2B5EF4-FFF2-40B4-BE49-F238E27FC236}">
-                <a16:creationId xmlns="" xmlns:a16="http://schemas.microsoft.com/office/drawing/2014/main" id="{0820BE71-470D-4418-8BBA-56BC87E53E0D}"/>
+                <a16:creationId xmlns:a16="http://schemas.microsoft.com/office/drawing/2014/main" id="{0820BE71-470D-4418-8BBA-56BC87E53E0D}"/>
               </a:ext>
             </a:extLst>
           </p:cNvPr>
@@ -407,7 +408,7 @@
           <p:cNvPr id="3" name="Vertical Text Placeholder 2">
             <a:extLst>
               <a:ext uri="{FF2B5EF4-FFF2-40B4-BE49-F238E27FC236}">
-                <a16:creationId xmlns="" xmlns:a16="http://schemas.microsoft.com/office/drawing/2014/main" id="{1CD458A7-5C48-48B1-8674-1E3B59FF0DBF}"/>
+                <a16:creationId xmlns:a16="http://schemas.microsoft.com/office/drawing/2014/main" id="{1CD458A7-5C48-48B1-8674-1E3B59FF0DBF}"/>
               </a:ext>
             </a:extLst>
           </p:cNvPr>
@@ -464,7 +465,7 @@
           <p:cNvPr id="4" name="Date Placeholder 3">
             <a:extLst>
               <a:ext uri="{FF2B5EF4-FFF2-40B4-BE49-F238E27FC236}">
-                <a16:creationId xmlns="" xmlns:a16="http://schemas.microsoft.com/office/drawing/2014/main" id="{71FF30CF-2DC0-4356-ACC2-DC5857B93045}"/>
+                <a16:creationId xmlns:a16="http://schemas.microsoft.com/office/drawing/2014/main" id="{71FF30CF-2DC0-4356-ACC2-DC5857B93045}"/>
               </a:ext>
             </a:extLst>
           </p:cNvPr>
@@ -482,7 +483,7 @@
           <a:p>
             <a:fld id="{79DE2D3D-0B4E-4DD7-9670-155A46B4C7D3}" type="datetimeFigureOut">
               <a:rPr lang="en-US" smtClean="0"/>
-              <a:t>4/4/2018</a:t>
+              <a:t>4/9/2018</a:t>
             </a:fld>
             <a:endParaRPr lang="en-US"/>
           </a:p>
@@ -493,7 +494,7 @@
           <p:cNvPr id="5" name="Footer Placeholder 4">
             <a:extLst>
               <a:ext uri="{FF2B5EF4-FFF2-40B4-BE49-F238E27FC236}">
-                <a16:creationId xmlns="" xmlns:a16="http://schemas.microsoft.com/office/drawing/2014/main" id="{C64F5D84-1880-4D66-9409-B05042B38277}"/>
+                <a16:creationId xmlns:a16="http://schemas.microsoft.com/office/drawing/2014/main" id="{C64F5D84-1880-4D66-9409-B05042B38277}"/>
               </a:ext>
             </a:extLst>
           </p:cNvPr>
@@ -518,7 +519,7 @@
           <p:cNvPr id="6" name="Slide Number Placeholder 5">
             <a:extLst>
               <a:ext uri="{FF2B5EF4-FFF2-40B4-BE49-F238E27FC236}">
-                <a16:creationId xmlns="" xmlns:a16="http://schemas.microsoft.com/office/drawing/2014/main" id="{6AEA3C71-42CA-4318-8246-5C298A025615}"/>
+                <a16:creationId xmlns:a16="http://schemas.microsoft.com/office/drawing/2014/main" id="{6AEA3C71-42CA-4318-8246-5C298A025615}"/>
               </a:ext>
             </a:extLst>
           </p:cNvPr>
@@ -577,7 +578,7 @@
           <p:cNvPr id="2" name="Vertical Title 1">
             <a:extLst>
               <a:ext uri="{FF2B5EF4-FFF2-40B4-BE49-F238E27FC236}">
-                <a16:creationId xmlns="" xmlns:a16="http://schemas.microsoft.com/office/drawing/2014/main" id="{4FC911C0-596F-406E-89F9-D86536F980CB}"/>
+                <a16:creationId xmlns:a16="http://schemas.microsoft.com/office/drawing/2014/main" id="{4FC911C0-596F-406E-89F9-D86536F980CB}"/>
               </a:ext>
             </a:extLst>
           </p:cNvPr>
@@ -610,7 +611,7 @@
           <p:cNvPr id="3" name="Vertical Text Placeholder 2">
             <a:extLst>
               <a:ext uri="{FF2B5EF4-FFF2-40B4-BE49-F238E27FC236}">
-                <a16:creationId xmlns="" xmlns:a16="http://schemas.microsoft.com/office/drawing/2014/main" id="{D3F5427C-63BC-48E8-9131-FE9C4D5F3036}"/>
+                <a16:creationId xmlns:a16="http://schemas.microsoft.com/office/drawing/2014/main" id="{D3F5427C-63BC-48E8-9131-FE9C4D5F3036}"/>
               </a:ext>
             </a:extLst>
           </p:cNvPr>
@@ -672,7 +673,7 @@
           <p:cNvPr id="4" name="Date Placeholder 3">
             <a:extLst>
               <a:ext uri="{FF2B5EF4-FFF2-40B4-BE49-F238E27FC236}">
-                <a16:creationId xmlns="" xmlns:a16="http://schemas.microsoft.com/office/drawing/2014/main" id="{35036C6B-FB42-4DE3-9515-2C21F01A41B2}"/>
+                <a16:creationId xmlns:a16="http://schemas.microsoft.com/office/drawing/2014/main" id="{35036C6B-FB42-4DE3-9515-2C21F01A41B2}"/>
               </a:ext>
             </a:extLst>
           </p:cNvPr>
@@ -690,7 +691,7 @@
           <a:p>
             <a:fld id="{79DE2D3D-0B4E-4DD7-9670-155A46B4C7D3}" type="datetimeFigureOut">
               <a:rPr lang="en-US" smtClean="0"/>
-              <a:t>4/4/2018</a:t>
+              <a:t>4/9/2018</a:t>
             </a:fld>
             <a:endParaRPr lang="en-US"/>
           </a:p>
@@ -701,7 +702,7 @@
           <p:cNvPr id="5" name="Footer Placeholder 4">
             <a:extLst>
               <a:ext uri="{FF2B5EF4-FFF2-40B4-BE49-F238E27FC236}">
-                <a16:creationId xmlns="" xmlns:a16="http://schemas.microsoft.com/office/drawing/2014/main" id="{EE5F9010-B58A-4E05-80CB-8465A102D5D3}"/>
+                <a16:creationId xmlns:a16="http://schemas.microsoft.com/office/drawing/2014/main" id="{EE5F9010-B58A-4E05-80CB-8465A102D5D3}"/>
               </a:ext>
             </a:extLst>
           </p:cNvPr>
@@ -726,7 +727,7 @@
           <p:cNvPr id="6" name="Slide Number Placeholder 5">
             <a:extLst>
               <a:ext uri="{FF2B5EF4-FFF2-40B4-BE49-F238E27FC236}">
-                <a16:creationId xmlns="" xmlns:a16="http://schemas.microsoft.com/office/drawing/2014/main" id="{8A93244B-0726-4AEF-A9D6-78C169B4EBBC}"/>
+                <a16:creationId xmlns:a16="http://schemas.microsoft.com/office/drawing/2014/main" id="{8A93244B-0726-4AEF-A9D6-78C169B4EBBC}"/>
               </a:ext>
             </a:extLst>
           </p:cNvPr>
@@ -785,7 +786,7 @@
           <p:cNvPr id="2" name="Title 1">
             <a:extLst>
               <a:ext uri="{FF2B5EF4-FFF2-40B4-BE49-F238E27FC236}">
-                <a16:creationId xmlns="" xmlns:a16="http://schemas.microsoft.com/office/drawing/2014/main" id="{E8BD4358-492D-49F4-8353-C46623D4A0DE}"/>
+                <a16:creationId xmlns:a16="http://schemas.microsoft.com/office/drawing/2014/main" id="{E8BD4358-492D-49F4-8353-C46623D4A0DE}"/>
               </a:ext>
             </a:extLst>
           </p:cNvPr>
@@ -813,7 +814,7 @@
           <p:cNvPr id="3" name="Content Placeholder 2">
             <a:extLst>
               <a:ext uri="{FF2B5EF4-FFF2-40B4-BE49-F238E27FC236}">
-                <a16:creationId xmlns="" xmlns:a16="http://schemas.microsoft.com/office/drawing/2014/main" id="{CE882704-3E1B-4A78-A667-7E5E07744BE1}"/>
+                <a16:creationId xmlns:a16="http://schemas.microsoft.com/office/drawing/2014/main" id="{CE882704-3E1B-4A78-A667-7E5E07744BE1}"/>
               </a:ext>
             </a:extLst>
           </p:cNvPr>
@@ -870,7 +871,7 @@
           <p:cNvPr id="4" name="Date Placeholder 3">
             <a:extLst>
               <a:ext uri="{FF2B5EF4-FFF2-40B4-BE49-F238E27FC236}">
-                <a16:creationId xmlns="" xmlns:a16="http://schemas.microsoft.com/office/drawing/2014/main" id="{0D08B253-52A2-4C3D-BF5D-B8E56A1A2E16}"/>
+                <a16:creationId xmlns:a16="http://schemas.microsoft.com/office/drawing/2014/main" id="{0D08B253-52A2-4C3D-BF5D-B8E56A1A2E16}"/>
               </a:ext>
             </a:extLst>
           </p:cNvPr>
@@ -888,7 +889,7 @@
           <a:p>
             <a:fld id="{79DE2D3D-0B4E-4DD7-9670-155A46B4C7D3}" type="datetimeFigureOut">
               <a:rPr lang="en-US" smtClean="0"/>
-              <a:t>4/4/2018</a:t>
+              <a:t>4/9/2018</a:t>
             </a:fld>
             <a:endParaRPr lang="en-US"/>
           </a:p>
@@ -899,7 +900,7 @@
           <p:cNvPr id="5" name="Footer Placeholder 4">
             <a:extLst>
               <a:ext uri="{FF2B5EF4-FFF2-40B4-BE49-F238E27FC236}">
-                <a16:creationId xmlns="" xmlns:a16="http://schemas.microsoft.com/office/drawing/2014/main" id="{F2538AF5-D233-40C7-90BF-D5042A78432D}"/>
+                <a16:creationId xmlns:a16="http://schemas.microsoft.com/office/drawing/2014/main" id="{F2538AF5-D233-40C7-90BF-D5042A78432D}"/>
               </a:ext>
             </a:extLst>
           </p:cNvPr>
@@ -924,7 +925,7 @@
           <p:cNvPr id="6" name="Slide Number Placeholder 5">
             <a:extLst>
               <a:ext uri="{FF2B5EF4-FFF2-40B4-BE49-F238E27FC236}">
-                <a16:creationId xmlns="" xmlns:a16="http://schemas.microsoft.com/office/drawing/2014/main" id="{BBDF52CB-805F-4DFD-8CDA-7B1787FF8EEF}"/>
+                <a16:creationId xmlns:a16="http://schemas.microsoft.com/office/drawing/2014/main" id="{BBDF52CB-805F-4DFD-8CDA-7B1787FF8EEF}"/>
               </a:ext>
             </a:extLst>
           </p:cNvPr>
@@ -983,7 +984,7 @@
           <p:cNvPr id="2" name="Title 1">
             <a:extLst>
               <a:ext uri="{FF2B5EF4-FFF2-40B4-BE49-F238E27FC236}">
-                <a16:creationId xmlns="" xmlns:a16="http://schemas.microsoft.com/office/drawing/2014/main" id="{27D28634-873F-4F1F-A867-4DD9B734A08D}"/>
+                <a16:creationId xmlns:a16="http://schemas.microsoft.com/office/drawing/2014/main" id="{27D28634-873F-4F1F-A867-4DD9B734A08D}"/>
               </a:ext>
             </a:extLst>
           </p:cNvPr>
@@ -1020,7 +1021,7 @@
           <p:cNvPr id="3" name="Text Placeholder 2">
             <a:extLst>
               <a:ext uri="{FF2B5EF4-FFF2-40B4-BE49-F238E27FC236}">
-                <a16:creationId xmlns="" xmlns:a16="http://schemas.microsoft.com/office/drawing/2014/main" id="{1DECB686-6970-4E95-90E6-6FEDEDA473C2}"/>
+                <a16:creationId xmlns:a16="http://schemas.microsoft.com/office/drawing/2014/main" id="{1DECB686-6970-4E95-90E6-6FEDEDA473C2}"/>
               </a:ext>
             </a:extLst>
           </p:cNvPr>
@@ -1145,7 +1146,7 @@
           <p:cNvPr id="4" name="Date Placeholder 3">
             <a:extLst>
               <a:ext uri="{FF2B5EF4-FFF2-40B4-BE49-F238E27FC236}">
-                <a16:creationId xmlns="" xmlns:a16="http://schemas.microsoft.com/office/drawing/2014/main" id="{00FBC595-CBE7-4EA9-A885-EE14A03709FF}"/>
+                <a16:creationId xmlns:a16="http://schemas.microsoft.com/office/drawing/2014/main" id="{00FBC595-CBE7-4EA9-A885-EE14A03709FF}"/>
               </a:ext>
             </a:extLst>
           </p:cNvPr>
@@ -1163,7 +1164,7 @@
           <a:p>
             <a:fld id="{79DE2D3D-0B4E-4DD7-9670-155A46B4C7D3}" type="datetimeFigureOut">
               <a:rPr lang="en-US" smtClean="0"/>
-              <a:t>4/4/2018</a:t>
+              <a:t>4/9/2018</a:t>
             </a:fld>
             <a:endParaRPr lang="en-US"/>
           </a:p>
@@ -1174,7 +1175,7 @@
           <p:cNvPr id="5" name="Footer Placeholder 4">
             <a:extLst>
               <a:ext uri="{FF2B5EF4-FFF2-40B4-BE49-F238E27FC236}">
-                <a16:creationId xmlns="" xmlns:a16="http://schemas.microsoft.com/office/drawing/2014/main" id="{FF14EDF1-B2C2-49FE-9528-7E748E6EA3F6}"/>
+                <a16:creationId xmlns:a16="http://schemas.microsoft.com/office/drawing/2014/main" id="{FF14EDF1-B2C2-49FE-9528-7E748E6EA3F6}"/>
               </a:ext>
             </a:extLst>
           </p:cNvPr>
@@ -1199,7 +1200,7 @@
           <p:cNvPr id="6" name="Slide Number Placeholder 5">
             <a:extLst>
               <a:ext uri="{FF2B5EF4-FFF2-40B4-BE49-F238E27FC236}">
-                <a16:creationId xmlns="" xmlns:a16="http://schemas.microsoft.com/office/drawing/2014/main" id="{820E7B30-794B-44D2-9AF6-8F3EBCC924A1}"/>
+                <a16:creationId xmlns:a16="http://schemas.microsoft.com/office/drawing/2014/main" id="{820E7B30-794B-44D2-9AF6-8F3EBCC924A1}"/>
               </a:ext>
             </a:extLst>
           </p:cNvPr>
@@ -1258,7 +1259,7 @@
           <p:cNvPr id="2" name="Title 1">
             <a:extLst>
               <a:ext uri="{FF2B5EF4-FFF2-40B4-BE49-F238E27FC236}">
-                <a16:creationId xmlns="" xmlns:a16="http://schemas.microsoft.com/office/drawing/2014/main" id="{4D052C3E-728A-4E49-88AF-B7AADC9448DF}"/>
+                <a16:creationId xmlns:a16="http://schemas.microsoft.com/office/drawing/2014/main" id="{4D052C3E-728A-4E49-88AF-B7AADC9448DF}"/>
               </a:ext>
             </a:extLst>
           </p:cNvPr>
@@ -1286,7 +1287,7 @@
           <p:cNvPr id="3" name="Content Placeholder 2">
             <a:extLst>
               <a:ext uri="{FF2B5EF4-FFF2-40B4-BE49-F238E27FC236}">
-                <a16:creationId xmlns="" xmlns:a16="http://schemas.microsoft.com/office/drawing/2014/main" id="{19ABF20A-CEF3-431B-95B1-BC6709015D64}"/>
+                <a16:creationId xmlns:a16="http://schemas.microsoft.com/office/drawing/2014/main" id="{19ABF20A-CEF3-431B-95B1-BC6709015D64}"/>
               </a:ext>
             </a:extLst>
           </p:cNvPr>
@@ -1348,7 +1349,7 @@
           <p:cNvPr id="4" name="Content Placeholder 3">
             <a:extLst>
               <a:ext uri="{FF2B5EF4-FFF2-40B4-BE49-F238E27FC236}">
-                <a16:creationId xmlns="" xmlns:a16="http://schemas.microsoft.com/office/drawing/2014/main" id="{2737B622-ACD2-4627-B8FF-45D35B2633F1}"/>
+                <a16:creationId xmlns:a16="http://schemas.microsoft.com/office/drawing/2014/main" id="{2737B622-ACD2-4627-B8FF-45D35B2633F1}"/>
               </a:ext>
             </a:extLst>
           </p:cNvPr>
@@ -1410,7 +1411,7 @@
           <p:cNvPr id="5" name="Date Placeholder 4">
             <a:extLst>
               <a:ext uri="{FF2B5EF4-FFF2-40B4-BE49-F238E27FC236}">
-                <a16:creationId xmlns="" xmlns:a16="http://schemas.microsoft.com/office/drawing/2014/main" id="{42DDD691-4765-43B5-B9AD-534F1097CD33}"/>
+                <a16:creationId xmlns:a16="http://schemas.microsoft.com/office/drawing/2014/main" id="{42DDD691-4765-43B5-B9AD-534F1097CD33}"/>
               </a:ext>
             </a:extLst>
           </p:cNvPr>
@@ -1428,7 +1429,7 @@
           <a:p>
             <a:fld id="{79DE2D3D-0B4E-4DD7-9670-155A46B4C7D3}" type="datetimeFigureOut">
               <a:rPr lang="en-US" smtClean="0"/>
-              <a:t>4/4/2018</a:t>
+              <a:t>4/9/2018</a:t>
             </a:fld>
             <a:endParaRPr lang="en-US"/>
           </a:p>
@@ -1439,7 +1440,7 @@
           <p:cNvPr id="6" name="Footer Placeholder 5">
             <a:extLst>
               <a:ext uri="{FF2B5EF4-FFF2-40B4-BE49-F238E27FC236}">
-                <a16:creationId xmlns="" xmlns:a16="http://schemas.microsoft.com/office/drawing/2014/main" id="{52530E5C-8595-4F7E-B13E-A3BAFCF64E6D}"/>
+                <a16:creationId xmlns:a16="http://schemas.microsoft.com/office/drawing/2014/main" id="{52530E5C-8595-4F7E-B13E-A3BAFCF64E6D}"/>
               </a:ext>
             </a:extLst>
           </p:cNvPr>
@@ -1464,7 +1465,7 @@
           <p:cNvPr id="7" name="Slide Number Placeholder 6">
             <a:extLst>
               <a:ext uri="{FF2B5EF4-FFF2-40B4-BE49-F238E27FC236}">
-                <a16:creationId xmlns="" xmlns:a16="http://schemas.microsoft.com/office/drawing/2014/main" id="{0DB30A7B-8C52-420F-A1B6-C897CC27AA65}"/>
+                <a16:creationId xmlns:a16="http://schemas.microsoft.com/office/drawing/2014/main" id="{0DB30A7B-8C52-420F-A1B6-C897CC27AA65}"/>
               </a:ext>
             </a:extLst>
           </p:cNvPr>
@@ -1523,7 +1524,7 @@
           <p:cNvPr id="2" name="Title 1">
             <a:extLst>
               <a:ext uri="{FF2B5EF4-FFF2-40B4-BE49-F238E27FC236}">
-                <a16:creationId xmlns="" xmlns:a16="http://schemas.microsoft.com/office/drawing/2014/main" id="{E9AC60E8-9FC1-42DC-8C29-EA7465D837D0}"/>
+                <a16:creationId xmlns:a16="http://schemas.microsoft.com/office/drawing/2014/main" id="{E9AC60E8-9FC1-42DC-8C29-EA7465D837D0}"/>
               </a:ext>
             </a:extLst>
           </p:cNvPr>
@@ -1556,7 +1557,7 @@
           <p:cNvPr id="3" name="Text Placeholder 2">
             <a:extLst>
               <a:ext uri="{FF2B5EF4-FFF2-40B4-BE49-F238E27FC236}">
-                <a16:creationId xmlns="" xmlns:a16="http://schemas.microsoft.com/office/drawing/2014/main" id="{0C818A30-7FA1-4337-8120-C200A7442D75}"/>
+                <a16:creationId xmlns:a16="http://schemas.microsoft.com/office/drawing/2014/main" id="{0C818A30-7FA1-4337-8120-C200A7442D75}"/>
               </a:ext>
             </a:extLst>
           </p:cNvPr>
@@ -1627,7 +1628,7 @@
           <p:cNvPr id="4" name="Content Placeholder 3">
             <a:extLst>
               <a:ext uri="{FF2B5EF4-FFF2-40B4-BE49-F238E27FC236}">
-                <a16:creationId xmlns="" xmlns:a16="http://schemas.microsoft.com/office/drawing/2014/main" id="{9CE84CA1-F2AA-4CF1-AFDA-45D282715E23}"/>
+                <a16:creationId xmlns:a16="http://schemas.microsoft.com/office/drawing/2014/main" id="{9CE84CA1-F2AA-4CF1-AFDA-45D282715E23}"/>
               </a:ext>
             </a:extLst>
           </p:cNvPr>
@@ -1689,7 +1690,7 @@
           <p:cNvPr id="5" name="Text Placeholder 4">
             <a:extLst>
               <a:ext uri="{FF2B5EF4-FFF2-40B4-BE49-F238E27FC236}">
-                <a16:creationId xmlns="" xmlns:a16="http://schemas.microsoft.com/office/drawing/2014/main" id="{DBA3B6D1-4E3D-4DD3-9BB7-54C5D52214F5}"/>
+                <a16:creationId xmlns:a16="http://schemas.microsoft.com/office/drawing/2014/main" id="{DBA3B6D1-4E3D-4DD3-9BB7-54C5D52214F5}"/>
               </a:ext>
             </a:extLst>
           </p:cNvPr>
@@ -1760,7 +1761,7 @@
           <p:cNvPr id="6" name="Content Placeholder 5">
             <a:extLst>
               <a:ext uri="{FF2B5EF4-FFF2-40B4-BE49-F238E27FC236}">
-                <a16:creationId xmlns="" xmlns:a16="http://schemas.microsoft.com/office/drawing/2014/main" id="{E542C983-E152-4F06-8C96-7E07D0F125CD}"/>
+                <a16:creationId xmlns:a16="http://schemas.microsoft.com/office/drawing/2014/main" id="{E542C983-E152-4F06-8C96-7E07D0F125CD}"/>
               </a:ext>
             </a:extLst>
           </p:cNvPr>
@@ -1822,7 +1823,7 @@
           <p:cNvPr id="7" name="Date Placeholder 6">
             <a:extLst>
               <a:ext uri="{FF2B5EF4-FFF2-40B4-BE49-F238E27FC236}">
-                <a16:creationId xmlns="" xmlns:a16="http://schemas.microsoft.com/office/drawing/2014/main" id="{8E601059-966A-4AC8-B04D-E3BDB85FC4E2}"/>
+                <a16:creationId xmlns:a16="http://schemas.microsoft.com/office/drawing/2014/main" id="{8E601059-966A-4AC8-B04D-E3BDB85FC4E2}"/>
               </a:ext>
             </a:extLst>
           </p:cNvPr>
@@ -1840,7 +1841,7 @@
           <a:p>
             <a:fld id="{79DE2D3D-0B4E-4DD7-9670-155A46B4C7D3}" type="datetimeFigureOut">
               <a:rPr lang="en-US" smtClean="0"/>
-              <a:t>4/4/2018</a:t>
+              <a:t>4/9/2018</a:t>
             </a:fld>
             <a:endParaRPr lang="en-US"/>
           </a:p>
@@ -1851,7 +1852,7 @@
           <p:cNvPr id="8" name="Footer Placeholder 7">
             <a:extLst>
               <a:ext uri="{FF2B5EF4-FFF2-40B4-BE49-F238E27FC236}">
-                <a16:creationId xmlns="" xmlns:a16="http://schemas.microsoft.com/office/drawing/2014/main" id="{79DD1AA8-075F-40C9-9873-85A9A2D4DC98}"/>
+                <a16:creationId xmlns:a16="http://schemas.microsoft.com/office/drawing/2014/main" id="{79DD1AA8-075F-40C9-9873-85A9A2D4DC98}"/>
               </a:ext>
             </a:extLst>
           </p:cNvPr>
@@ -1876,7 +1877,7 @@
           <p:cNvPr id="9" name="Slide Number Placeholder 8">
             <a:extLst>
               <a:ext uri="{FF2B5EF4-FFF2-40B4-BE49-F238E27FC236}">
-                <a16:creationId xmlns="" xmlns:a16="http://schemas.microsoft.com/office/drawing/2014/main" id="{C179C8F9-9FC6-415C-BF20-26F3308511CF}"/>
+                <a16:creationId xmlns:a16="http://schemas.microsoft.com/office/drawing/2014/main" id="{C179C8F9-9FC6-415C-BF20-26F3308511CF}"/>
               </a:ext>
             </a:extLst>
           </p:cNvPr>
@@ -1935,7 +1936,7 @@
           <p:cNvPr id="2" name="Title 1">
             <a:extLst>
               <a:ext uri="{FF2B5EF4-FFF2-40B4-BE49-F238E27FC236}">
-                <a16:creationId xmlns="" xmlns:a16="http://schemas.microsoft.com/office/drawing/2014/main" id="{4C9581B1-453E-4AAD-9D12-D5CD21C43E28}"/>
+                <a16:creationId xmlns:a16="http://schemas.microsoft.com/office/drawing/2014/main" id="{4C9581B1-453E-4AAD-9D12-D5CD21C43E28}"/>
               </a:ext>
             </a:extLst>
           </p:cNvPr>
@@ -1963,7 +1964,7 @@
           <p:cNvPr id="3" name="Date Placeholder 2">
             <a:extLst>
               <a:ext uri="{FF2B5EF4-FFF2-40B4-BE49-F238E27FC236}">
-                <a16:creationId xmlns="" xmlns:a16="http://schemas.microsoft.com/office/drawing/2014/main" id="{19DECDA6-0FFD-4C5B-B7E6-7249068A0385}"/>
+                <a16:creationId xmlns:a16="http://schemas.microsoft.com/office/drawing/2014/main" id="{19DECDA6-0FFD-4C5B-B7E6-7249068A0385}"/>
               </a:ext>
             </a:extLst>
           </p:cNvPr>
@@ -1981,7 +1982,7 @@
           <a:p>
             <a:fld id="{79DE2D3D-0B4E-4DD7-9670-155A46B4C7D3}" type="datetimeFigureOut">
               <a:rPr lang="en-US" smtClean="0"/>
-              <a:t>4/4/2018</a:t>
+              <a:t>4/9/2018</a:t>
             </a:fld>
             <a:endParaRPr lang="en-US"/>
           </a:p>
@@ -1992,7 +1993,7 @@
           <p:cNvPr id="4" name="Footer Placeholder 3">
             <a:extLst>
               <a:ext uri="{FF2B5EF4-FFF2-40B4-BE49-F238E27FC236}">
-                <a16:creationId xmlns="" xmlns:a16="http://schemas.microsoft.com/office/drawing/2014/main" id="{51FB464C-C0C4-4823-A3E7-091DC998738E}"/>
+                <a16:creationId xmlns:a16="http://schemas.microsoft.com/office/drawing/2014/main" id="{51FB464C-C0C4-4823-A3E7-091DC998738E}"/>
               </a:ext>
             </a:extLst>
           </p:cNvPr>
@@ -2017,7 +2018,7 @@
           <p:cNvPr id="5" name="Slide Number Placeholder 4">
             <a:extLst>
               <a:ext uri="{FF2B5EF4-FFF2-40B4-BE49-F238E27FC236}">
-                <a16:creationId xmlns="" xmlns:a16="http://schemas.microsoft.com/office/drawing/2014/main" id="{D0716546-9DB4-4D0D-B586-6AC1ECAE4C07}"/>
+                <a16:creationId xmlns:a16="http://schemas.microsoft.com/office/drawing/2014/main" id="{D0716546-9DB4-4D0D-B586-6AC1ECAE4C07}"/>
               </a:ext>
             </a:extLst>
           </p:cNvPr>
@@ -2076,7 +2077,7 @@
           <p:cNvPr id="2" name="Date Placeholder 1">
             <a:extLst>
               <a:ext uri="{FF2B5EF4-FFF2-40B4-BE49-F238E27FC236}">
-                <a16:creationId xmlns="" xmlns:a16="http://schemas.microsoft.com/office/drawing/2014/main" id="{BA814E6B-A29F-4AE7-9237-6DF2A3ABBA33}"/>
+                <a16:creationId xmlns:a16="http://schemas.microsoft.com/office/drawing/2014/main" id="{BA814E6B-A29F-4AE7-9237-6DF2A3ABBA33}"/>
               </a:ext>
             </a:extLst>
           </p:cNvPr>
@@ -2094,7 +2095,7 @@
           <a:p>
             <a:fld id="{79DE2D3D-0B4E-4DD7-9670-155A46B4C7D3}" type="datetimeFigureOut">
               <a:rPr lang="en-US" smtClean="0"/>
-              <a:t>4/4/2018</a:t>
+              <a:t>4/9/2018</a:t>
             </a:fld>
             <a:endParaRPr lang="en-US"/>
           </a:p>
@@ -2105,7 +2106,7 @@
           <p:cNvPr id="3" name="Footer Placeholder 2">
             <a:extLst>
               <a:ext uri="{FF2B5EF4-FFF2-40B4-BE49-F238E27FC236}">
-                <a16:creationId xmlns="" xmlns:a16="http://schemas.microsoft.com/office/drawing/2014/main" id="{09BA391C-6DAE-4B53-B555-6CD4D8F9D2CB}"/>
+                <a16:creationId xmlns:a16="http://schemas.microsoft.com/office/drawing/2014/main" id="{09BA391C-6DAE-4B53-B555-6CD4D8F9D2CB}"/>
               </a:ext>
             </a:extLst>
           </p:cNvPr>
@@ -2130,7 +2131,7 @@
           <p:cNvPr id="4" name="Slide Number Placeholder 3">
             <a:extLst>
               <a:ext uri="{FF2B5EF4-FFF2-40B4-BE49-F238E27FC236}">
-                <a16:creationId xmlns="" xmlns:a16="http://schemas.microsoft.com/office/drawing/2014/main" id="{F625249E-BF43-4AB8-A5F0-A41CC1492ED3}"/>
+                <a16:creationId xmlns:a16="http://schemas.microsoft.com/office/drawing/2014/main" id="{F625249E-BF43-4AB8-A5F0-A41CC1492ED3}"/>
               </a:ext>
             </a:extLst>
           </p:cNvPr>
@@ -2189,7 +2190,7 @@
           <p:cNvPr id="2" name="Title 1">
             <a:extLst>
               <a:ext uri="{FF2B5EF4-FFF2-40B4-BE49-F238E27FC236}">
-                <a16:creationId xmlns="" xmlns:a16="http://schemas.microsoft.com/office/drawing/2014/main" id="{076ABC1E-EE30-473D-9843-97DA2B713DCD}"/>
+                <a16:creationId xmlns:a16="http://schemas.microsoft.com/office/drawing/2014/main" id="{076ABC1E-EE30-473D-9843-97DA2B713DCD}"/>
               </a:ext>
             </a:extLst>
           </p:cNvPr>
@@ -2226,7 +2227,7 @@
           <p:cNvPr id="3" name="Content Placeholder 2">
             <a:extLst>
               <a:ext uri="{FF2B5EF4-FFF2-40B4-BE49-F238E27FC236}">
-                <a16:creationId xmlns="" xmlns:a16="http://schemas.microsoft.com/office/drawing/2014/main" id="{BC46249D-CC42-436D-BE0D-5625D0485C24}"/>
+                <a16:creationId xmlns:a16="http://schemas.microsoft.com/office/drawing/2014/main" id="{BC46249D-CC42-436D-BE0D-5625D0485C24}"/>
               </a:ext>
             </a:extLst>
           </p:cNvPr>
@@ -2316,7 +2317,7 @@
           <p:cNvPr id="4" name="Text Placeholder 3">
             <a:extLst>
               <a:ext uri="{FF2B5EF4-FFF2-40B4-BE49-F238E27FC236}">
-                <a16:creationId xmlns="" xmlns:a16="http://schemas.microsoft.com/office/drawing/2014/main" id="{BB8F32DE-2D90-4225-849F-71A8E16108A2}"/>
+                <a16:creationId xmlns:a16="http://schemas.microsoft.com/office/drawing/2014/main" id="{BB8F32DE-2D90-4225-849F-71A8E16108A2}"/>
               </a:ext>
             </a:extLst>
           </p:cNvPr>
@@ -2387,7 +2388,7 @@
           <p:cNvPr id="5" name="Date Placeholder 4">
             <a:extLst>
               <a:ext uri="{FF2B5EF4-FFF2-40B4-BE49-F238E27FC236}">
-                <a16:creationId xmlns="" xmlns:a16="http://schemas.microsoft.com/office/drawing/2014/main" id="{81FDD5F9-4B94-4BF2-986F-B735C9B79581}"/>
+                <a16:creationId xmlns:a16="http://schemas.microsoft.com/office/drawing/2014/main" id="{81FDD5F9-4B94-4BF2-986F-B735C9B79581}"/>
               </a:ext>
             </a:extLst>
           </p:cNvPr>
@@ -2405,7 +2406,7 @@
           <a:p>
             <a:fld id="{79DE2D3D-0B4E-4DD7-9670-155A46B4C7D3}" type="datetimeFigureOut">
               <a:rPr lang="en-US" smtClean="0"/>
-              <a:t>4/4/2018</a:t>
+              <a:t>4/9/2018</a:t>
             </a:fld>
             <a:endParaRPr lang="en-US"/>
           </a:p>
@@ -2416,7 +2417,7 @@
           <p:cNvPr id="6" name="Footer Placeholder 5">
             <a:extLst>
               <a:ext uri="{FF2B5EF4-FFF2-40B4-BE49-F238E27FC236}">
-                <a16:creationId xmlns="" xmlns:a16="http://schemas.microsoft.com/office/drawing/2014/main" id="{D0408356-96AD-466E-AC30-0DCC886CEFA5}"/>
+                <a16:creationId xmlns:a16="http://schemas.microsoft.com/office/drawing/2014/main" id="{D0408356-96AD-466E-AC30-0DCC886CEFA5}"/>
               </a:ext>
             </a:extLst>
           </p:cNvPr>
@@ -2441,7 +2442,7 @@
           <p:cNvPr id="7" name="Slide Number Placeholder 6">
             <a:extLst>
               <a:ext uri="{FF2B5EF4-FFF2-40B4-BE49-F238E27FC236}">
-                <a16:creationId xmlns="" xmlns:a16="http://schemas.microsoft.com/office/drawing/2014/main" id="{68F5E96F-D5B9-4F8B-A9CC-7427EAB39A92}"/>
+                <a16:creationId xmlns:a16="http://schemas.microsoft.com/office/drawing/2014/main" id="{68F5E96F-D5B9-4F8B-A9CC-7427EAB39A92}"/>
               </a:ext>
             </a:extLst>
           </p:cNvPr>
@@ -2500,7 +2501,7 @@
           <p:cNvPr id="2" name="Title 1">
             <a:extLst>
               <a:ext uri="{FF2B5EF4-FFF2-40B4-BE49-F238E27FC236}">
-                <a16:creationId xmlns="" xmlns:a16="http://schemas.microsoft.com/office/drawing/2014/main" id="{9C0F5112-278F-44E4-87C0-4C2F8A651829}"/>
+                <a16:creationId xmlns:a16="http://schemas.microsoft.com/office/drawing/2014/main" id="{9C0F5112-278F-44E4-87C0-4C2F8A651829}"/>
               </a:ext>
             </a:extLst>
           </p:cNvPr>
@@ -2537,7 +2538,7 @@
           <p:cNvPr id="3" name="Picture Placeholder 2">
             <a:extLst>
               <a:ext uri="{FF2B5EF4-FFF2-40B4-BE49-F238E27FC236}">
-                <a16:creationId xmlns="" xmlns:a16="http://schemas.microsoft.com/office/drawing/2014/main" id="{05EA54BB-79CA-4CC9-98CE-E5D860A33729}"/>
+                <a16:creationId xmlns:a16="http://schemas.microsoft.com/office/drawing/2014/main" id="{05EA54BB-79CA-4CC9-98CE-E5D860A33729}"/>
               </a:ext>
             </a:extLst>
           </p:cNvPr>
@@ -2604,7 +2605,7 @@
           <p:cNvPr id="4" name="Text Placeholder 3">
             <a:extLst>
               <a:ext uri="{FF2B5EF4-FFF2-40B4-BE49-F238E27FC236}">
-                <a16:creationId xmlns="" xmlns:a16="http://schemas.microsoft.com/office/drawing/2014/main" id="{BE5F85B6-2DFC-4F12-B91A-B047130C2235}"/>
+                <a16:creationId xmlns:a16="http://schemas.microsoft.com/office/drawing/2014/main" id="{BE5F85B6-2DFC-4F12-B91A-B047130C2235}"/>
               </a:ext>
             </a:extLst>
           </p:cNvPr>
@@ -2675,7 +2676,7 @@
           <p:cNvPr id="5" name="Date Placeholder 4">
             <a:extLst>
               <a:ext uri="{FF2B5EF4-FFF2-40B4-BE49-F238E27FC236}">
-                <a16:creationId xmlns="" xmlns:a16="http://schemas.microsoft.com/office/drawing/2014/main" id="{172D123F-5801-4632-89EF-A7048EAB1264}"/>
+                <a16:creationId xmlns:a16="http://schemas.microsoft.com/office/drawing/2014/main" id="{172D123F-5801-4632-89EF-A7048EAB1264}"/>
               </a:ext>
             </a:extLst>
           </p:cNvPr>
@@ -2693,7 +2694,7 @@
           <a:p>
             <a:fld id="{79DE2D3D-0B4E-4DD7-9670-155A46B4C7D3}" type="datetimeFigureOut">
               <a:rPr lang="en-US" smtClean="0"/>
-              <a:t>4/4/2018</a:t>
+              <a:t>4/9/2018</a:t>
             </a:fld>
             <a:endParaRPr lang="en-US"/>
           </a:p>
@@ -2704,7 +2705,7 @@
           <p:cNvPr id="6" name="Footer Placeholder 5">
             <a:extLst>
               <a:ext uri="{FF2B5EF4-FFF2-40B4-BE49-F238E27FC236}">
-                <a16:creationId xmlns="" xmlns:a16="http://schemas.microsoft.com/office/drawing/2014/main" id="{5393FCEA-51F8-4D51-BA8E-D42F966A2BF0}"/>
+                <a16:creationId xmlns:a16="http://schemas.microsoft.com/office/drawing/2014/main" id="{5393FCEA-51F8-4D51-BA8E-D42F966A2BF0}"/>
               </a:ext>
             </a:extLst>
           </p:cNvPr>
@@ -2729,7 +2730,7 @@
           <p:cNvPr id="7" name="Slide Number Placeholder 6">
             <a:extLst>
               <a:ext uri="{FF2B5EF4-FFF2-40B4-BE49-F238E27FC236}">
-                <a16:creationId xmlns="" xmlns:a16="http://schemas.microsoft.com/office/drawing/2014/main" id="{A0B91011-BCB3-49E8-B94D-89877DAB044B}"/>
+                <a16:creationId xmlns:a16="http://schemas.microsoft.com/office/drawing/2014/main" id="{A0B91011-BCB3-49E8-B94D-89877DAB044B}"/>
               </a:ext>
             </a:extLst>
           </p:cNvPr>
@@ -2793,7 +2794,7 @@
           <p:cNvPr id="2" name="Title Placeholder 1">
             <a:extLst>
               <a:ext uri="{FF2B5EF4-FFF2-40B4-BE49-F238E27FC236}">
-                <a16:creationId xmlns="" xmlns:a16="http://schemas.microsoft.com/office/drawing/2014/main" id="{5BBD9B47-EC09-49CB-91C3-4FF23C8DFDFA}"/>
+                <a16:creationId xmlns:a16="http://schemas.microsoft.com/office/drawing/2014/main" id="{5BBD9B47-EC09-49CB-91C3-4FF23C8DFDFA}"/>
               </a:ext>
             </a:extLst>
           </p:cNvPr>
@@ -2831,7 +2832,7 @@
           <p:cNvPr id="3" name="Text Placeholder 2">
             <a:extLst>
               <a:ext uri="{FF2B5EF4-FFF2-40B4-BE49-F238E27FC236}">
-                <a16:creationId xmlns="" xmlns:a16="http://schemas.microsoft.com/office/drawing/2014/main" id="{513AA069-5DC8-4F13-BF00-1DDB9CFEBB93}"/>
+                <a16:creationId xmlns:a16="http://schemas.microsoft.com/office/drawing/2014/main" id="{513AA069-5DC8-4F13-BF00-1DDB9CFEBB93}"/>
               </a:ext>
             </a:extLst>
           </p:cNvPr>
@@ -2898,7 +2899,7 @@
           <p:cNvPr id="4" name="Date Placeholder 3">
             <a:extLst>
               <a:ext uri="{FF2B5EF4-FFF2-40B4-BE49-F238E27FC236}">
-                <a16:creationId xmlns="" xmlns:a16="http://schemas.microsoft.com/office/drawing/2014/main" id="{1B988FF8-EF37-4E2D-8D06-B56DC9727511}"/>
+                <a16:creationId xmlns:a16="http://schemas.microsoft.com/office/drawing/2014/main" id="{1B988FF8-EF37-4E2D-8D06-B56DC9727511}"/>
               </a:ext>
             </a:extLst>
           </p:cNvPr>
@@ -2934,7 +2935,7 @@
           <a:p>
             <a:fld id="{79DE2D3D-0B4E-4DD7-9670-155A46B4C7D3}" type="datetimeFigureOut">
               <a:rPr lang="en-US" smtClean="0"/>
-              <a:t>4/4/2018</a:t>
+              <a:t>4/9/2018</a:t>
             </a:fld>
             <a:endParaRPr lang="en-US"/>
           </a:p>
@@ -2945,7 +2946,7 @@
           <p:cNvPr id="5" name="Footer Placeholder 4">
             <a:extLst>
               <a:ext uri="{FF2B5EF4-FFF2-40B4-BE49-F238E27FC236}">
-                <a16:creationId xmlns="" xmlns:a16="http://schemas.microsoft.com/office/drawing/2014/main" id="{83212C0E-B2E5-4E9B-8071-67611BC3B695}"/>
+                <a16:creationId xmlns:a16="http://schemas.microsoft.com/office/drawing/2014/main" id="{83212C0E-B2E5-4E9B-8071-67611BC3B695}"/>
               </a:ext>
             </a:extLst>
           </p:cNvPr>
@@ -2988,7 +2989,7 @@
           <p:cNvPr id="6" name="Slide Number Placeholder 5">
             <a:extLst>
               <a:ext uri="{FF2B5EF4-FFF2-40B4-BE49-F238E27FC236}">
-                <a16:creationId xmlns="" xmlns:a16="http://schemas.microsoft.com/office/drawing/2014/main" id="{FEDCB7D4-E33C-461E-9027-986C5814089F}"/>
+                <a16:creationId xmlns:a16="http://schemas.microsoft.com/office/drawing/2014/main" id="{FEDCB7D4-E33C-461E-9027-986C5814089F}"/>
               </a:ext>
             </a:extLst>
           </p:cNvPr>
@@ -3356,7 +3357,7 @@
           <p:cNvPr id="2" name="Title 1">
             <a:extLst>
               <a:ext uri="{FF2B5EF4-FFF2-40B4-BE49-F238E27FC236}">
-                <a16:creationId xmlns="" xmlns:a16="http://schemas.microsoft.com/office/drawing/2014/main" id="{139BAF7C-DB50-417E-B55C-81858A77D703}"/>
+                <a16:creationId xmlns:a16="http://schemas.microsoft.com/office/drawing/2014/main" id="{139BAF7C-DB50-417E-B55C-81858A77D703}"/>
               </a:ext>
             </a:extLst>
           </p:cNvPr>
@@ -3384,7 +3385,7 @@
           <p:cNvPr id="3" name="Subtitle 2">
             <a:extLst>
               <a:ext uri="{FF2B5EF4-FFF2-40B4-BE49-F238E27FC236}">
-                <a16:creationId xmlns="" xmlns:a16="http://schemas.microsoft.com/office/drawing/2014/main" id="{CE9D560A-2AB0-4D6D-83D1-F0F54D6A5F58}"/>
+                <a16:creationId xmlns:a16="http://schemas.microsoft.com/office/drawing/2014/main" id="{CE9D560A-2AB0-4D6D-83D1-F0F54D6A5F58}"/>
               </a:ext>
             </a:extLst>
           </p:cNvPr>
@@ -3439,7 +3440,7 @@
           <p:cNvPr id="2" name="Title 1">
             <a:extLst>
               <a:ext uri="{FF2B5EF4-FFF2-40B4-BE49-F238E27FC236}">
-                <a16:creationId xmlns="" xmlns:a16="http://schemas.microsoft.com/office/drawing/2014/main" id="{5ADC56FF-B4DC-4FF6-8C43-32D010FD16AF}"/>
+                <a16:creationId xmlns:a16="http://schemas.microsoft.com/office/drawing/2014/main" id="{5ADC56FF-B4DC-4FF6-8C43-32D010FD16AF}"/>
               </a:ext>
             </a:extLst>
           </p:cNvPr>
@@ -4288,7 +4289,7 @@
           <p:cNvPr id="2" name="Title 1">
             <a:extLst>
               <a:ext uri="{FF2B5EF4-FFF2-40B4-BE49-F238E27FC236}">
-                <a16:creationId xmlns="" xmlns:a16="http://schemas.microsoft.com/office/drawing/2014/main" id="{2435A16B-C73F-4378-AB6D-608131C0F4DA}"/>
+                <a16:creationId xmlns:a16="http://schemas.microsoft.com/office/drawing/2014/main" id="{5ADC56FF-B4DC-4FF6-8C43-32D010FD16AF}"/>
               </a:ext>
             </a:extLst>
           </p:cNvPr>
@@ -4301,6 +4302,1049 @@
         </p:nvSpPr>
         <p:spPr/>
         <p:txBody>
+          <a:bodyPr>
+            <a:normAutofit/>
+          </a:bodyPr>
+          <a:lstStyle/>
+          <a:p>
+            <a:r>
+              <a:rPr lang="en-US" sz="4000" dirty="0"/>
+              <a:t>Architecture</a:t>
+            </a:r>
+          </a:p>
+        </p:txBody>
+      </p:sp>
+      <p:sp>
+        <p:nvSpPr>
+          <p:cNvPr id="4" name="Rectangle 3"/>
+          <p:cNvSpPr/>
+          <p:nvPr/>
+        </p:nvSpPr>
+        <p:spPr>
+          <a:xfrm>
+            <a:off x="640080" y="2905002"/>
+            <a:ext cx="1503680" cy="955040"/>
+          </a:xfrm>
+          <a:prstGeom prst="rect">
+            <a:avLst/>
+          </a:prstGeom>
+        </p:spPr>
+        <p:style>
+          <a:lnRef idx="2">
+            <a:schemeClr val="accent1">
+              <a:shade val="50000"/>
+            </a:schemeClr>
+          </a:lnRef>
+          <a:fillRef idx="1">
+            <a:schemeClr val="accent1"/>
+          </a:fillRef>
+          <a:effectRef idx="0">
+            <a:schemeClr val="accent1"/>
+          </a:effectRef>
+          <a:fontRef idx="minor">
+            <a:schemeClr val="lt1"/>
+          </a:fontRef>
+        </p:style>
+        <p:txBody>
+          <a:bodyPr rtlCol="0" anchor="ctr"/>
+          <a:lstStyle/>
+          <a:p>
+            <a:pPr algn="ctr"/>
+            <a:r>
+              <a:rPr lang="en-US" sz="1600" dirty="0"/>
+              <a:t>Game Interface</a:t>
+            </a:r>
+          </a:p>
+          <a:p>
+            <a:pPr algn="ctr"/>
+            <a:r>
+              <a:rPr lang="en-US" sz="1600" dirty="0"/>
+              <a:t>(BWAPI)</a:t>
+            </a:r>
+          </a:p>
+        </p:txBody>
+      </p:sp>
+      <p:sp>
+        <p:nvSpPr>
+          <p:cNvPr id="5" name="Rectangle 4"/>
+          <p:cNvSpPr/>
+          <p:nvPr/>
+        </p:nvSpPr>
+        <p:spPr>
+          <a:xfrm>
+            <a:off x="6868160" y="3519682"/>
+            <a:ext cx="1503680" cy="955040"/>
+          </a:xfrm>
+          <a:prstGeom prst="rect">
+            <a:avLst/>
+          </a:prstGeom>
+        </p:spPr>
+        <p:style>
+          <a:lnRef idx="2">
+            <a:schemeClr val="accent1">
+              <a:shade val="50000"/>
+            </a:schemeClr>
+          </a:lnRef>
+          <a:fillRef idx="1">
+            <a:schemeClr val="accent1"/>
+          </a:fillRef>
+          <a:effectRef idx="0">
+            <a:schemeClr val="accent1"/>
+          </a:effectRef>
+          <a:fontRef idx="minor">
+            <a:schemeClr val="lt1"/>
+          </a:fontRef>
+        </p:style>
+        <p:txBody>
+          <a:bodyPr rtlCol="0" anchor="ctr"/>
+          <a:lstStyle/>
+          <a:p>
+            <a:pPr algn="ctr"/>
+            <a:r>
+              <a:rPr lang="en-US" sz="1600" dirty="0"/>
+              <a:t>Strategy Space</a:t>
+            </a:r>
+          </a:p>
+        </p:txBody>
+      </p:sp>
+      <p:sp>
+        <p:nvSpPr>
+          <p:cNvPr id="6" name="Rectangle 5"/>
+          <p:cNvSpPr/>
+          <p:nvPr/>
+        </p:nvSpPr>
+        <p:spPr>
+          <a:xfrm>
+            <a:off x="4592320" y="3519682"/>
+            <a:ext cx="1503680" cy="955040"/>
+          </a:xfrm>
+          <a:prstGeom prst="rect">
+            <a:avLst/>
+          </a:prstGeom>
+        </p:spPr>
+        <p:style>
+          <a:lnRef idx="2">
+            <a:schemeClr val="accent1">
+              <a:shade val="50000"/>
+            </a:schemeClr>
+          </a:lnRef>
+          <a:fillRef idx="1">
+            <a:schemeClr val="accent1"/>
+          </a:fillRef>
+          <a:effectRef idx="0">
+            <a:schemeClr val="accent1"/>
+          </a:effectRef>
+          <a:fontRef idx="minor">
+            <a:schemeClr val="lt1"/>
+          </a:fontRef>
+        </p:style>
+        <p:txBody>
+          <a:bodyPr rtlCol="0" anchor="ctr"/>
+          <a:lstStyle/>
+          <a:p>
+            <a:pPr algn="ctr"/>
+            <a:r>
+              <a:rPr lang="en-US" sz="1600" dirty="0"/>
+              <a:t>Information Manager</a:t>
+            </a:r>
+          </a:p>
+        </p:txBody>
+      </p:sp>
+      <p:sp>
+        <p:nvSpPr>
+          <p:cNvPr id="7" name="Rectangle 6"/>
+          <p:cNvSpPr/>
+          <p:nvPr/>
+        </p:nvSpPr>
+        <p:spPr>
+          <a:xfrm>
+            <a:off x="6868160" y="5093867"/>
+            <a:ext cx="1503680" cy="955040"/>
+          </a:xfrm>
+          <a:prstGeom prst="rect">
+            <a:avLst/>
+          </a:prstGeom>
+        </p:spPr>
+        <p:style>
+          <a:lnRef idx="2">
+            <a:schemeClr val="accent1">
+              <a:shade val="50000"/>
+            </a:schemeClr>
+          </a:lnRef>
+          <a:fillRef idx="1">
+            <a:schemeClr val="accent1"/>
+          </a:fillRef>
+          <a:effectRef idx="0">
+            <a:schemeClr val="accent1"/>
+          </a:effectRef>
+          <a:fontRef idx="minor">
+            <a:schemeClr val="lt1"/>
+          </a:fontRef>
+        </p:style>
+        <p:txBody>
+          <a:bodyPr rtlCol="0" anchor="ctr"/>
+          <a:lstStyle/>
+          <a:p>
+            <a:pPr algn="ctr"/>
+            <a:r>
+              <a:rPr lang="en-US" sz="1600" dirty="0"/>
+              <a:t>Tech Tree Manager</a:t>
+            </a:r>
+          </a:p>
+        </p:txBody>
+      </p:sp>
+      <p:sp>
+        <p:nvSpPr>
+          <p:cNvPr id="8" name="Rectangle 7"/>
+          <p:cNvSpPr/>
+          <p:nvPr/>
+        </p:nvSpPr>
+        <p:spPr>
+          <a:xfrm>
+            <a:off x="4592320" y="1802687"/>
+            <a:ext cx="1503680" cy="955040"/>
+          </a:xfrm>
+          <a:prstGeom prst="rect">
+            <a:avLst/>
+          </a:prstGeom>
+        </p:spPr>
+        <p:style>
+          <a:lnRef idx="2">
+            <a:schemeClr val="accent1">
+              <a:shade val="50000"/>
+            </a:schemeClr>
+          </a:lnRef>
+          <a:fillRef idx="1">
+            <a:schemeClr val="accent1"/>
+          </a:fillRef>
+          <a:effectRef idx="0">
+            <a:schemeClr val="accent1"/>
+          </a:effectRef>
+          <a:fontRef idx="minor">
+            <a:schemeClr val="lt1"/>
+          </a:fontRef>
+        </p:style>
+        <p:txBody>
+          <a:bodyPr rtlCol="0" anchor="ctr"/>
+          <a:lstStyle/>
+          <a:p>
+            <a:pPr algn="ctr"/>
+            <a:r>
+              <a:rPr lang="en-US" sz="1600" dirty="0"/>
+              <a:t>Nova AI Module</a:t>
+            </a:r>
+          </a:p>
+        </p:txBody>
+      </p:sp>
+      <p:sp>
+        <p:nvSpPr>
+          <p:cNvPr id="9" name="Rectangle 8"/>
+          <p:cNvSpPr/>
+          <p:nvPr/>
+        </p:nvSpPr>
+        <p:spPr>
+          <a:xfrm>
+            <a:off x="640080" y="4154682"/>
+            <a:ext cx="1503680" cy="955040"/>
+          </a:xfrm>
+          <a:prstGeom prst="rect">
+            <a:avLst/>
+          </a:prstGeom>
+        </p:spPr>
+        <p:style>
+          <a:lnRef idx="2">
+            <a:schemeClr val="accent1">
+              <a:shade val="50000"/>
+            </a:schemeClr>
+          </a:lnRef>
+          <a:fillRef idx="1">
+            <a:schemeClr val="accent1"/>
+          </a:fillRef>
+          <a:effectRef idx="0">
+            <a:schemeClr val="accent1"/>
+          </a:effectRef>
+          <a:fontRef idx="minor">
+            <a:schemeClr val="lt1"/>
+          </a:fontRef>
+        </p:style>
+        <p:txBody>
+          <a:bodyPr rtlCol="0" anchor="ctr"/>
+          <a:lstStyle/>
+          <a:p>
+            <a:pPr algn="ctr"/>
+            <a:r>
+              <a:rPr lang="en-US" sz="1600" dirty="0"/>
+              <a:t>Test Driver</a:t>
+            </a:r>
+          </a:p>
+        </p:txBody>
+      </p:sp>
+      <p:sp>
+        <p:nvSpPr>
+          <p:cNvPr id="10" name="Rectangle 9"/>
+          <p:cNvSpPr/>
+          <p:nvPr/>
+        </p:nvSpPr>
+        <p:spPr>
+          <a:xfrm>
+            <a:off x="6868160" y="2183664"/>
+            <a:ext cx="1503680" cy="955040"/>
+          </a:xfrm>
+          <a:prstGeom prst="rect">
+            <a:avLst/>
+          </a:prstGeom>
+        </p:spPr>
+        <p:style>
+          <a:lnRef idx="2">
+            <a:schemeClr val="accent1">
+              <a:shade val="50000"/>
+            </a:schemeClr>
+          </a:lnRef>
+          <a:fillRef idx="1">
+            <a:schemeClr val="accent1"/>
+          </a:fillRef>
+          <a:effectRef idx="0">
+            <a:schemeClr val="accent1"/>
+          </a:effectRef>
+          <a:fontRef idx="minor">
+            <a:schemeClr val="lt1"/>
+          </a:fontRef>
+        </p:style>
+        <p:txBody>
+          <a:bodyPr rtlCol="0" anchor="ctr"/>
+          <a:lstStyle/>
+          <a:p>
+            <a:pPr algn="ctr"/>
+            <a:r>
+              <a:rPr lang="en-US" sz="1600" dirty="0"/>
+              <a:t>Strategy Reader</a:t>
+            </a:r>
+          </a:p>
+        </p:txBody>
+      </p:sp>
+      <p:cxnSp>
+        <p:nvCxnSpPr>
+          <p:cNvPr id="12" name="Straight Arrow Connector 11"/>
+          <p:cNvCxnSpPr>
+            <a:stCxn id="4" idx="3"/>
+            <a:endCxn id="6" idx="1"/>
+          </p:cNvCxnSpPr>
+          <p:nvPr/>
+        </p:nvCxnSpPr>
+        <p:spPr>
+          <a:xfrm>
+            <a:off x="2143760" y="3382522"/>
+            <a:ext cx="2448560" cy="614680"/>
+          </a:xfrm>
+          <a:prstGeom prst="bentConnector3">
+            <a:avLst>
+              <a:gd name="adj1" fmla="val 50000"/>
+            </a:avLst>
+          </a:prstGeom>
+          <a:ln>
+            <a:tailEnd type="arrow"/>
+          </a:ln>
+        </p:spPr>
+        <p:style>
+          <a:lnRef idx="1">
+            <a:schemeClr val="accent1"/>
+          </a:lnRef>
+          <a:fillRef idx="0">
+            <a:schemeClr val="accent1"/>
+          </a:fillRef>
+          <a:effectRef idx="0">
+            <a:schemeClr val="accent1"/>
+          </a:effectRef>
+          <a:fontRef idx="minor">
+            <a:schemeClr val="tx1"/>
+          </a:fontRef>
+        </p:style>
+      </p:cxnSp>
+      <p:cxnSp>
+        <p:nvCxnSpPr>
+          <p:cNvPr id="13" name="Straight Arrow Connector 12"/>
+          <p:cNvCxnSpPr>
+            <a:stCxn id="9" idx="3"/>
+            <a:endCxn id="6" idx="1"/>
+          </p:cNvCxnSpPr>
+          <p:nvPr/>
+        </p:nvCxnSpPr>
+        <p:spPr>
+          <a:xfrm flipV="1">
+            <a:off x="2143760" y="3997202"/>
+            <a:ext cx="2448560" cy="635000"/>
+          </a:xfrm>
+          <a:prstGeom prst="bentConnector3">
+            <a:avLst>
+              <a:gd name="adj1" fmla="val 50000"/>
+            </a:avLst>
+          </a:prstGeom>
+          <a:ln>
+            <a:tailEnd type="arrow"/>
+          </a:ln>
+        </p:spPr>
+        <p:style>
+          <a:lnRef idx="1">
+            <a:schemeClr val="accent1"/>
+          </a:lnRef>
+          <a:fillRef idx="0">
+            <a:schemeClr val="accent1"/>
+          </a:fillRef>
+          <a:effectRef idx="0">
+            <a:schemeClr val="accent1"/>
+          </a:effectRef>
+          <a:fontRef idx="minor">
+            <a:schemeClr val="tx1"/>
+          </a:fontRef>
+        </p:style>
+      </p:cxnSp>
+      <p:sp>
+        <p:nvSpPr>
+          <p:cNvPr id="20" name="TextBox 19"/>
+          <p:cNvSpPr txBox="1"/>
+          <p:nvPr/>
+        </p:nvSpPr>
+        <p:spPr>
+          <a:xfrm>
+            <a:off x="2255235" y="3668371"/>
+            <a:ext cx="931986" cy="584775"/>
+          </a:xfrm>
+          <a:prstGeom prst="rect">
+            <a:avLst/>
+          </a:prstGeom>
+          <a:noFill/>
+        </p:spPr>
+        <p:txBody>
+          <a:bodyPr wrap="none" rtlCol="0">
+            <a:spAutoFit/>
+          </a:bodyPr>
+          <a:lstStyle/>
+          <a:p>
+            <a:r>
+              <a:rPr lang="en-US" sz="1600" dirty="0" err="1"/>
+              <a:t>UnitType</a:t>
+            </a:r>
+            <a:endParaRPr lang="en-US" sz="1600" dirty="0"/>
+          </a:p>
+          <a:p>
+            <a:r>
+              <a:rPr lang="en-US" sz="1600" dirty="0"/>
+              <a:t>Status</a:t>
+            </a:r>
+          </a:p>
+        </p:txBody>
+      </p:sp>
+      <p:cxnSp>
+        <p:nvCxnSpPr>
+          <p:cNvPr id="23" name="Straight Arrow Connector 22"/>
+          <p:cNvCxnSpPr>
+            <a:stCxn id="10" idx="2"/>
+            <a:endCxn id="5" idx="0"/>
+          </p:cNvCxnSpPr>
+          <p:nvPr/>
+        </p:nvCxnSpPr>
+        <p:spPr>
+          <a:xfrm>
+            <a:off x="7620000" y="3138704"/>
+            <a:ext cx="0" cy="380978"/>
+          </a:xfrm>
+          <a:prstGeom prst="straightConnector1">
+            <a:avLst/>
+          </a:prstGeom>
+          <a:ln>
+            <a:tailEnd type="arrow"/>
+          </a:ln>
+        </p:spPr>
+        <p:style>
+          <a:lnRef idx="1">
+            <a:schemeClr val="accent1"/>
+          </a:lnRef>
+          <a:fillRef idx="0">
+            <a:schemeClr val="accent1"/>
+          </a:fillRef>
+          <a:effectRef idx="0">
+            <a:schemeClr val="accent1"/>
+          </a:effectRef>
+          <a:fontRef idx="minor">
+            <a:schemeClr val="tx1"/>
+          </a:fontRef>
+        </p:style>
+      </p:cxnSp>
+      <p:sp>
+        <p:nvSpPr>
+          <p:cNvPr id="24" name="Flowchart: Document 23"/>
+          <p:cNvSpPr/>
+          <p:nvPr/>
+        </p:nvSpPr>
+        <p:spPr>
+          <a:xfrm>
+            <a:off x="7104418" y="1198144"/>
+            <a:ext cx="1031164" cy="690880"/>
+          </a:xfrm>
+          <a:prstGeom prst="flowChartDocument">
+            <a:avLst/>
+          </a:prstGeom>
+        </p:spPr>
+        <p:style>
+          <a:lnRef idx="2">
+            <a:schemeClr val="accent1">
+              <a:shade val="50000"/>
+            </a:schemeClr>
+          </a:lnRef>
+          <a:fillRef idx="1">
+            <a:schemeClr val="accent1"/>
+          </a:fillRef>
+          <a:effectRef idx="0">
+            <a:schemeClr val="accent1"/>
+          </a:effectRef>
+          <a:fontRef idx="minor">
+            <a:schemeClr val="lt1"/>
+          </a:fontRef>
+        </p:style>
+        <p:txBody>
+          <a:bodyPr rtlCol="0" anchor="ctr"/>
+          <a:lstStyle/>
+          <a:p>
+            <a:pPr algn="ctr"/>
+            <a:r>
+              <a:rPr lang="en-US" sz="1600" dirty="0"/>
+              <a:t>PDDL File</a:t>
+            </a:r>
+          </a:p>
+        </p:txBody>
+      </p:sp>
+      <p:cxnSp>
+        <p:nvCxnSpPr>
+          <p:cNvPr id="25" name="Straight Arrow Connector 24"/>
+          <p:cNvCxnSpPr>
+            <a:stCxn id="24" idx="2"/>
+            <a:endCxn id="10" idx="0"/>
+          </p:cNvCxnSpPr>
+          <p:nvPr/>
+        </p:nvCxnSpPr>
+        <p:spPr>
+          <a:xfrm>
+            <a:off x="7620000" y="1843349"/>
+            <a:ext cx="0" cy="340315"/>
+          </a:xfrm>
+          <a:prstGeom prst="straightConnector1">
+            <a:avLst/>
+          </a:prstGeom>
+          <a:ln>
+            <a:tailEnd type="arrow"/>
+          </a:ln>
+        </p:spPr>
+        <p:style>
+          <a:lnRef idx="1">
+            <a:schemeClr val="accent1"/>
+          </a:lnRef>
+          <a:fillRef idx="0">
+            <a:schemeClr val="accent1"/>
+          </a:fillRef>
+          <a:effectRef idx="0">
+            <a:schemeClr val="accent1"/>
+          </a:effectRef>
+          <a:fontRef idx="minor">
+            <a:schemeClr val="tx1"/>
+          </a:fontRef>
+        </p:style>
+      </p:cxnSp>
+      <p:cxnSp>
+        <p:nvCxnSpPr>
+          <p:cNvPr id="30" name="Straight Arrow Connector 29"/>
+          <p:cNvCxnSpPr>
+            <a:stCxn id="5" idx="2"/>
+            <a:endCxn id="7" idx="0"/>
+          </p:cNvCxnSpPr>
+          <p:nvPr/>
+        </p:nvCxnSpPr>
+        <p:spPr>
+          <a:xfrm>
+            <a:off x="7620000" y="4474722"/>
+            <a:ext cx="0" cy="619145"/>
+          </a:xfrm>
+          <a:prstGeom prst="straightConnector1">
+            <a:avLst/>
+          </a:prstGeom>
+          <a:ln>
+            <a:headEnd type="arrow"/>
+            <a:tailEnd type="arrow"/>
+          </a:ln>
+        </p:spPr>
+        <p:style>
+          <a:lnRef idx="1">
+            <a:schemeClr val="accent1"/>
+          </a:lnRef>
+          <a:fillRef idx="0">
+            <a:schemeClr val="accent1"/>
+          </a:fillRef>
+          <a:effectRef idx="0">
+            <a:schemeClr val="accent1"/>
+          </a:effectRef>
+          <a:fontRef idx="minor">
+            <a:schemeClr val="tx1"/>
+          </a:fontRef>
+        </p:style>
+      </p:cxnSp>
+      <p:cxnSp>
+        <p:nvCxnSpPr>
+          <p:cNvPr id="31" name="Straight Arrow Connector 30"/>
+          <p:cNvCxnSpPr>
+            <a:stCxn id="6" idx="3"/>
+            <a:endCxn id="5" idx="1"/>
+          </p:cNvCxnSpPr>
+          <p:nvPr/>
+        </p:nvCxnSpPr>
+        <p:spPr>
+          <a:xfrm>
+            <a:off x="6096000" y="3997202"/>
+            <a:ext cx="772160" cy="0"/>
+          </a:xfrm>
+          <a:prstGeom prst="straightConnector1">
+            <a:avLst/>
+          </a:prstGeom>
+          <a:ln>
+            <a:headEnd type="arrow"/>
+            <a:tailEnd type="arrow"/>
+          </a:ln>
+        </p:spPr>
+        <p:style>
+          <a:lnRef idx="1">
+            <a:schemeClr val="accent1"/>
+          </a:lnRef>
+          <a:fillRef idx="0">
+            <a:schemeClr val="accent1"/>
+          </a:fillRef>
+          <a:effectRef idx="0">
+            <a:schemeClr val="accent1"/>
+          </a:effectRef>
+          <a:fontRef idx="minor">
+            <a:schemeClr val="tx1"/>
+          </a:fontRef>
+        </p:style>
+      </p:cxnSp>
+      <p:cxnSp>
+        <p:nvCxnSpPr>
+          <p:cNvPr id="34" name="Straight Arrow Connector 33"/>
+          <p:cNvCxnSpPr>
+            <a:stCxn id="8" idx="2"/>
+            <a:endCxn id="6" idx="0"/>
+          </p:cNvCxnSpPr>
+          <p:nvPr/>
+        </p:nvCxnSpPr>
+        <p:spPr>
+          <a:xfrm>
+            <a:off x="5344160" y="2757727"/>
+            <a:ext cx="0" cy="761955"/>
+          </a:xfrm>
+          <a:prstGeom prst="straightConnector1">
+            <a:avLst/>
+          </a:prstGeom>
+          <a:ln>
+            <a:headEnd type="arrow"/>
+            <a:tailEnd type="arrow"/>
+          </a:ln>
+        </p:spPr>
+        <p:style>
+          <a:lnRef idx="1">
+            <a:schemeClr val="accent1"/>
+          </a:lnRef>
+          <a:fillRef idx="0">
+            <a:schemeClr val="accent1"/>
+          </a:fillRef>
+          <a:effectRef idx="0">
+            <a:schemeClr val="accent1"/>
+          </a:effectRef>
+          <a:fontRef idx="minor">
+            <a:schemeClr val="tx1"/>
+          </a:fontRef>
+        </p:style>
+      </p:cxnSp>
+      <p:cxnSp>
+        <p:nvCxnSpPr>
+          <p:cNvPr id="37" name="Straight Arrow Connector 36"/>
+          <p:cNvCxnSpPr>
+            <a:stCxn id="8" idx="1"/>
+            <a:endCxn id="4" idx="0"/>
+          </p:cNvCxnSpPr>
+          <p:nvPr/>
+        </p:nvCxnSpPr>
+        <p:spPr>
+          <a:xfrm rot="10800000" flipV="1">
+            <a:off x="1391920" y="2280206"/>
+            <a:ext cx="3200400" cy="624795"/>
+          </a:xfrm>
+          <a:prstGeom prst="bentConnector2">
+            <a:avLst/>
+          </a:prstGeom>
+          <a:ln>
+            <a:headEnd type="arrow"/>
+            <a:tailEnd type="arrow"/>
+          </a:ln>
+        </p:spPr>
+        <p:style>
+          <a:lnRef idx="1">
+            <a:schemeClr val="accent1"/>
+          </a:lnRef>
+          <a:fillRef idx="0">
+            <a:schemeClr val="accent1"/>
+          </a:fillRef>
+          <a:effectRef idx="0">
+            <a:schemeClr val="accent1"/>
+          </a:effectRef>
+          <a:fontRef idx="minor">
+            <a:schemeClr val="tx1"/>
+          </a:fontRef>
+        </p:style>
+      </p:cxnSp>
+      <p:sp>
+        <p:nvSpPr>
+          <p:cNvPr id="44" name="TextBox 43"/>
+          <p:cNvSpPr txBox="1"/>
+          <p:nvPr/>
+        </p:nvSpPr>
+        <p:spPr>
+          <a:xfrm>
+            <a:off x="8472241" y="4013057"/>
+            <a:ext cx="1198880" cy="830997"/>
+          </a:xfrm>
+          <a:prstGeom prst="rect">
+            <a:avLst/>
+          </a:prstGeom>
+          <a:noFill/>
+        </p:spPr>
+        <p:txBody>
+          <a:bodyPr wrap="square" rtlCol="0">
+            <a:spAutoFit/>
+          </a:bodyPr>
+          <a:lstStyle/>
+          <a:p>
+            <a:r>
+              <a:rPr lang="en-US" sz="1600" dirty="0"/>
+              <a:t>Update Template Weights</a:t>
+            </a:r>
+          </a:p>
+        </p:txBody>
+      </p:sp>
+      <p:sp>
+        <p:nvSpPr>
+          <p:cNvPr id="46" name="Flowchart: Multidocument 45"/>
+          <p:cNvSpPr/>
+          <p:nvPr/>
+        </p:nvSpPr>
+        <p:spPr>
+          <a:xfrm>
+            <a:off x="9771522" y="3405153"/>
+            <a:ext cx="1381760" cy="1184097"/>
+          </a:xfrm>
+          <a:prstGeom prst="flowChartMultidocument">
+            <a:avLst/>
+          </a:prstGeom>
+        </p:spPr>
+        <p:style>
+          <a:lnRef idx="2">
+            <a:schemeClr val="accent1">
+              <a:shade val="50000"/>
+            </a:schemeClr>
+          </a:lnRef>
+          <a:fillRef idx="1">
+            <a:schemeClr val="accent1"/>
+          </a:fillRef>
+          <a:effectRef idx="0">
+            <a:schemeClr val="accent1"/>
+          </a:effectRef>
+          <a:fontRef idx="minor">
+            <a:schemeClr val="lt1"/>
+          </a:fontRef>
+        </p:style>
+        <p:txBody>
+          <a:bodyPr rtlCol="0" anchor="ctr"/>
+          <a:lstStyle/>
+          <a:p>
+            <a:pPr algn="ctr"/>
+            <a:r>
+              <a:rPr lang="en-US" sz="1600" dirty="0"/>
+              <a:t>Strategies</a:t>
+            </a:r>
+          </a:p>
+        </p:txBody>
+      </p:sp>
+      <p:cxnSp>
+        <p:nvCxnSpPr>
+          <p:cNvPr id="48" name="Straight Arrow Connector 47"/>
+          <p:cNvCxnSpPr>
+            <a:stCxn id="46" idx="1"/>
+            <a:endCxn id="5" idx="3"/>
+          </p:cNvCxnSpPr>
+          <p:nvPr/>
+        </p:nvCxnSpPr>
+        <p:spPr>
+          <a:xfrm flipH="1">
+            <a:off x="8371840" y="3997202"/>
+            <a:ext cx="1399682" cy="0"/>
+          </a:xfrm>
+          <a:prstGeom prst="straightConnector1">
+            <a:avLst/>
+          </a:prstGeom>
+          <a:ln>
+            <a:headEnd type="arrow"/>
+            <a:tailEnd type="arrow"/>
+          </a:ln>
+        </p:spPr>
+        <p:style>
+          <a:lnRef idx="1">
+            <a:schemeClr val="accent1"/>
+          </a:lnRef>
+          <a:fillRef idx="0">
+            <a:schemeClr val="accent1"/>
+          </a:fillRef>
+          <a:effectRef idx="0">
+            <a:schemeClr val="accent1"/>
+          </a:effectRef>
+          <a:fontRef idx="minor">
+            <a:schemeClr val="tx1"/>
+          </a:fontRef>
+        </p:style>
+      </p:cxnSp>
+      <p:sp>
+        <p:nvSpPr>
+          <p:cNvPr id="28" name="Rectangle 27">
+            <a:extLst>
+              <a:ext uri="{FF2B5EF4-FFF2-40B4-BE49-F238E27FC236}">
+                <a16:creationId xmlns:a16="http://schemas.microsoft.com/office/drawing/2014/main" id="{48EBDA38-3674-4766-8A9E-FC5A870C4AEE}"/>
+              </a:ext>
+            </a:extLst>
+          </p:cNvPr>
+          <p:cNvSpPr/>
+          <p:nvPr/>
+        </p:nvSpPr>
+        <p:spPr>
+          <a:xfrm>
+            <a:off x="4592320" y="5290055"/>
+            <a:ext cx="1503680" cy="955040"/>
+          </a:xfrm>
+          <a:prstGeom prst="rect">
+            <a:avLst/>
+          </a:prstGeom>
+        </p:spPr>
+        <p:style>
+          <a:lnRef idx="2">
+            <a:schemeClr val="accent1">
+              <a:shade val="50000"/>
+            </a:schemeClr>
+          </a:lnRef>
+          <a:fillRef idx="1">
+            <a:schemeClr val="accent1"/>
+          </a:fillRef>
+          <a:effectRef idx="0">
+            <a:schemeClr val="accent1"/>
+          </a:effectRef>
+          <a:fontRef idx="minor">
+            <a:schemeClr val="lt1"/>
+          </a:fontRef>
+        </p:style>
+        <p:txBody>
+          <a:bodyPr rtlCol="0" anchor="ctr"/>
+          <a:lstStyle/>
+          <a:p>
+            <a:pPr algn="ctr"/>
+            <a:r>
+              <a:rPr lang="en-US" sz="1600" dirty="0"/>
+              <a:t>Squad Manager</a:t>
+            </a:r>
+          </a:p>
+        </p:txBody>
+      </p:sp>
+      <p:sp>
+        <p:nvSpPr>
+          <p:cNvPr id="29" name="Rectangle 28">
+            <a:extLst>
+              <a:ext uri="{FF2B5EF4-FFF2-40B4-BE49-F238E27FC236}">
+                <a16:creationId xmlns:a16="http://schemas.microsoft.com/office/drawing/2014/main" id="{8BB1185D-28C9-48E3-AF83-56D19481BD9B}"/>
+              </a:ext>
+            </a:extLst>
+          </p:cNvPr>
+          <p:cNvSpPr/>
+          <p:nvPr/>
+        </p:nvSpPr>
+        <p:spPr>
+          <a:xfrm>
+            <a:off x="7020560" y="5246267"/>
+            <a:ext cx="1503680" cy="955040"/>
+          </a:xfrm>
+          <a:prstGeom prst="rect">
+            <a:avLst/>
+          </a:prstGeom>
+        </p:spPr>
+        <p:style>
+          <a:lnRef idx="2">
+            <a:schemeClr val="accent1">
+              <a:shade val="50000"/>
+            </a:schemeClr>
+          </a:lnRef>
+          <a:fillRef idx="1">
+            <a:schemeClr val="accent1"/>
+          </a:fillRef>
+          <a:effectRef idx="0">
+            <a:schemeClr val="accent1"/>
+          </a:effectRef>
+          <a:fontRef idx="minor">
+            <a:schemeClr val="lt1"/>
+          </a:fontRef>
+        </p:style>
+        <p:txBody>
+          <a:bodyPr rtlCol="0" anchor="ctr"/>
+          <a:lstStyle/>
+          <a:p>
+            <a:pPr algn="ctr"/>
+            <a:r>
+              <a:rPr lang="en-US" sz="1600" dirty="0"/>
+              <a:t>Tech Tree Manager</a:t>
+            </a:r>
+          </a:p>
+        </p:txBody>
+      </p:sp>
+      <p:sp>
+        <p:nvSpPr>
+          <p:cNvPr id="32" name="Rectangle 31">
+            <a:extLst>
+              <a:ext uri="{FF2B5EF4-FFF2-40B4-BE49-F238E27FC236}">
+                <a16:creationId xmlns:a16="http://schemas.microsoft.com/office/drawing/2014/main" id="{809860E9-C61D-4819-AC6C-EB42FB88463A}"/>
+              </a:ext>
+            </a:extLst>
+          </p:cNvPr>
+          <p:cNvSpPr/>
+          <p:nvPr/>
+        </p:nvSpPr>
+        <p:spPr>
+          <a:xfrm>
+            <a:off x="7172960" y="5398667"/>
+            <a:ext cx="1503680" cy="955040"/>
+          </a:xfrm>
+          <a:prstGeom prst="rect">
+            <a:avLst/>
+          </a:prstGeom>
+        </p:spPr>
+        <p:style>
+          <a:lnRef idx="2">
+            <a:schemeClr val="accent1">
+              <a:shade val="50000"/>
+            </a:schemeClr>
+          </a:lnRef>
+          <a:fillRef idx="1">
+            <a:schemeClr val="accent1"/>
+          </a:fillRef>
+          <a:effectRef idx="0">
+            <a:schemeClr val="accent1"/>
+          </a:effectRef>
+          <a:fontRef idx="minor">
+            <a:schemeClr val="lt1"/>
+          </a:fontRef>
+        </p:style>
+        <p:txBody>
+          <a:bodyPr rtlCol="0" anchor="ctr"/>
+          <a:lstStyle/>
+          <a:p>
+            <a:pPr algn="ctr"/>
+            <a:r>
+              <a:rPr lang="en-US" sz="1600" dirty="0"/>
+              <a:t>Tech Tree Manager</a:t>
+            </a:r>
+          </a:p>
+        </p:txBody>
+      </p:sp>
+      <p:cxnSp>
+        <p:nvCxnSpPr>
+          <p:cNvPr id="33" name="Straight Arrow Connector 32">
+            <a:extLst>
+              <a:ext uri="{FF2B5EF4-FFF2-40B4-BE49-F238E27FC236}">
+                <a16:creationId xmlns:a16="http://schemas.microsoft.com/office/drawing/2014/main" id="{4FD98F2F-6E1F-404B-9187-1EBEA778FA8B}"/>
+              </a:ext>
+            </a:extLst>
+          </p:cNvPr>
+          <p:cNvCxnSpPr>
+            <a:cxnSpLocks/>
+            <a:stCxn id="6" idx="2"/>
+            <a:endCxn id="28" idx="0"/>
+          </p:cNvCxnSpPr>
+          <p:nvPr/>
+        </p:nvCxnSpPr>
+        <p:spPr>
+          <a:xfrm>
+            <a:off x="5344160" y="4474722"/>
+            <a:ext cx="0" cy="815333"/>
+          </a:xfrm>
+          <a:prstGeom prst="straightConnector1">
+            <a:avLst/>
+          </a:prstGeom>
+          <a:ln>
+            <a:headEnd type="arrow"/>
+            <a:tailEnd type="arrow"/>
+          </a:ln>
+        </p:spPr>
+        <p:style>
+          <a:lnRef idx="1">
+            <a:schemeClr val="accent1"/>
+          </a:lnRef>
+          <a:fillRef idx="0">
+            <a:schemeClr val="accent1"/>
+          </a:fillRef>
+          <a:effectRef idx="0">
+            <a:schemeClr val="accent1"/>
+          </a:effectRef>
+          <a:fontRef idx="minor">
+            <a:schemeClr val="tx1"/>
+          </a:fontRef>
+        </p:style>
+      </p:cxnSp>
+    </p:spTree>
+    <p:extLst>
+      <p:ext uri="{BB962C8B-B14F-4D97-AF65-F5344CB8AC3E}">
+        <p14:creationId xmlns:p14="http://schemas.microsoft.com/office/powerpoint/2010/main" val="2745846289"/>
+      </p:ext>
+    </p:extLst>
+  </p:cSld>
+  <p:clrMapOvr>
+    <a:masterClrMapping/>
+  </p:clrMapOvr>
+</p:sld>
+</file>
+
+<file path=ppt/slides/slide12.xml><?xml version="1.0" encoding="utf-8"?>
+<p:sld xmlns:a="http://schemas.openxmlformats.org/drawingml/2006/main" xmlns:r="http://schemas.openxmlformats.org/officeDocument/2006/relationships" xmlns:p="http://schemas.openxmlformats.org/presentationml/2006/main">
+  <p:cSld>
+    <p:spTree>
+      <p:nvGrpSpPr>
+        <p:cNvPr id="1" name=""/>
+        <p:cNvGrpSpPr/>
+        <p:nvPr/>
+      </p:nvGrpSpPr>
+      <p:grpSpPr>
+        <a:xfrm>
+          <a:off x="0" y="0"/>
+          <a:ext cx="0" cy="0"/>
+          <a:chOff x="0" y="0"/>
+          <a:chExt cx="0" cy="0"/>
+        </a:xfrm>
+      </p:grpSpPr>
+      <p:sp>
+        <p:nvSpPr>
+          <p:cNvPr id="2" name="Title 1">
+            <a:extLst>
+              <a:ext uri="{FF2B5EF4-FFF2-40B4-BE49-F238E27FC236}">
+                <a16:creationId xmlns:a16="http://schemas.microsoft.com/office/drawing/2014/main" id="{2435A16B-C73F-4378-AB6D-608131C0F4DA}"/>
+              </a:ext>
+            </a:extLst>
+          </p:cNvPr>
+          <p:cNvSpPr>
+            <a:spLocks noGrp="1"/>
+          </p:cNvSpPr>
+          <p:nvPr>
+            <p:ph type="title"/>
+          </p:nvPr>
+        </p:nvSpPr>
+        <p:spPr/>
+        <p:txBody>
           <a:bodyPr/>
           <a:lstStyle/>
           <a:p>
@@ -4316,7 +5360,7 @@
           <p:cNvPr id="4" name="Content Placeholder 3">
             <a:extLst>
               <a:ext uri="{FF2B5EF4-FFF2-40B4-BE49-F238E27FC236}">
-                <a16:creationId xmlns="" xmlns:a16="http://schemas.microsoft.com/office/drawing/2014/main" id="{14BDE94F-63BA-453E-9B65-76E3AD0850E8}"/>
+                <a16:creationId xmlns:a16="http://schemas.microsoft.com/office/drawing/2014/main" id="{14BDE94F-63BA-453E-9B65-76E3AD0850E8}"/>
               </a:ext>
             </a:extLst>
           </p:cNvPr>
@@ -4346,28 +5390,28 @@
                 <a:gridCol w="2900149">
                   <a:extLst>
                     <a:ext uri="{9D8B030D-6E8A-4147-A177-3AD203B41FA5}">
-                      <a16:colId xmlns="" xmlns:a16="http://schemas.microsoft.com/office/drawing/2014/main" val="1377422795"/>
+                      <a16:colId xmlns:a16="http://schemas.microsoft.com/office/drawing/2014/main" val="1377422795"/>
                     </a:ext>
                   </a:extLst>
                 </a:gridCol>
                 <a:gridCol w="2531661">
                   <a:extLst>
                     <a:ext uri="{9D8B030D-6E8A-4147-A177-3AD203B41FA5}">
-                      <a16:colId xmlns="" xmlns:a16="http://schemas.microsoft.com/office/drawing/2014/main" val="1598590039"/>
+                      <a16:colId xmlns:a16="http://schemas.microsoft.com/office/drawing/2014/main" val="1598590039"/>
                     </a:ext>
                   </a:extLst>
                 </a:gridCol>
                 <a:gridCol w="2101756">
                   <a:extLst>
                     <a:ext uri="{9D8B030D-6E8A-4147-A177-3AD203B41FA5}">
-                      <a16:colId xmlns="" xmlns:a16="http://schemas.microsoft.com/office/drawing/2014/main" val="3896506482"/>
+                      <a16:colId xmlns:a16="http://schemas.microsoft.com/office/drawing/2014/main" val="3896506482"/>
                     </a:ext>
                   </a:extLst>
                 </a:gridCol>
                 <a:gridCol w="4067030">
                   <a:extLst>
                     <a:ext uri="{9D8B030D-6E8A-4147-A177-3AD203B41FA5}">
-                      <a16:colId xmlns="" xmlns:a16="http://schemas.microsoft.com/office/drawing/2014/main" val="3170647213"/>
+                      <a16:colId xmlns:a16="http://schemas.microsoft.com/office/drawing/2014/main" val="3170647213"/>
                     </a:ext>
                   </a:extLst>
                 </a:gridCol>
@@ -4427,7 +5471,7 @@
                 </a:tc>
                 <a:extLst>
                   <a:ext uri="{0D108BD9-81ED-4DB2-BD59-A6C34878D82A}">
-                    <a16:rowId xmlns="" xmlns:a16="http://schemas.microsoft.com/office/drawing/2014/main" val="3387341382"/>
+                    <a16:rowId xmlns:a16="http://schemas.microsoft.com/office/drawing/2014/main" val="3387341382"/>
                   </a:ext>
                 </a:extLst>
               </a:tr>
@@ -4487,7 +5531,7 @@
                 </a:tc>
                 <a:extLst>
                   <a:ext uri="{0D108BD9-81ED-4DB2-BD59-A6C34878D82A}">
-                    <a16:rowId xmlns="" xmlns:a16="http://schemas.microsoft.com/office/drawing/2014/main" val="855420630"/>
+                    <a16:rowId xmlns:a16="http://schemas.microsoft.com/office/drawing/2014/main" val="855420630"/>
                   </a:ext>
                 </a:extLst>
               </a:tr>
@@ -4563,7 +5607,7 @@
                 </a:tc>
                 <a:extLst>
                   <a:ext uri="{0D108BD9-81ED-4DB2-BD59-A6C34878D82A}">
-                    <a16:rowId xmlns="" xmlns:a16="http://schemas.microsoft.com/office/drawing/2014/main" val="3188031076"/>
+                    <a16:rowId xmlns:a16="http://schemas.microsoft.com/office/drawing/2014/main" val="3188031076"/>
                   </a:ext>
                 </a:extLst>
               </a:tr>
@@ -4630,7 +5674,7 @@
                 </a:tc>
                 <a:extLst>
                   <a:ext uri="{0D108BD9-81ED-4DB2-BD59-A6C34878D82A}">
-                    <a16:rowId xmlns="" xmlns:a16="http://schemas.microsoft.com/office/drawing/2014/main" val="1240135095"/>
+                    <a16:rowId xmlns:a16="http://schemas.microsoft.com/office/drawing/2014/main" val="1240135095"/>
                   </a:ext>
                 </a:extLst>
               </a:tr>
@@ -4686,7 +5730,7 @@
                 </a:tc>
                 <a:extLst>
                   <a:ext uri="{0D108BD9-81ED-4DB2-BD59-A6C34878D82A}">
-                    <a16:rowId xmlns="" xmlns:a16="http://schemas.microsoft.com/office/drawing/2014/main" val="1651246168"/>
+                    <a16:rowId xmlns:a16="http://schemas.microsoft.com/office/drawing/2014/main" val="1651246168"/>
                   </a:ext>
                 </a:extLst>
               </a:tr>
@@ -4746,7 +5790,7 @@
                 </a:tc>
                 <a:extLst>
                   <a:ext uri="{0D108BD9-81ED-4DB2-BD59-A6C34878D82A}">
-                    <a16:rowId xmlns="" xmlns:a16="http://schemas.microsoft.com/office/drawing/2014/main" val="3320754550"/>
+                    <a16:rowId xmlns:a16="http://schemas.microsoft.com/office/drawing/2014/main" val="3320754550"/>
                   </a:ext>
                 </a:extLst>
               </a:tr>
@@ -4823,7 +5867,7 @@
                 </a:tc>
                 <a:extLst>
                   <a:ext uri="{0D108BD9-81ED-4DB2-BD59-A6C34878D82A}">
-                    <a16:rowId xmlns="" xmlns:a16="http://schemas.microsoft.com/office/drawing/2014/main" val="701464579"/>
+                    <a16:rowId xmlns:a16="http://schemas.microsoft.com/office/drawing/2014/main" val="701464579"/>
                   </a:ext>
                 </a:extLst>
               </a:tr>
@@ -4960,7 +6004,7 @@
                 </a:tc>
                 <a:extLst>
                   <a:ext uri="{0D108BD9-81ED-4DB2-BD59-A6C34878D82A}">
-                    <a16:rowId xmlns="" xmlns:a16="http://schemas.microsoft.com/office/drawing/2014/main" val="904193852"/>
+                    <a16:rowId xmlns:a16="http://schemas.microsoft.com/office/drawing/2014/main" val="904193852"/>
                   </a:ext>
                 </a:extLst>
               </a:tr>
@@ -4981,7 +6025,7 @@
 </p:sld>
 </file>
 
-<file path=ppt/slides/slide12.xml><?xml version="1.0" encoding="utf-8"?>
+<file path=ppt/slides/slide13.xml><?xml version="1.0" encoding="utf-8"?>
 <p:sld xmlns:a="http://schemas.openxmlformats.org/drawingml/2006/main" xmlns:r="http://schemas.openxmlformats.org/officeDocument/2006/relationships" xmlns:p="http://schemas.openxmlformats.org/presentationml/2006/main">
   <p:cSld>
     <p:spTree>
@@ -5003,7 +6047,7 @@
           <p:cNvPr id="2" name="Title 1">
             <a:extLst>
               <a:ext uri="{FF2B5EF4-FFF2-40B4-BE49-F238E27FC236}">
-                <a16:creationId xmlns="" xmlns:a16="http://schemas.microsoft.com/office/drawing/2014/main" id="{88BB61F1-4D04-4BA3-880A-182E63063E3F}"/>
+                <a16:creationId xmlns:a16="http://schemas.microsoft.com/office/drawing/2014/main" id="{88BB61F1-4D04-4BA3-880A-182E63063E3F}"/>
               </a:ext>
             </a:extLst>
           </p:cNvPr>
@@ -5031,7 +6075,7 @@
           <p:cNvPr id="5" name="Table 4">
             <a:extLst>
               <a:ext uri="{FF2B5EF4-FFF2-40B4-BE49-F238E27FC236}">
-                <a16:creationId xmlns="" xmlns:a16="http://schemas.microsoft.com/office/drawing/2014/main" id="{7FE0EC76-5C3B-4492-8D2E-E1FAAD3FCB09}"/>
+                <a16:creationId xmlns:a16="http://schemas.microsoft.com/office/drawing/2014/main" id="{7FE0EC76-5C3B-4492-8D2E-E1FAAD3FCB09}"/>
               </a:ext>
             </a:extLst>
           </p:cNvPr>
@@ -5060,21 +6104,21 @@
                 <a:gridCol w="1190594">
                   <a:extLst>
                     <a:ext uri="{9D8B030D-6E8A-4147-A177-3AD203B41FA5}">
-                      <a16:colId xmlns="" xmlns:a16="http://schemas.microsoft.com/office/drawing/2014/main" val="2350551349"/>
+                      <a16:colId xmlns:a16="http://schemas.microsoft.com/office/drawing/2014/main" val="2350551349"/>
                     </a:ext>
                   </a:extLst>
                 </a:gridCol>
                 <a:gridCol w="4492101">
                   <a:extLst>
                     <a:ext uri="{9D8B030D-6E8A-4147-A177-3AD203B41FA5}">
-                      <a16:colId xmlns="" xmlns:a16="http://schemas.microsoft.com/office/drawing/2014/main" val="3837764880"/>
+                      <a16:colId xmlns:a16="http://schemas.microsoft.com/office/drawing/2014/main" val="3837764880"/>
                     </a:ext>
                   </a:extLst>
                 </a:gridCol>
                 <a:gridCol w="5495277">
                   <a:extLst>
                     <a:ext uri="{9D8B030D-6E8A-4147-A177-3AD203B41FA5}">
-                      <a16:colId xmlns="" xmlns:a16="http://schemas.microsoft.com/office/drawing/2014/main" val="1650680026"/>
+                      <a16:colId xmlns:a16="http://schemas.microsoft.com/office/drawing/2014/main" val="1650680026"/>
                     </a:ext>
                   </a:extLst>
                 </a:gridCol>
@@ -5186,7 +6230,7 @@
                 </a:tc>
                 <a:extLst>
                   <a:ext uri="{0D108BD9-81ED-4DB2-BD59-A6C34878D82A}">
-                    <a16:rowId xmlns="" xmlns:a16="http://schemas.microsoft.com/office/drawing/2014/main" val="3622372536"/>
+                    <a16:rowId xmlns:a16="http://schemas.microsoft.com/office/drawing/2014/main" val="3622372536"/>
                   </a:ext>
                 </a:extLst>
               </a:tr>
@@ -5226,7 +6270,7 @@
                 </a:tc>
                 <a:extLst>
                   <a:ext uri="{0D108BD9-81ED-4DB2-BD59-A6C34878D82A}">
-                    <a16:rowId xmlns="" xmlns:a16="http://schemas.microsoft.com/office/drawing/2014/main" val="3395803886"/>
+                    <a16:rowId xmlns:a16="http://schemas.microsoft.com/office/drawing/2014/main" val="3395803886"/>
                   </a:ext>
                 </a:extLst>
               </a:tr>
@@ -5266,7 +6310,7 @@
                 </a:tc>
                 <a:extLst>
                   <a:ext uri="{0D108BD9-81ED-4DB2-BD59-A6C34878D82A}">
-                    <a16:rowId xmlns="" xmlns:a16="http://schemas.microsoft.com/office/drawing/2014/main" val="678614825"/>
+                    <a16:rowId xmlns:a16="http://schemas.microsoft.com/office/drawing/2014/main" val="678614825"/>
                   </a:ext>
                 </a:extLst>
               </a:tr>
@@ -5306,7 +6350,7 @@
                 </a:tc>
                 <a:extLst>
                   <a:ext uri="{0D108BD9-81ED-4DB2-BD59-A6C34878D82A}">
-                    <a16:rowId xmlns="" xmlns:a16="http://schemas.microsoft.com/office/drawing/2014/main" val="14700446"/>
+                    <a16:rowId xmlns:a16="http://schemas.microsoft.com/office/drawing/2014/main" val="14700446"/>
                   </a:ext>
                 </a:extLst>
               </a:tr>
@@ -5397,7 +6441,7 @@
                 </a:tc>
                 <a:extLst>
                   <a:ext uri="{0D108BD9-81ED-4DB2-BD59-A6C34878D82A}">
-                    <a16:rowId xmlns="" xmlns:a16="http://schemas.microsoft.com/office/drawing/2014/main" val="2986406775"/>
+                    <a16:rowId xmlns:a16="http://schemas.microsoft.com/office/drawing/2014/main" val="2986406775"/>
                   </a:ext>
                 </a:extLst>
               </a:tr>
@@ -5410,7 +6454,7 @@
           <p:cNvPr id="6" name="Rectangle 5">
             <a:extLst>
               <a:ext uri="{FF2B5EF4-FFF2-40B4-BE49-F238E27FC236}">
-                <a16:creationId xmlns="" xmlns:a16="http://schemas.microsoft.com/office/drawing/2014/main" id="{3D3A6304-95D1-4C9A-9D4F-D6FEB093FD04}"/>
+                <a16:creationId xmlns:a16="http://schemas.microsoft.com/office/drawing/2014/main" id="{3D3A6304-95D1-4C9A-9D4F-D6FEB093FD04}"/>
               </a:ext>
             </a:extLst>
           </p:cNvPr>
@@ -5460,7 +6504,7 @@
           <p:cNvPr id="7" name="Rectangle 6">
             <a:extLst>
               <a:ext uri="{FF2B5EF4-FFF2-40B4-BE49-F238E27FC236}">
-                <a16:creationId xmlns="" xmlns:a16="http://schemas.microsoft.com/office/drawing/2014/main" id="{FA2D1AB0-D637-49D0-8B11-798F83C57DE5}"/>
+                <a16:creationId xmlns:a16="http://schemas.microsoft.com/office/drawing/2014/main" id="{FA2D1AB0-D637-49D0-8B11-798F83C57DE5}"/>
               </a:ext>
             </a:extLst>
           </p:cNvPr>
@@ -5509,7 +6553,7 @@
           <p:cNvPr id="20" name="Group 19">
             <a:extLst>
               <a:ext uri="{FF2B5EF4-FFF2-40B4-BE49-F238E27FC236}">
-                <a16:creationId xmlns="" xmlns:a16="http://schemas.microsoft.com/office/drawing/2014/main" id="{61966E5F-6A7D-4692-B4A7-31B364D52472}"/>
+                <a16:creationId xmlns:a16="http://schemas.microsoft.com/office/drawing/2014/main" id="{61966E5F-6A7D-4692-B4A7-31B364D52472}"/>
               </a:ext>
             </a:extLst>
           </p:cNvPr>
@@ -5529,7 +6573,7 @@
             <p:cNvPr id="10" name="Rectangle 9">
               <a:extLst>
                 <a:ext uri="{FF2B5EF4-FFF2-40B4-BE49-F238E27FC236}">
-                  <a16:creationId xmlns="" xmlns:a16="http://schemas.microsoft.com/office/drawing/2014/main" id="{ED96FD96-30EE-42EA-AE74-FF660B4CD95E}"/>
+                  <a16:creationId xmlns:a16="http://schemas.microsoft.com/office/drawing/2014/main" id="{ED96FD96-30EE-42EA-AE74-FF660B4CD95E}"/>
                 </a:ext>
               </a:extLst>
             </p:cNvPr>
@@ -5578,7 +6622,7 @@
             <p:cNvPr id="15" name="Flowchart: Decision 14">
               <a:extLst>
                 <a:ext uri="{FF2B5EF4-FFF2-40B4-BE49-F238E27FC236}">
-                  <a16:creationId xmlns="" xmlns:a16="http://schemas.microsoft.com/office/drawing/2014/main" id="{7DD829F6-1A9E-4763-8903-C9A0993AC38E}"/>
+                  <a16:creationId xmlns:a16="http://schemas.microsoft.com/office/drawing/2014/main" id="{7DD829F6-1A9E-4763-8903-C9A0993AC38E}"/>
                 </a:ext>
               </a:extLst>
             </p:cNvPr>
@@ -5625,7 +6669,7 @@
           <p:cNvPr id="19" name="Group 18">
             <a:extLst>
               <a:ext uri="{FF2B5EF4-FFF2-40B4-BE49-F238E27FC236}">
-                <a16:creationId xmlns="" xmlns:a16="http://schemas.microsoft.com/office/drawing/2014/main" id="{0DAE263D-B219-4D24-932B-1ECEB1854EDA}"/>
+                <a16:creationId xmlns:a16="http://schemas.microsoft.com/office/drawing/2014/main" id="{0DAE263D-B219-4D24-932B-1ECEB1854EDA}"/>
               </a:ext>
             </a:extLst>
           </p:cNvPr>
@@ -5645,7 +6689,7 @@
             <p:cNvPr id="11" name="Rectangle 10">
               <a:extLst>
                 <a:ext uri="{FF2B5EF4-FFF2-40B4-BE49-F238E27FC236}">
-                  <a16:creationId xmlns="" xmlns:a16="http://schemas.microsoft.com/office/drawing/2014/main" id="{80085097-CCF1-4DCA-9E6D-E8FB4FF5528B}"/>
+                  <a16:creationId xmlns:a16="http://schemas.microsoft.com/office/drawing/2014/main" id="{80085097-CCF1-4DCA-9E6D-E8FB4FF5528B}"/>
                 </a:ext>
               </a:extLst>
             </p:cNvPr>
@@ -5694,7 +6738,7 @@
             <p:cNvPr id="12" name="Flowchart: Decision 11">
               <a:extLst>
                 <a:ext uri="{FF2B5EF4-FFF2-40B4-BE49-F238E27FC236}">
-                  <a16:creationId xmlns="" xmlns:a16="http://schemas.microsoft.com/office/drawing/2014/main" id="{2A0BE501-A964-4BB6-B7A5-2B5C26EC5DF9}"/>
+                  <a16:creationId xmlns:a16="http://schemas.microsoft.com/office/drawing/2014/main" id="{2A0BE501-A964-4BB6-B7A5-2B5C26EC5DF9}"/>
                 </a:ext>
               </a:extLst>
             </p:cNvPr>
@@ -5740,7 +6784,7 @@
             <p:cNvPr id="13" name="Flowchart: Decision 12">
               <a:extLst>
                 <a:ext uri="{FF2B5EF4-FFF2-40B4-BE49-F238E27FC236}">
-                  <a16:creationId xmlns="" xmlns:a16="http://schemas.microsoft.com/office/drawing/2014/main" id="{ED8A9097-3781-480B-8EA6-66A0EFFD1B0C}"/>
+                  <a16:creationId xmlns:a16="http://schemas.microsoft.com/office/drawing/2014/main" id="{ED8A9097-3781-480B-8EA6-66A0EFFD1B0C}"/>
                 </a:ext>
               </a:extLst>
             </p:cNvPr>
@@ -5786,7 +6830,7 @@
             <p:cNvPr id="14" name="Flowchart: Decision 13">
               <a:extLst>
                 <a:ext uri="{FF2B5EF4-FFF2-40B4-BE49-F238E27FC236}">
-                  <a16:creationId xmlns="" xmlns:a16="http://schemas.microsoft.com/office/drawing/2014/main" id="{FC301A33-6B6C-4638-8E7B-D2120989BE20}"/>
+                  <a16:creationId xmlns:a16="http://schemas.microsoft.com/office/drawing/2014/main" id="{FC301A33-6B6C-4638-8E7B-D2120989BE20}"/>
                 </a:ext>
               </a:extLst>
             </p:cNvPr>
@@ -5833,7 +6877,7 @@
           <p:cNvPr id="21" name="Group 20">
             <a:extLst>
               <a:ext uri="{FF2B5EF4-FFF2-40B4-BE49-F238E27FC236}">
-                <a16:creationId xmlns="" xmlns:a16="http://schemas.microsoft.com/office/drawing/2014/main" id="{84119507-443D-45EE-86E7-FA578222D438}"/>
+                <a16:creationId xmlns:a16="http://schemas.microsoft.com/office/drawing/2014/main" id="{84119507-443D-45EE-86E7-FA578222D438}"/>
               </a:ext>
             </a:extLst>
           </p:cNvPr>
@@ -5853,7 +6897,7 @@
             <p:cNvPr id="8" name="Rectangle 7">
               <a:extLst>
                 <a:ext uri="{FF2B5EF4-FFF2-40B4-BE49-F238E27FC236}">
-                  <a16:creationId xmlns="" xmlns:a16="http://schemas.microsoft.com/office/drawing/2014/main" id="{AFEE3931-10A1-4CDD-810D-FC9109934B99}"/>
+                  <a16:creationId xmlns:a16="http://schemas.microsoft.com/office/drawing/2014/main" id="{AFEE3931-10A1-4CDD-810D-FC9109934B99}"/>
                 </a:ext>
               </a:extLst>
             </p:cNvPr>
@@ -5902,7 +6946,7 @@
             <p:cNvPr id="16" name="Flowchart: Decision 15">
               <a:extLst>
                 <a:ext uri="{FF2B5EF4-FFF2-40B4-BE49-F238E27FC236}">
-                  <a16:creationId xmlns="" xmlns:a16="http://schemas.microsoft.com/office/drawing/2014/main" id="{4E597F90-8639-4F18-85CF-7F9254DB3317}"/>
+                  <a16:creationId xmlns:a16="http://schemas.microsoft.com/office/drawing/2014/main" id="{4E597F90-8639-4F18-85CF-7F9254DB3317}"/>
                 </a:ext>
               </a:extLst>
             </p:cNvPr>
@@ -5949,7 +6993,7 @@
           <p:cNvPr id="22" name="Group 21">
             <a:extLst>
               <a:ext uri="{FF2B5EF4-FFF2-40B4-BE49-F238E27FC236}">
-                <a16:creationId xmlns="" xmlns:a16="http://schemas.microsoft.com/office/drawing/2014/main" id="{D3172953-4DC1-4408-A686-B915B758B219}"/>
+                <a16:creationId xmlns:a16="http://schemas.microsoft.com/office/drawing/2014/main" id="{D3172953-4DC1-4408-A686-B915B758B219}"/>
               </a:ext>
             </a:extLst>
           </p:cNvPr>
@@ -5969,7 +7013,7 @@
             <p:cNvPr id="9" name="Rectangle 8">
               <a:extLst>
                 <a:ext uri="{FF2B5EF4-FFF2-40B4-BE49-F238E27FC236}">
-                  <a16:creationId xmlns="" xmlns:a16="http://schemas.microsoft.com/office/drawing/2014/main" id="{EFA74233-BA2E-456A-86AA-CF07F73244F1}"/>
+                  <a16:creationId xmlns:a16="http://schemas.microsoft.com/office/drawing/2014/main" id="{EFA74233-BA2E-456A-86AA-CF07F73244F1}"/>
                 </a:ext>
               </a:extLst>
             </p:cNvPr>
@@ -6018,7 +7062,7 @@
             <p:cNvPr id="17" name="Flowchart: Decision 16">
               <a:extLst>
                 <a:ext uri="{FF2B5EF4-FFF2-40B4-BE49-F238E27FC236}">
-                  <a16:creationId xmlns="" xmlns:a16="http://schemas.microsoft.com/office/drawing/2014/main" id="{92959D0E-74B4-4C6C-828D-74F2B6A3D47C}"/>
+                  <a16:creationId xmlns:a16="http://schemas.microsoft.com/office/drawing/2014/main" id="{92959D0E-74B4-4C6C-828D-74F2B6A3D47C}"/>
                 </a:ext>
               </a:extLst>
             </p:cNvPr>
@@ -6065,7 +7109,7 @@
           <p:cNvPr id="18" name="Flowchart: Decision 17">
             <a:extLst>
               <a:ext uri="{FF2B5EF4-FFF2-40B4-BE49-F238E27FC236}">
-                <a16:creationId xmlns="" xmlns:a16="http://schemas.microsoft.com/office/drawing/2014/main" id="{210DC1B3-53F0-4298-B209-CB2117756721}"/>
+                <a16:creationId xmlns:a16="http://schemas.microsoft.com/office/drawing/2014/main" id="{210DC1B3-53F0-4298-B209-CB2117756721}"/>
               </a:ext>
             </a:extLst>
           </p:cNvPr>
@@ -6111,7 +7155,7 @@
           <p:cNvPr id="23" name="TextBox 22">
             <a:extLst>
               <a:ext uri="{FF2B5EF4-FFF2-40B4-BE49-F238E27FC236}">
-                <a16:creationId xmlns="" xmlns:a16="http://schemas.microsoft.com/office/drawing/2014/main" id="{E661C252-6A24-4EB1-8618-EC5A6E2ECFDD}"/>
+                <a16:creationId xmlns:a16="http://schemas.microsoft.com/office/drawing/2014/main" id="{E661C252-6A24-4EB1-8618-EC5A6E2ECFDD}"/>
               </a:ext>
             </a:extLst>
           </p:cNvPr>
@@ -6150,7 +7194,7 @@
           <p:cNvPr id="24" name="TextBox 23">
             <a:extLst>
               <a:ext uri="{FF2B5EF4-FFF2-40B4-BE49-F238E27FC236}">
-                <a16:creationId xmlns="" xmlns:a16="http://schemas.microsoft.com/office/drawing/2014/main" id="{F7314EE0-3A67-4C86-892A-2F68B23DA8DE}"/>
+                <a16:creationId xmlns:a16="http://schemas.microsoft.com/office/drawing/2014/main" id="{F7314EE0-3A67-4C86-892A-2F68B23DA8DE}"/>
               </a:ext>
             </a:extLst>
           </p:cNvPr>
@@ -6189,7 +7233,7 @@
           <p:cNvPr id="25" name="TextBox 24">
             <a:extLst>
               <a:ext uri="{FF2B5EF4-FFF2-40B4-BE49-F238E27FC236}">
-                <a16:creationId xmlns="" xmlns:a16="http://schemas.microsoft.com/office/drawing/2014/main" id="{DFC08BC7-36A6-438D-B1DC-123CBDD5C0F6}"/>
+                <a16:creationId xmlns:a16="http://schemas.microsoft.com/office/drawing/2014/main" id="{DFC08BC7-36A6-438D-B1DC-123CBDD5C0F6}"/>
               </a:ext>
             </a:extLst>
           </p:cNvPr>
@@ -6228,7 +7272,7 @@
           <p:cNvPr id="26" name="TextBox 25">
             <a:extLst>
               <a:ext uri="{FF2B5EF4-FFF2-40B4-BE49-F238E27FC236}">
-                <a16:creationId xmlns="" xmlns:a16="http://schemas.microsoft.com/office/drawing/2014/main" id="{4992DB1A-B53E-43E4-9038-42FB5B14EC93}"/>
+                <a16:creationId xmlns:a16="http://schemas.microsoft.com/office/drawing/2014/main" id="{4992DB1A-B53E-43E4-9038-42FB5B14EC93}"/>
               </a:ext>
             </a:extLst>
           </p:cNvPr>
@@ -6267,7 +7311,7 @@
           <p:cNvPr id="27" name="TextBox 26">
             <a:extLst>
               <a:ext uri="{FF2B5EF4-FFF2-40B4-BE49-F238E27FC236}">
-                <a16:creationId xmlns="" xmlns:a16="http://schemas.microsoft.com/office/drawing/2014/main" id="{8710889C-2534-4DC4-B4CE-00EC929F78F1}"/>
+                <a16:creationId xmlns:a16="http://schemas.microsoft.com/office/drawing/2014/main" id="{8710889C-2534-4DC4-B4CE-00EC929F78F1}"/>
               </a:ext>
             </a:extLst>
           </p:cNvPr>
@@ -6306,7 +7350,7 @@
           <p:cNvPr id="29" name="TextBox 28">
             <a:extLst>
               <a:ext uri="{FF2B5EF4-FFF2-40B4-BE49-F238E27FC236}">
-                <a16:creationId xmlns="" xmlns:a16="http://schemas.microsoft.com/office/drawing/2014/main" id="{31A6AF03-D01E-4FD5-90D9-8B5FFD612ECB}"/>
+                <a16:creationId xmlns:a16="http://schemas.microsoft.com/office/drawing/2014/main" id="{31A6AF03-D01E-4FD5-90D9-8B5FFD612ECB}"/>
               </a:ext>
             </a:extLst>
           </p:cNvPr>
@@ -6341,7 +7385,7 @@
           <p:cNvPr id="30" name="TextBox 29">
             <a:extLst>
               <a:ext uri="{FF2B5EF4-FFF2-40B4-BE49-F238E27FC236}">
-                <a16:creationId xmlns="" xmlns:a16="http://schemas.microsoft.com/office/drawing/2014/main" id="{B1F3D9F5-18A1-4BB4-8394-3037A1C456BE}"/>
+                <a16:creationId xmlns:a16="http://schemas.microsoft.com/office/drawing/2014/main" id="{B1F3D9F5-18A1-4BB4-8394-3037A1C456BE}"/>
               </a:ext>
             </a:extLst>
           </p:cNvPr>
@@ -6376,7 +7420,7 @@
           <p:cNvPr id="32" name="Straight Connector 31">
             <a:extLst>
               <a:ext uri="{FF2B5EF4-FFF2-40B4-BE49-F238E27FC236}">
-                <a16:creationId xmlns="" xmlns:a16="http://schemas.microsoft.com/office/drawing/2014/main" id="{C278E7B5-CACA-4CA5-BAB7-413AB76CD5F8}"/>
+                <a16:creationId xmlns:a16="http://schemas.microsoft.com/office/drawing/2014/main" id="{C278E7B5-CACA-4CA5-BAB7-413AB76CD5F8}"/>
               </a:ext>
             </a:extLst>
           </p:cNvPr>
@@ -6418,7 +7462,7 @@
           <p:cNvPr id="33" name="Straight Connector 32">
             <a:extLst>
               <a:ext uri="{FF2B5EF4-FFF2-40B4-BE49-F238E27FC236}">
-                <a16:creationId xmlns="" xmlns:a16="http://schemas.microsoft.com/office/drawing/2014/main" id="{760B251E-E9CE-466F-9A74-481074E07959}"/>
+                <a16:creationId xmlns:a16="http://schemas.microsoft.com/office/drawing/2014/main" id="{760B251E-E9CE-466F-9A74-481074E07959}"/>
               </a:ext>
             </a:extLst>
           </p:cNvPr>
@@ -6461,7 +7505,7 @@
           <p:cNvPr id="36" name="Straight Connector 35">
             <a:extLst>
               <a:ext uri="{FF2B5EF4-FFF2-40B4-BE49-F238E27FC236}">
-                <a16:creationId xmlns="" xmlns:a16="http://schemas.microsoft.com/office/drawing/2014/main" id="{4B29E178-4BBD-4573-A789-253BC7408026}"/>
+                <a16:creationId xmlns:a16="http://schemas.microsoft.com/office/drawing/2014/main" id="{4B29E178-4BBD-4573-A789-253BC7408026}"/>
               </a:ext>
             </a:extLst>
           </p:cNvPr>
@@ -6504,7 +7548,7 @@
           <p:cNvPr id="39" name="Straight Connector 38">
             <a:extLst>
               <a:ext uri="{FF2B5EF4-FFF2-40B4-BE49-F238E27FC236}">
-                <a16:creationId xmlns="" xmlns:a16="http://schemas.microsoft.com/office/drawing/2014/main" id="{1833A9CD-9D3C-4E77-BBE9-FCBD590D33A0}"/>
+                <a16:creationId xmlns:a16="http://schemas.microsoft.com/office/drawing/2014/main" id="{1833A9CD-9D3C-4E77-BBE9-FCBD590D33A0}"/>
               </a:ext>
             </a:extLst>
           </p:cNvPr>
@@ -6547,7 +7591,7 @@
           <p:cNvPr id="47" name="Straight Connector 46">
             <a:extLst>
               <a:ext uri="{FF2B5EF4-FFF2-40B4-BE49-F238E27FC236}">
-                <a16:creationId xmlns="" xmlns:a16="http://schemas.microsoft.com/office/drawing/2014/main" id="{3CCE225C-90DF-4831-BC56-FC60EC845F85}"/>
+                <a16:creationId xmlns:a16="http://schemas.microsoft.com/office/drawing/2014/main" id="{3CCE225C-90DF-4831-BC56-FC60EC845F85}"/>
               </a:ext>
             </a:extLst>
           </p:cNvPr>
@@ -6634,7 +7678,7 @@
 </p:sld>
 </file>
 
-<file path=ppt/slides/slide13.xml><?xml version="1.0" encoding="utf-8"?>
+<file path=ppt/slides/slide14.xml><?xml version="1.0" encoding="utf-8"?>
 <p:sld xmlns:a="http://schemas.openxmlformats.org/drawingml/2006/main" xmlns:r="http://schemas.openxmlformats.org/officeDocument/2006/relationships" xmlns:p="http://schemas.openxmlformats.org/presentationml/2006/main">
   <p:cSld>
     <p:spTree>
@@ -6707,28 +7751,28 @@
                 <a:gridCol w="2628900">
                   <a:extLst>
                     <a:ext uri="{9D8B030D-6E8A-4147-A177-3AD203B41FA5}">
-                      <a16:colId xmlns="" xmlns:a16="http://schemas.microsoft.com/office/drawing/2014/main" val="20000"/>
+                      <a16:colId xmlns:a16="http://schemas.microsoft.com/office/drawing/2014/main" val="20000"/>
                     </a:ext>
                   </a:extLst>
                 </a:gridCol>
                 <a:gridCol w="2628900">
                   <a:extLst>
                     <a:ext uri="{9D8B030D-6E8A-4147-A177-3AD203B41FA5}">
-                      <a16:colId xmlns="" xmlns:a16="http://schemas.microsoft.com/office/drawing/2014/main" val="20001"/>
+                      <a16:colId xmlns:a16="http://schemas.microsoft.com/office/drawing/2014/main" val="20001"/>
                     </a:ext>
                   </a:extLst>
                 </a:gridCol>
                 <a:gridCol w="2628900">
                   <a:extLst>
                     <a:ext uri="{9D8B030D-6E8A-4147-A177-3AD203B41FA5}">
-                      <a16:colId xmlns="" xmlns:a16="http://schemas.microsoft.com/office/drawing/2014/main" val="20002"/>
+                      <a16:colId xmlns:a16="http://schemas.microsoft.com/office/drawing/2014/main" val="20002"/>
                     </a:ext>
                   </a:extLst>
                 </a:gridCol>
                 <a:gridCol w="2628900">
                   <a:extLst>
                     <a:ext uri="{9D8B030D-6E8A-4147-A177-3AD203B41FA5}">
-                      <a16:colId xmlns="" xmlns:a16="http://schemas.microsoft.com/office/drawing/2014/main" val="20003"/>
+                      <a16:colId xmlns:a16="http://schemas.microsoft.com/office/drawing/2014/main" val="20003"/>
                     </a:ext>
                   </a:extLst>
                 </a:gridCol>
@@ -6793,7 +7837,7 @@
                 </a:tc>
                 <a:extLst>
                   <a:ext uri="{0D108BD9-81ED-4DB2-BD59-A6C34878D82A}">
-                    <a16:rowId xmlns="" xmlns:a16="http://schemas.microsoft.com/office/drawing/2014/main" val="10000"/>
+                    <a16:rowId xmlns:a16="http://schemas.microsoft.com/office/drawing/2014/main" val="10000"/>
                   </a:ext>
                 </a:extLst>
               </a:tr>
@@ -6852,7 +7896,7 @@
                 </a:tc>
                 <a:extLst>
                   <a:ext uri="{0D108BD9-81ED-4DB2-BD59-A6C34878D82A}">
-                    <a16:rowId xmlns="" xmlns:a16="http://schemas.microsoft.com/office/drawing/2014/main" val="10001"/>
+                    <a16:rowId xmlns:a16="http://schemas.microsoft.com/office/drawing/2014/main" val="10001"/>
                   </a:ext>
                 </a:extLst>
               </a:tr>
@@ -6915,7 +7959,7 @@
                 </a:tc>
                 <a:extLst>
                   <a:ext uri="{0D108BD9-81ED-4DB2-BD59-A6C34878D82A}">
-                    <a16:rowId xmlns="" xmlns:a16="http://schemas.microsoft.com/office/drawing/2014/main" val="10002"/>
+                    <a16:rowId xmlns:a16="http://schemas.microsoft.com/office/drawing/2014/main" val="10002"/>
                   </a:ext>
                 </a:extLst>
               </a:tr>
@@ -6978,7 +8022,7 @@
                 </a:tc>
                 <a:extLst>
                   <a:ext uri="{0D108BD9-81ED-4DB2-BD59-A6C34878D82A}">
-                    <a16:rowId xmlns="" xmlns:a16="http://schemas.microsoft.com/office/drawing/2014/main" val="10003"/>
+                    <a16:rowId xmlns:a16="http://schemas.microsoft.com/office/drawing/2014/main" val="10003"/>
                   </a:ext>
                 </a:extLst>
               </a:tr>
@@ -7037,7 +8081,7 @@
                 </a:tc>
                 <a:extLst>
                   <a:ext uri="{0D108BD9-81ED-4DB2-BD59-A6C34878D82A}">
-                    <a16:rowId xmlns="" xmlns:a16="http://schemas.microsoft.com/office/drawing/2014/main" val="10004"/>
+                    <a16:rowId xmlns:a16="http://schemas.microsoft.com/office/drawing/2014/main" val="10004"/>
                   </a:ext>
                 </a:extLst>
               </a:tr>
@@ -7096,7 +8140,7 @@
                 </a:tc>
                 <a:extLst>
                   <a:ext uri="{0D108BD9-81ED-4DB2-BD59-A6C34878D82A}">
-                    <a16:rowId xmlns="" xmlns:a16="http://schemas.microsoft.com/office/drawing/2014/main" val="10005"/>
+                    <a16:rowId xmlns:a16="http://schemas.microsoft.com/office/drawing/2014/main" val="10005"/>
                   </a:ext>
                 </a:extLst>
               </a:tr>
@@ -7156,7 +8200,7 @@
                 </a:tc>
                 <a:extLst>
                   <a:ext uri="{0D108BD9-81ED-4DB2-BD59-A6C34878D82A}">
-                    <a16:rowId xmlns="" xmlns:a16="http://schemas.microsoft.com/office/drawing/2014/main" val="10006"/>
+                    <a16:rowId xmlns:a16="http://schemas.microsoft.com/office/drawing/2014/main" val="10006"/>
                   </a:ext>
                 </a:extLst>
               </a:tr>
@@ -7177,7 +8221,7 @@
 </p:sld>
 </file>
 
-<file path=ppt/slides/slide14.xml><?xml version="1.0" encoding="utf-8"?>
+<file path=ppt/slides/slide15.xml><?xml version="1.0" encoding="utf-8"?>
 <p:sld xmlns:a="http://schemas.openxmlformats.org/drawingml/2006/main" xmlns:r="http://schemas.openxmlformats.org/officeDocument/2006/relationships" xmlns:p="http://schemas.openxmlformats.org/presentationml/2006/main">
   <p:cSld>
     <p:spTree>
@@ -7250,28 +8294,28 @@
                 <a:gridCol w="2628900">
                   <a:extLst>
                     <a:ext uri="{9D8B030D-6E8A-4147-A177-3AD203B41FA5}">
-                      <a16:colId xmlns="" xmlns:a16="http://schemas.microsoft.com/office/drawing/2014/main" val="20000"/>
+                      <a16:colId xmlns:a16="http://schemas.microsoft.com/office/drawing/2014/main" val="20000"/>
                     </a:ext>
                   </a:extLst>
                 </a:gridCol>
                 <a:gridCol w="2628900">
                   <a:extLst>
                     <a:ext uri="{9D8B030D-6E8A-4147-A177-3AD203B41FA5}">
-                      <a16:colId xmlns="" xmlns:a16="http://schemas.microsoft.com/office/drawing/2014/main" val="20001"/>
+                      <a16:colId xmlns:a16="http://schemas.microsoft.com/office/drawing/2014/main" val="20001"/>
                     </a:ext>
                   </a:extLst>
                 </a:gridCol>
                 <a:gridCol w="2628900">
                   <a:extLst>
                     <a:ext uri="{9D8B030D-6E8A-4147-A177-3AD203B41FA5}">
-                      <a16:colId xmlns="" xmlns:a16="http://schemas.microsoft.com/office/drawing/2014/main" val="20002"/>
+                      <a16:colId xmlns:a16="http://schemas.microsoft.com/office/drawing/2014/main" val="20002"/>
                     </a:ext>
                   </a:extLst>
                 </a:gridCol>
                 <a:gridCol w="2628900">
                   <a:extLst>
                     <a:ext uri="{9D8B030D-6E8A-4147-A177-3AD203B41FA5}">
-                      <a16:colId xmlns="" xmlns:a16="http://schemas.microsoft.com/office/drawing/2014/main" val="20003"/>
+                      <a16:colId xmlns:a16="http://schemas.microsoft.com/office/drawing/2014/main" val="20003"/>
                     </a:ext>
                   </a:extLst>
                 </a:gridCol>
@@ -7336,7 +8380,7 @@
                 </a:tc>
                 <a:extLst>
                   <a:ext uri="{0D108BD9-81ED-4DB2-BD59-A6C34878D82A}">
-                    <a16:rowId xmlns="" xmlns:a16="http://schemas.microsoft.com/office/drawing/2014/main" val="10000"/>
+                    <a16:rowId xmlns:a16="http://schemas.microsoft.com/office/drawing/2014/main" val="10000"/>
                   </a:ext>
                 </a:extLst>
               </a:tr>
@@ -7399,7 +8443,7 @@
                 </a:tc>
                 <a:extLst>
                   <a:ext uri="{0D108BD9-81ED-4DB2-BD59-A6C34878D82A}">
-                    <a16:rowId xmlns="" xmlns:a16="http://schemas.microsoft.com/office/drawing/2014/main" val="10001"/>
+                    <a16:rowId xmlns:a16="http://schemas.microsoft.com/office/drawing/2014/main" val="10001"/>
                   </a:ext>
                 </a:extLst>
               </a:tr>
@@ -7470,7 +8514,7 @@
                 </a:tc>
                 <a:extLst>
                   <a:ext uri="{0D108BD9-81ED-4DB2-BD59-A6C34878D82A}">
-                    <a16:rowId xmlns="" xmlns:a16="http://schemas.microsoft.com/office/drawing/2014/main" val="10002"/>
+                    <a16:rowId xmlns:a16="http://schemas.microsoft.com/office/drawing/2014/main" val="10002"/>
                   </a:ext>
                 </a:extLst>
               </a:tr>
@@ -7529,7 +8573,7 @@
                 </a:tc>
                 <a:extLst>
                   <a:ext uri="{0D108BD9-81ED-4DB2-BD59-A6C34878D82A}">
-                    <a16:rowId xmlns="" xmlns:a16="http://schemas.microsoft.com/office/drawing/2014/main" val="10003"/>
+                    <a16:rowId xmlns:a16="http://schemas.microsoft.com/office/drawing/2014/main" val="10003"/>
                   </a:ext>
                 </a:extLst>
               </a:tr>
@@ -7600,7 +8644,7 @@
                 </a:tc>
                 <a:extLst>
                   <a:ext uri="{0D108BD9-81ED-4DB2-BD59-A6C34878D82A}">
-                    <a16:rowId xmlns="" xmlns:a16="http://schemas.microsoft.com/office/drawing/2014/main" val="10004"/>
+                    <a16:rowId xmlns:a16="http://schemas.microsoft.com/office/drawing/2014/main" val="10004"/>
                   </a:ext>
                 </a:extLst>
               </a:tr>
@@ -7659,7 +8703,7 @@
                 </a:tc>
                 <a:extLst>
                   <a:ext uri="{0D108BD9-81ED-4DB2-BD59-A6C34878D82A}">
-                    <a16:rowId xmlns="" xmlns:a16="http://schemas.microsoft.com/office/drawing/2014/main" val="10005"/>
+                    <a16:rowId xmlns:a16="http://schemas.microsoft.com/office/drawing/2014/main" val="10005"/>
                   </a:ext>
                 </a:extLst>
               </a:tr>
@@ -7722,7 +8766,7 @@
                 </a:tc>
                 <a:extLst>
                   <a:ext uri="{0D108BD9-81ED-4DB2-BD59-A6C34878D82A}">
-                    <a16:rowId xmlns="" xmlns:a16="http://schemas.microsoft.com/office/drawing/2014/main" val="10006"/>
+                    <a16:rowId xmlns:a16="http://schemas.microsoft.com/office/drawing/2014/main" val="10006"/>
                   </a:ext>
                 </a:extLst>
               </a:tr>
@@ -7782,7 +8826,7 @@
                 </a:tc>
                 <a:extLst>
                   <a:ext uri="{0D108BD9-81ED-4DB2-BD59-A6C34878D82A}">
-                    <a16:rowId xmlns="" xmlns:a16="http://schemas.microsoft.com/office/drawing/2014/main" val="10007"/>
+                    <a16:rowId xmlns:a16="http://schemas.microsoft.com/office/drawing/2014/main" val="10007"/>
                   </a:ext>
                 </a:extLst>
               </a:tr>
@@ -7803,7 +8847,7 @@
 </p:sld>
 </file>
 
-<file path=ppt/slides/slide15.xml><?xml version="1.0" encoding="utf-8"?>
+<file path=ppt/slides/slide16.xml><?xml version="1.0" encoding="utf-8"?>
 <p:sld xmlns:a="http://schemas.openxmlformats.org/drawingml/2006/main" xmlns:r="http://schemas.openxmlformats.org/officeDocument/2006/relationships" xmlns:p="http://schemas.openxmlformats.org/presentationml/2006/main">
   <p:cSld>
     <p:spTree>
@@ -7876,28 +8920,28 @@
                 <a:gridCol w="2628900">
                   <a:extLst>
                     <a:ext uri="{9D8B030D-6E8A-4147-A177-3AD203B41FA5}">
-                      <a16:colId xmlns="" xmlns:a16="http://schemas.microsoft.com/office/drawing/2014/main" val="20000"/>
+                      <a16:colId xmlns:a16="http://schemas.microsoft.com/office/drawing/2014/main" val="20000"/>
                     </a:ext>
                   </a:extLst>
                 </a:gridCol>
                 <a:gridCol w="2628900">
                   <a:extLst>
                     <a:ext uri="{9D8B030D-6E8A-4147-A177-3AD203B41FA5}">
-                      <a16:colId xmlns="" xmlns:a16="http://schemas.microsoft.com/office/drawing/2014/main" val="20001"/>
+                      <a16:colId xmlns:a16="http://schemas.microsoft.com/office/drawing/2014/main" val="20001"/>
                     </a:ext>
                   </a:extLst>
                 </a:gridCol>
                 <a:gridCol w="2628900">
                   <a:extLst>
                     <a:ext uri="{9D8B030D-6E8A-4147-A177-3AD203B41FA5}">
-                      <a16:colId xmlns="" xmlns:a16="http://schemas.microsoft.com/office/drawing/2014/main" val="20002"/>
+                      <a16:colId xmlns:a16="http://schemas.microsoft.com/office/drawing/2014/main" val="20002"/>
                     </a:ext>
                   </a:extLst>
                 </a:gridCol>
                 <a:gridCol w="2628900">
                   <a:extLst>
                     <a:ext uri="{9D8B030D-6E8A-4147-A177-3AD203B41FA5}">
-                      <a16:colId xmlns="" xmlns:a16="http://schemas.microsoft.com/office/drawing/2014/main" val="20003"/>
+                      <a16:colId xmlns:a16="http://schemas.microsoft.com/office/drawing/2014/main" val="20003"/>
                     </a:ext>
                   </a:extLst>
                 </a:gridCol>
@@ -7962,7 +9006,7 @@
                 </a:tc>
                 <a:extLst>
                   <a:ext uri="{0D108BD9-81ED-4DB2-BD59-A6C34878D82A}">
-                    <a16:rowId xmlns="" xmlns:a16="http://schemas.microsoft.com/office/drawing/2014/main" val="10000"/>
+                    <a16:rowId xmlns:a16="http://schemas.microsoft.com/office/drawing/2014/main" val="10000"/>
                   </a:ext>
                 </a:extLst>
               </a:tr>
@@ -8033,7 +9077,7 @@
                 </a:tc>
                 <a:extLst>
                   <a:ext uri="{0D108BD9-81ED-4DB2-BD59-A6C34878D82A}">
-                    <a16:rowId xmlns="" xmlns:a16="http://schemas.microsoft.com/office/drawing/2014/main" val="10001"/>
+                    <a16:rowId xmlns:a16="http://schemas.microsoft.com/office/drawing/2014/main" val="10001"/>
                   </a:ext>
                 </a:extLst>
               </a:tr>
@@ -8104,7 +9148,7 @@
                 </a:tc>
                 <a:extLst>
                   <a:ext uri="{0D108BD9-81ED-4DB2-BD59-A6C34878D82A}">
-                    <a16:rowId xmlns="" xmlns:a16="http://schemas.microsoft.com/office/drawing/2014/main" val="10002"/>
+                    <a16:rowId xmlns:a16="http://schemas.microsoft.com/office/drawing/2014/main" val="10002"/>
                   </a:ext>
                 </a:extLst>
               </a:tr>
@@ -8175,7 +9219,7 @@
                 </a:tc>
                 <a:extLst>
                   <a:ext uri="{0D108BD9-81ED-4DB2-BD59-A6C34878D82A}">
-                    <a16:rowId xmlns="" xmlns:a16="http://schemas.microsoft.com/office/drawing/2014/main" val="10003"/>
+                    <a16:rowId xmlns:a16="http://schemas.microsoft.com/office/drawing/2014/main" val="10003"/>
                   </a:ext>
                 </a:extLst>
               </a:tr>
@@ -8234,7 +9278,7 @@
                 </a:tc>
                 <a:extLst>
                   <a:ext uri="{0D108BD9-81ED-4DB2-BD59-A6C34878D82A}">
-                    <a16:rowId xmlns="" xmlns:a16="http://schemas.microsoft.com/office/drawing/2014/main" val="10004"/>
+                    <a16:rowId xmlns:a16="http://schemas.microsoft.com/office/drawing/2014/main" val="10004"/>
                   </a:ext>
                 </a:extLst>
               </a:tr>
@@ -8293,7 +9337,7 @@
                 </a:tc>
                 <a:extLst>
                   <a:ext uri="{0D108BD9-81ED-4DB2-BD59-A6C34878D82A}">
-                    <a16:rowId xmlns="" xmlns:a16="http://schemas.microsoft.com/office/drawing/2014/main" val="10005"/>
+                    <a16:rowId xmlns:a16="http://schemas.microsoft.com/office/drawing/2014/main" val="10005"/>
                   </a:ext>
                 </a:extLst>
               </a:tr>
@@ -12842,7 +13886,7 @@
           <p:cNvPr id="2" name="Title 1">
             <a:extLst>
               <a:ext uri="{FF2B5EF4-FFF2-40B4-BE49-F238E27FC236}">
-                <a16:creationId xmlns="" xmlns:a16="http://schemas.microsoft.com/office/drawing/2014/main" id="{5ADC56FF-B4DC-4FF6-8C43-32D010FD16AF}"/>
+                <a16:creationId xmlns:a16="http://schemas.microsoft.com/office/drawing/2014/main" id="{5ADC56FF-B4DC-4FF6-8C43-32D010FD16AF}"/>
               </a:ext>
             </a:extLst>
           </p:cNvPr>
@@ -12962,7 +14006,7 @@
                   <a:schemeClr val="tx1"/>
                 </a:solidFill>
               </a:rPr>
-              <a:t>Intent Recognition Engine</a:t>
+              <a:t>Intent Recognition Engine (IRE)</a:t>
             </a:r>
           </a:p>
         </p:txBody>
@@ -13228,7 +14272,7 @@
           <p:cNvPr id="50" name="Group 49">
             <a:extLst>
               <a:ext uri="{FF2B5EF4-FFF2-40B4-BE49-F238E27FC236}">
-                <a16:creationId xmlns="" xmlns:a16="http://schemas.microsoft.com/office/drawing/2014/main" id="{A51CCD7C-E0FB-4561-9ECB-21FA3B0B6011}"/>
+                <a16:creationId xmlns:a16="http://schemas.microsoft.com/office/drawing/2014/main" id="{A51CCD7C-E0FB-4561-9ECB-21FA3B0B6011}"/>
               </a:ext>
             </a:extLst>
           </p:cNvPr>
@@ -13248,7 +14292,7 @@
             <p:cNvPr id="47" name="Picture 46">
               <a:extLst>
                 <a:ext uri="{FF2B5EF4-FFF2-40B4-BE49-F238E27FC236}">
-                  <a16:creationId xmlns="" xmlns:a16="http://schemas.microsoft.com/office/drawing/2014/main" id="{01223F7B-10CE-4717-82FD-54FCB975B5B3}"/>
+                  <a16:creationId xmlns:a16="http://schemas.microsoft.com/office/drawing/2014/main" id="{01223F7B-10CE-4717-82FD-54FCB975B5B3}"/>
                 </a:ext>
               </a:extLst>
             </p:cNvPr>
@@ -13278,7 +14322,7 @@
             <p:cNvPr id="49" name="Rectangle 48">
               <a:extLst>
                 <a:ext uri="{FF2B5EF4-FFF2-40B4-BE49-F238E27FC236}">
-                  <a16:creationId xmlns="" xmlns:a16="http://schemas.microsoft.com/office/drawing/2014/main" id="{D108285C-25BE-499E-9547-DE13717298E7}"/>
+                  <a16:creationId xmlns:a16="http://schemas.microsoft.com/office/drawing/2014/main" id="{D108285C-25BE-499E-9547-DE13717298E7}"/>
                 </a:ext>
               </a:extLst>
             </p:cNvPr>
@@ -13314,7 +14358,7 @@
           <p:cNvPr id="52" name="Oval 51">
             <a:extLst>
               <a:ext uri="{FF2B5EF4-FFF2-40B4-BE49-F238E27FC236}">
-                <a16:creationId xmlns="" xmlns:a16="http://schemas.microsoft.com/office/drawing/2014/main" id="{E0BF3096-B959-4382-A27C-4DDB205490B2}"/>
+                <a16:creationId xmlns:a16="http://schemas.microsoft.com/office/drawing/2014/main" id="{E0BF3096-B959-4382-A27C-4DDB205490B2}"/>
               </a:ext>
             </a:extLst>
           </p:cNvPr>
@@ -13363,7 +14407,7 @@
           <p:cNvPr id="53" name="Oval 52">
             <a:extLst>
               <a:ext uri="{FF2B5EF4-FFF2-40B4-BE49-F238E27FC236}">
-                <a16:creationId xmlns="" xmlns:a16="http://schemas.microsoft.com/office/drawing/2014/main" id="{FDC57CFA-8D25-4707-B3DB-E4E532673A0A}"/>
+                <a16:creationId xmlns:a16="http://schemas.microsoft.com/office/drawing/2014/main" id="{FDC57CFA-8D25-4707-B3DB-E4E532673A0A}"/>
               </a:ext>
             </a:extLst>
           </p:cNvPr>
@@ -13412,7 +14456,7 @@
           <p:cNvPr id="54" name="Oval 53">
             <a:extLst>
               <a:ext uri="{FF2B5EF4-FFF2-40B4-BE49-F238E27FC236}">
-                <a16:creationId xmlns="" xmlns:a16="http://schemas.microsoft.com/office/drawing/2014/main" id="{345DB287-9B46-4514-AC05-9E3901CC17ED}"/>
+                <a16:creationId xmlns:a16="http://schemas.microsoft.com/office/drawing/2014/main" id="{345DB287-9B46-4514-AC05-9E3901CC17ED}"/>
               </a:ext>
             </a:extLst>
           </p:cNvPr>
@@ -13461,7 +14505,7 @@
           <p:cNvPr id="66" name="Straight Arrow Connector 33">
             <a:extLst>
               <a:ext uri="{FF2B5EF4-FFF2-40B4-BE49-F238E27FC236}">
-                <a16:creationId xmlns="" xmlns:a16="http://schemas.microsoft.com/office/drawing/2014/main" id="{870FF5B4-0094-43D7-B747-D0F9EC5A425A}"/>
+                <a16:creationId xmlns:a16="http://schemas.microsoft.com/office/drawing/2014/main" id="{870FF5B4-0094-43D7-B747-D0F9EC5A425A}"/>
               </a:ext>
             </a:extLst>
           </p:cNvPr>
@@ -13507,7 +14551,7 @@
           <p:cNvPr id="74" name="Straight Arrow Connector 73">
             <a:extLst>
               <a:ext uri="{FF2B5EF4-FFF2-40B4-BE49-F238E27FC236}">
-                <a16:creationId xmlns="" xmlns:a16="http://schemas.microsoft.com/office/drawing/2014/main" id="{25DC6E09-766C-435A-9947-62A270F44579}"/>
+                <a16:creationId xmlns:a16="http://schemas.microsoft.com/office/drawing/2014/main" id="{25DC6E09-766C-435A-9947-62A270F44579}"/>
               </a:ext>
             </a:extLst>
           </p:cNvPr>
@@ -13555,7 +14599,7 @@
           <p:cNvPr id="83" name="Straight Arrow Connector 82">
             <a:extLst>
               <a:ext uri="{FF2B5EF4-FFF2-40B4-BE49-F238E27FC236}">
-                <a16:creationId xmlns="" xmlns:a16="http://schemas.microsoft.com/office/drawing/2014/main" id="{7673F6C5-5DA1-42DB-9BD1-DB5C15D667E7}"/>
+                <a16:creationId xmlns:a16="http://schemas.microsoft.com/office/drawing/2014/main" id="{7673F6C5-5DA1-42DB-9BD1-DB5C15D667E7}"/>
               </a:ext>
             </a:extLst>
           </p:cNvPr>
@@ -13900,7 +14944,7 @@
   <a:extraClrSchemeLst/>
   <a:extLst>
     <a:ext uri="{05A4C25C-085E-4340-85A3-A5531E510DB2}">
-      <thm15:themeFamily xmlns="" xmlns:thm15="http://schemas.microsoft.com/office/thememl/2012/main" name="Office Theme" id="{62F939B6-93AF-4DB8-9C6B-D6C7DFDC589F}" vid="{4A3C46E8-61CC-4603-A589-7422A47A8E4A}"/>
+      <thm15:themeFamily xmlns:thm15="http://schemas.microsoft.com/office/thememl/2012/main" name="Office Theme" id="{62F939B6-93AF-4DB8-9C6B-D6C7DFDC589F}" vid="{4A3C46E8-61CC-4603-A589-7422A47A8E4A}"/>
     </a:ext>
   </a:extLst>
 </a:theme>

</xml_diff>

<commit_message>
Updates to Thesis including additional references and NOVA test results
</commit_message>
<xml_diff>
--- a/Documentation/Architecture.pptx
+++ b/Documentation/Architecture.pptx
@@ -124,7 +124,7 @@
   </p:defaultTextStyle>
   <p:extLst>
     <p:ext uri="{EFAFB233-063F-42B5-8137-9DF3F51BA10A}">
-      <p15:sldGuideLst xmlns:p15="http://schemas.microsoft.com/office/powerpoint/2012/main" xmlns="">
+      <p15:sldGuideLst xmlns:p15="http://schemas.microsoft.com/office/powerpoint/2012/main">
         <p15:guide id="1" orient="horz" pos="2160">
           <p15:clr>
             <a:srgbClr val="A4A3A4"/>
@@ -163,7 +163,7 @@
           <p:cNvPr id="2" name="Title 1">
             <a:extLst>
               <a:ext uri="{FF2B5EF4-FFF2-40B4-BE49-F238E27FC236}">
-                <a16:creationId xmlns:a16="http://schemas.microsoft.com/office/drawing/2014/main" xmlns="" id="{0208DEFD-B3C0-4D12-817A-672980A0AB83}"/>
+                <a16:creationId xmlns:a16="http://schemas.microsoft.com/office/drawing/2014/main" id="{0208DEFD-B3C0-4D12-817A-672980A0AB83}"/>
               </a:ext>
             </a:extLst>
           </p:cNvPr>
@@ -200,7 +200,7 @@
           <p:cNvPr id="3" name="Subtitle 2">
             <a:extLst>
               <a:ext uri="{FF2B5EF4-FFF2-40B4-BE49-F238E27FC236}">
-                <a16:creationId xmlns:a16="http://schemas.microsoft.com/office/drawing/2014/main" xmlns="" id="{52F30D22-503B-48B4-86CB-F2B0287B54CC}"/>
+                <a16:creationId xmlns:a16="http://schemas.microsoft.com/office/drawing/2014/main" id="{52F30D22-503B-48B4-86CB-F2B0287B54CC}"/>
               </a:ext>
             </a:extLst>
           </p:cNvPr>
@@ -270,7 +270,7 @@
           <p:cNvPr id="4" name="Date Placeholder 3">
             <a:extLst>
               <a:ext uri="{FF2B5EF4-FFF2-40B4-BE49-F238E27FC236}">
-                <a16:creationId xmlns:a16="http://schemas.microsoft.com/office/drawing/2014/main" xmlns="" id="{E8D6C7CF-C878-4063-8520-28BAE75AD582}"/>
+                <a16:creationId xmlns:a16="http://schemas.microsoft.com/office/drawing/2014/main" id="{E8D6C7CF-C878-4063-8520-28BAE75AD582}"/>
               </a:ext>
             </a:extLst>
           </p:cNvPr>
@@ -288,7 +288,7 @@
           <a:p>
             <a:fld id="{79DE2D3D-0B4E-4DD7-9670-155A46B4C7D3}" type="datetimeFigureOut">
               <a:rPr lang="en-US" smtClean="0"/>
-              <a:t>4/10/2018</a:t>
+              <a:t>5/27/2018</a:t>
             </a:fld>
             <a:endParaRPr lang="en-US"/>
           </a:p>
@@ -299,7 +299,7 @@
           <p:cNvPr id="5" name="Footer Placeholder 4">
             <a:extLst>
               <a:ext uri="{FF2B5EF4-FFF2-40B4-BE49-F238E27FC236}">
-                <a16:creationId xmlns:a16="http://schemas.microsoft.com/office/drawing/2014/main" xmlns="" id="{3405CBA8-3946-4106-B7BE-1A9C679D70B1}"/>
+                <a16:creationId xmlns:a16="http://schemas.microsoft.com/office/drawing/2014/main" id="{3405CBA8-3946-4106-B7BE-1A9C679D70B1}"/>
               </a:ext>
             </a:extLst>
           </p:cNvPr>
@@ -324,7 +324,7 @@
           <p:cNvPr id="6" name="Slide Number Placeholder 5">
             <a:extLst>
               <a:ext uri="{FF2B5EF4-FFF2-40B4-BE49-F238E27FC236}">
-                <a16:creationId xmlns:a16="http://schemas.microsoft.com/office/drawing/2014/main" xmlns="" id="{EA452CDD-AB4C-46BE-AF96-A4F89F5341BB}"/>
+                <a16:creationId xmlns:a16="http://schemas.microsoft.com/office/drawing/2014/main" id="{EA452CDD-AB4C-46BE-AF96-A4F89F5341BB}"/>
               </a:ext>
             </a:extLst>
           </p:cNvPr>
@@ -383,7 +383,7 @@
           <p:cNvPr id="2" name="Title 1">
             <a:extLst>
               <a:ext uri="{FF2B5EF4-FFF2-40B4-BE49-F238E27FC236}">
-                <a16:creationId xmlns:a16="http://schemas.microsoft.com/office/drawing/2014/main" xmlns="" id="{0820BE71-470D-4418-8BBA-56BC87E53E0D}"/>
+                <a16:creationId xmlns:a16="http://schemas.microsoft.com/office/drawing/2014/main" id="{0820BE71-470D-4418-8BBA-56BC87E53E0D}"/>
               </a:ext>
             </a:extLst>
           </p:cNvPr>
@@ -411,7 +411,7 @@
           <p:cNvPr id="3" name="Vertical Text Placeholder 2">
             <a:extLst>
               <a:ext uri="{FF2B5EF4-FFF2-40B4-BE49-F238E27FC236}">
-                <a16:creationId xmlns:a16="http://schemas.microsoft.com/office/drawing/2014/main" xmlns="" id="{1CD458A7-5C48-48B1-8674-1E3B59FF0DBF}"/>
+                <a16:creationId xmlns:a16="http://schemas.microsoft.com/office/drawing/2014/main" id="{1CD458A7-5C48-48B1-8674-1E3B59FF0DBF}"/>
               </a:ext>
             </a:extLst>
           </p:cNvPr>
@@ -468,7 +468,7 @@
           <p:cNvPr id="4" name="Date Placeholder 3">
             <a:extLst>
               <a:ext uri="{FF2B5EF4-FFF2-40B4-BE49-F238E27FC236}">
-                <a16:creationId xmlns:a16="http://schemas.microsoft.com/office/drawing/2014/main" xmlns="" id="{71FF30CF-2DC0-4356-ACC2-DC5857B93045}"/>
+                <a16:creationId xmlns:a16="http://schemas.microsoft.com/office/drawing/2014/main" id="{71FF30CF-2DC0-4356-ACC2-DC5857B93045}"/>
               </a:ext>
             </a:extLst>
           </p:cNvPr>
@@ -486,7 +486,7 @@
           <a:p>
             <a:fld id="{79DE2D3D-0B4E-4DD7-9670-155A46B4C7D3}" type="datetimeFigureOut">
               <a:rPr lang="en-US" smtClean="0"/>
-              <a:t>4/10/2018</a:t>
+              <a:t>5/27/2018</a:t>
             </a:fld>
             <a:endParaRPr lang="en-US"/>
           </a:p>
@@ -497,7 +497,7 @@
           <p:cNvPr id="5" name="Footer Placeholder 4">
             <a:extLst>
               <a:ext uri="{FF2B5EF4-FFF2-40B4-BE49-F238E27FC236}">
-                <a16:creationId xmlns:a16="http://schemas.microsoft.com/office/drawing/2014/main" xmlns="" id="{C64F5D84-1880-4D66-9409-B05042B38277}"/>
+                <a16:creationId xmlns:a16="http://schemas.microsoft.com/office/drawing/2014/main" id="{C64F5D84-1880-4D66-9409-B05042B38277}"/>
               </a:ext>
             </a:extLst>
           </p:cNvPr>
@@ -522,7 +522,7 @@
           <p:cNvPr id="6" name="Slide Number Placeholder 5">
             <a:extLst>
               <a:ext uri="{FF2B5EF4-FFF2-40B4-BE49-F238E27FC236}">
-                <a16:creationId xmlns:a16="http://schemas.microsoft.com/office/drawing/2014/main" xmlns="" id="{6AEA3C71-42CA-4318-8246-5C298A025615}"/>
+                <a16:creationId xmlns:a16="http://schemas.microsoft.com/office/drawing/2014/main" id="{6AEA3C71-42CA-4318-8246-5C298A025615}"/>
               </a:ext>
             </a:extLst>
           </p:cNvPr>
@@ -581,7 +581,7 @@
           <p:cNvPr id="2" name="Vertical Title 1">
             <a:extLst>
               <a:ext uri="{FF2B5EF4-FFF2-40B4-BE49-F238E27FC236}">
-                <a16:creationId xmlns:a16="http://schemas.microsoft.com/office/drawing/2014/main" xmlns="" id="{4FC911C0-596F-406E-89F9-D86536F980CB}"/>
+                <a16:creationId xmlns:a16="http://schemas.microsoft.com/office/drawing/2014/main" id="{4FC911C0-596F-406E-89F9-D86536F980CB}"/>
               </a:ext>
             </a:extLst>
           </p:cNvPr>
@@ -614,7 +614,7 @@
           <p:cNvPr id="3" name="Vertical Text Placeholder 2">
             <a:extLst>
               <a:ext uri="{FF2B5EF4-FFF2-40B4-BE49-F238E27FC236}">
-                <a16:creationId xmlns:a16="http://schemas.microsoft.com/office/drawing/2014/main" xmlns="" id="{D3F5427C-63BC-48E8-9131-FE9C4D5F3036}"/>
+                <a16:creationId xmlns:a16="http://schemas.microsoft.com/office/drawing/2014/main" id="{D3F5427C-63BC-48E8-9131-FE9C4D5F3036}"/>
               </a:ext>
             </a:extLst>
           </p:cNvPr>
@@ -676,7 +676,7 @@
           <p:cNvPr id="4" name="Date Placeholder 3">
             <a:extLst>
               <a:ext uri="{FF2B5EF4-FFF2-40B4-BE49-F238E27FC236}">
-                <a16:creationId xmlns:a16="http://schemas.microsoft.com/office/drawing/2014/main" xmlns="" id="{35036C6B-FB42-4DE3-9515-2C21F01A41B2}"/>
+                <a16:creationId xmlns:a16="http://schemas.microsoft.com/office/drawing/2014/main" id="{35036C6B-FB42-4DE3-9515-2C21F01A41B2}"/>
               </a:ext>
             </a:extLst>
           </p:cNvPr>
@@ -694,7 +694,7 @@
           <a:p>
             <a:fld id="{79DE2D3D-0B4E-4DD7-9670-155A46B4C7D3}" type="datetimeFigureOut">
               <a:rPr lang="en-US" smtClean="0"/>
-              <a:t>4/10/2018</a:t>
+              <a:t>5/27/2018</a:t>
             </a:fld>
             <a:endParaRPr lang="en-US"/>
           </a:p>
@@ -705,7 +705,7 @@
           <p:cNvPr id="5" name="Footer Placeholder 4">
             <a:extLst>
               <a:ext uri="{FF2B5EF4-FFF2-40B4-BE49-F238E27FC236}">
-                <a16:creationId xmlns:a16="http://schemas.microsoft.com/office/drawing/2014/main" xmlns="" id="{EE5F9010-B58A-4E05-80CB-8465A102D5D3}"/>
+                <a16:creationId xmlns:a16="http://schemas.microsoft.com/office/drawing/2014/main" id="{EE5F9010-B58A-4E05-80CB-8465A102D5D3}"/>
               </a:ext>
             </a:extLst>
           </p:cNvPr>
@@ -730,7 +730,7 @@
           <p:cNvPr id="6" name="Slide Number Placeholder 5">
             <a:extLst>
               <a:ext uri="{FF2B5EF4-FFF2-40B4-BE49-F238E27FC236}">
-                <a16:creationId xmlns:a16="http://schemas.microsoft.com/office/drawing/2014/main" xmlns="" id="{8A93244B-0726-4AEF-A9D6-78C169B4EBBC}"/>
+                <a16:creationId xmlns:a16="http://schemas.microsoft.com/office/drawing/2014/main" id="{8A93244B-0726-4AEF-A9D6-78C169B4EBBC}"/>
               </a:ext>
             </a:extLst>
           </p:cNvPr>
@@ -789,7 +789,7 @@
           <p:cNvPr id="2" name="Title 1">
             <a:extLst>
               <a:ext uri="{FF2B5EF4-FFF2-40B4-BE49-F238E27FC236}">
-                <a16:creationId xmlns:a16="http://schemas.microsoft.com/office/drawing/2014/main" xmlns="" id="{E8BD4358-492D-49F4-8353-C46623D4A0DE}"/>
+                <a16:creationId xmlns:a16="http://schemas.microsoft.com/office/drawing/2014/main" id="{E8BD4358-492D-49F4-8353-C46623D4A0DE}"/>
               </a:ext>
             </a:extLst>
           </p:cNvPr>
@@ -817,7 +817,7 @@
           <p:cNvPr id="3" name="Content Placeholder 2">
             <a:extLst>
               <a:ext uri="{FF2B5EF4-FFF2-40B4-BE49-F238E27FC236}">
-                <a16:creationId xmlns:a16="http://schemas.microsoft.com/office/drawing/2014/main" xmlns="" id="{CE882704-3E1B-4A78-A667-7E5E07744BE1}"/>
+                <a16:creationId xmlns:a16="http://schemas.microsoft.com/office/drawing/2014/main" id="{CE882704-3E1B-4A78-A667-7E5E07744BE1}"/>
               </a:ext>
             </a:extLst>
           </p:cNvPr>
@@ -874,7 +874,7 @@
           <p:cNvPr id="4" name="Date Placeholder 3">
             <a:extLst>
               <a:ext uri="{FF2B5EF4-FFF2-40B4-BE49-F238E27FC236}">
-                <a16:creationId xmlns:a16="http://schemas.microsoft.com/office/drawing/2014/main" xmlns="" id="{0D08B253-52A2-4C3D-BF5D-B8E56A1A2E16}"/>
+                <a16:creationId xmlns:a16="http://schemas.microsoft.com/office/drawing/2014/main" id="{0D08B253-52A2-4C3D-BF5D-B8E56A1A2E16}"/>
               </a:ext>
             </a:extLst>
           </p:cNvPr>
@@ -892,7 +892,7 @@
           <a:p>
             <a:fld id="{79DE2D3D-0B4E-4DD7-9670-155A46B4C7D3}" type="datetimeFigureOut">
               <a:rPr lang="en-US" smtClean="0"/>
-              <a:t>4/10/2018</a:t>
+              <a:t>5/27/2018</a:t>
             </a:fld>
             <a:endParaRPr lang="en-US"/>
           </a:p>
@@ -903,7 +903,7 @@
           <p:cNvPr id="5" name="Footer Placeholder 4">
             <a:extLst>
               <a:ext uri="{FF2B5EF4-FFF2-40B4-BE49-F238E27FC236}">
-                <a16:creationId xmlns:a16="http://schemas.microsoft.com/office/drawing/2014/main" xmlns="" id="{F2538AF5-D233-40C7-90BF-D5042A78432D}"/>
+                <a16:creationId xmlns:a16="http://schemas.microsoft.com/office/drawing/2014/main" id="{F2538AF5-D233-40C7-90BF-D5042A78432D}"/>
               </a:ext>
             </a:extLst>
           </p:cNvPr>
@@ -928,7 +928,7 @@
           <p:cNvPr id="6" name="Slide Number Placeholder 5">
             <a:extLst>
               <a:ext uri="{FF2B5EF4-FFF2-40B4-BE49-F238E27FC236}">
-                <a16:creationId xmlns:a16="http://schemas.microsoft.com/office/drawing/2014/main" xmlns="" id="{BBDF52CB-805F-4DFD-8CDA-7B1787FF8EEF}"/>
+                <a16:creationId xmlns:a16="http://schemas.microsoft.com/office/drawing/2014/main" id="{BBDF52CB-805F-4DFD-8CDA-7B1787FF8EEF}"/>
               </a:ext>
             </a:extLst>
           </p:cNvPr>
@@ -987,7 +987,7 @@
           <p:cNvPr id="2" name="Title 1">
             <a:extLst>
               <a:ext uri="{FF2B5EF4-FFF2-40B4-BE49-F238E27FC236}">
-                <a16:creationId xmlns:a16="http://schemas.microsoft.com/office/drawing/2014/main" xmlns="" id="{27D28634-873F-4F1F-A867-4DD9B734A08D}"/>
+                <a16:creationId xmlns:a16="http://schemas.microsoft.com/office/drawing/2014/main" id="{27D28634-873F-4F1F-A867-4DD9B734A08D}"/>
               </a:ext>
             </a:extLst>
           </p:cNvPr>
@@ -1024,7 +1024,7 @@
           <p:cNvPr id="3" name="Text Placeholder 2">
             <a:extLst>
               <a:ext uri="{FF2B5EF4-FFF2-40B4-BE49-F238E27FC236}">
-                <a16:creationId xmlns:a16="http://schemas.microsoft.com/office/drawing/2014/main" xmlns="" id="{1DECB686-6970-4E95-90E6-6FEDEDA473C2}"/>
+                <a16:creationId xmlns:a16="http://schemas.microsoft.com/office/drawing/2014/main" id="{1DECB686-6970-4E95-90E6-6FEDEDA473C2}"/>
               </a:ext>
             </a:extLst>
           </p:cNvPr>
@@ -1149,7 +1149,7 @@
           <p:cNvPr id="4" name="Date Placeholder 3">
             <a:extLst>
               <a:ext uri="{FF2B5EF4-FFF2-40B4-BE49-F238E27FC236}">
-                <a16:creationId xmlns:a16="http://schemas.microsoft.com/office/drawing/2014/main" xmlns="" id="{00FBC595-CBE7-4EA9-A885-EE14A03709FF}"/>
+                <a16:creationId xmlns:a16="http://schemas.microsoft.com/office/drawing/2014/main" id="{00FBC595-CBE7-4EA9-A885-EE14A03709FF}"/>
               </a:ext>
             </a:extLst>
           </p:cNvPr>
@@ -1167,7 +1167,7 @@
           <a:p>
             <a:fld id="{79DE2D3D-0B4E-4DD7-9670-155A46B4C7D3}" type="datetimeFigureOut">
               <a:rPr lang="en-US" smtClean="0"/>
-              <a:t>4/10/2018</a:t>
+              <a:t>5/27/2018</a:t>
             </a:fld>
             <a:endParaRPr lang="en-US"/>
           </a:p>
@@ -1178,7 +1178,7 @@
           <p:cNvPr id="5" name="Footer Placeholder 4">
             <a:extLst>
               <a:ext uri="{FF2B5EF4-FFF2-40B4-BE49-F238E27FC236}">
-                <a16:creationId xmlns:a16="http://schemas.microsoft.com/office/drawing/2014/main" xmlns="" id="{FF14EDF1-B2C2-49FE-9528-7E748E6EA3F6}"/>
+                <a16:creationId xmlns:a16="http://schemas.microsoft.com/office/drawing/2014/main" id="{FF14EDF1-B2C2-49FE-9528-7E748E6EA3F6}"/>
               </a:ext>
             </a:extLst>
           </p:cNvPr>
@@ -1203,7 +1203,7 @@
           <p:cNvPr id="6" name="Slide Number Placeholder 5">
             <a:extLst>
               <a:ext uri="{FF2B5EF4-FFF2-40B4-BE49-F238E27FC236}">
-                <a16:creationId xmlns:a16="http://schemas.microsoft.com/office/drawing/2014/main" xmlns="" id="{820E7B30-794B-44D2-9AF6-8F3EBCC924A1}"/>
+                <a16:creationId xmlns:a16="http://schemas.microsoft.com/office/drawing/2014/main" id="{820E7B30-794B-44D2-9AF6-8F3EBCC924A1}"/>
               </a:ext>
             </a:extLst>
           </p:cNvPr>
@@ -1262,7 +1262,7 @@
           <p:cNvPr id="2" name="Title 1">
             <a:extLst>
               <a:ext uri="{FF2B5EF4-FFF2-40B4-BE49-F238E27FC236}">
-                <a16:creationId xmlns:a16="http://schemas.microsoft.com/office/drawing/2014/main" xmlns="" id="{4D052C3E-728A-4E49-88AF-B7AADC9448DF}"/>
+                <a16:creationId xmlns:a16="http://schemas.microsoft.com/office/drawing/2014/main" id="{4D052C3E-728A-4E49-88AF-B7AADC9448DF}"/>
               </a:ext>
             </a:extLst>
           </p:cNvPr>
@@ -1290,7 +1290,7 @@
           <p:cNvPr id="3" name="Content Placeholder 2">
             <a:extLst>
               <a:ext uri="{FF2B5EF4-FFF2-40B4-BE49-F238E27FC236}">
-                <a16:creationId xmlns:a16="http://schemas.microsoft.com/office/drawing/2014/main" xmlns="" id="{19ABF20A-CEF3-431B-95B1-BC6709015D64}"/>
+                <a16:creationId xmlns:a16="http://schemas.microsoft.com/office/drawing/2014/main" id="{19ABF20A-CEF3-431B-95B1-BC6709015D64}"/>
               </a:ext>
             </a:extLst>
           </p:cNvPr>
@@ -1352,7 +1352,7 @@
           <p:cNvPr id="4" name="Content Placeholder 3">
             <a:extLst>
               <a:ext uri="{FF2B5EF4-FFF2-40B4-BE49-F238E27FC236}">
-                <a16:creationId xmlns:a16="http://schemas.microsoft.com/office/drawing/2014/main" xmlns="" id="{2737B622-ACD2-4627-B8FF-45D35B2633F1}"/>
+                <a16:creationId xmlns:a16="http://schemas.microsoft.com/office/drawing/2014/main" id="{2737B622-ACD2-4627-B8FF-45D35B2633F1}"/>
               </a:ext>
             </a:extLst>
           </p:cNvPr>
@@ -1414,7 +1414,7 @@
           <p:cNvPr id="5" name="Date Placeholder 4">
             <a:extLst>
               <a:ext uri="{FF2B5EF4-FFF2-40B4-BE49-F238E27FC236}">
-                <a16:creationId xmlns:a16="http://schemas.microsoft.com/office/drawing/2014/main" xmlns="" id="{42DDD691-4765-43B5-B9AD-534F1097CD33}"/>
+                <a16:creationId xmlns:a16="http://schemas.microsoft.com/office/drawing/2014/main" id="{42DDD691-4765-43B5-B9AD-534F1097CD33}"/>
               </a:ext>
             </a:extLst>
           </p:cNvPr>
@@ -1432,7 +1432,7 @@
           <a:p>
             <a:fld id="{79DE2D3D-0B4E-4DD7-9670-155A46B4C7D3}" type="datetimeFigureOut">
               <a:rPr lang="en-US" smtClean="0"/>
-              <a:t>4/10/2018</a:t>
+              <a:t>5/27/2018</a:t>
             </a:fld>
             <a:endParaRPr lang="en-US"/>
           </a:p>
@@ -1443,7 +1443,7 @@
           <p:cNvPr id="6" name="Footer Placeholder 5">
             <a:extLst>
               <a:ext uri="{FF2B5EF4-FFF2-40B4-BE49-F238E27FC236}">
-                <a16:creationId xmlns:a16="http://schemas.microsoft.com/office/drawing/2014/main" xmlns="" id="{52530E5C-8595-4F7E-B13E-A3BAFCF64E6D}"/>
+                <a16:creationId xmlns:a16="http://schemas.microsoft.com/office/drawing/2014/main" id="{52530E5C-8595-4F7E-B13E-A3BAFCF64E6D}"/>
               </a:ext>
             </a:extLst>
           </p:cNvPr>
@@ -1468,7 +1468,7 @@
           <p:cNvPr id="7" name="Slide Number Placeholder 6">
             <a:extLst>
               <a:ext uri="{FF2B5EF4-FFF2-40B4-BE49-F238E27FC236}">
-                <a16:creationId xmlns:a16="http://schemas.microsoft.com/office/drawing/2014/main" xmlns="" id="{0DB30A7B-8C52-420F-A1B6-C897CC27AA65}"/>
+                <a16:creationId xmlns:a16="http://schemas.microsoft.com/office/drawing/2014/main" id="{0DB30A7B-8C52-420F-A1B6-C897CC27AA65}"/>
               </a:ext>
             </a:extLst>
           </p:cNvPr>
@@ -1527,7 +1527,7 @@
           <p:cNvPr id="2" name="Title 1">
             <a:extLst>
               <a:ext uri="{FF2B5EF4-FFF2-40B4-BE49-F238E27FC236}">
-                <a16:creationId xmlns:a16="http://schemas.microsoft.com/office/drawing/2014/main" xmlns="" id="{E9AC60E8-9FC1-42DC-8C29-EA7465D837D0}"/>
+                <a16:creationId xmlns:a16="http://schemas.microsoft.com/office/drawing/2014/main" id="{E9AC60E8-9FC1-42DC-8C29-EA7465D837D0}"/>
               </a:ext>
             </a:extLst>
           </p:cNvPr>
@@ -1560,7 +1560,7 @@
           <p:cNvPr id="3" name="Text Placeholder 2">
             <a:extLst>
               <a:ext uri="{FF2B5EF4-FFF2-40B4-BE49-F238E27FC236}">
-                <a16:creationId xmlns:a16="http://schemas.microsoft.com/office/drawing/2014/main" xmlns="" id="{0C818A30-7FA1-4337-8120-C200A7442D75}"/>
+                <a16:creationId xmlns:a16="http://schemas.microsoft.com/office/drawing/2014/main" id="{0C818A30-7FA1-4337-8120-C200A7442D75}"/>
               </a:ext>
             </a:extLst>
           </p:cNvPr>
@@ -1631,7 +1631,7 @@
           <p:cNvPr id="4" name="Content Placeholder 3">
             <a:extLst>
               <a:ext uri="{FF2B5EF4-FFF2-40B4-BE49-F238E27FC236}">
-                <a16:creationId xmlns:a16="http://schemas.microsoft.com/office/drawing/2014/main" xmlns="" id="{9CE84CA1-F2AA-4CF1-AFDA-45D282715E23}"/>
+                <a16:creationId xmlns:a16="http://schemas.microsoft.com/office/drawing/2014/main" id="{9CE84CA1-F2AA-4CF1-AFDA-45D282715E23}"/>
               </a:ext>
             </a:extLst>
           </p:cNvPr>
@@ -1693,7 +1693,7 @@
           <p:cNvPr id="5" name="Text Placeholder 4">
             <a:extLst>
               <a:ext uri="{FF2B5EF4-FFF2-40B4-BE49-F238E27FC236}">
-                <a16:creationId xmlns:a16="http://schemas.microsoft.com/office/drawing/2014/main" xmlns="" id="{DBA3B6D1-4E3D-4DD3-9BB7-54C5D52214F5}"/>
+                <a16:creationId xmlns:a16="http://schemas.microsoft.com/office/drawing/2014/main" id="{DBA3B6D1-4E3D-4DD3-9BB7-54C5D52214F5}"/>
               </a:ext>
             </a:extLst>
           </p:cNvPr>
@@ -1764,7 +1764,7 @@
           <p:cNvPr id="6" name="Content Placeholder 5">
             <a:extLst>
               <a:ext uri="{FF2B5EF4-FFF2-40B4-BE49-F238E27FC236}">
-                <a16:creationId xmlns:a16="http://schemas.microsoft.com/office/drawing/2014/main" xmlns="" id="{E542C983-E152-4F06-8C96-7E07D0F125CD}"/>
+                <a16:creationId xmlns:a16="http://schemas.microsoft.com/office/drawing/2014/main" id="{E542C983-E152-4F06-8C96-7E07D0F125CD}"/>
               </a:ext>
             </a:extLst>
           </p:cNvPr>
@@ -1826,7 +1826,7 @@
           <p:cNvPr id="7" name="Date Placeholder 6">
             <a:extLst>
               <a:ext uri="{FF2B5EF4-FFF2-40B4-BE49-F238E27FC236}">
-                <a16:creationId xmlns:a16="http://schemas.microsoft.com/office/drawing/2014/main" xmlns="" id="{8E601059-966A-4AC8-B04D-E3BDB85FC4E2}"/>
+                <a16:creationId xmlns:a16="http://schemas.microsoft.com/office/drawing/2014/main" id="{8E601059-966A-4AC8-B04D-E3BDB85FC4E2}"/>
               </a:ext>
             </a:extLst>
           </p:cNvPr>
@@ -1844,7 +1844,7 @@
           <a:p>
             <a:fld id="{79DE2D3D-0B4E-4DD7-9670-155A46B4C7D3}" type="datetimeFigureOut">
               <a:rPr lang="en-US" smtClean="0"/>
-              <a:t>4/10/2018</a:t>
+              <a:t>5/27/2018</a:t>
             </a:fld>
             <a:endParaRPr lang="en-US"/>
           </a:p>
@@ -1855,7 +1855,7 @@
           <p:cNvPr id="8" name="Footer Placeholder 7">
             <a:extLst>
               <a:ext uri="{FF2B5EF4-FFF2-40B4-BE49-F238E27FC236}">
-                <a16:creationId xmlns:a16="http://schemas.microsoft.com/office/drawing/2014/main" xmlns="" id="{79DD1AA8-075F-40C9-9873-85A9A2D4DC98}"/>
+                <a16:creationId xmlns:a16="http://schemas.microsoft.com/office/drawing/2014/main" id="{79DD1AA8-075F-40C9-9873-85A9A2D4DC98}"/>
               </a:ext>
             </a:extLst>
           </p:cNvPr>
@@ -1880,7 +1880,7 @@
           <p:cNvPr id="9" name="Slide Number Placeholder 8">
             <a:extLst>
               <a:ext uri="{FF2B5EF4-FFF2-40B4-BE49-F238E27FC236}">
-                <a16:creationId xmlns:a16="http://schemas.microsoft.com/office/drawing/2014/main" xmlns="" id="{C179C8F9-9FC6-415C-BF20-26F3308511CF}"/>
+                <a16:creationId xmlns:a16="http://schemas.microsoft.com/office/drawing/2014/main" id="{C179C8F9-9FC6-415C-BF20-26F3308511CF}"/>
               </a:ext>
             </a:extLst>
           </p:cNvPr>
@@ -1939,7 +1939,7 @@
           <p:cNvPr id="2" name="Title 1">
             <a:extLst>
               <a:ext uri="{FF2B5EF4-FFF2-40B4-BE49-F238E27FC236}">
-                <a16:creationId xmlns:a16="http://schemas.microsoft.com/office/drawing/2014/main" xmlns="" id="{4C9581B1-453E-4AAD-9D12-D5CD21C43E28}"/>
+                <a16:creationId xmlns:a16="http://schemas.microsoft.com/office/drawing/2014/main" id="{4C9581B1-453E-4AAD-9D12-D5CD21C43E28}"/>
               </a:ext>
             </a:extLst>
           </p:cNvPr>
@@ -1967,7 +1967,7 @@
           <p:cNvPr id="3" name="Date Placeholder 2">
             <a:extLst>
               <a:ext uri="{FF2B5EF4-FFF2-40B4-BE49-F238E27FC236}">
-                <a16:creationId xmlns:a16="http://schemas.microsoft.com/office/drawing/2014/main" xmlns="" id="{19DECDA6-0FFD-4C5B-B7E6-7249068A0385}"/>
+                <a16:creationId xmlns:a16="http://schemas.microsoft.com/office/drawing/2014/main" id="{19DECDA6-0FFD-4C5B-B7E6-7249068A0385}"/>
               </a:ext>
             </a:extLst>
           </p:cNvPr>
@@ -1985,7 +1985,7 @@
           <a:p>
             <a:fld id="{79DE2D3D-0B4E-4DD7-9670-155A46B4C7D3}" type="datetimeFigureOut">
               <a:rPr lang="en-US" smtClean="0"/>
-              <a:t>4/10/2018</a:t>
+              <a:t>5/27/2018</a:t>
             </a:fld>
             <a:endParaRPr lang="en-US"/>
           </a:p>
@@ -1996,7 +1996,7 @@
           <p:cNvPr id="4" name="Footer Placeholder 3">
             <a:extLst>
               <a:ext uri="{FF2B5EF4-FFF2-40B4-BE49-F238E27FC236}">
-                <a16:creationId xmlns:a16="http://schemas.microsoft.com/office/drawing/2014/main" xmlns="" id="{51FB464C-C0C4-4823-A3E7-091DC998738E}"/>
+                <a16:creationId xmlns:a16="http://schemas.microsoft.com/office/drawing/2014/main" id="{51FB464C-C0C4-4823-A3E7-091DC998738E}"/>
               </a:ext>
             </a:extLst>
           </p:cNvPr>
@@ -2021,7 +2021,7 @@
           <p:cNvPr id="5" name="Slide Number Placeholder 4">
             <a:extLst>
               <a:ext uri="{FF2B5EF4-FFF2-40B4-BE49-F238E27FC236}">
-                <a16:creationId xmlns:a16="http://schemas.microsoft.com/office/drawing/2014/main" xmlns="" id="{D0716546-9DB4-4D0D-B586-6AC1ECAE4C07}"/>
+                <a16:creationId xmlns:a16="http://schemas.microsoft.com/office/drawing/2014/main" id="{D0716546-9DB4-4D0D-B586-6AC1ECAE4C07}"/>
               </a:ext>
             </a:extLst>
           </p:cNvPr>
@@ -2080,7 +2080,7 @@
           <p:cNvPr id="2" name="Date Placeholder 1">
             <a:extLst>
               <a:ext uri="{FF2B5EF4-FFF2-40B4-BE49-F238E27FC236}">
-                <a16:creationId xmlns:a16="http://schemas.microsoft.com/office/drawing/2014/main" xmlns="" id="{BA814E6B-A29F-4AE7-9237-6DF2A3ABBA33}"/>
+                <a16:creationId xmlns:a16="http://schemas.microsoft.com/office/drawing/2014/main" id="{BA814E6B-A29F-4AE7-9237-6DF2A3ABBA33}"/>
               </a:ext>
             </a:extLst>
           </p:cNvPr>
@@ -2098,7 +2098,7 @@
           <a:p>
             <a:fld id="{79DE2D3D-0B4E-4DD7-9670-155A46B4C7D3}" type="datetimeFigureOut">
               <a:rPr lang="en-US" smtClean="0"/>
-              <a:t>4/10/2018</a:t>
+              <a:t>5/27/2018</a:t>
             </a:fld>
             <a:endParaRPr lang="en-US"/>
           </a:p>
@@ -2109,7 +2109,7 @@
           <p:cNvPr id="3" name="Footer Placeholder 2">
             <a:extLst>
               <a:ext uri="{FF2B5EF4-FFF2-40B4-BE49-F238E27FC236}">
-                <a16:creationId xmlns:a16="http://schemas.microsoft.com/office/drawing/2014/main" xmlns="" id="{09BA391C-6DAE-4B53-B555-6CD4D8F9D2CB}"/>
+                <a16:creationId xmlns:a16="http://schemas.microsoft.com/office/drawing/2014/main" id="{09BA391C-6DAE-4B53-B555-6CD4D8F9D2CB}"/>
               </a:ext>
             </a:extLst>
           </p:cNvPr>
@@ -2134,7 +2134,7 @@
           <p:cNvPr id="4" name="Slide Number Placeholder 3">
             <a:extLst>
               <a:ext uri="{FF2B5EF4-FFF2-40B4-BE49-F238E27FC236}">
-                <a16:creationId xmlns:a16="http://schemas.microsoft.com/office/drawing/2014/main" xmlns="" id="{F625249E-BF43-4AB8-A5F0-A41CC1492ED3}"/>
+                <a16:creationId xmlns:a16="http://schemas.microsoft.com/office/drawing/2014/main" id="{F625249E-BF43-4AB8-A5F0-A41CC1492ED3}"/>
               </a:ext>
             </a:extLst>
           </p:cNvPr>
@@ -2193,7 +2193,7 @@
           <p:cNvPr id="2" name="Title 1">
             <a:extLst>
               <a:ext uri="{FF2B5EF4-FFF2-40B4-BE49-F238E27FC236}">
-                <a16:creationId xmlns:a16="http://schemas.microsoft.com/office/drawing/2014/main" xmlns="" id="{076ABC1E-EE30-473D-9843-97DA2B713DCD}"/>
+                <a16:creationId xmlns:a16="http://schemas.microsoft.com/office/drawing/2014/main" id="{076ABC1E-EE30-473D-9843-97DA2B713DCD}"/>
               </a:ext>
             </a:extLst>
           </p:cNvPr>
@@ -2230,7 +2230,7 @@
           <p:cNvPr id="3" name="Content Placeholder 2">
             <a:extLst>
               <a:ext uri="{FF2B5EF4-FFF2-40B4-BE49-F238E27FC236}">
-                <a16:creationId xmlns:a16="http://schemas.microsoft.com/office/drawing/2014/main" xmlns="" id="{BC46249D-CC42-436D-BE0D-5625D0485C24}"/>
+                <a16:creationId xmlns:a16="http://schemas.microsoft.com/office/drawing/2014/main" id="{BC46249D-CC42-436D-BE0D-5625D0485C24}"/>
               </a:ext>
             </a:extLst>
           </p:cNvPr>
@@ -2320,7 +2320,7 @@
           <p:cNvPr id="4" name="Text Placeholder 3">
             <a:extLst>
               <a:ext uri="{FF2B5EF4-FFF2-40B4-BE49-F238E27FC236}">
-                <a16:creationId xmlns:a16="http://schemas.microsoft.com/office/drawing/2014/main" xmlns="" id="{BB8F32DE-2D90-4225-849F-71A8E16108A2}"/>
+                <a16:creationId xmlns:a16="http://schemas.microsoft.com/office/drawing/2014/main" id="{BB8F32DE-2D90-4225-849F-71A8E16108A2}"/>
               </a:ext>
             </a:extLst>
           </p:cNvPr>
@@ -2391,7 +2391,7 @@
           <p:cNvPr id="5" name="Date Placeholder 4">
             <a:extLst>
               <a:ext uri="{FF2B5EF4-FFF2-40B4-BE49-F238E27FC236}">
-                <a16:creationId xmlns:a16="http://schemas.microsoft.com/office/drawing/2014/main" xmlns="" id="{81FDD5F9-4B94-4BF2-986F-B735C9B79581}"/>
+                <a16:creationId xmlns:a16="http://schemas.microsoft.com/office/drawing/2014/main" id="{81FDD5F9-4B94-4BF2-986F-B735C9B79581}"/>
               </a:ext>
             </a:extLst>
           </p:cNvPr>
@@ -2409,7 +2409,7 @@
           <a:p>
             <a:fld id="{79DE2D3D-0B4E-4DD7-9670-155A46B4C7D3}" type="datetimeFigureOut">
               <a:rPr lang="en-US" smtClean="0"/>
-              <a:t>4/10/2018</a:t>
+              <a:t>5/27/2018</a:t>
             </a:fld>
             <a:endParaRPr lang="en-US"/>
           </a:p>
@@ -2420,7 +2420,7 @@
           <p:cNvPr id="6" name="Footer Placeholder 5">
             <a:extLst>
               <a:ext uri="{FF2B5EF4-FFF2-40B4-BE49-F238E27FC236}">
-                <a16:creationId xmlns:a16="http://schemas.microsoft.com/office/drawing/2014/main" xmlns="" id="{D0408356-96AD-466E-AC30-0DCC886CEFA5}"/>
+                <a16:creationId xmlns:a16="http://schemas.microsoft.com/office/drawing/2014/main" id="{D0408356-96AD-466E-AC30-0DCC886CEFA5}"/>
               </a:ext>
             </a:extLst>
           </p:cNvPr>
@@ -2445,7 +2445,7 @@
           <p:cNvPr id="7" name="Slide Number Placeholder 6">
             <a:extLst>
               <a:ext uri="{FF2B5EF4-FFF2-40B4-BE49-F238E27FC236}">
-                <a16:creationId xmlns:a16="http://schemas.microsoft.com/office/drawing/2014/main" xmlns="" id="{68F5E96F-D5B9-4F8B-A9CC-7427EAB39A92}"/>
+                <a16:creationId xmlns:a16="http://schemas.microsoft.com/office/drawing/2014/main" id="{68F5E96F-D5B9-4F8B-A9CC-7427EAB39A92}"/>
               </a:ext>
             </a:extLst>
           </p:cNvPr>
@@ -2504,7 +2504,7 @@
           <p:cNvPr id="2" name="Title 1">
             <a:extLst>
               <a:ext uri="{FF2B5EF4-FFF2-40B4-BE49-F238E27FC236}">
-                <a16:creationId xmlns:a16="http://schemas.microsoft.com/office/drawing/2014/main" xmlns="" id="{9C0F5112-278F-44E4-87C0-4C2F8A651829}"/>
+                <a16:creationId xmlns:a16="http://schemas.microsoft.com/office/drawing/2014/main" id="{9C0F5112-278F-44E4-87C0-4C2F8A651829}"/>
               </a:ext>
             </a:extLst>
           </p:cNvPr>
@@ -2541,7 +2541,7 @@
           <p:cNvPr id="3" name="Picture Placeholder 2">
             <a:extLst>
               <a:ext uri="{FF2B5EF4-FFF2-40B4-BE49-F238E27FC236}">
-                <a16:creationId xmlns:a16="http://schemas.microsoft.com/office/drawing/2014/main" xmlns="" id="{05EA54BB-79CA-4CC9-98CE-E5D860A33729}"/>
+                <a16:creationId xmlns:a16="http://schemas.microsoft.com/office/drawing/2014/main" id="{05EA54BB-79CA-4CC9-98CE-E5D860A33729}"/>
               </a:ext>
             </a:extLst>
           </p:cNvPr>
@@ -2608,7 +2608,7 @@
           <p:cNvPr id="4" name="Text Placeholder 3">
             <a:extLst>
               <a:ext uri="{FF2B5EF4-FFF2-40B4-BE49-F238E27FC236}">
-                <a16:creationId xmlns:a16="http://schemas.microsoft.com/office/drawing/2014/main" xmlns="" id="{BE5F85B6-2DFC-4F12-B91A-B047130C2235}"/>
+                <a16:creationId xmlns:a16="http://schemas.microsoft.com/office/drawing/2014/main" id="{BE5F85B6-2DFC-4F12-B91A-B047130C2235}"/>
               </a:ext>
             </a:extLst>
           </p:cNvPr>
@@ -2679,7 +2679,7 @@
           <p:cNvPr id="5" name="Date Placeholder 4">
             <a:extLst>
               <a:ext uri="{FF2B5EF4-FFF2-40B4-BE49-F238E27FC236}">
-                <a16:creationId xmlns:a16="http://schemas.microsoft.com/office/drawing/2014/main" xmlns="" id="{172D123F-5801-4632-89EF-A7048EAB1264}"/>
+                <a16:creationId xmlns:a16="http://schemas.microsoft.com/office/drawing/2014/main" id="{172D123F-5801-4632-89EF-A7048EAB1264}"/>
               </a:ext>
             </a:extLst>
           </p:cNvPr>
@@ -2697,7 +2697,7 @@
           <a:p>
             <a:fld id="{79DE2D3D-0B4E-4DD7-9670-155A46B4C7D3}" type="datetimeFigureOut">
               <a:rPr lang="en-US" smtClean="0"/>
-              <a:t>4/10/2018</a:t>
+              <a:t>5/27/2018</a:t>
             </a:fld>
             <a:endParaRPr lang="en-US"/>
           </a:p>
@@ -2708,7 +2708,7 @@
           <p:cNvPr id="6" name="Footer Placeholder 5">
             <a:extLst>
               <a:ext uri="{FF2B5EF4-FFF2-40B4-BE49-F238E27FC236}">
-                <a16:creationId xmlns:a16="http://schemas.microsoft.com/office/drawing/2014/main" xmlns="" id="{5393FCEA-51F8-4D51-BA8E-D42F966A2BF0}"/>
+                <a16:creationId xmlns:a16="http://schemas.microsoft.com/office/drawing/2014/main" id="{5393FCEA-51F8-4D51-BA8E-D42F966A2BF0}"/>
               </a:ext>
             </a:extLst>
           </p:cNvPr>
@@ -2733,7 +2733,7 @@
           <p:cNvPr id="7" name="Slide Number Placeholder 6">
             <a:extLst>
               <a:ext uri="{FF2B5EF4-FFF2-40B4-BE49-F238E27FC236}">
-                <a16:creationId xmlns:a16="http://schemas.microsoft.com/office/drawing/2014/main" xmlns="" id="{A0B91011-BCB3-49E8-B94D-89877DAB044B}"/>
+                <a16:creationId xmlns:a16="http://schemas.microsoft.com/office/drawing/2014/main" id="{A0B91011-BCB3-49E8-B94D-89877DAB044B}"/>
               </a:ext>
             </a:extLst>
           </p:cNvPr>
@@ -2797,7 +2797,7 @@
           <p:cNvPr id="2" name="Title Placeholder 1">
             <a:extLst>
               <a:ext uri="{FF2B5EF4-FFF2-40B4-BE49-F238E27FC236}">
-                <a16:creationId xmlns:a16="http://schemas.microsoft.com/office/drawing/2014/main" xmlns="" id="{5BBD9B47-EC09-49CB-91C3-4FF23C8DFDFA}"/>
+                <a16:creationId xmlns:a16="http://schemas.microsoft.com/office/drawing/2014/main" id="{5BBD9B47-EC09-49CB-91C3-4FF23C8DFDFA}"/>
               </a:ext>
             </a:extLst>
           </p:cNvPr>
@@ -2835,7 +2835,7 @@
           <p:cNvPr id="3" name="Text Placeholder 2">
             <a:extLst>
               <a:ext uri="{FF2B5EF4-FFF2-40B4-BE49-F238E27FC236}">
-                <a16:creationId xmlns:a16="http://schemas.microsoft.com/office/drawing/2014/main" xmlns="" id="{513AA069-5DC8-4F13-BF00-1DDB9CFEBB93}"/>
+                <a16:creationId xmlns:a16="http://schemas.microsoft.com/office/drawing/2014/main" id="{513AA069-5DC8-4F13-BF00-1DDB9CFEBB93}"/>
               </a:ext>
             </a:extLst>
           </p:cNvPr>
@@ -2902,7 +2902,7 @@
           <p:cNvPr id="4" name="Date Placeholder 3">
             <a:extLst>
               <a:ext uri="{FF2B5EF4-FFF2-40B4-BE49-F238E27FC236}">
-                <a16:creationId xmlns:a16="http://schemas.microsoft.com/office/drawing/2014/main" xmlns="" id="{1B988FF8-EF37-4E2D-8D06-B56DC9727511}"/>
+                <a16:creationId xmlns:a16="http://schemas.microsoft.com/office/drawing/2014/main" id="{1B988FF8-EF37-4E2D-8D06-B56DC9727511}"/>
               </a:ext>
             </a:extLst>
           </p:cNvPr>
@@ -2938,7 +2938,7 @@
           <a:p>
             <a:fld id="{79DE2D3D-0B4E-4DD7-9670-155A46B4C7D3}" type="datetimeFigureOut">
               <a:rPr lang="en-US" smtClean="0"/>
-              <a:t>4/10/2018</a:t>
+              <a:t>5/27/2018</a:t>
             </a:fld>
             <a:endParaRPr lang="en-US"/>
           </a:p>
@@ -2949,7 +2949,7 @@
           <p:cNvPr id="5" name="Footer Placeholder 4">
             <a:extLst>
               <a:ext uri="{FF2B5EF4-FFF2-40B4-BE49-F238E27FC236}">
-                <a16:creationId xmlns:a16="http://schemas.microsoft.com/office/drawing/2014/main" xmlns="" id="{83212C0E-B2E5-4E9B-8071-67611BC3B695}"/>
+                <a16:creationId xmlns:a16="http://schemas.microsoft.com/office/drawing/2014/main" id="{83212C0E-B2E5-4E9B-8071-67611BC3B695}"/>
               </a:ext>
             </a:extLst>
           </p:cNvPr>
@@ -2992,7 +2992,7 @@
           <p:cNvPr id="6" name="Slide Number Placeholder 5">
             <a:extLst>
               <a:ext uri="{FF2B5EF4-FFF2-40B4-BE49-F238E27FC236}">
-                <a16:creationId xmlns:a16="http://schemas.microsoft.com/office/drawing/2014/main" xmlns="" id="{FEDCB7D4-E33C-461E-9027-986C5814089F}"/>
+                <a16:creationId xmlns:a16="http://schemas.microsoft.com/office/drawing/2014/main" id="{FEDCB7D4-E33C-461E-9027-986C5814089F}"/>
               </a:ext>
             </a:extLst>
           </p:cNvPr>
@@ -3360,7 +3360,7 @@
           <p:cNvPr id="2" name="Title 1">
             <a:extLst>
               <a:ext uri="{FF2B5EF4-FFF2-40B4-BE49-F238E27FC236}">
-                <a16:creationId xmlns:a16="http://schemas.microsoft.com/office/drawing/2014/main" xmlns="" id="{139BAF7C-DB50-417E-B55C-81858A77D703}"/>
+                <a16:creationId xmlns:a16="http://schemas.microsoft.com/office/drawing/2014/main" id="{139BAF7C-DB50-417E-B55C-81858A77D703}"/>
               </a:ext>
             </a:extLst>
           </p:cNvPr>
@@ -3388,7 +3388,7 @@
           <p:cNvPr id="3" name="Subtitle 2">
             <a:extLst>
               <a:ext uri="{FF2B5EF4-FFF2-40B4-BE49-F238E27FC236}">
-                <a16:creationId xmlns:a16="http://schemas.microsoft.com/office/drawing/2014/main" xmlns="" id="{CE9D560A-2AB0-4D6D-83D1-F0F54D6A5F58}"/>
+                <a16:creationId xmlns:a16="http://schemas.microsoft.com/office/drawing/2014/main" id="{CE9D560A-2AB0-4D6D-83D1-F0F54D6A5F58}"/>
               </a:ext>
             </a:extLst>
           </p:cNvPr>
@@ -4152,7 +4152,7 @@
           <p:cNvPr id="2" name="Title 1">
             <a:extLst>
               <a:ext uri="{FF2B5EF4-FFF2-40B4-BE49-F238E27FC236}">
-                <a16:creationId xmlns:a16="http://schemas.microsoft.com/office/drawing/2014/main" xmlns="" id="{5ADC56FF-B4DC-4FF6-8C43-32D010FD16AF}"/>
+                <a16:creationId xmlns:a16="http://schemas.microsoft.com/office/drawing/2014/main" id="{5ADC56FF-B4DC-4FF6-8C43-32D010FD16AF}"/>
               </a:ext>
             </a:extLst>
           </p:cNvPr>
@@ -4183,7 +4183,7 @@
         </p:nvSpPr>
         <p:spPr>
           <a:xfrm>
-            <a:off x="241983" y="2908300"/>
+            <a:off x="191556" y="2106384"/>
             <a:ext cx="1503680" cy="955040"/>
           </a:xfrm>
           <a:prstGeom prst="rect">
@@ -4222,7 +4222,7 @@
           <a:p>
             <a:pPr algn="ctr"/>
             <a:r>
-              <a:rPr lang="en-US" dirty="0"/>
+              <a:rPr lang="en-US" sz="2400" dirty="0"/>
               <a:t>StarCraft</a:t>
             </a:r>
           </a:p>
@@ -4236,7 +4236,7 @@
         </p:nvSpPr>
         <p:spPr>
           <a:xfrm>
-            <a:off x="4672236" y="2908299"/>
+            <a:off x="6409414" y="2127249"/>
             <a:ext cx="3270762" cy="3751807"/>
           </a:xfrm>
           <a:prstGeom prst="rect">
@@ -4267,7 +4267,7 @@
           <a:p>
             <a:pPr algn="ctr"/>
             <a:r>
-              <a:rPr lang="en-US" dirty="0">
+              <a:rPr lang="en-US" b="1" dirty="0">
                 <a:solidFill>
                   <a:schemeClr val="tx1"/>
                 </a:solidFill>
@@ -4285,7 +4285,7 @@
         </p:nvSpPr>
         <p:spPr>
           <a:xfrm>
-            <a:off x="2219960" y="2908300"/>
+            <a:off x="3884564" y="2127250"/>
             <a:ext cx="1503680" cy="955040"/>
           </a:xfrm>
           <a:prstGeom prst="rect">
@@ -4324,7 +4324,7 @@
           <a:p>
             <a:pPr algn="ctr"/>
             <a:r>
-              <a:rPr lang="en-US" dirty="0"/>
+              <a:rPr lang="en-US" sz="2400" dirty="0"/>
               <a:t>NOVA</a:t>
             </a:r>
           </a:p>
@@ -4335,25 +4335,25 @@
           <p:cNvPr id="12" name="Straight Arrow Connector 11"/>
           <p:cNvCxnSpPr>
             <a:cxnSpLocks/>
-            <a:stCxn id="4" idx="3"/>
+            <a:stCxn id="32" idx="3"/>
             <a:endCxn id="8" idx="1"/>
           </p:cNvCxnSpPr>
           <p:nvPr/>
         </p:nvCxnSpPr>
         <p:spPr>
           <a:xfrm>
-            <a:off x="1745663" y="3385820"/>
-            <a:ext cx="474297" cy="0"/>
+            <a:off x="3541740" y="2592610"/>
+            <a:ext cx="342824" cy="12160"/>
           </a:xfrm>
           <a:prstGeom prst="straightConnector1">
             <a:avLst/>
           </a:prstGeom>
-          <a:ln>
+          <a:ln w="38100">
             <a:solidFill>
               <a:schemeClr val="tx1"/>
             </a:solidFill>
-            <a:headEnd type="arrow"/>
-            <a:tailEnd type="arrow"/>
+            <a:headEnd type="triangle"/>
+            <a:tailEnd type="triangle"/>
           </a:ln>
         </p:spPr>
         <p:style>
@@ -4383,16 +4383,16 @@
         </p:nvCxnSpPr>
         <p:spPr>
           <a:xfrm>
-            <a:off x="2391953" y="4937586"/>
-            <a:ext cx="2916395" cy="1115653"/>
+            <a:off x="4825815" y="4156536"/>
+            <a:ext cx="1961035" cy="1115653"/>
           </a:xfrm>
           <a:prstGeom prst="bentConnector3">
             <a:avLst>
               <a:gd name="adj1" fmla="val 50000"/>
             </a:avLst>
           </a:prstGeom>
-          <a:ln>
-            <a:tailEnd type="arrow"/>
+          <a:ln w="38100">
+            <a:tailEnd type="triangle"/>
           </a:ln>
         </p:spPr>
         <p:style>
@@ -4422,17 +4422,17 @@
         </p:nvCxnSpPr>
         <p:spPr>
           <a:xfrm>
-            <a:off x="3723640" y="3385820"/>
-            <a:ext cx="1584708" cy="388763"/>
+            <a:off x="5388244" y="2604770"/>
+            <a:ext cx="1398606" cy="388763"/>
           </a:xfrm>
           <a:prstGeom prst="bentConnector3">
             <a:avLst>
               <a:gd name="adj1" fmla="val 50000"/>
             </a:avLst>
           </a:prstGeom>
-          <a:ln>
-            <a:headEnd type="arrow"/>
-            <a:tailEnd type="arrow"/>
+          <a:ln w="38100">
+            <a:headEnd type="triangle"/>
+            <a:tailEnd type="triangle"/>
           </a:ln>
         </p:spPr>
         <p:style>
@@ -4458,7 +4458,7 @@
         </p:nvSpPr>
         <p:spPr>
           <a:xfrm>
-            <a:off x="8729832" y="3794213"/>
+            <a:off x="10238066" y="3508991"/>
             <a:ext cx="1381760" cy="1184097"/>
           </a:xfrm>
           <a:prstGeom prst="flowChartMultidocument">
@@ -4487,7 +4487,7 @@
           <a:p>
             <a:pPr algn="ctr"/>
             <a:r>
-              <a:rPr lang="en-US" dirty="0"/>
+              <a:rPr lang="en-US" i="1" dirty="0"/>
               <a:t>Strategies</a:t>
             </a:r>
           </a:p>
@@ -4505,17 +4505,17 @@
         </p:nvCxnSpPr>
         <p:spPr>
           <a:xfrm rot="10800000" flipV="1">
-            <a:off x="7273626" y="4386261"/>
-            <a:ext cx="1456206" cy="1666977"/>
+            <a:off x="9284390" y="4101039"/>
+            <a:ext cx="953676" cy="1171149"/>
           </a:xfrm>
           <a:prstGeom prst="bentConnector3">
             <a:avLst>
               <a:gd name="adj1" fmla="val 50000"/>
             </a:avLst>
           </a:prstGeom>
-          <a:ln>
-            <a:headEnd type="arrow"/>
-            <a:tailEnd type="arrow"/>
+          <a:ln w="38100">
+            <a:headEnd type="triangle"/>
+            <a:tailEnd type="triangle"/>
           </a:ln>
         </p:spPr>
         <p:style>
@@ -4538,7 +4538,7 @@
           <p:cNvPr id="50" name="Group 49">
             <a:extLst>
               <a:ext uri="{FF2B5EF4-FFF2-40B4-BE49-F238E27FC236}">
-                <a16:creationId xmlns:a16="http://schemas.microsoft.com/office/drawing/2014/main" xmlns="" id="{A51CCD7C-E0FB-4561-9ECB-21FA3B0B6011}"/>
+                <a16:creationId xmlns:a16="http://schemas.microsoft.com/office/drawing/2014/main" id="{A51CCD7C-E0FB-4561-9ECB-21FA3B0B6011}"/>
               </a:ext>
             </a:extLst>
           </p:cNvPr>
@@ -4547,10 +4547,10 @@
         </p:nvGrpSpPr>
         <p:grpSpPr>
           <a:xfrm>
-            <a:off x="1451415" y="4132088"/>
-            <a:ext cx="1062791" cy="1971972"/>
-            <a:chOff x="979790" y="4386262"/>
-            <a:chExt cx="1062791" cy="1971972"/>
+            <a:off x="3738442" y="3351038"/>
+            <a:ext cx="1356462" cy="2064305"/>
+            <a:chOff x="832955" y="4386262"/>
+            <a:chExt cx="1356462" cy="2064305"/>
           </a:xfrm>
         </p:grpSpPr>
         <p:pic>
@@ -4558,7 +4558,7 @@
             <p:cNvPr id="47" name="Picture 46">
               <a:extLst>
                 <a:ext uri="{FF2B5EF4-FFF2-40B4-BE49-F238E27FC236}">
-                  <a16:creationId xmlns:a16="http://schemas.microsoft.com/office/drawing/2014/main" xmlns="" id="{01223F7B-10CE-4717-82FD-54FCB975B5B3}"/>
+                  <a16:creationId xmlns:a16="http://schemas.microsoft.com/office/drawing/2014/main" id="{01223F7B-10CE-4717-82FD-54FCB975B5B3}"/>
                 </a:ext>
               </a:extLst>
             </p:cNvPr>
@@ -4588,7 +4588,7 @@
             <p:cNvPr id="49" name="Rectangle 48">
               <a:extLst>
                 <a:ext uri="{FF2B5EF4-FFF2-40B4-BE49-F238E27FC236}">
-                  <a16:creationId xmlns:a16="http://schemas.microsoft.com/office/drawing/2014/main" xmlns="" id="{D108285C-25BE-499E-9547-DE13717298E7}"/>
+                  <a16:creationId xmlns:a16="http://schemas.microsoft.com/office/drawing/2014/main" id="{D108285C-25BE-499E-9547-DE13717298E7}"/>
                 </a:ext>
               </a:extLst>
             </p:cNvPr>
@@ -4597,8 +4597,8 @@
           </p:nvSpPr>
           <p:spPr>
             <a:xfrm>
-              <a:off x="979790" y="5988902"/>
-              <a:ext cx="1062791" cy="369332"/>
+              <a:off x="832955" y="5988902"/>
+              <a:ext cx="1356462" cy="461665"/>
             </a:xfrm>
             <a:prstGeom prst="rect">
               <a:avLst/>
@@ -4612,7 +4612,7 @@
             <a:p>
               <a:pPr algn="ctr"/>
               <a:r>
-                <a:rPr lang="en-US" dirty="0"/>
+                <a:rPr lang="en-US" sz="2400" dirty="0"/>
                 <a:t>Evaluator</a:t>
               </a:r>
             </a:p>
@@ -4624,7 +4624,7 @@
           <p:cNvPr id="52" name="Oval 51">
             <a:extLst>
               <a:ext uri="{FF2B5EF4-FFF2-40B4-BE49-F238E27FC236}">
-                <a16:creationId xmlns:a16="http://schemas.microsoft.com/office/drawing/2014/main" xmlns="" id="{E0BF3096-B959-4382-A27C-4DDB205490B2}"/>
+                <a16:creationId xmlns:a16="http://schemas.microsoft.com/office/drawing/2014/main" id="{E0BF3096-B959-4382-A27C-4DDB205490B2}"/>
               </a:ext>
             </a:extLst>
           </p:cNvPr>
@@ -4633,8 +4633,8 @@
         </p:nvSpPr>
         <p:spPr>
           <a:xfrm>
-            <a:off x="5308348" y="3417076"/>
-            <a:ext cx="1965278" cy="715014"/>
+            <a:off x="6786850" y="2636026"/>
+            <a:ext cx="2497540" cy="715014"/>
           </a:xfrm>
           <a:prstGeom prst="ellipse">
             <a:avLst/>
@@ -4657,12 +4657,12 @@
           </a:fontRef>
         </p:style>
         <p:txBody>
-          <a:bodyPr rtlCol="0" anchor="ctr"/>
+          <a:bodyPr lIns="0" rIns="0" rtlCol="0" anchor="ctr"/>
           <a:lstStyle/>
           <a:p>
             <a:pPr algn="ctr"/>
             <a:r>
-              <a:rPr lang="en-US" sz="1200" dirty="0"/>
+              <a:rPr lang="en-US" b="1" dirty="0"/>
               <a:t>ID Enemy Strategy</a:t>
             </a:r>
           </a:p>
@@ -4673,7 +4673,7 @@
           <p:cNvPr id="53" name="Oval 52">
             <a:extLst>
               <a:ext uri="{FF2B5EF4-FFF2-40B4-BE49-F238E27FC236}">
-                <a16:creationId xmlns:a16="http://schemas.microsoft.com/office/drawing/2014/main" xmlns="" id="{FDC57CFA-8D25-4707-B3DB-E4E532673A0A}"/>
+                <a16:creationId xmlns:a16="http://schemas.microsoft.com/office/drawing/2014/main" id="{FDC57CFA-8D25-4707-B3DB-E4E532673A0A}"/>
               </a:ext>
             </a:extLst>
           </p:cNvPr>
@@ -4682,8 +4682,8 @@
         </p:nvSpPr>
         <p:spPr>
           <a:xfrm>
-            <a:off x="5308348" y="4537531"/>
-            <a:ext cx="1965278" cy="715014"/>
+            <a:off x="6786850" y="3756481"/>
+            <a:ext cx="2497540" cy="715014"/>
           </a:xfrm>
           <a:prstGeom prst="ellipse">
             <a:avLst/>
@@ -4706,12 +4706,12 @@
           </a:fontRef>
         </p:style>
         <p:txBody>
-          <a:bodyPr rtlCol="0" anchor="ctr"/>
+          <a:bodyPr lIns="0" rIns="0" rtlCol="0" anchor="ctr"/>
           <a:lstStyle/>
           <a:p>
             <a:pPr algn="ctr"/>
             <a:r>
-              <a:rPr lang="en-US" sz="1200" dirty="0"/>
+              <a:rPr lang="en-US" b="1" dirty="0"/>
               <a:t>Propose Counter-Strategy</a:t>
             </a:r>
           </a:p>
@@ -4722,7 +4722,7 @@
           <p:cNvPr id="54" name="Oval 53">
             <a:extLst>
               <a:ext uri="{FF2B5EF4-FFF2-40B4-BE49-F238E27FC236}">
-                <a16:creationId xmlns:a16="http://schemas.microsoft.com/office/drawing/2014/main" xmlns="" id="{345DB287-9B46-4514-AC05-9E3901CC17ED}"/>
+                <a16:creationId xmlns:a16="http://schemas.microsoft.com/office/drawing/2014/main" id="{345DB287-9B46-4514-AC05-9E3901CC17ED}"/>
               </a:ext>
             </a:extLst>
           </p:cNvPr>
@@ -4731,8 +4731,8 @@
         </p:nvSpPr>
         <p:spPr>
           <a:xfrm>
-            <a:off x="5308348" y="5695732"/>
-            <a:ext cx="1965278" cy="715014"/>
+            <a:off x="6786850" y="4914682"/>
+            <a:ext cx="2497540" cy="715014"/>
           </a:xfrm>
           <a:prstGeom prst="ellipse">
             <a:avLst/>
@@ -4755,12 +4755,12 @@
           </a:fontRef>
         </p:style>
         <p:txBody>
-          <a:bodyPr rtlCol="0" anchor="ctr"/>
+          <a:bodyPr lIns="0" rIns="0" rtlCol="0" anchor="ctr"/>
           <a:lstStyle/>
           <a:p>
             <a:pPr algn="ctr"/>
             <a:r>
-              <a:rPr lang="en-US" sz="1200" dirty="0"/>
+              <a:rPr lang="en-US" b="1" dirty="0"/>
               <a:t>Read and Write Strategies</a:t>
             </a:r>
           </a:p>
@@ -4771,7 +4771,7 @@
           <p:cNvPr id="66" name="Straight Arrow Connector 33">
             <a:extLst>
               <a:ext uri="{FF2B5EF4-FFF2-40B4-BE49-F238E27FC236}">
-                <a16:creationId xmlns:a16="http://schemas.microsoft.com/office/drawing/2014/main" xmlns="" id="{870FF5B4-0094-43D7-B747-D0F9EC5A425A}"/>
+                <a16:creationId xmlns:a16="http://schemas.microsoft.com/office/drawing/2014/main" id="{870FF5B4-0094-43D7-B747-D0F9EC5A425A}"/>
               </a:ext>
             </a:extLst>
           </p:cNvPr>
@@ -4784,17 +4784,17 @@
         </p:nvCxnSpPr>
         <p:spPr>
           <a:xfrm>
-            <a:off x="3723640" y="3385820"/>
-            <a:ext cx="1584708" cy="1509218"/>
+            <a:off x="5388244" y="2604770"/>
+            <a:ext cx="1398606" cy="1509218"/>
           </a:xfrm>
           <a:prstGeom prst="bentConnector3">
             <a:avLst>
               <a:gd name="adj1" fmla="val 50000"/>
             </a:avLst>
           </a:prstGeom>
-          <a:ln>
-            <a:headEnd type="arrow"/>
-            <a:tailEnd type="none"/>
+          <a:ln w="38100">
+            <a:headEnd type="triangle"/>
+            <a:tailEnd type="triangle"/>
           </a:ln>
         </p:spPr>
         <p:style>
@@ -4817,7 +4817,7 @@
           <p:cNvPr id="74" name="Straight Arrow Connector 73">
             <a:extLst>
               <a:ext uri="{FF2B5EF4-FFF2-40B4-BE49-F238E27FC236}">
-                <a16:creationId xmlns:a16="http://schemas.microsoft.com/office/drawing/2014/main" xmlns="" id="{25DC6E09-766C-435A-9947-62A270F44579}"/>
+                <a16:creationId xmlns:a16="http://schemas.microsoft.com/office/drawing/2014/main" id="{25DC6E09-766C-435A-9947-62A270F44579}"/>
               </a:ext>
             </a:extLst>
           </p:cNvPr>
@@ -4830,19 +4830,19 @@
         </p:nvCxnSpPr>
         <p:spPr>
           <a:xfrm flipV="1">
-            <a:off x="6290987" y="5252545"/>
+            <a:off x="8035620" y="4471495"/>
             <a:ext cx="0" cy="443187"/>
           </a:xfrm>
           <a:prstGeom prst="straightConnector1">
             <a:avLst/>
           </a:prstGeom>
-          <a:ln>
+          <a:ln w="38100">
             <a:solidFill>
               <a:schemeClr val="tx1"/>
             </a:solidFill>
             <a:prstDash val="lgDash"/>
-            <a:headEnd type="arrow"/>
-            <a:tailEnd type="arrow"/>
+            <a:headEnd type="triangle"/>
+            <a:tailEnd type="triangle"/>
           </a:ln>
         </p:spPr>
         <p:style>
@@ -4865,7 +4865,7 @@
           <p:cNvPr id="83" name="Straight Arrow Connector 82">
             <a:extLst>
               <a:ext uri="{FF2B5EF4-FFF2-40B4-BE49-F238E27FC236}">
-                <a16:creationId xmlns:a16="http://schemas.microsoft.com/office/drawing/2014/main" xmlns="" id="{7673F6C5-5DA1-42DB-9BD1-DB5C15D667E7}"/>
+                <a16:creationId xmlns:a16="http://schemas.microsoft.com/office/drawing/2014/main" id="{7673F6C5-5DA1-42DB-9BD1-DB5C15D667E7}"/>
               </a:ext>
             </a:extLst>
           </p:cNvPr>
@@ -4878,19 +4878,125 @@
         </p:nvCxnSpPr>
         <p:spPr>
           <a:xfrm>
-            <a:off x="6290987" y="4132090"/>
+            <a:off x="8035620" y="3351040"/>
             <a:ext cx="0" cy="405441"/>
           </a:xfrm>
           <a:prstGeom prst="straightConnector1">
             <a:avLst/>
           </a:prstGeom>
-          <a:ln>
+          <a:ln w="38100">
             <a:solidFill>
               <a:schemeClr val="tx1"/>
             </a:solidFill>
             <a:prstDash val="lgDash"/>
             <a:headEnd type="none"/>
-            <a:tailEnd type="arrow"/>
+            <a:tailEnd type="triangle"/>
+          </a:ln>
+        </p:spPr>
+        <p:style>
+          <a:lnRef idx="1">
+            <a:schemeClr val="accent1"/>
+          </a:lnRef>
+          <a:fillRef idx="0">
+            <a:schemeClr val="accent1"/>
+          </a:fillRef>
+          <a:effectRef idx="0">
+            <a:schemeClr val="accent1"/>
+          </a:effectRef>
+          <a:fontRef idx="minor">
+            <a:schemeClr val="tx1"/>
+          </a:fontRef>
+        </p:style>
+      </p:cxnSp>
+      <p:sp>
+        <p:nvSpPr>
+          <p:cNvPr id="32" name="Rectangle 31">
+            <a:extLst>
+              <a:ext uri="{FF2B5EF4-FFF2-40B4-BE49-F238E27FC236}">
+                <a16:creationId xmlns:a16="http://schemas.microsoft.com/office/drawing/2014/main" id="{27279B7F-4482-48C1-9E95-EBD3B3184E42}"/>
+              </a:ext>
+            </a:extLst>
+          </p:cNvPr>
+          <p:cNvSpPr/>
+          <p:nvPr/>
+        </p:nvSpPr>
+        <p:spPr>
+          <a:xfrm>
+            <a:off x="2038060" y="2115090"/>
+            <a:ext cx="1503680" cy="955040"/>
+          </a:xfrm>
+          <a:prstGeom prst="rect">
+            <a:avLst/>
+          </a:prstGeom>
+          <a:solidFill>
+            <a:schemeClr val="bg1">
+              <a:lumMod val="50000"/>
+            </a:schemeClr>
+          </a:solidFill>
+          <a:ln>
+            <a:solidFill>
+              <a:schemeClr val="tx1"/>
+            </a:solidFill>
+          </a:ln>
+        </p:spPr>
+        <p:style>
+          <a:lnRef idx="2">
+            <a:schemeClr val="accent1">
+              <a:shade val="50000"/>
+            </a:schemeClr>
+          </a:lnRef>
+          <a:fillRef idx="1">
+            <a:schemeClr val="accent1"/>
+          </a:fillRef>
+          <a:effectRef idx="0">
+            <a:schemeClr val="accent1"/>
+          </a:effectRef>
+          <a:fontRef idx="minor">
+            <a:schemeClr val="lt1"/>
+          </a:fontRef>
+        </p:style>
+        <p:txBody>
+          <a:bodyPr rtlCol="0" anchor="ctr"/>
+          <a:lstStyle/>
+          <a:p>
+            <a:pPr algn="ctr"/>
+            <a:r>
+              <a:rPr lang="en-US" sz="2400" dirty="0"/>
+              <a:t>BWAPI</a:t>
+            </a:r>
+          </a:p>
+        </p:txBody>
+      </p:sp>
+      <p:cxnSp>
+        <p:nvCxnSpPr>
+          <p:cNvPr id="35" name="Straight Arrow Connector 34">
+            <a:extLst>
+              <a:ext uri="{FF2B5EF4-FFF2-40B4-BE49-F238E27FC236}">
+                <a16:creationId xmlns:a16="http://schemas.microsoft.com/office/drawing/2014/main" id="{AECF8DDD-67D1-4693-AE07-22195ECB8FC2}"/>
+              </a:ext>
+            </a:extLst>
+          </p:cNvPr>
+          <p:cNvCxnSpPr>
+            <a:cxnSpLocks/>
+            <a:stCxn id="4" idx="3"/>
+            <a:endCxn id="32" idx="1"/>
+          </p:cNvCxnSpPr>
+          <p:nvPr/>
+        </p:nvCxnSpPr>
+        <p:spPr>
+          <a:xfrm>
+            <a:off x="1695236" y="2583904"/>
+            <a:ext cx="342824" cy="8706"/>
+          </a:xfrm>
+          <a:prstGeom prst="straightConnector1">
+            <a:avLst/>
+          </a:prstGeom>
+          <a:ln w="38100">
+            <a:solidFill>
+              <a:schemeClr val="tx1"/>
+            </a:solidFill>
+            <a:headEnd type="triangle"/>
+            <a:tailEnd type="triangle"/>
           </a:ln>
         </p:spPr>
         <p:style>
@@ -4943,7 +5049,7 @@
           <p:cNvPr id="2" name="Title 1">
             <a:extLst>
               <a:ext uri="{FF2B5EF4-FFF2-40B4-BE49-F238E27FC236}">
-                <a16:creationId xmlns:a16="http://schemas.microsoft.com/office/drawing/2014/main" xmlns="" id="{5ADC56FF-B4DC-4FF6-8C43-32D010FD16AF}"/>
+                <a16:creationId xmlns:a16="http://schemas.microsoft.com/office/drawing/2014/main" id="{5ADC56FF-B4DC-4FF6-8C43-32D010FD16AF}"/>
               </a:ext>
             </a:extLst>
           </p:cNvPr>
@@ -5792,7 +5898,7 @@
           <p:cNvPr id="2" name="Title 1">
             <a:extLst>
               <a:ext uri="{FF2B5EF4-FFF2-40B4-BE49-F238E27FC236}">
-                <a16:creationId xmlns:a16="http://schemas.microsoft.com/office/drawing/2014/main" xmlns="" id="{5ADC56FF-B4DC-4FF6-8C43-32D010FD16AF}"/>
+                <a16:creationId xmlns:a16="http://schemas.microsoft.com/office/drawing/2014/main" id="{5ADC56FF-B4DC-4FF6-8C43-32D010FD16AF}"/>
               </a:ext>
             </a:extLst>
           </p:cNvPr>
@@ -6614,7 +6720,7 @@
           <p:cNvPr id="28" name="Rectangle 27">
             <a:extLst>
               <a:ext uri="{FF2B5EF4-FFF2-40B4-BE49-F238E27FC236}">
-                <a16:creationId xmlns:a16="http://schemas.microsoft.com/office/drawing/2014/main" xmlns="" id="{48EBDA38-3674-4766-8A9E-FC5A870C4AEE}"/>
+                <a16:creationId xmlns:a16="http://schemas.microsoft.com/office/drawing/2014/main" id="{48EBDA38-3674-4766-8A9E-FC5A870C4AEE}"/>
               </a:ext>
             </a:extLst>
           </p:cNvPr>
@@ -6663,7 +6769,7 @@
           <p:cNvPr id="29" name="Rectangle 28">
             <a:extLst>
               <a:ext uri="{FF2B5EF4-FFF2-40B4-BE49-F238E27FC236}">
-                <a16:creationId xmlns:a16="http://schemas.microsoft.com/office/drawing/2014/main" xmlns="" id="{8BB1185D-28C9-48E3-AF83-56D19481BD9B}"/>
+                <a16:creationId xmlns:a16="http://schemas.microsoft.com/office/drawing/2014/main" id="{8BB1185D-28C9-48E3-AF83-56D19481BD9B}"/>
               </a:ext>
             </a:extLst>
           </p:cNvPr>
@@ -6712,7 +6818,7 @@
           <p:cNvPr id="32" name="Rectangle 31">
             <a:extLst>
               <a:ext uri="{FF2B5EF4-FFF2-40B4-BE49-F238E27FC236}">
-                <a16:creationId xmlns:a16="http://schemas.microsoft.com/office/drawing/2014/main" xmlns="" id="{809860E9-C61D-4819-AC6C-EB42FB88463A}"/>
+                <a16:creationId xmlns:a16="http://schemas.microsoft.com/office/drawing/2014/main" id="{809860E9-C61D-4819-AC6C-EB42FB88463A}"/>
               </a:ext>
             </a:extLst>
           </p:cNvPr>
@@ -6761,7 +6867,7 @@
           <p:cNvPr id="33" name="Straight Arrow Connector 32">
             <a:extLst>
               <a:ext uri="{FF2B5EF4-FFF2-40B4-BE49-F238E27FC236}">
-                <a16:creationId xmlns:a16="http://schemas.microsoft.com/office/drawing/2014/main" xmlns="" id="{4FD98F2F-6E1F-404B-9187-1EBEA778FA8B}"/>
+                <a16:creationId xmlns:a16="http://schemas.microsoft.com/office/drawing/2014/main" id="{4FD98F2F-6E1F-404B-9187-1EBEA778FA8B}"/>
               </a:ext>
             </a:extLst>
           </p:cNvPr>
@@ -6835,7 +6941,7 @@
           <p:cNvPr id="2" name="Title 1">
             <a:extLst>
               <a:ext uri="{FF2B5EF4-FFF2-40B4-BE49-F238E27FC236}">
-                <a16:creationId xmlns:a16="http://schemas.microsoft.com/office/drawing/2014/main" xmlns="" id="{2435A16B-C73F-4378-AB6D-608131C0F4DA}"/>
+                <a16:creationId xmlns:a16="http://schemas.microsoft.com/office/drawing/2014/main" id="{2435A16B-C73F-4378-AB6D-608131C0F4DA}"/>
               </a:ext>
             </a:extLst>
           </p:cNvPr>
@@ -6863,7 +6969,7 @@
           <p:cNvPr id="4" name="Content Placeholder 3">
             <a:extLst>
               <a:ext uri="{FF2B5EF4-FFF2-40B4-BE49-F238E27FC236}">
-                <a16:creationId xmlns:a16="http://schemas.microsoft.com/office/drawing/2014/main" xmlns="" id="{14BDE94F-63BA-453E-9B65-76E3AD0850E8}"/>
+                <a16:creationId xmlns:a16="http://schemas.microsoft.com/office/drawing/2014/main" id="{14BDE94F-63BA-453E-9B65-76E3AD0850E8}"/>
               </a:ext>
             </a:extLst>
           </p:cNvPr>
@@ -6893,28 +6999,28 @@
                 <a:gridCol w="2900149">
                   <a:extLst>
                     <a:ext uri="{9D8B030D-6E8A-4147-A177-3AD203B41FA5}">
-                      <a16:colId xmlns:a16="http://schemas.microsoft.com/office/drawing/2014/main" xmlns="" val="1377422795"/>
+                      <a16:colId xmlns:a16="http://schemas.microsoft.com/office/drawing/2014/main" val="1377422795"/>
                     </a:ext>
                   </a:extLst>
                 </a:gridCol>
                 <a:gridCol w="2531661">
                   <a:extLst>
                     <a:ext uri="{9D8B030D-6E8A-4147-A177-3AD203B41FA5}">
-                      <a16:colId xmlns:a16="http://schemas.microsoft.com/office/drawing/2014/main" xmlns="" val="1598590039"/>
+                      <a16:colId xmlns:a16="http://schemas.microsoft.com/office/drawing/2014/main" val="1598590039"/>
                     </a:ext>
                   </a:extLst>
                 </a:gridCol>
                 <a:gridCol w="2101756">
                   <a:extLst>
                     <a:ext uri="{9D8B030D-6E8A-4147-A177-3AD203B41FA5}">
-                      <a16:colId xmlns:a16="http://schemas.microsoft.com/office/drawing/2014/main" xmlns="" val="3896506482"/>
+                      <a16:colId xmlns:a16="http://schemas.microsoft.com/office/drawing/2014/main" val="3896506482"/>
                     </a:ext>
                   </a:extLst>
                 </a:gridCol>
                 <a:gridCol w="4067030">
                   <a:extLst>
                     <a:ext uri="{9D8B030D-6E8A-4147-A177-3AD203B41FA5}">
-                      <a16:colId xmlns:a16="http://schemas.microsoft.com/office/drawing/2014/main" xmlns="" val="3170647213"/>
+                      <a16:colId xmlns:a16="http://schemas.microsoft.com/office/drawing/2014/main" val="3170647213"/>
                     </a:ext>
                   </a:extLst>
                 </a:gridCol>
@@ -6974,7 +7080,7 @@
                 </a:tc>
                 <a:extLst>
                   <a:ext uri="{0D108BD9-81ED-4DB2-BD59-A6C34878D82A}">
-                    <a16:rowId xmlns:a16="http://schemas.microsoft.com/office/drawing/2014/main" xmlns="" val="3387341382"/>
+                    <a16:rowId xmlns:a16="http://schemas.microsoft.com/office/drawing/2014/main" val="3387341382"/>
                   </a:ext>
                 </a:extLst>
               </a:tr>
@@ -7034,7 +7140,7 @@
                 </a:tc>
                 <a:extLst>
                   <a:ext uri="{0D108BD9-81ED-4DB2-BD59-A6C34878D82A}">
-                    <a16:rowId xmlns:a16="http://schemas.microsoft.com/office/drawing/2014/main" xmlns="" val="855420630"/>
+                    <a16:rowId xmlns:a16="http://schemas.microsoft.com/office/drawing/2014/main" val="855420630"/>
                   </a:ext>
                 </a:extLst>
               </a:tr>
@@ -7110,7 +7216,7 @@
                 </a:tc>
                 <a:extLst>
                   <a:ext uri="{0D108BD9-81ED-4DB2-BD59-A6C34878D82A}">
-                    <a16:rowId xmlns:a16="http://schemas.microsoft.com/office/drawing/2014/main" xmlns="" val="3188031076"/>
+                    <a16:rowId xmlns:a16="http://schemas.microsoft.com/office/drawing/2014/main" val="3188031076"/>
                   </a:ext>
                 </a:extLst>
               </a:tr>
@@ -7177,7 +7283,7 @@
                 </a:tc>
                 <a:extLst>
                   <a:ext uri="{0D108BD9-81ED-4DB2-BD59-A6C34878D82A}">
-                    <a16:rowId xmlns:a16="http://schemas.microsoft.com/office/drawing/2014/main" xmlns="" val="1240135095"/>
+                    <a16:rowId xmlns:a16="http://schemas.microsoft.com/office/drawing/2014/main" val="1240135095"/>
                   </a:ext>
                 </a:extLst>
               </a:tr>
@@ -7233,7 +7339,7 @@
                 </a:tc>
                 <a:extLst>
                   <a:ext uri="{0D108BD9-81ED-4DB2-BD59-A6C34878D82A}">
-                    <a16:rowId xmlns:a16="http://schemas.microsoft.com/office/drawing/2014/main" xmlns="" val="1651246168"/>
+                    <a16:rowId xmlns:a16="http://schemas.microsoft.com/office/drawing/2014/main" val="1651246168"/>
                   </a:ext>
                 </a:extLst>
               </a:tr>
@@ -7293,7 +7399,7 @@
                 </a:tc>
                 <a:extLst>
                   <a:ext uri="{0D108BD9-81ED-4DB2-BD59-A6C34878D82A}">
-                    <a16:rowId xmlns:a16="http://schemas.microsoft.com/office/drawing/2014/main" xmlns="" val="3320754550"/>
+                    <a16:rowId xmlns:a16="http://schemas.microsoft.com/office/drawing/2014/main" val="3320754550"/>
                   </a:ext>
                 </a:extLst>
               </a:tr>
@@ -7370,7 +7476,7 @@
                 </a:tc>
                 <a:extLst>
                   <a:ext uri="{0D108BD9-81ED-4DB2-BD59-A6C34878D82A}">
-                    <a16:rowId xmlns:a16="http://schemas.microsoft.com/office/drawing/2014/main" xmlns="" val="701464579"/>
+                    <a16:rowId xmlns:a16="http://schemas.microsoft.com/office/drawing/2014/main" val="701464579"/>
                   </a:ext>
                 </a:extLst>
               </a:tr>
@@ -7507,7 +7613,7 @@
                 </a:tc>
                 <a:extLst>
                   <a:ext uri="{0D108BD9-81ED-4DB2-BD59-A6C34878D82A}">
-                    <a16:rowId xmlns:a16="http://schemas.microsoft.com/office/drawing/2014/main" xmlns="" val="904193852"/>
+                    <a16:rowId xmlns:a16="http://schemas.microsoft.com/office/drawing/2014/main" val="904193852"/>
                   </a:ext>
                 </a:extLst>
               </a:tr>
@@ -7550,7 +7656,7 @@
           <p:cNvPr id="2" name="Title 1">
             <a:extLst>
               <a:ext uri="{FF2B5EF4-FFF2-40B4-BE49-F238E27FC236}">
-                <a16:creationId xmlns:a16="http://schemas.microsoft.com/office/drawing/2014/main" xmlns="" id="{88BB61F1-4D04-4BA3-880A-182E63063E3F}"/>
+                <a16:creationId xmlns:a16="http://schemas.microsoft.com/office/drawing/2014/main" id="{88BB61F1-4D04-4BA3-880A-182E63063E3F}"/>
               </a:ext>
             </a:extLst>
           </p:cNvPr>
@@ -7578,7 +7684,7 @@
           <p:cNvPr id="5" name="Table 4">
             <a:extLst>
               <a:ext uri="{FF2B5EF4-FFF2-40B4-BE49-F238E27FC236}">
-                <a16:creationId xmlns:a16="http://schemas.microsoft.com/office/drawing/2014/main" xmlns="" id="{7FE0EC76-5C3B-4492-8D2E-E1FAAD3FCB09}"/>
+                <a16:creationId xmlns:a16="http://schemas.microsoft.com/office/drawing/2014/main" id="{7FE0EC76-5C3B-4492-8D2E-E1FAAD3FCB09}"/>
               </a:ext>
             </a:extLst>
           </p:cNvPr>
@@ -7607,21 +7713,21 @@
                 <a:gridCol w="1190594">
                   <a:extLst>
                     <a:ext uri="{9D8B030D-6E8A-4147-A177-3AD203B41FA5}">
-                      <a16:colId xmlns:a16="http://schemas.microsoft.com/office/drawing/2014/main" xmlns="" val="2350551349"/>
+                      <a16:colId xmlns:a16="http://schemas.microsoft.com/office/drawing/2014/main" val="2350551349"/>
                     </a:ext>
                   </a:extLst>
                 </a:gridCol>
                 <a:gridCol w="4492101">
                   <a:extLst>
                     <a:ext uri="{9D8B030D-6E8A-4147-A177-3AD203B41FA5}">
-                      <a16:colId xmlns:a16="http://schemas.microsoft.com/office/drawing/2014/main" xmlns="" val="3837764880"/>
+                      <a16:colId xmlns:a16="http://schemas.microsoft.com/office/drawing/2014/main" val="3837764880"/>
                     </a:ext>
                   </a:extLst>
                 </a:gridCol>
                 <a:gridCol w="5495277">
                   <a:extLst>
                     <a:ext uri="{9D8B030D-6E8A-4147-A177-3AD203B41FA5}">
-                      <a16:colId xmlns:a16="http://schemas.microsoft.com/office/drawing/2014/main" xmlns="" val="1650680026"/>
+                      <a16:colId xmlns:a16="http://schemas.microsoft.com/office/drawing/2014/main" val="1650680026"/>
                     </a:ext>
                   </a:extLst>
                 </a:gridCol>
@@ -7733,7 +7839,7 @@
                 </a:tc>
                 <a:extLst>
                   <a:ext uri="{0D108BD9-81ED-4DB2-BD59-A6C34878D82A}">
-                    <a16:rowId xmlns:a16="http://schemas.microsoft.com/office/drawing/2014/main" xmlns="" val="3622372536"/>
+                    <a16:rowId xmlns:a16="http://schemas.microsoft.com/office/drawing/2014/main" val="3622372536"/>
                   </a:ext>
                 </a:extLst>
               </a:tr>
@@ -7773,7 +7879,7 @@
                 </a:tc>
                 <a:extLst>
                   <a:ext uri="{0D108BD9-81ED-4DB2-BD59-A6C34878D82A}">
-                    <a16:rowId xmlns:a16="http://schemas.microsoft.com/office/drawing/2014/main" xmlns="" val="3395803886"/>
+                    <a16:rowId xmlns:a16="http://schemas.microsoft.com/office/drawing/2014/main" val="3395803886"/>
                   </a:ext>
                 </a:extLst>
               </a:tr>
@@ -7813,7 +7919,7 @@
                 </a:tc>
                 <a:extLst>
                   <a:ext uri="{0D108BD9-81ED-4DB2-BD59-A6C34878D82A}">
-                    <a16:rowId xmlns:a16="http://schemas.microsoft.com/office/drawing/2014/main" xmlns="" val="678614825"/>
+                    <a16:rowId xmlns:a16="http://schemas.microsoft.com/office/drawing/2014/main" val="678614825"/>
                   </a:ext>
                 </a:extLst>
               </a:tr>
@@ -7853,7 +7959,7 @@
                 </a:tc>
                 <a:extLst>
                   <a:ext uri="{0D108BD9-81ED-4DB2-BD59-A6C34878D82A}">
-                    <a16:rowId xmlns:a16="http://schemas.microsoft.com/office/drawing/2014/main" xmlns="" val="14700446"/>
+                    <a16:rowId xmlns:a16="http://schemas.microsoft.com/office/drawing/2014/main" val="14700446"/>
                   </a:ext>
                 </a:extLst>
               </a:tr>
@@ -7944,7 +8050,7 @@
                 </a:tc>
                 <a:extLst>
                   <a:ext uri="{0D108BD9-81ED-4DB2-BD59-A6C34878D82A}">
-                    <a16:rowId xmlns:a16="http://schemas.microsoft.com/office/drawing/2014/main" xmlns="" val="2986406775"/>
+                    <a16:rowId xmlns:a16="http://schemas.microsoft.com/office/drawing/2014/main" val="2986406775"/>
                   </a:ext>
                 </a:extLst>
               </a:tr>
@@ -7957,7 +8063,7 @@
           <p:cNvPr id="6" name="Rectangle 5">
             <a:extLst>
               <a:ext uri="{FF2B5EF4-FFF2-40B4-BE49-F238E27FC236}">
-                <a16:creationId xmlns:a16="http://schemas.microsoft.com/office/drawing/2014/main" xmlns="" id="{3D3A6304-95D1-4C9A-9D4F-D6FEB093FD04}"/>
+                <a16:creationId xmlns:a16="http://schemas.microsoft.com/office/drawing/2014/main" id="{3D3A6304-95D1-4C9A-9D4F-D6FEB093FD04}"/>
               </a:ext>
             </a:extLst>
           </p:cNvPr>
@@ -8007,7 +8113,7 @@
           <p:cNvPr id="7" name="Rectangle 6">
             <a:extLst>
               <a:ext uri="{FF2B5EF4-FFF2-40B4-BE49-F238E27FC236}">
-                <a16:creationId xmlns:a16="http://schemas.microsoft.com/office/drawing/2014/main" xmlns="" id="{FA2D1AB0-D637-49D0-8B11-798F83C57DE5}"/>
+                <a16:creationId xmlns:a16="http://schemas.microsoft.com/office/drawing/2014/main" id="{FA2D1AB0-D637-49D0-8B11-798F83C57DE5}"/>
               </a:ext>
             </a:extLst>
           </p:cNvPr>
@@ -8056,7 +8162,7 @@
           <p:cNvPr id="20" name="Group 19">
             <a:extLst>
               <a:ext uri="{FF2B5EF4-FFF2-40B4-BE49-F238E27FC236}">
-                <a16:creationId xmlns:a16="http://schemas.microsoft.com/office/drawing/2014/main" xmlns="" id="{61966E5F-6A7D-4692-B4A7-31B364D52472}"/>
+                <a16:creationId xmlns:a16="http://schemas.microsoft.com/office/drawing/2014/main" id="{61966E5F-6A7D-4692-B4A7-31B364D52472}"/>
               </a:ext>
             </a:extLst>
           </p:cNvPr>
@@ -8076,7 +8182,7 @@
             <p:cNvPr id="10" name="Rectangle 9">
               <a:extLst>
                 <a:ext uri="{FF2B5EF4-FFF2-40B4-BE49-F238E27FC236}">
-                  <a16:creationId xmlns:a16="http://schemas.microsoft.com/office/drawing/2014/main" xmlns="" id="{ED96FD96-30EE-42EA-AE74-FF660B4CD95E}"/>
+                  <a16:creationId xmlns:a16="http://schemas.microsoft.com/office/drawing/2014/main" id="{ED96FD96-30EE-42EA-AE74-FF660B4CD95E}"/>
                 </a:ext>
               </a:extLst>
             </p:cNvPr>
@@ -8125,7 +8231,7 @@
             <p:cNvPr id="15" name="Flowchart: Decision 14">
               <a:extLst>
                 <a:ext uri="{FF2B5EF4-FFF2-40B4-BE49-F238E27FC236}">
-                  <a16:creationId xmlns:a16="http://schemas.microsoft.com/office/drawing/2014/main" xmlns="" id="{7DD829F6-1A9E-4763-8903-C9A0993AC38E}"/>
+                  <a16:creationId xmlns:a16="http://schemas.microsoft.com/office/drawing/2014/main" id="{7DD829F6-1A9E-4763-8903-C9A0993AC38E}"/>
                 </a:ext>
               </a:extLst>
             </p:cNvPr>
@@ -8172,7 +8278,7 @@
           <p:cNvPr id="19" name="Group 18">
             <a:extLst>
               <a:ext uri="{FF2B5EF4-FFF2-40B4-BE49-F238E27FC236}">
-                <a16:creationId xmlns:a16="http://schemas.microsoft.com/office/drawing/2014/main" xmlns="" id="{0DAE263D-B219-4D24-932B-1ECEB1854EDA}"/>
+                <a16:creationId xmlns:a16="http://schemas.microsoft.com/office/drawing/2014/main" id="{0DAE263D-B219-4D24-932B-1ECEB1854EDA}"/>
               </a:ext>
             </a:extLst>
           </p:cNvPr>
@@ -8192,7 +8298,7 @@
             <p:cNvPr id="11" name="Rectangle 10">
               <a:extLst>
                 <a:ext uri="{FF2B5EF4-FFF2-40B4-BE49-F238E27FC236}">
-                  <a16:creationId xmlns:a16="http://schemas.microsoft.com/office/drawing/2014/main" xmlns="" id="{80085097-CCF1-4DCA-9E6D-E8FB4FF5528B}"/>
+                  <a16:creationId xmlns:a16="http://schemas.microsoft.com/office/drawing/2014/main" id="{80085097-CCF1-4DCA-9E6D-E8FB4FF5528B}"/>
                 </a:ext>
               </a:extLst>
             </p:cNvPr>
@@ -8241,7 +8347,7 @@
             <p:cNvPr id="12" name="Flowchart: Decision 11">
               <a:extLst>
                 <a:ext uri="{FF2B5EF4-FFF2-40B4-BE49-F238E27FC236}">
-                  <a16:creationId xmlns:a16="http://schemas.microsoft.com/office/drawing/2014/main" xmlns="" id="{2A0BE501-A964-4BB6-B7A5-2B5C26EC5DF9}"/>
+                  <a16:creationId xmlns:a16="http://schemas.microsoft.com/office/drawing/2014/main" id="{2A0BE501-A964-4BB6-B7A5-2B5C26EC5DF9}"/>
                 </a:ext>
               </a:extLst>
             </p:cNvPr>
@@ -8287,7 +8393,7 @@
             <p:cNvPr id="13" name="Flowchart: Decision 12">
               <a:extLst>
                 <a:ext uri="{FF2B5EF4-FFF2-40B4-BE49-F238E27FC236}">
-                  <a16:creationId xmlns:a16="http://schemas.microsoft.com/office/drawing/2014/main" xmlns="" id="{ED8A9097-3781-480B-8EA6-66A0EFFD1B0C}"/>
+                  <a16:creationId xmlns:a16="http://schemas.microsoft.com/office/drawing/2014/main" id="{ED8A9097-3781-480B-8EA6-66A0EFFD1B0C}"/>
                 </a:ext>
               </a:extLst>
             </p:cNvPr>
@@ -8333,7 +8439,7 @@
             <p:cNvPr id="14" name="Flowchart: Decision 13">
               <a:extLst>
                 <a:ext uri="{FF2B5EF4-FFF2-40B4-BE49-F238E27FC236}">
-                  <a16:creationId xmlns:a16="http://schemas.microsoft.com/office/drawing/2014/main" xmlns="" id="{FC301A33-6B6C-4638-8E7B-D2120989BE20}"/>
+                  <a16:creationId xmlns:a16="http://schemas.microsoft.com/office/drawing/2014/main" id="{FC301A33-6B6C-4638-8E7B-D2120989BE20}"/>
                 </a:ext>
               </a:extLst>
             </p:cNvPr>
@@ -8380,7 +8486,7 @@
           <p:cNvPr id="21" name="Group 20">
             <a:extLst>
               <a:ext uri="{FF2B5EF4-FFF2-40B4-BE49-F238E27FC236}">
-                <a16:creationId xmlns:a16="http://schemas.microsoft.com/office/drawing/2014/main" xmlns="" id="{84119507-443D-45EE-86E7-FA578222D438}"/>
+                <a16:creationId xmlns:a16="http://schemas.microsoft.com/office/drawing/2014/main" id="{84119507-443D-45EE-86E7-FA578222D438}"/>
               </a:ext>
             </a:extLst>
           </p:cNvPr>
@@ -8400,7 +8506,7 @@
             <p:cNvPr id="8" name="Rectangle 7">
               <a:extLst>
                 <a:ext uri="{FF2B5EF4-FFF2-40B4-BE49-F238E27FC236}">
-                  <a16:creationId xmlns:a16="http://schemas.microsoft.com/office/drawing/2014/main" xmlns="" id="{AFEE3931-10A1-4CDD-810D-FC9109934B99}"/>
+                  <a16:creationId xmlns:a16="http://schemas.microsoft.com/office/drawing/2014/main" id="{AFEE3931-10A1-4CDD-810D-FC9109934B99}"/>
                 </a:ext>
               </a:extLst>
             </p:cNvPr>
@@ -8449,7 +8555,7 @@
             <p:cNvPr id="16" name="Flowchart: Decision 15">
               <a:extLst>
                 <a:ext uri="{FF2B5EF4-FFF2-40B4-BE49-F238E27FC236}">
-                  <a16:creationId xmlns:a16="http://schemas.microsoft.com/office/drawing/2014/main" xmlns="" id="{4E597F90-8639-4F18-85CF-7F9254DB3317}"/>
+                  <a16:creationId xmlns:a16="http://schemas.microsoft.com/office/drawing/2014/main" id="{4E597F90-8639-4F18-85CF-7F9254DB3317}"/>
                 </a:ext>
               </a:extLst>
             </p:cNvPr>
@@ -8496,7 +8602,7 @@
           <p:cNvPr id="22" name="Group 21">
             <a:extLst>
               <a:ext uri="{FF2B5EF4-FFF2-40B4-BE49-F238E27FC236}">
-                <a16:creationId xmlns:a16="http://schemas.microsoft.com/office/drawing/2014/main" xmlns="" id="{D3172953-4DC1-4408-A686-B915B758B219}"/>
+                <a16:creationId xmlns:a16="http://schemas.microsoft.com/office/drawing/2014/main" id="{D3172953-4DC1-4408-A686-B915B758B219}"/>
               </a:ext>
             </a:extLst>
           </p:cNvPr>
@@ -8516,7 +8622,7 @@
             <p:cNvPr id="9" name="Rectangle 8">
               <a:extLst>
                 <a:ext uri="{FF2B5EF4-FFF2-40B4-BE49-F238E27FC236}">
-                  <a16:creationId xmlns:a16="http://schemas.microsoft.com/office/drawing/2014/main" xmlns="" id="{EFA74233-BA2E-456A-86AA-CF07F73244F1}"/>
+                  <a16:creationId xmlns:a16="http://schemas.microsoft.com/office/drawing/2014/main" id="{EFA74233-BA2E-456A-86AA-CF07F73244F1}"/>
                 </a:ext>
               </a:extLst>
             </p:cNvPr>
@@ -8565,7 +8671,7 @@
             <p:cNvPr id="17" name="Flowchart: Decision 16">
               <a:extLst>
                 <a:ext uri="{FF2B5EF4-FFF2-40B4-BE49-F238E27FC236}">
-                  <a16:creationId xmlns:a16="http://schemas.microsoft.com/office/drawing/2014/main" xmlns="" id="{92959D0E-74B4-4C6C-828D-74F2B6A3D47C}"/>
+                  <a16:creationId xmlns:a16="http://schemas.microsoft.com/office/drawing/2014/main" id="{92959D0E-74B4-4C6C-828D-74F2B6A3D47C}"/>
                 </a:ext>
               </a:extLst>
             </p:cNvPr>
@@ -8612,7 +8718,7 @@
           <p:cNvPr id="18" name="Flowchart: Decision 17">
             <a:extLst>
               <a:ext uri="{FF2B5EF4-FFF2-40B4-BE49-F238E27FC236}">
-                <a16:creationId xmlns:a16="http://schemas.microsoft.com/office/drawing/2014/main" xmlns="" id="{210DC1B3-53F0-4298-B209-CB2117756721}"/>
+                <a16:creationId xmlns:a16="http://schemas.microsoft.com/office/drawing/2014/main" id="{210DC1B3-53F0-4298-B209-CB2117756721}"/>
               </a:ext>
             </a:extLst>
           </p:cNvPr>
@@ -8658,7 +8764,7 @@
           <p:cNvPr id="23" name="TextBox 22">
             <a:extLst>
               <a:ext uri="{FF2B5EF4-FFF2-40B4-BE49-F238E27FC236}">
-                <a16:creationId xmlns:a16="http://schemas.microsoft.com/office/drawing/2014/main" xmlns="" id="{E661C252-6A24-4EB1-8618-EC5A6E2ECFDD}"/>
+                <a16:creationId xmlns:a16="http://schemas.microsoft.com/office/drawing/2014/main" id="{E661C252-6A24-4EB1-8618-EC5A6E2ECFDD}"/>
               </a:ext>
             </a:extLst>
           </p:cNvPr>
@@ -8697,7 +8803,7 @@
           <p:cNvPr id="24" name="TextBox 23">
             <a:extLst>
               <a:ext uri="{FF2B5EF4-FFF2-40B4-BE49-F238E27FC236}">
-                <a16:creationId xmlns:a16="http://schemas.microsoft.com/office/drawing/2014/main" xmlns="" id="{F7314EE0-3A67-4C86-892A-2F68B23DA8DE}"/>
+                <a16:creationId xmlns:a16="http://schemas.microsoft.com/office/drawing/2014/main" id="{F7314EE0-3A67-4C86-892A-2F68B23DA8DE}"/>
               </a:ext>
             </a:extLst>
           </p:cNvPr>
@@ -8736,7 +8842,7 @@
           <p:cNvPr id="25" name="TextBox 24">
             <a:extLst>
               <a:ext uri="{FF2B5EF4-FFF2-40B4-BE49-F238E27FC236}">
-                <a16:creationId xmlns:a16="http://schemas.microsoft.com/office/drawing/2014/main" xmlns="" id="{DFC08BC7-36A6-438D-B1DC-123CBDD5C0F6}"/>
+                <a16:creationId xmlns:a16="http://schemas.microsoft.com/office/drawing/2014/main" id="{DFC08BC7-36A6-438D-B1DC-123CBDD5C0F6}"/>
               </a:ext>
             </a:extLst>
           </p:cNvPr>
@@ -8775,7 +8881,7 @@
           <p:cNvPr id="26" name="TextBox 25">
             <a:extLst>
               <a:ext uri="{FF2B5EF4-FFF2-40B4-BE49-F238E27FC236}">
-                <a16:creationId xmlns:a16="http://schemas.microsoft.com/office/drawing/2014/main" xmlns="" id="{4992DB1A-B53E-43E4-9038-42FB5B14EC93}"/>
+                <a16:creationId xmlns:a16="http://schemas.microsoft.com/office/drawing/2014/main" id="{4992DB1A-B53E-43E4-9038-42FB5B14EC93}"/>
               </a:ext>
             </a:extLst>
           </p:cNvPr>
@@ -8814,7 +8920,7 @@
           <p:cNvPr id="27" name="TextBox 26">
             <a:extLst>
               <a:ext uri="{FF2B5EF4-FFF2-40B4-BE49-F238E27FC236}">
-                <a16:creationId xmlns:a16="http://schemas.microsoft.com/office/drawing/2014/main" xmlns="" id="{8710889C-2534-4DC4-B4CE-00EC929F78F1}"/>
+                <a16:creationId xmlns:a16="http://schemas.microsoft.com/office/drawing/2014/main" id="{8710889C-2534-4DC4-B4CE-00EC929F78F1}"/>
               </a:ext>
             </a:extLst>
           </p:cNvPr>
@@ -8853,7 +8959,7 @@
           <p:cNvPr id="29" name="TextBox 28">
             <a:extLst>
               <a:ext uri="{FF2B5EF4-FFF2-40B4-BE49-F238E27FC236}">
-                <a16:creationId xmlns:a16="http://schemas.microsoft.com/office/drawing/2014/main" xmlns="" id="{31A6AF03-D01E-4FD5-90D9-8B5FFD612ECB}"/>
+                <a16:creationId xmlns:a16="http://schemas.microsoft.com/office/drawing/2014/main" id="{31A6AF03-D01E-4FD5-90D9-8B5FFD612ECB}"/>
               </a:ext>
             </a:extLst>
           </p:cNvPr>
@@ -8888,7 +8994,7 @@
           <p:cNvPr id="30" name="TextBox 29">
             <a:extLst>
               <a:ext uri="{FF2B5EF4-FFF2-40B4-BE49-F238E27FC236}">
-                <a16:creationId xmlns:a16="http://schemas.microsoft.com/office/drawing/2014/main" xmlns="" id="{B1F3D9F5-18A1-4BB4-8394-3037A1C456BE}"/>
+                <a16:creationId xmlns:a16="http://schemas.microsoft.com/office/drawing/2014/main" id="{B1F3D9F5-18A1-4BB4-8394-3037A1C456BE}"/>
               </a:ext>
             </a:extLst>
           </p:cNvPr>
@@ -8923,7 +9029,7 @@
           <p:cNvPr id="32" name="Straight Connector 31">
             <a:extLst>
               <a:ext uri="{FF2B5EF4-FFF2-40B4-BE49-F238E27FC236}">
-                <a16:creationId xmlns:a16="http://schemas.microsoft.com/office/drawing/2014/main" xmlns="" id="{C278E7B5-CACA-4CA5-BAB7-413AB76CD5F8}"/>
+                <a16:creationId xmlns:a16="http://schemas.microsoft.com/office/drawing/2014/main" id="{C278E7B5-CACA-4CA5-BAB7-413AB76CD5F8}"/>
               </a:ext>
             </a:extLst>
           </p:cNvPr>
@@ -8965,7 +9071,7 @@
           <p:cNvPr id="33" name="Straight Connector 32">
             <a:extLst>
               <a:ext uri="{FF2B5EF4-FFF2-40B4-BE49-F238E27FC236}">
-                <a16:creationId xmlns:a16="http://schemas.microsoft.com/office/drawing/2014/main" xmlns="" id="{760B251E-E9CE-466F-9A74-481074E07959}"/>
+                <a16:creationId xmlns:a16="http://schemas.microsoft.com/office/drawing/2014/main" id="{760B251E-E9CE-466F-9A74-481074E07959}"/>
               </a:ext>
             </a:extLst>
           </p:cNvPr>
@@ -9008,7 +9114,7 @@
           <p:cNvPr id="36" name="Straight Connector 35">
             <a:extLst>
               <a:ext uri="{FF2B5EF4-FFF2-40B4-BE49-F238E27FC236}">
-                <a16:creationId xmlns:a16="http://schemas.microsoft.com/office/drawing/2014/main" xmlns="" id="{4B29E178-4BBD-4573-A789-253BC7408026}"/>
+                <a16:creationId xmlns:a16="http://schemas.microsoft.com/office/drawing/2014/main" id="{4B29E178-4BBD-4573-A789-253BC7408026}"/>
               </a:ext>
             </a:extLst>
           </p:cNvPr>
@@ -9051,7 +9157,7 @@
           <p:cNvPr id="39" name="Straight Connector 38">
             <a:extLst>
               <a:ext uri="{FF2B5EF4-FFF2-40B4-BE49-F238E27FC236}">
-                <a16:creationId xmlns:a16="http://schemas.microsoft.com/office/drawing/2014/main" xmlns="" id="{1833A9CD-9D3C-4E77-BBE9-FCBD590D33A0}"/>
+                <a16:creationId xmlns:a16="http://schemas.microsoft.com/office/drawing/2014/main" id="{1833A9CD-9D3C-4E77-BBE9-FCBD590D33A0}"/>
               </a:ext>
             </a:extLst>
           </p:cNvPr>
@@ -9094,7 +9200,7 @@
           <p:cNvPr id="47" name="Straight Connector 46">
             <a:extLst>
               <a:ext uri="{FF2B5EF4-FFF2-40B4-BE49-F238E27FC236}">
-                <a16:creationId xmlns:a16="http://schemas.microsoft.com/office/drawing/2014/main" xmlns="" id="{3CCE225C-90DF-4831-BC56-FC60EC845F85}"/>
+                <a16:creationId xmlns:a16="http://schemas.microsoft.com/office/drawing/2014/main" id="{3CCE225C-90DF-4831-BC56-FC60EC845F85}"/>
               </a:ext>
             </a:extLst>
           </p:cNvPr>
@@ -9254,28 +9360,28 @@
                 <a:gridCol w="2628900">
                   <a:extLst>
                     <a:ext uri="{9D8B030D-6E8A-4147-A177-3AD203B41FA5}">
-                      <a16:colId xmlns:a16="http://schemas.microsoft.com/office/drawing/2014/main" xmlns="" val="20000"/>
+                      <a16:colId xmlns:a16="http://schemas.microsoft.com/office/drawing/2014/main" val="20000"/>
                     </a:ext>
                   </a:extLst>
                 </a:gridCol>
                 <a:gridCol w="2628900">
                   <a:extLst>
                     <a:ext uri="{9D8B030D-6E8A-4147-A177-3AD203B41FA5}">
-                      <a16:colId xmlns:a16="http://schemas.microsoft.com/office/drawing/2014/main" xmlns="" val="20001"/>
+                      <a16:colId xmlns:a16="http://schemas.microsoft.com/office/drawing/2014/main" val="20001"/>
                     </a:ext>
                   </a:extLst>
                 </a:gridCol>
                 <a:gridCol w="2628900">
                   <a:extLst>
                     <a:ext uri="{9D8B030D-6E8A-4147-A177-3AD203B41FA5}">
-                      <a16:colId xmlns:a16="http://schemas.microsoft.com/office/drawing/2014/main" xmlns="" val="20002"/>
+                      <a16:colId xmlns:a16="http://schemas.microsoft.com/office/drawing/2014/main" val="20002"/>
                     </a:ext>
                   </a:extLst>
                 </a:gridCol>
                 <a:gridCol w="2628900">
                   <a:extLst>
                     <a:ext uri="{9D8B030D-6E8A-4147-A177-3AD203B41FA5}">
-                      <a16:colId xmlns:a16="http://schemas.microsoft.com/office/drawing/2014/main" xmlns="" val="20003"/>
+                      <a16:colId xmlns:a16="http://schemas.microsoft.com/office/drawing/2014/main" val="20003"/>
                     </a:ext>
                   </a:extLst>
                 </a:gridCol>
@@ -9340,7 +9446,7 @@
                 </a:tc>
                 <a:extLst>
                   <a:ext uri="{0D108BD9-81ED-4DB2-BD59-A6C34878D82A}">
-                    <a16:rowId xmlns:a16="http://schemas.microsoft.com/office/drawing/2014/main" xmlns="" val="10000"/>
+                    <a16:rowId xmlns:a16="http://schemas.microsoft.com/office/drawing/2014/main" val="10000"/>
                   </a:ext>
                 </a:extLst>
               </a:tr>
@@ -9399,7 +9505,7 @@
                 </a:tc>
                 <a:extLst>
                   <a:ext uri="{0D108BD9-81ED-4DB2-BD59-A6C34878D82A}">
-                    <a16:rowId xmlns:a16="http://schemas.microsoft.com/office/drawing/2014/main" xmlns="" val="10001"/>
+                    <a16:rowId xmlns:a16="http://schemas.microsoft.com/office/drawing/2014/main" val="10001"/>
                   </a:ext>
                 </a:extLst>
               </a:tr>
@@ -9462,7 +9568,7 @@
                 </a:tc>
                 <a:extLst>
                   <a:ext uri="{0D108BD9-81ED-4DB2-BD59-A6C34878D82A}">
-                    <a16:rowId xmlns:a16="http://schemas.microsoft.com/office/drawing/2014/main" xmlns="" val="10002"/>
+                    <a16:rowId xmlns:a16="http://schemas.microsoft.com/office/drawing/2014/main" val="10002"/>
                   </a:ext>
                 </a:extLst>
               </a:tr>
@@ -9525,7 +9631,7 @@
                 </a:tc>
                 <a:extLst>
                   <a:ext uri="{0D108BD9-81ED-4DB2-BD59-A6C34878D82A}">
-                    <a16:rowId xmlns:a16="http://schemas.microsoft.com/office/drawing/2014/main" xmlns="" val="10003"/>
+                    <a16:rowId xmlns:a16="http://schemas.microsoft.com/office/drawing/2014/main" val="10003"/>
                   </a:ext>
                 </a:extLst>
               </a:tr>
@@ -9584,7 +9690,7 @@
                 </a:tc>
                 <a:extLst>
                   <a:ext uri="{0D108BD9-81ED-4DB2-BD59-A6C34878D82A}">
-                    <a16:rowId xmlns:a16="http://schemas.microsoft.com/office/drawing/2014/main" xmlns="" val="10004"/>
+                    <a16:rowId xmlns:a16="http://schemas.microsoft.com/office/drawing/2014/main" val="10004"/>
                   </a:ext>
                 </a:extLst>
               </a:tr>
@@ -9643,7 +9749,7 @@
                 </a:tc>
                 <a:extLst>
                   <a:ext uri="{0D108BD9-81ED-4DB2-BD59-A6C34878D82A}">
-                    <a16:rowId xmlns:a16="http://schemas.microsoft.com/office/drawing/2014/main" xmlns="" val="10005"/>
+                    <a16:rowId xmlns:a16="http://schemas.microsoft.com/office/drawing/2014/main" val="10005"/>
                   </a:ext>
                 </a:extLst>
               </a:tr>
@@ -9703,7 +9809,7 @@
                 </a:tc>
                 <a:extLst>
                   <a:ext uri="{0D108BD9-81ED-4DB2-BD59-A6C34878D82A}">
-                    <a16:rowId xmlns:a16="http://schemas.microsoft.com/office/drawing/2014/main" xmlns="" val="10006"/>
+                    <a16:rowId xmlns:a16="http://schemas.microsoft.com/office/drawing/2014/main" val="10006"/>
                   </a:ext>
                 </a:extLst>
               </a:tr>
@@ -9797,28 +9903,28 @@
                 <a:gridCol w="2628900">
                   <a:extLst>
                     <a:ext uri="{9D8B030D-6E8A-4147-A177-3AD203B41FA5}">
-                      <a16:colId xmlns:a16="http://schemas.microsoft.com/office/drawing/2014/main" xmlns="" val="20000"/>
+                      <a16:colId xmlns:a16="http://schemas.microsoft.com/office/drawing/2014/main" val="20000"/>
                     </a:ext>
                   </a:extLst>
                 </a:gridCol>
                 <a:gridCol w="2628900">
                   <a:extLst>
                     <a:ext uri="{9D8B030D-6E8A-4147-A177-3AD203B41FA5}">
-                      <a16:colId xmlns:a16="http://schemas.microsoft.com/office/drawing/2014/main" xmlns="" val="20001"/>
+                      <a16:colId xmlns:a16="http://schemas.microsoft.com/office/drawing/2014/main" val="20001"/>
                     </a:ext>
                   </a:extLst>
                 </a:gridCol>
                 <a:gridCol w="2628900">
                   <a:extLst>
                     <a:ext uri="{9D8B030D-6E8A-4147-A177-3AD203B41FA5}">
-                      <a16:colId xmlns:a16="http://schemas.microsoft.com/office/drawing/2014/main" xmlns="" val="20002"/>
+                      <a16:colId xmlns:a16="http://schemas.microsoft.com/office/drawing/2014/main" val="20002"/>
                     </a:ext>
                   </a:extLst>
                 </a:gridCol>
                 <a:gridCol w="2628900">
                   <a:extLst>
                     <a:ext uri="{9D8B030D-6E8A-4147-A177-3AD203B41FA5}">
-                      <a16:colId xmlns:a16="http://schemas.microsoft.com/office/drawing/2014/main" xmlns="" val="20003"/>
+                      <a16:colId xmlns:a16="http://schemas.microsoft.com/office/drawing/2014/main" val="20003"/>
                     </a:ext>
                   </a:extLst>
                 </a:gridCol>
@@ -9883,7 +9989,7 @@
                 </a:tc>
                 <a:extLst>
                   <a:ext uri="{0D108BD9-81ED-4DB2-BD59-A6C34878D82A}">
-                    <a16:rowId xmlns:a16="http://schemas.microsoft.com/office/drawing/2014/main" xmlns="" val="10000"/>
+                    <a16:rowId xmlns:a16="http://schemas.microsoft.com/office/drawing/2014/main" val="10000"/>
                   </a:ext>
                 </a:extLst>
               </a:tr>
@@ -9946,7 +10052,7 @@
                 </a:tc>
                 <a:extLst>
                   <a:ext uri="{0D108BD9-81ED-4DB2-BD59-A6C34878D82A}">
-                    <a16:rowId xmlns:a16="http://schemas.microsoft.com/office/drawing/2014/main" xmlns="" val="10001"/>
+                    <a16:rowId xmlns:a16="http://schemas.microsoft.com/office/drawing/2014/main" val="10001"/>
                   </a:ext>
                 </a:extLst>
               </a:tr>
@@ -10017,7 +10123,7 @@
                 </a:tc>
                 <a:extLst>
                   <a:ext uri="{0D108BD9-81ED-4DB2-BD59-A6C34878D82A}">
-                    <a16:rowId xmlns:a16="http://schemas.microsoft.com/office/drawing/2014/main" xmlns="" val="10002"/>
+                    <a16:rowId xmlns:a16="http://schemas.microsoft.com/office/drawing/2014/main" val="10002"/>
                   </a:ext>
                 </a:extLst>
               </a:tr>
@@ -10076,7 +10182,7 @@
                 </a:tc>
                 <a:extLst>
                   <a:ext uri="{0D108BD9-81ED-4DB2-BD59-A6C34878D82A}">
-                    <a16:rowId xmlns:a16="http://schemas.microsoft.com/office/drawing/2014/main" xmlns="" val="10003"/>
+                    <a16:rowId xmlns:a16="http://schemas.microsoft.com/office/drawing/2014/main" val="10003"/>
                   </a:ext>
                 </a:extLst>
               </a:tr>
@@ -10147,7 +10253,7 @@
                 </a:tc>
                 <a:extLst>
                   <a:ext uri="{0D108BD9-81ED-4DB2-BD59-A6C34878D82A}">
-                    <a16:rowId xmlns:a16="http://schemas.microsoft.com/office/drawing/2014/main" xmlns="" val="10004"/>
+                    <a16:rowId xmlns:a16="http://schemas.microsoft.com/office/drawing/2014/main" val="10004"/>
                   </a:ext>
                 </a:extLst>
               </a:tr>
@@ -10206,7 +10312,7 @@
                 </a:tc>
                 <a:extLst>
                   <a:ext uri="{0D108BD9-81ED-4DB2-BD59-A6C34878D82A}">
-                    <a16:rowId xmlns:a16="http://schemas.microsoft.com/office/drawing/2014/main" xmlns="" val="10005"/>
+                    <a16:rowId xmlns:a16="http://schemas.microsoft.com/office/drawing/2014/main" val="10005"/>
                   </a:ext>
                 </a:extLst>
               </a:tr>
@@ -10269,7 +10375,7 @@
                 </a:tc>
                 <a:extLst>
                   <a:ext uri="{0D108BD9-81ED-4DB2-BD59-A6C34878D82A}">
-                    <a16:rowId xmlns:a16="http://schemas.microsoft.com/office/drawing/2014/main" xmlns="" val="10006"/>
+                    <a16:rowId xmlns:a16="http://schemas.microsoft.com/office/drawing/2014/main" val="10006"/>
                   </a:ext>
                 </a:extLst>
               </a:tr>
@@ -10329,7 +10435,7 @@
                 </a:tc>
                 <a:extLst>
                   <a:ext uri="{0D108BD9-81ED-4DB2-BD59-A6C34878D82A}">
-                    <a16:rowId xmlns:a16="http://schemas.microsoft.com/office/drawing/2014/main" xmlns="" val="10007"/>
+                    <a16:rowId xmlns:a16="http://schemas.microsoft.com/office/drawing/2014/main" val="10007"/>
                   </a:ext>
                 </a:extLst>
               </a:tr>
@@ -10423,28 +10529,28 @@
                 <a:gridCol w="2628900">
                   <a:extLst>
                     <a:ext uri="{9D8B030D-6E8A-4147-A177-3AD203B41FA5}">
-                      <a16:colId xmlns:a16="http://schemas.microsoft.com/office/drawing/2014/main" xmlns="" val="20000"/>
+                      <a16:colId xmlns:a16="http://schemas.microsoft.com/office/drawing/2014/main" val="20000"/>
                     </a:ext>
                   </a:extLst>
                 </a:gridCol>
                 <a:gridCol w="2628900">
                   <a:extLst>
                     <a:ext uri="{9D8B030D-6E8A-4147-A177-3AD203B41FA5}">
-                      <a16:colId xmlns:a16="http://schemas.microsoft.com/office/drawing/2014/main" xmlns="" val="20001"/>
+                      <a16:colId xmlns:a16="http://schemas.microsoft.com/office/drawing/2014/main" val="20001"/>
                     </a:ext>
                   </a:extLst>
                 </a:gridCol>
                 <a:gridCol w="2628900">
                   <a:extLst>
                     <a:ext uri="{9D8B030D-6E8A-4147-A177-3AD203B41FA5}">
-                      <a16:colId xmlns:a16="http://schemas.microsoft.com/office/drawing/2014/main" xmlns="" val="20002"/>
+                      <a16:colId xmlns:a16="http://schemas.microsoft.com/office/drawing/2014/main" val="20002"/>
                     </a:ext>
                   </a:extLst>
                 </a:gridCol>
                 <a:gridCol w="2628900">
                   <a:extLst>
                     <a:ext uri="{9D8B030D-6E8A-4147-A177-3AD203B41FA5}">
-                      <a16:colId xmlns:a16="http://schemas.microsoft.com/office/drawing/2014/main" xmlns="" val="20003"/>
+                      <a16:colId xmlns:a16="http://schemas.microsoft.com/office/drawing/2014/main" val="20003"/>
                     </a:ext>
                   </a:extLst>
                 </a:gridCol>
@@ -10509,7 +10615,7 @@
                 </a:tc>
                 <a:extLst>
                   <a:ext uri="{0D108BD9-81ED-4DB2-BD59-A6C34878D82A}">
-                    <a16:rowId xmlns:a16="http://schemas.microsoft.com/office/drawing/2014/main" xmlns="" val="10000"/>
+                    <a16:rowId xmlns:a16="http://schemas.microsoft.com/office/drawing/2014/main" val="10000"/>
                   </a:ext>
                 </a:extLst>
               </a:tr>
@@ -10580,7 +10686,7 @@
                 </a:tc>
                 <a:extLst>
                   <a:ext uri="{0D108BD9-81ED-4DB2-BD59-A6C34878D82A}">
-                    <a16:rowId xmlns:a16="http://schemas.microsoft.com/office/drawing/2014/main" xmlns="" val="10001"/>
+                    <a16:rowId xmlns:a16="http://schemas.microsoft.com/office/drawing/2014/main" val="10001"/>
                   </a:ext>
                 </a:extLst>
               </a:tr>
@@ -10651,7 +10757,7 @@
                 </a:tc>
                 <a:extLst>
                   <a:ext uri="{0D108BD9-81ED-4DB2-BD59-A6C34878D82A}">
-                    <a16:rowId xmlns:a16="http://schemas.microsoft.com/office/drawing/2014/main" xmlns="" val="10002"/>
+                    <a16:rowId xmlns:a16="http://schemas.microsoft.com/office/drawing/2014/main" val="10002"/>
                   </a:ext>
                 </a:extLst>
               </a:tr>
@@ -10722,7 +10828,7 @@
                 </a:tc>
                 <a:extLst>
                   <a:ext uri="{0D108BD9-81ED-4DB2-BD59-A6C34878D82A}">
-                    <a16:rowId xmlns:a16="http://schemas.microsoft.com/office/drawing/2014/main" xmlns="" val="10003"/>
+                    <a16:rowId xmlns:a16="http://schemas.microsoft.com/office/drawing/2014/main" val="10003"/>
                   </a:ext>
                 </a:extLst>
               </a:tr>
@@ -10781,7 +10887,7 @@
                 </a:tc>
                 <a:extLst>
                   <a:ext uri="{0D108BD9-81ED-4DB2-BD59-A6C34878D82A}">
-                    <a16:rowId xmlns:a16="http://schemas.microsoft.com/office/drawing/2014/main" xmlns="" val="10004"/>
+                    <a16:rowId xmlns:a16="http://schemas.microsoft.com/office/drawing/2014/main" val="10004"/>
                   </a:ext>
                 </a:extLst>
               </a:tr>
@@ -10840,7 +10946,7 @@
                 </a:tc>
                 <a:extLst>
                   <a:ext uri="{0D108BD9-81ED-4DB2-BD59-A6C34878D82A}">
-                    <a16:rowId xmlns:a16="http://schemas.microsoft.com/office/drawing/2014/main" xmlns="" val="10005"/>
+                    <a16:rowId xmlns:a16="http://schemas.microsoft.com/office/drawing/2014/main" val="10005"/>
                   </a:ext>
                 </a:extLst>
               </a:tr>
@@ -16173,7 +16279,7 @@
   <a:extraClrSchemeLst/>
   <a:extLst>
     <a:ext uri="{05A4C25C-085E-4340-85A3-A5531E510DB2}">
-      <thm15:themeFamily xmlns:thm15="http://schemas.microsoft.com/office/thememl/2012/main" xmlns="" name="Office Theme" id="{62F939B6-93AF-4DB8-9C6B-D6C7DFDC589F}" vid="{4A3C46E8-61CC-4603-A589-7422A47A8E4A}"/>
+      <thm15:themeFamily xmlns:thm15="http://schemas.microsoft.com/office/thememl/2012/main" name="Office Theme" id="{62F939B6-93AF-4DB8-9C6B-D6C7DFDC589F}" vid="{4A3C46E8-61CC-4603-A589-7422A47A8E4A}"/>
     </a:ext>
   </a:extLst>
 </a:theme>

</xml_diff>

<commit_message>
updates to thesis . shifting to final draft
</commit_message>
<xml_diff>
--- a/Documentation/Architecture.pptx
+++ b/Documentation/Architecture.pptx
@@ -17,8 +17,8 @@
     <p:sldId id="262" r:id="rId11"/>
     <p:sldId id="272" r:id="rId12"/>
     <p:sldId id="258" r:id="rId13"/>
-    <p:sldId id="269" r:id="rId14"/>
-    <p:sldId id="271" r:id="rId15"/>
+    <p:sldId id="271" r:id="rId14"/>
+    <p:sldId id="275" r:id="rId15"/>
     <p:sldId id="270" r:id="rId16"/>
     <p:sldId id="257" r:id="rId17"/>
     <p:sldId id="266" r:id="rId18"/>
@@ -124,7 +124,7 @@
   </p:defaultTextStyle>
   <p:extLst>
     <p:ext uri="{EFAFB233-063F-42B5-8137-9DF3F51BA10A}">
-      <p15:sldGuideLst xmlns:p15="http://schemas.microsoft.com/office/powerpoint/2012/main">
+      <p15:sldGuideLst xmlns:p15="http://schemas.microsoft.com/office/powerpoint/2012/main" xmlns="">
         <p15:guide id="1" orient="horz" pos="2160">
           <p15:clr>
             <a:srgbClr val="A4A3A4"/>
@@ -163,7 +163,7 @@
           <p:cNvPr id="2" name="Title 1">
             <a:extLst>
               <a:ext uri="{FF2B5EF4-FFF2-40B4-BE49-F238E27FC236}">
-                <a16:creationId xmlns:a16="http://schemas.microsoft.com/office/drawing/2014/main" id="{0208DEFD-B3C0-4D12-817A-672980A0AB83}"/>
+                <a16:creationId xmlns:a16="http://schemas.microsoft.com/office/drawing/2014/main" xmlns="" id="{0208DEFD-B3C0-4D12-817A-672980A0AB83}"/>
               </a:ext>
             </a:extLst>
           </p:cNvPr>
@@ -200,7 +200,7 @@
           <p:cNvPr id="3" name="Subtitle 2">
             <a:extLst>
               <a:ext uri="{FF2B5EF4-FFF2-40B4-BE49-F238E27FC236}">
-                <a16:creationId xmlns:a16="http://schemas.microsoft.com/office/drawing/2014/main" id="{52F30D22-503B-48B4-86CB-F2B0287B54CC}"/>
+                <a16:creationId xmlns:a16="http://schemas.microsoft.com/office/drawing/2014/main" xmlns="" id="{52F30D22-503B-48B4-86CB-F2B0287B54CC}"/>
               </a:ext>
             </a:extLst>
           </p:cNvPr>
@@ -270,7 +270,7 @@
           <p:cNvPr id="4" name="Date Placeholder 3">
             <a:extLst>
               <a:ext uri="{FF2B5EF4-FFF2-40B4-BE49-F238E27FC236}">
-                <a16:creationId xmlns:a16="http://schemas.microsoft.com/office/drawing/2014/main" id="{E8D6C7CF-C878-4063-8520-28BAE75AD582}"/>
+                <a16:creationId xmlns:a16="http://schemas.microsoft.com/office/drawing/2014/main" xmlns="" id="{E8D6C7CF-C878-4063-8520-28BAE75AD582}"/>
               </a:ext>
             </a:extLst>
           </p:cNvPr>
@@ -288,7 +288,7 @@
           <a:p>
             <a:fld id="{79DE2D3D-0B4E-4DD7-9670-155A46B4C7D3}" type="datetimeFigureOut">
               <a:rPr lang="en-US" smtClean="0"/>
-              <a:t>5/27/2018</a:t>
+              <a:t>6/13/2018</a:t>
             </a:fld>
             <a:endParaRPr lang="en-US"/>
           </a:p>
@@ -299,7 +299,7 @@
           <p:cNvPr id="5" name="Footer Placeholder 4">
             <a:extLst>
               <a:ext uri="{FF2B5EF4-FFF2-40B4-BE49-F238E27FC236}">
-                <a16:creationId xmlns:a16="http://schemas.microsoft.com/office/drawing/2014/main" id="{3405CBA8-3946-4106-B7BE-1A9C679D70B1}"/>
+                <a16:creationId xmlns:a16="http://schemas.microsoft.com/office/drawing/2014/main" xmlns="" id="{3405CBA8-3946-4106-B7BE-1A9C679D70B1}"/>
               </a:ext>
             </a:extLst>
           </p:cNvPr>
@@ -324,7 +324,7 @@
           <p:cNvPr id="6" name="Slide Number Placeholder 5">
             <a:extLst>
               <a:ext uri="{FF2B5EF4-FFF2-40B4-BE49-F238E27FC236}">
-                <a16:creationId xmlns:a16="http://schemas.microsoft.com/office/drawing/2014/main" id="{EA452CDD-AB4C-46BE-AF96-A4F89F5341BB}"/>
+                <a16:creationId xmlns:a16="http://schemas.microsoft.com/office/drawing/2014/main" xmlns="" id="{EA452CDD-AB4C-46BE-AF96-A4F89F5341BB}"/>
               </a:ext>
             </a:extLst>
           </p:cNvPr>
@@ -383,7 +383,7 @@
           <p:cNvPr id="2" name="Title 1">
             <a:extLst>
               <a:ext uri="{FF2B5EF4-FFF2-40B4-BE49-F238E27FC236}">
-                <a16:creationId xmlns:a16="http://schemas.microsoft.com/office/drawing/2014/main" id="{0820BE71-470D-4418-8BBA-56BC87E53E0D}"/>
+                <a16:creationId xmlns:a16="http://schemas.microsoft.com/office/drawing/2014/main" xmlns="" id="{0820BE71-470D-4418-8BBA-56BC87E53E0D}"/>
               </a:ext>
             </a:extLst>
           </p:cNvPr>
@@ -411,7 +411,7 @@
           <p:cNvPr id="3" name="Vertical Text Placeholder 2">
             <a:extLst>
               <a:ext uri="{FF2B5EF4-FFF2-40B4-BE49-F238E27FC236}">
-                <a16:creationId xmlns:a16="http://schemas.microsoft.com/office/drawing/2014/main" id="{1CD458A7-5C48-48B1-8674-1E3B59FF0DBF}"/>
+                <a16:creationId xmlns:a16="http://schemas.microsoft.com/office/drawing/2014/main" xmlns="" id="{1CD458A7-5C48-48B1-8674-1E3B59FF0DBF}"/>
               </a:ext>
             </a:extLst>
           </p:cNvPr>
@@ -468,7 +468,7 @@
           <p:cNvPr id="4" name="Date Placeholder 3">
             <a:extLst>
               <a:ext uri="{FF2B5EF4-FFF2-40B4-BE49-F238E27FC236}">
-                <a16:creationId xmlns:a16="http://schemas.microsoft.com/office/drawing/2014/main" id="{71FF30CF-2DC0-4356-ACC2-DC5857B93045}"/>
+                <a16:creationId xmlns:a16="http://schemas.microsoft.com/office/drawing/2014/main" xmlns="" id="{71FF30CF-2DC0-4356-ACC2-DC5857B93045}"/>
               </a:ext>
             </a:extLst>
           </p:cNvPr>
@@ -486,7 +486,7 @@
           <a:p>
             <a:fld id="{79DE2D3D-0B4E-4DD7-9670-155A46B4C7D3}" type="datetimeFigureOut">
               <a:rPr lang="en-US" smtClean="0"/>
-              <a:t>5/27/2018</a:t>
+              <a:t>6/13/2018</a:t>
             </a:fld>
             <a:endParaRPr lang="en-US"/>
           </a:p>
@@ -497,7 +497,7 @@
           <p:cNvPr id="5" name="Footer Placeholder 4">
             <a:extLst>
               <a:ext uri="{FF2B5EF4-FFF2-40B4-BE49-F238E27FC236}">
-                <a16:creationId xmlns:a16="http://schemas.microsoft.com/office/drawing/2014/main" id="{C64F5D84-1880-4D66-9409-B05042B38277}"/>
+                <a16:creationId xmlns:a16="http://schemas.microsoft.com/office/drawing/2014/main" xmlns="" id="{C64F5D84-1880-4D66-9409-B05042B38277}"/>
               </a:ext>
             </a:extLst>
           </p:cNvPr>
@@ -522,7 +522,7 @@
           <p:cNvPr id="6" name="Slide Number Placeholder 5">
             <a:extLst>
               <a:ext uri="{FF2B5EF4-FFF2-40B4-BE49-F238E27FC236}">
-                <a16:creationId xmlns:a16="http://schemas.microsoft.com/office/drawing/2014/main" id="{6AEA3C71-42CA-4318-8246-5C298A025615}"/>
+                <a16:creationId xmlns:a16="http://schemas.microsoft.com/office/drawing/2014/main" xmlns="" id="{6AEA3C71-42CA-4318-8246-5C298A025615}"/>
               </a:ext>
             </a:extLst>
           </p:cNvPr>
@@ -581,7 +581,7 @@
           <p:cNvPr id="2" name="Vertical Title 1">
             <a:extLst>
               <a:ext uri="{FF2B5EF4-FFF2-40B4-BE49-F238E27FC236}">
-                <a16:creationId xmlns:a16="http://schemas.microsoft.com/office/drawing/2014/main" id="{4FC911C0-596F-406E-89F9-D86536F980CB}"/>
+                <a16:creationId xmlns:a16="http://schemas.microsoft.com/office/drawing/2014/main" xmlns="" id="{4FC911C0-596F-406E-89F9-D86536F980CB}"/>
               </a:ext>
             </a:extLst>
           </p:cNvPr>
@@ -614,7 +614,7 @@
           <p:cNvPr id="3" name="Vertical Text Placeholder 2">
             <a:extLst>
               <a:ext uri="{FF2B5EF4-FFF2-40B4-BE49-F238E27FC236}">
-                <a16:creationId xmlns:a16="http://schemas.microsoft.com/office/drawing/2014/main" id="{D3F5427C-63BC-48E8-9131-FE9C4D5F3036}"/>
+                <a16:creationId xmlns:a16="http://schemas.microsoft.com/office/drawing/2014/main" xmlns="" id="{D3F5427C-63BC-48E8-9131-FE9C4D5F3036}"/>
               </a:ext>
             </a:extLst>
           </p:cNvPr>
@@ -676,7 +676,7 @@
           <p:cNvPr id="4" name="Date Placeholder 3">
             <a:extLst>
               <a:ext uri="{FF2B5EF4-FFF2-40B4-BE49-F238E27FC236}">
-                <a16:creationId xmlns:a16="http://schemas.microsoft.com/office/drawing/2014/main" id="{35036C6B-FB42-4DE3-9515-2C21F01A41B2}"/>
+                <a16:creationId xmlns:a16="http://schemas.microsoft.com/office/drawing/2014/main" xmlns="" id="{35036C6B-FB42-4DE3-9515-2C21F01A41B2}"/>
               </a:ext>
             </a:extLst>
           </p:cNvPr>
@@ -694,7 +694,7 @@
           <a:p>
             <a:fld id="{79DE2D3D-0B4E-4DD7-9670-155A46B4C7D3}" type="datetimeFigureOut">
               <a:rPr lang="en-US" smtClean="0"/>
-              <a:t>5/27/2018</a:t>
+              <a:t>6/13/2018</a:t>
             </a:fld>
             <a:endParaRPr lang="en-US"/>
           </a:p>
@@ -705,7 +705,7 @@
           <p:cNvPr id="5" name="Footer Placeholder 4">
             <a:extLst>
               <a:ext uri="{FF2B5EF4-FFF2-40B4-BE49-F238E27FC236}">
-                <a16:creationId xmlns:a16="http://schemas.microsoft.com/office/drawing/2014/main" id="{EE5F9010-B58A-4E05-80CB-8465A102D5D3}"/>
+                <a16:creationId xmlns:a16="http://schemas.microsoft.com/office/drawing/2014/main" xmlns="" id="{EE5F9010-B58A-4E05-80CB-8465A102D5D3}"/>
               </a:ext>
             </a:extLst>
           </p:cNvPr>
@@ -730,7 +730,7 @@
           <p:cNvPr id="6" name="Slide Number Placeholder 5">
             <a:extLst>
               <a:ext uri="{FF2B5EF4-FFF2-40B4-BE49-F238E27FC236}">
-                <a16:creationId xmlns:a16="http://schemas.microsoft.com/office/drawing/2014/main" id="{8A93244B-0726-4AEF-A9D6-78C169B4EBBC}"/>
+                <a16:creationId xmlns:a16="http://schemas.microsoft.com/office/drawing/2014/main" xmlns="" id="{8A93244B-0726-4AEF-A9D6-78C169B4EBBC}"/>
               </a:ext>
             </a:extLst>
           </p:cNvPr>
@@ -789,7 +789,7 @@
           <p:cNvPr id="2" name="Title 1">
             <a:extLst>
               <a:ext uri="{FF2B5EF4-FFF2-40B4-BE49-F238E27FC236}">
-                <a16:creationId xmlns:a16="http://schemas.microsoft.com/office/drawing/2014/main" id="{E8BD4358-492D-49F4-8353-C46623D4A0DE}"/>
+                <a16:creationId xmlns:a16="http://schemas.microsoft.com/office/drawing/2014/main" xmlns="" id="{E8BD4358-492D-49F4-8353-C46623D4A0DE}"/>
               </a:ext>
             </a:extLst>
           </p:cNvPr>
@@ -817,7 +817,7 @@
           <p:cNvPr id="3" name="Content Placeholder 2">
             <a:extLst>
               <a:ext uri="{FF2B5EF4-FFF2-40B4-BE49-F238E27FC236}">
-                <a16:creationId xmlns:a16="http://schemas.microsoft.com/office/drawing/2014/main" id="{CE882704-3E1B-4A78-A667-7E5E07744BE1}"/>
+                <a16:creationId xmlns:a16="http://schemas.microsoft.com/office/drawing/2014/main" xmlns="" id="{CE882704-3E1B-4A78-A667-7E5E07744BE1}"/>
               </a:ext>
             </a:extLst>
           </p:cNvPr>
@@ -874,7 +874,7 @@
           <p:cNvPr id="4" name="Date Placeholder 3">
             <a:extLst>
               <a:ext uri="{FF2B5EF4-FFF2-40B4-BE49-F238E27FC236}">
-                <a16:creationId xmlns:a16="http://schemas.microsoft.com/office/drawing/2014/main" id="{0D08B253-52A2-4C3D-BF5D-B8E56A1A2E16}"/>
+                <a16:creationId xmlns:a16="http://schemas.microsoft.com/office/drawing/2014/main" xmlns="" id="{0D08B253-52A2-4C3D-BF5D-B8E56A1A2E16}"/>
               </a:ext>
             </a:extLst>
           </p:cNvPr>
@@ -892,7 +892,7 @@
           <a:p>
             <a:fld id="{79DE2D3D-0B4E-4DD7-9670-155A46B4C7D3}" type="datetimeFigureOut">
               <a:rPr lang="en-US" smtClean="0"/>
-              <a:t>5/27/2018</a:t>
+              <a:t>6/13/2018</a:t>
             </a:fld>
             <a:endParaRPr lang="en-US"/>
           </a:p>
@@ -903,7 +903,7 @@
           <p:cNvPr id="5" name="Footer Placeholder 4">
             <a:extLst>
               <a:ext uri="{FF2B5EF4-FFF2-40B4-BE49-F238E27FC236}">
-                <a16:creationId xmlns:a16="http://schemas.microsoft.com/office/drawing/2014/main" id="{F2538AF5-D233-40C7-90BF-D5042A78432D}"/>
+                <a16:creationId xmlns:a16="http://schemas.microsoft.com/office/drawing/2014/main" xmlns="" id="{F2538AF5-D233-40C7-90BF-D5042A78432D}"/>
               </a:ext>
             </a:extLst>
           </p:cNvPr>
@@ -928,7 +928,7 @@
           <p:cNvPr id="6" name="Slide Number Placeholder 5">
             <a:extLst>
               <a:ext uri="{FF2B5EF4-FFF2-40B4-BE49-F238E27FC236}">
-                <a16:creationId xmlns:a16="http://schemas.microsoft.com/office/drawing/2014/main" id="{BBDF52CB-805F-4DFD-8CDA-7B1787FF8EEF}"/>
+                <a16:creationId xmlns:a16="http://schemas.microsoft.com/office/drawing/2014/main" xmlns="" id="{BBDF52CB-805F-4DFD-8CDA-7B1787FF8EEF}"/>
               </a:ext>
             </a:extLst>
           </p:cNvPr>
@@ -987,7 +987,7 @@
           <p:cNvPr id="2" name="Title 1">
             <a:extLst>
               <a:ext uri="{FF2B5EF4-FFF2-40B4-BE49-F238E27FC236}">
-                <a16:creationId xmlns:a16="http://schemas.microsoft.com/office/drawing/2014/main" id="{27D28634-873F-4F1F-A867-4DD9B734A08D}"/>
+                <a16:creationId xmlns:a16="http://schemas.microsoft.com/office/drawing/2014/main" xmlns="" id="{27D28634-873F-4F1F-A867-4DD9B734A08D}"/>
               </a:ext>
             </a:extLst>
           </p:cNvPr>
@@ -1024,7 +1024,7 @@
           <p:cNvPr id="3" name="Text Placeholder 2">
             <a:extLst>
               <a:ext uri="{FF2B5EF4-FFF2-40B4-BE49-F238E27FC236}">
-                <a16:creationId xmlns:a16="http://schemas.microsoft.com/office/drawing/2014/main" id="{1DECB686-6970-4E95-90E6-6FEDEDA473C2}"/>
+                <a16:creationId xmlns:a16="http://schemas.microsoft.com/office/drawing/2014/main" xmlns="" id="{1DECB686-6970-4E95-90E6-6FEDEDA473C2}"/>
               </a:ext>
             </a:extLst>
           </p:cNvPr>
@@ -1149,7 +1149,7 @@
           <p:cNvPr id="4" name="Date Placeholder 3">
             <a:extLst>
               <a:ext uri="{FF2B5EF4-FFF2-40B4-BE49-F238E27FC236}">
-                <a16:creationId xmlns:a16="http://schemas.microsoft.com/office/drawing/2014/main" id="{00FBC595-CBE7-4EA9-A885-EE14A03709FF}"/>
+                <a16:creationId xmlns:a16="http://schemas.microsoft.com/office/drawing/2014/main" xmlns="" id="{00FBC595-CBE7-4EA9-A885-EE14A03709FF}"/>
               </a:ext>
             </a:extLst>
           </p:cNvPr>
@@ -1167,7 +1167,7 @@
           <a:p>
             <a:fld id="{79DE2D3D-0B4E-4DD7-9670-155A46B4C7D3}" type="datetimeFigureOut">
               <a:rPr lang="en-US" smtClean="0"/>
-              <a:t>5/27/2018</a:t>
+              <a:t>6/13/2018</a:t>
             </a:fld>
             <a:endParaRPr lang="en-US"/>
           </a:p>
@@ -1178,7 +1178,7 @@
           <p:cNvPr id="5" name="Footer Placeholder 4">
             <a:extLst>
               <a:ext uri="{FF2B5EF4-FFF2-40B4-BE49-F238E27FC236}">
-                <a16:creationId xmlns:a16="http://schemas.microsoft.com/office/drawing/2014/main" id="{FF14EDF1-B2C2-49FE-9528-7E748E6EA3F6}"/>
+                <a16:creationId xmlns:a16="http://schemas.microsoft.com/office/drawing/2014/main" xmlns="" id="{FF14EDF1-B2C2-49FE-9528-7E748E6EA3F6}"/>
               </a:ext>
             </a:extLst>
           </p:cNvPr>
@@ -1203,7 +1203,7 @@
           <p:cNvPr id="6" name="Slide Number Placeholder 5">
             <a:extLst>
               <a:ext uri="{FF2B5EF4-FFF2-40B4-BE49-F238E27FC236}">
-                <a16:creationId xmlns:a16="http://schemas.microsoft.com/office/drawing/2014/main" id="{820E7B30-794B-44D2-9AF6-8F3EBCC924A1}"/>
+                <a16:creationId xmlns:a16="http://schemas.microsoft.com/office/drawing/2014/main" xmlns="" id="{820E7B30-794B-44D2-9AF6-8F3EBCC924A1}"/>
               </a:ext>
             </a:extLst>
           </p:cNvPr>
@@ -1262,7 +1262,7 @@
           <p:cNvPr id="2" name="Title 1">
             <a:extLst>
               <a:ext uri="{FF2B5EF4-FFF2-40B4-BE49-F238E27FC236}">
-                <a16:creationId xmlns:a16="http://schemas.microsoft.com/office/drawing/2014/main" id="{4D052C3E-728A-4E49-88AF-B7AADC9448DF}"/>
+                <a16:creationId xmlns:a16="http://schemas.microsoft.com/office/drawing/2014/main" xmlns="" id="{4D052C3E-728A-4E49-88AF-B7AADC9448DF}"/>
               </a:ext>
             </a:extLst>
           </p:cNvPr>
@@ -1290,7 +1290,7 @@
           <p:cNvPr id="3" name="Content Placeholder 2">
             <a:extLst>
               <a:ext uri="{FF2B5EF4-FFF2-40B4-BE49-F238E27FC236}">
-                <a16:creationId xmlns:a16="http://schemas.microsoft.com/office/drawing/2014/main" id="{19ABF20A-CEF3-431B-95B1-BC6709015D64}"/>
+                <a16:creationId xmlns:a16="http://schemas.microsoft.com/office/drawing/2014/main" xmlns="" id="{19ABF20A-CEF3-431B-95B1-BC6709015D64}"/>
               </a:ext>
             </a:extLst>
           </p:cNvPr>
@@ -1352,7 +1352,7 @@
           <p:cNvPr id="4" name="Content Placeholder 3">
             <a:extLst>
               <a:ext uri="{FF2B5EF4-FFF2-40B4-BE49-F238E27FC236}">
-                <a16:creationId xmlns:a16="http://schemas.microsoft.com/office/drawing/2014/main" id="{2737B622-ACD2-4627-B8FF-45D35B2633F1}"/>
+                <a16:creationId xmlns:a16="http://schemas.microsoft.com/office/drawing/2014/main" xmlns="" id="{2737B622-ACD2-4627-B8FF-45D35B2633F1}"/>
               </a:ext>
             </a:extLst>
           </p:cNvPr>
@@ -1414,7 +1414,7 @@
           <p:cNvPr id="5" name="Date Placeholder 4">
             <a:extLst>
               <a:ext uri="{FF2B5EF4-FFF2-40B4-BE49-F238E27FC236}">
-                <a16:creationId xmlns:a16="http://schemas.microsoft.com/office/drawing/2014/main" id="{42DDD691-4765-43B5-B9AD-534F1097CD33}"/>
+                <a16:creationId xmlns:a16="http://schemas.microsoft.com/office/drawing/2014/main" xmlns="" id="{42DDD691-4765-43B5-B9AD-534F1097CD33}"/>
               </a:ext>
             </a:extLst>
           </p:cNvPr>
@@ -1432,7 +1432,7 @@
           <a:p>
             <a:fld id="{79DE2D3D-0B4E-4DD7-9670-155A46B4C7D3}" type="datetimeFigureOut">
               <a:rPr lang="en-US" smtClean="0"/>
-              <a:t>5/27/2018</a:t>
+              <a:t>6/13/2018</a:t>
             </a:fld>
             <a:endParaRPr lang="en-US"/>
           </a:p>
@@ -1443,7 +1443,7 @@
           <p:cNvPr id="6" name="Footer Placeholder 5">
             <a:extLst>
               <a:ext uri="{FF2B5EF4-FFF2-40B4-BE49-F238E27FC236}">
-                <a16:creationId xmlns:a16="http://schemas.microsoft.com/office/drawing/2014/main" id="{52530E5C-8595-4F7E-B13E-A3BAFCF64E6D}"/>
+                <a16:creationId xmlns:a16="http://schemas.microsoft.com/office/drawing/2014/main" xmlns="" id="{52530E5C-8595-4F7E-B13E-A3BAFCF64E6D}"/>
               </a:ext>
             </a:extLst>
           </p:cNvPr>
@@ -1468,7 +1468,7 @@
           <p:cNvPr id="7" name="Slide Number Placeholder 6">
             <a:extLst>
               <a:ext uri="{FF2B5EF4-FFF2-40B4-BE49-F238E27FC236}">
-                <a16:creationId xmlns:a16="http://schemas.microsoft.com/office/drawing/2014/main" id="{0DB30A7B-8C52-420F-A1B6-C897CC27AA65}"/>
+                <a16:creationId xmlns:a16="http://schemas.microsoft.com/office/drawing/2014/main" xmlns="" id="{0DB30A7B-8C52-420F-A1B6-C897CC27AA65}"/>
               </a:ext>
             </a:extLst>
           </p:cNvPr>
@@ -1527,7 +1527,7 @@
           <p:cNvPr id="2" name="Title 1">
             <a:extLst>
               <a:ext uri="{FF2B5EF4-FFF2-40B4-BE49-F238E27FC236}">
-                <a16:creationId xmlns:a16="http://schemas.microsoft.com/office/drawing/2014/main" id="{E9AC60E8-9FC1-42DC-8C29-EA7465D837D0}"/>
+                <a16:creationId xmlns:a16="http://schemas.microsoft.com/office/drawing/2014/main" xmlns="" id="{E9AC60E8-9FC1-42DC-8C29-EA7465D837D0}"/>
               </a:ext>
             </a:extLst>
           </p:cNvPr>
@@ -1560,7 +1560,7 @@
           <p:cNvPr id="3" name="Text Placeholder 2">
             <a:extLst>
               <a:ext uri="{FF2B5EF4-FFF2-40B4-BE49-F238E27FC236}">
-                <a16:creationId xmlns:a16="http://schemas.microsoft.com/office/drawing/2014/main" id="{0C818A30-7FA1-4337-8120-C200A7442D75}"/>
+                <a16:creationId xmlns:a16="http://schemas.microsoft.com/office/drawing/2014/main" xmlns="" id="{0C818A30-7FA1-4337-8120-C200A7442D75}"/>
               </a:ext>
             </a:extLst>
           </p:cNvPr>
@@ -1631,7 +1631,7 @@
           <p:cNvPr id="4" name="Content Placeholder 3">
             <a:extLst>
               <a:ext uri="{FF2B5EF4-FFF2-40B4-BE49-F238E27FC236}">
-                <a16:creationId xmlns:a16="http://schemas.microsoft.com/office/drawing/2014/main" id="{9CE84CA1-F2AA-4CF1-AFDA-45D282715E23}"/>
+                <a16:creationId xmlns:a16="http://schemas.microsoft.com/office/drawing/2014/main" xmlns="" id="{9CE84CA1-F2AA-4CF1-AFDA-45D282715E23}"/>
               </a:ext>
             </a:extLst>
           </p:cNvPr>
@@ -1693,7 +1693,7 @@
           <p:cNvPr id="5" name="Text Placeholder 4">
             <a:extLst>
               <a:ext uri="{FF2B5EF4-FFF2-40B4-BE49-F238E27FC236}">
-                <a16:creationId xmlns:a16="http://schemas.microsoft.com/office/drawing/2014/main" id="{DBA3B6D1-4E3D-4DD3-9BB7-54C5D52214F5}"/>
+                <a16:creationId xmlns:a16="http://schemas.microsoft.com/office/drawing/2014/main" xmlns="" id="{DBA3B6D1-4E3D-4DD3-9BB7-54C5D52214F5}"/>
               </a:ext>
             </a:extLst>
           </p:cNvPr>
@@ -1764,7 +1764,7 @@
           <p:cNvPr id="6" name="Content Placeholder 5">
             <a:extLst>
               <a:ext uri="{FF2B5EF4-FFF2-40B4-BE49-F238E27FC236}">
-                <a16:creationId xmlns:a16="http://schemas.microsoft.com/office/drawing/2014/main" id="{E542C983-E152-4F06-8C96-7E07D0F125CD}"/>
+                <a16:creationId xmlns:a16="http://schemas.microsoft.com/office/drawing/2014/main" xmlns="" id="{E542C983-E152-4F06-8C96-7E07D0F125CD}"/>
               </a:ext>
             </a:extLst>
           </p:cNvPr>
@@ -1826,7 +1826,7 @@
           <p:cNvPr id="7" name="Date Placeholder 6">
             <a:extLst>
               <a:ext uri="{FF2B5EF4-FFF2-40B4-BE49-F238E27FC236}">
-                <a16:creationId xmlns:a16="http://schemas.microsoft.com/office/drawing/2014/main" id="{8E601059-966A-4AC8-B04D-E3BDB85FC4E2}"/>
+                <a16:creationId xmlns:a16="http://schemas.microsoft.com/office/drawing/2014/main" xmlns="" id="{8E601059-966A-4AC8-B04D-E3BDB85FC4E2}"/>
               </a:ext>
             </a:extLst>
           </p:cNvPr>
@@ -1844,7 +1844,7 @@
           <a:p>
             <a:fld id="{79DE2D3D-0B4E-4DD7-9670-155A46B4C7D3}" type="datetimeFigureOut">
               <a:rPr lang="en-US" smtClean="0"/>
-              <a:t>5/27/2018</a:t>
+              <a:t>6/13/2018</a:t>
             </a:fld>
             <a:endParaRPr lang="en-US"/>
           </a:p>
@@ -1855,7 +1855,7 @@
           <p:cNvPr id="8" name="Footer Placeholder 7">
             <a:extLst>
               <a:ext uri="{FF2B5EF4-FFF2-40B4-BE49-F238E27FC236}">
-                <a16:creationId xmlns:a16="http://schemas.microsoft.com/office/drawing/2014/main" id="{79DD1AA8-075F-40C9-9873-85A9A2D4DC98}"/>
+                <a16:creationId xmlns:a16="http://schemas.microsoft.com/office/drawing/2014/main" xmlns="" id="{79DD1AA8-075F-40C9-9873-85A9A2D4DC98}"/>
               </a:ext>
             </a:extLst>
           </p:cNvPr>
@@ -1880,7 +1880,7 @@
           <p:cNvPr id="9" name="Slide Number Placeholder 8">
             <a:extLst>
               <a:ext uri="{FF2B5EF4-FFF2-40B4-BE49-F238E27FC236}">
-                <a16:creationId xmlns:a16="http://schemas.microsoft.com/office/drawing/2014/main" id="{C179C8F9-9FC6-415C-BF20-26F3308511CF}"/>
+                <a16:creationId xmlns:a16="http://schemas.microsoft.com/office/drawing/2014/main" xmlns="" id="{C179C8F9-9FC6-415C-BF20-26F3308511CF}"/>
               </a:ext>
             </a:extLst>
           </p:cNvPr>
@@ -1939,7 +1939,7 @@
           <p:cNvPr id="2" name="Title 1">
             <a:extLst>
               <a:ext uri="{FF2B5EF4-FFF2-40B4-BE49-F238E27FC236}">
-                <a16:creationId xmlns:a16="http://schemas.microsoft.com/office/drawing/2014/main" id="{4C9581B1-453E-4AAD-9D12-D5CD21C43E28}"/>
+                <a16:creationId xmlns:a16="http://schemas.microsoft.com/office/drawing/2014/main" xmlns="" id="{4C9581B1-453E-4AAD-9D12-D5CD21C43E28}"/>
               </a:ext>
             </a:extLst>
           </p:cNvPr>
@@ -1967,7 +1967,7 @@
           <p:cNvPr id="3" name="Date Placeholder 2">
             <a:extLst>
               <a:ext uri="{FF2B5EF4-FFF2-40B4-BE49-F238E27FC236}">
-                <a16:creationId xmlns:a16="http://schemas.microsoft.com/office/drawing/2014/main" id="{19DECDA6-0FFD-4C5B-B7E6-7249068A0385}"/>
+                <a16:creationId xmlns:a16="http://schemas.microsoft.com/office/drawing/2014/main" xmlns="" id="{19DECDA6-0FFD-4C5B-B7E6-7249068A0385}"/>
               </a:ext>
             </a:extLst>
           </p:cNvPr>
@@ -1985,7 +1985,7 @@
           <a:p>
             <a:fld id="{79DE2D3D-0B4E-4DD7-9670-155A46B4C7D3}" type="datetimeFigureOut">
               <a:rPr lang="en-US" smtClean="0"/>
-              <a:t>5/27/2018</a:t>
+              <a:t>6/13/2018</a:t>
             </a:fld>
             <a:endParaRPr lang="en-US"/>
           </a:p>
@@ -1996,7 +1996,7 @@
           <p:cNvPr id="4" name="Footer Placeholder 3">
             <a:extLst>
               <a:ext uri="{FF2B5EF4-FFF2-40B4-BE49-F238E27FC236}">
-                <a16:creationId xmlns:a16="http://schemas.microsoft.com/office/drawing/2014/main" id="{51FB464C-C0C4-4823-A3E7-091DC998738E}"/>
+                <a16:creationId xmlns:a16="http://schemas.microsoft.com/office/drawing/2014/main" xmlns="" id="{51FB464C-C0C4-4823-A3E7-091DC998738E}"/>
               </a:ext>
             </a:extLst>
           </p:cNvPr>
@@ -2021,7 +2021,7 @@
           <p:cNvPr id="5" name="Slide Number Placeholder 4">
             <a:extLst>
               <a:ext uri="{FF2B5EF4-FFF2-40B4-BE49-F238E27FC236}">
-                <a16:creationId xmlns:a16="http://schemas.microsoft.com/office/drawing/2014/main" id="{D0716546-9DB4-4D0D-B586-6AC1ECAE4C07}"/>
+                <a16:creationId xmlns:a16="http://schemas.microsoft.com/office/drawing/2014/main" xmlns="" id="{D0716546-9DB4-4D0D-B586-6AC1ECAE4C07}"/>
               </a:ext>
             </a:extLst>
           </p:cNvPr>
@@ -2080,7 +2080,7 @@
           <p:cNvPr id="2" name="Date Placeholder 1">
             <a:extLst>
               <a:ext uri="{FF2B5EF4-FFF2-40B4-BE49-F238E27FC236}">
-                <a16:creationId xmlns:a16="http://schemas.microsoft.com/office/drawing/2014/main" id="{BA814E6B-A29F-4AE7-9237-6DF2A3ABBA33}"/>
+                <a16:creationId xmlns:a16="http://schemas.microsoft.com/office/drawing/2014/main" xmlns="" id="{BA814E6B-A29F-4AE7-9237-6DF2A3ABBA33}"/>
               </a:ext>
             </a:extLst>
           </p:cNvPr>
@@ -2098,7 +2098,7 @@
           <a:p>
             <a:fld id="{79DE2D3D-0B4E-4DD7-9670-155A46B4C7D3}" type="datetimeFigureOut">
               <a:rPr lang="en-US" smtClean="0"/>
-              <a:t>5/27/2018</a:t>
+              <a:t>6/13/2018</a:t>
             </a:fld>
             <a:endParaRPr lang="en-US"/>
           </a:p>
@@ -2109,7 +2109,7 @@
           <p:cNvPr id="3" name="Footer Placeholder 2">
             <a:extLst>
               <a:ext uri="{FF2B5EF4-FFF2-40B4-BE49-F238E27FC236}">
-                <a16:creationId xmlns:a16="http://schemas.microsoft.com/office/drawing/2014/main" id="{09BA391C-6DAE-4B53-B555-6CD4D8F9D2CB}"/>
+                <a16:creationId xmlns:a16="http://schemas.microsoft.com/office/drawing/2014/main" xmlns="" id="{09BA391C-6DAE-4B53-B555-6CD4D8F9D2CB}"/>
               </a:ext>
             </a:extLst>
           </p:cNvPr>
@@ -2134,7 +2134,7 @@
           <p:cNvPr id="4" name="Slide Number Placeholder 3">
             <a:extLst>
               <a:ext uri="{FF2B5EF4-FFF2-40B4-BE49-F238E27FC236}">
-                <a16:creationId xmlns:a16="http://schemas.microsoft.com/office/drawing/2014/main" id="{F625249E-BF43-4AB8-A5F0-A41CC1492ED3}"/>
+                <a16:creationId xmlns:a16="http://schemas.microsoft.com/office/drawing/2014/main" xmlns="" id="{F625249E-BF43-4AB8-A5F0-A41CC1492ED3}"/>
               </a:ext>
             </a:extLst>
           </p:cNvPr>
@@ -2193,7 +2193,7 @@
           <p:cNvPr id="2" name="Title 1">
             <a:extLst>
               <a:ext uri="{FF2B5EF4-FFF2-40B4-BE49-F238E27FC236}">
-                <a16:creationId xmlns:a16="http://schemas.microsoft.com/office/drawing/2014/main" id="{076ABC1E-EE30-473D-9843-97DA2B713DCD}"/>
+                <a16:creationId xmlns:a16="http://schemas.microsoft.com/office/drawing/2014/main" xmlns="" id="{076ABC1E-EE30-473D-9843-97DA2B713DCD}"/>
               </a:ext>
             </a:extLst>
           </p:cNvPr>
@@ -2230,7 +2230,7 @@
           <p:cNvPr id="3" name="Content Placeholder 2">
             <a:extLst>
               <a:ext uri="{FF2B5EF4-FFF2-40B4-BE49-F238E27FC236}">
-                <a16:creationId xmlns:a16="http://schemas.microsoft.com/office/drawing/2014/main" id="{BC46249D-CC42-436D-BE0D-5625D0485C24}"/>
+                <a16:creationId xmlns:a16="http://schemas.microsoft.com/office/drawing/2014/main" xmlns="" id="{BC46249D-CC42-436D-BE0D-5625D0485C24}"/>
               </a:ext>
             </a:extLst>
           </p:cNvPr>
@@ -2320,7 +2320,7 @@
           <p:cNvPr id="4" name="Text Placeholder 3">
             <a:extLst>
               <a:ext uri="{FF2B5EF4-FFF2-40B4-BE49-F238E27FC236}">
-                <a16:creationId xmlns:a16="http://schemas.microsoft.com/office/drawing/2014/main" id="{BB8F32DE-2D90-4225-849F-71A8E16108A2}"/>
+                <a16:creationId xmlns:a16="http://schemas.microsoft.com/office/drawing/2014/main" xmlns="" id="{BB8F32DE-2D90-4225-849F-71A8E16108A2}"/>
               </a:ext>
             </a:extLst>
           </p:cNvPr>
@@ -2391,7 +2391,7 @@
           <p:cNvPr id="5" name="Date Placeholder 4">
             <a:extLst>
               <a:ext uri="{FF2B5EF4-FFF2-40B4-BE49-F238E27FC236}">
-                <a16:creationId xmlns:a16="http://schemas.microsoft.com/office/drawing/2014/main" id="{81FDD5F9-4B94-4BF2-986F-B735C9B79581}"/>
+                <a16:creationId xmlns:a16="http://schemas.microsoft.com/office/drawing/2014/main" xmlns="" id="{81FDD5F9-4B94-4BF2-986F-B735C9B79581}"/>
               </a:ext>
             </a:extLst>
           </p:cNvPr>
@@ -2409,7 +2409,7 @@
           <a:p>
             <a:fld id="{79DE2D3D-0B4E-4DD7-9670-155A46B4C7D3}" type="datetimeFigureOut">
               <a:rPr lang="en-US" smtClean="0"/>
-              <a:t>5/27/2018</a:t>
+              <a:t>6/13/2018</a:t>
             </a:fld>
             <a:endParaRPr lang="en-US"/>
           </a:p>
@@ -2420,7 +2420,7 @@
           <p:cNvPr id="6" name="Footer Placeholder 5">
             <a:extLst>
               <a:ext uri="{FF2B5EF4-FFF2-40B4-BE49-F238E27FC236}">
-                <a16:creationId xmlns:a16="http://schemas.microsoft.com/office/drawing/2014/main" id="{D0408356-96AD-466E-AC30-0DCC886CEFA5}"/>
+                <a16:creationId xmlns:a16="http://schemas.microsoft.com/office/drawing/2014/main" xmlns="" id="{D0408356-96AD-466E-AC30-0DCC886CEFA5}"/>
               </a:ext>
             </a:extLst>
           </p:cNvPr>
@@ -2445,7 +2445,7 @@
           <p:cNvPr id="7" name="Slide Number Placeholder 6">
             <a:extLst>
               <a:ext uri="{FF2B5EF4-FFF2-40B4-BE49-F238E27FC236}">
-                <a16:creationId xmlns:a16="http://schemas.microsoft.com/office/drawing/2014/main" id="{68F5E96F-D5B9-4F8B-A9CC-7427EAB39A92}"/>
+                <a16:creationId xmlns:a16="http://schemas.microsoft.com/office/drawing/2014/main" xmlns="" id="{68F5E96F-D5B9-4F8B-A9CC-7427EAB39A92}"/>
               </a:ext>
             </a:extLst>
           </p:cNvPr>
@@ -2504,7 +2504,7 @@
           <p:cNvPr id="2" name="Title 1">
             <a:extLst>
               <a:ext uri="{FF2B5EF4-FFF2-40B4-BE49-F238E27FC236}">
-                <a16:creationId xmlns:a16="http://schemas.microsoft.com/office/drawing/2014/main" id="{9C0F5112-278F-44E4-87C0-4C2F8A651829}"/>
+                <a16:creationId xmlns:a16="http://schemas.microsoft.com/office/drawing/2014/main" xmlns="" id="{9C0F5112-278F-44E4-87C0-4C2F8A651829}"/>
               </a:ext>
             </a:extLst>
           </p:cNvPr>
@@ -2541,7 +2541,7 @@
           <p:cNvPr id="3" name="Picture Placeholder 2">
             <a:extLst>
               <a:ext uri="{FF2B5EF4-FFF2-40B4-BE49-F238E27FC236}">
-                <a16:creationId xmlns:a16="http://schemas.microsoft.com/office/drawing/2014/main" id="{05EA54BB-79CA-4CC9-98CE-E5D860A33729}"/>
+                <a16:creationId xmlns:a16="http://schemas.microsoft.com/office/drawing/2014/main" xmlns="" id="{05EA54BB-79CA-4CC9-98CE-E5D860A33729}"/>
               </a:ext>
             </a:extLst>
           </p:cNvPr>
@@ -2608,7 +2608,7 @@
           <p:cNvPr id="4" name="Text Placeholder 3">
             <a:extLst>
               <a:ext uri="{FF2B5EF4-FFF2-40B4-BE49-F238E27FC236}">
-                <a16:creationId xmlns:a16="http://schemas.microsoft.com/office/drawing/2014/main" id="{BE5F85B6-2DFC-4F12-B91A-B047130C2235}"/>
+                <a16:creationId xmlns:a16="http://schemas.microsoft.com/office/drawing/2014/main" xmlns="" id="{BE5F85B6-2DFC-4F12-B91A-B047130C2235}"/>
               </a:ext>
             </a:extLst>
           </p:cNvPr>
@@ -2679,7 +2679,7 @@
           <p:cNvPr id="5" name="Date Placeholder 4">
             <a:extLst>
               <a:ext uri="{FF2B5EF4-FFF2-40B4-BE49-F238E27FC236}">
-                <a16:creationId xmlns:a16="http://schemas.microsoft.com/office/drawing/2014/main" id="{172D123F-5801-4632-89EF-A7048EAB1264}"/>
+                <a16:creationId xmlns:a16="http://schemas.microsoft.com/office/drawing/2014/main" xmlns="" id="{172D123F-5801-4632-89EF-A7048EAB1264}"/>
               </a:ext>
             </a:extLst>
           </p:cNvPr>
@@ -2697,7 +2697,7 @@
           <a:p>
             <a:fld id="{79DE2D3D-0B4E-4DD7-9670-155A46B4C7D3}" type="datetimeFigureOut">
               <a:rPr lang="en-US" smtClean="0"/>
-              <a:t>5/27/2018</a:t>
+              <a:t>6/13/2018</a:t>
             </a:fld>
             <a:endParaRPr lang="en-US"/>
           </a:p>
@@ -2708,7 +2708,7 @@
           <p:cNvPr id="6" name="Footer Placeholder 5">
             <a:extLst>
               <a:ext uri="{FF2B5EF4-FFF2-40B4-BE49-F238E27FC236}">
-                <a16:creationId xmlns:a16="http://schemas.microsoft.com/office/drawing/2014/main" id="{5393FCEA-51F8-4D51-BA8E-D42F966A2BF0}"/>
+                <a16:creationId xmlns:a16="http://schemas.microsoft.com/office/drawing/2014/main" xmlns="" id="{5393FCEA-51F8-4D51-BA8E-D42F966A2BF0}"/>
               </a:ext>
             </a:extLst>
           </p:cNvPr>
@@ -2733,7 +2733,7 @@
           <p:cNvPr id="7" name="Slide Number Placeholder 6">
             <a:extLst>
               <a:ext uri="{FF2B5EF4-FFF2-40B4-BE49-F238E27FC236}">
-                <a16:creationId xmlns:a16="http://schemas.microsoft.com/office/drawing/2014/main" id="{A0B91011-BCB3-49E8-B94D-89877DAB044B}"/>
+                <a16:creationId xmlns:a16="http://schemas.microsoft.com/office/drawing/2014/main" xmlns="" id="{A0B91011-BCB3-49E8-B94D-89877DAB044B}"/>
               </a:ext>
             </a:extLst>
           </p:cNvPr>
@@ -2797,7 +2797,7 @@
           <p:cNvPr id="2" name="Title Placeholder 1">
             <a:extLst>
               <a:ext uri="{FF2B5EF4-FFF2-40B4-BE49-F238E27FC236}">
-                <a16:creationId xmlns:a16="http://schemas.microsoft.com/office/drawing/2014/main" id="{5BBD9B47-EC09-49CB-91C3-4FF23C8DFDFA}"/>
+                <a16:creationId xmlns:a16="http://schemas.microsoft.com/office/drawing/2014/main" xmlns="" id="{5BBD9B47-EC09-49CB-91C3-4FF23C8DFDFA}"/>
               </a:ext>
             </a:extLst>
           </p:cNvPr>
@@ -2835,7 +2835,7 @@
           <p:cNvPr id="3" name="Text Placeholder 2">
             <a:extLst>
               <a:ext uri="{FF2B5EF4-FFF2-40B4-BE49-F238E27FC236}">
-                <a16:creationId xmlns:a16="http://schemas.microsoft.com/office/drawing/2014/main" id="{513AA069-5DC8-4F13-BF00-1DDB9CFEBB93}"/>
+                <a16:creationId xmlns:a16="http://schemas.microsoft.com/office/drawing/2014/main" xmlns="" id="{513AA069-5DC8-4F13-BF00-1DDB9CFEBB93}"/>
               </a:ext>
             </a:extLst>
           </p:cNvPr>
@@ -2902,7 +2902,7 @@
           <p:cNvPr id="4" name="Date Placeholder 3">
             <a:extLst>
               <a:ext uri="{FF2B5EF4-FFF2-40B4-BE49-F238E27FC236}">
-                <a16:creationId xmlns:a16="http://schemas.microsoft.com/office/drawing/2014/main" id="{1B988FF8-EF37-4E2D-8D06-B56DC9727511}"/>
+                <a16:creationId xmlns:a16="http://schemas.microsoft.com/office/drawing/2014/main" xmlns="" id="{1B988FF8-EF37-4E2D-8D06-B56DC9727511}"/>
               </a:ext>
             </a:extLst>
           </p:cNvPr>
@@ -2938,7 +2938,7 @@
           <a:p>
             <a:fld id="{79DE2D3D-0B4E-4DD7-9670-155A46B4C7D3}" type="datetimeFigureOut">
               <a:rPr lang="en-US" smtClean="0"/>
-              <a:t>5/27/2018</a:t>
+              <a:t>6/13/2018</a:t>
             </a:fld>
             <a:endParaRPr lang="en-US"/>
           </a:p>
@@ -2949,7 +2949,7 @@
           <p:cNvPr id="5" name="Footer Placeholder 4">
             <a:extLst>
               <a:ext uri="{FF2B5EF4-FFF2-40B4-BE49-F238E27FC236}">
-                <a16:creationId xmlns:a16="http://schemas.microsoft.com/office/drawing/2014/main" id="{83212C0E-B2E5-4E9B-8071-67611BC3B695}"/>
+                <a16:creationId xmlns:a16="http://schemas.microsoft.com/office/drawing/2014/main" xmlns="" id="{83212C0E-B2E5-4E9B-8071-67611BC3B695}"/>
               </a:ext>
             </a:extLst>
           </p:cNvPr>
@@ -2992,7 +2992,7 @@
           <p:cNvPr id="6" name="Slide Number Placeholder 5">
             <a:extLst>
               <a:ext uri="{FF2B5EF4-FFF2-40B4-BE49-F238E27FC236}">
-                <a16:creationId xmlns:a16="http://schemas.microsoft.com/office/drawing/2014/main" id="{FEDCB7D4-E33C-461E-9027-986C5814089F}"/>
+                <a16:creationId xmlns:a16="http://schemas.microsoft.com/office/drawing/2014/main" xmlns="" id="{FEDCB7D4-E33C-461E-9027-986C5814089F}"/>
               </a:ext>
             </a:extLst>
           </p:cNvPr>
@@ -3360,7 +3360,7 @@
           <p:cNvPr id="2" name="Title 1">
             <a:extLst>
               <a:ext uri="{FF2B5EF4-FFF2-40B4-BE49-F238E27FC236}">
-                <a16:creationId xmlns:a16="http://schemas.microsoft.com/office/drawing/2014/main" id="{139BAF7C-DB50-417E-B55C-81858A77D703}"/>
+                <a16:creationId xmlns:a16="http://schemas.microsoft.com/office/drawing/2014/main" xmlns="" id="{139BAF7C-DB50-417E-B55C-81858A77D703}"/>
               </a:ext>
             </a:extLst>
           </p:cNvPr>
@@ -3388,7 +3388,7 @@
           <p:cNvPr id="3" name="Subtitle 2">
             <a:extLst>
               <a:ext uri="{FF2B5EF4-FFF2-40B4-BE49-F238E27FC236}">
-                <a16:creationId xmlns:a16="http://schemas.microsoft.com/office/drawing/2014/main" id="{CE9D560A-2AB0-4D6D-83D1-F0F54D6A5F58}"/>
+                <a16:creationId xmlns:a16="http://schemas.microsoft.com/office/drawing/2014/main" xmlns="" id="{CE9D560A-2AB0-4D6D-83D1-F0F54D6A5F58}"/>
               </a:ext>
             </a:extLst>
           </p:cNvPr>
@@ -4152,7 +4152,7 @@
           <p:cNvPr id="2" name="Title 1">
             <a:extLst>
               <a:ext uri="{FF2B5EF4-FFF2-40B4-BE49-F238E27FC236}">
-                <a16:creationId xmlns:a16="http://schemas.microsoft.com/office/drawing/2014/main" id="{5ADC56FF-B4DC-4FF6-8C43-32D010FD16AF}"/>
+                <a16:creationId xmlns:a16="http://schemas.microsoft.com/office/drawing/2014/main" xmlns="" id="{5ADC56FF-B4DC-4FF6-8C43-32D010FD16AF}"/>
               </a:ext>
             </a:extLst>
           </p:cNvPr>
@@ -4538,7 +4538,7 @@
           <p:cNvPr id="50" name="Group 49">
             <a:extLst>
               <a:ext uri="{FF2B5EF4-FFF2-40B4-BE49-F238E27FC236}">
-                <a16:creationId xmlns:a16="http://schemas.microsoft.com/office/drawing/2014/main" id="{A51CCD7C-E0FB-4561-9ECB-21FA3B0B6011}"/>
+                <a16:creationId xmlns:a16="http://schemas.microsoft.com/office/drawing/2014/main" xmlns="" id="{A51CCD7C-E0FB-4561-9ECB-21FA3B0B6011}"/>
               </a:ext>
             </a:extLst>
           </p:cNvPr>
@@ -4558,7 +4558,7 @@
             <p:cNvPr id="47" name="Picture 46">
               <a:extLst>
                 <a:ext uri="{FF2B5EF4-FFF2-40B4-BE49-F238E27FC236}">
-                  <a16:creationId xmlns:a16="http://schemas.microsoft.com/office/drawing/2014/main" id="{01223F7B-10CE-4717-82FD-54FCB975B5B3}"/>
+                  <a16:creationId xmlns:a16="http://schemas.microsoft.com/office/drawing/2014/main" xmlns="" id="{01223F7B-10CE-4717-82FD-54FCB975B5B3}"/>
                 </a:ext>
               </a:extLst>
             </p:cNvPr>
@@ -4588,7 +4588,7 @@
             <p:cNvPr id="49" name="Rectangle 48">
               <a:extLst>
                 <a:ext uri="{FF2B5EF4-FFF2-40B4-BE49-F238E27FC236}">
-                  <a16:creationId xmlns:a16="http://schemas.microsoft.com/office/drawing/2014/main" id="{D108285C-25BE-499E-9547-DE13717298E7}"/>
+                  <a16:creationId xmlns:a16="http://schemas.microsoft.com/office/drawing/2014/main" xmlns="" id="{D108285C-25BE-499E-9547-DE13717298E7}"/>
                 </a:ext>
               </a:extLst>
             </p:cNvPr>
@@ -4624,7 +4624,7 @@
           <p:cNvPr id="52" name="Oval 51">
             <a:extLst>
               <a:ext uri="{FF2B5EF4-FFF2-40B4-BE49-F238E27FC236}">
-                <a16:creationId xmlns:a16="http://schemas.microsoft.com/office/drawing/2014/main" id="{E0BF3096-B959-4382-A27C-4DDB205490B2}"/>
+                <a16:creationId xmlns:a16="http://schemas.microsoft.com/office/drawing/2014/main" xmlns="" id="{E0BF3096-B959-4382-A27C-4DDB205490B2}"/>
               </a:ext>
             </a:extLst>
           </p:cNvPr>
@@ -4673,7 +4673,7 @@
           <p:cNvPr id="53" name="Oval 52">
             <a:extLst>
               <a:ext uri="{FF2B5EF4-FFF2-40B4-BE49-F238E27FC236}">
-                <a16:creationId xmlns:a16="http://schemas.microsoft.com/office/drawing/2014/main" id="{FDC57CFA-8D25-4707-B3DB-E4E532673A0A}"/>
+                <a16:creationId xmlns:a16="http://schemas.microsoft.com/office/drawing/2014/main" xmlns="" id="{FDC57CFA-8D25-4707-B3DB-E4E532673A0A}"/>
               </a:ext>
             </a:extLst>
           </p:cNvPr>
@@ -4722,7 +4722,7 @@
           <p:cNvPr id="54" name="Oval 53">
             <a:extLst>
               <a:ext uri="{FF2B5EF4-FFF2-40B4-BE49-F238E27FC236}">
-                <a16:creationId xmlns:a16="http://schemas.microsoft.com/office/drawing/2014/main" id="{345DB287-9B46-4514-AC05-9E3901CC17ED}"/>
+                <a16:creationId xmlns:a16="http://schemas.microsoft.com/office/drawing/2014/main" xmlns="" id="{345DB287-9B46-4514-AC05-9E3901CC17ED}"/>
               </a:ext>
             </a:extLst>
           </p:cNvPr>
@@ -4771,7 +4771,7 @@
           <p:cNvPr id="66" name="Straight Arrow Connector 33">
             <a:extLst>
               <a:ext uri="{FF2B5EF4-FFF2-40B4-BE49-F238E27FC236}">
-                <a16:creationId xmlns:a16="http://schemas.microsoft.com/office/drawing/2014/main" id="{870FF5B4-0094-43D7-B747-D0F9EC5A425A}"/>
+                <a16:creationId xmlns:a16="http://schemas.microsoft.com/office/drawing/2014/main" xmlns="" id="{870FF5B4-0094-43D7-B747-D0F9EC5A425A}"/>
               </a:ext>
             </a:extLst>
           </p:cNvPr>
@@ -4817,7 +4817,7 @@
           <p:cNvPr id="74" name="Straight Arrow Connector 73">
             <a:extLst>
               <a:ext uri="{FF2B5EF4-FFF2-40B4-BE49-F238E27FC236}">
-                <a16:creationId xmlns:a16="http://schemas.microsoft.com/office/drawing/2014/main" id="{25DC6E09-766C-435A-9947-62A270F44579}"/>
+                <a16:creationId xmlns:a16="http://schemas.microsoft.com/office/drawing/2014/main" xmlns="" id="{25DC6E09-766C-435A-9947-62A270F44579}"/>
               </a:ext>
             </a:extLst>
           </p:cNvPr>
@@ -4865,7 +4865,7 @@
           <p:cNvPr id="83" name="Straight Arrow Connector 82">
             <a:extLst>
               <a:ext uri="{FF2B5EF4-FFF2-40B4-BE49-F238E27FC236}">
-                <a16:creationId xmlns:a16="http://schemas.microsoft.com/office/drawing/2014/main" id="{7673F6C5-5DA1-42DB-9BD1-DB5C15D667E7}"/>
+                <a16:creationId xmlns:a16="http://schemas.microsoft.com/office/drawing/2014/main" xmlns="" id="{7673F6C5-5DA1-42DB-9BD1-DB5C15D667E7}"/>
               </a:ext>
             </a:extLst>
           </p:cNvPr>
@@ -4913,7 +4913,7 @@
           <p:cNvPr id="32" name="Rectangle 31">
             <a:extLst>
               <a:ext uri="{FF2B5EF4-FFF2-40B4-BE49-F238E27FC236}">
-                <a16:creationId xmlns:a16="http://schemas.microsoft.com/office/drawing/2014/main" id="{27279B7F-4482-48C1-9E95-EBD3B3184E42}"/>
+                <a16:creationId xmlns:a16="http://schemas.microsoft.com/office/drawing/2014/main" xmlns="" id="{27279B7F-4482-48C1-9E95-EBD3B3184E42}"/>
               </a:ext>
             </a:extLst>
           </p:cNvPr>
@@ -4972,7 +4972,7 @@
           <p:cNvPr id="35" name="Straight Arrow Connector 34">
             <a:extLst>
               <a:ext uri="{FF2B5EF4-FFF2-40B4-BE49-F238E27FC236}">
-                <a16:creationId xmlns:a16="http://schemas.microsoft.com/office/drawing/2014/main" id="{AECF8DDD-67D1-4693-AE07-22195ECB8FC2}"/>
+                <a16:creationId xmlns:a16="http://schemas.microsoft.com/office/drawing/2014/main" xmlns="" id="{AECF8DDD-67D1-4693-AE07-22195ECB8FC2}"/>
               </a:ext>
             </a:extLst>
           </p:cNvPr>
@@ -5049,7 +5049,7 @@
           <p:cNvPr id="2" name="Title 1">
             <a:extLst>
               <a:ext uri="{FF2B5EF4-FFF2-40B4-BE49-F238E27FC236}">
-                <a16:creationId xmlns:a16="http://schemas.microsoft.com/office/drawing/2014/main" id="{5ADC56FF-B4DC-4FF6-8C43-32D010FD16AF}"/>
+                <a16:creationId xmlns:a16="http://schemas.microsoft.com/office/drawing/2014/main" xmlns="" id="{5ADC56FF-B4DC-4FF6-8C43-32D010FD16AF}"/>
               </a:ext>
             </a:extLst>
           </p:cNvPr>
@@ -5062,11 +5062,13 @@
         </p:nvSpPr>
         <p:spPr/>
         <p:txBody>
-          <a:bodyPr/>
+          <a:bodyPr>
+            <a:normAutofit/>
+          </a:bodyPr>
           <a:lstStyle/>
           <a:p>
             <a:r>
-              <a:rPr lang="en-US" dirty="0"/>
+              <a:rPr lang="en-US" sz="4000" dirty="0"/>
               <a:t>Architecture</a:t>
             </a:r>
           </a:p>
@@ -5080,7 +5082,7 @@
         </p:nvSpPr>
         <p:spPr>
           <a:xfrm>
-            <a:off x="1361440" y="3464560"/>
+            <a:off x="640080" y="2905002"/>
             <a:ext cx="1503680" cy="955040"/>
           </a:xfrm>
           <a:prstGeom prst="rect">
@@ -5109,14 +5111,14 @@
           <a:p>
             <a:pPr algn="ctr"/>
             <a:r>
-              <a:rPr lang="en-US" dirty="0"/>
+              <a:rPr lang="en-US" sz="1600" dirty="0"/>
               <a:t>Game Interface</a:t>
             </a:r>
           </a:p>
           <a:p>
             <a:pPr algn="ctr"/>
             <a:r>
-              <a:rPr lang="en-US" dirty="0"/>
+              <a:rPr lang="en-US" sz="1600" dirty="0"/>
               <a:t>(BWAPI)</a:t>
             </a:r>
           </a:p>
@@ -5130,7 +5132,7 @@
         </p:nvSpPr>
         <p:spPr>
           <a:xfrm>
-            <a:off x="7589520" y="4079240"/>
+            <a:off x="6868160" y="3519682"/>
             <a:ext cx="1503680" cy="955040"/>
           </a:xfrm>
           <a:prstGeom prst="rect">
@@ -5159,8 +5161,8 @@
           <a:p>
             <a:pPr algn="ctr"/>
             <a:r>
-              <a:rPr lang="en-US" dirty="0"/>
-              <a:t>Strategy Manager</a:t>
+              <a:rPr lang="en-US" sz="1600" dirty="0"/>
+              <a:t>Strategy Space</a:t>
             </a:r>
           </a:p>
         </p:txBody>
@@ -5173,7 +5175,7 @@
         </p:nvSpPr>
         <p:spPr>
           <a:xfrm>
-            <a:off x="5313680" y="4079240"/>
+            <a:off x="4592320" y="3519682"/>
             <a:ext cx="1503680" cy="955040"/>
           </a:xfrm>
           <a:prstGeom prst="rect">
@@ -5202,9 +5204,10 @@
           <a:p>
             <a:pPr algn="ctr"/>
             <a:r>
-              <a:rPr lang="en-US" dirty="0"/>
-              <a:t>Inference Engine</a:t>
+              <a:rPr lang="en-US" sz="1600" dirty="0" smtClean="0"/>
+              <a:t>Strategy Manager</a:t>
             </a:r>
+            <a:endParaRPr lang="en-US" sz="1600" dirty="0"/>
           </a:p>
         </p:txBody>
       </p:sp>
@@ -5216,7 +5219,7 @@
         </p:nvSpPr>
         <p:spPr>
           <a:xfrm>
-            <a:off x="7589520" y="5653425"/>
+            <a:off x="6868160" y="5093867"/>
             <a:ext cx="1503680" cy="955040"/>
           </a:xfrm>
           <a:prstGeom prst="rect">
@@ -5245,8 +5248,8 @@
           <a:p>
             <a:pPr algn="ctr"/>
             <a:r>
-              <a:rPr lang="en-US" dirty="0"/>
-              <a:t>Tree Builder</a:t>
+              <a:rPr lang="en-US" sz="1600" dirty="0"/>
+              <a:t>Tech Tree Manager</a:t>
             </a:r>
           </a:p>
         </p:txBody>
@@ -5259,7 +5262,7 @@
         </p:nvSpPr>
         <p:spPr>
           <a:xfrm>
-            <a:off x="5313680" y="2362245"/>
+            <a:off x="4592320" y="1802687"/>
             <a:ext cx="1503680" cy="955040"/>
           </a:xfrm>
           <a:prstGeom prst="rect">
@@ -5288,8 +5291,8 @@
           <a:p>
             <a:pPr algn="ctr"/>
             <a:r>
-              <a:rPr lang="en-US" dirty="0"/>
-              <a:t>Admin</a:t>
+              <a:rPr lang="en-US" sz="1600" dirty="0"/>
+              <a:t>Nova AI Module</a:t>
             </a:r>
           </a:p>
         </p:txBody>
@@ -5302,7 +5305,7 @@
         </p:nvSpPr>
         <p:spPr>
           <a:xfrm>
-            <a:off x="1361440" y="4714240"/>
+            <a:off x="640080" y="4154682"/>
             <a:ext cx="1503680" cy="955040"/>
           </a:xfrm>
           <a:prstGeom prst="rect">
@@ -5331,7 +5334,7 @@
           <a:p>
             <a:pPr algn="ctr"/>
             <a:r>
-              <a:rPr lang="en-US" dirty="0"/>
+              <a:rPr lang="en-US" sz="1600" dirty="0"/>
               <a:t>Test Driver</a:t>
             </a:r>
           </a:p>
@@ -5345,7 +5348,7 @@
         </p:nvSpPr>
         <p:spPr>
           <a:xfrm>
-            <a:off x="7589520" y="2743222"/>
+            <a:off x="6868160" y="2183664"/>
             <a:ext cx="1503680" cy="955040"/>
           </a:xfrm>
           <a:prstGeom prst="rect">
@@ -5374,8 +5377,8 @@
           <a:p>
             <a:pPr algn="ctr"/>
             <a:r>
-              <a:rPr lang="en-US" dirty="0"/>
-              <a:t>PDDL Reader</a:t>
+              <a:rPr lang="en-US" sz="1600" dirty="0"/>
+              <a:t>Strategy Reader</a:t>
             </a:r>
           </a:p>
         </p:txBody>
@@ -5391,7 +5394,7 @@
         </p:nvCxnSpPr>
         <p:spPr>
           <a:xfrm>
-            <a:off x="2865120" y="3942080"/>
+            <a:off x="2143760" y="3382522"/>
             <a:ext cx="2448560" cy="614680"/>
           </a:xfrm>
           <a:prstGeom prst="bentConnector3">
@@ -5429,7 +5432,7 @@
         </p:nvCxnSpPr>
         <p:spPr>
           <a:xfrm flipV="1">
-            <a:off x="2865120" y="4556760"/>
+            <a:off x="2143760" y="3997202"/>
             <a:ext cx="2448560" cy="635000"/>
           </a:xfrm>
           <a:prstGeom prst="bentConnector3">
@@ -5464,8 +5467,8 @@
         </p:nvSpPr>
         <p:spPr>
           <a:xfrm>
-            <a:off x="2976595" y="4227929"/>
-            <a:ext cx="1112805" cy="646331"/>
+            <a:off x="2255235" y="3668371"/>
+            <a:ext cx="931986" cy="584775"/>
           </a:xfrm>
           <a:prstGeom prst="rect">
             <a:avLst/>
@@ -5479,13 +5482,14 @@
           <a:lstStyle/>
           <a:p>
             <a:r>
-              <a:rPr lang="en-US" dirty="0"/>
-              <a:t>Capability</a:t>
+              <a:rPr lang="en-US" sz="1600" dirty="0" err="1"/>
+              <a:t>UnitType</a:t>
             </a:r>
+            <a:endParaRPr lang="en-US" sz="1600" dirty="0"/>
           </a:p>
           <a:p>
             <a:r>
-              <a:rPr lang="en-US" dirty="0"/>
+              <a:rPr lang="en-US" sz="1600" dirty="0"/>
               <a:t>Status</a:t>
             </a:r>
           </a:p>
@@ -5502,7 +5506,7 @@
         </p:nvCxnSpPr>
         <p:spPr>
           <a:xfrm>
-            <a:off x="8341360" y="3698262"/>
+            <a:off x="7620000" y="3138704"/>
             <a:ext cx="0" cy="380978"/>
           </a:xfrm>
           <a:prstGeom prst="straightConnector1">
@@ -5535,7 +5539,7 @@
         </p:nvSpPr>
         <p:spPr>
           <a:xfrm>
-            <a:off x="7825778" y="1757702"/>
+            <a:off x="7104418" y="1198144"/>
             <a:ext cx="1031164" cy="690880"/>
           </a:xfrm>
           <a:prstGeom prst="flowChartDocument">
@@ -5564,7 +5568,7 @@
           <a:p>
             <a:pPr algn="ctr"/>
             <a:r>
-              <a:rPr lang="en-US" dirty="0"/>
+              <a:rPr lang="en-US" sz="1600" dirty="0"/>
               <a:t>PDDL File</a:t>
             </a:r>
           </a:p>
@@ -5581,7 +5585,7 @@
         </p:nvCxnSpPr>
         <p:spPr>
           <a:xfrm>
-            <a:off x="8341360" y="2402907"/>
+            <a:off x="7620000" y="1843349"/>
             <a:ext cx="0" cy="340315"/>
           </a:xfrm>
           <a:prstGeom prst="straightConnector1">
@@ -5617,7 +5621,7 @@
         </p:nvCxnSpPr>
         <p:spPr>
           <a:xfrm>
-            <a:off x="8341360" y="5034280"/>
+            <a:off x="7620000" y="4474722"/>
             <a:ext cx="0" cy="619145"/>
           </a:xfrm>
           <a:prstGeom prst="straightConnector1">
@@ -5654,7 +5658,7 @@
         </p:nvCxnSpPr>
         <p:spPr>
           <a:xfrm>
-            <a:off x="6817360" y="4556760"/>
+            <a:off x="6096000" y="3997202"/>
             <a:ext cx="772160" cy="0"/>
           </a:xfrm>
           <a:prstGeom prst="straightConnector1">
@@ -5691,7 +5695,7 @@
         </p:nvCxnSpPr>
         <p:spPr>
           <a:xfrm>
-            <a:off x="6065520" y="3317285"/>
+            <a:off x="5344160" y="2757727"/>
             <a:ext cx="0" cy="761955"/>
           </a:xfrm>
           <a:prstGeom prst="straightConnector1">
@@ -5728,7 +5732,7 @@
         </p:nvCxnSpPr>
         <p:spPr>
           <a:xfrm rot="10800000" flipV="1">
-            <a:off x="2113280" y="2839764"/>
+            <a:off x="1391920" y="2280206"/>
             <a:ext cx="3200400" cy="624795"/>
           </a:xfrm>
           <a:prstGeom prst="bentConnector2">
@@ -5762,8 +5766,8 @@
         </p:nvSpPr>
         <p:spPr>
           <a:xfrm>
-            <a:off x="9193601" y="4572615"/>
-            <a:ext cx="1198880" cy="923330"/>
+            <a:off x="8472241" y="4013057"/>
+            <a:ext cx="1198880" cy="830997"/>
           </a:xfrm>
           <a:prstGeom prst="rect">
             <a:avLst/>
@@ -5777,7 +5781,7 @@
           <a:lstStyle/>
           <a:p>
             <a:r>
-              <a:rPr lang="en-US" dirty="0"/>
+              <a:rPr lang="en-US" sz="1600" dirty="0"/>
               <a:t>Update Template Weights</a:t>
             </a:r>
           </a:p>
@@ -5791,7 +5795,7 @@
         </p:nvSpPr>
         <p:spPr>
           <a:xfrm>
-            <a:off x="10492882" y="3964711"/>
+            <a:off x="9771522" y="3405153"/>
             <a:ext cx="1381760" cy="1184097"/>
           </a:xfrm>
           <a:prstGeom prst="flowChartMultidocument">
@@ -5820,7 +5824,7 @@
           <a:p>
             <a:pPr algn="ctr"/>
             <a:r>
-              <a:rPr lang="en-US" dirty="0"/>
+              <a:rPr lang="en-US" sz="1600" dirty="0"/>
               <a:t>Strategies</a:t>
             </a:r>
           </a:p>
@@ -5837,8 +5841,200 @@
         </p:nvCxnSpPr>
         <p:spPr>
           <a:xfrm flipH="1">
-            <a:off x="9093200" y="4556760"/>
+            <a:off x="8371840" y="3997202"/>
             <a:ext cx="1399682" cy="0"/>
+          </a:xfrm>
+          <a:prstGeom prst="straightConnector1">
+            <a:avLst/>
+          </a:prstGeom>
+          <a:ln>
+            <a:headEnd type="arrow"/>
+            <a:tailEnd type="arrow"/>
+          </a:ln>
+        </p:spPr>
+        <p:style>
+          <a:lnRef idx="1">
+            <a:schemeClr val="accent1"/>
+          </a:lnRef>
+          <a:fillRef idx="0">
+            <a:schemeClr val="accent1"/>
+          </a:fillRef>
+          <a:effectRef idx="0">
+            <a:schemeClr val="accent1"/>
+          </a:effectRef>
+          <a:fontRef idx="minor">
+            <a:schemeClr val="tx1"/>
+          </a:fontRef>
+        </p:style>
+      </p:cxnSp>
+      <p:sp>
+        <p:nvSpPr>
+          <p:cNvPr id="28" name="Rectangle 27">
+            <a:extLst>
+              <a:ext uri="{FF2B5EF4-FFF2-40B4-BE49-F238E27FC236}">
+                <a16:creationId xmlns:a16="http://schemas.microsoft.com/office/drawing/2014/main" xmlns="" id="{48EBDA38-3674-4766-8A9E-FC5A870C4AEE}"/>
+              </a:ext>
+            </a:extLst>
+          </p:cNvPr>
+          <p:cNvSpPr/>
+          <p:nvPr/>
+        </p:nvSpPr>
+        <p:spPr>
+          <a:xfrm>
+            <a:off x="4592320" y="5290055"/>
+            <a:ext cx="1503680" cy="955040"/>
+          </a:xfrm>
+          <a:prstGeom prst="rect">
+            <a:avLst/>
+          </a:prstGeom>
+        </p:spPr>
+        <p:style>
+          <a:lnRef idx="2">
+            <a:schemeClr val="accent1">
+              <a:shade val="50000"/>
+            </a:schemeClr>
+          </a:lnRef>
+          <a:fillRef idx="1">
+            <a:schemeClr val="accent1"/>
+          </a:fillRef>
+          <a:effectRef idx="0">
+            <a:schemeClr val="accent1"/>
+          </a:effectRef>
+          <a:fontRef idx="minor">
+            <a:schemeClr val="lt1"/>
+          </a:fontRef>
+        </p:style>
+        <p:txBody>
+          <a:bodyPr rtlCol="0" anchor="ctr"/>
+          <a:lstStyle/>
+          <a:p>
+            <a:pPr algn="ctr"/>
+            <a:r>
+              <a:rPr lang="en-US" sz="1600" dirty="0" smtClean="0"/>
+              <a:t>Information Manager</a:t>
+            </a:r>
+            <a:endParaRPr lang="en-US" sz="1600" dirty="0"/>
+          </a:p>
+        </p:txBody>
+      </p:sp>
+      <p:sp>
+        <p:nvSpPr>
+          <p:cNvPr id="29" name="Rectangle 28">
+            <a:extLst>
+              <a:ext uri="{FF2B5EF4-FFF2-40B4-BE49-F238E27FC236}">
+                <a16:creationId xmlns:a16="http://schemas.microsoft.com/office/drawing/2014/main" xmlns="" id="{8BB1185D-28C9-48E3-AF83-56D19481BD9B}"/>
+              </a:ext>
+            </a:extLst>
+          </p:cNvPr>
+          <p:cNvSpPr/>
+          <p:nvPr/>
+        </p:nvSpPr>
+        <p:spPr>
+          <a:xfrm>
+            <a:off x="7020560" y="5246267"/>
+            <a:ext cx="1503680" cy="955040"/>
+          </a:xfrm>
+          <a:prstGeom prst="rect">
+            <a:avLst/>
+          </a:prstGeom>
+        </p:spPr>
+        <p:style>
+          <a:lnRef idx="2">
+            <a:schemeClr val="accent1">
+              <a:shade val="50000"/>
+            </a:schemeClr>
+          </a:lnRef>
+          <a:fillRef idx="1">
+            <a:schemeClr val="accent1"/>
+          </a:fillRef>
+          <a:effectRef idx="0">
+            <a:schemeClr val="accent1"/>
+          </a:effectRef>
+          <a:fontRef idx="minor">
+            <a:schemeClr val="lt1"/>
+          </a:fontRef>
+        </p:style>
+        <p:txBody>
+          <a:bodyPr rtlCol="0" anchor="ctr"/>
+          <a:lstStyle/>
+          <a:p>
+            <a:pPr algn="ctr"/>
+            <a:r>
+              <a:rPr lang="en-US" sz="1600" dirty="0"/>
+              <a:t>Tech Tree Manager</a:t>
+            </a:r>
+          </a:p>
+        </p:txBody>
+      </p:sp>
+      <p:sp>
+        <p:nvSpPr>
+          <p:cNvPr id="32" name="Rectangle 31">
+            <a:extLst>
+              <a:ext uri="{FF2B5EF4-FFF2-40B4-BE49-F238E27FC236}">
+                <a16:creationId xmlns:a16="http://schemas.microsoft.com/office/drawing/2014/main" xmlns="" id="{809860E9-C61D-4819-AC6C-EB42FB88463A}"/>
+              </a:ext>
+            </a:extLst>
+          </p:cNvPr>
+          <p:cNvSpPr/>
+          <p:nvPr/>
+        </p:nvSpPr>
+        <p:spPr>
+          <a:xfrm>
+            <a:off x="7172960" y="5398667"/>
+            <a:ext cx="1503680" cy="955040"/>
+          </a:xfrm>
+          <a:prstGeom prst="rect">
+            <a:avLst/>
+          </a:prstGeom>
+        </p:spPr>
+        <p:style>
+          <a:lnRef idx="2">
+            <a:schemeClr val="accent1">
+              <a:shade val="50000"/>
+            </a:schemeClr>
+          </a:lnRef>
+          <a:fillRef idx="1">
+            <a:schemeClr val="accent1"/>
+          </a:fillRef>
+          <a:effectRef idx="0">
+            <a:schemeClr val="accent1"/>
+          </a:effectRef>
+          <a:fontRef idx="minor">
+            <a:schemeClr val="lt1"/>
+          </a:fontRef>
+        </p:style>
+        <p:txBody>
+          <a:bodyPr rtlCol="0" anchor="ctr"/>
+          <a:lstStyle/>
+          <a:p>
+            <a:pPr algn="ctr"/>
+            <a:r>
+              <a:rPr lang="en-US" sz="1600" dirty="0"/>
+              <a:t>Tech Tree Manager</a:t>
+            </a:r>
+          </a:p>
+        </p:txBody>
+      </p:sp>
+      <p:cxnSp>
+        <p:nvCxnSpPr>
+          <p:cNvPr id="33" name="Straight Arrow Connector 32">
+            <a:extLst>
+              <a:ext uri="{FF2B5EF4-FFF2-40B4-BE49-F238E27FC236}">
+                <a16:creationId xmlns:a16="http://schemas.microsoft.com/office/drawing/2014/main" xmlns="" id="{4FD98F2F-6E1F-404B-9187-1EBEA778FA8B}"/>
+              </a:ext>
+            </a:extLst>
+          </p:cNvPr>
+          <p:cNvCxnSpPr>
+            <a:cxnSpLocks/>
+            <a:stCxn id="6" idx="2"/>
+            <a:endCxn id="28" idx="0"/>
+          </p:cNvCxnSpPr>
+          <p:nvPr/>
+        </p:nvCxnSpPr>
+        <p:spPr>
+          <a:xfrm>
+            <a:off x="5344160" y="4474722"/>
+            <a:ext cx="0" cy="815333"/>
           </a:xfrm>
           <a:prstGeom prst="straightConnector1">
             <a:avLst/>
@@ -5866,7 +6062,7 @@
     </p:spTree>
     <p:extLst>
       <p:ext uri="{BB962C8B-B14F-4D97-AF65-F5344CB8AC3E}">
-        <p14:creationId xmlns:p14="http://schemas.microsoft.com/office/powerpoint/2010/main" val="447203902"/>
+        <p14:creationId xmlns:p14="http://schemas.microsoft.com/office/powerpoint/2010/main" val="2745846289"/>
       </p:ext>
     </p:extLst>
   </p:cSld>
@@ -5895,13 +6091,7 @@
       </p:grpSpPr>
       <p:sp>
         <p:nvSpPr>
-          <p:cNvPr id="2" name="Title 1">
-            <a:extLst>
-              <a:ext uri="{FF2B5EF4-FFF2-40B4-BE49-F238E27FC236}">
-                <a16:creationId xmlns:a16="http://schemas.microsoft.com/office/drawing/2014/main" id="{5ADC56FF-B4DC-4FF6-8C43-32D010FD16AF}"/>
-              </a:ext>
-            </a:extLst>
-          </p:cNvPr>
+          <p:cNvPr id="2" name="Title 1"/>
           <p:cNvSpPr>
             <a:spLocks noGrp="1"/>
           </p:cNvSpPr>
@@ -5911,63 +6101,177 @@
         </p:nvSpPr>
         <p:spPr/>
         <p:txBody>
-          <a:bodyPr>
-            <a:normAutofit/>
-          </a:bodyPr>
-          <a:lstStyle/>
-          <a:p>
+          <a:bodyPr/>
+          <a:lstStyle/>
+          <a:p>
+            <a:endParaRPr lang="en-US"/>
+          </a:p>
+        </p:txBody>
+      </p:sp>
+      <p:pic>
+        <p:nvPicPr>
+          <p:cNvPr id="4" name="Picture 2"/>
+          <p:cNvPicPr>
+            <a:picLocks noChangeAspect="1" noChangeArrowheads="1"/>
+          </p:cNvPicPr>
+          <p:nvPr/>
+        </p:nvPicPr>
+        <p:blipFill>
+          <a:blip r:embed="rId2">
+            <a:extLst>
+              <a:ext uri="{28A0092B-C50C-407E-A947-70E740481C1C}">
+                <a14:useLocalDpi xmlns:a14="http://schemas.microsoft.com/office/drawing/2010/main" val="0"/>
+              </a:ext>
+            </a:extLst>
+          </a:blip>
+          <a:srcRect/>
+          <a:stretch>
+            <a:fillRect/>
+          </a:stretch>
+        </p:blipFill>
+        <p:spPr bwMode="auto">
+          <a:xfrm>
+            <a:off x="4505960" y="2971811"/>
+            <a:ext cx="2846281" cy="1932694"/>
+          </a:xfrm>
+          <a:prstGeom prst="rect">
+            <a:avLst/>
+          </a:prstGeom>
+          <a:noFill/>
+          <a:ln>
+            <a:noFill/>
+          </a:ln>
+          <a:effectLst/>
+          <a:extLst>
+            <a:ext uri="{909E8E84-426E-40DD-AFC4-6F175D3DCCD1}">
+              <a14:hiddenFill xmlns:a14="http://schemas.microsoft.com/office/drawing/2010/main">
+                <a:solidFill>
+                  <a:schemeClr val="accent1"/>
+                </a:solidFill>
+              </a14:hiddenFill>
+            </a:ext>
+            <a:ext uri="{91240B29-F687-4F45-9708-019B960494DF}">
+              <a14:hiddenLine xmlns:a14="http://schemas.microsoft.com/office/drawing/2010/main" w="9525">
+                <a:solidFill>
+                  <a:schemeClr val="tx1"/>
+                </a:solidFill>
+                <a:miter lim="800000"/>
+                <a:headEnd/>
+                <a:tailEnd/>
+              </a14:hiddenLine>
+            </a:ext>
+            <a:ext uri="{AF507438-7753-43E0-B8FC-AC1667EBCBE1}">
+              <a14:hiddenEffects xmlns:a14="http://schemas.microsoft.com/office/drawing/2010/main">
+                <a:effectLst>
+                  <a:outerShdw dist="35921" dir="2700000" algn="ctr" rotWithShape="0">
+                    <a:schemeClr val="bg2"/>
+                  </a:outerShdw>
+                </a:effectLst>
+              </a14:hiddenEffects>
+            </a:ext>
+          </a:extLst>
+        </p:spPr>
+      </p:pic>
+      <p:sp>
+        <p:nvSpPr>
+          <p:cNvPr id="5" name="Rectangle 4"/>
+          <p:cNvSpPr/>
+          <p:nvPr/>
+        </p:nvSpPr>
+        <p:spPr>
+          <a:xfrm>
+            <a:off x="2328062" y="4365382"/>
+            <a:ext cx="1503680" cy="955040"/>
+          </a:xfrm>
+          <a:prstGeom prst="rect">
+            <a:avLst/>
+          </a:prstGeom>
+          <a:solidFill>
+            <a:srgbClr val="4472C4"/>
+          </a:solidFill>
+          <a:ln w="12700" cap="flat" cmpd="sng" algn="ctr">
+            <a:solidFill>
+              <a:srgbClr val="4472C4">
+                <a:shade val="50000"/>
+              </a:srgbClr>
+            </a:solidFill>
+            <a:prstDash val="solid"/>
+            <a:miter lim="800000"/>
+          </a:ln>
+          <a:effectLst/>
+        </p:spPr>
+        <p:txBody>
+          <a:bodyPr rtlCol="0" anchor="ctr"/>
+          <a:lstStyle/>
+          <a:p>
+            <a:pPr marL="0" marR="0" lvl="0" indent="0" algn="ctr" defTabSz="914400" eaLnBrk="1" fontAlgn="auto" latinLnBrk="0" hangingPunct="1">
+              <a:lnSpc>
+                <a:spcPct val="100000"/>
+              </a:lnSpc>
+              <a:spcBef>
+                <a:spcPts val="0"/>
+              </a:spcBef>
+              <a:spcAft>
+                <a:spcPts val="0"/>
+              </a:spcAft>
+              <a:buClrTx/>
+              <a:buSzTx/>
+              <a:buFontTx/>
+              <a:buNone/>
+              <a:tabLst/>
+              <a:defRPr/>
+            </a:pPr>
             <a:r>
-              <a:rPr lang="en-US" sz="4000" dirty="0"/>
-              <a:t>Architecture</a:t>
-            </a:r>
-          </a:p>
-        </p:txBody>
-      </p:sp>
-      <p:sp>
-        <p:nvSpPr>
-          <p:cNvPr id="4" name="Rectangle 3"/>
-          <p:cNvSpPr/>
-          <p:nvPr/>
-        </p:nvSpPr>
-        <p:spPr>
-          <a:xfrm>
-            <a:off x="640080" y="2905002"/>
-            <a:ext cx="1503680" cy="955040"/>
-          </a:xfrm>
-          <a:prstGeom prst="rect">
-            <a:avLst/>
-          </a:prstGeom>
-        </p:spPr>
-        <p:style>
-          <a:lnRef idx="2">
-            <a:schemeClr val="accent1">
-              <a:shade val="50000"/>
-            </a:schemeClr>
-          </a:lnRef>
-          <a:fillRef idx="1">
-            <a:schemeClr val="accent1"/>
-          </a:fillRef>
-          <a:effectRef idx="0">
-            <a:schemeClr val="accent1"/>
-          </a:effectRef>
-          <a:fontRef idx="minor">
-            <a:schemeClr val="lt1"/>
-          </a:fontRef>
-        </p:style>
-        <p:txBody>
-          <a:bodyPr rtlCol="0" anchor="ctr"/>
-          <a:lstStyle/>
-          <a:p>
-            <a:pPr algn="ctr"/>
-            <a:r>
-              <a:rPr lang="en-US" sz="1600" dirty="0"/>
+              <a:rPr kumimoji="0" lang="en-US" sz="1600" b="0" i="0" u="none" strike="noStrike" kern="0" cap="none" spc="0" normalizeH="0" baseline="0" noProof="0" dirty="0" smtClean="0">
+                <a:ln>
+                  <a:noFill/>
+                </a:ln>
+                <a:solidFill>
+                  <a:prstClr val="white"/>
+                </a:solidFill>
+                <a:effectLst/>
+                <a:uLnTx/>
+                <a:uFillTx/>
+                <a:latin typeface="Calibri" panose="020F0502020204030204"/>
+                <a:ea typeface="+mn-ea"/>
+                <a:cs typeface="+mn-cs"/>
+              </a:rPr>
               <a:t>Game Interface</a:t>
             </a:r>
           </a:p>
           <a:p>
-            <a:pPr algn="ctr"/>
+            <a:pPr marL="0" marR="0" lvl="0" indent="0" algn="ctr" defTabSz="914400" eaLnBrk="1" fontAlgn="auto" latinLnBrk="0" hangingPunct="1">
+              <a:lnSpc>
+                <a:spcPct val="100000"/>
+              </a:lnSpc>
+              <a:spcBef>
+                <a:spcPts val="0"/>
+              </a:spcBef>
+              <a:spcAft>
+                <a:spcPts val="0"/>
+              </a:spcAft>
+              <a:buClrTx/>
+              <a:buSzTx/>
+              <a:buFontTx/>
+              <a:buNone/>
+              <a:tabLst/>
+              <a:defRPr/>
+            </a:pPr>
             <a:r>
-              <a:rPr lang="en-US" sz="1600" dirty="0"/>
+              <a:rPr kumimoji="0" lang="en-US" sz="1600" b="0" i="0" u="none" strike="noStrike" kern="0" cap="none" spc="0" normalizeH="0" baseline="0" noProof="0" dirty="0" smtClean="0">
+                <a:ln>
+                  <a:noFill/>
+                </a:ln>
+                <a:solidFill>
+                  <a:prstClr val="white"/>
+                </a:solidFill>
+                <a:effectLst/>
+                <a:uLnTx/>
+                <a:uFillTx/>
+                <a:latin typeface="Calibri" panose="020F0502020204030204"/>
+                <a:ea typeface="+mn-ea"/>
+                <a:cs typeface="+mn-cs"/>
+              </a:rPr>
               <a:t>(BWAPI)</a:t>
             </a:r>
           </a:p>
@@ -5975,42 +6279,68 @@
       </p:sp>
       <p:sp>
         <p:nvSpPr>
-          <p:cNvPr id="5" name="Rectangle 4"/>
+          <p:cNvPr id="6" name="Rectangle 5"/>
           <p:cNvSpPr/>
           <p:nvPr/>
         </p:nvSpPr>
         <p:spPr>
           <a:xfrm>
-            <a:off x="6868160" y="3519682"/>
+            <a:off x="7567544" y="3352789"/>
             <a:ext cx="1503680" cy="955040"/>
           </a:xfrm>
           <a:prstGeom prst="rect">
             <a:avLst/>
           </a:prstGeom>
-        </p:spPr>
-        <p:style>
-          <a:lnRef idx="2">
-            <a:schemeClr val="accent1">
-              <a:shade val="50000"/>
-            </a:schemeClr>
-          </a:lnRef>
-          <a:fillRef idx="1">
-            <a:schemeClr val="accent1"/>
-          </a:fillRef>
-          <a:effectRef idx="0">
-            <a:schemeClr val="accent1"/>
-          </a:effectRef>
-          <a:fontRef idx="minor">
-            <a:schemeClr val="lt1"/>
-          </a:fontRef>
-        </p:style>
+          <a:solidFill>
+            <a:srgbClr val="4472C4"/>
+          </a:solidFill>
+          <a:ln w="12700" cap="flat" cmpd="sng" algn="ctr">
+            <a:solidFill>
+              <a:srgbClr val="4472C4">
+                <a:shade val="50000"/>
+              </a:srgbClr>
+            </a:solidFill>
+            <a:prstDash val="solid"/>
+            <a:miter lim="800000"/>
+          </a:ln>
+          <a:effectLst/>
+        </p:spPr>
         <p:txBody>
           <a:bodyPr rtlCol="0" anchor="ctr"/>
           <a:lstStyle/>
           <a:p>
-            <a:pPr algn="ctr"/>
+            <a:pPr marL="0" marR="0" lvl="0" indent="0" algn="ctr" defTabSz="914400" eaLnBrk="1" fontAlgn="auto" latinLnBrk="0" hangingPunct="1">
+              <a:lnSpc>
+                <a:spcPct val="100000"/>
+              </a:lnSpc>
+              <a:spcBef>
+                <a:spcPts val="0"/>
+              </a:spcBef>
+              <a:spcAft>
+                <a:spcPts val="0"/>
+              </a:spcAft>
+              <a:buClrTx/>
+              <a:buSzTx/>
+              <a:buFontTx/>
+              <a:buNone/>
+              <a:tabLst/>
+              <a:defRPr/>
+            </a:pPr>
             <a:r>
-              <a:rPr lang="en-US" sz="1600" dirty="0"/>
+              <a:rPr kumimoji="0" lang="en-US" sz="1600" b="0" i="0" u="none" strike="noStrike" kern="0" cap="none" spc="0" normalizeH="0" baseline="0" noProof="0" dirty="0" smtClean="0">
+                <a:ln>
+                  <a:noFill/>
+                </a:ln>
+                <a:solidFill>
+                  <a:prstClr val="white"/>
+                </a:solidFill>
+                <a:effectLst/>
+                <a:uLnTx/>
+                <a:uFillTx/>
+                <a:latin typeface="Calibri" panose="020F0502020204030204"/>
+                <a:ea typeface="+mn-ea"/>
+                <a:cs typeface="+mn-cs"/>
+              </a:rPr>
               <a:t>Strategy Space</a:t>
             </a:r>
           </a:p>
@@ -6018,85 +6348,68 @@
       </p:sp>
       <p:sp>
         <p:nvSpPr>
-          <p:cNvPr id="6" name="Rectangle 5"/>
-          <p:cNvSpPr/>
-          <p:nvPr/>
-        </p:nvSpPr>
-        <p:spPr>
-          <a:xfrm>
-            <a:off x="4592320" y="3519682"/>
-            <a:ext cx="1503680" cy="955040"/>
-          </a:xfrm>
-          <a:prstGeom prst="rect">
-            <a:avLst/>
-          </a:prstGeom>
-        </p:spPr>
-        <p:style>
-          <a:lnRef idx="2">
-            <a:schemeClr val="accent1">
-              <a:shade val="50000"/>
-            </a:schemeClr>
-          </a:lnRef>
-          <a:fillRef idx="1">
-            <a:schemeClr val="accent1"/>
-          </a:fillRef>
-          <a:effectRef idx="0">
-            <a:schemeClr val="accent1"/>
-          </a:effectRef>
-          <a:fontRef idx="minor">
-            <a:schemeClr val="lt1"/>
-          </a:fontRef>
-        </p:style>
-        <p:txBody>
-          <a:bodyPr rtlCol="0" anchor="ctr"/>
-          <a:lstStyle/>
-          <a:p>
-            <a:pPr algn="ctr"/>
-            <a:r>
-              <a:rPr lang="en-US" sz="1600" dirty="0"/>
-              <a:t>Information Manager</a:t>
-            </a:r>
-          </a:p>
-        </p:txBody>
-      </p:sp>
-      <p:sp>
-        <p:nvSpPr>
           <p:cNvPr id="7" name="Rectangle 6"/>
           <p:cNvSpPr/>
           <p:nvPr/>
         </p:nvSpPr>
         <p:spPr>
           <a:xfrm>
-            <a:off x="6868160" y="5093867"/>
+            <a:off x="7567544" y="4926974"/>
             <a:ext cx="1503680" cy="955040"/>
           </a:xfrm>
           <a:prstGeom prst="rect">
             <a:avLst/>
           </a:prstGeom>
-        </p:spPr>
-        <p:style>
-          <a:lnRef idx="2">
-            <a:schemeClr val="accent1">
-              <a:shade val="50000"/>
-            </a:schemeClr>
-          </a:lnRef>
-          <a:fillRef idx="1">
-            <a:schemeClr val="accent1"/>
-          </a:fillRef>
-          <a:effectRef idx="0">
-            <a:schemeClr val="accent1"/>
-          </a:effectRef>
-          <a:fontRef idx="minor">
-            <a:schemeClr val="lt1"/>
-          </a:fontRef>
-        </p:style>
+          <a:solidFill>
+            <a:srgbClr val="4472C4"/>
+          </a:solidFill>
+          <a:ln w="12700" cap="flat" cmpd="sng" algn="ctr">
+            <a:solidFill>
+              <a:srgbClr val="4472C4">
+                <a:shade val="50000"/>
+              </a:srgbClr>
+            </a:solidFill>
+            <a:prstDash val="solid"/>
+            <a:miter lim="800000"/>
+          </a:ln>
+          <a:effectLst/>
+        </p:spPr>
         <p:txBody>
           <a:bodyPr rtlCol="0" anchor="ctr"/>
           <a:lstStyle/>
           <a:p>
-            <a:pPr algn="ctr"/>
+            <a:pPr marL="0" marR="0" lvl="0" indent="0" algn="ctr" defTabSz="914400" eaLnBrk="1" fontAlgn="auto" latinLnBrk="0" hangingPunct="1">
+              <a:lnSpc>
+                <a:spcPct val="100000"/>
+              </a:lnSpc>
+              <a:spcBef>
+                <a:spcPts val="0"/>
+              </a:spcBef>
+              <a:spcAft>
+                <a:spcPts val="0"/>
+              </a:spcAft>
+              <a:buClrTx/>
+              <a:buSzTx/>
+              <a:buFontTx/>
+              <a:buNone/>
+              <a:tabLst/>
+              <a:defRPr/>
+            </a:pPr>
             <a:r>
-              <a:rPr lang="en-US" sz="1600" dirty="0"/>
+              <a:rPr kumimoji="0" lang="en-US" sz="1600" b="0" i="0" u="none" strike="noStrike" kern="0" cap="none" spc="0" normalizeH="0" baseline="0" noProof="0" dirty="0" smtClean="0">
+                <a:ln>
+                  <a:noFill/>
+                </a:ln>
+                <a:solidFill>
+                  <a:prstClr val="white"/>
+                </a:solidFill>
+                <a:effectLst/>
+                <a:uLnTx/>
+                <a:uFillTx/>
+                <a:latin typeface="Calibri" panose="020F0502020204030204"/>
+                <a:ea typeface="+mn-ea"/>
+                <a:cs typeface="+mn-cs"/>
+              </a:rPr>
               <a:t>Tech Tree Manager</a:t>
             </a:r>
           </a:p>
@@ -6110,36 +6423,65 @@
         </p:nvSpPr>
         <p:spPr>
           <a:xfrm>
-            <a:off x="4592320" y="1802687"/>
-            <a:ext cx="1503680" cy="955040"/>
+            <a:off x="5617740" y="4478069"/>
+            <a:ext cx="717020" cy="364833"/>
           </a:xfrm>
           <a:prstGeom prst="rect">
             <a:avLst/>
           </a:prstGeom>
-        </p:spPr>
-        <p:style>
-          <a:lnRef idx="2">
-            <a:schemeClr val="accent1">
-              <a:shade val="50000"/>
-            </a:schemeClr>
-          </a:lnRef>
-          <a:fillRef idx="1">
-            <a:schemeClr val="accent1"/>
-          </a:fillRef>
-          <a:effectRef idx="0">
-            <a:schemeClr val="accent1"/>
-          </a:effectRef>
-          <a:fontRef idx="minor">
-            <a:schemeClr val="lt1"/>
-          </a:fontRef>
-        </p:style>
+          <a:solidFill>
+            <a:schemeClr val="tx2"/>
+          </a:solidFill>
+          <a:ln w="3175" cap="flat" cmpd="sng" algn="ctr">
+            <a:solidFill>
+              <a:schemeClr val="bg2"/>
+            </a:solidFill>
+            <a:prstDash val="solid"/>
+            <a:miter lim="800000"/>
+          </a:ln>
+          <a:effectLst>
+            <a:outerShdw blurRad="50800" dist="38100" dir="2700000" algn="tl" rotWithShape="0">
+              <a:prstClr val="black">
+                <a:alpha val="40000"/>
+              </a:prstClr>
+            </a:outerShdw>
+          </a:effectLst>
+        </p:spPr>
         <p:txBody>
           <a:bodyPr rtlCol="0" anchor="ctr"/>
           <a:lstStyle/>
           <a:p>
-            <a:pPr algn="ctr"/>
+            <a:pPr marL="0" marR="0" lvl="0" indent="0" algn="ctr" defTabSz="914400" eaLnBrk="1" fontAlgn="auto" latinLnBrk="0" hangingPunct="1">
+              <a:lnSpc>
+                <a:spcPct val="100000"/>
+              </a:lnSpc>
+              <a:spcBef>
+                <a:spcPts val="0"/>
+              </a:spcBef>
+              <a:spcAft>
+                <a:spcPts val="0"/>
+              </a:spcAft>
+              <a:buClrTx/>
+              <a:buSzTx/>
+              <a:buFontTx/>
+              <a:buNone/>
+              <a:tabLst/>
+              <a:defRPr/>
+            </a:pPr>
             <a:r>
-              <a:rPr lang="en-US" sz="1600" dirty="0"/>
+              <a:rPr kumimoji="0" lang="en-US" sz="1000" b="0" i="0" u="none" strike="noStrike" kern="0" cap="none" spc="0" normalizeH="0" baseline="0" noProof="0" dirty="0" smtClean="0">
+                <a:ln>
+                  <a:noFill/>
+                </a:ln>
+                <a:solidFill>
+                  <a:schemeClr val="bg2"/>
+                </a:solidFill>
+                <a:effectLst/>
+                <a:uLnTx/>
+                <a:uFillTx/>
+                <a:latin typeface="Arial" panose="020B0604020202020204" pitchFamily="34" charset="0"/>
+                <a:cs typeface="Arial" panose="020B0604020202020204" pitchFamily="34" charset="0"/>
+              </a:rPr>
               <a:t>Nova AI Module</a:t>
             </a:r>
           </a:p>
@@ -6153,36 +6495,62 @@
         </p:nvSpPr>
         <p:spPr>
           <a:xfrm>
-            <a:off x="640080" y="4154682"/>
+            <a:off x="2362200" y="2684780"/>
             <a:ext cx="1503680" cy="955040"/>
           </a:xfrm>
           <a:prstGeom prst="rect">
             <a:avLst/>
           </a:prstGeom>
-        </p:spPr>
-        <p:style>
-          <a:lnRef idx="2">
-            <a:schemeClr val="accent1">
-              <a:shade val="50000"/>
-            </a:schemeClr>
-          </a:lnRef>
-          <a:fillRef idx="1">
-            <a:schemeClr val="accent1"/>
-          </a:fillRef>
-          <a:effectRef idx="0">
-            <a:schemeClr val="accent1"/>
-          </a:effectRef>
-          <a:fontRef idx="minor">
-            <a:schemeClr val="lt1"/>
-          </a:fontRef>
-        </p:style>
+          <a:solidFill>
+            <a:srgbClr val="4472C4"/>
+          </a:solidFill>
+          <a:ln w="12700" cap="flat" cmpd="sng" algn="ctr">
+            <a:solidFill>
+              <a:srgbClr val="4472C4">
+                <a:shade val="50000"/>
+              </a:srgbClr>
+            </a:solidFill>
+            <a:prstDash val="solid"/>
+            <a:miter lim="800000"/>
+          </a:ln>
+          <a:effectLst/>
+        </p:spPr>
         <p:txBody>
           <a:bodyPr rtlCol="0" anchor="ctr"/>
           <a:lstStyle/>
           <a:p>
-            <a:pPr algn="ctr"/>
+            <a:pPr marL="0" marR="0" lvl="0" indent="0" algn="ctr" defTabSz="914400" eaLnBrk="1" fontAlgn="auto" latinLnBrk="0" hangingPunct="1">
+              <a:lnSpc>
+                <a:spcPct val="100000"/>
+              </a:lnSpc>
+              <a:spcBef>
+                <a:spcPts val="0"/>
+              </a:spcBef>
+              <a:spcAft>
+                <a:spcPts val="0"/>
+              </a:spcAft>
+              <a:buClrTx/>
+              <a:buSzTx/>
+              <a:buFontTx/>
+              <a:buNone/>
+              <a:tabLst/>
+              <a:defRPr/>
+            </a:pPr>
             <a:r>
-              <a:rPr lang="en-US" sz="1600" dirty="0"/>
+              <a:rPr kumimoji="0" lang="en-US" sz="1600" b="0" i="0" u="none" strike="noStrike" kern="0" cap="none" spc="0" normalizeH="0" baseline="0" noProof="0" dirty="0" smtClean="0">
+                <a:ln>
+                  <a:noFill/>
+                </a:ln>
+                <a:solidFill>
+                  <a:prstClr val="white"/>
+                </a:solidFill>
+                <a:effectLst/>
+                <a:uLnTx/>
+                <a:uFillTx/>
+                <a:latin typeface="Calibri" panose="020F0502020204030204"/>
+                <a:ea typeface="+mn-ea"/>
+                <a:cs typeface="+mn-cs"/>
+              </a:rPr>
               <a:t>Test Driver</a:t>
             </a:r>
           </a:p>
@@ -6196,36 +6564,62 @@
         </p:nvSpPr>
         <p:spPr>
           <a:xfrm>
-            <a:off x="6868160" y="2183664"/>
+            <a:off x="7567544" y="2016771"/>
             <a:ext cx="1503680" cy="955040"/>
           </a:xfrm>
           <a:prstGeom prst="rect">
             <a:avLst/>
           </a:prstGeom>
-        </p:spPr>
-        <p:style>
-          <a:lnRef idx="2">
-            <a:schemeClr val="accent1">
-              <a:shade val="50000"/>
-            </a:schemeClr>
-          </a:lnRef>
-          <a:fillRef idx="1">
-            <a:schemeClr val="accent1"/>
-          </a:fillRef>
-          <a:effectRef idx="0">
-            <a:schemeClr val="accent1"/>
-          </a:effectRef>
-          <a:fontRef idx="minor">
-            <a:schemeClr val="lt1"/>
-          </a:fontRef>
-        </p:style>
+          <a:solidFill>
+            <a:srgbClr val="4472C4"/>
+          </a:solidFill>
+          <a:ln w="12700" cap="flat" cmpd="sng" algn="ctr">
+            <a:solidFill>
+              <a:srgbClr val="4472C4">
+                <a:shade val="50000"/>
+              </a:srgbClr>
+            </a:solidFill>
+            <a:prstDash val="solid"/>
+            <a:miter lim="800000"/>
+          </a:ln>
+          <a:effectLst/>
+        </p:spPr>
         <p:txBody>
           <a:bodyPr rtlCol="0" anchor="ctr"/>
           <a:lstStyle/>
           <a:p>
-            <a:pPr algn="ctr"/>
+            <a:pPr marL="0" marR="0" lvl="0" indent="0" algn="ctr" defTabSz="914400" eaLnBrk="1" fontAlgn="auto" latinLnBrk="0" hangingPunct="1">
+              <a:lnSpc>
+                <a:spcPct val="100000"/>
+              </a:lnSpc>
+              <a:spcBef>
+                <a:spcPts val="0"/>
+              </a:spcBef>
+              <a:spcAft>
+                <a:spcPts val="0"/>
+              </a:spcAft>
+              <a:buClrTx/>
+              <a:buSzTx/>
+              <a:buFontTx/>
+              <a:buNone/>
+              <a:tabLst/>
+              <a:defRPr/>
+            </a:pPr>
             <a:r>
-              <a:rPr lang="en-US" sz="1600" dirty="0"/>
+              <a:rPr kumimoji="0" lang="en-US" sz="1600" b="0" i="0" u="none" strike="noStrike" kern="0" cap="none" spc="0" normalizeH="0" baseline="0" noProof="0" dirty="0" smtClean="0">
+                <a:ln>
+                  <a:noFill/>
+                </a:ln>
+                <a:solidFill>
+                  <a:prstClr val="white"/>
+                </a:solidFill>
+                <a:effectLst/>
+                <a:uLnTx/>
+                <a:uFillTx/>
+                <a:latin typeface="Calibri" panose="020F0502020204030204"/>
+                <a:ea typeface="+mn-ea"/>
+                <a:cs typeface="+mn-cs"/>
+              </a:rPr>
               <a:t>Strategy Reader</a:t>
             </a:r>
           </a:p>
@@ -6233,494 +6627,370 @@
       </p:sp>
       <p:cxnSp>
         <p:nvCxnSpPr>
-          <p:cNvPr id="12" name="Straight Arrow Connector 11"/>
+          <p:cNvPr id="11" name="Straight Arrow Connector 11"/>
           <p:cNvCxnSpPr>
-            <a:stCxn id="4" idx="3"/>
-            <a:endCxn id="6" idx="1"/>
+            <a:stCxn id="5" idx="3"/>
+            <a:endCxn id="8" idx="2"/>
           </p:cNvCxnSpPr>
           <p:nvPr/>
         </p:nvCxnSpPr>
         <p:spPr>
           <a:xfrm>
-            <a:off x="2143760" y="3382522"/>
-            <a:ext cx="2448560" cy="614680"/>
-          </a:xfrm>
-          <a:prstGeom prst="bentConnector3">
+            <a:off x="3831742" y="4842902"/>
+            <a:ext cx="2144508" cy="12700"/>
+          </a:xfrm>
+          <a:prstGeom prst="bentConnector4">
             <a:avLst>
-              <a:gd name="adj1" fmla="val 50000"/>
+              <a:gd name="adj1" fmla="val 16399"/>
+              <a:gd name="adj2" fmla="val 1813598"/>
             </a:avLst>
           </a:prstGeom>
-          <a:ln>
+          <a:noFill/>
+          <a:ln w="6350" cap="flat" cmpd="sng" algn="ctr">
+            <a:solidFill>
+              <a:srgbClr val="4472C4"/>
+            </a:solidFill>
+            <a:prstDash val="solid"/>
+            <a:miter lim="800000"/>
             <a:tailEnd type="arrow"/>
           </a:ln>
-        </p:spPr>
-        <p:style>
-          <a:lnRef idx="1">
-            <a:schemeClr val="accent1"/>
-          </a:lnRef>
-          <a:fillRef idx="0">
-            <a:schemeClr val="accent1"/>
-          </a:fillRef>
-          <a:effectRef idx="0">
-            <a:schemeClr val="accent1"/>
-          </a:effectRef>
-          <a:fontRef idx="minor">
-            <a:schemeClr val="tx1"/>
-          </a:fontRef>
-        </p:style>
+          <a:effectLst/>
+        </p:spPr>
+      </p:cxnSp>
+      <p:cxnSp>
+        <p:nvCxnSpPr>
+          <p:cNvPr id="12" name="Straight Arrow Connector 12"/>
+          <p:cNvCxnSpPr>
+            <a:stCxn id="9" idx="3"/>
+            <a:endCxn id="8" idx="2"/>
+          </p:cNvCxnSpPr>
+          <p:nvPr/>
+        </p:nvCxnSpPr>
+        <p:spPr>
+          <a:xfrm>
+            <a:off x="3865880" y="3162300"/>
+            <a:ext cx="2110370" cy="1680602"/>
+          </a:xfrm>
+          <a:prstGeom prst="bentConnector4">
+            <a:avLst>
+              <a:gd name="adj1" fmla="val 15509"/>
+              <a:gd name="adj2" fmla="val 113602"/>
+            </a:avLst>
+          </a:prstGeom>
+          <a:noFill/>
+          <a:ln w="6350" cap="flat" cmpd="sng" algn="ctr">
+            <a:solidFill>
+              <a:srgbClr val="4472C4"/>
+            </a:solidFill>
+            <a:prstDash val="solid"/>
+            <a:miter lim="800000"/>
+            <a:tailEnd type="arrow"/>
+          </a:ln>
+          <a:effectLst/>
+        </p:spPr>
       </p:cxnSp>
       <p:cxnSp>
         <p:nvCxnSpPr>
           <p:cNvPr id="13" name="Straight Arrow Connector 12"/>
           <p:cNvCxnSpPr>
-            <a:stCxn id="9" idx="3"/>
-            <a:endCxn id="6" idx="1"/>
+            <a:stCxn id="10" idx="2"/>
+            <a:endCxn id="6" idx="0"/>
           </p:cNvCxnSpPr>
           <p:nvPr/>
         </p:nvCxnSpPr>
         <p:spPr>
-          <a:xfrm flipV="1">
-            <a:off x="2143760" y="3997202"/>
-            <a:ext cx="2448560" cy="635000"/>
-          </a:xfrm>
-          <a:prstGeom prst="bentConnector3">
-            <a:avLst>
-              <a:gd name="adj1" fmla="val 50000"/>
-            </a:avLst>
-          </a:prstGeom>
-          <a:ln>
+          <a:xfrm>
+            <a:off x="8319384" y="2971811"/>
+            <a:ext cx="0" cy="380978"/>
+          </a:xfrm>
+          <a:prstGeom prst="straightConnector1">
+            <a:avLst/>
+          </a:prstGeom>
+          <a:noFill/>
+          <a:ln w="6350" cap="flat" cmpd="sng" algn="ctr">
+            <a:solidFill>
+              <a:srgbClr val="4472C4"/>
+            </a:solidFill>
+            <a:prstDash val="solid"/>
+            <a:miter lim="800000"/>
             <a:tailEnd type="arrow"/>
           </a:ln>
-        </p:spPr>
-        <p:style>
-          <a:lnRef idx="1">
-            <a:schemeClr val="accent1"/>
-          </a:lnRef>
-          <a:fillRef idx="0">
-            <a:schemeClr val="accent1"/>
-          </a:fillRef>
-          <a:effectRef idx="0">
-            <a:schemeClr val="accent1"/>
-          </a:effectRef>
-          <a:fontRef idx="minor">
-            <a:schemeClr val="tx1"/>
-          </a:fontRef>
-        </p:style>
+          <a:effectLst/>
+        </p:spPr>
       </p:cxnSp>
       <p:sp>
         <p:nvSpPr>
-          <p:cNvPr id="20" name="TextBox 19"/>
-          <p:cNvSpPr txBox="1"/>
+          <p:cNvPr id="14" name="Flowchart: Document 13"/>
+          <p:cNvSpPr/>
           <p:nvPr/>
         </p:nvSpPr>
         <p:spPr>
           <a:xfrm>
-            <a:off x="2255235" y="3668371"/>
-            <a:ext cx="931986" cy="584775"/>
-          </a:xfrm>
-          <a:prstGeom prst="rect">
-            <a:avLst/>
-          </a:prstGeom>
-          <a:noFill/>
-        </p:spPr>
-        <p:txBody>
-          <a:bodyPr wrap="none" rtlCol="0">
-            <a:spAutoFit/>
-          </a:bodyPr>
-          <a:lstStyle/>
-          <a:p>
+            <a:off x="9799396" y="2148851"/>
+            <a:ext cx="1031164" cy="690880"/>
+          </a:xfrm>
+          <a:prstGeom prst="flowChartDocument">
+            <a:avLst/>
+          </a:prstGeom>
+          <a:solidFill>
+            <a:schemeClr val="tx2">
+              <a:lumMod val="85000"/>
+            </a:schemeClr>
+          </a:solidFill>
+          <a:ln w="12700" cap="flat" cmpd="sng" algn="ctr">
+            <a:solidFill>
+              <a:schemeClr val="tx2">
+                <a:lumMod val="50000"/>
+              </a:schemeClr>
+            </a:solidFill>
+            <a:prstDash val="dashDot"/>
+            <a:miter lim="800000"/>
+          </a:ln>
+          <a:effectLst/>
+        </p:spPr>
+        <p:txBody>
+          <a:bodyPr rtlCol="0" anchor="ctr"/>
+          <a:lstStyle/>
+          <a:p>
+            <a:pPr marL="0" marR="0" lvl="0" indent="0" algn="ctr" defTabSz="914400" eaLnBrk="1" fontAlgn="auto" latinLnBrk="0" hangingPunct="1">
+              <a:lnSpc>
+                <a:spcPct val="100000"/>
+              </a:lnSpc>
+              <a:spcBef>
+                <a:spcPts val="0"/>
+              </a:spcBef>
+              <a:spcAft>
+                <a:spcPts val="0"/>
+              </a:spcAft>
+              <a:buClrTx/>
+              <a:buSzTx/>
+              <a:buFontTx/>
+              <a:buNone/>
+              <a:tabLst/>
+              <a:defRPr/>
+            </a:pPr>
             <a:r>
-              <a:rPr lang="en-US" sz="1600" dirty="0" err="1"/>
-              <a:t>UnitType</a:t>
-            </a:r>
-            <a:endParaRPr lang="en-US" sz="1600" dirty="0"/>
-          </a:p>
-          <a:p>
-            <a:r>
-              <a:rPr lang="en-US" sz="1600" dirty="0"/>
-              <a:t>Status</a:t>
+              <a:rPr kumimoji="0" lang="en-US" sz="1600" b="0" i="0" u="none" strike="noStrike" kern="0" cap="none" spc="0" normalizeH="0" baseline="0" noProof="0" dirty="0" smtClean="0">
+                <a:ln>
+                  <a:noFill/>
+                </a:ln>
+                <a:solidFill>
+                  <a:schemeClr val="bg2">
+                    <a:lumMod val="50000"/>
+                    <a:lumOff val="50000"/>
+                  </a:schemeClr>
+                </a:solidFill>
+                <a:effectLst/>
+                <a:uLnTx/>
+                <a:uFillTx/>
+                <a:latin typeface="Calibri" panose="020F0502020204030204"/>
+                <a:ea typeface="+mn-ea"/>
+                <a:cs typeface="+mn-cs"/>
+              </a:rPr>
+              <a:t>PDDL File</a:t>
             </a:r>
           </a:p>
         </p:txBody>
       </p:sp>
       <p:cxnSp>
         <p:nvCxnSpPr>
-          <p:cNvPr id="23" name="Straight Arrow Connector 22"/>
+          <p:cNvPr id="15" name="Straight Arrow Connector 14"/>
           <p:cNvCxnSpPr>
-            <a:stCxn id="10" idx="2"/>
-            <a:endCxn id="5" idx="0"/>
+            <a:stCxn id="14" idx="1"/>
+            <a:endCxn id="10" idx="3"/>
           </p:cNvCxnSpPr>
           <p:nvPr/>
         </p:nvCxnSpPr>
         <p:spPr>
-          <a:xfrm>
-            <a:off x="7620000" y="3138704"/>
-            <a:ext cx="0" cy="380978"/>
+          <a:xfrm flipH="1">
+            <a:off x="9071224" y="2494291"/>
+            <a:ext cx="728172" cy="0"/>
           </a:xfrm>
           <a:prstGeom prst="straightConnector1">
             <a:avLst/>
           </a:prstGeom>
-          <a:ln>
+          <a:noFill/>
+          <a:ln w="6350" cap="flat" cmpd="sng" algn="ctr">
+            <a:solidFill>
+              <a:schemeClr val="tx2">
+                <a:lumMod val="50000"/>
+              </a:schemeClr>
+            </a:solidFill>
+            <a:prstDash val="dashDot"/>
+            <a:miter lim="800000"/>
             <a:tailEnd type="arrow"/>
           </a:ln>
-        </p:spPr>
-        <p:style>
-          <a:lnRef idx="1">
-            <a:schemeClr val="accent1"/>
-          </a:lnRef>
-          <a:fillRef idx="0">
-            <a:schemeClr val="accent1"/>
-          </a:fillRef>
-          <a:effectRef idx="0">
-            <a:schemeClr val="accent1"/>
-          </a:effectRef>
-          <a:fontRef idx="minor">
-            <a:schemeClr val="tx1"/>
-          </a:fontRef>
-        </p:style>
-      </p:cxnSp>
-      <p:sp>
-        <p:nvSpPr>
-          <p:cNvPr id="24" name="Flowchart: Document 23"/>
-          <p:cNvSpPr/>
-          <p:nvPr/>
-        </p:nvSpPr>
-        <p:spPr>
-          <a:xfrm>
-            <a:off x="7104418" y="1198144"/>
-            <a:ext cx="1031164" cy="690880"/>
-          </a:xfrm>
-          <a:prstGeom prst="flowChartDocument">
-            <a:avLst/>
-          </a:prstGeom>
-        </p:spPr>
-        <p:style>
-          <a:lnRef idx="2">
-            <a:schemeClr val="accent1">
-              <a:shade val="50000"/>
-            </a:schemeClr>
-          </a:lnRef>
-          <a:fillRef idx="1">
-            <a:schemeClr val="accent1"/>
-          </a:fillRef>
-          <a:effectRef idx="0">
-            <a:schemeClr val="accent1"/>
-          </a:effectRef>
-          <a:fontRef idx="minor">
-            <a:schemeClr val="lt1"/>
-          </a:fontRef>
-        </p:style>
-        <p:txBody>
-          <a:bodyPr rtlCol="0" anchor="ctr"/>
-          <a:lstStyle/>
-          <a:p>
-            <a:pPr algn="ctr"/>
-            <a:r>
-              <a:rPr lang="en-US" sz="1600" dirty="0"/>
-              <a:t>PDDL File</a:t>
-            </a:r>
-          </a:p>
-        </p:txBody>
-      </p:sp>
-      <p:cxnSp>
-        <p:nvCxnSpPr>
-          <p:cNvPr id="25" name="Straight Arrow Connector 24"/>
-          <p:cNvCxnSpPr>
-            <a:stCxn id="24" idx="2"/>
-            <a:endCxn id="10" idx="0"/>
-          </p:cNvCxnSpPr>
-          <p:nvPr/>
-        </p:nvCxnSpPr>
-        <p:spPr>
-          <a:xfrm>
-            <a:off x="7620000" y="1843349"/>
-            <a:ext cx="0" cy="340315"/>
-          </a:xfrm>
-          <a:prstGeom prst="straightConnector1">
-            <a:avLst/>
-          </a:prstGeom>
-          <a:ln>
-            <a:tailEnd type="arrow"/>
-          </a:ln>
-        </p:spPr>
-        <p:style>
-          <a:lnRef idx="1">
-            <a:schemeClr val="accent1"/>
-          </a:lnRef>
-          <a:fillRef idx="0">
-            <a:schemeClr val="accent1"/>
-          </a:fillRef>
-          <a:effectRef idx="0">
-            <a:schemeClr val="accent1"/>
-          </a:effectRef>
-          <a:fontRef idx="minor">
-            <a:schemeClr val="tx1"/>
-          </a:fontRef>
-        </p:style>
+          <a:effectLst/>
+        </p:spPr>
       </p:cxnSp>
       <p:cxnSp>
         <p:nvCxnSpPr>
-          <p:cNvPr id="30" name="Straight Arrow Connector 29"/>
+          <p:cNvPr id="16" name="Straight Arrow Connector 15"/>
           <p:cNvCxnSpPr>
-            <a:stCxn id="5" idx="2"/>
+            <a:stCxn id="6" idx="2"/>
             <a:endCxn id="7" idx="0"/>
           </p:cNvCxnSpPr>
           <p:nvPr/>
         </p:nvCxnSpPr>
         <p:spPr>
           <a:xfrm>
-            <a:off x="7620000" y="4474722"/>
+            <a:off x="8319384" y="4307829"/>
             <a:ext cx="0" cy="619145"/>
           </a:xfrm>
           <a:prstGeom prst="straightConnector1">
             <a:avLst/>
           </a:prstGeom>
-          <a:ln>
+          <a:noFill/>
+          <a:ln w="6350" cap="flat" cmpd="sng" algn="ctr">
+            <a:solidFill>
+              <a:srgbClr val="4472C4"/>
+            </a:solidFill>
+            <a:prstDash val="solid"/>
+            <a:miter lim="800000"/>
             <a:headEnd type="arrow"/>
             <a:tailEnd type="arrow"/>
           </a:ln>
-        </p:spPr>
-        <p:style>
-          <a:lnRef idx="1">
-            <a:schemeClr val="accent1"/>
-          </a:lnRef>
-          <a:fillRef idx="0">
-            <a:schemeClr val="accent1"/>
-          </a:fillRef>
-          <a:effectRef idx="0">
-            <a:schemeClr val="accent1"/>
-          </a:effectRef>
-          <a:fontRef idx="minor">
-            <a:schemeClr val="tx1"/>
-          </a:fontRef>
-        </p:style>
+          <a:effectLst/>
+        </p:spPr>
       </p:cxnSp>
       <p:cxnSp>
         <p:nvCxnSpPr>
-          <p:cNvPr id="31" name="Straight Arrow Connector 30"/>
+          <p:cNvPr id="17" name="Straight Arrow Connector 17"/>
           <p:cNvCxnSpPr>
-            <a:stCxn id="6" idx="3"/>
-            <a:endCxn id="5" idx="1"/>
+            <a:stCxn id="4" idx="0"/>
+            <a:endCxn id="6" idx="1"/>
           </p:cNvCxnSpPr>
           <p:nvPr/>
         </p:nvCxnSpPr>
         <p:spPr>
-          <a:xfrm>
-            <a:off x="6096000" y="3997202"/>
-            <a:ext cx="772160" cy="0"/>
-          </a:xfrm>
-          <a:prstGeom prst="straightConnector1">
-            <a:avLst/>
-          </a:prstGeom>
-          <a:ln>
+          <a:xfrm rot="16200000" flipH="1">
+            <a:off x="6319073" y="2581839"/>
+            <a:ext cx="858498" cy="1638443"/>
+          </a:xfrm>
+          <a:prstGeom prst="bentConnector4">
+            <a:avLst>
+              <a:gd name="adj1" fmla="val -26628"/>
+              <a:gd name="adj2" fmla="val 93430"/>
+            </a:avLst>
+          </a:prstGeom>
+          <a:noFill/>
+          <a:ln w="6350" cap="flat" cmpd="sng" algn="ctr">
+            <a:solidFill>
+              <a:srgbClr val="4472C4"/>
+            </a:solidFill>
+            <a:prstDash val="solid"/>
+            <a:miter lim="800000"/>
             <a:headEnd type="arrow"/>
             <a:tailEnd type="arrow"/>
           </a:ln>
-        </p:spPr>
-        <p:style>
-          <a:lnRef idx="1">
-            <a:schemeClr val="accent1"/>
-          </a:lnRef>
-          <a:fillRef idx="0">
-            <a:schemeClr val="accent1"/>
-          </a:fillRef>
-          <a:effectRef idx="0">
-            <a:schemeClr val="accent1"/>
-          </a:effectRef>
-          <a:fontRef idx="minor">
-            <a:schemeClr val="tx1"/>
-          </a:fontRef>
-        </p:style>
+          <a:effectLst/>
+        </p:spPr>
       </p:cxnSp>
+      <p:sp>
+        <p:nvSpPr>
+          <p:cNvPr id="18" name="Flowchart: Multidocument 17"/>
+          <p:cNvSpPr/>
+          <p:nvPr/>
+        </p:nvSpPr>
+        <p:spPr>
+          <a:xfrm>
+            <a:off x="9687560" y="3238260"/>
+            <a:ext cx="1381760" cy="1184097"/>
+          </a:xfrm>
+          <a:prstGeom prst="flowChartMultidocument">
+            <a:avLst/>
+          </a:prstGeom>
+          <a:solidFill>
+            <a:srgbClr val="4472C4"/>
+          </a:solidFill>
+          <a:ln w="12700" cap="flat" cmpd="sng" algn="ctr">
+            <a:solidFill>
+              <a:srgbClr val="4472C4">
+                <a:shade val="50000"/>
+              </a:srgbClr>
+            </a:solidFill>
+            <a:prstDash val="solid"/>
+            <a:miter lim="800000"/>
+          </a:ln>
+          <a:effectLst/>
+        </p:spPr>
+        <p:txBody>
+          <a:bodyPr rtlCol="0" anchor="ctr"/>
+          <a:lstStyle/>
+          <a:p>
+            <a:pPr marL="0" marR="0" lvl="0" indent="0" algn="ctr" defTabSz="914400" eaLnBrk="1" fontAlgn="auto" latinLnBrk="0" hangingPunct="1">
+              <a:lnSpc>
+                <a:spcPct val="100000"/>
+              </a:lnSpc>
+              <a:spcBef>
+                <a:spcPts val="0"/>
+              </a:spcBef>
+              <a:spcAft>
+                <a:spcPts val="0"/>
+              </a:spcAft>
+              <a:buClrTx/>
+              <a:buSzTx/>
+              <a:buFontTx/>
+              <a:buNone/>
+              <a:tabLst/>
+              <a:defRPr/>
+            </a:pPr>
+            <a:r>
+              <a:rPr kumimoji="0" lang="en-US" sz="1600" b="0" i="0" u="none" strike="noStrike" kern="0" cap="none" spc="0" normalizeH="0" baseline="0" noProof="0" dirty="0" smtClean="0">
+                <a:ln>
+                  <a:noFill/>
+                </a:ln>
+                <a:solidFill>
+                  <a:prstClr val="white"/>
+                </a:solidFill>
+                <a:effectLst/>
+                <a:uLnTx/>
+                <a:uFillTx/>
+                <a:latin typeface="Calibri" panose="020F0502020204030204"/>
+                <a:ea typeface="+mn-ea"/>
+                <a:cs typeface="+mn-cs"/>
+              </a:rPr>
+              <a:t>Strategies</a:t>
+            </a:r>
+          </a:p>
+        </p:txBody>
+      </p:sp>
       <p:cxnSp>
         <p:nvCxnSpPr>
-          <p:cNvPr id="34" name="Straight Arrow Connector 33"/>
+          <p:cNvPr id="19" name="Straight Arrow Connector 18"/>
           <p:cNvCxnSpPr>
-            <a:stCxn id="8" idx="2"/>
-            <a:endCxn id="6" idx="0"/>
+            <a:stCxn id="18" idx="1"/>
+            <a:endCxn id="6" idx="3"/>
           </p:cNvCxnSpPr>
           <p:nvPr/>
         </p:nvCxnSpPr>
         <p:spPr>
-          <a:xfrm>
-            <a:off x="5344160" y="2757727"/>
-            <a:ext cx="0" cy="761955"/>
+          <a:xfrm flipH="1">
+            <a:off x="9071224" y="3830309"/>
+            <a:ext cx="616336" cy="0"/>
           </a:xfrm>
           <a:prstGeom prst="straightConnector1">
             <a:avLst/>
           </a:prstGeom>
-          <a:ln>
+          <a:noFill/>
+          <a:ln w="6350" cap="flat" cmpd="sng" algn="ctr">
+            <a:solidFill>
+              <a:srgbClr val="4472C4"/>
+            </a:solidFill>
+            <a:prstDash val="solid"/>
+            <a:miter lim="800000"/>
             <a:headEnd type="arrow"/>
             <a:tailEnd type="arrow"/>
           </a:ln>
-        </p:spPr>
-        <p:style>
-          <a:lnRef idx="1">
-            <a:schemeClr val="accent1"/>
-          </a:lnRef>
-          <a:fillRef idx="0">
-            <a:schemeClr val="accent1"/>
-          </a:fillRef>
-          <a:effectRef idx="0">
-            <a:schemeClr val="accent1"/>
-          </a:effectRef>
-          <a:fontRef idx="minor">
-            <a:schemeClr val="tx1"/>
-          </a:fontRef>
-        </p:style>
+          <a:effectLst/>
+        </p:spPr>
       </p:cxnSp>
-      <p:cxnSp>
-        <p:nvCxnSpPr>
-          <p:cNvPr id="37" name="Straight Arrow Connector 36"/>
-          <p:cNvCxnSpPr>
-            <a:stCxn id="8" idx="1"/>
-            <a:endCxn id="4" idx="0"/>
-          </p:cNvCxnSpPr>
-          <p:nvPr/>
-        </p:nvCxnSpPr>
-        <p:spPr>
-          <a:xfrm rot="10800000" flipV="1">
-            <a:off x="1391920" y="2280206"/>
-            <a:ext cx="3200400" cy="624795"/>
-          </a:xfrm>
-          <a:prstGeom prst="bentConnector2">
-            <a:avLst/>
-          </a:prstGeom>
-          <a:ln>
-            <a:headEnd type="arrow"/>
-            <a:tailEnd type="arrow"/>
-          </a:ln>
-        </p:spPr>
-        <p:style>
-          <a:lnRef idx="1">
-            <a:schemeClr val="accent1"/>
-          </a:lnRef>
-          <a:fillRef idx="0">
-            <a:schemeClr val="accent1"/>
-          </a:fillRef>
-          <a:effectRef idx="0">
-            <a:schemeClr val="accent1"/>
-          </a:effectRef>
-          <a:fontRef idx="minor">
-            <a:schemeClr val="tx1"/>
-          </a:fontRef>
-        </p:style>
-      </p:cxnSp>
-      <p:sp>
-        <p:nvSpPr>
-          <p:cNvPr id="44" name="TextBox 43"/>
-          <p:cNvSpPr txBox="1"/>
-          <p:nvPr/>
-        </p:nvSpPr>
-        <p:spPr>
-          <a:xfrm>
-            <a:off x="8472241" y="4013057"/>
-            <a:ext cx="1198880" cy="830997"/>
-          </a:xfrm>
-          <a:prstGeom prst="rect">
-            <a:avLst/>
-          </a:prstGeom>
-          <a:noFill/>
-        </p:spPr>
-        <p:txBody>
-          <a:bodyPr wrap="square" rtlCol="0">
-            <a:spAutoFit/>
-          </a:bodyPr>
-          <a:lstStyle/>
-          <a:p>
-            <a:r>
-              <a:rPr lang="en-US" sz="1600" dirty="0"/>
-              <a:t>Update Template Weights</a:t>
-            </a:r>
-          </a:p>
-        </p:txBody>
-      </p:sp>
-      <p:sp>
-        <p:nvSpPr>
-          <p:cNvPr id="46" name="Flowchart: Multidocument 45"/>
-          <p:cNvSpPr/>
-          <p:nvPr/>
-        </p:nvSpPr>
-        <p:spPr>
-          <a:xfrm>
-            <a:off x="9771522" y="3405153"/>
-            <a:ext cx="1381760" cy="1184097"/>
-          </a:xfrm>
-          <a:prstGeom prst="flowChartMultidocument">
-            <a:avLst/>
-          </a:prstGeom>
-        </p:spPr>
-        <p:style>
-          <a:lnRef idx="2">
-            <a:schemeClr val="accent1">
-              <a:shade val="50000"/>
-            </a:schemeClr>
-          </a:lnRef>
-          <a:fillRef idx="1">
-            <a:schemeClr val="accent1"/>
-          </a:fillRef>
-          <a:effectRef idx="0">
-            <a:schemeClr val="accent1"/>
-          </a:effectRef>
-          <a:fontRef idx="minor">
-            <a:schemeClr val="lt1"/>
-          </a:fontRef>
-        </p:style>
-        <p:txBody>
-          <a:bodyPr rtlCol="0" anchor="ctr"/>
-          <a:lstStyle/>
-          <a:p>
-            <a:pPr algn="ctr"/>
-            <a:r>
-              <a:rPr lang="en-US" sz="1600" dirty="0"/>
-              <a:t>Strategies</a:t>
-            </a:r>
-          </a:p>
-        </p:txBody>
-      </p:sp>
-      <p:cxnSp>
-        <p:nvCxnSpPr>
-          <p:cNvPr id="48" name="Straight Arrow Connector 47"/>
-          <p:cNvCxnSpPr>
-            <a:stCxn id="46" idx="1"/>
-            <a:endCxn id="5" idx="3"/>
-          </p:cNvCxnSpPr>
-          <p:nvPr/>
-        </p:nvCxnSpPr>
-        <p:spPr>
-          <a:xfrm flipH="1">
-            <a:off x="8371840" y="3997202"/>
-            <a:ext cx="1399682" cy="0"/>
-          </a:xfrm>
-          <a:prstGeom prst="straightConnector1">
-            <a:avLst/>
-          </a:prstGeom>
-          <a:ln>
-            <a:headEnd type="arrow"/>
-            <a:tailEnd type="arrow"/>
-          </a:ln>
-        </p:spPr>
-        <p:style>
-          <a:lnRef idx="1">
-            <a:schemeClr val="accent1"/>
-          </a:lnRef>
-          <a:fillRef idx="0">
-            <a:schemeClr val="accent1"/>
-          </a:fillRef>
-          <a:effectRef idx="0">
-            <a:schemeClr val="accent1"/>
-          </a:effectRef>
-          <a:fontRef idx="minor">
-            <a:schemeClr val="tx1"/>
-          </a:fontRef>
-        </p:style>
-      </p:cxnSp>
-      <p:sp>
-        <p:nvSpPr>
-          <p:cNvPr id="28" name="Rectangle 27">
+      <p:sp>
+        <p:nvSpPr>
+          <p:cNvPr id="20" name="Rectangle 19">
             <a:extLst>
               <a:ext uri="{FF2B5EF4-FFF2-40B4-BE49-F238E27FC236}">
-                <a16:creationId xmlns:a16="http://schemas.microsoft.com/office/drawing/2014/main" id="{48EBDA38-3674-4766-8A9E-FC5A870C4AEE}"/>
+                <a16:creationId xmlns:a16="http://schemas.microsoft.com/office/drawing/2014/main" xmlns="" id="{8BB1185D-28C9-48E3-AF83-56D19481BD9B}"/>
               </a:ext>
             </a:extLst>
           </p:cNvPr>
@@ -6729,47 +6999,73 @@
         </p:nvSpPr>
         <p:spPr>
           <a:xfrm>
-            <a:off x="4592320" y="5290055"/>
+            <a:off x="7719944" y="5079374"/>
             <a:ext cx="1503680" cy="955040"/>
           </a:xfrm>
           <a:prstGeom prst="rect">
             <a:avLst/>
           </a:prstGeom>
-        </p:spPr>
-        <p:style>
-          <a:lnRef idx="2">
-            <a:schemeClr val="accent1">
-              <a:shade val="50000"/>
-            </a:schemeClr>
-          </a:lnRef>
-          <a:fillRef idx="1">
-            <a:schemeClr val="accent1"/>
-          </a:fillRef>
-          <a:effectRef idx="0">
-            <a:schemeClr val="accent1"/>
-          </a:effectRef>
-          <a:fontRef idx="minor">
-            <a:schemeClr val="lt1"/>
-          </a:fontRef>
-        </p:style>
+          <a:solidFill>
+            <a:srgbClr val="4472C4"/>
+          </a:solidFill>
+          <a:ln w="12700" cap="flat" cmpd="sng" algn="ctr">
+            <a:solidFill>
+              <a:srgbClr val="4472C4">
+                <a:shade val="50000"/>
+              </a:srgbClr>
+            </a:solidFill>
+            <a:prstDash val="solid"/>
+            <a:miter lim="800000"/>
+          </a:ln>
+          <a:effectLst/>
+        </p:spPr>
         <p:txBody>
           <a:bodyPr rtlCol="0" anchor="ctr"/>
           <a:lstStyle/>
           <a:p>
-            <a:pPr algn="ctr"/>
+            <a:pPr marL="0" marR="0" lvl="0" indent="0" algn="ctr" defTabSz="914400" eaLnBrk="1" fontAlgn="auto" latinLnBrk="0" hangingPunct="1">
+              <a:lnSpc>
+                <a:spcPct val="100000"/>
+              </a:lnSpc>
+              <a:spcBef>
+                <a:spcPts val="0"/>
+              </a:spcBef>
+              <a:spcAft>
+                <a:spcPts val="0"/>
+              </a:spcAft>
+              <a:buClrTx/>
+              <a:buSzTx/>
+              <a:buFontTx/>
+              <a:buNone/>
+              <a:tabLst/>
+              <a:defRPr/>
+            </a:pPr>
             <a:r>
-              <a:rPr lang="en-US" sz="1600" dirty="0"/>
-              <a:t>Squad Manager</a:t>
+              <a:rPr kumimoji="0" lang="en-US" sz="1600" b="0" i="0" u="none" strike="noStrike" kern="0" cap="none" spc="0" normalizeH="0" baseline="0" noProof="0" dirty="0" smtClean="0">
+                <a:ln>
+                  <a:noFill/>
+                </a:ln>
+                <a:solidFill>
+                  <a:prstClr val="white"/>
+                </a:solidFill>
+                <a:effectLst/>
+                <a:uLnTx/>
+                <a:uFillTx/>
+                <a:latin typeface="Calibri" panose="020F0502020204030204"/>
+                <a:ea typeface="+mn-ea"/>
+                <a:cs typeface="+mn-cs"/>
+              </a:rPr>
+              <a:t>Tech Tree Manager</a:t>
             </a:r>
           </a:p>
         </p:txBody>
       </p:sp>
       <p:sp>
         <p:nvSpPr>
-          <p:cNvPr id="29" name="Rectangle 28">
+          <p:cNvPr id="21" name="Rectangle 20">
             <a:extLst>
               <a:ext uri="{FF2B5EF4-FFF2-40B4-BE49-F238E27FC236}">
-                <a16:creationId xmlns:a16="http://schemas.microsoft.com/office/drawing/2014/main" id="{8BB1185D-28C9-48E3-AF83-56D19481BD9B}"/>
+                <a16:creationId xmlns:a16="http://schemas.microsoft.com/office/drawing/2014/main" xmlns="" id="{809860E9-C61D-4819-AC6C-EB42FB88463A}"/>
               </a:ext>
             </a:extLst>
           </p:cNvPr>
@@ -6778,138 +7074,106 @@
         </p:nvSpPr>
         <p:spPr>
           <a:xfrm>
-            <a:off x="7020560" y="5246267"/>
+            <a:off x="7872344" y="5231774"/>
             <a:ext cx="1503680" cy="955040"/>
           </a:xfrm>
           <a:prstGeom prst="rect">
             <a:avLst/>
           </a:prstGeom>
-        </p:spPr>
-        <p:style>
-          <a:lnRef idx="2">
-            <a:schemeClr val="accent1">
-              <a:shade val="50000"/>
-            </a:schemeClr>
-          </a:lnRef>
-          <a:fillRef idx="1">
-            <a:schemeClr val="accent1"/>
-          </a:fillRef>
-          <a:effectRef idx="0">
-            <a:schemeClr val="accent1"/>
-          </a:effectRef>
-          <a:fontRef idx="minor">
-            <a:schemeClr val="lt1"/>
-          </a:fontRef>
-        </p:style>
+          <a:solidFill>
+            <a:srgbClr val="4472C4"/>
+          </a:solidFill>
+          <a:ln w="12700" cap="flat" cmpd="sng" algn="ctr">
+            <a:solidFill>
+              <a:srgbClr val="4472C4">
+                <a:shade val="50000"/>
+              </a:srgbClr>
+            </a:solidFill>
+            <a:prstDash val="solid"/>
+            <a:miter lim="800000"/>
+          </a:ln>
+          <a:effectLst/>
+        </p:spPr>
         <p:txBody>
           <a:bodyPr rtlCol="0" anchor="ctr"/>
           <a:lstStyle/>
           <a:p>
-            <a:pPr algn="ctr"/>
+            <a:pPr marL="0" marR="0" lvl="0" indent="0" algn="ctr" defTabSz="914400" eaLnBrk="1" fontAlgn="auto" latinLnBrk="0" hangingPunct="1">
+              <a:lnSpc>
+                <a:spcPct val="100000"/>
+              </a:lnSpc>
+              <a:spcBef>
+                <a:spcPts val="0"/>
+              </a:spcBef>
+              <a:spcAft>
+                <a:spcPts val="0"/>
+              </a:spcAft>
+              <a:buClrTx/>
+              <a:buSzTx/>
+              <a:buFontTx/>
+              <a:buNone/>
+              <a:tabLst/>
+              <a:defRPr/>
+            </a:pPr>
             <a:r>
-              <a:rPr lang="en-US" sz="1600" dirty="0"/>
-              <a:t>Tech Tree Manager</a:t>
-            </a:r>
-          </a:p>
-        </p:txBody>
-      </p:sp>
-      <p:sp>
-        <p:nvSpPr>
-          <p:cNvPr id="32" name="Rectangle 31">
-            <a:extLst>
-              <a:ext uri="{FF2B5EF4-FFF2-40B4-BE49-F238E27FC236}">
-                <a16:creationId xmlns:a16="http://schemas.microsoft.com/office/drawing/2014/main" id="{809860E9-C61D-4819-AC6C-EB42FB88463A}"/>
-              </a:ext>
-            </a:extLst>
-          </p:cNvPr>
-          <p:cNvSpPr/>
-          <p:nvPr/>
-        </p:nvSpPr>
-        <p:spPr>
-          <a:xfrm>
-            <a:off x="7172960" y="5398667"/>
-            <a:ext cx="1503680" cy="955040"/>
-          </a:xfrm>
-          <a:prstGeom prst="rect">
-            <a:avLst/>
-          </a:prstGeom>
-        </p:spPr>
-        <p:style>
-          <a:lnRef idx="2">
-            <a:schemeClr val="accent1">
-              <a:shade val="50000"/>
-            </a:schemeClr>
-          </a:lnRef>
-          <a:fillRef idx="1">
-            <a:schemeClr val="accent1"/>
-          </a:fillRef>
-          <a:effectRef idx="0">
-            <a:schemeClr val="accent1"/>
-          </a:effectRef>
-          <a:fontRef idx="minor">
-            <a:schemeClr val="lt1"/>
-          </a:fontRef>
-        </p:style>
-        <p:txBody>
-          <a:bodyPr rtlCol="0" anchor="ctr"/>
-          <a:lstStyle/>
-          <a:p>
-            <a:pPr algn="ctr"/>
-            <a:r>
-              <a:rPr lang="en-US" sz="1600" dirty="0"/>
-              <a:t>Tech Tree Manager</a:t>
+              <a:rPr kumimoji="0" lang="en-US" sz="1600" b="0" i="0" u="none" strike="noStrike" kern="0" cap="none" spc="0" normalizeH="0" baseline="0" noProof="0" dirty="0" smtClean="0">
+                <a:ln>
+                  <a:noFill/>
+                </a:ln>
+                <a:solidFill>
+                  <a:prstClr val="white"/>
+                </a:solidFill>
+                <a:effectLst/>
+                <a:uLnTx/>
+                <a:uFillTx/>
+                <a:latin typeface="Calibri" panose="020F0502020204030204"/>
+                <a:ea typeface="+mn-ea"/>
+                <a:cs typeface="+mn-cs"/>
+              </a:rPr>
+              <a:t>(I) Tech Tree Manager</a:t>
             </a:r>
           </a:p>
         </p:txBody>
       </p:sp>
       <p:cxnSp>
         <p:nvCxnSpPr>
-          <p:cNvPr id="33" name="Straight Arrow Connector 32">
-            <a:extLst>
-              <a:ext uri="{FF2B5EF4-FFF2-40B4-BE49-F238E27FC236}">
-                <a16:creationId xmlns:a16="http://schemas.microsoft.com/office/drawing/2014/main" id="{4FD98F2F-6E1F-404B-9187-1EBEA778FA8B}"/>
-              </a:ext>
-            </a:extLst>
-          </p:cNvPr>
+          <p:cNvPr id="22" name="Straight Arrow Connector 21"/>
           <p:cNvCxnSpPr>
-            <a:cxnSpLocks/>
-            <a:stCxn id="6" idx="2"/>
-            <a:endCxn id="28" idx="0"/>
+            <a:endCxn id="8" idx="0"/>
           </p:cNvCxnSpPr>
           <p:nvPr/>
         </p:nvCxnSpPr>
         <p:spPr>
           <a:xfrm>
-            <a:off x="5344160" y="4474722"/>
-            <a:ext cx="0" cy="815333"/>
+            <a:off x="5976250" y="4205614"/>
+            <a:ext cx="0" cy="272455"/>
           </a:xfrm>
           <a:prstGeom prst="straightConnector1">
             <a:avLst/>
           </a:prstGeom>
-          <a:ln>
-            <a:headEnd type="arrow"/>
-            <a:tailEnd type="arrow"/>
+          <a:noFill/>
+          <a:ln w="6350" cap="flat" cmpd="sng" algn="ctr">
+            <a:solidFill>
+              <a:schemeClr val="bg2"/>
+            </a:solidFill>
+            <a:prstDash val="dash"/>
+            <a:miter lim="800000"/>
+            <a:headEnd type="triangle"/>
+            <a:tailEnd type="triangle"/>
           </a:ln>
-        </p:spPr>
-        <p:style>
-          <a:lnRef idx="1">
-            <a:schemeClr val="accent1"/>
-          </a:lnRef>
-          <a:fillRef idx="0">
-            <a:schemeClr val="accent1"/>
-          </a:fillRef>
-          <a:effectRef idx="0">
-            <a:schemeClr val="accent1"/>
-          </a:effectRef>
-          <a:fontRef idx="minor">
-            <a:schemeClr val="tx1"/>
-          </a:fontRef>
-        </p:style>
+          <a:effectLst>
+            <a:outerShdw blurRad="50800" dist="38100" dir="2700000" algn="tl" rotWithShape="0">
+              <a:prstClr val="black">
+                <a:alpha val="40000"/>
+              </a:prstClr>
+            </a:outerShdw>
+          </a:effectLst>
+        </p:spPr>
       </p:cxnSp>
     </p:spTree>
     <p:extLst>
       <p:ext uri="{BB962C8B-B14F-4D97-AF65-F5344CB8AC3E}">
-        <p14:creationId xmlns:p14="http://schemas.microsoft.com/office/powerpoint/2010/main" val="2745846289"/>
+        <p14:creationId xmlns:p14="http://schemas.microsoft.com/office/powerpoint/2010/main" val="3171762094"/>
       </p:ext>
     </p:extLst>
   </p:cSld>
@@ -6941,7 +7205,7 @@
           <p:cNvPr id="2" name="Title 1">
             <a:extLst>
               <a:ext uri="{FF2B5EF4-FFF2-40B4-BE49-F238E27FC236}">
-                <a16:creationId xmlns:a16="http://schemas.microsoft.com/office/drawing/2014/main" id="{2435A16B-C73F-4378-AB6D-608131C0F4DA}"/>
+                <a16:creationId xmlns:a16="http://schemas.microsoft.com/office/drawing/2014/main" xmlns="" id="{2435A16B-C73F-4378-AB6D-608131C0F4DA}"/>
               </a:ext>
             </a:extLst>
           </p:cNvPr>
@@ -6969,7 +7233,7 @@
           <p:cNvPr id="4" name="Content Placeholder 3">
             <a:extLst>
               <a:ext uri="{FF2B5EF4-FFF2-40B4-BE49-F238E27FC236}">
-                <a16:creationId xmlns:a16="http://schemas.microsoft.com/office/drawing/2014/main" id="{14BDE94F-63BA-453E-9B65-76E3AD0850E8}"/>
+                <a16:creationId xmlns:a16="http://schemas.microsoft.com/office/drawing/2014/main" xmlns="" id="{14BDE94F-63BA-453E-9B65-76E3AD0850E8}"/>
               </a:ext>
             </a:extLst>
           </p:cNvPr>
@@ -6999,28 +7263,28 @@
                 <a:gridCol w="2900149">
                   <a:extLst>
                     <a:ext uri="{9D8B030D-6E8A-4147-A177-3AD203B41FA5}">
-                      <a16:colId xmlns:a16="http://schemas.microsoft.com/office/drawing/2014/main" val="1377422795"/>
+                      <a16:colId xmlns:a16="http://schemas.microsoft.com/office/drawing/2014/main" xmlns="" val="1377422795"/>
                     </a:ext>
                   </a:extLst>
                 </a:gridCol>
                 <a:gridCol w="2531661">
                   <a:extLst>
                     <a:ext uri="{9D8B030D-6E8A-4147-A177-3AD203B41FA5}">
-                      <a16:colId xmlns:a16="http://schemas.microsoft.com/office/drawing/2014/main" val="1598590039"/>
+                      <a16:colId xmlns:a16="http://schemas.microsoft.com/office/drawing/2014/main" xmlns="" val="1598590039"/>
                     </a:ext>
                   </a:extLst>
                 </a:gridCol>
                 <a:gridCol w="2101756">
                   <a:extLst>
                     <a:ext uri="{9D8B030D-6E8A-4147-A177-3AD203B41FA5}">
-                      <a16:colId xmlns:a16="http://schemas.microsoft.com/office/drawing/2014/main" val="3896506482"/>
+                      <a16:colId xmlns:a16="http://schemas.microsoft.com/office/drawing/2014/main" xmlns="" val="3896506482"/>
                     </a:ext>
                   </a:extLst>
                 </a:gridCol>
                 <a:gridCol w="4067030">
                   <a:extLst>
                     <a:ext uri="{9D8B030D-6E8A-4147-A177-3AD203B41FA5}">
-                      <a16:colId xmlns:a16="http://schemas.microsoft.com/office/drawing/2014/main" val="3170647213"/>
+                      <a16:colId xmlns:a16="http://schemas.microsoft.com/office/drawing/2014/main" xmlns="" val="3170647213"/>
                     </a:ext>
                   </a:extLst>
                 </a:gridCol>
@@ -7080,7 +7344,7 @@
                 </a:tc>
                 <a:extLst>
                   <a:ext uri="{0D108BD9-81ED-4DB2-BD59-A6C34878D82A}">
-                    <a16:rowId xmlns:a16="http://schemas.microsoft.com/office/drawing/2014/main" val="3387341382"/>
+                    <a16:rowId xmlns:a16="http://schemas.microsoft.com/office/drawing/2014/main" xmlns="" val="3387341382"/>
                   </a:ext>
                 </a:extLst>
               </a:tr>
@@ -7140,7 +7404,7 @@
                 </a:tc>
                 <a:extLst>
                   <a:ext uri="{0D108BD9-81ED-4DB2-BD59-A6C34878D82A}">
-                    <a16:rowId xmlns:a16="http://schemas.microsoft.com/office/drawing/2014/main" val="855420630"/>
+                    <a16:rowId xmlns:a16="http://schemas.microsoft.com/office/drawing/2014/main" xmlns="" val="855420630"/>
                   </a:ext>
                 </a:extLst>
               </a:tr>
@@ -7216,7 +7480,7 @@
                 </a:tc>
                 <a:extLst>
                   <a:ext uri="{0D108BD9-81ED-4DB2-BD59-A6C34878D82A}">
-                    <a16:rowId xmlns:a16="http://schemas.microsoft.com/office/drawing/2014/main" val="3188031076"/>
+                    <a16:rowId xmlns:a16="http://schemas.microsoft.com/office/drawing/2014/main" xmlns="" val="3188031076"/>
                   </a:ext>
                 </a:extLst>
               </a:tr>
@@ -7283,7 +7547,7 @@
                 </a:tc>
                 <a:extLst>
                   <a:ext uri="{0D108BD9-81ED-4DB2-BD59-A6C34878D82A}">
-                    <a16:rowId xmlns:a16="http://schemas.microsoft.com/office/drawing/2014/main" val="1240135095"/>
+                    <a16:rowId xmlns:a16="http://schemas.microsoft.com/office/drawing/2014/main" xmlns="" val="1240135095"/>
                   </a:ext>
                 </a:extLst>
               </a:tr>
@@ -7339,7 +7603,7 @@
                 </a:tc>
                 <a:extLst>
                   <a:ext uri="{0D108BD9-81ED-4DB2-BD59-A6C34878D82A}">
-                    <a16:rowId xmlns:a16="http://schemas.microsoft.com/office/drawing/2014/main" val="1651246168"/>
+                    <a16:rowId xmlns:a16="http://schemas.microsoft.com/office/drawing/2014/main" xmlns="" val="1651246168"/>
                   </a:ext>
                 </a:extLst>
               </a:tr>
@@ -7399,7 +7663,7 @@
                 </a:tc>
                 <a:extLst>
                   <a:ext uri="{0D108BD9-81ED-4DB2-BD59-A6C34878D82A}">
-                    <a16:rowId xmlns:a16="http://schemas.microsoft.com/office/drawing/2014/main" val="3320754550"/>
+                    <a16:rowId xmlns:a16="http://schemas.microsoft.com/office/drawing/2014/main" xmlns="" val="3320754550"/>
                   </a:ext>
                 </a:extLst>
               </a:tr>
@@ -7476,7 +7740,7 @@
                 </a:tc>
                 <a:extLst>
                   <a:ext uri="{0D108BD9-81ED-4DB2-BD59-A6C34878D82A}">
-                    <a16:rowId xmlns:a16="http://schemas.microsoft.com/office/drawing/2014/main" val="701464579"/>
+                    <a16:rowId xmlns:a16="http://schemas.microsoft.com/office/drawing/2014/main" xmlns="" val="701464579"/>
                   </a:ext>
                 </a:extLst>
               </a:tr>
@@ -7613,7 +7877,7 @@
                 </a:tc>
                 <a:extLst>
                   <a:ext uri="{0D108BD9-81ED-4DB2-BD59-A6C34878D82A}">
-                    <a16:rowId xmlns:a16="http://schemas.microsoft.com/office/drawing/2014/main" val="904193852"/>
+                    <a16:rowId xmlns:a16="http://schemas.microsoft.com/office/drawing/2014/main" xmlns="" val="904193852"/>
                   </a:ext>
                 </a:extLst>
               </a:tr>
@@ -7656,7 +7920,7 @@
           <p:cNvPr id="2" name="Title 1">
             <a:extLst>
               <a:ext uri="{FF2B5EF4-FFF2-40B4-BE49-F238E27FC236}">
-                <a16:creationId xmlns:a16="http://schemas.microsoft.com/office/drawing/2014/main" id="{88BB61F1-4D04-4BA3-880A-182E63063E3F}"/>
+                <a16:creationId xmlns:a16="http://schemas.microsoft.com/office/drawing/2014/main" xmlns="" id="{88BB61F1-4D04-4BA3-880A-182E63063E3F}"/>
               </a:ext>
             </a:extLst>
           </p:cNvPr>
@@ -7684,7 +7948,7 @@
           <p:cNvPr id="5" name="Table 4">
             <a:extLst>
               <a:ext uri="{FF2B5EF4-FFF2-40B4-BE49-F238E27FC236}">
-                <a16:creationId xmlns:a16="http://schemas.microsoft.com/office/drawing/2014/main" id="{7FE0EC76-5C3B-4492-8D2E-E1FAAD3FCB09}"/>
+                <a16:creationId xmlns:a16="http://schemas.microsoft.com/office/drawing/2014/main" xmlns="" id="{7FE0EC76-5C3B-4492-8D2E-E1FAAD3FCB09}"/>
               </a:ext>
             </a:extLst>
           </p:cNvPr>
@@ -7713,21 +7977,21 @@
                 <a:gridCol w="1190594">
                   <a:extLst>
                     <a:ext uri="{9D8B030D-6E8A-4147-A177-3AD203B41FA5}">
-                      <a16:colId xmlns:a16="http://schemas.microsoft.com/office/drawing/2014/main" val="2350551349"/>
+                      <a16:colId xmlns:a16="http://schemas.microsoft.com/office/drawing/2014/main" xmlns="" val="2350551349"/>
                     </a:ext>
                   </a:extLst>
                 </a:gridCol>
                 <a:gridCol w="4492101">
                   <a:extLst>
                     <a:ext uri="{9D8B030D-6E8A-4147-A177-3AD203B41FA5}">
-                      <a16:colId xmlns:a16="http://schemas.microsoft.com/office/drawing/2014/main" val="3837764880"/>
+                      <a16:colId xmlns:a16="http://schemas.microsoft.com/office/drawing/2014/main" xmlns="" val="3837764880"/>
                     </a:ext>
                   </a:extLst>
                 </a:gridCol>
                 <a:gridCol w="5495277">
                   <a:extLst>
                     <a:ext uri="{9D8B030D-6E8A-4147-A177-3AD203B41FA5}">
-                      <a16:colId xmlns:a16="http://schemas.microsoft.com/office/drawing/2014/main" val="1650680026"/>
+                      <a16:colId xmlns:a16="http://schemas.microsoft.com/office/drawing/2014/main" xmlns="" val="1650680026"/>
                     </a:ext>
                   </a:extLst>
                 </a:gridCol>
@@ -7839,7 +8103,7 @@
                 </a:tc>
                 <a:extLst>
                   <a:ext uri="{0D108BD9-81ED-4DB2-BD59-A6C34878D82A}">
-                    <a16:rowId xmlns:a16="http://schemas.microsoft.com/office/drawing/2014/main" val="3622372536"/>
+                    <a16:rowId xmlns:a16="http://schemas.microsoft.com/office/drawing/2014/main" xmlns="" val="3622372536"/>
                   </a:ext>
                 </a:extLst>
               </a:tr>
@@ -7879,7 +8143,7 @@
                 </a:tc>
                 <a:extLst>
                   <a:ext uri="{0D108BD9-81ED-4DB2-BD59-A6C34878D82A}">
-                    <a16:rowId xmlns:a16="http://schemas.microsoft.com/office/drawing/2014/main" val="3395803886"/>
+                    <a16:rowId xmlns:a16="http://schemas.microsoft.com/office/drawing/2014/main" xmlns="" val="3395803886"/>
                   </a:ext>
                 </a:extLst>
               </a:tr>
@@ -7919,7 +8183,7 @@
                 </a:tc>
                 <a:extLst>
                   <a:ext uri="{0D108BD9-81ED-4DB2-BD59-A6C34878D82A}">
-                    <a16:rowId xmlns:a16="http://schemas.microsoft.com/office/drawing/2014/main" val="678614825"/>
+                    <a16:rowId xmlns:a16="http://schemas.microsoft.com/office/drawing/2014/main" xmlns="" val="678614825"/>
                   </a:ext>
                 </a:extLst>
               </a:tr>
@@ -7959,7 +8223,7 @@
                 </a:tc>
                 <a:extLst>
                   <a:ext uri="{0D108BD9-81ED-4DB2-BD59-A6C34878D82A}">
-                    <a16:rowId xmlns:a16="http://schemas.microsoft.com/office/drawing/2014/main" val="14700446"/>
+                    <a16:rowId xmlns:a16="http://schemas.microsoft.com/office/drawing/2014/main" xmlns="" val="14700446"/>
                   </a:ext>
                 </a:extLst>
               </a:tr>
@@ -8050,7 +8314,7 @@
                 </a:tc>
                 <a:extLst>
                   <a:ext uri="{0D108BD9-81ED-4DB2-BD59-A6C34878D82A}">
-                    <a16:rowId xmlns:a16="http://schemas.microsoft.com/office/drawing/2014/main" val="2986406775"/>
+                    <a16:rowId xmlns:a16="http://schemas.microsoft.com/office/drawing/2014/main" xmlns="" val="2986406775"/>
                   </a:ext>
                 </a:extLst>
               </a:tr>
@@ -8063,7 +8327,7 @@
           <p:cNvPr id="6" name="Rectangle 5">
             <a:extLst>
               <a:ext uri="{FF2B5EF4-FFF2-40B4-BE49-F238E27FC236}">
-                <a16:creationId xmlns:a16="http://schemas.microsoft.com/office/drawing/2014/main" id="{3D3A6304-95D1-4C9A-9D4F-D6FEB093FD04}"/>
+                <a16:creationId xmlns:a16="http://schemas.microsoft.com/office/drawing/2014/main" xmlns="" id="{3D3A6304-95D1-4C9A-9D4F-D6FEB093FD04}"/>
               </a:ext>
             </a:extLst>
           </p:cNvPr>
@@ -8113,7 +8377,7 @@
           <p:cNvPr id="7" name="Rectangle 6">
             <a:extLst>
               <a:ext uri="{FF2B5EF4-FFF2-40B4-BE49-F238E27FC236}">
-                <a16:creationId xmlns:a16="http://schemas.microsoft.com/office/drawing/2014/main" id="{FA2D1AB0-D637-49D0-8B11-798F83C57DE5}"/>
+                <a16:creationId xmlns:a16="http://schemas.microsoft.com/office/drawing/2014/main" xmlns="" id="{FA2D1AB0-D637-49D0-8B11-798F83C57DE5}"/>
               </a:ext>
             </a:extLst>
           </p:cNvPr>
@@ -8162,7 +8426,7 @@
           <p:cNvPr id="20" name="Group 19">
             <a:extLst>
               <a:ext uri="{FF2B5EF4-FFF2-40B4-BE49-F238E27FC236}">
-                <a16:creationId xmlns:a16="http://schemas.microsoft.com/office/drawing/2014/main" id="{61966E5F-6A7D-4692-B4A7-31B364D52472}"/>
+                <a16:creationId xmlns:a16="http://schemas.microsoft.com/office/drawing/2014/main" xmlns="" id="{61966E5F-6A7D-4692-B4A7-31B364D52472}"/>
               </a:ext>
             </a:extLst>
           </p:cNvPr>
@@ -8182,7 +8446,7 @@
             <p:cNvPr id="10" name="Rectangle 9">
               <a:extLst>
                 <a:ext uri="{FF2B5EF4-FFF2-40B4-BE49-F238E27FC236}">
-                  <a16:creationId xmlns:a16="http://schemas.microsoft.com/office/drawing/2014/main" id="{ED96FD96-30EE-42EA-AE74-FF660B4CD95E}"/>
+                  <a16:creationId xmlns:a16="http://schemas.microsoft.com/office/drawing/2014/main" xmlns="" id="{ED96FD96-30EE-42EA-AE74-FF660B4CD95E}"/>
                 </a:ext>
               </a:extLst>
             </p:cNvPr>
@@ -8231,7 +8495,7 @@
             <p:cNvPr id="15" name="Flowchart: Decision 14">
               <a:extLst>
                 <a:ext uri="{FF2B5EF4-FFF2-40B4-BE49-F238E27FC236}">
-                  <a16:creationId xmlns:a16="http://schemas.microsoft.com/office/drawing/2014/main" id="{7DD829F6-1A9E-4763-8903-C9A0993AC38E}"/>
+                  <a16:creationId xmlns:a16="http://schemas.microsoft.com/office/drawing/2014/main" xmlns="" id="{7DD829F6-1A9E-4763-8903-C9A0993AC38E}"/>
                 </a:ext>
               </a:extLst>
             </p:cNvPr>
@@ -8278,7 +8542,7 @@
           <p:cNvPr id="19" name="Group 18">
             <a:extLst>
               <a:ext uri="{FF2B5EF4-FFF2-40B4-BE49-F238E27FC236}">
-                <a16:creationId xmlns:a16="http://schemas.microsoft.com/office/drawing/2014/main" id="{0DAE263D-B219-4D24-932B-1ECEB1854EDA}"/>
+                <a16:creationId xmlns:a16="http://schemas.microsoft.com/office/drawing/2014/main" xmlns="" id="{0DAE263D-B219-4D24-932B-1ECEB1854EDA}"/>
               </a:ext>
             </a:extLst>
           </p:cNvPr>
@@ -8298,7 +8562,7 @@
             <p:cNvPr id="11" name="Rectangle 10">
               <a:extLst>
                 <a:ext uri="{FF2B5EF4-FFF2-40B4-BE49-F238E27FC236}">
-                  <a16:creationId xmlns:a16="http://schemas.microsoft.com/office/drawing/2014/main" id="{80085097-CCF1-4DCA-9E6D-E8FB4FF5528B}"/>
+                  <a16:creationId xmlns:a16="http://schemas.microsoft.com/office/drawing/2014/main" xmlns="" id="{80085097-CCF1-4DCA-9E6D-E8FB4FF5528B}"/>
                 </a:ext>
               </a:extLst>
             </p:cNvPr>
@@ -8347,7 +8611,7 @@
             <p:cNvPr id="12" name="Flowchart: Decision 11">
               <a:extLst>
                 <a:ext uri="{FF2B5EF4-FFF2-40B4-BE49-F238E27FC236}">
-                  <a16:creationId xmlns:a16="http://schemas.microsoft.com/office/drawing/2014/main" id="{2A0BE501-A964-4BB6-B7A5-2B5C26EC5DF9}"/>
+                  <a16:creationId xmlns:a16="http://schemas.microsoft.com/office/drawing/2014/main" xmlns="" id="{2A0BE501-A964-4BB6-B7A5-2B5C26EC5DF9}"/>
                 </a:ext>
               </a:extLst>
             </p:cNvPr>
@@ -8393,7 +8657,7 @@
             <p:cNvPr id="13" name="Flowchart: Decision 12">
               <a:extLst>
                 <a:ext uri="{FF2B5EF4-FFF2-40B4-BE49-F238E27FC236}">
-                  <a16:creationId xmlns:a16="http://schemas.microsoft.com/office/drawing/2014/main" id="{ED8A9097-3781-480B-8EA6-66A0EFFD1B0C}"/>
+                  <a16:creationId xmlns:a16="http://schemas.microsoft.com/office/drawing/2014/main" xmlns="" id="{ED8A9097-3781-480B-8EA6-66A0EFFD1B0C}"/>
                 </a:ext>
               </a:extLst>
             </p:cNvPr>
@@ -8439,7 +8703,7 @@
             <p:cNvPr id="14" name="Flowchart: Decision 13">
               <a:extLst>
                 <a:ext uri="{FF2B5EF4-FFF2-40B4-BE49-F238E27FC236}">
-                  <a16:creationId xmlns:a16="http://schemas.microsoft.com/office/drawing/2014/main" id="{FC301A33-6B6C-4638-8E7B-D2120989BE20}"/>
+                  <a16:creationId xmlns:a16="http://schemas.microsoft.com/office/drawing/2014/main" xmlns="" id="{FC301A33-6B6C-4638-8E7B-D2120989BE20}"/>
                 </a:ext>
               </a:extLst>
             </p:cNvPr>
@@ -8486,7 +8750,7 @@
           <p:cNvPr id="21" name="Group 20">
             <a:extLst>
               <a:ext uri="{FF2B5EF4-FFF2-40B4-BE49-F238E27FC236}">
-                <a16:creationId xmlns:a16="http://schemas.microsoft.com/office/drawing/2014/main" id="{84119507-443D-45EE-86E7-FA578222D438}"/>
+                <a16:creationId xmlns:a16="http://schemas.microsoft.com/office/drawing/2014/main" xmlns="" id="{84119507-443D-45EE-86E7-FA578222D438}"/>
               </a:ext>
             </a:extLst>
           </p:cNvPr>
@@ -8506,7 +8770,7 @@
             <p:cNvPr id="8" name="Rectangle 7">
               <a:extLst>
                 <a:ext uri="{FF2B5EF4-FFF2-40B4-BE49-F238E27FC236}">
-                  <a16:creationId xmlns:a16="http://schemas.microsoft.com/office/drawing/2014/main" id="{AFEE3931-10A1-4CDD-810D-FC9109934B99}"/>
+                  <a16:creationId xmlns:a16="http://schemas.microsoft.com/office/drawing/2014/main" xmlns="" id="{AFEE3931-10A1-4CDD-810D-FC9109934B99}"/>
                 </a:ext>
               </a:extLst>
             </p:cNvPr>
@@ -8555,7 +8819,7 @@
             <p:cNvPr id="16" name="Flowchart: Decision 15">
               <a:extLst>
                 <a:ext uri="{FF2B5EF4-FFF2-40B4-BE49-F238E27FC236}">
-                  <a16:creationId xmlns:a16="http://schemas.microsoft.com/office/drawing/2014/main" id="{4E597F90-8639-4F18-85CF-7F9254DB3317}"/>
+                  <a16:creationId xmlns:a16="http://schemas.microsoft.com/office/drawing/2014/main" xmlns="" id="{4E597F90-8639-4F18-85CF-7F9254DB3317}"/>
                 </a:ext>
               </a:extLst>
             </p:cNvPr>
@@ -8602,7 +8866,7 @@
           <p:cNvPr id="22" name="Group 21">
             <a:extLst>
               <a:ext uri="{FF2B5EF4-FFF2-40B4-BE49-F238E27FC236}">
-                <a16:creationId xmlns:a16="http://schemas.microsoft.com/office/drawing/2014/main" id="{D3172953-4DC1-4408-A686-B915B758B219}"/>
+                <a16:creationId xmlns:a16="http://schemas.microsoft.com/office/drawing/2014/main" xmlns="" id="{D3172953-4DC1-4408-A686-B915B758B219}"/>
               </a:ext>
             </a:extLst>
           </p:cNvPr>
@@ -8622,7 +8886,7 @@
             <p:cNvPr id="9" name="Rectangle 8">
               <a:extLst>
                 <a:ext uri="{FF2B5EF4-FFF2-40B4-BE49-F238E27FC236}">
-                  <a16:creationId xmlns:a16="http://schemas.microsoft.com/office/drawing/2014/main" id="{EFA74233-BA2E-456A-86AA-CF07F73244F1}"/>
+                  <a16:creationId xmlns:a16="http://schemas.microsoft.com/office/drawing/2014/main" xmlns="" id="{EFA74233-BA2E-456A-86AA-CF07F73244F1}"/>
                 </a:ext>
               </a:extLst>
             </p:cNvPr>
@@ -8671,7 +8935,7 @@
             <p:cNvPr id="17" name="Flowchart: Decision 16">
               <a:extLst>
                 <a:ext uri="{FF2B5EF4-FFF2-40B4-BE49-F238E27FC236}">
-                  <a16:creationId xmlns:a16="http://schemas.microsoft.com/office/drawing/2014/main" id="{92959D0E-74B4-4C6C-828D-74F2B6A3D47C}"/>
+                  <a16:creationId xmlns:a16="http://schemas.microsoft.com/office/drawing/2014/main" xmlns="" id="{92959D0E-74B4-4C6C-828D-74F2B6A3D47C}"/>
                 </a:ext>
               </a:extLst>
             </p:cNvPr>
@@ -8718,7 +8982,7 @@
           <p:cNvPr id="18" name="Flowchart: Decision 17">
             <a:extLst>
               <a:ext uri="{FF2B5EF4-FFF2-40B4-BE49-F238E27FC236}">
-                <a16:creationId xmlns:a16="http://schemas.microsoft.com/office/drawing/2014/main" id="{210DC1B3-53F0-4298-B209-CB2117756721}"/>
+                <a16:creationId xmlns:a16="http://schemas.microsoft.com/office/drawing/2014/main" xmlns="" id="{210DC1B3-53F0-4298-B209-CB2117756721}"/>
               </a:ext>
             </a:extLst>
           </p:cNvPr>
@@ -8764,7 +9028,7 @@
           <p:cNvPr id="23" name="TextBox 22">
             <a:extLst>
               <a:ext uri="{FF2B5EF4-FFF2-40B4-BE49-F238E27FC236}">
-                <a16:creationId xmlns:a16="http://schemas.microsoft.com/office/drawing/2014/main" id="{E661C252-6A24-4EB1-8618-EC5A6E2ECFDD}"/>
+                <a16:creationId xmlns:a16="http://schemas.microsoft.com/office/drawing/2014/main" xmlns="" id="{E661C252-6A24-4EB1-8618-EC5A6E2ECFDD}"/>
               </a:ext>
             </a:extLst>
           </p:cNvPr>
@@ -8803,7 +9067,7 @@
           <p:cNvPr id="24" name="TextBox 23">
             <a:extLst>
               <a:ext uri="{FF2B5EF4-FFF2-40B4-BE49-F238E27FC236}">
-                <a16:creationId xmlns:a16="http://schemas.microsoft.com/office/drawing/2014/main" id="{F7314EE0-3A67-4C86-892A-2F68B23DA8DE}"/>
+                <a16:creationId xmlns:a16="http://schemas.microsoft.com/office/drawing/2014/main" xmlns="" id="{F7314EE0-3A67-4C86-892A-2F68B23DA8DE}"/>
               </a:ext>
             </a:extLst>
           </p:cNvPr>
@@ -8842,7 +9106,7 @@
           <p:cNvPr id="25" name="TextBox 24">
             <a:extLst>
               <a:ext uri="{FF2B5EF4-FFF2-40B4-BE49-F238E27FC236}">
-                <a16:creationId xmlns:a16="http://schemas.microsoft.com/office/drawing/2014/main" id="{DFC08BC7-36A6-438D-B1DC-123CBDD5C0F6}"/>
+                <a16:creationId xmlns:a16="http://schemas.microsoft.com/office/drawing/2014/main" xmlns="" id="{DFC08BC7-36A6-438D-B1DC-123CBDD5C0F6}"/>
               </a:ext>
             </a:extLst>
           </p:cNvPr>
@@ -8881,7 +9145,7 @@
           <p:cNvPr id="26" name="TextBox 25">
             <a:extLst>
               <a:ext uri="{FF2B5EF4-FFF2-40B4-BE49-F238E27FC236}">
-                <a16:creationId xmlns:a16="http://schemas.microsoft.com/office/drawing/2014/main" id="{4992DB1A-B53E-43E4-9038-42FB5B14EC93}"/>
+                <a16:creationId xmlns:a16="http://schemas.microsoft.com/office/drawing/2014/main" xmlns="" id="{4992DB1A-B53E-43E4-9038-42FB5B14EC93}"/>
               </a:ext>
             </a:extLst>
           </p:cNvPr>
@@ -8920,7 +9184,7 @@
           <p:cNvPr id="27" name="TextBox 26">
             <a:extLst>
               <a:ext uri="{FF2B5EF4-FFF2-40B4-BE49-F238E27FC236}">
-                <a16:creationId xmlns:a16="http://schemas.microsoft.com/office/drawing/2014/main" id="{8710889C-2534-4DC4-B4CE-00EC929F78F1}"/>
+                <a16:creationId xmlns:a16="http://schemas.microsoft.com/office/drawing/2014/main" xmlns="" id="{8710889C-2534-4DC4-B4CE-00EC929F78F1}"/>
               </a:ext>
             </a:extLst>
           </p:cNvPr>
@@ -8959,7 +9223,7 @@
           <p:cNvPr id="29" name="TextBox 28">
             <a:extLst>
               <a:ext uri="{FF2B5EF4-FFF2-40B4-BE49-F238E27FC236}">
-                <a16:creationId xmlns:a16="http://schemas.microsoft.com/office/drawing/2014/main" id="{31A6AF03-D01E-4FD5-90D9-8B5FFD612ECB}"/>
+                <a16:creationId xmlns:a16="http://schemas.microsoft.com/office/drawing/2014/main" xmlns="" id="{31A6AF03-D01E-4FD5-90D9-8B5FFD612ECB}"/>
               </a:ext>
             </a:extLst>
           </p:cNvPr>
@@ -8994,7 +9258,7 @@
           <p:cNvPr id="30" name="TextBox 29">
             <a:extLst>
               <a:ext uri="{FF2B5EF4-FFF2-40B4-BE49-F238E27FC236}">
-                <a16:creationId xmlns:a16="http://schemas.microsoft.com/office/drawing/2014/main" id="{B1F3D9F5-18A1-4BB4-8394-3037A1C456BE}"/>
+                <a16:creationId xmlns:a16="http://schemas.microsoft.com/office/drawing/2014/main" xmlns="" id="{B1F3D9F5-18A1-4BB4-8394-3037A1C456BE}"/>
               </a:ext>
             </a:extLst>
           </p:cNvPr>
@@ -9029,7 +9293,7 @@
           <p:cNvPr id="32" name="Straight Connector 31">
             <a:extLst>
               <a:ext uri="{FF2B5EF4-FFF2-40B4-BE49-F238E27FC236}">
-                <a16:creationId xmlns:a16="http://schemas.microsoft.com/office/drawing/2014/main" id="{C278E7B5-CACA-4CA5-BAB7-413AB76CD5F8}"/>
+                <a16:creationId xmlns:a16="http://schemas.microsoft.com/office/drawing/2014/main" xmlns="" id="{C278E7B5-CACA-4CA5-BAB7-413AB76CD5F8}"/>
               </a:ext>
             </a:extLst>
           </p:cNvPr>
@@ -9071,7 +9335,7 @@
           <p:cNvPr id="33" name="Straight Connector 32">
             <a:extLst>
               <a:ext uri="{FF2B5EF4-FFF2-40B4-BE49-F238E27FC236}">
-                <a16:creationId xmlns:a16="http://schemas.microsoft.com/office/drawing/2014/main" id="{760B251E-E9CE-466F-9A74-481074E07959}"/>
+                <a16:creationId xmlns:a16="http://schemas.microsoft.com/office/drawing/2014/main" xmlns="" id="{760B251E-E9CE-466F-9A74-481074E07959}"/>
               </a:ext>
             </a:extLst>
           </p:cNvPr>
@@ -9114,7 +9378,7 @@
           <p:cNvPr id="36" name="Straight Connector 35">
             <a:extLst>
               <a:ext uri="{FF2B5EF4-FFF2-40B4-BE49-F238E27FC236}">
-                <a16:creationId xmlns:a16="http://schemas.microsoft.com/office/drawing/2014/main" id="{4B29E178-4BBD-4573-A789-253BC7408026}"/>
+                <a16:creationId xmlns:a16="http://schemas.microsoft.com/office/drawing/2014/main" xmlns="" id="{4B29E178-4BBD-4573-A789-253BC7408026}"/>
               </a:ext>
             </a:extLst>
           </p:cNvPr>
@@ -9157,7 +9421,7 @@
           <p:cNvPr id="39" name="Straight Connector 38">
             <a:extLst>
               <a:ext uri="{FF2B5EF4-FFF2-40B4-BE49-F238E27FC236}">
-                <a16:creationId xmlns:a16="http://schemas.microsoft.com/office/drawing/2014/main" id="{1833A9CD-9D3C-4E77-BBE9-FCBD590D33A0}"/>
+                <a16:creationId xmlns:a16="http://schemas.microsoft.com/office/drawing/2014/main" xmlns="" id="{1833A9CD-9D3C-4E77-BBE9-FCBD590D33A0}"/>
               </a:ext>
             </a:extLst>
           </p:cNvPr>
@@ -9200,7 +9464,7 @@
           <p:cNvPr id="47" name="Straight Connector 46">
             <a:extLst>
               <a:ext uri="{FF2B5EF4-FFF2-40B4-BE49-F238E27FC236}">
-                <a16:creationId xmlns:a16="http://schemas.microsoft.com/office/drawing/2014/main" id="{3CCE225C-90DF-4831-BC56-FC60EC845F85}"/>
+                <a16:creationId xmlns:a16="http://schemas.microsoft.com/office/drawing/2014/main" xmlns="" id="{3CCE225C-90DF-4831-BC56-FC60EC845F85}"/>
               </a:ext>
             </a:extLst>
           </p:cNvPr>
@@ -9360,28 +9624,28 @@
                 <a:gridCol w="2628900">
                   <a:extLst>
                     <a:ext uri="{9D8B030D-6E8A-4147-A177-3AD203B41FA5}">
-                      <a16:colId xmlns:a16="http://schemas.microsoft.com/office/drawing/2014/main" val="20000"/>
+                      <a16:colId xmlns:a16="http://schemas.microsoft.com/office/drawing/2014/main" xmlns="" val="20000"/>
                     </a:ext>
                   </a:extLst>
                 </a:gridCol>
                 <a:gridCol w="2628900">
                   <a:extLst>
                     <a:ext uri="{9D8B030D-6E8A-4147-A177-3AD203B41FA5}">
-                      <a16:colId xmlns:a16="http://schemas.microsoft.com/office/drawing/2014/main" val="20001"/>
+                      <a16:colId xmlns:a16="http://schemas.microsoft.com/office/drawing/2014/main" xmlns="" val="20001"/>
                     </a:ext>
                   </a:extLst>
                 </a:gridCol>
                 <a:gridCol w="2628900">
                   <a:extLst>
                     <a:ext uri="{9D8B030D-6E8A-4147-A177-3AD203B41FA5}">
-                      <a16:colId xmlns:a16="http://schemas.microsoft.com/office/drawing/2014/main" val="20002"/>
+                      <a16:colId xmlns:a16="http://schemas.microsoft.com/office/drawing/2014/main" xmlns="" val="20002"/>
                     </a:ext>
                   </a:extLst>
                 </a:gridCol>
                 <a:gridCol w="2628900">
                   <a:extLst>
                     <a:ext uri="{9D8B030D-6E8A-4147-A177-3AD203B41FA5}">
-                      <a16:colId xmlns:a16="http://schemas.microsoft.com/office/drawing/2014/main" val="20003"/>
+                      <a16:colId xmlns:a16="http://schemas.microsoft.com/office/drawing/2014/main" xmlns="" val="20003"/>
                     </a:ext>
                   </a:extLst>
                 </a:gridCol>
@@ -9446,7 +9710,7 @@
                 </a:tc>
                 <a:extLst>
                   <a:ext uri="{0D108BD9-81ED-4DB2-BD59-A6C34878D82A}">
-                    <a16:rowId xmlns:a16="http://schemas.microsoft.com/office/drawing/2014/main" val="10000"/>
+                    <a16:rowId xmlns:a16="http://schemas.microsoft.com/office/drawing/2014/main" xmlns="" val="10000"/>
                   </a:ext>
                 </a:extLst>
               </a:tr>
@@ -9505,7 +9769,7 @@
                 </a:tc>
                 <a:extLst>
                   <a:ext uri="{0D108BD9-81ED-4DB2-BD59-A6C34878D82A}">
-                    <a16:rowId xmlns:a16="http://schemas.microsoft.com/office/drawing/2014/main" val="10001"/>
+                    <a16:rowId xmlns:a16="http://schemas.microsoft.com/office/drawing/2014/main" xmlns="" val="10001"/>
                   </a:ext>
                 </a:extLst>
               </a:tr>
@@ -9568,7 +9832,7 @@
                 </a:tc>
                 <a:extLst>
                   <a:ext uri="{0D108BD9-81ED-4DB2-BD59-A6C34878D82A}">
-                    <a16:rowId xmlns:a16="http://schemas.microsoft.com/office/drawing/2014/main" val="10002"/>
+                    <a16:rowId xmlns:a16="http://schemas.microsoft.com/office/drawing/2014/main" xmlns="" val="10002"/>
                   </a:ext>
                 </a:extLst>
               </a:tr>
@@ -9631,7 +9895,7 @@
                 </a:tc>
                 <a:extLst>
                   <a:ext uri="{0D108BD9-81ED-4DB2-BD59-A6C34878D82A}">
-                    <a16:rowId xmlns:a16="http://schemas.microsoft.com/office/drawing/2014/main" val="10003"/>
+                    <a16:rowId xmlns:a16="http://schemas.microsoft.com/office/drawing/2014/main" xmlns="" val="10003"/>
                   </a:ext>
                 </a:extLst>
               </a:tr>
@@ -9690,7 +9954,7 @@
                 </a:tc>
                 <a:extLst>
                   <a:ext uri="{0D108BD9-81ED-4DB2-BD59-A6C34878D82A}">
-                    <a16:rowId xmlns:a16="http://schemas.microsoft.com/office/drawing/2014/main" val="10004"/>
+                    <a16:rowId xmlns:a16="http://schemas.microsoft.com/office/drawing/2014/main" xmlns="" val="10004"/>
                   </a:ext>
                 </a:extLst>
               </a:tr>
@@ -9749,7 +10013,7 @@
                 </a:tc>
                 <a:extLst>
                   <a:ext uri="{0D108BD9-81ED-4DB2-BD59-A6C34878D82A}">
-                    <a16:rowId xmlns:a16="http://schemas.microsoft.com/office/drawing/2014/main" val="10005"/>
+                    <a16:rowId xmlns:a16="http://schemas.microsoft.com/office/drawing/2014/main" xmlns="" val="10005"/>
                   </a:ext>
                 </a:extLst>
               </a:tr>
@@ -9809,7 +10073,7 @@
                 </a:tc>
                 <a:extLst>
                   <a:ext uri="{0D108BD9-81ED-4DB2-BD59-A6C34878D82A}">
-                    <a16:rowId xmlns:a16="http://schemas.microsoft.com/office/drawing/2014/main" val="10006"/>
+                    <a16:rowId xmlns:a16="http://schemas.microsoft.com/office/drawing/2014/main" xmlns="" val="10006"/>
                   </a:ext>
                 </a:extLst>
               </a:tr>
@@ -9903,28 +10167,28 @@
                 <a:gridCol w="2628900">
                   <a:extLst>
                     <a:ext uri="{9D8B030D-6E8A-4147-A177-3AD203B41FA5}">
-                      <a16:colId xmlns:a16="http://schemas.microsoft.com/office/drawing/2014/main" val="20000"/>
+                      <a16:colId xmlns:a16="http://schemas.microsoft.com/office/drawing/2014/main" xmlns="" val="20000"/>
                     </a:ext>
                   </a:extLst>
                 </a:gridCol>
                 <a:gridCol w="2628900">
                   <a:extLst>
                     <a:ext uri="{9D8B030D-6E8A-4147-A177-3AD203B41FA5}">
-                      <a16:colId xmlns:a16="http://schemas.microsoft.com/office/drawing/2014/main" val="20001"/>
+                      <a16:colId xmlns:a16="http://schemas.microsoft.com/office/drawing/2014/main" xmlns="" val="20001"/>
                     </a:ext>
                   </a:extLst>
                 </a:gridCol>
                 <a:gridCol w="2628900">
                   <a:extLst>
                     <a:ext uri="{9D8B030D-6E8A-4147-A177-3AD203B41FA5}">
-                      <a16:colId xmlns:a16="http://schemas.microsoft.com/office/drawing/2014/main" val="20002"/>
+                      <a16:colId xmlns:a16="http://schemas.microsoft.com/office/drawing/2014/main" xmlns="" val="20002"/>
                     </a:ext>
                   </a:extLst>
                 </a:gridCol>
                 <a:gridCol w="2628900">
                   <a:extLst>
                     <a:ext uri="{9D8B030D-6E8A-4147-A177-3AD203B41FA5}">
-                      <a16:colId xmlns:a16="http://schemas.microsoft.com/office/drawing/2014/main" val="20003"/>
+                      <a16:colId xmlns:a16="http://schemas.microsoft.com/office/drawing/2014/main" xmlns="" val="20003"/>
                     </a:ext>
                   </a:extLst>
                 </a:gridCol>
@@ -9989,7 +10253,7 @@
                 </a:tc>
                 <a:extLst>
                   <a:ext uri="{0D108BD9-81ED-4DB2-BD59-A6C34878D82A}">
-                    <a16:rowId xmlns:a16="http://schemas.microsoft.com/office/drawing/2014/main" val="10000"/>
+                    <a16:rowId xmlns:a16="http://schemas.microsoft.com/office/drawing/2014/main" xmlns="" val="10000"/>
                   </a:ext>
                 </a:extLst>
               </a:tr>
@@ -10052,7 +10316,7 @@
                 </a:tc>
                 <a:extLst>
                   <a:ext uri="{0D108BD9-81ED-4DB2-BD59-A6C34878D82A}">
-                    <a16:rowId xmlns:a16="http://schemas.microsoft.com/office/drawing/2014/main" val="10001"/>
+                    <a16:rowId xmlns:a16="http://schemas.microsoft.com/office/drawing/2014/main" xmlns="" val="10001"/>
                   </a:ext>
                 </a:extLst>
               </a:tr>
@@ -10123,7 +10387,7 @@
                 </a:tc>
                 <a:extLst>
                   <a:ext uri="{0D108BD9-81ED-4DB2-BD59-A6C34878D82A}">
-                    <a16:rowId xmlns:a16="http://schemas.microsoft.com/office/drawing/2014/main" val="10002"/>
+                    <a16:rowId xmlns:a16="http://schemas.microsoft.com/office/drawing/2014/main" xmlns="" val="10002"/>
                   </a:ext>
                 </a:extLst>
               </a:tr>
@@ -10182,7 +10446,7 @@
                 </a:tc>
                 <a:extLst>
                   <a:ext uri="{0D108BD9-81ED-4DB2-BD59-A6C34878D82A}">
-                    <a16:rowId xmlns:a16="http://schemas.microsoft.com/office/drawing/2014/main" val="10003"/>
+                    <a16:rowId xmlns:a16="http://schemas.microsoft.com/office/drawing/2014/main" xmlns="" val="10003"/>
                   </a:ext>
                 </a:extLst>
               </a:tr>
@@ -10253,7 +10517,7 @@
                 </a:tc>
                 <a:extLst>
                   <a:ext uri="{0D108BD9-81ED-4DB2-BD59-A6C34878D82A}">
-                    <a16:rowId xmlns:a16="http://schemas.microsoft.com/office/drawing/2014/main" val="10004"/>
+                    <a16:rowId xmlns:a16="http://schemas.microsoft.com/office/drawing/2014/main" xmlns="" val="10004"/>
                   </a:ext>
                 </a:extLst>
               </a:tr>
@@ -10312,7 +10576,7 @@
                 </a:tc>
                 <a:extLst>
                   <a:ext uri="{0D108BD9-81ED-4DB2-BD59-A6C34878D82A}">
-                    <a16:rowId xmlns:a16="http://schemas.microsoft.com/office/drawing/2014/main" val="10005"/>
+                    <a16:rowId xmlns:a16="http://schemas.microsoft.com/office/drawing/2014/main" xmlns="" val="10005"/>
                   </a:ext>
                 </a:extLst>
               </a:tr>
@@ -10375,7 +10639,7 @@
                 </a:tc>
                 <a:extLst>
                   <a:ext uri="{0D108BD9-81ED-4DB2-BD59-A6C34878D82A}">
-                    <a16:rowId xmlns:a16="http://schemas.microsoft.com/office/drawing/2014/main" val="10006"/>
+                    <a16:rowId xmlns:a16="http://schemas.microsoft.com/office/drawing/2014/main" xmlns="" val="10006"/>
                   </a:ext>
                 </a:extLst>
               </a:tr>
@@ -10435,7 +10699,7 @@
                 </a:tc>
                 <a:extLst>
                   <a:ext uri="{0D108BD9-81ED-4DB2-BD59-A6C34878D82A}">
-                    <a16:rowId xmlns:a16="http://schemas.microsoft.com/office/drawing/2014/main" val="10007"/>
+                    <a16:rowId xmlns:a16="http://schemas.microsoft.com/office/drawing/2014/main" xmlns="" val="10007"/>
                   </a:ext>
                 </a:extLst>
               </a:tr>
@@ -10529,28 +10793,28 @@
                 <a:gridCol w="2628900">
                   <a:extLst>
                     <a:ext uri="{9D8B030D-6E8A-4147-A177-3AD203B41FA5}">
-                      <a16:colId xmlns:a16="http://schemas.microsoft.com/office/drawing/2014/main" val="20000"/>
+                      <a16:colId xmlns:a16="http://schemas.microsoft.com/office/drawing/2014/main" xmlns="" val="20000"/>
                     </a:ext>
                   </a:extLst>
                 </a:gridCol>
                 <a:gridCol w="2628900">
                   <a:extLst>
                     <a:ext uri="{9D8B030D-6E8A-4147-A177-3AD203B41FA5}">
-                      <a16:colId xmlns:a16="http://schemas.microsoft.com/office/drawing/2014/main" val="20001"/>
+                      <a16:colId xmlns:a16="http://schemas.microsoft.com/office/drawing/2014/main" xmlns="" val="20001"/>
                     </a:ext>
                   </a:extLst>
                 </a:gridCol>
                 <a:gridCol w="2628900">
                   <a:extLst>
                     <a:ext uri="{9D8B030D-6E8A-4147-A177-3AD203B41FA5}">
-                      <a16:colId xmlns:a16="http://schemas.microsoft.com/office/drawing/2014/main" val="20002"/>
+                      <a16:colId xmlns:a16="http://schemas.microsoft.com/office/drawing/2014/main" xmlns="" val="20002"/>
                     </a:ext>
                   </a:extLst>
                 </a:gridCol>
                 <a:gridCol w="2628900">
                   <a:extLst>
                     <a:ext uri="{9D8B030D-6E8A-4147-A177-3AD203B41FA5}">
-                      <a16:colId xmlns:a16="http://schemas.microsoft.com/office/drawing/2014/main" val="20003"/>
+                      <a16:colId xmlns:a16="http://schemas.microsoft.com/office/drawing/2014/main" xmlns="" val="20003"/>
                     </a:ext>
                   </a:extLst>
                 </a:gridCol>
@@ -10615,7 +10879,7 @@
                 </a:tc>
                 <a:extLst>
                   <a:ext uri="{0D108BD9-81ED-4DB2-BD59-A6C34878D82A}">
-                    <a16:rowId xmlns:a16="http://schemas.microsoft.com/office/drawing/2014/main" val="10000"/>
+                    <a16:rowId xmlns:a16="http://schemas.microsoft.com/office/drawing/2014/main" xmlns="" val="10000"/>
                   </a:ext>
                 </a:extLst>
               </a:tr>
@@ -10686,7 +10950,7 @@
                 </a:tc>
                 <a:extLst>
                   <a:ext uri="{0D108BD9-81ED-4DB2-BD59-A6C34878D82A}">
-                    <a16:rowId xmlns:a16="http://schemas.microsoft.com/office/drawing/2014/main" val="10001"/>
+                    <a16:rowId xmlns:a16="http://schemas.microsoft.com/office/drawing/2014/main" xmlns="" val="10001"/>
                   </a:ext>
                 </a:extLst>
               </a:tr>
@@ -10757,7 +11021,7 @@
                 </a:tc>
                 <a:extLst>
                   <a:ext uri="{0D108BD9-81ED-4DB2-BD59-A6C34878D82A}">
-                    <a16:rowId xmlns:a16="http://schemas.microsoft.com/office/drawing/2014/main" val="10002"/>
+                    <a16:rowId xmlns:a16="http://schemas.microsoft.com/office/drawing/2014/main" xmlns="" val="10002"/>
                   </a:ext>
                 </a:extLst>
               </a:tr>
@@ -10828,7 +11092,7 @@
                 </a:tc>
                 <a:extLst>
                   <a:ext uri="{0D108BD9-81ED-4DB2-BD59-A6C34878D82A}">
-                    <a16:rowId xmlns:a16="http://schemas.microsoft.com/office/drawing/2014/main" val="10003"/>
+                    <a16:rowId xmlns:a16="http://schemas.microsoft.com/office/drawing/2014/main" xmlns="" val="10003"/>
                   </a:ext>
                 </a:extLst>
               </a:tr>
@@ -10887,7 +11151,7 @@
                 </a:tc>
                 <a:extLst>
                   <a:ext uri="{0D108BD9-81ED-4DB2-BD59-A6C34878D82A}">
-                    <a16:rowId xmlns:a16="http://schemas.microsoft.com/office/drawing/2014/main" val="10004"/>
+                    <a16:rowId xmlns:a16="http://schemas.microsoft.com/office/drawing/2014/main" xmlns="" val="10004"/>
                   </a:ext>
                 </a:extLst>
               </a:tr>
@@ -10946,7 +11210,7 @@
                 </a:tc>
                 <a:extLst>
                   <a:ext uri="{0D108BD9-81ED-4DB2-BD59-A6C34878D82A}">
-                    <a16:rowId xmlns:a16="http://schemas.microsoft.com/office/drawing/2014/main" val="10005"/>
+                    <a16:rowId xmlns:a16="http://schemas.microsoft.com/office/drawing/2014/main" xmlns="" val="10005"/>
                   </a:ext>
                 </a:extLst>
               </a:tr>
@@ -16279,7 +16543,7 @@
   <a:extraClrSchemeLst/>
   <a:extLst>
     <a:ext uri="{05A4C25C-085E-4340-85A3-A5531E510DB2}">
-      <thm15:themeFamily xmlns:thm15="http://schemas.microsoft.com/office/thememl/2012/main" name="Office Theme" id="{62F939B6-93AF-4DB8-9C6B-D6C7DFDC589F}" vid="{4A3C46E8-61CC-4603-A589-7422A47A8E4A}"/>
+      <thm15:themeFamily xmlns:thm15="http://schemas.microsoft.com/office/thememl/2012/main" xmlns="" name="Office Theme" id="{62F939B6-93AF-4DB8-9C6B-D6C7DFDC589F}" vid="{4A3C46E8-61CC-4603-A589-7422A47A8E4A}"/>
     </a:ext>
   </a:extLst>
 </a:theme>

</xml_diff>